<commit_message>
Created Flowchart Image for Q1 of PSPM1718
</commit_message>
<xml_diff>
--- a/Past Year Theory Questions/Resources/resources.pptx
+++ b/Past Year Theory Questions/Resources/resources.pptx
@@ -6,6 +6,7 @@
   </p:sldMasterIdLst>
   <p:sldIdLst>
     <p:sldId id="257" r:id="rId2"/>
+    <p:sldId id="258" r:id="rId3"/>
   </p:sldIdLst>
   <p:sldSz cx="12192000" cy="6858000"/>
   <p:notesSz cx="6858000" cy="9144000"/>
@@ -104,6 +105,11 @@
       </a:defRPr>
     </a:lvl9pPr>
   </p:defaultTextStyle>
+  <p:extLst>
+    <p:ext uri="{EFAFB233-063F-42B5-8137-9DF3F51BA10A}">
+      <p15:sldGuideLst xmlns:p15="http://schemas.microsoft.com/office/powerpoint/2012/main"/>
+    </p:ext>
+  </p:extLst>
 </p:presentation>
 </file>
 
@@ -254,7 +260,7 @@
           <a:p>
             <a:fld id="{34BBF2E1-1C0D-4B66-AD27-CA9E57E33A5F}" type="datetimeFigureOut">
               <a:rPr lang="en-US" smtClean="0"/>
-              <a:t>28-Apr-22</a:t>
+              <a:t>01-May-22</a:t>
             </a:fld>
             <a:endParaRPr lang="en-US"/>
           </a:p>
@@ -452,7 +458,7 @@
           <a:p>
             <a:fld id="{34BBF2E1-1C0D-4B66-AD27-CA9E57E33A5F}" type="datetimeFigureOut">
               <a:rPr lang="en-US" smtClean="0"/>
-              <a:t>28-Apr-22</a:t>
+              <a:t>01-May-22</a:t>
             </a:fld>
             <a:endParaRPr lang="en-US"/>
           </a:p>
@@ -660,7 +666,7 @@
           <a:p>
             <a:fld id="{34BBF2E1-1C0D-4B66-AD27-CA9E57E33A5F}" type="datetimeFigureOut">
               <a:rPr lang="en-US" smtClean="0"/>
-              <a:t>28-Apr-22</a:t>
+              <a:t>01-May-22</a:t>
             </a:fld>
             <a:endParaRPr lang="en-US"/>
           </a:p>
@@ -858,7 +864,7 @@
           <a:p>
             <a:fld id="{34BBF2E1-1C0D-4B66-AD27-CA9E57E33A5F}" type="datetimeFigureOut">
               <a:rPr lang="en-US" smtClean="0"/>
-              <a:t>28-Apr-22</a:t>
+              <a:t>01-May-22</a:t>
             </a:fld>
             <a:endParaRPr lang="en-US"/>
           </a:p>
@@ -1133,7 +1139,7 @@
           <a:p>
             <a:fld id="{34BBF2E1-1C0D-4B66-AD27-CA9E57E33A5F}" type="datetimeFigureOut">
               <a:rPr lang="en-US" smtClean="0"/>
-              <a:t>28-Apr-22</a:t>
+              <a:t>01-May-22</a:t>
             </a:fld>
             <a:endParaRPr lang="en-US"/>
           </a:p>
@@ -1398,7 +1404,7 @@
           <a:p>
             <a:fld id="{34BBF2E1-1C0D-4B66-AD27-CA9E57E33A5F}" type="datetimeFigureOut">
               <a:rPr lang="en-US" smtClean="0"/>
-              <a:t>28-Apr-22</a:t>
+              <a:t>01-May-22</a:t>
             </a:fld>
             <a:endParaRPr lang="en-US"/>
           </a:p>
@@ -1810,7 +1816,7 @@
           <a:p>
             <a:fld id="{34BBF2E1-1C0D-4B66-AD27-CA9E57E33A5F}" type="datetimeFigureOut">
               <a:rPr lang="en-US" smtClean="0"/>
-              <a:t>28-Apr-22</a:t>
+              <a:t>01-May-22</a:t>
             </a:fld>
             <a:endParaRPr lang="en-US"/>
           </a:p>
@@ -1951,7 +1957,7 @@
           <a:p>
             <a:fld id="{34BBF2E1-1C0D-4B66-AD27-CA9E57E33A5F}" type="datetimeFigureOut">
               <a:rPr lang="en-US" smtClean="0"/>
-              <a:t>28-Apr-22</a:t>
+              <a:t>01-May-22</a:t>
             </a:fld>
             <a:endParaRPr lang="en-US"/>
           </a:p>
@@ -2064,7 +2070,7 @@
           <a:p>
             <a:fld id="{34BBF2E1-1C0D-4B66-AD27-CA9E57E33A5F}" type="datetimeFigureOut">
               <a:rPr lang="en-US" smtClean="0"/>
-              <a:t>28-Apr-22</a:t>
+              <a:t>01-May-22</a:t>
             </a:fld>
             <a:endParaRPr lang="en-US"/>
           </a:p>
@@ -2375,7 +2381,7 @@
           <a:p>
             <a:fld id="{34BBF2E1-1C0D-4B66-AD27-CA9E57E33A5F}" type="datetimeFigureOut">
               <a:rPr lang="en-US" smtClean="0"/>
-              <a:t>28-Apr-22</a:t>
+              <a:t>01-May-22</a:t>
             </a:fld>
             <a:endParaRPr lang="en-US"/>
           </a:p>
@@ -2663,7 +2669,7 @@
           <a:p>
             <a:fld id="{34BBF2E1-1C0D-4B66-AD27-CA9E57E33A5F}" type="datetimeFigureOut">
               <a:rPr lang="en-US" smtClean="0"/>
-              <a:t>28-Apr-22</a:t>
+              <a:t>01-May-22</a:t>
             </a:fld>
             <a:endParaRPr lang="en-US"/>
           </a:p>
@@ -2904,7 +2910,7 @@
           <a:p>
             <a:fld id="{34BBF2E1-1C0D-4B66-AD27-CA9E57E33A5F}" type="datetimeFigureOut">
               <a:rPr lang="en-US" smtClean="0"/>
-              <a:t>28-Apr-22</a:t>
+              <a:t>01-May-22</a:t>
             </a:fld>
             <a:endParaRPr lang="en-US"/>
           </a:p>
@@ -3323,10 +3329,10 @@
       </p:grpSpPr>
       <p:grpSp>
         <p:nvGrpSpPr>
-          <p:cNvPr id="61" name="Group 60">
+          <p:cNvPr id="22" name="Group 21">
             <a:extLst>
               <a:ext uri="{FF2B5EF4-FFF2-40B4-BE49-F238E27FC236}">
-                <a16:creationId xmlns:a16="http://schemas.microsoft.com/office/drawing/2014/main" id="{70C683A8-AE87-4446-BB7D-47E5A91DF6BB}"/>
+                <a16:creationId xmlns:a16="http://schemas.microsoft.com/office/drawing/2014/main" id="{87B95432-9386-120B-AD51-A60D700807AC}"/>
               </a:ext>
             </a:extLst>
           </p:cNvPr>
@@ -3335,10 +3341,10 @@
         </p:nvGrpSpPr>
         <p:grpSpPr>
           <a:xfrm>
-            <a:off x="681789" y="393032"/>
-            <a:ext cx="7002379" cy="5564011"/>
-            <a:chOff x="0" y="-24063"/>
-            <a:chExt cx="7002379" cy="5564011"/>
+            <a:off x="2594810" y="169092"/>
+            <a:ext cx="7002379" cy="6519816"/>
+            <a:chOff x="2594810" y="228600"/>
+            <a:chExt cx="7002379" cy="6519816"/>
           </a:xfrm>
         </p:grpSpPr>
         <p:sp>
@@ -3355,8 +3361,8 @@
           </p:nvSpPr>
           <p:spPr>
             <a:xfrm>
-              <a:off x="0" y="-24063"/>
-              <a:ext cx="7002379" cy="5564011"/>
+              <a:off x="2594810" y="228600"/>
+              <a:ext cx="7002379" cy="6519816"/>
             </a:xfrm>
             <a:prstGeom prst="rect">
               <a:avLst/>
@@ -3396,1392 +3402,3440 @@
             </a:p>
           </p:txBody>
         </p:sp>
-        <p:grpSp>
-          <p:nvGrpSpPr>
-            <p:cNvPr id="60" name="Group 59">
+        <p:sp>
+          <p:nvSpPr>
+            <p:cNvPr id="2" name="Flowchart: Data 1">
               <a:extLst>
                 <a:ext uri="{FF2B5EF4-FFF2-40B4-BE49-F238E27FC236}">
-                  <a16:creationId xmlns:a16="http://schemas.microsoft.com/office/drawing/2014/main" id="{A2283FC2-3CC1-4758-B2E4-A6EC30DC8EEB}"/>
+                  <a16:creationId xmlns:a16="http://schemas.microsoft.com/office/drawing/2014/main" id="{28F59F68-13F2-4B32-82DB-6EB574B2D1A9}"/>
                 </a:ext>
               </a:extLst>
             </p:cNvPr>
-            <p:cNvGrpSpPr/>
+            <p:cNvSpPr/>
             <p:nvPr/>
-          </p:nvGrpSpPr>
-          <p:grpSpPr>
+          </p:nvSpPr>
+          <p:spPr>
             <a:xfrm>
-              <a:off x="360947" y="336883"/>
-              <a:ext cx="6268454" cy="4712371"/>
-              <a:chOff x="360947" y="336883"/>
-              <a:chExt cx="6268454" cy="4712371"/>
+              <a:off x="2955757" y="1545350"/>
+              <a:ext cx="1844844" cy="489284"/>
             </a:xfrm>
-          </p:grpSpPr>
-          <p:sp>
-            <p:nvSpPr>
-              <p:cNvPr id="2" name="Flowchart: Data 1">
-                <a:extLst>
-                  <a:ext uri="{FF2B5EF4-FFF2-40B4-BE49-F238E27FC236}">
-                    <a16:creationId xmlns:a16="http://schemas.microsoft.com/office/drawing/2014/main" id="{28F59F68-13F2-4B32-82DB-6EB574B2D1A9}"/>
-                  </a:ext>
-                </a:extLst>
-              </p:cNvPr>
-              <p:cNvSpPr/>
-              <p:nvPr/>
-            </p:nvSpPr>
-            <p:spPr>
-              <a:xfrm>
-                <a:off x="360947" y="336883"/>
-                <a:ext cx="1844844" cy="489284"/>
-              </a:xfrm>
-              <a:prstGeom prst="flowChartInputOutput">
-                <a:avLst/>
-              </a:prstGeom>
-              <a:noFill/>
-              <a:ln>
-                <a:solidFill>
-                  <a:schemeClr val="accent1">
-                    <a:lumMod val="60000"/>
-                    <a:lumOff val="40000"/>
-                  </a:schemeClr>
-                </a:solidFill>
-              </a:ln>
-            </p:spPr>
-            <p:style>
-              <a:lnRef idx="2">
+            <a:prstGeom prst="flowChartInputOutput">
+              <a:avLst/>
+            </a:prstGeom>
+            <a:noFill/>
+            <a:ln>
+              <a:solidFill>
                 <a:schemeClr val="accent1">
-                  <a:shade val="50000"/>
+                  <a:lumMod val="60000"/>
+                  <a:lumOff val="40000"/>
                 </a:schemeClr>
-              </a:lnRef>
-              <a:fillRef idx="1">
-                <a:schemeClr val="accent1"/>
-              </a:fillRef>
-              <a:effectRef idx="0">
-                <a:schemeClr val="accent1"/>
-              </a:effectRef>
-              <a:fontRef idx="minor">
-                <a:schemeClr val="lt1"/>
-              </a:fontRef>
-            </p:style>
-            <p:txBody>
-              <a:bodyPr rtlCol="0" anchor="ctr"/>
-              <a:lstStyle/>
-              <a:p>
-                <a:pPr algn="ctr"/>
-                <a:r>
-                  <a:rPr lang="en-US" sz="1200" dirty="0">
-                    <a:solidFill>
-                      <a:schemeClr val="bg1">
-                        <a:lumMod val="85000"/>
-                      </a:schemeClr>
-                    </a:solidFill>
-                    <a:latin typeface="Open Sans" panose="020B0606030504020204" pitchFamily="34" charset="0"/>
-                    <a:ea typeface="Open Sans" panose="020B0606030504020204" pitchFamily="34" charset="0"/>
-                    <a:cs typeface="Open Sans" panose="020B0606030504020204" pitchFamily="34" charset="0"/>
-                  </a:rPr>
-                  <a:t>Read hour</a:t>
-                </a:r>
-              </a:p>
-            </p:txBody>
-          </p:sp>
-          <p:sp>
-            <p:nvSpPr>
-              <p:cNvPr id="4" name="Flowchart: Decision 3">
-                <a:extLst>
-                  <a:ext uri="{FF2B5EF4-FFF2-40B4-BE49-F238E27FC236}">
-                    <a16:creationId xmlns:a16="http://schemas.microsoft.com/office/drawing/2014/main" id="{1B56FC5E-4065-4A70-BFA0-754CEBDBDF32}"/>
-                  </a:ext>
-                </a:extLst>
-              </p:cNvPr>
-              <p:cNvSpPr/>
-              <p:nvPr/>
-            </p:nvSpPr>
-            <p:spPr>
-              <a:xfrm>
-                <a:off x="360947" y="1122947"/>
-                <a:ext cx="1844844" cy="946484"/>
-              </a:xfrm>
-              <a:prstGeom prst="flowChartDecision">
-                <a:avLst/>
-              </a:prstGeom>
-              <a:noFill/>
-              <a:ln>
-                <a:solidFill>
-                  <a:srgbClr val="FF7C80"/>
-                </a:solidFill>
-              </a:ln>
-            </p:spPr>
-            <p:style>
-              <a:lnRef idx="2">
+              </a:solidFill>
+            </a:ln>
+          </p:spPr>
+          <p:style>
+            <a:lnRef idx="2">
+              <a:schemeClr val="accent1">
+                <a:shade val="50000"/>
+              </a:schemeClr>
+            </a:lnRef>
+            <a:fillRef idx="1">
+              <a:schemeClr val="accent1"/>
+            </a:fillRef>
+            <a:effectRef idx="0">
+              <a:schemeClr val="accent1"/>
+            </a:effectRef>
+            <a:fontRef idx="minor">
+              <a:schemeClr val="lt1"/>
+            </a:fontRef>
+          </p:style>
+          <p:txBody>
+            <a:bodyPr rtlCol="0" anchor="ctr"/>
+            <a:lstStyle/>
+            <a:p>
+              <a:pPr algn="ctr"/>
+              <a:r>
+                <a:rPr lang="en-US" sz="1200" dirty="0">
+                  <a:solidFill>
+                    <a:schemeClr val="bg1">
+                      <a:lumMod val="85000"/>
+                    </a:schemeClr>
+                  </a:solidFill>
+                  <a:latin typeface="Open Sans" panose="020B0606030504020204" pitchFamily="34" charset="0"/>
+                  <a:ea typeface="Open Sans" panose="020B0606030504020204" pitchFamily="34" charset="0"/>
+                  <a:cs typeface="Open Sans" panose="020B0606030504020204" pitchFamily="34" charset="0"/>
+                </a:rPr>
+                <a:t>Read hour</a:t>
+              </a:r>
+            </a:p>
+          </p:txBody>
+        </p:sp>
+        <p:sp>
+          <p:nvSpPr>
+            <p:cNvPr id="4" name="Flowchart: Decision 3">
+              <a:extLst>
+                <a:ext uri="{FF2B5EF4-FFF2-40B4-BE49-F238E27FC236}">
+                  <a16:creationId xmlns:a16="http://schemas.microsoft.com/office/drawing/2014/main" id="{1B56FC5E-4065-4A70-BFA0-754CEBDBDF32}"/>
+                </a:ext>
+              </a:extLst>
+            </p:cNvPr>
+            <p:cNvSpPr/>
+            <p:nvPr/>
+          </p:nvSpPr>
+          <p:spPr>
+            <a:xfrm>
+              <a:off x="2955757" y="2331414"/>
+              <a:ext cx="1844844" cy="946484"/>
+            </a:xfrm>
+            <a:prstGeom prst="flowChartDecision">
+              <a:avLst/>
+            </a:prstGeom>
+            <a:noFill/>
+            <a:ln>
+              <a:solidFill>
+                <a:srgbClr val="FF7C80"/>
+              </a:solidFill>
+            </a:ln>
+          </p:spPr>
+          <p:style>
+            <a:lnRef idx="2">
+              <a:schemeClr val="accent1">
+                <a:shade val="50000"/>
+              </a:schemeClr>
+            </a:lnRef>
+            <a:fillRef idx="1">
+              <a:schemeClr val="accent1"/>
+            </a:fillRef>
+            <a:effectRef idx="0">
+              <a:schemeClr val="accent1"/>
+            </a:effectRef>
+            <a:fontRef idx="minor">
+              <a:schemeClr val="lt1"/>
+            </a:fontRef>
+          </p:style>
+          <p:txBody>
+            <a:bodyPr rtlCol="0" anchor="ctr"/>
+            <a:lstStyle/>
+            <a:p>
+              <a:pPr algn="ctr"/>
+              <a:r>
+                <a:rPr lang="en-US" sz="1200" dirty="0">
+                  <a:solidFill>
+                    <a:schemeClr val="bg1">
+                      <a:lumMod val="85000"/>
+                    </a:schemeClr>
+                  </a:solidFill>
+                  <a:latin typeface="Open Sans" panose="020B0606030504020204" pitchFamily="34" charset="0"/>
+                  <a:ea typeface="Open Sans" panose="020B0606030504020204" pitchFamily="34" charset="0"/>
+                  <a:cs typeface="Open Sans" panose="020B0606030504020204" pitchFamily="34" charset="0"/>
+                </a:rPr>
+                <a:t>hour &gt; 7</a:t>
+              </a:r>
+            </a:p>
+          </p:txBody>
+        </p:sp>
+        <p:sp>
+          <p:nvSpPr>
+            <p:cNvPr id="7" name="Flowchart: Decision 6">
+              <a:extLst>
+                <a:ext uri="{FF2B5EF4-FFF2-40B4-BE49-F238E27FC236}">
+                  <a16:creationId xmlns:a16="http://schemas.microsoft.com/office/drawing/2014/main" id="{1AE8724F-01CD-48A2-A4D7-888DE810E9C4}"/>
+                </a:ext>
+              </a:extLst>
+            </p:cNvPr>
+            <p:cNvSpPr/>
+            <p:nvPr/>
+          </p:nvSpPr>
+          <p:spPr>
+            <a:xfrm>
+              <a:off x="2955757" y="3574678"/>
+              <a:ext cx="1844844" cy="946484"/>
+            </a:xfrm>
+            <a:prstGeom prst="flowChartDecision">
+              <a:avLst/>
+            </a:prstGeom>
+            <a:noFill/>
+            <a:ln>
+              <a:solidFill>
+                <a:srgbClr val="FF7C80"/>
+              </a:solidFill>
+            </a:ln>
+          </p:spPr>
+          <p:style>
+            <a:lnRef idx="2">
+              <a:schemeClr val="accent1">
+                <a:shade val="50000"/>
+              </a:schemeClr>
+            </a:lnRef>
+            <a:fillRef idx="1">
+              <a:schemeClr val="accent1"/>
+            </a:fillRef>
+            <a:effectRef idx="0">
+              <a:schemeClr val="accent1"/>
+            </a:effectRef>
+            <a:fontRef idx="minor">
+              <a:schemeClr val="lt1"/>
+            </a:fontRef>
+          </p:style>
+          <p:txBody>
+            <a:bodyPr rtlCol="0" anchor="ctr"/>
+            <a:lstStyle/>
+            <a:p>
+              <a:pPr algn="ctr"/>
+              <a:r>
+                <a:rPr lang="en-US" sz="1200" dirty="0">
+                  <a:solidFill>
+                    <a:schemeClr val="bg1">
+                      <a:lumMod val="85000"/>
+                    </a:schemeClr>
+                  </a:solidFill>
+                  <a:latin typeface="Open Sans" panose="020B0606030504020204" pitchFamily="34" charset="0"/>
+                  <a:ea typeface="Open Sans" panose="020B0606030504020204" pitchFamily="34" charset="0"/>
+                  <a:cs typeface="Open Sans" panose="020B0606030504020204" pitchFamily="34" charset="0"/>
+                </a:rPr>
+                <a:t>hour &gt; 5</a:t>
+              </a:r>
+            </a:p>
+          </p:txBody>
+        </p:sp>
+        <p:sp>
+          <p:nvSpPr>
+            <p:cNvPr id="8" name="Flowchart: Decision 7">
+              <a:extLst>
+                <a:ext uri="{FF2B5EF4-FFF2-40B4-BE49-F238E27FC236}">
+                  <a16:creationId xmlns:a16="http://schemas.microsoft.com/office/drawing/2014/main" id="{BE14D555-F1F8-437B-99EF-3DC9B8DEAF5A}"/>
+                </a:ext>
+              </a:extLst>
+            </p:cNvPr>
+            <p:cNvSpPr/>
+            <p:nvPr/>
+          </p:nvSpPr>
+          <p:spPr>
+            <a:xfrm>
+              <a:off x="2955757" y="4817942"/>
+              <a:ext cx="1844844" cy="946484"/>
+            </a:xfrm>
+            <a:prstGeom prst="flowChartDecision">
+              <a:avLst/>
+            </a:prstGeom>
+            <a:noFill/>
+            <a:ln>
+              <a:solidFill>
+                <a:srgbClr val="FF7C80"/>
+              </a:solidFill>
+            </a:ln>
+          </p:spPr>
+          <p:style>
+            <a:lnRef idx="2">
+              <a:schemeClr val="accent1">
+                <a:shade val="50000"/>
+              </a:schemeClr>
+            </a:lnRef>
+            <a:fillRef idx="1">
+              <a:schemeClr val="accent1"/>
+            </a:fillRef>
+            <a:effectRef idx="0">
+              <a:schemeClr val="accent1"/>
+            </a:effectRef>
+            <a:fontRef idx="minor">
+              <a:schemeClr val="lt1"/>
+            </a:fontRef>
+          </p:style>
+          <p:txBody>
+            <a:bodyPr rtlCol="0" anchor="ctr"/>
+            <a:lstStyle/>
+            <a:p>
+              <a:pPr algn="ctr"/>
+              <a:r>
+                <a:rPr lang="en-US" sz="1200" dirty="0">
+                  <a:solidFill>
+                    <a:schemeClr val="bg1">
+                      <a:lumMod val="85000"/>
+                    </a:schemeClr>
+                  </a:solidFill>
+                  <a:latin typeface="Open Sans" panose="020B0606030504020204" pitchFamily="34" charset="0"/>
+                  <a:ea typeface="Open Sans" panose="020B0606030504020204" pitchFamily="34" charset="0"/>
+                  <a:cs typeface="Open Sans" panose="020B0606030504020204" pitchFamily="34" charset="0"/>
+                </a:rPr>
+                <a:t>hour &gt; 3</a:t>
+              </a:r>
+            </a:p>
+          </p:txBody>
+        </p:sp>
+        <p:cxnSp>
+          <p:nvCxnSpPr>
+            <p:cNvPr id="10" name="Straight Arrow Connector 9">
+              <a:extLst>
+                <a:ext uri="{FF2B5EF4-FFF2-40B4-BE49-F238E27FC236}">
+                  <a16:creationId xmlns:a16="http://schemas.microsoft.com/office/drawing/2014/main" id="{3C71FA0F-D010-4470-A4DA-37400D7EA02F}"/>
+                </a:ext>
+              </a:extLst>
+            </p:cNvPr>
+            <p:cNvCxnSpPr>
+              <a:stCxn id="2" idx="4"/>
+              <a:endCxn id="4" idx="0"/>
+            </p:cNvCxnSpPr>
+            <p:nvPr/>
+          </p:nvCxnSpPr>
+          <p:spPr>
+            <a:xfrm>
+              <a:off x="3878179" y="2034634"/>
+              <a:ext cx="0" cy="296780"/>
+            </a:xfrm>
+            <a:prstGeom prst="straightConnector1">
+              <a:avLst/>
+            </a:prstGeom>
+            <a:ln w="12700">
+              <a:solidFill>
                 <a:schemeClr val="accent1">
-                  <a:shade val="50000"/>
+                  <a:lumMod val="60000"/>
+                  <a:lumOff val="40000"/>
                 </a:schemeClr>
-              </a:lnRef>
-              <a:fillRef idx="1">
-                <a:schemeClr val="accent1"/>
-              </a:fillRef>
-              <a:effectRef idx="0">
-                <a:schemeClr val="accent1"/>
-              </a:effectRef>
-              <a:fontRef idx="minor">
-                <a:schemeClr val="lt1"/>
-              </a:fontRef>
-            </p:style>
-            <p:txBody>
-              <a:bodyPr rtlCol="0" anchor="ctr"/>
-              <a:lstStyle/>
-              <a:p>
-                <a:pPr algn="ctr"/>
-                <a:r>
-                  <a:rPr lang="en-US" sz="1200" dirty="0">
-                    <a:solidFill>
-                      <a:schemeClr val="bg1">
-                        <a:lumMod val="85000"/>
-                      </a:schemeClr>
-                    </a:solidFill>
-                    <a:latin typeface="Open Sans" panose="020B0606030504020204" pitchFamily="34" charset="0"/>
-                    <a:ea typeface="Open Sans" panose="020B0606030504020204" pitchFamily="34" charset="0"/>
-                    <a:cs typeface="Open Sans" panose="020B0606030504020204" pitchFamily="34" charset="0"/>
-                  </a:rPr>
-                  <a:t>hour &gt; 7</a:t>
-                </a:r>
-              </a:p>
-            </p:txBody>
-          </p:sp>
-          <p:sp>
-            <p:nvSpPr>
-              <p:cNvPr id="7" name="Flowchart: Decision 6">
-                <a:extLst>
-                  <a:ext uri="{FF2B5EF4-FFF2-40B4-BE49-F238E27FC236}">
-                    <a16:creationId xmlns:a16="http://schemas.microsoft.com/office/drawing/2014/main" id="{1AE8724F-01CD-48A2-A4D7-888DE810E9C4}"/>
-                  </a:ext>
-                </a:extLst>
-              </p:cNvPr>
-              <p:cNvSpPr/>
-              <p:nvPr/>
-            </p:nvSpPr>
-            <p:spPr>
-              <a:xfrm>
-                <a:off x="360947" y="2366211"/>
-                <a:ext cx="1844844" cy="946484"/>
-              </a:xfrm>
-              <a:prstGeom prst="flowChartDecision">
-                <a:avLst/>
-              </a:prstGeom>
-              <a:noFill/>
-              <a:ln>
-                <a:solidFill>
-                  <a:srgbClr val="FF7C80"/>
-                </a:solidFill>
-              </a:ln>
-            </p:spPr>
-            <p:style>
-              <a:lnRef idx="2">
-                <a:schemeClr val="accent1">
-                  <a:shade val="50000"/>
+              </a:solidFill>
+              <a:tailEnd type="triangle"/>
+            </a:ln>
+          </p:spPr>
+          <p:style>
+            <a:lnRef idx="1">
+              <a:schemeClr val="accent1"/>
+            </a:lnRef>
+            <a:fillRef idx="0">
+              <a:schemeClr val="accent1"/>
+            </a:fillRef>
+            <a:effectRef idx="0">
+              <a:schemeClr val="accent1"/>
+            </a:effectRef>
+            <a:fontRef idx="minor">
+              <a:schemeClr val="tx1"/>
+            </a:fontRef>
+          </p:style>
+        </p:cxnSp>
+        <p:sp>
+          <p:nvSpPr>
+            <p:cNvPr id="11" name="Rectangle 10">
+              <a:extLst>
+                <a:ext uri="{FF2B5EF4-FFF2-40B4-BE49-F238E27FC236}">
+                  <a16:creationId xmlns:a16="http://schemas.microsoft.com/office/drawing/2014/main" id="{948C2A8F-0239-4D44-9E68-CA7453A5CA77}"/>
+                </a:ext>
+              </a:extLst>
+            </p:cNvPr>
+            <p:cNvSpPr/>
+            <p:nvPr/>
+          </p:nvSpPr>
+          <p:spPr>
+            <a:xfrm>
+              <a:off x="5177587" y="2608140"/>
+              <a:ext cx="1844844" cy="393032"/>
+            </a:xfrm>
+            <a:prstGeom prst="rect">
+              <a:avLst/>
+            </a:prstGeom>
+            <a:noFill/>
+            <a:ln>
+              <a:solidFill>
+                <a:schemeClr val="accent6">
+                  <a:lumMod val="60000"/>
+                  <a:lumOff val="40000"/>
                 </a:schemeClr>
-              </a:lnRef>
-              <a:fillRef idx="1">
-                <a:schemeClr val="accent1"/>
-              </a:fillRef>
-              <a:effectRef idx="0">
-                <a:schemeClr val="accent1"/>
-              </a:effectRef>
-              <a:fontRef idx="minor">
-                <a:schemeClr val="lt1"/>
-              </a:fontRef>
-            </p:style>
-            <p:txBody>
-              <a:bodyPr rtlCol="0" anchor="ctr"/>
-              <a:lstStyle/>
-              <a:p>
-                <a:pPr algn="ctr"/>
-                <a:r>
-                  <a:rPr lang="en-US" sz="1200" dirty="0">
-                    <a:solidFill>
-                      <a:schemeClr val="bg1">
-                        <a:lumMod val="85000"/>
-                      </a:schemeClr>
-                    </a:solidFill>
-                    <a:latin typeface="Open Sans" panose="020B0606030504020204" pitchFamily="34" charset="0"/>
-                    <a:ea typeface="Open Sans" panose="020B0606030504020204" pitchFamily="34" charset="0"/>
-                    <a:cs typeface="Open Sans" panose="020B0606030504020204" pitchFamily="34" charset="0"/>
-                  </a:rPr>
-                  <a:t>hour &gt; 5</a:t>
-                </a:r>
-              </a:p>
-            </p:txBody>
-          </p:sp>
-          <p:sp>
-            <p:nvSpPr>
-              <p:cNvPr id="8" name="Flowchart: Decision 7">
-                <a:extLst>
-                  <a:ext uri="{FF2B5EF4-FFF2-40B4-BE49-F238E27FC236}">
-                    <a16:creationId xmlns:a16="http://schemas.microsoft.com/office/drawing/2014/main" id="{BE14D555-F1F8-437B-99EF-3DC9B8DEAF5A}"/>
-                  </a:ext>
-                </a:extLst>
-              </p:cNvPr>
-              <p:cNvSpPr/>
-              <p:nvPr/>
-            </p:nvSpPr>
-            <p:spPr>
-              <a:xfrm>
-                <a:off x="360947" y="3609475"/>
-                <a:ext cx="1844844" cy="946484"/>
-              </a:xfrm>
-              <a:prstGeom prst="flowChartDecision">
-                <a:avLst/>
-              </a:prstGeom>
-              <a:noFill/>
-              <a:ln>
-                <a:solidFill>
-                  <a:srgbClr val="FF7C80"/>
-                </a:solidFill>
-              </a:ln>
-            </p:spPr>
-            <p:style>
-              <a:lnRef idx="2">
-                <a:schemeClr val="accent1">
-                  <a:shade val="50000"/>
+              </a:solidFill>
+            </a:ln>
+          </p:spPr>
+          <p:style>
+            <a:lnRef idx="2">
+              <a:schemeClr val="accent1">
+                <a:shade val="50000"/>
+              </a:schemeClr>
+            </a:lnRef>
+            <a:fillRef idx="1">
+              <a:schemeClr val="accent1"/>
+            </a:fillRef>
+            <a:effectRef idx="0">
+              <a:schemeClr val="accent1"/>
+            </a:effectRef>
+            <a:fontRef idx="minor">
+              <a:schemeClr val="lt1"/>
+            </a:fontRef>
+          </p:style>
+          <p:txBody>
+            <a:bodyPr rtlCol="0" anchor="ctr"/>
+            <a:lstStyle/>
+            <a:p>
+              <a:pPr algn="ctr"/>
+              <a:r>
+                <a:rPr lang="en-US" sz="1200" dirty="0">
+                  <a:solidFill>
+                    <a:schemeClr val="bg1">
+                      <a:lumMod val="85000"/>
+                    </a:schemeClr>
+                  </a:solidFill>
+                  <a:latin typeface="Open Sans" panose="020B0606030504020204" pitchFamily="34" charset="0"/>
+                  <a:ea typeface="Open Sans" panose="020B0606030504020204" pitchFamily="34" charset="0"/>
+                  <a:cs typeface="Open Sans" panose="020B0606030504020204" pitchFamily="34" charset="0"/>
+                </a:rPr>
+                <a:t>Fee = 25.00</a:t>
+              </a:r>
+            </a:p>
+          </p:txBody>
+        </p:sp>
+        <p:sp>
+          <p:nvSpPr>
+            <p:cNvPr id="12" name="Rectangle 11">
+              <a:extLst>
+                <a:ext uri="{FF2B5EF4-FFF2-40B4-BE49-F238E27FC236}">
+                  <a16:creationId xmlns:a16="http://schemas.microsoft.com/office/drawing/2014/main" id="{59E60FBA-E7D1-474B-9288-DE527C1FC37C}"/>
+                </a:ext>
+              </a:extLst>
+            </p:cNvPr>
+            <p:cNvSpPr/>
+            <p:nvPr/>
+          </p:nvSpPr>
+          <p:spPr>
+            <a:xfrm>
+              <a:off x="5177587" y="3773198"/>
+              <a:ext cx="1844844" cy="549443"/>
+            </a:xfrm>
+            <a:prstGeom prst="rect">
+              <a:avLst/>
+            </a:prstGeom>
+            <a:noFill/>
+            <a:ln>
+              <a:solidFill>
+                <a:schemeClr val="accent6">
+                  <a:lumMod val="60000"/>
+                  <a:lumOff val="40000"/>
                 </a:schemeClr>
-              </a:lnRef>
-              <a:fillRef idx="1">
-                <a:schemeClr val="accent1"/>
-              </a:fillRef>
-              <a:effectRef idx="0">
-                <a:schemeClr val="accent1"/>
-              </a:effectRef>
-              <a:fontRef idx="minor">
-                <a:schemeClr val="lt1"/>
-              </a:fontRef>
-            </p:style>
-            <p:txBody>
-              <a:bodyPr rtlCol="0" anchor="ctr"/>
-              <a:lstStyle/>
-              <a:p>
-                <a:pPr algn="ctr"/>
-                <a:r>
-                  <a:rPr lang="en-US" sz="1200" dirty="0">
-                    <a:solidFill>
-                      <a:schemeClr val="bg1">
-                        <a:lumMod val="85000"/>
-                      </a:schemeClr>
-                    </a:solidFill>
-                    <a:latin typeface="Open Sans" panose="020B0606030504020204" pitchFamily="34" charset="0"/>
-                    <a:ea typeface="Open Sans" panose="020B0606030504020204" pitchFamily="34" charset="0"/>
-                    <a:cs typeface="Open Sans" panose="020B0606030504020204" pitchFamily="34" charset="0"/>
-                  </a:rPr>
-                  <a:t>hour &gt; 3</a:t>
-                </a:r>
-              </a:p>
-            </p:txBody>
-          </p:sp>
-          <p:cxnSp>
-            <p:nvCxnSpPr>
-              <p:cNvPr id="10" name="Straight Arrow Connector 9">
-                <a:extLst>
-                  <a:ext uri="{FF2B5EF4-FFF2-40B4-BE49-F238E27FC236}">
-                    <a16:creationId xmlns:a16="http://schemas.microsoft.com/office/drawing/2014/main" id="{3C71FA0F-D010-4470-A4DA-37400D7EA02F}"/>
-                  </a:ext>
-                </a:extLst>
-              </p:cNvPr>
-              <p:cNvCxnSpPr>
-                <a:stCxn id="2" idx="4"/>
-                <a:endCxn id="4" idx="0"/>
-              </p:cNvCxnSpPr>
-              <p:nvPr/>
-            </p:nvCxnSpPr>
-            <p:spPr>
-              <a:xfrm>
-                <a:off x="1283369" y="826167"/>
-                <a:ext cx="0" cy="296780"/>
-              </a:xfrm>
-              <a:prstGeom prst="straightConnector1">
-                <a:avLst/>
-              </a:prstGeom>
-              <a:ln w="12700">
-                <a:solidFill>
-                  <a:schemeClr val="accent1">
-                    <a:lumMod val="60000"/>
-                    <a:lumOff val="40000"/>
-                  </a:schemeClr>
-                </a:solidFill>
-                <a:tailEnd type="triangle"/>
-              </a:ln>
-            </p:spPr>
-            <p:style>
-              <a:lnRef idx="1">
-                <a:schemeClr val="accent1"/>
-              </a:lnRef>
-              <a:fillRef idx="0">
-                <a:schemeClr val="accent1"/>
-              </a:fillRef>
-              <a:effectRef idx="0">
-                <a:schemeClr val="accent1"/>
-              </a:effectRef>
-              <a:fontRef idx="minor">
-                <a:schemeClr val="tx1"/>
-              </a:fontRef>
-            </p:style>
-          </p:cxnSp>
-          <p:sp>
-            <p:nvSpPr>
-              <p:cNvPr id="11" name="Rectangle 10">
-                <a:extLst>
-                  <a:ext uri="{FF2B5EF4-FFF2-40B4-BE49-F238E27FC236}">
-                    <a16:creationId xmlns:a16="http://schemas.microsoft.com/office/drawing/2014/main" id="{948C2A8F-0239-4D44-9E68-CA7453A5CA77}"/>
-                  </a:ext>
-                </a:extLst>
-              </p:cNvPr>
-              <p:cNvSpPr/>
-              <p:nvPr/>
-            </p:nvSpPr>
-            <p:spPr>
-              <a:xfrm>
-                <a:off x="2582777" y="1399673"/>
-                <a:ext cx="1844844" cy="393032"/>
-              </a:xfrm>
-              <a:prstGeom prst="rect">
-                <a:avLst/>
-              </a:prstGeom>
-              <a:noFill/>
-              <a:ln>
-                <a:solidFill>
-                  <a:schemeClr val="accent6">
-                    <a:lumMod val="60000"/>
-                    <a:lumOff val="40000"/>
-                  </a:schemeClr>
-                </a:solidFill>
-              </a:ln>
-            </p:spPr>
-            <p:style>
-              <a:lnRef idx="2">
-                <a:schemeClr val="accent1">
-                  <a:shade val="50000"/>
+              </a:solidFill>
+            </a:ln>
+          </p:spPr>
+          <p:style>
+            <a:lnRef idx="2">
+              <a:schemeClr val="accent1">
+                <a:shade val="50000"/>
+              </a:schemeClr>
+            </a:lnRef>
+            <a:fillRef idx="1">
+              <a:schemeClr val="accent1"/>
+            </a:fillRef>
+            <a:effectRef idx="0">
+              <a:schemeClr val="accent1"/>
+            </a:effectRef>
+            <a:fontRef idx="minor">
+              <a:schemeClr val="lt1"/>
+            </a:fontRef>
+          </p:style>
+          <p:txBody>
+            <a:bodyPr rtlCol="0" anchor="ctr"/>
+            <a:lstStyle/>
+            <a:p>
+              <a:pPr algn="ctr"/>
+              <a:r>
+                <a:rPr lang="en-US" sz="1200" dirty="0">
+                  <a:solidFill>
+                    <a:schemeClr val="bg1">
+                      <a:lumMod val="85000"/>
+                    </a:schemeClr>
+                  </a:solidFill>
+                  <a:latin typeface="Open Sans" panose="020B0606030504020204" pitchFamily="34" charset="0"/>
+                  <a:ea typeface="Open Sans" panose="020B0606030504020204" pitchFamily="34" charset="0"/>
+                  <a:cs typeface="Open Sans" panose="020B0606030504020204" pitchFamily="34" charset="0"/>
+                </a:rPr>
+                <a:t>Fee = 4.00*3 + 3.00*2 </a:t>
+              </a:r>
+            </a:p>
+            <a:p>
+              <a:pPr algn="ctr"/>
+              <a:r>
+                <a:rPr lang="en-US" sz="1200" dirty="0">
+                  <a:solidFill>
+                    <a:schemeClr val="bg1">
+                      <a:lumMod val="85000"/>
+                    </a:schemeClr>
+                  </a:solidFill>
+                  <a:latin typeface="Open Sans" panose="020B0606030504020204" pitchFamily="34" charset="0"/>
+                  <a:ea typeface="Open Sans" panose="020B0606030504020204" pitchFamily="34" charset="0"/>
+                  <a:cs typeface="Open Sans" panose="020B0606030504020204" pitchFamily="34" charset="0"/>
+                </a:rPr>
+                <a:t>+ 2.50*(hour – 5)</a:t>
+              </a:r>
+            </a:p>
+          </p:txBody>
+        </p:sp>
+        <p:sp>
+          <p:nvSpPr>
+            <p:cNvPr id="13" name="Rectangle 12">
+              <a:extLst>
+                <a:ext uri="{FF2B5EF4-FFF2-40B4-BE49-F238E27FC236}">
+                  <a16:creationId xmlns:a16="http://schemas.microsoft.com/office/drawing/2014/main" id="{1A7BACE9-4D58-4158-9C2E-F6E74C3A2A51}"/>
+                </a:ext>
+              </a:extLst>
+            </p:cNvPr>
+            <p:cNvSpPr/>
+            <p:nvPr/>
+          </p:nvSpPr>
+          <p:spPr>
+            <a:xfrm>
+              <a:off x="5177587" y="5020272"/>
+              <a:ext cx="1844844" cy="548640"/>
+            </a:xfrm>
+            <a:prstGeom prst="rect">
+              <a:avLst/>
+            </a:prstGeom>
+            <a:noFill/>
+            <a:ln>
+              <a:solidFill>
+                <a:schemeClr val="accent6">
+                  <a:lumMod val="60000"/>
+                  <a:lumOff val="40000"/>
                 </a:schemeClr>
-              </a:lnRef>
-              <a:fillRef idx="1">
-                <a:schemeClr val="accent1"/>
-              </a:fillRef>
-              <a:effectRef idx="0">
-                <a:schemeClr val="accent1"/>
-              </a:effectRef>
-              <a:fontRef idx="minor">
-                <a:schemeClr val="lt1"/>
-              </a:fontRef>
-            </p:style>
-            <p:txBody>
-              <a:bodyPr rtlCol="0" anchor="ctr"/>
-              <a:lstStyle/>
-              <a:p>
-                <a:pPr algn="ctr"/>
-                <a:r>
-                  <a:rPr lang="en-US" sz="1200" dirty="0">
-                    <a:solidFill>
-                      <a:schemeClr val="bg1">
-                        <a:lumMod val="85000"/>
-                      </a:schemeClr>
-                    </a:solidFill>
-                    <a:latin typeface="Open Sans" panose="020B0606030504020204" pitchFamily="34" charset="0"/>
-                    <a:ea typeface="Open Sans" panose="020B0606030504020204" pitchFamily="34" charset="0"/>
-                    <a:cs typeface="Open Sans" panose="020B0606030504020204" pitchFamily="34" charset="0"/>
-                  </a:rPr>
-                  <a:t>Fee = 25.00</a:t>
-                </a:r>
-              </a:p>
-            </p:txBody>
-          </p:sp>
-          <p:sp>
-            <p:nvSpPr>
-              <p:cNvPr id="12" name="Rectangle 11">
-                <a:extLst>
-                  <a:ext uri="{FF2B5EF4-FFF2-40B4-BE49-F238E27FC236}">
-                    <a16:creationId xmlns:a16="http://schemas.microsoft.com/office/drawing/2014/main" id="{59E60FBA-E7D1-474B-9288-DE527C1FC37C}"/>
-                  </a:ext>
-                </a:extLst>
-              </p:cNvPr>
-              <p:cNvSpPr/>
-              <p:nvPr/>
-            </p:nvSpPr>
-            <p:spPr>
-              <a:xfrm>
-                <a:off x="2582777" y="2564731"/>
-                <a:ext cx="1844844" cy="549443"/>
-              </a:xfrm>
-              <a:prstGeom prst="rect">
-                <a:avLst/>
-              </a:prstGeom>
-              <a:noFill/>
-              <a:ln>
-                <a:solidFill>
-                  <a:schemeClr val="accent6">
-                    <a:lumMod val="60000"/>
-                    <a:lumOff val="40000"/>
-                  </a:schemeClr>
-                </a:solidFill>
-              </a:ln>
-            </p:spPr>
-            <p:style>
-              <a:lnRef idx="2">
-                <a:schemeClr val="accent1">
-                  <a:shade val="50000"/>
+              </a:solidFill>
+            </a:ln>
+          </p:spPr>
+          <p:style>
+            <a:lnRef idx="2">
+              <a:schemeClr val="accent1">
+                <a:shade val="50000"/>
+              </a:schemeClr>
+            </a:lnRef>
+            <a:fillRef idx="1">
+              <a:schemeClr val="accent1"/>
+            </a:fillRef>
+            <a:effectRef idx="0">
+              <a:schemeClr val="accent1"/>
+            </a:effectRef>
+            <a:fontRef idx="minor">
+              <a:schemeClr val="lt1"/>
+            </a:fontRef>
+          </p:style>
+          <p:txBody>
+            <a:bodyPr rtlCol="0" anchor="ctr"/>
+            <a:lstStyle/>
+            <a:p>
+              <a:pPr algn="ctr"/>
+              <a:r>
+                <a:rPr lang="en-US" sz="1200" dirty="0">
+                  <a:solidFill>
+                    <a:schemeClr val="bg1">
+                      <a:lumMod val="85000"/>
+                    </a:schemeClr>
+                  </a:solidFill>
+                  <a:latin typeface="Open Sans" panose="020B0606030504020204" pitchFamily="34" charset="0"/>
+                  <a:ea typeface="Open Sans" panose="020B0606030504020204" pitchFamily="34" charset="0"/>
+                  <a:cs typeface="Open Sans" panose="020B0606030504020204" pitchFamily="34" charset="0"/>
+                </a:rPr>
+                <a:t>Fee = 4.00*3 </a:t>
+              </a:r>
+            </a:p>
+            <a:p>
+              <a:pPr algn="ctr"/>
+              <a:r>
+                <a:rPr lang="en-US" sz="1200" dirty="0">
+                  <a:solidFill>
+                    <a:schemeClr val="bg1">
+                      <a:lumMod val="85000"/>
+                    </a:schemeClr>
+                  </a:solidFill>
+                  <a:latin typeface="Open Sans" panose="020B0606030504020204" pitchFamily="34" charset="0"/>
+                  <a:ea typeface="Open Sans" panose="020B0606030504020204" pitchFamily="34" charset="0"/>
+                  <a:cs typeface="Open Sans" panose="020B0606030504020204" pitchFamily="34" charset="0"/>
+                </a:rPr>
+                <a:t>– 3.00*(hour – 3)</a:t>
+              </a:r>
+            </a:p>
+          </p:txBody>
+        </p:sp>
+        <p:cxnSp>
+          <p:nvCxnSpPr>
+            <p:cNvPr id="14" name="Straight Arrow Connector 13">
+              <a:extLst>
+                <a:ext uri="{FF2B5EF4-FFF2-40B4-BE49-F238E27FC236}">
+                  <a16:creationId xmlns:a16="http://schemas.microsoft.com/office/drawing/2014/main" id="{6E956648-8245-4E91-969E-DA818A0EE312}"/>
+                </a:ext>
+              </a:extLst>
+            </p:cNvPr>
+            <p:cNvCxnSpPr/>
+            <p:nvPr/>
+          </p:nvCxnSpPr>
+          <p:spPr>
+            <a:xfrm>
+              <a:off x="3878179" y="3277898"/>
+              <a:ext cx="0" cy="296780"/>
+            </a:xfrm>
+            <a:prstGeom prst="straightConnector1">
+              <a:avLst/>
+            </a:prstGeom>
+            <a:ln w="12700">
+              <a:solidFill>
+                <a:srgbClr val="FF7C80"/>
+              </a:solidFill>
+              <a:tailEnd type="triangle"/>
+            </a:ln>
+          </p:spPr>
+          <p:style>
+            <a:lnRef idx="1">
+              <a:schemeClr val="accent1"/>
+            </a:lnRef>
+            <a:fillRef idx="0">
+              <a:schemeClr val="accent1"/>
+            </a:fillRef>
+            <a:effectRef idx="0">
+              <a:schemeClr val="accent1"/>
+            </a:effectRef>
+            <a:fontRef idx="minor">
+              <a:schemeClr val="tx1"/>
+            </a:fontRef>
+          </p:style>
+        </p:cxnSp>
+        <p:cxnSp>
+          <p:nvCxnSpPr>
+            <p:cNvPr id="15" name="Straight Arrow Connector 14">
+              <a:extLst>
+                <a:ext uri="{FF2B5EF4-FFF2-40B4-BE49-F238E27FC236}">
+                  <a16:creationId xmlns:a16="http://schemas.microsoft.com/office/drawing/2014/main" id="{3721F831-D501-454D-81EE-0C02699D1E2A}"/>
+                </a:ext>
+              </a:extLst>
+            </p:cNvPr>
+            <p:cNvCxnSpPr/>
+            <p:nvPr/>
+          </p:nvCxnSpPr>
+          <p:spPr>
+            <a:xfrm>
+              <a:off x="3878179" y="4521162"/>
+              <a:ext cx="0" cy="296780"/>
+            </a:xfrm>
+            <a:prstGeom prst="straightConnector1">
+              <a:avLst/>
+            </a:prstGeom>
+            <a:ln w="12700">
+              <a:solidFill>
+                <a:srgbClr val="FF7C80"/>
+              </a:solidFill>
+              <a:tailEnd type="triangle"/>
+            </a:ln>
+          </p:spPr>
+          <p:style>
+            <a:lnRef idx="1">
+              <a:schemeClr val="accent1"/>
+            </a:lnRef>
+            <a:fillRef idx="0">
+              <a:schemeClr val="accent1"/>
+            </a:fillRef>
+            <a:effectRef idx="0">
+              <a:schemeClr val="accent1"/>
+            </a:effectRef>
+            <a:fontRef idx="minor">
+              <a:schemeClr val="tx1"/>
+            </a:fontRef>
+          </p:style>
+        </p:cxnSp>
+        <p:cxnSp>
+          <p:nvCxnSpPr>
+            <p:cNvPr id="19" name="Straight Arrow Connector 18">
+              <a:extLst>
+                <a:ext uri="{FF2B5EF4-FFF2-40B4-BE49-F238E27FC236}">
+                  <a16:creationId xmlns:a16="http://schemas.microsoft.com/office/drawing/2014/main" id="{3B5CE5DB-7A65-4FDD-B4F3-0AAB62E0E486}"/>
+                </a:ext>
+              </a:extLst>
+            </p:cNvPr>
+            <p:cNvCxnSpPr>
+              <a:stCxn id="4" idx="3"/>
+              <a:endCxn id="11" idx="1"/>
+            </p:cNvCxnSpPr>
+            <p:nvPr/>
+          </p:nvCxnSpPr>
+          <p:spPr>
+            <a:xfrm>
+              <a:off x="4800601" y="2804656"/>
+              <a:ext cx="376986" cy="0"/>
+            </a:xfrm>
+            <a:prstGeom prst="straightConnector1">
+              <a:avLst/>
+            </a:prstGeom>
+            <a:ln w="12700">
+              <a:solidFill>
+                <a:srgbClr val="FF7C80"/>
+              </a:solidFill>
+              <a:tailEnd type="triangle"/>
+            </a:ln>
+          </p:spPr>
+          <p:style>
+            <a:lnRef idx="1">
+              <a:schemeClr val="accent1"/>
+            </a:lnRef>
+            <a:fillRef idx="0">
+              <a:schemeClr val="accent1"/>
+            </a:fillRef>
+            <a:effectRef idx="0">
+              <a:schemeClr val="accent1"/>
+            </a:effectRef>
+            <a:fontRef idx="minor">
+              <a:schemeClr val="tx1"/>
+            </a:fontRef>
+          </p:style>
+        </p:cxnSp>
+        <p:cxnSp>
+          <p:nvCxnSpPr>
+            <p:cNvPr id="20" name="Straight Arrow Connector 19">
+              <a:extLst>
+                <a:ext uri="{FF2B5EF4-FFF2-40B4-BE49-F238E27FC236}">
+                  <a16:creationId xmlns:a16="http://schemas.microsoft.com/office/drawing/2014/main" id="{844786FB-3790-4EB5-B3D7-F42BA9824AC0}"/>
+                </a:ext>
+              </a:extLst>
+            </p:cNvPr>
+            <p:cNvCxnSpPr/>
+            <p:nvPr/>
+          </p:nvCxnSpPr>
+          <p:spPr>
+            <a:xfrm>
+              <a:off x="4800601" y="4047919"/>
+              <a:ext cx="376986" cy="0"/>
+            </a:xfrm>
+            <a:prstGeom prst="straightConnector1">
+              <a:avLst/>
+            </a:prstGeom>
+            <a:ln w="12700">
+              <a:solidFill>
+                <a:srgbClr val="FF7C80"/>
+              </a:solidFill>
+              <a:tailEnd type="triangle"/>
+            </a:ln>
+          </p:spPr>
+          <p:style>
+            <a:lnRef idx="1">
+              <a:schemeClr val="accent1"/>
+            </a:lnRef>
+            <a:fillRef idx="0">
+              <a:schemeClr val="accent1"/>
+            </a:fillRef>
+            <a:effectRef idx="0">
+              <a:schemeClr val="accent1"/>
+            </a:effectRef>
+            <a:fontRef idx="minor">
+              <a:schemeClr val="tx1"/>
+            </a:fontRef>
+          </p:style>
+        </p:cxnSp>
+        <p:cxnSp>
+          <p:nvCxnSpPr>
+            <p:cNvPr id="21" name="Straight Arrow Connector 20">
+              <a:extLst>
+                <a:ext uri="{FF2B5EF4-FFF2-40B4-BE49-F238E27FC236}">
+                  <a16:creationId xmlns:a16="http://schemas.microsoft.com/office/drawing/2014/main" id="{B81CB08E-A669-408D-BD9C-BEEA5DDBDBF5}"/>
+                </a:ext>
+              </a:extLst>
+            </p:cNvPr>
+            <p:cNvCxnSpPr/>
+            <p:nvPr/>
+          </p:nvCxnSpPr>
+          <p:spPr>
+            <a:xfrm>
+              <a:off x="4800601" y="5291183"/>
+              <a:ext cx="376986" cy="0"/>
+            </a:xfrm>
+            <a:prstGeom prst="straightConnector1">
+              <a:avLst/>
+            </a:prstGeom>
+            <a:ln w="12700">
+              <a:solidFill>
+                <a:srgbClr val="FF7C80"/>
+              </a:solidFill>
+              <a:tailEnd type="triangle"/>
+            </a:ln>
+          </p:spPr>
+          <p:style>
+            <a:lnRef idx="1">
+              <a:schemeClr val="accent1"/>
+            </a:lnRef>
+            <a:fillRef idx="0">
+              <a:schemeClr val="accent1"/>
+            </a:fillRef>
+            <a:effectRef idx="0">
+              <a:schemeClr val="accent1"/>
+            </a:effectRef>
+            <a:fontRef idx="minor">
+              <a:schemeClr val="tx1"/>
+            </a:fontRef>
+          </p:style>
+        </p:cxnSp>
+        <p:sp>
+          <p:nvSpPr>
+            <p:cNvPr id="30" name="Rectangle 29">
+              <a:extLst>
+                <a:ext uri="{FF2B5EF4-FFF2-40B4-BE49-F238E27FC236}">
+                  <a16:creationId xmlns:a16="http://schemas.microsoft.com/office/drawing/2014/main" id="{712A489D-A621-4FE4-ACF6-D76866D938EF}"/>
+                </a:ext>
+              </a:extLst>
+            </p:cNvPr>
+            <p:cNvSpPr/>
+            <p:nvPr/>
+          </p:nvSpPr>
+          <p:spPr>
+            <a:xfrm>
+              <a:off x="5177587" y="5864689"/>
+              <a:ext cx="1844844" cy="393032"/>
+            </a:xfrm>
+            <a:prstGeom prst="rect">
+              <a:avLst/>
+            </a:prstGeom>
+            <a:noFill/>
+            <a:ln>
+              <a:solidFill>
+                <a:schemeClr val="accent6">
+                  <a:lumMod val="60000"/>
+                  <a:lumOff val="40000"/>
                 </a:schemeClr>
-              </a:lnRef>
-              <a:fillRef idx="1">
-                <a:schemeClr val="accent1"/>
-              </a:fillRef>
-              <a:effectRef idx="0">
-                <a:schemeClr val="accent1"/>
-              </a:effectRef>
-              <a:fontRef idx="minor">
-                <a:schemeClr val="lt1"/>
-              </a:fontRef>
-            </p:style>
-            <p:txBody>
-              <a:bodyPr rtlCol="0" anchor="ctr"/>
-              <a:lstStyle/>
-              <a:p>
-                <a:pPr algn="ctr"/>
-                <a:r>
-                  <a:rPr lang="en-US" sz="1200" dirty="0">
-                    <a:solidFill>
-                      <a:schemeClr val="bg1">
-                        <a:lumMod val="85000"/>
-                      </a:schemeClr>
-                    </a:solidFill>
-                    <a:latin typeface="Open Sans" panose="020B0606030504020204" pitchFamily="34" charset="0"/>
-                    <a:ea typeface="Open Sans" panose="020B0606030504020204" pitchFamily="34" charset="0"/>
-                    <a:cs typeface="Open Sans" panose="020B0606030504020204" pitchFamily="34" charset="0"/>
-                  </a:rPr>
-                  <a:t>Fee = 4.00*3 + 3.00*2 </a:t>
-                </a:r>
-              </a:p>
-              <a:p>
-                <a:pPr algn="ctr"/>
-                <a:r>
-                  <a:rPr lang="en-US" sz="1200" dirty="0">
-                    <a:solidFill>
-                      <a:schemeClr val="bg1">
-                        <a:lumMod val="85000"/>
-                      </a:schemeClr>
-                    </a:solidFill>
-                    <a:latin typeface="Open Sans" panose="020B0606030504020204" pitchFamily="34" charset="0"/>
-                    <a:ea typeface="Open Sans" panose="020B0606030504020204" pitchFamily="34" charset="0"/>
-                    <a:cs typeface="Open Sans" panose="020B0606030504020204" pitchFamily="34" charset="0"/>
-                  </a:rPr>
-                  <a:t>+ 2.50*(hour – 5)</a:t>
-                </a:r>
-              </a:p>
-            </p:txBody>
-          </p:sp>
-          <p:sp>
-            <p:nvSpPr>
-              <p:cNvPr id="13" name="Rectangle 12">
-                <a:extLst>
-                  <a:ext uri="{FF2B5EF4-FFF2-40B4-BE49-F238E27FC236}">
-                    <a16:creationId xmlns:a16="http://schemas.microsoft.com/office/drawing/2014/main" id="{1A7BACE9-4D58-4158-9C2E-F6E74C3A2A51}"/>
-                  </a:ext>
-                </a:extLst>
-              </p:cNvPr>
-              <p:cNvSpPr/>
-              <p:nvPr/>
-            </p:nvSpPr>
-            <p:spPr>
-              <a:xfrm>
-                <a:off x="2582777" y="3811805"/>
-                <a:ext cx="1844844" cy="548640"/>
-              </a:xfrm>
-              <a:prstGeom prst="rect">
-                <a:avLst/>
-              </a:prstGeom>
-              <a:noFill/>
-              <a:ln>
-                <a:solidFill>
-                  <a:schemeClr val="accent6">
-                    <a:lumMod val="60000"/>
-                    <a:lumOff val="40000"/>
-                  </a:schemeClr>
-                </a:solidFill>
-              </a:ln>
-            </p:spPr>
-            <p:style>
-              <a:lnRef idx="2">
-                <a:schemeClr val="accent1">
-                  <a:shade val="50000"/>
+              </a:solidFill>
+            </a:ln>
+          </p:spPr>
+          <p:style>
+            <a:lnRef idx="2">
+              <a:schemeClr val="accent1">
+                <a:shade val="50000"/>
+              </a:schemeClr>
+            </a:lnRef>
+            <a:fillRef idx="1">
+              <a:schemeClr val="accent1"/>
+            </a:fillRef>
+            <a:effectRef idx="0">
+              <a:schemeClr val="accent1"/>
+            </a:effectRef>
+            <a:fontRef idx="minor">
+              <a:schemeClr val="lt1"/>
+            </a:fontRef>
+          </p:style>
+          <p:txBody>
+            <a:bodyPr rtlCol="0" anchor="ctr"/>
+            <a:lstStyle/>
+            <a:p>
+              <a:pPr algn="ctr"/>
+              <a:r>
+                <a:rPr lang="en-US" sz="1200" dirty="0">
+                  <a:solidFill>
+                    <a:schemeClr val="bg1">
+                      <a:lumMod val="85000"/>
+                    </a:schemeClr>
+                  </a:solidFill>
+                  <a:latin typeface="Open Sans" panose="020B0606030504020204" pitchFamily="34" charset="0"/>
+                  <a:ea typeface="Open Sans" panose="020B0606030504020204" pitchFamily="34" charset="0"/>
+                  <a:cs typeface="Open Sans" panose="020B0606030504020204" pitchFamily="34" charset="0"/>
+                </a:rPr>
+                <a:t>Fee = 4.00*hour</a:t>
+              </a:r>
+            </a:p>
+          </p:txBody>
+        </p:sp>
+        <p:cxnSp>
+          <p:nvCxnSpPr>
+            <p:cNvPr id="35" name="Connector: Elbow 34">
+              <a:extLst>
+                <a:ext uri="{FF2B5EF4-FFF2-40B4-BE49-F238E27FC236}">
+                  <a16:creationId xmlns:a16="http://schemas.microsoft.com/office/drawing/2014/main" id="{44F8E138-8730-4986-859D-6909BD3EA4CE}"/>
+                </a:ext>
+              </a:extLst>
+            </p:cNvPr>
+            <p:cNvCxnSpPr>
+              <a:stCxn id="8" idx="2"/>
+              <a:endCxn id="30" idx="1"/>
+            </p:cNvCxnSpPr>
+            <p:nvPr/>
+          </p:nvCxnSpPr>
+          <p:spPr>
+            <a:xfrm rot="16200000" flipH="1">
+              <a:off x="4379494" y="5263111"/>
+              <a:ext cx="296779" cy="1299408"/>
+            </a:xfrm>
+            <a:prstGeom prst="bentConnector2">
+              <a:avLst/>
+            </a:prstGeom>
+            <a:ln w="12700">
+              <a:solidFill>
+                <a:srgbClr val="FF7C80"/>
+              </a:solidFill>
+              <a:tailEnd type="triangle"/>
+            </a:ln>
+          </p:spPr>
+          <p:style>
+            <a:lnRef idx="1">
+              <a:schemeClr val="accent1"/>
+            </a:lnRef>
+            <a:fillRef idx="0">
+              <a:schemeClr val="accent1"/>
+            </a:fillRef>
+            <a:effectRef idx="0">
+              <a:schemeClr val="accent1"/>
+            </a:effectRef>
+            <a:fontRef idx="minor">
+              <a:schemeClr val="tx1"/>
+            </a:fontRef>
+          </p:style>
+        </p:cxnSp>
+        <p:sp>
+          <p:nvSpPr>
+            <p:cNvPr id="36" name="TextBox 35">
+              <a:extLst>
+                <a:ext uri="{FF2B5EF4-FFF2-40B4-BE49-F238E27FC236}">
+                  <a16:creationId xmlns:a16="http://schemas.microsoft.com/office/drawing/2014/main" id="{026FF1F1-338C-4F48-8811-F9243B273734}"/>
+                </a:ext>
+              </a:extLst>
+            </p:cNvPr>
+            <p:cNvSpPr txBox="1"/>
+            <p:nvPr/>
+          </p:nvSpPr>
+          <p:spPr>
+            <a:xfrm>
+              <a:off x="4854281" y="2526519"/>
+              <a:ext cx="269626" cy="276999"/>
+            </a:xfrm>
+            <a:prstGeom prst="rect">
+              <a:avLst/>
+            </a:prstGeom>
+            <a:noFill/>
+          </p:spPr>
+          <p:txBody>
+            <a:bodyPr wrap="none" rtlCol="0">
+              <a:spAutoFit/>
+            </a:bodyPr>
+            <a:lstStyle/>
+            <a:p>
+              <a:r>
+                <a:rPr lang="en-US" sz="1200" dirty="0">
+                  <a:solidFill>
+                    <a:srgbClr val="FF7C80"/>
+                  </a:solidFill>
+                  <a:latin typeface="Open Sans" panose="020B0606030504020204" pitchFamily="34" charset="0"/>
+                  <a:ea typeface="Open Sans" panose="020B0606030504020204" pitchFamily="34" charset="0"/>
+                  <a:cs typeface="Open Sans" panose="020B0606030504020204" pitchFamily="34" charset="0"/>
+                </a:rPr>
+                <a:t>T</a:t>
+              </a:r>
+            </a:p>
+          </p:txBody>
+        </p:sp>
+        <p:sp>
+          <p:nvSpPr>
+            <p:cNvPr id="37" name="TextBox 36">
+              <a:extLst>
+                <a:ext uri="{FF2B5EF4-FFF2-40B4-BE49-F238E27FC236}">
+                  <a16:creationId xmlns:a16="http://schemas.microsoft.com/office/drawing/2014/main" id="{021392A3-D0C9-4305-86BD-5332188EA6CB}"/>
+                </a:ext>
+              </a:extLst>
+            </p:cNvPr>
+            <p:cNvSpPr txBox="1"/>
+            <p:nvPr/>
+          </p:nvSpPr>
+          <p:spPr>
+            <a:xfrm>
+              <a:off x="4854281" y="3769782"/>
+              <a:ext cx="269626" cy="276999"/>
+            </a:xfrm>
+            <a:prstGeom prst="rect">
+              <a:avLst/>
+            </a:prstGeom>
+            <a:noFill/>
+          </p:spPr>
+          <p:txBody>
+            <a:bodyPr wrap="none" rtlCol="0">
+              <a:spAutoFit/>
+            </a:bodyPr>
+            <a:lstStyle/>
+            <a:p>
+              <a:r>
+                <a:rPr lang="en-US" sz="1200" dirty="0">
+                  <a:solidFill>
+                    <a:srgbClr val="FF7C80"/>
+                  </a:solidFill>
+                  <a:latin typeface="Open Sans" panose="020B0606030504020204" pitchFamily="34" charset="0"/>
+                  <a:ea typeface="Open Sans" panose="020B0606030504020204" pitchFamily="34" charset="0"/>
+                  <a:cs typeface="Open Sans" panose="020B0606030504020204" pitchFamily="34" charset="0"/>
+                </a:rPr>
+                <a:t>T</a:t>
+              </a:r>
+            </a:p>
+          </p:txBody>
+        </p:sp>
+        <p:sp>
+          <p:nvSpPr>
+            <p:cNvPr id="38" name="TextBox 37">
+              <a:extLst>
+                <a:ext uri="{FF2B5EF4-FFF2-40B4-BE49-F238E27FC236}">
+                  <a16:creationId xmlns:a16="http://schemas.microsoft.com/office/drawing/2014/main" id="{741830F2-B1C3-4F7F-A19A-609F9A3B848C}"/>
+                </a:ext>
+              </a:extLst>
+            </p:cNvPr>
+            <p:cNvSpPr txBox="1"/>
+            <p:nvPr/>
+          </p:nvSpPr>
+          <p:spPr>
+            <a:xfrm>
+              <a:off x="4854281" y="5011906"/>
+              <a:ext cx="269626" cy="276999"/>
+            </a:xfrm>
+            <a:prstGeom prst="rect">
+              <a:avLst/>
+            </a:prstGeom>
+            <a:noFill/>
+          </p:spPr>
+          <p:txBody>
+            <a:bodyPr wrap="none" rtlCol="0">
+              <a:spAutoFit/>
+            </a:bodyPr>
+            <a:lstStyle/>
+            <a:p>
+              <a:r>
+                <a:rPr lang="en-US" sz="1200" dirty="0">
+                  <a:solidFill>
+                    <a:srgbClr val="FF7C80"/>
+                  </a:solidFill>
+                  <a:latin typeface="Open Sans" panose="020B0606030504020204" pitchFamily="34" charset="0"/>
+                  <a:ea typeface="Open Sans" panose="020B0606030504020204" pitchFamily="34" charset="0"/>
+                  <a:cs typeface="Open Sans" panose="020B0606030504020204" pitchFamily="34" charset="0"/>
+                </a:rPr>
+                <a:t>T</a:t>
+              </a:r>
+            </a:p>
+          </p:txBody>
+        </p:sp>
+        <p:sp>
+          <p:nvSpPr>
+            <p:cNvPr id="39" name="TextBox 38">
+              <a:extLst>
+                <a:ext uri="{FF2B5EF4-FFF2-40B4-BE49-F238E27FC236}">
+                  <a16:creationId xmlns:a16="http://schemas.microsoft.com/office/drawing/2014/main" id="{C8B085BA-4F97-4C99-BDA6-87889E1F708C}"/>
+                </a:ext>
+              </a:extLst>
+            </p:cNvPr>
+            <p:cNvSpPr txBox="1"/>
+            <p:nvPr/>
+          </p:nvSpPr>
+          <p:spPr>
+            <a:xfrm>
+              <a:off x="3608553" y="3277897"/>
+              <a:ext cx="269626" cy="276999"/>
+            </a:xfrm>
+            <a:prstGeom prst="rect">
+              <a:avLst/>
+            </a:prstGeom>
+            <a:noFill/>
+          </p:spPr>
+          <p:txBody>
+            <a:bodyPr wrap="none" rtlCol="0">
+              <a:spAutoFit/>
+            </a:bodyPr>
+            <a:lstStyle/>
+            <a:p>
+              <a:r>
+                <a:rPr lang="en-US" sz="1200" dirty="0">
+                  <a:solidFill>
+                    <a:srgbClr val="FF7C80"/>
+                  </a:solidFill>
+                  <a:latin typeface="Open Sans" panose="020B0606030504020204" pitchFamily="34" charset="0"/>
+                  <a:ea typeface="Open Sans" panose="020B0606030504020204" pitchFamily="34" charset="0"/>
+                  <a:cs typeface="Open Sans" panose="020B0606030504020204" pitchFamily="34" charset="0"/>
+                </a:rPr>
+                <a:t>F</a:t>
+              </a:r>
+            </a:p>
+          </p:txBody>
+        </p:sp>
+        <p:sp>
+          <p:nvSpPr>
+            <p:cNvPr id="40" name="TextBox 39">
+              <a:extLst>
+                <a:ext uri="{FF2B5EF4-FFF2-40B4-BE49-F238E27FC236}">
+                  <a16:creationId xmlns:a16="http://schemas.microsoft.com/office/drawing/2014/main" id="{D6D47987-88FE-4262-88A7-BD01262D32EB}"/>
+                </a:ext>
+              </a:extLst>
+            </p:cNvPr>
+            <p:cNvSpPr txBox="1"/>
+            <p:nvPr/>
+          </p:nvSpPr>
+          <p:spPr>
+            <a:xfrm>
+              <a:off x="3608553" y="4521161"/>
+              <a:ext cx="269626" cy="276999"/>
+            </a:xfrm>
+            <a:prstGeom prst="rect">
+              <a:avLst/>
+            </a:prstGeom>
+            <a:noFill/>
+          </p:spPr>
+          <p:txBody>
+            <a:bodyPr wrap="none" rtlCol="0">
+              <a:spAutoFit/>
+            </a:bodyPr>
+            <a:lstStyle/>
+            <a:p>
+              <a:r>
+                <a:rPr lang="en-US" sz="1200" dirty="0">
+                  <a:solidFill>
+                    <a:srgbClr val="FF7C80"/>
+                  </a:solidFill>
+                  <a:latin typeface="Open Sans" panose="020B0606030504020204" pitchFamily="34" charset="0"/>
+                  <a:ea typeface="Open Sans" panose="020B0606030504020204" pitchFamily="34" charset="0"/>
+                  <a:cs typeface="Open Sans" panose="020B0606030504020204" pitchFamily="34" charset="0"/>
+                </a:rPr>
+                <a:t>F</a:t>
+              </a:r>
+            </a:p>
+          </p:txBody>
+        </p:sp>
+        <p:sp>
+          <p:nvSpPr>
+            <p:cNvPr id="41" name="TextBox 40">
+              <a:extLst>
+                <a:ext uri="{FF2B5EF4-FFF2-40B4-BE49-F238E27FC236}">
+                  <a16:creationId xmlns:a16="http://schemas.microsoft.com/office/drawing/2014/main" id="{DDE17185-5F1B-431F-8A40-25E814C364CC}"/>
+                </a:ext>
+              </a:extLst>
+            </p:cNvPr>
+            <p:cNvSpPr txBox="1"/>
+            <p:nvPr/>
+          </p:nvSpPr>
+          <p:spPr>
+            <a:xfrm>
+              <a:off x="3608553" y="5764424"/>
+              <a:ext cx="269626" cy="276999"/>
+            </a:xfrm>
+            <a:prstGeom prst="rect">
+              <a:avLst/>
+            </a:prstGeom>
+            <a:noFill/>
+          </p:spPr>
+          <p:txBody>
+            <a:bodyPr wrap="none" rtlCol="0">
+              <a:spAutoFit/>
+            </a:bodyPr>
+            <a:lstStyle/>
+            <a:p>
+              <a:r>
+                <a:rPr lang="en-US" sz="1200" dirty="0">
+                  <a:solidFill>
+                    <a:srgbClr val="FF7C80"/>
+                  </a:solidFill>
+                  <a:latin typeface="Open Sans" panose="020B0606030504020204" pitchFamily="34" charset="0"/>
+                  <a:ea typeface="Open Sans" panose="020B0606030504020204" pitchFamily="34" charset="0"/>
+                  <a:cs typeface="Open Sans" panose="020B0606030504020204" pitchFamily="34" charset="0"/>
+                </a:rPr>
+                <a:t>F</a:t>
+              </a:r>
+            </a:p>
+          </p:txBody>
+        </p:sp>
+        <p:sp>
+          <p:nvSpPr>
+            <p:cNvPr id="43" name="Flowchart: Data 42">
+              <a:extLst>
+                <a:ext uri="{FF2B5EF4-FFF2-40B4-BE49-F238E27FC236}">
+                  <a16:creationId xmlns:a16="http://schemas.microsoft.com/office/drawing/2014/main" id="{83FFD052-AEAD-4743-812A-CEECDBB42BF6}"/>
+                </a:ext>
+              </a:extLst>
+            </p:cNvPr>
+            <p:cNvSpPr/>
+            <p:nvPr/>
+          </p:nvSpPr>
+          <p:spPr>
+            <a:xfrm>
+              <a:off x="7379367" y="1545350"/>
+              <a:ext cx="1844844" cy="489284"/>
+            </a:xfrm>
+            <a:prstGeom prst="flowChartInputOutput">
+              <a:avLst/>
+            </a:prstGeom>
+            <a:noFill/>
+            <a:ln>
+              <a:solidFill>
+                <a:srgbClr val="CC99FF"/>
+              </a:solidFill>
+            </a:ln>
+          </p:spPr>
+          <p:style>
+            <a:lnRef idx="2">
+              <a:schemeClr val="accent1">
+                <a:shade val="50000"/>
+              </a:schemeClr>
+            </a:lnRef>
+            <a:fillRef idx="1">
+              <a:schemeClr val="accent1"/>
+            </a:fillRef>
+            <a:effectRef idx="0">
+              <a:schemeClr val="accent1"/>
+            </a:effectRef>
+            <a:fontRef idx="minor">
+              <a:schemeClr val="lt1"/>
+            </a:fontRef>
+          </p:style>
+          <p:txBody>
+            <a:bodyPr rtlCol="0" anchor="ctr"/>
+            <a:lstStyle/>
+            <a:p>
+              <a:pPr algn="ctr"/>
+              <a:r>
+                <a:rPr lang="en-US" sz="1200" dirty="0">
+                  <a:solidFill>
+                    <a:schemeClr val="bg1">
+                      <a:lumMod val="85000"/>
+                    </a:schemeClr>
+                  </a:solidFill>
+                  <a:latin typeface="Open Sans" panose="020B0606030504020204" pitchFamily="34" charset="0"/>
+                  <a:ea typeface="Open Sans" panose="020B0606030504020204" pitchFamily="34" charset="0"/>
+                  <a:cs typeface="Open Sans" panose="020B0606030504020204" pitchFamily="34" charset="0"/>
+                </a:rPr>
+                <a:t>Print fee</a:t>
+              </a:r>
+            </a:p>
+          </p:txBody>
+        </p:sp>
+        <p:cxnSp>
+          <p:nvCxnSpPr>
+            <p:cNvPr id="47" name="Connector: Elbow 46">
+              <a:extLst>
+                <a:ext uri="{FF2B5EF4-FFF2-40B4-BE49-F238E27FC236}">
+                  <a16:creationId xmlns:a16="http://schemas.microsoft.com/office/drawing/2014/main" id="{ED230FEA-0465-4B2C-A3B8-43A79370BD23}"/>
+                </a:ext>
+              </a:extLst>
+            </p:cNvPr>
+            <p:cNvCxnSpPr>
+              <a:cxnSpLocks/>
+              <a:stCxn id="30" idx="3"/>
+              <a:endCxn id="43" idx="4"/>
+            </p:cNvCxnSpPr>
+            <p:nvPr/>
+          </p:nvCxnSpPr>
+          <p:spPr>
+            <a:xfrm flipV="1">
+              <a:off x="7022431" y="2034634"/>
+              <a:ext cx="1279358" cy="4026571"/>
+            </a:xfrm>
+            <a:prstGeom prst="bentConnector2">
+              <a:avLst/>
+            </a:prstGeom>
+            <a:ln w="12700">
+              <a:solidFill>
+                <a:schemeClr val="bg1">
+                  <a:lumMod val="75000"/>
                 </a:schemeClr>
-              </a:lnRef>
-              <a:fillRef idx="1">
-                <a:schemeClr val="accent1"/>
-              </a:fillRef>
-              <a:effectRef idx="0">
-                <a:schemeClr val="accent1"/>
-              </a:effectRef>
-              <a:fontRef idx="minor">
-                <a:schemeClr val="lt1"/>
-              </a:fontRef>
-            </p:style>
-            <p:txBody>
-              <a:bodyPr rtlCol="0" anchor="ctr"/>
-              <a:lstStyle/>
-              <a:p>
-                <a:pPr algn="ctr"/>
-                <a:r>
-                  <a:rPr lang="en-US" sz="1200" dirty="0">
-                    <a:solidFill>
-                      <a:schemeClr val="bg1">
-                        <a:lumMod val="85000"/>
-                      </a:schemeClr>
-                    </a:solidFill>
-                    <a:latin typeface="Open Sans" panose="020B0606030504020204" pitchFamily="34" charset="0"/>
-                    <a:ea typeface="Open Sans" panose="020B0606030504020204" pitchFamily="34" charset="0"/>
-                    <a:cs typeface="Open Sans" panose="020B0606030504020204" pitchFamily="34" charset="0"/>
-                  </a:rPr>
-                  <a:t>Fee = 4.00*3 </a:t>
-                </a:r>
-              </a:p>
-              <a:p>
-                <a:pPr algn="ctr"/>
-                <a:r>
-                  <a:rPr lang="en-US" sz="1200" dirty="0">
-                    <a:solidFill>
-                      <a:schemeClr val="bg1">
-                        <a:lumMod val="85000"/>
-                      </a:schemeClr>
-                    </a:solidFill>
-                    <a:latin typeface="Open Sans" panose="020B0606030504020204" pitchFamily="34" charset="0"/>
-                    <a:ea typeface="Open Sans" panose="020B0606030504020204" pitchFamily="34" charset="0"/>
-                    <a:cs typeface="Open Sans" panose="020B0606030504020204" pitchFamily="34" charset="0"/>
-                  </a:rPr>
-                  <a:t>– 3.00*(hour – 3)</a:t>
-                </a:r>
-              </a:p>
-            </p:txBody>
-          </p:sp>
-          <p:cxnSp>
-            <p:nvCxnSpPr>
-              <p:cNvPr id="14" name="Straight Arrow Connector 13">
-                <a:extLst>
-                  <a:ext uri="{FF2B5EF4-FFF2-40B4-BE49-F238E27FC236}">
-                    <a16:creationId xmlns:a16="http://schemas.microsoft.com/office/drawing/2014/main" id="{6E956648-8245-4E91-969E-DA818A0EE312}"/>
-                  </a:ext>
-                </a:extLst>
-              </p:cNvPr>
-              <p:cNvCxnSpPr/>
-              <p:nvPr/>
-            </p:nvCxnSpPr>
-            <p:spPr>
-              <a:xfrm>
-                <a:off x="1283369" y="2069431"/>
-                <a:ext cx="0" cy="296780"/>
-              </a:xfrm>
-              <a:prstGeom prst="straightConnector1">
-                <a:avLst/>
-              </a:prstGeom>
-              <a:ln w="12700">
-                <a:solidFill>
-                  <a:srgbClr val="FF7C80"/>
-                </a:solidFill>
-                <a:tailEnd type="triangle"/>
-              </a:ln>
-            </p:spPr>
-            <p:style>
-              <a:lnRef idx="1">
-                <a:schemeClr val="accent1"/>
-              </a:lnRef>
-              <a:fillRef idx="0">
-                <a:schemeClr val="accent1"/>
-              </a:fillRef>
-              <a:effectRef idx="0">
-                <a:schemeClr val="accent1"/>
-              </a:effectRef>
-              <a:fontRef idx="minor">
-                <a:schemeClr val="tx1"/>
-              </a:fontRef>
-            </p:style>
-          </p:cxnSp>
-          <p:cxnSp>
-            <p:nvCxnSpPr>
-              <p:cNvPr id="15" name="Straight Arrow Connector 14">
-                <a:extLst>
-                  <a:ext uri="{FF2B5EF4-FFF2-40B4-BE49-F238E27FC236}">
-                    <a16:creationId xmlns:a16="http://schemas.microsoft.com/office/drawing/2014/main" id="{3721F831-D501-454D-81EE-0C02699D1E2A}"/>
-                  </a:ext>
-                </a:extLst>
-              </p:cNvPr>
-              <p:cNvCxnSpPr/>
-              <p:nvPr/>
-            </p:nvCxnSpPr>
-            <p:spPr>
-              <a:xfrm>
-                <a:off x="1283369" y="3312695"/>
-                <a:ext cx="0" cy="296780"/>
-              </a:xfrm>
-              <a:prstGeom prst="straightConnector1">
-                <a:avLst/>
-              </a:prstGeom>
-              <a:ln w="12700">
-                <a:solidFill>
-                  <a:srgbClr val="FF7C80"/>
-                </a:solidFill>
-                <a:tailEnd type="triangle"/>
-              </a:ln>
-            </p:spPr>
-            <p:style>
-              <a:lnRef idx="1">
-                <a:schemeClr val="accent1"/>
-              </a:lnRef>
-              <a:fillRef idx="0">
-                <a:schemeClr val="accent1"/>
-              </a:fillRef>
-              <a:effectRef idx="0">
-                <a:schemeClr val="accent1"/>
-              </a:effectRef>
-              <a:fontRef idx="minor">
-                <a:schemeClr val="tx1"/>
-              </a:fontRef>
-            </p:style>
-          </p:cxnSp>
-          <p:cxnSp>
-            <p:nvCxnSpPr>
-              <p:cNvPr id="19" name="Straight Arrow Connector 18">
-                <a:extLst>
-                  <a:ext uri="{FF2B5EF4-FFF2-40B4-BE49-F238E27FC236}">
-                    <a16:creationId xmlns:a16="http://schemas.microsoft.com/office/drawing/2014/main" id="{3B5CE5DB-7A65-4FDD-B4F3-0AAB62E0E486}"/>
-                  </a:ext>
-                </a:extLst>
-              </p:cNvPr>
-              <p:cNvCxnSpPr>
-                <a:stCxn id="4" idx="3"/>
-                <a:endCxn id="11" idx="1"/>
-              </p:cNvCxnSpPr>
-              <p:nvPr/>
-            </p:nvCxnSpPr>
-            <p:spPr>
-              <a:xfrm>
-                <a:off x="2205791" y="1596189"/>
-                <a:ext cx="376986" cy="0"/>
-              </a:xfrm>
-              <a:prstGeom prst="straightConnector1">
-                <a:avLst/>
-              </a:prstGeom>
-              <a:ln w="12700">
-                <a:solidFill>
-                  <a:srgbClr val="FF7C80"/>
-                </a:solidFill>
-                <a:tailEnd type="triangle"/>
-              </a:ln>
-            </p:spPr>
-            <p:style>
-              <a:lnRef idx="1">
-                <a:schemeClr val="accent1"/>
-              </a:lnRef>
-              <a:fillRef idx="0">
-                <a:schemeClr val="accent1"/>
-              </a:fillRef>
-              <a:effectRef idx="0">
-                <a:schemeClr val="accent1"/>
-              </a:effectRef>
-              <a:fontRef idx="minor">
-                <a:schemeClr val="tx1"/>
-              </a:fontRef>
-            </p:style>
-          </p:cxnSp>
-          <p:cxnSp>
-            <p:nvCxnSpPr>
-              <p:cNvPr id="20" name="Straight Arrow Connector 19">
-                <a:extLst>
-                  <a:ext uri="{FF2B5EF4-FFF2-40B4-BE49-F238E27FC236}">
-                    <a16:creationId xmlns:a16="http://schemas.microsoft.com/office/drawing/2014/main" id="{844786FB-3790-4EB5-B3D7-F42BA9824AC0}"/>
-                  </a:ext>
-                </a:extLst>
-              </p:cNvPr>
-              <p:cNvCxnSpPr/>
-              <p:nvPr/>
-            </p:nvCxnSpPr>
-            <p:spPr>
-              <a:xfrm>
-                <a:off x="2205791" y="2839452"/>
-                <a:ext cx="376986" cy="0"/>
-              </a:xfrm>
-              <a:prstGeom prst="straightConnector1">
-                <a:avLst/>
-              </a:prstGeom>
-              <a:ln w="12700">
-                <a:solidFill>
-                  <a:srgbClr val="FF7C80"/>
-                </a:solidFill>
-                <a:tailEnd type="triangle"/>
-              </a:ln>
-            </p:spPr>
-            <p:style>
-              <a:lnRef idx="1">
-                <a:schemeClr val="accent1"/>
-              </a:lnRef>
-              <a:fillRef idx="0">
-                <a:schemeClr val="accent1"/>
-              </a:fillRef>
-              <a:effectRef idx="0">
-                <a:schemeClr val="accent1"/>
-              </a:effectRef>
-              <a:fontRef idx="minor">
-                <a:schemeClr val="tx1"/>
-              </a:fontRef>
-            </p:style>
-          </p:cxnSp>
-          <p:cxnSp>
-            <p:nvCxnSpPr>
-              <p:cNvPr id="21" name="Straight Arrow Connector 20">
-                <a:extLst>
-                  <a:ext uri="{FF2B5EF4-FFF2-40B4-BE49-F238E27FC236}">
-                    <a16:creationId xmlns:a16="http://schemas.microsoft.com/office/drawing/2014/main" id="{B81CB08E-A669-408D-BD9C-BEEA5DDBDBF5}"/>
-                  </a:ext>
-                </a:extLst>
-              </p:cNvPr>
-              <p:cNvCxnSpPr/>
-              <p:nvPr/>
-            </p:nvCxnSpPr>
-            <p:spPr>
-              <a:xfrm>
-                <a:off x="2205791" y="4082716"/>
-                <a:ext cx="376986" cy="0"/>
-              </a:xfrm>
-              <a:prstGeom prst="straightConnector1">
-                <a:avLst/>
-              </a:prstGeom>
-              <a:ln w="12700">
-                <a:solidFill>
-                  <a:srgbClr val="FF7C80"/>
-                </a:solidFill>
-                <a:tailEnd type="triangle"/>
-              </a:ln>
-            </p:spPr>
-            <p:style>
-              <a:lnRef idx="1">
-                <a:schemeClr val="accent1"/>
-              </a:lnRef>
-              <a:fillRef idx="0">
-                <a:schemeClr val="accent1"/>
-              </a:fillRef>
-              <a:effectRef idx="0">
-                <a:schemeClr val="accent1"/>
-              </a:effectRef>
-              <a:fontRef idx="minor">
-                <a:schemeClr val="tx1"/>
-              </a:fontRef>
-            </p:style>
-          </p:cxnSp>
-          <p:sp>
-            <p:nvSpPr>
-              <p:cNvPr id="30" name="Rectangle 29">
-                <a:extLst>
-                  <a:ext uri="{FF2B5EF4-FFF2-40B4-BE49-F238E27FC236}">
-                    <a16:creationId xmlns:a16="http://schemas.microsoft.com/office/drawing/2014/main" id="{712A489D-A621-4FE4-ACF6-D76866D938EF}"/>
-                  </a:ext>
-                </a:extLst>
-              </p:cNvPr>
-              <p:cNvSpPr/>
-              <p:nvPr/>
-            </p:nvSpPr>
-            <p:spPr>
-              <a:xfrm>
-                <a:off x="2582777" y="4656222"/>
-                <a:ext cx="1844844" cy="393032"/>
-              </a:xfrm>
-              <a:prstGeom prst="rect">
-                <a:avLst/>
-              </a:prstGeom>
-              <a:noFill/>
-              <a:ln>
-                <a:solidFill>
-                  <a:schemeClr val="accent6">
-                    <a:lumMod val="60000"/>
-                    <a:lumOff val="40000"/>
-                  </a:schemeClr>
-                </a:solidFill>
-              </a:ln>
-            </p:spPr>
-            <p:style>
-              <a:lnRef idx="2">
-                <a:schemeClr val="accent1">
-                  <a:shade val="50000"/>
+              </a:solidFill>
+              <a:tailEnd type="triangle"/>
+            </a:ln>
+          </p:spPr>
+          <p:style>
+            <a:lnRef idx="1">
+              <a:schemeClr val="accent1"/>
+            </a:lnRef>
+            <a:fillRef idx="0">
+              <a:schemeClr val="accent1"/>
+            </a:fillRef>
+            <a:effectRef idx="0">
+              <a:schemeClr val="accent1"/>
+            </a:effectRef>
+            <a:fontRef idx="minor">
+              <a:schemeClr val="tx1"/>
+            </a:fontRef>
+          </p:style>
+        </p:cxnSp>
+        <p:cxnSp>
+          <p:nvCxnSpPr>
+            <p:cNvPr id="55" name="Straight Connector 54">
+              <a:extLst>
+                <a:ext uri="{FF2B5EF4-FFF2-40B4-BE49-F238E27FC236}">
+                  <a16:creationId xmlns:a16="http://schemas.microsoft.com/office/drawing/2014/main" id="{926EFA16-9636-40DD-B5F7-F2E2EEF1914D}"/>
+                </a:ext>
+              </a:extLst>
+            </p:cNvPr>
+            <p:cNvCxnSpPr>
+              <a:stCxn id="11" idx="3"/>
+            </p:cNvCxnSpPr>
+            <p:nvPr/>
+          </p:nvCxnSpPr>
+          <p:spPr>
+            <a:xfrm flipV="1">
+              <a:off x="7022431" y="2803518"/>
+              <a:ext cx="1279357" cy="1138"/>
+            </a:xfrm>
+            <a:prstGeom prst="line">
+              <a:avLst/>
+            </a:prstGeom>
+            <a:ln w="12700">
+              <a:solidFill>
+                <a:schemeClr val="bg1">
+                  <a:lumMod val="75000"/>
                 </a:schemeClr>
-              </a:lnRef>
-              <a:fillRef idx="1">
-                <a:schemeClr val="accent1"/>
-              </a:fillRef>
-              <a:effectRef idx="0">
-                <a:schemeClr val="accent1"/>
-              </a:effectRef>
-              <a:fontRef idx="minor">
-                <a:schemeClr val="lt1"/>
-              </a:fontRef>
-            </p:style>
-            <p:txBody>
-              <a:bodyPr rtlCol="0" anchor="ctr"/>
-              <a:lstStyle/>
-              <a:p>
-                <a:pPr algn="ctr"/>
-                <a:r>
-                  <a:rPr lang="en-US" sz="1200" dirty="0">
-                    <a:solidFill>
-                      <a:schemeClr val="bg1">
-                        <a:lumMod val="85000"/>
-                      </a:schemeClr>
-                    </a:solidFill>
-                    <a:latin typeface="Open Sans" panose="020B0606030504020204" pitchFamily="34" charset="0"/>
-                    <a:ea typeface="Open Sans" panose="020B0606030504020204" pitchFamily="34" charset="0"/>
-                    <a:cs typeface="Open Sans" panose="020B0606030504020204" pitchFamily="34" charset="0"/>
-                  </a:rPr>
-                  <a:t>Fee = 4.00*hour</a:t>
-                </a:r>
-              </a:p>
-            </p:txBody>
-          </p:sp>
-          <p:cxnSp>
-            <p:nvCxnSpPr>
-              <p:cNvPr id="35" name="Connector: Elbow 34">
-                <a:extLst>
-                  <a:ext uri="{FF2B5EF4-FFF2-40B4-BE49-F238E27FC236}">
-                    <a16:creationId xmlns:a16="http://schemas.microsoft.com/office/drawing/2014/main" id="{44F8E138-8730-4986-859D-6909BD3EA4CE}"/>
-                  </a:ext>
-                </a:extLst>
-              </p:cNvPr>
-              <p:cNvCxnSpPr>
-                <a:stCxn id="8" idx="2"/>
-                <a:endCxn id="30" idx="1"/>
-              </p:cNvCxnSpPr>
-              <p:nvPr/>
-            </p:nvCxnSpPr>
-            <p:spPr>
-              <a:xfrm rot="16200000" flipH="1">
-                <a:off x="1784684" y="4054644"/>
-                <a:ext cx="296779" cy="1299408"/>
-              </a:xfrm>
-              <a:prstGeom prst="bentConnector2">
-                <a:avLst/>
-              </a:prstGeom>
-              <a:ln w="12700">
-                <a:solidFill>
-                  <a:srgbClr val="FF7C80"/>
-                </a:solidFill>
-                <a:tailEnd type="triangle"/>
-              </a:ln>
-            </p:spPr>
-            <p:style>
-              <a:lnRef idx="1">
-                <a:schemeClr val="accent1"/>
-              </a:lnRef>
-              <a:fillRef idx="0">
-                <a:schemeClr val="accent1"/>
-              </a:fillRef>
-              <a:effectRef idx="0">
-                <a:schemeClr val="accent1"/>
-              </a:effectRef>
-              <a:fontRef idx="minor">
-                <a:schemeClr val="tx1"/>
-              </a:fontRef>
-            </p:style>
-          </p:cxnSp>
-          <p:sp>
-            <p:nvSpPr>
-              <p:cNvPr id="36" name="TextBox 35">
-                <a:extLst>
-                  <a:ext uri="{FF2B5EF4-FFF2-40B4-BE49-F238E27FC236}">
-                    <a16:creationId xmlns:a16="http://schemas.microsoft.com/office/drawing/2014/main" id="{026FF1F1-338C-4F48-8811-F9243B273734}"/>
-                  </a:ext>
-                </a:extLst>
-              </p:cNvPr>
-              <p:cNvSpPr txBox="1"/>
-              <p:nvPr/>
-            </p:nvSpPr>
-            <p:spPr>
-              <a:xfrm>
-                <a:off x="2259471" y="1318052"/>
-                <a:ext cx="269626" cy="276999"/>
-              </a:xfrm>
-              <a:prstGeom prst="rect">
-                <a:avLst/>
-              </a:prstGeom>
-              <a:noFill/>
-            </p:spPr>
-            <p:txBody>
-              <a:bodyPr wrap="none" rtlCol="0">
-                <a:spAutoFit/>
-              </a:bodyPr>
-              <a:lstStyle/>
-              <a:p>
-                <a:r>
-                  <a:rPr lang="en-US" sz="1200" dirty="0">
-                    <a:solidFill>
-                      <a:srgbClr val="FF7C80"/>
-                    </a:solidFill>
-                    <a:latin typeface="Open Sans" panose="020B0606030504020204" pitchFamily="34" charset="0"/>
-                    <a:ea typeface="Open Sans" panose="020B0606030504020204" pitchFamily="34" charset="0"/>
-                    <a:cs typeface="Open Sans" panose="020B0606030504020204" pitchFamily="34" charset="0"/>
-                  </a:rPr>
-                  <a:t>T</a:t>
-                </a:r>
-              </a:p>
-            </p:txBody>
-          </p:sp>
-          <p:sp>
-            <p:nvSpPr>
-              <p:cNvPr id="37" name="TextBox 36">
-                <a:extLst>
-                  <a:ext uri="{FF2B5EF4-FFF2-40B4-BE49-F238E27FC236}">
-                    <a16:creationId xmlns:a16="http://schemas.microsoft.com/office/drawing/2014/main" id="{021392A3-D0C9-4305-86BD-5332188EA6CB}"/>
-                  </a:ext>
-                </a:extLst>
-              </p:cNvPr>
-              <p:cNvSpPr txBox="1"/>
-              <p:nvPr/>
-            </p:nvSpPr>
-            <p:spPr>
-              <a:xfrm>
-                <a:off x="2259471" y="2561315"/>
-                <a:ext cx="269626" cy="276999"/>
-              </a:xfrm>
-              <a:prstGeom prst="rect">
-                <a:avLst/>
-              </a:prstGeom>
-              <a:noFill/>
-            </p:spPr>
-            <p:txBody>
-              <a:bodyPr wrap="none" rtlCol="0">
-                <a:spAutoFit/>
-              </a:bodyPr>
-              <a:lstStyle/>
-              <a:p>
-                <a:r>
-                  <a:rPr lang="en-US" sz="1200" dirty="0">
-                    <a:solidFill>
-                      <a:srgbClr val="FF7C80"/>
-                    </a:solidFill>
-                    <a:latin typeface="Open Sans" panose="020B0606030504020204" pitchFamily="34" charset="0"/>
-                    <a:ea typeface="Open Sans" panose="020B0606030504020204" pitchFamily="34" charset="0"/>
-                    <a:cs typeface="Open Sans" panose="020B0606030504020204" pitchFamily="34" charset="0"/>
-                  </a:rPr>
-                  <a:t>T</a:t>
-                </a:r>
-              </a:p>
-            </p:txBody>
-          </p:sp>
-          <p:sp>
-            <p:nvSpPr>
-              <p:cNvPr id="38" name="TextBox 37">
-                <a:extLst>
-                  <a:ext uri="{FF2B5EF4-FFF2-40B4-BE49-F238E27FC236}">
-                    <a16:creationId xmlns:a16="http://schemas.microsoft.com/office/drawing/2014/main" id="{741830F2-B1C3-4F7F-A19A-609F9A3B848C}"/>
-                  </a:ext>
-                </a:extLst>
-              </p:cNvPr>
-              <p:cNvSpPr txBox="1"/>
-              <p:nvPr/>
-            </p:nvSpPr>
-            <p:spPr>
-              <a:xfrm>
-                <a:off x="2259471" y="3803439"/>
-                <a:ext cx="269626" cy="276999"/>
-              </a:xfrm>
-              <a:prstGeom prst="rect">
-                <a:avLst/>
-              </a:prstGeom>
-              <a:noFill/>
-            </p:spPr>
-            <p:txBody>
-              <a:bodyPr wrap="none" rtlCol="0">
-                <a:spAutoFit/>
-              </a:bodyPr>
-              <a:lstStyle/>
-              <a:p>
-                <a:r>
-                  <a:rPr lang="en-US" sz="1200" dirty="0">
-                    <a:solidFill>
-                      <a:srgbClr val="FF7C80"/>
-                    </a:solidFill>
-                    <a:latin typeface="Open Sans" panose="020B0606030504020204" pitchFamily="34" charset="0"/>
-                    <a:ea typeface="Open Sans" panose="020B0606030504020204" pitchFamily="34" charset="0"/>
-                    <a:cs typeface="Open Sans" panose="020B0606030504020204" pitchFamily="34" charset="0"/>
-                  </a:rPr>
-                  <a:t>T</a:t>
-                </a:r>
-              </a:p>
-            </p:txBody>
-          </p:sp>
-          <p:sp>
-            <p:nvSpPr>
-              <p:cNvPr id="39" name="TextBox 38">
-                <a:extLst>
-                  <a:ext uri="{FF2B5EF4-FFF2-40B4-BE49-F238E27FC236}">
-                    <a16:creationId xmlns:a16="http://schemas.microsoft.com/office/drawing/2014/main" id="{C8B085BA-4F97-4C99-BDA6-87889E1F708C}"/>
-                  </a:ext>
-                </a:extLst>
-              </p:cNvPr>
-              <p:cNvSpPr txBox="1"/>
-              <p:nvPr/>
-            </p:nvSpPr>
-            <p:spPr>
-              <a:xfrm>
-                <a:off x="1013743" y="2069430"/>
-                <a:ext cx="269626" cy="276999"/>
-              </a:xfrm>
-              <a:prstGeom prst="rect">
-                <a:avLst/>
-              </a:prstGeom>
-              <a:noFill/>
-            </p:spPr>
-            <p:txBody>
-              <a:bodyPr wrap="none" rtlCol="0">
-                <a:spAutoFit/>
-              </a:bodyPr>
-              <a:lstStyle/>
-              <a:p>
-                <a:r>
-                  <a:rPr lang="en-US" sz="1200" dirty="0">
-                    <a:solidFill>
-                      <a:srgbClr val="FF7C80"/>
-                    </a:solidFill>
-                    <a:latin typeface="Open Sans" panose="020B0606030504020204" pitchFamily="34" charset="0"/>
-                    <a:ea typeface="Open Sans" panose="020B0606030504020204" pitchFamily="34" charset="0"/>
-                    <a:cs typeface="Open Sans" panose="020B0606030504020204" pitchFamily="34" charset="0"/>
-                  </a:rPr>
-                  <a:t>F</a:t>
-                </a:r>
-              </a:p>
-            </p:txBody>
-          </p:sp>
-          <p:sp>
-            <p:nvSpPr>
-              <p:cNvPr id="40" name="TextBox 39">
-                <a:extLst>
-                  <a:ext uri="{FF2B5EF4-FFF2-40B4-BE49-F238E27FC236}">
-                    <a16:creationId xmlns:a16="http://schemas.microsoft.com/office/drawing/2014/main" id="{D6D47987-88FE-4262-88A7-BD01262D32EB}"/>
-                  </a:ext>
-                </a:extLst>
-              </p:cNvPr>
-              <p:cNvSpPr txBox="1"/>
-              <p:nvPr/>
-            </p:nvSpPr>
-            <p:spPr>
-              <a:xfrm>
-                <a:off x="1013743" y="3312694"/>
-                <a:ext cx="269626" cy="276999"/>
-              </a:xfrm>
-              <a:prstGeom prst="rect">
-                <a:avLst/>
-              </a:prstGeom>
-              <a:noFill/>
-            </p:spPr>
-            <p:txBody>
-              <a:bodyPr wrap="none" rtlCol="0">
-                <a:spAutoFit/>
-              </a:bodyPr>
-              <a:lstStyle/>
-              <a:p>
-                <a:r>
-                  <a:rPr lang="en-US" sz="1200" dirty="0">
-                    <a:solidFill>
-                      <a:srgbClr val="FF7C80"/>
-                    </a:solidFill>
-                    <a:latin typeface="Open Sans" panose="020B0606030504020204" pitchFamily="34" charset="0"/>
-                    <a:ea typeface="Open Sans" panose="020B0606030504020204" pitchFamily="34" charset="0"/>
-                    <a:cs typeface="Open Sans" panose="020B0606030504020204" pitchFamily="34" charset="0"/>
-                  </a:rPr>
-                  <a:t>F</a:t>
-                </a:r>
-              </a:p>
-            </p:txBody>
-          </p:sp>
-          <p:sp>
-            <p:nvSpPr>
-              <p:cNvPr id="41" name="TextBox 40">
-                <a:extLst>
-                  <a:ext uri="{FF2B5EF4-FFF2-40B4-BE49-F238E27FC236}">
-                    <a16:creationId xmlns:a16="http://schemas.microsoft.com/office/drawing/2014/main" id="{DDE17185-5F1B-431F-8A40-25E814C364CC}"/>
-                  </a:ext>
-                </a:extLst>
-              </p:cNvPr>
-              <p:cNvSpPr txBox="1"/>
-              <p:nvPr/>
-            </p:nvSpPr>
-            <p:spPr>
-              <a:xfrm>
-                <a:off x="1013743" y="4555957"/>
-                <a:ext cx="269626" cy="276999"/>
-              </a:xfrm>
-              <a:prstGeom prst="rect">
-                <a:avLst/>
-              </a:prstGeom>
-              <a:noFill/>
-            </p:spPr>
-            <p:txBody>
-              <a:bodyPr wrap="none" rtlCol="0">
-                <a:spAutoFit/>
-              </a:bodyPr>
-              <a:lstStyle/>
-              <a:p>
-                <a:r>
-                  <a:rPr lang="en-US" sz="1200" dirty="0">
-                    <a:solidFill>
-                      <a:srgbClr val="FF7C80"/>
-                    </a:solidFill>
-                    <a:latin typeface="Open Sans" panose="020B0606030504020204" pitchFamily="34" charset="0"/>
-                    <a:ea typeface="Open Sans" panose="020B0606030504020204" pitchFamily="34" charset="0"/>
-                    <a:cs typeface="Open Sans" panose="020B0606030504020204" pitchFamily="34" charset="0"/>
-                  </a:rPr>
-                  <a:t>F</a:t>
-                </a:r>
-              </a:p>
-            </p:txBody>
-          </p:sp>
-          <p:sp>
-            <p:nvSpPr>
-              <p:cNvPr id="43" name="Flowchart: Data 42">
-                <a:extLst>
-                  <a:ext uri="{FF2B5EF4-FFF2-40B4-BE49-F238E27FC236}">
-                    <a16:creationId xmlns:a16="http://schemas.microsoft.com/office/drawing/2014/main" id="{83FFD052-AEAD-4743-812A-CEECDBB42BF6}"/>
-                  </a:ext>
-                </a:extLst>
-              </p:cNvPr>
-              <p:cNvSpPr/>
-              <p:nvPr/>
-            </p:nvSpPr>
-            <p:spPr>
-              <a:xfrm>
-                <a:off x="4784557" y="336883"/>
-                <a:ext cx="1844844" cy="489284"/>
-              </a:xfrm>
-              <a:prstGeom prst="flowChartInputOutput">
-                <a:avLst/>
-              </a:prstGeom>
-              <a:noFill/>
-              <a:ln>
-                <a:solidFill>
-                  <a:srgbClr val="CC99FF"/>
-                </a:solidFill>
-              </a:ln>
-            </p:spPr>
-            <p:style>
-              <a:lnRef idx="2">
-                <a:schemeClr val="accent1">
-                  <a:shade val="50000"/>
+              </a:solidFill>
+            </a:ln>
+          </p:spPr>
+          <p:style>
+            <a:lnRef idx="1">
+              <a:schemeClr val="accent1"/>
+            </a:lnRef>
+            <a:fillRef idx="0">
+              <a:schemeClr val="accent1"/>
+            </a:fillRef>
+            <a:effectRef idx="0">
+              <a:schemeClr val="accent1"/>
+            </a:effectRef>
+            <a:fontRef idx="minor">
+              <a:schemeClr val="tx1"/>
+            </a:fontRef>
+          </p:style>
+        </p:cxnSp>
+        <p:cxnSp>
+          <p:nvCxnSpPr>
+            <p:cNvPr id="56" name="Straight Connector 55">
+              <a:extLst>
+                <a:ext uri="{FF2B5EF4-FFF2-40B4-BE49-F238E27FC236}">
+                  <a16:creationId xmlns:a16="http://schemas.microsoft.com/office/drawing/2014/main" id="{183936C0-B393-49D7-A7EF-57AAEC68FD3E}"/>
+                </a:ext>
+              </a:extLst>
+            </p:cNvPr>
+            <p:cNvCxnSpPr/>
+            <p:nvPr/>
+          </p:nvCxnSpPr>
+          <p:spPr>
+            <a:xfrm flipV="1">
+              <a:off x="7022431" y="4046781"/>
+              <a:ext cx="1279357" cy="1138"/>
+            </a:xfrm>
+            <a:prstGeom prst="line">
+              <a:avLst/>
+            </a:prstGeom>
+            <a:ln w="12700">
+              <a:solidFill>
+                <a:schemeClr val="bg1">
+                  <a:lumMod val="75000"/>
                 </a:schemeClr>
-              </a:lnRef>
-              <a:fillRef idx="1">
-                <a:schemeClr val="accent1"/>
-              </a:fillRef>
-              <a:effectRef idx="0">
-                <a:schemeClr val="accent1"/>
-              </a:effectRef>
-              <a:fontRef idx="minor">
-                <a:schemeClr val="lt1"/>
-              </a:fontRef>
-            </p:style>
-            <p:txBody>
-              <a:bodyPr rtlCol="0" anchor="ctr"/>
-              <a:lstStyle/>
-              <a:p>
-                <a:pPr algn="ctr"/>
-                <a:r>
-                  <a:rPr lang="en-US" sz="1200" dirty="0">
-                    <a:solidFill>
-                      <a:schemeClr val="bg1">
-                        <a:lumMod val="85000"/>
-                      </a:schemeClr>
-                    </a:solidFill>
-                    <a:latin typeface="Open Sans" panose="020B0606030504020204" pitchFamily="34" charset="0"/>
-                    <a:ea typeface="Open Sans" panose="020B0606030504020204" pitchFamily="34" charset="0"/>
-                    <a:cs typeface="Open Sans" panose="020B0606030504020204" pitchFamily="34" charset="0"/>
-                  </a:rPr>
-                  <a:t>Print fee</a:t>
-                </a:r>
-              </a:p>
-            </p:txBody>
-          </p:sp>
-          <p:cxnSp>
-            <p:nvCxnSpPr>
-              <p:cNvPr id="47" name="Connector: Elbow 46">
-                <a:extLst>
-                  <a:ext uri="{FF2B5EF4-FFF2-40B4-BE49-F238E27FC236}">
-                    <a16:creationId xmlns:a16="http://schemas.microsoft.com/office/drawing/2014/main" id="{ED230FEA-0465-4B2C-A3B8-43A79370BD23}"/>
-                  </a:ext>
-                </a:extLst>
-              </p:cNvPr>
-              <p:cNvCxnSpPr>
-                <a:cxnSpLocks/>
-                <a:stCxn id="30" idx="3"/>
-                <a:endCxn id="43" idx="4"/>
-              </p:cNvCxnSpPr>
-              <p:nvPr/>
-            </p:nvCxnSpPr>
-            <p:spPr>
-              <a:xfrm flipV="1">
-                <a:off x="4427621" y="826167"/>
-                <a:ext cx="1279358" cy="4026571"/>
-              </a:xfrm>
-              <a:prstGeom prst="bentConnector2">
-                <a:avLst/>
-              </a:prstGeom>
-              <a:ln w="12700">
-                <a:solidFill>
-                  <a:schemeClr val="bg1">
-                    <a:lumMod val="75000"/>
-                  </a:schemeClr>
-                </a:solidFill>
-                <a:tailEnd type="triangle"/>
-              </a:ln>
-            </p:spPr>
-            <p:style>
-              <a:lnRef idx="1">
-                <a:schemeClr val="accent1"/>
-              </a:lnRef>
-              <a:fillRef idx="0">
-                <a:schemeClr val="accent1"/>
-              </a:fillRef>
-              <a:effectRef idx="0">
-                <a:schemeClr val="accent1"/>
-              </a:effectRef>
-              <a:fontRef idx="minor">
-                <a:schemeClr val="tx1"/>
-              </a:fontRef>
-            </p:style>
-          </p:cxnSp>
-          <p:cxnSp>
-            <p:nvCxnSpPr>
-              <p:cNvPr id="55" name="Straight Connector 54">
-                <a:extLst>
-                  <a:ext uri="{FF2B5EF4-FFF2-40B4-BE49-F238E27FC236}">
-                    <a16:creationId xmlns:a16="http://schemas.microsoft.com/office/drawing/2014/main" id="{926EFA16-9636-40DD-B5F7-F2E2EEF1914D}"/>
-                  </a:ext>
-                </a:extLst>
-              </p:cNvPr>
-              <p:cNvCxnSpPr>
-                <a:stCxn id="11" idx="3"/>
-              </p:cNvCxnSpPr>
-              <p:nvPr/>
-            </p:nvCxnSpPr>
-            <p:spPr>
-              <a:xfrm flipV="1">
-                <a:off x="4427621" y="1595051"/>
-                <a:ext cx="1279357" cy="1138"/>
-              </a:xfrm>
-              <a:prstGeom prst="line">
-                <a:avLst/>
-              </a:prstGeom>
-              <a:ln w="12700">
-                <a:solidFill>
-                  <a:schemeClr val="bg1">
-                    <a:lumMod val="75000"/>
-                  </a:schemeClr>
-                </a:solidFill>
-              </a:ln>
-            </p:spPr>
-            <p:style>
-              <a:lnRef idx="1">
-                <a:schemeClr val="accent1"/>
-              </a:lnRef>
-              <a:fillRef idx="0">
-                <a:schemeClr val="accent1"/>
-              </a:fillRef>
-              <a:effectRef idx="0">
-                <a:schemeClr val="accent1"/>
-              </a:effectRef>
-              <a:fontRef idx="minor">
-                <a:schemeClr val="tx1"/>
-              </a:fontRef>
-            </p:style>
-          </p:cxnSp>
-          <p:cxnSp>
-            <p:nvCxnSpPr>
-              <p:cNvPr id="56" name="Straight Connector 55">
-                <a:extLst>
-                  <a:ext uri="{FF2B5EF4-FFF2-40B4-BE49-F238E27FC236}">
-                    <a16:creationId xmlns:a16="http://schemas.microsoft.com/office/drawing/2014/main" id="{183936C0-B393-49D7-A7EF-57AAEC68FD3E}"/>
-                  </a:ext>
-                </a:extLst>
-              </p:cNvPr>
-              <p:cNvCxnSpPr/>
-              <p:nvPr/>
-            </p:nvCxnSpPr>
-            <p:spPr>
-              <a:xfrm flipV="1">
-                <a:off x="4427621" y="2838314"/>
-                <a:ext cx="1279357" cy="1138"/>
-              </a:xfrm>
-              <a:prstGeom prst="line">
-                <a:avLst/>
-              </a:prstGeom>
-              <a:ln w="12700">
-                <a:solidFill>
-                  <a:schemeClr val="bg1">
-                    <a:lumMod val="75000"/>
-                  </a:schemeClr>
-                </a:solidFill>
-              </a:ln>
-            </p:spPr>
-            <p:style>
-              <a:lnRef idx="1">
-                <a:schemeClr val="accent1"/>
-              </a:lnRef>
-              <a:fillRef idx="0">
-                <a:schemeClr val="accent1"/>
-              </a:fillRef>
-              <a:effectRef idx="0">
-                <a:schemeClr val="accent1"/>
-              </a:effectRef>
-              <a:fontRef idx="minor">
-                <a:schemeClr val="tx1"/>
-              </a:fontRef>
-            </p:style>
-          </p:cxnSp>
-          <p:cxnSp>
-            <p:nvCxnSpPr>
-              <p:cNvPr id="57" name="Straight Connector 56">
-                <a:extLst>
-                  <a:ext uri="{FF2B5EF4-FFF2-40B4-BE49-F238E27FC236}">
-                    <a16:creationId xmlns:a16="http://schemas.microsoft.com/office/drawing/2014/main" id="{8B5C6E0D-2DE4-439E-9595-609E8DBADFE6}"/>
-                  </a:ext>
-                </a:extLst>
-              </p:cNvPr>
-              <p:cNvCxnSpPr/>
-              <p:nvPr/>
-            </p:nvCxnSpPr>
-            <p:spPr>
-              <a:xfrm flipV="1">
-                <a:off x="4427621" y="4080438"/>
-                <a:ext cx="1279357" cy="1138"/>
-              </a:xfrm>
-              <a:prstGeom prst="line">
-                <a:avLst/>
-              </a:prstGeom>
-              <a:ln w="12700">
-                <a:solidFill>
-                  <a:schemeClr val="bg1">
-                    <a:lumMod val="75000"/>
-                  </a:schemeClr>
-                </a:solidFill>
-              </a:ln>
-            </p:spPr>
-            <p:style>
-              <a:lnRef idx="1">
-                <a:schemeClr val="accent1"/>
-              </a:lnRef>
-              <a:fillRef idx="0">
-                <a:schemeClr val="accent1"/>
-              </a:fillRef>
-              <a:effectRef idx="0">
-                <a:schemeClr val="accent1"/>
-              </a:effectRef>
-              <a:fontRef idx="minor">
-                <a:schemeClr val="tx1"/>
-              </a:fontRef>
-            </p:style>
-          </p:cxnSp>
-        </p:grpSp>
+              </a:solidFill>
+            </a:ln>
+          </p:spPr>
+          <p:style>
+            <a:lnRef idx="1">
+              <a:schemeClr val="accent1"/>
+            </a:lnRef>
+            <a:fillRef idx="0">
+              <a:schemeClr val="accent1"/>
+            </a:fillRef>
+            <a:effectRef idx="0">
+              <a:schemeClr val="accent1"/>
+            </a:effectRef>
+            <a:fontRef idx="minor">
+              <a:schemeClr val="tx1"/>
+            </a:fontRef>
+          </p:style>
+        </p:cxnSp>
+        <p:cxnSp>
+          <p:nvCxnSpPr>
+            <p:cNvPr id="57" name="Straight Connector 56">
+              <a:extLst>
+                <a:ext uri="{FF2B5EF4-FFF2-40B4-BE49-F238E27FC236}">
+                  <a16:creationId xmlns:a16="http://schemas.microsoft.com/office/drawing/2014/main" id="{8B5C6E0D-2DE4-439E-9595-609E8DBADFE6}"/>
+                </a:ext>
+              </a:extLst>
+            </p:cNvPr>
+            <p:cNvCxnSpPr/>
+            <p:nvPr/>
+          </p:nvCxnSpPr>
+          <p:spPr>
+            <a:xfrm flipV="1">
+              <a:off x="7022431" y="5288905"/>
+              <a:ext cx="1279357" cy="1138"/>
+            </a:xfrm>
+            <a:prstGeom prst="line">
+              <a:avLst/>
+            </a:prstGeom>
+            <a:ln w="12700">
+              <a:solidFill>
+                <a:schemeClr val="bg1">
+                  <a:lumMod val="75000"/>
+                </a:schemeClr>
+              </a:solidFill>
+            </a:ln>
+          </p:spPr>
+          <p:style>
+            <a:lnRef idx="1">
+              <a:schemeClr val="accent1"/>
+            </a:lnRef>
+            <a:fillRef idx="0">
+              <a:schemeClr val="accent1"/>
+            </a:fillRef>
+            <a:effectRef idx="0">
+              <a:schemeClr val="accent1"/>
+            </a:effectRef>
+            <a:fontRef idx="minor">
+              <a:schemeClr val="tx1"/>
+            </a:fontRef>
+          </p:style>
+        </p:cxnSp>
+        <p:sp>
+          <p:nvSpPr>
+            <p:cNvPr id="5" name="Flowchart: Terminator 4">
+              <a:extLst>
+                <a:ext uri="{FF2B5EF4-FFF2-40B4-BE49-F238E27FC236}">
+                  <a16:creationId xmlns:a16="http://schemas.microsoft.com/office/drawing/2014/main" id="{DEDE428B-CAC6-B926-1BE9-AEB7B568CFF2}"/>
+                </a:ext>
+              </a:extLst>
+            </p:cNvPr>
+            <p:cNvSpPr/>
+            <p:nvPr/>
+          </p:nvSpPr>
+          <p:spPr>
+            <a:xfrm>
+              <a:off x="3352800" y="759286"/>
+              <a:ext cx="1050758" cy="489284"/>
+            </a:xfrm>
+            <a:prstGeom prst="flowChartTerminator">
+              <a:avLst/>
+            </a:prstGeom>
+            <a:noFill/>
+            <a:ln>
+              <a:solidFill>
+                <a:schemeClr val="bg1">
+                  <a:lumMod val="75000"/>
+                </a:schemeClr>
+              </a:solidFill>
+            </a:ln>
+          </p:spPr>
+          <p:style>
+            <a:lnRef idx="2">
+              <a:schemeClr val="accent1">
+                <a:shade val="50000"/>
+              </a:schemeClr>
+            </a:lnRef>
+            <a:fillRef idx="1">
+              <a:schemeClr val="accent1"/>
+            </a:fillRef>
+            <a:effectRef idx="0">
+              <a:schemeClr val="accent1"/>
+            </a:effectRef>
+            <a:fontRef idx="minor">
+              <a:schemeClr val="lt1"/>
+            </a:fontRef>
+          </p:style>
+          <p:txBody>
+            <a:bodyPr rtlCol="0" anchor="ctr"/>
+            <a:lstStyle/>
+            <a:p>
+              <a:pPr algn="ctr"/>
+              <a:r>
+                <a:rPr lang="en-US" sz="1200" dirty="0">
+                  <a:solidFill>
+                    <a:schemeClr val="bg1">
+                      <a:lumMod val="85000"/>
+                    </a:schemeClr>
+                  </a:solidFill>
+                  <a:latin typeface="Open Sans" panose="020B0606030504020204" pitchFamily="34" charset="0"/>
+                  <a:ea typeface="Open Sans" panose="020B0606030504020204" pitchFamily="34" charset="0"/>
+                  <a:cs typeface="Open Sans" panose="020B0606030504020204" pitchFamily="34" charset="0"/>
+                </a:rPr>
+                <a:t>Start</a:t>
+              </a:r>
+            </a:p>
+          </p:txBody>
+        </p:sp>
+        <p:sp>
+          <p:nvSpPr>
+            <p:cNvPr id="46" name="Flowchart: Terminator 45">
+              <a:extLst>
+                <a:ext uri="{FF2B5EF4-FFF2-40B4-BE49-F238E27FC236}">
+                  <a16:creationId xmlns:a16="http://schemas.microsoft.com/office/drawing/2014/main" id="{E48E25D2-5C41-2F10-F5CF-D8F02FC6E93A}"/>
+                </a:ext>
+              </a:extLst>
+            </p:cNvPr>
+            <p:cNvSpPr/>
+            <p:nvPr/>
+          </p:nvSpPr>
+          <p:spPr>
+            <a:xfrm>
+              <a:off x="7776409" y="759286"/>
+              <a:ext cx="1050758" cy="489284"/>
+            </a:xfrm>
+            <a:prstGeom prst="flowChartTerminator">
+              <a:avLst/>
+            </a:prstGeom>
+            <a:noFill/>
+            <a:ln>
+              <a:solidFill>
+                <a:schemeClr val="bg1">
+                  <a:lumMod val="75000"/>
+                </a:schemeClr>
+              </a:solidFill>
+            </a:ln>
+          </p:spPr>
+          <p:style>
+            <a:lnRef idx="2">
+              <a:schemeClr val="accent1">
+                <a:shade val="50000"/>
+              </a:schemeClr>
+            </a:lnRef>
+            <a:fillRef idx="1">
+              <a:schemeClr val="accent1"/>
+            </a:fillRef>
+            <a:effectRef idx="0">
+              <a:schemeClr val="accent1"/>
+            </a:effectRef>
+            <a:fontRef idx="minor">
+              <a:schemeClr val="lt1"/>
+            </a:fontRef>
+          </p:style>
+          <p:txBody>
+            <a:bodyPr rtlCol="0" anchor="ctr"/>
+            <a:lstStyle/>
+            <a:p>
+              <a:pPr algn="ctr"/>
+              <a:r>
+                <a:rPr lang="en-US" sz="1200" dirty="0">
+                  <a:solidFill>
+                    <a:schemeClr val="bg1">
+                      <a:lumMod val="85000"/>
+                    </a:schemeClr>
+                  </a:solidFill>
+                  <a:latin typeface="Open Sans" panose="020B0606030504020204" pitchFamily="34" charset="0"/>
+                  <a:ea typeface="Open Sans" panose="020B0606030504020204" pitchFamily="34" charset="0"/>
+                  <a:cs typeface="Open Sans" panose="020B0606030504020204" pitchFamily="34" charset="0"/>
+                </a:rPr>
+                <a:t>Stop</a:t>
+              </a:r>
+            </a:p>
+          </p:txBody>
+        </p:sp>
+        <p:cxnSp>
+          <p:nvCxnSpPr>
+            <p:cNvPr id="9" name="Straight Arrow Connector 8">
+              <a:extLst>
+                <a:ext uri="{FF2B5EF4-FFF2-40B4-BE49-F238E27FC236}">
+                  <a16:creationId xmlns:a16="http://schemas.microsoft.com/office/drawing/2014/main" id="{7A548BF5-95C9-2B30-17CF-B10813B86142}"/>
+                </a:ext>
+              </a:extLst>
+            </p:cNvPr>
+            <p:cNvCxnSpPr>
+              <a:stCxn id="5" idx="2"/>
+              <a:endCxn id="2" idx="1"/>
+            </p:cNvCxnSpPr>
+            <p:nvPr/>
+          </p:nvCxnSpPr>
+          <p:spPr>
+            <a:xfrm>
+              <a:off x="3878179" y="1248570"/>
+              <a:ext cx="0" cy="296780"/>
+            </a:xfrm>
+            <a:prstGeom prst="straightConnector1">
+              <a:avLst/>
+            </a:prstGeom>
+            <a:ln w="12700">
+              <a:solidFill>
+                <a:schemeClr val="bg1">
+                  <a:lumMod val="75000"/>
+                </a:schemeClr>
+              </a:solidFill>
+              <a:tailEnd type="triangle"/>
+            </a:ln>
+          </p:spPr>
+          <p:style>
+            <a:lnRef idx="1">
+              <a:schemeClr val="accent1"/>
+            </a:lnRef>
+            <a:fillRef idx="0">
+              <a:schemeClr val="accent1"/>
+            </a:fillRef>
+            <a:effectRef idx="0">
+              <a:schemeClr val="accent1"/>
+            </a:effectRef>
+            <a:fontRef idx="minor">
+              <a:schemeClr val="tx1"/>
+            </a:fontRef>
+          </p:style>
+        </p:cxnSp>
+        <p:cxnSp>
+          <p:nvCxnSpPr>
+            <p:cNvPr id="17" name="Straight Arrow Connector 16">
+              <a:extLst>
+                <a:ext uri="{FF2B5EF4-FFF2-40B4-BE49-F238E27FC236}">
+                  <a16:creationId xmlns:a16="http://schemas.microsoft.com/office/drawing/2014/main" id="{1D382808-0FB6-9DFC-5D11-C21C8027C421}"/>
+                </a:ext>
+              </a:extLst>
+            </p:cNvPr>
+            <p:cNvCxnSpPr>
+              <a:cxnSpLocks/>
+              <a:endCxn id="46" idx="2"/>
+            </p:cNvCxnSpPr>
+            <p:nvPr/>
+          </p:nvCxnSpPr>
+          <p:spPr>
+            <a:xfrm flipV="1">
+              <a:off x="8301788" y="1248570"/>
+              <a:ext cx="0" cy="296780"/>
+            </a:xfrm>
+            <a:prstGeom prst="straightConnector1">
+              <a:avLst/>
+            </a:prstGeom>
+            <a:ln w="12700">
+              <a:solidFill>
+                <a:srgbClr val="CC99FF"/>
+              </a:solidFill>
+              <a:tailEnd type="triangle"/>
+            </a:ln>
+          </p:spPr>
+          <p:style>
+            <a:lnRef idx="1">
+              <a:schemeClr val="accent1"/>
+            </a:lnRef>
+            <a:fillRef idx="0">
+              <a:schemeClr val="accent1"/>
+            </a:fillRef>
+            <a:effectRef idx="0">
+              <a:schemeClr val="accent1"/>
+            </a:effectRef>
+            <a:fontRef idx="minor">
+              <a:schemeClr val="tx1"/>
+            </a:fontRef>
+          </p:style>
+        </p:cxnSp>
       </p:grpSp>
     </p:spTree>
     <p:extLst>
       <p:ext uri="{BB962C8B-B14F-4D97-AF65-F5344CB8AC3E}">
         <p14:creationId xmlns:p14="http://schemas.microsoft.com/office/powerpoint/2010/main" val="556201221"/>
+      </p:ext>
+    </p:extLst>
+  </p:cSld>
+  <p:clrMapOvr>
+    <a:masterClrMapping/>
+  </p:clrMapOvr>
+</p:sld>
+</file>
+
+<file path=ppt/slides/slide2.xml><?xml version="1.0" encoding="utf-8"?>
+<p:sld xmlns:a="http://schemas.openxmlformats.org/drawingml/2006/main" xmlns:r="http://schemas.openxmlformats.org/officeDocument/2006/relationships" xmlns:p="http://schemas.openxmlformats.org/presentationml/2006/main">
+  <p:cSld>
+    <p:spTree>
+      <p:nvGrpSpPr>
+        <p:cNvPr id="1" name=""/>
+        <p:cNvGrpSpPr/>
+        <p:nvPr/>
+      </p:nvGrpSpPr>
+      <p:grpSpPr>
+        <a:xfrm>
+          <a:off x="0" y="0"/>
+          <a:ext cx="0" cy="0"/>
+          <a:chOff x="0" y="0"/>
+          <a:chExt cx="0" cy="0"/>
+        </a:xfrm>
+      </p:grpSpPr>
+      <p:grpSp>
+        <p:nvGrpSpPr>
+          <p:cNvPr id="109" name="Group 108">
+            <a:extLst>
+              <a:ext uri="{FF2B5EF4-FFF2-40B4-BE49-F238E27FC236}">
+                <a16:creationId xmlns:a16="http://schemas.microsoft.com/office/drawing/2014/main" id="{45852487-5383-394E-20B0-51F48592BE6B}"/>
+              </a:ext>
+            </a:extLst>
+          </p:cNvPr>
+          <p:cNvGrpSpPr/>
+          <p:nvPr/>
+        </p:nvGrpSpPr>
+        <p:grpSpPr>
+          <a:xfrm>
+            <a:off x="2594810" y="169092"/>
+            <a:ext cx="7002379" cy="6519816"/>
+            <a:chOff x="2594810" y="169092"/>
+            <a:chExt cx="7002379" cy="6519816"/>
+          </a:xfrm>
+        </p:grpSpPr>
+        <p:sp>
+          <p:nvSpPr>
+            <p:cNvPr id="108" name="Rectangle 107">
+              <a:extLst>
+                <a:ext uri="{FF2B5EF4-FFF2-40B4-BE49-F238E27FC236}">
+                  <a16:creationId xmlns:a16="http://schemas.microsoft.com/office/drawing/2014/main" id="{F5A5FD62-A99C-04B6-706B-DEE9B81AF541}"/>
+                </a:ext>
+              </a:extLst>
+            </p:cNvPr>
+            <p:cNvSpPr/>
+            <p:nvPr/>
+          </p:nvSpPr>
+          <p:spPr>
+            <a:xfrm>
+              <a:off x="2594810" y="169092"/>
+              <a:ext cx="7002379" cy="6519816"/>
+            </a:xfrm>
+            <a:prstGeom prst="rect">
+              <a:avLst/>
+            </a:prstGeom>
+            <a:solidFill>
+              <a:schemeClr val="tx1">
+                <a:lumMod val="85000"/>
+                <a:lumOff val="15000"/>
+              </a:schemeClr>
+            </a:solidFill>
+            <a:ln>
+              <a:noFill/>
+            </a:ln>
+          </p:spPr>
+          <p:style>
+            <a:lnRef idx="2">
+              <a:schemeClr val="accent1">
+                <a:shade val="50000"/>
+              </a:schemeClr>
+            </a:lnRef>
+            <a:fillRef idx="1">
+              <a:schemeClr val="accent1"/>
+            </a:fillRef>
+            <a:effectRef idx="0">
+              <a:schemeClr val="accent1"/>
+            </a:effectRef>
+            <a:fontRef idx="minor">
+              <a:schemeClr val="lt1"/>
+            </a:fontRef>
+          </p:style>
+          <p:txBody>
+            <a:bodyPr rtlCol="0" anchor="ctr"/>
+            <a:lstStyle/>
+            <a:p>
+              <a:pPr algn="ctr"/>
+              <a:endParaRPr lang="en-US" dirty="0"/>
+            </a:p>
+          </p:txBody>
+        </p:sp>
+        <p:sp>
+          <p:nvSpPr>
+            <p:cNvPr id="59" name="Flowchart: Terminator 58">
+              <a:extLst>
+                <a:ext uri="{FF2B5EF4-FFF2-40B4-BE49-F238E27FC236}">
+                  <a16:creationId xmlns:a16="http://schemas.microsoft.com/office/drawing/2014/main" id="{D7554AAC-5F81-46CA-BA4E-6CDF6B8CC5AD}"/>
+                </a:ext>
+              </a:extLst>
+            </p:cNvPr>
+            <p:cNvSpPr/>
+            <p:nvPr/>
+          </p:nvSpPr>
+          <p:spPr>
+            <a:xfrm>
+              <a:off x="3358816" y="559257"/>
+              <a:ext cx="1050758" cy="489284"/>
+            </a:xfrm>
+            <a:prstGeom prst="flowChartTerminator">
+              <a:avLst/>
+            </a:prstGeom>
+            <a:noFill/>
+            <a:ln>
+              <a:solidFill>
+                <a:schemeClr val="bg1">
+                  <a:lumMod val="75000"/>
+                </a:schemeClr>
+              </a:solidFill>
+            </a:ln>
+          </p:spPr>
+          <p:style>
+            <a:lnRef idx="2">
+              <a:schemeClr val="accent1">
+                <a:shade val="50000"/>
+              </a:schemeClr>
+            </a:lnRef>
+            <a:fillRef idx="1">
+              <a:schemeClr val="accent1"/>
+            </a:fillRef>
+            <a:effectRef idx="0">
+              <a:schemeClr val="accent1"/>
+            </a:effectRef>
+            <a:fontRef idx="minor">
+              <a:schemeClr val="lt1"/>
+            </a:fontRef>
+          </p:style>
+          <p:txBody>
+            <a:bodyPr rtlCol="0" anchor="ctr"/>
+            <a:lstStyle/>
+            <a:p>
+              <a:pPr algn="ctr"/>
+              <a:r>
+                <a:rPr lang="en-US" sz="1200" dirty="0">
+                  <a:solidFill>
+                    <a:schemeClr val="bg1">
+                      <a:lumMod val="85000"/>
+                    </a:schemeClr>
+                  </a:solidFill>
+                  <a:latin typeface="Open Sans" panose="020B0606030504020204" pitchFamily="34" charset="0"/>
+                  <a:ea typeface="Open Sans" panose="020B0606030504020204" pitchFamily="34" charset="0"/>
+                  <a:cs typeface="Open Sans" panose="020B0606030504020204" pitchFamily="34" charset="0"/>
+                </a:rPr>
+                <a:t>Start</a:t>
+              </a:r>
+            </a:p>
+          </p:txBody>
+        </p:sp>
+        <p:sp>
+          <p:nvSpPr>
+            <p:cNvPr id="60" name="Flowchart: Terminator 59">
+              <a:extLst>
+                <a:ext uri="{FF2B5EF4-FFF2-40B4-BE49-F238E27FC236}">
+                  <a16:creationId xmlns:a16="http://schemas.microsoft.com/office/drawing/2014/main" id="{103191FC-37A5-724C-C214-882B4B9F6C89}"/>
+                </a:ext>
+              </a:extLst>
+            </p:cNvPr>
+            <p:cNvSpPr/>
+            <p:nvPr/>
+          </p:nvSpPr>
+          <p:spPr>
+            <a:xfrm>
+              <a:off x="7782425" y="559257"/>
+              <a:ext cx="1050758" cy="489284"/>
+            </a:xfrm>
+            <a:prstGeom prst="flowChartTerminator">
+              <a:avLst/>
+            </a:prstGeom>
+            <a:noFill/>
+            <a:ln>
+              <a:solidFill>
+                <a:schemeClr val="bg1">
+                  <a:lumMod val="75000"/>
+                </a:schemeClr>
+              </a:solidFill>
+            </a:ln>
+          </p:spPr>
+          <p:style>
+            <a:lnRef idx="2">
+              <a:schemeClr val="accent1">
+                <a:shade val="50000"/>
+              </a:schemeClr>
+            </a:lnRef>
+            <a:fillRef idx="1">
+              <a:schemeClr val="accent1"/>
+            </a:fillRef>
+            <a:effectRef idx="0">
+              <a:schemeClr val="accent1"/>
+            </a:effectRef>
+            <a:fontRef idx="minor">
+              <a:schemeClr val="lt1"/>
+            </a:fontRef>
+          </p:style>
+          <p:txBody>
+            <a:bodyPr rtlCol="0" anchor="ctr"/>
+            <a:lstStyle/>
+            <a:p>
+              <a:pPr algn="ctr"/>
+              <a:r>
+                <a:rPr lang="en-US" sz="1200" dirty="0">
+                  <a:solidFill>
+                    <a:schemeClr val="bg1">
+                      <a:lumMod val="85000"/>
+                    </a:schemeClr>
+                  </a:solidFill>
+                  <a:latin typeface="Open Sans" panose="020B0606030504020204" pitchFamily="34" charset="0"/>
+                  <a:ea typeface="Open Sans" panose="020B0606030504020204" pitchFamily="34" charset="0"/>
+                  <a:cs typeface="Open Sans" panose="020B0606030504020204" pitchFamily="34" charset="0"/>
+                </a:rPr>
+                <a:t>Stop</a:t>
+              </a:r>
+            </a:p>
+          </p:txBody>
+        </p:sp>
+        <p:cxnSp>
+          <p:nvCxnSpPr>
+            <p:cNvPr id="61" name="Straight Arrow Connector 60">
+              <a:extLst>
+                <a:ext uri="{FF2B5EF4-FFF2-40B4-BE49-F238E27FC236}">
+                  <a16:creationId xmlns:a16="http://schemas.microsoft.com/office/drawing/2014/main" id="{A1BBCFB3-141A-F3B8-67BE-C05995E64053}"/>
+                </a:ext>
+              </a:extLst>
+            </p:cNvPr>
+            <p:cNvCxnSpPr>
+              <a:cxnSpLocks/>
+              <a:stCxn id="59" idx="2"/>
+            </p:cNvCxnSpPr>
+            <p:nvPr/>
+          </p:nvCxnSpPr>
+          <p:spPr>
+            <a:xfrm>
+              <a:off x="3884195" y="1048541"/>
+              <a:ext cx="0" cy="296780"/>
+            </a:xfrm>
+            <a:prstGeom prst="straightConnector1">
+              <a:avLst/>
+            </a:prstGeom>
+            <a:ln w="12700">
+              <a:solidFill>
+                <a:schemeClr val="bg1">
+                  <a:lumMod val="75000"/>
+                </a:schemeClr>
+              </a:solidFill>
+              <a:tailEnd type="triangle"/>
+            </a:ln>
+          </p:spPr>
+          <p:style>
+            <a:lnRef idx="1">
+              <a:schemeClr val="accent1"/>
+            </a:lnRef>
+            <a:fillRef idx="0">
+              <a:schemeClr val="accent1"/>
+            </a:fillRef>
+            <a:effectRef idx="0">
+              <a:schemeClr val="accent1"/>
+            </a:effectRef>
+            <a:fontRef idx="minor">
+              <a:schemeClr val="tx1"/>
+            </a:fontRef>
+          </p:style>
+        </p:cxnSp>
+        <p:cxnSp>
+          <p:nvCxnSpPr>
+            <p:cNvPr id="62" name="Straight Arrow Connector 61">
+              <a:extLst>
+                <a:ext uri="{FF2B5EF4-FFF2-40B4-BE49-F238E27FC236}">
+                  <a16:creationId xmlns:a16="http://schemas.microsoft.com/office/drawing/2014/main" id="{903344F0-BBDC-6927-095D-B254CDEA41DC}"/>
+                </a:ext>
+              </a:extLst>
+            </p:cNvPr>
+            <p:cNvCxnSpPr>
+              <a:cxnSpLocks/>
+              <a:endCxn id="60" idx="2"/>
+            </p:cNvCxnSpPr>
+            <p:nvPr/>
+          </p:nvCxnSpPr>
+          <p:spPr>
+            <a:xfrm flipV="1">
+              <a:off x="8307804" y="1048541"/>
+              <a:ext cx="0" cy="296780"/>
+            </a:xfrm>
+            <a:prstGeom prst="straightConnector1">
+              <a:avLst/>
+            </a:prstGeom>
+            <a:ln w="12700">
+              <a:solidFill>
+                <a:srgbClr val="CC99FF"/>
+              </a:solidFill>
+              <a:tailEnd type="triangle"/>
+            </a:ln>
+          </p:spPr>
+          <p:style>
+            <a:lnRef idx="1">
+              <a:schemeClr val="accent1"/>
+            </a:lnRef>
+            <a:fillRef idx="0">
+              <a:schemeClr val="accent1"/>
+            </a:fillRef>
+            <a:effectRef idx="0">
+              <a:schemeClr val="accent1"/>
+            </a:effectRef>
+            <a:fontRef idx="minor">
+              <a:schemeClr val="tx1"/>
+            </a:fontRef>
+          </p:style>
+        </p:cxnSp>
+        <p:sp>
+          <p:nvSpPr>
+            <p:cNvPr id="64" name="Rectangle 63">
+              <a:extLst>
+                <a:ext uri="{FF2B5EF4-FFF2-40B4-BE49-F238E27FC236}">
+                  <a16:creationId xmlns:a16="http://schemas.microsoft.com/office/drawing/2014/main" id="{5052184B-AC25-3BA4-D865-84420C9A2C6C}"/>
+                </a:ext>
+              </a:extLst>
+            </p:cNvPr>
+            <p:cNvSpPr/>
+            <p:nvPr/>
+          </p:nvSpPr>
+          <p:spPr>
+            <a:xfrm>
+              <a:off x="2961773" y="1345321"/>
+              <a:ext cx="1844844" cy="393032"/>
+            </a:xfrm>
+            <a:prstGeom prst="rect">
+              <a:avLst/>
+            </a:prstGeom>
+            <a:noFill/>
+            <a:ln>
+              <a:solidFill>
+                <a:schemeClr val="accent6">
+                  <a:lumMod val="60000"/>
+                  <a:lumOff val="40000"/>
+                </a:schemeClr>
+              </a:solidFill>
+            </a:ln>
+          </p:spPr>
+          <p:style>
+            <a:lnRef idx="2">
+              <a:schemeClr val="accent1">
+                <a:shade val="50000"/>
+              </a:schemeClr>
+            </a:lnRef>
+            <a:fillRef idx="1">
+              <a:schemeClr val="accent1"/>
+            </a:fillRef>
+            <a:effectRef idx="0">
+              <a:schemeClr val="accent1"/>
+            </a:effectRef>
+            <a:fontRef idx="minor">
+              <a:schemeClr val="lt1"/>
+            </a:fontRef>
+          </p:style>
+          <p:txBody>
+            <a:bodyPr rtlCol="0" anchor="ctr"/>
+            <a:lstStyle/>
+            <a:p>
+              <a:pPr algn="ctr"/>
+              <a:r>
+                <a:rPr lang="en-US" sz="1200" dirty="0" err="1">
+                  <a:solidFill>
+                    <a:schemeClr val="bg1">
+                      <a:lumMod val="85000"/>
+                    </a:schemeClr>
+                  </a:solidFill>
+                  <a:latin typeface="Open Sans" panose="020B0606030504020204" pitchFamily="34" charset="0"/>
+                  <a:ea typeface="Open Sans" panose="020B0606030504020204" pitchFamily="34" charset="0"/>
+                  <a:cs typeface="Open Sans" panose="020B0606030504020204" pitchFamily="34" charset="0"/>
+                </a:rPr>
+                <a:t>i</a:t>
+              </a:r>
+              <a:r>
+                <a:rPr lang="en-US" sz="1200" dirty="0">
+                  <a:solidFill>
+                    <a:schemeClr val="bg1">
+                      <a:lumMod val="85000"/>
+                    </a:schemeClr>
+                  </a:solidFill>
+                  <a:latin typeface="Open Sans" panose="020B0606030504020204" pitchFamily="34" charset="0"/>
+                  <a:ea typeface="Open Sans" panose="020B0606030504020204" pitchFamily="34" charset="0"/>
+                  <a:cs typeface="Open Sans" panose="020B0606030504020204" pitchFamily="34" charset="0"/>
+                </a:rPr>
+                <a:t> = 0</a:t>
+              </a:r>
+            </a:p>
+          </p:txBody>
+        </p:sp>
+        <p:cxnSp>
+          <p:nvCxnSpPr>
+            <p:cNvPr id="65" name="Straight Arrow Connector 64">
+              <a:extLst>
+                <a:ext uri="{FF2B5EF4-FFF2-40B4-BE49-F238E27FC236}">
+                  <a16:creationId xmlns:a16="http://schemas.microsoft.com/office/drawing/2014/main" id="{C47DC224-7648-7A50-0797-89D1EC17589F}"/>
+                </a:ext>
+              </a:extLst>
+            </p:cNvPr>
+            <p:cNvCxnSpPr>
+              <a:cxnSpLocks/>
+            </p:cNvCxnSpPr>
+            <p:nvPr/>
+          </p:nvCxnSpPr>
+          <p:spPr>
+            <a:xfrm>
+              <a:off x="3884195" y="1738353"/>
+              <a:ext cx="0" cy="296780"/>
+            </a:xfrm>
+            <a:prstGeom prst="straightConnector1">
+              <a:avLst/>
+            </a:prstGeom>
+            <a:ln w="12700">
+              <a:solidFill>
+                <a:schemeClr val="bg1">
+                  <a:lumMod val="75000"/>
+                </a:schemeClr>
+              </a:solidFill>
+              <a:tailEnd type="triangle"/>
+            </a:ln>
+          </p:spPr>
+          <p:style>
+            <a:lnRef idx="1">
+              <a:schemeClr val="accent1"/>
+            </a:lnRef>
+            <a:fillRef idx="0">
+              <a:schemeClr val="accent1"/>
+            </a:fillRef>
+            <a:effectRef idx="0">
+              <a:schemeClr val="accent1"/>
+            </a:effectRef>
+            <a:fontRef idx="minor">
+              <a:schemeClr val="tx1"/>
+            </a:fontRef>
+          </p:style>
+        </p:cxnSp>
+        <p:sp>
+          <p:nvSpPr>
+            <p:cNvPr id="66" name="Flowchart: Data 65">
+              <a:extLst>
+                <a:ext uri="{FF2B5EF4-FFF2-40B4-BE49-F238E27FC236}">
+                  <a16:creationId xmlns:a16="http://schemas.microsoft.com/office/drawing/2014/main" id="{477DEE41-8C21-3CDD-4ED3-E6F3415D387C}"/>
+                </a:ext>
+              </a:extLst>
+            </p:cNvPr>
+            <p:cNvSpPr/>
+            <p:nvPr/>
+          </p:nvSpPr>
+          <p:spPr>
+            <a:xfrm>
+              <a:off x="3248522" y="3920196"/>
+              <a:ext cx="1844844" cy="489284"/>
+            </a:xfrm>
+            <a:prstGeom prst="flowChartInputOutput">
+              <a:avLst/>
+            </a:prstGeom>
+            <a:noFill/>
+            <a:ln>
+              <a:solidFill>
+                <a:schemeClr val="accent1">
+                  <a:lumMod val="60000"/>
+                  <a:lumOff val="40000"/>
+                </a:schemeClr>
+              </a:solidFill>
+            </a:ln>
+          </p:spPr>
+          <p:style>
+            <a:lnRef idx="2">
+              <a:schemeClr val="accent1">
+                <a:shade val="50000"/>
+              </a:schemeClr>
+            </a:lnRef>
+            <a:fillRef idx="1">
+              <a:schemeClr val="accent1"/>
+            </a:fillRef>
+            <a:effectRef idx="0">
+              <a:schemeClr val="accent1"/>
+            </a:effectRef>
+            <a:fontRef idx="minor">
+              <a:schemeClr val="lt1"/>
+            </a:fontRef>
+          </p:style>
+          <p:txBody>
+            <a:bodyPr rtlCol="0" anchor="ctr"/>
+            <a:lstStyle/>
+            <a:p>
+              <a:pPr algn="ctr"/>
+              <a:r>
+                <a:rPr lang="en-US" sz="1200" dirty="0">
+                  <a:solidFill>
+                    <a:schemeClr val="bg1">
+                      <a:lumMod val="85000"/>
+                    </a:schemeClr>
+                  </a:solidFill>
+                  <a:latin typeface="Open Sans" panose="020B0606030504020204" pitchFamily="34" charset="0"/>
+                  <a:ea typeface="Open Sans" panose="020B0606030504020204" pitchFamily="34" charset="0"/>
+                  <a:cs typeface="Open Sans" panose="020B0606030504020204" pitchFamily="34" charset="0"/>
+                </a:rPr>
+                <a:t>Read mileage</a:t>
+              </a:r>
+            </a:p>
+          </p:txBody>
+        </p:sp>
+        <p:sp>
+          <p:nvSpPr>
+            <p:cNvPr id="67" name="Flowchart: Decision 66">
+              <a:extLst>
+                <a:ext uri="{FF2B5EF4-FFF2-40B4-BE49-F238E27FC236}">
+                  <a16:creationId xmlns:a16="http://schemas.microsoft.com/office/drawing/2014/main" id="{A3DDEFFD-6E92-1CB4-EE4D-6CD3E04860A6}"/>
+                </a:ext>
+              </a:extLst>
+            </p:cNvPr>
+            <p:cNvSpPr/>
+            <p:nvPr/>
+          </p:nvSpPr>
+          <p:spPr>
+            <a:xfrm>
+              <a:off x="3248522" y="2694275"/>
+              <a:ext cx="1844844" cy="946484"/>
+            </a:xfrm>
+            <a:prstGeom prst="flowChartDecision">
+              <a:avLst/>
+            </a:prstGeom>
+            <a:noFill/>
+            <a:ln>
+              <a:solidFill>
+                <a:srgbClr val="FF7C80"/>
+              </a:solidFill>
+            </a:ln>
+          </p:spPr>
+          <p:style>
+            <a:lnRef idx="2">
+              <a:schemeClr val="accent1">
+                <a:shade val="50000"/>
+              </a:schemeClr>
+            </a:lnRef>
+            <a:fillRef idx="1">
+              <a:schemeClr val="accent1"/>
+            </a:fillRef>
+            <a:effectRef idx="0">
+              <a:schemeClr val="accent1"/>
+            </a:effectRef>
+            <a:fontRef idx="minor">
+              <a:schemeClr val="lt1"/>
+            </a:fontRef>
+          </p:style>
+          <p:txBody>
+            <a:bodyPr rtlCol="0" anchor="ctr"/>
+            <a:lstStyle/>
+            <a:p>
+              <a:pPr algn="ctr"/>
+              <a:r>
+                <a:rPr lang="en-US" sz="1200" dirty="0" err="1">
+                  <a:solidFill>
+                    <a:schemeClr val="bg1">
+                      <a:lumMod val="85000"/>
+                    </a:schemeClr>
+                  </a:solidFill>
+                  <a:latin typeface="Open Sans" panose="020B0606030504020204" pitchFamily="34" charset="0"/>
+                  <a:ea typeface="Open Sans" panose="020B0606030504020204" pitchFamily="34" charset="0"/>
+                  <a:cs typeface="Open Sans" panose="020B0606030504020204" pitchFamily="34" charset="0"/>
+                </a:rPr>
+                <a:t>i</a:t>
+              </a:r>
+              <a:r>
+                <a:rPr lang="en-US" sz="1200" dirty="0">
+                  <a:solidFill>
+                    <a:schemeClr val="bg1">
+                      <a:lumMod val="85000"/>
+                    </a:schemeClr>
+                  </a:solidFill>
+                  <a:latin typeface="Open Sans" panose="020B0606030504020204" pitchFamily="34" charset="0"/>
+                  <a:ea typeface="Open Sans" panose="020B0606030504020204" pitchFamily="34" charset="0"/>
+                  <a:cs typeface="Open Sans" panose="020B0606030504020204" pitchFamily="34" charset="0"/>
+                </a:rPr>
+                <a:t> &lt; 10</a:t>
+              </a:r>
+            </a:p>
+          </p:txBody>
+        </p:sp>
+        <p:sp>
+          <p:nvSpPr>
+            <p:cNvPr id="68" name="Flowchart: Data 67">
+              <a:extLst>
+                <a:ext uri="{FF2B5EF4-FFF2-40B4-BE49-F238E27FC236}">
+                  <a16:creationId xmlns:a16="http://schemas.microsoft.com/office/drawing/2014/main" id="{8D94F3CE-61BC-B2ED-B3E1-C8F7854DA1F1}"/>
+                </a:ext>
+              </a:extLst>
+            </p:cNvPr>
+            <p:cNvSpPr/>
+            <p:nvPr/>
+          </p:nvSpPr>
+          <p:spPr>
+            <a:xfrm>
+              <a:off x="3248522" y="4688917"/>
+              <a:ext cx="1844844" cy="489284"/>
+            </a:xfrm>
+            <a:prstGeom prst="flowChartInputOutput">
+              <a:avLst/>
+            </a:prstGeom>
+            <a:noFill/>
+            <a:ln>
+              <a:solidFill>
+                <a:schemeClr val="accent1">
+                  <a:lumMod val="60000"/>
+                  <a:lumOff val="40000"/>
+                </a:schemeClr>
+              </a:solidFill>
+            </a:ln>
+          </p:spPr>
+          <p:style>
+            <a:lnRef idx="2">
+              <a:schemeClr val="accent1">
+                <a:shade val="50000"/>
+              </a:schemeClr>
+            </a:lnRef>
+            <a:fillRef idx="1">
+              <a:schemeClr val="accent1"/>
+            </a:fillRef>
+            <a:effectRef idx="0">
+              <a:schemeClr val="accent1"/>
+            </a:effectRef>
+            <a:fontRef idx="minor">
+              <a:schemeClr val="lt1"/>
+            </a:fontRef>
+          </p:style>
+          <p:txBody>
+            <a:bodyPr rtlCol="0" anchor="ctr"/>
+            <a:lstStyle/>
+            <a:p>
+              <a:pPr algn="ctr"/>
+              <a:r>
+                <a:rPr lang="en-US" sz="1200" dirty="0">
+                  <a:solidFill>
+                    <a:schemeClr val="bg1">
+                      <a:lumMod val="85000"/>
+                    </a:schemeClr>
+                  </a:solidFill>
+                  <a:latin typeface="Open Sans" panose="020B0606030504020204" pitchFamily="34" charset="0"/>
+                  <a:ea typeface="Open Sans" panose="020B0606030504020204" pitchFamily="34" charset="0"/>
+                  <a:cs typeface="Open Sans" panose="020B0606030504020204" pitchFamily="34" charset="0"/>
+                </a:rPr>
+                <a:t>Read </a:t>
+              </a:r>
+              <a:r>
+                <a:rPr lang="en-US" sz="1200" dirty="0" err="1">
+                  <a:solidFill>
+                    <a:schemeClr val="bg1">
+                      <a:lumMod val="85000"/>
+                    </a:schemeClr>
+                  </a:solidFill>
+                  <a:latin typeface="Open Sans" panose="020B0606030504020204" pitchFamily="34" charset="0"/>
+                  <a:ea typeface="Open Sans" panose="020B0606030504020204" pitchFamily="34" charset="0"/>
+                  <a:cs typeface="Open Sans" panose="020B0606030504020204" pitchFamily="34" charset="0"/>
+                </a:rPr>
+                <a:t>fuelInitial</a:t>
+              </a:r>
+              <a:endParaRPr lang="en-US" sz="1200" dirty="0">
+                <a:solidFill>
+                  <a:schemeClr val="bg1">
+                    <a:lumMod val="85000"/>
+                  </a:schemeClr>
+                </a:solidFill>
+                <a:latin typeface="Open Sans" panose="020B0606030504020204" pitchFamily="34" charset="0"/>
+                <a:ea typeface="Open Sans" panose="020B0606030504020204" pitchFamily="34" charset="0"/>
+                <a:cs typeface="Open Sans" panose="020B0606030504020204" pitchFamily="34" charset="0"/>
+              </a:endParaRPr>
+            </a:p>
+          </p:txBody>
+        </p:sp>
+        <p:sp>
+          <p:nvSpPr>
+            <p:cNvPr id="69" name="Flowchart: Data 68">
+              <a:extLst>
+                <a:ext uri="{FF2B5EF4-FFF2-40B4-BE49-F238E27FC236}">
+                  <a16:creationId xmlns:a16="http://schemas.microsoft.com/office/drawing/2014/main" id="{1134E655-4421-65A0-2CA3-E17474DCE0F3}"/>
+                </a:ext>
+              </a:extLst>
+            </p:cNvPr>
+            <p:cNvSpPr/>
+            <p:nvPr/>
+          </p:nvSpPr>
+          <p:spPr>
+            <a:xfrm>
+              <a:off x="3248522" y="5458939"/>
+              <a:ext cx="1844844" cy="489284"/>
+            </a:xfrm>
+            <a:prstGeom prst="flowChartInputOutput">
+              <a:avLst/>
+            </a:prstGeom>
+            <a:noFill/>
+            <a:ln>
+              <a:solidFill>
+                <a:schemeClr val="accent1">
+                  <a:lumMod val="60000"/>
+                  <a:lumOff val="40000"/>
+                </a:schemeClr>
+              </a:solidFill>
+            </a:ln>
+          </p:spPr>
+          <p:style>
+            <a:lnRef idx="2">
+              <a:schemeClr val="accent1">
+                <a:shade val="50000"/>
+              </a:schemeClr>
+            </a:lnRef>
+            <a:fillRef idx="1">
+              <a:schemeClr val="accent1"/>
+            </a:fillRef>
+            <a:effectRef idx="0">
+              <a:schemeClr val="accent1"/>
+            </a:effectRef>
+            <a:fontRef idx="minor">
+              <a:schemeClr val="lt1"/>
+            </a:fontRef>
+          </p:style>
+          <p:txBody>
+            <a:bodyPr rtlCol="0" anchor="ctr"/>
+            <a:lstStyle/>
+            <a:p>
+              <a:pPr algn="ctr"/>
+              <a:r>
+                <a:rPr lang="en-US" sz="1200" dirty="0">
+                  <a:solidFill>
+                    <a:schemeClr val="bg1">
+                      <a:lumMod val="85000"/>
+                    </a:schemeClr>
+                  </a:solidFill>
+                  <a:latin typeface="Open Sans" panose="020B0606030504020204" pitchFamily="34" charset="0"/>
+                  <a:ea typeface="Open Sans" panose="020B0606030504020204" pitchFamily="34" charset="0"/>
+                  <a:cs typeface="Open Sans" panose="020B0606030504020204" pitchFamily="34" charset="0"/>
+                </a:rPr>
+                <a:t>Read </a:t>
+              </a:r>
+              <a:r>
+                <a:rPr lang="en-US" sz="1200" dirty="0" err="1">
+                  <a:solidFill>
+                    <a:schemeClr val="bg1">
+                      <a:lumMod val="85000"/>
+                    </a:schemeClr>
+                  </a:solidFill>
+                  <a:latin typeface="Open Sans" panose="020B0606030504020204" pitchFamily="34" charset="0"/>
+                  <a:ea typeface="Open Sans" panose="020B0606030504020204" pitchFamily="34" charset="0"/>
+                  <a:cs typeface="Open Sans" panose="020B0606030504020204" pitchFamily="34" charset="0"/>
+                </a:rPr>
+                <a:t>fuelFinal</a:t>
+              </a:r>
+              <a:endParaRPr lang="en-US" sz="1200" dirty="0">
+                <a:solidFill>
+                  <a:schemeClr val="bg1">
+                    <a:lumMod val="85000"/>
+                  </a:schemeClr>
+                </a:solidFill>
+                <a:latin typeface="Open Sans" panose="020B0606030504020204" pitchFamily="34" charset="0"/>
+                <a:ea typeface="Open Sans" panose="020B0606030504020204" pitchFamily="34" charset="0"/>
+                <a:cs typeface="Open Sans" panose="020B0606030504020204" pitchFamily="34" charset="0"/>
+              </a:endParaRPr>
+            </a:p>
+          </p:txBody>
+        </p:sp>
+        <p:sp>
+          <p:nvSpPr>
+            <p:cNvPr id="70" name="Rectangle 69">
+              <a:extLst>
+                <a:ext uri="{FF2B5EF4-FFF2-40B4-BE49-F238E27FC236}">
+                  <a16:creationId xmlns:a16="http://schemas.microsoft.com/office/drawing/2014/main" id="{1BD90794-F495-9B3E-8618-DFB9D37BB267}"/>
+                </a:ext>
+              </a:extLst>
+            </p:cNvPr>
+            <p:cNvSpPr/>
+            <p:nvPr/>
+          </p:nvSpPr>
+          <p:spPr>
+            <a:xfrm>
+              <a:off x="5735048" y="3890518"/>
+              <a:ext cx="1844844" cy="548640"/>
+            </a:xfrm>
+            <a:prstGeom prst="rect">
+              <a:avLst/>
+            </a:prstGeom>
+            <a:noFill/>
+            <a:ln>
+              <a:solidFill>
+                <a:schemeClr val="accent6">
+                  <a:lumMod val="60000"/>
+                  <a:lumOff val="40000"/>
+                </a:schemeClr>
+              </a:solidFill>
+            </a:ln>
+          </p:spPr>
+          <p:style>
+            <a:lnRef idx="2">
+              <a:schemeClr val="accent1">
+                <a:shade val="50000"/>
+              </a:schemeClr>
+            </a:lnRef>
+            <a:fillRef idx="1">
+              <a:schemeClr val="accent1"/>
+            </a:fillRef>
+            <a:effectRef idx="0">
+              <a:schemeClr val="accent1"/>
+            </a:effectRef>
+            <a:fontRef idx="minor">
+              <a:schemeClr val="lt1"/>
+            </a:fontRef>
+          </p:style>
+          <p:txBody>
+            <a:bodyPr rtlCol="0" anchor="ctr"/>
+            <a:lstStyle/>
+            <a:p>
+              <a:pPr algn="ctr"/>
+              <a:r>
+                <a:rPr lang="en-US" sz="1200" dirty="0" err="1">
+                  <a:solidFill>
+                    <a:schemeClr val="bg1">
+                      <a:lumMod val="85000"/>
+                    </a:schemeClr>
+                  </a:solidFill>
+                  <a:latin typeface="Open Sans" panose="020B0606030504020204" pitchFamily="34" charset="0"/>
+                  <a:ea typeface="Open Sans" panose="020B0606030504020204" pitchFamily="34" charset="0"/>
+                  <a:cs typeface="Open Sans" panose="020B0606030504020204" pitchFamily="34" charset="0"/>
+                </a:rPr>
+                <a:t>fuelConsumed</a:t>
+              </a:r>
+              <a:r>
+                <a:rPr lang="en-US" sz="1200" dirty="0">
+                  <a:solidFill>
+                    <a:schemeClr val="bg1">
+                      <a:lumMod val="85000"/>
+                    </a:schemeClr>
+                  </a:solidFill>
+                  <a:latin typeface="Open Sans" panose="020B0606030504020204" pitchFamily="34" charset="0"/>
+                  <a:ea typeface="Open Sans" panose="020B0606030504020204" pitchFamily="34" charset="0"/>
+                  <a:cs typeface="Open Sans" panose="020B0606030504020204" pitchFamily="34" charset="0"/>
+                </a:rPr>
+                <a:t> = </a:t>
+              </a:r>
+              <a:r>
+                <a:rPr lang="en-US" sz="1200" dirty="0" err="1">
+                  <a:solidFill>
+                    <a:schemeClr val="bg1">
+                      <a:lumMod val="85000"/>
+                    </a:schemeClr>
+                  </a:solidFill>
+                  <a:latin typeface="Open Sans" panose="020B0606030504020204" pitchFamily="34" charset="0"/>
+                  <a:ea typeface="Open Sans" panose="020B0606030504020204" pitchFamily="34" charset="0"/>
+                  <a:cs typeface="Open Sans" panose="020B0606030504020204" pitchFamily="34" charset="0"/>
+                </a:rPr>
+                <a:t>fuelInitial</a:t>
+              </a:r>
+              <a:r>
+                <a:rPr lang="en-US" sz="1200" dirty="0">
+                  <a:solidFill>
+                    <a:schemeClr val="bg1">
+                      <a:lumMod val="85000"/>
+                    </a:schemeClr>
+                  </a:solidFill>
+                  <a:latin typeface="Open Sans" panose="020B0606030504020204" pitchFamily="34" charset="0"/>
+                  <a:ea typeface="Open Sans" panose="020B0606030504020204" pitchFamily="34" charset="0"/>
+                  <a:cs typeface="Open Sans" panose="020B0606030504020204" pitchFamily="34" charset="0"/>
+                </a:rPr>
+                <a:t> – </a:t>
+              </a:r>
+              <a:r>
+                <a:rPr lang="en-US" sz="1200" dirty="0" err="1">
+                  <a:solidFill>
+                    <a:schemeClr val="bg1">
+                      <a:lumMod val="85000"/>
+                    </a:schemeClr>
+                  </a:solidFill>
+                  <a:latin typeface="Open Sans" panose="020B0606030504020204" pitchFamily="34" charset="0"/>
+                  <a:ea typeface="Open Sans" panose="020B0606030504020204" pitchFamily="34" charset="0"/>
+                  <a:cs typeface="Open Sans" panose="020B0606030504020204" pitchFamily="34" charset="0"/>
+                </a:rPr>
+                <a:t>fuelFinal</a:t>
+              </a:r>
+              <a:endParaRPr lang="en-US" sz="1200" dirty="0">
+                <a:solidFill>
+                  <a:schemeClr val="bg1">
+                    <a:lumMod val="85000"/>
+                  </a:schemeClr>
+                </a:solidFill>
+                <a:latin typeface="Open Sans" panose="020B0606030504020204" pitchFamily="34" charset="0"/>
+                <a:ea typeface="Open Sans" panose="020B0606030504020204" pitchFamily="34" charset="0"/>
+                <a:cs typeface="Open Sans" panose="020B0606030504020204" pitchFamily="34" charset="0"/>
+              </a:endParaRPr>
+            </a:p>
+          </p:txBody>
+        </p:sp>
+        <p:sp>
+          <p:nvSpPr>
+            <p:cNvPr id="71" name="Rectangle 70">
+              <a:extLst>
+                <a:ext uri="{FF2B5EF4-FFF2-40B4-BE49-F238E27FC236}">
+                  <a16:creationId xmlns:a16="http://schemas.microsoft.com/office/drawing/2014/main" id="{D707F6F0-3861-EB68-3D7E-3BEA90C85526}"/>
+                </a:ext>
+              </a:extLst>
+            </p:cNvPr>
+            <p:cNvSpPr/>
+            <p:nvPr/>
+          </p:nvSpPr>
+          <p:spPr>
+            <a:xfrm>
+              <a:off x="5735048" y="5429261"/>
+              <a:ext cx="1844844" cy="548640"/>
+            </a:xfrm>
+            <a:prstGeom prst="rect">
+              <a:avLst/>
+            </a:prstGeom>
+            <a:noFill/>
+            <a:ln>
+              <a:solidFill>
+                <a:schemeClr val="accent6">
+                  <a:lumMod val="60000"/>
+                  <a:lumOff val="40000"/>
+                </a:schemeClr>
+              </a:solidFill>
+            </a:ln>
+          </p:spPr>
+          <p:style>
+            <a:lnRef idx="2">
+              <a:schemeClr val="accent1">
+                <a:shade val="50000"/>
+              </a:schemeClr>
+            </a:lnRef>
+            <a:fillRef idx="1">
+              <a:schemeClr val="accent1"/>
+            </a:fillRef>
+            <a:effectRef idx="0">
+              <a:schemeClr val="accent1"/>
+            </a:effectRef>
+            <a:fontRef idx="minor">
+              <a:schemeClr val="lt1"/>
+            </a:fontRef>
+          </p:style>
+          <p:txBody>
+            <a:bodyPr rtlCol="0" anchor="ctr"/>
+            <a:lstStyle/>
+            <a:p>
+              <a:pPr algn="ctr"/>
+              <a:r>
+                <a:rPr lang="en-US" sz="1200" dirty="0" err="1">
+                  <a:solidFill>
+                    <a:schemeClr val="bg1">
+                      <a:lumMod val="85000"/>
+                    </a:schemeClr>
+                  </a:solidFill>
+                  <a:latin typeface="Open Sans" panose="020B0606030504020204" pitchFamily="34" charset="0"/>
+                  <a:ea typeface="Open Sans" panose="020B0606030504020204" pitchFamily="34" charset="0"/>
+                  <a:cs typeface="Open Sans" panose="020B0606030504020204" pitchFamily="34" charset="0"/>
+                </a:rPr>
+                <a:t>fuelTotal</a:t>
+              </a:r>
+              <a:r>
+                <a:rPr lang="en-US" sz="1200" dirty="0">
+                  <a:solidFill>
+                    <a:schemeClr val="bg1">
+                      <a:lumMod val="85000"/>
+                    </a:schemeClr>
+                  </a:solidFill>
+                  <a:latin typeface="Open Sans" panose="020B0606030504020204" pitchFamily="34" charset="0"/>
+                  <a:ea typeface="Open Sans" panose="020B0606030504020204" pitchFamily="34" charset="0"/>
+                  <a:cs typeface="Open Sans" panose="020B0606030504020204" pitchFamily="34" charset="0"/>
+                </a:rPr>
+                <a:t> = </a:t>
+              </a:r>
+              <a:r>
+                <a:rPr lang="en-US" sz="1200" dirty="0" err="1">
+                  <a:solidFill>
+                    <a:schemeClr val="bg1">
+                      <a:lumMod val="85000"/>
+                    </a:schemeClr>
+                  </a:solidFill>
+                  <a:latin typeface="Open Sans" panose="020B0606030504020204" pitchFamily="34" charset="0"/>
+                  <a:ea typeface="Open Sans" panose="020B0606030504020204" pitchFamily="34" charset="0"/>
+                  <a:cs typeface="Open Sans" panose="020B0606030504020204" pitchFamily="34" charset="0"/>
+                </a:rPr>
+                <a:t>fuelTotal</a:t>
+              </a:r>
+              <a:r>
+                <a:rPr lang="en-US" sz="1200" dirty="0">
+                  <a:solidFill>
+                    <a:schemeClr val="bg1">
+                      <a:lumMod val="85000"/>
+                    </a:schemeClr>
+                  </a:solidFill>
+                  <a:latin typeface="Open Sans" panose="020B0606030504020204" pitchFamily="34" charset="0"/>
+                  <a:ea typeface="Open Sans" panose="020B0606030504020204" pitchFamily="34" charset="0"/>
+                  <a:cs typeface="Open Sans" panose="020B0606030504020204" pitchFamily="34" charset="0"/>
+                </a:rPr>
+                <a:t> + </a:t>
+              </a:r>
+              <a:r>
+                <a:rPr lang="en-US" sz="1200" dirty="0" err="1">
+                  <a:solidFill>
+                    <a:schemeClr val="bg1">
+                      <a:lumMod val="85000"/>
+                    </a:schemeClr>
+                  </a:solidFill>
+                  <a:latin typeface="Open Sans" panose="020B0606030504020204" pitchFamily="34" charset="0"/>
+                  <a:ea typeface="Open Sans" panose="020B0606030504020204" pitchFamily="34" charset="0"/>
+                  <a:cs typeface="Open Sans" panose="020B0606030504020204" pitchFamily="34" charset="0"/>
+                </a:rPr>
+                <a:t>fuelConsumed</a:t>
+              </a:r>
+              <a:endParaRPr lang="en-US" sz="1200" dirty="0">
+                <a:solidFill>
+                  <a:schemeClr val="bg1">
+                    <a:lumMod val="85000"/>
+                  </a:schemeClr>
+                </a:solidFill>
+                <a:latin typeface="Open Sans" panose="020B0606030504020204" pitchFamily="34" charset="0"/>
+                <a:ea typeface="Open Sans" panose="020B0606030504020204" pitchFamily="34" charset="0"/>
+                <a:cs typeface="Open Sans" panose="020B0606030504020204" pitchFamily="34" charset="0"/>
+              </a:endParaRPr>
+            </a:p>
+          </p:txBody>
+        </p:sp>
+        <p:sp>
+          <p:nvSpPr>
+            <p:cNvPr id="72" name="Rectangle 71">
+              <a:extLst>
+                <a:ext uri="{FF2B5EF4-FFF2-40B4-BE49-F238E27FC236}">
+                  <a16:creationId xmlns:a16="http://schemas.microsoft.com/office/drawing/2014/main" id="{EADD0A65-3445-0CCB-60E5-BDAA87CF7072}"/>
+                </a:ext>
+              </a:extLst>
+            </p:cNvPr>
+            <p:cNvSpPr/>
+            <p:nvPr/>
+          </p:nvSpPr>
+          <p:spPr>
+            <a:xfrm>
+              <a:off x="2961773" y="2019089"/>
+              <a:ext cx="1844844" cy="393032"/>
+            </a:xfrm>
+            <a:prstGeom prst="rect">
+              <a:avLst/>
+            </a:prstGeom>
+            <a:noFill/>
+            <a:ln>
+              <a:solidFill>
+                <a:schemeClr val="accent6">
+                  <a:lumMod val="60000"/>
+                  <a:lumOff val="40000"/>
+                </a:schemeClr>
+              </a:solidFill>
+            </a:ln>
+          </p:spPr>
+          <p:style>
+            <a:lnRef idx="2">
+              <a:schemeClr val="accent1">
+                <a:shade val="50000"/>
+              </a:schemeClr>
+            </a:lnRef>
+            <a:fillRef idx="1">
+              <a:schemeClr val="accent1"/>
+            </a:fillRef>
+            <a:effectRef idx="0">
+              <a:schemeClr val="accent1"/>
+            </a:effectRef>
+            <a:fontRef idx="minor">
+              <a:schemeClr val="lt1"/>
+            </a:fontRef>
+          </p:style>
+          <p:txBody>
+            <a:bodyPr rtlCol="0" anchor="ctr"/>
+            <a:lstStyle/>
+            <a:p>
+              <a:pPr algn="ctr"/>
+              <a:r>
+                <a:rPr lang="en-US" sz="1200" dirty="0" err="1">
+                  <a:solidFill>
+                    <a:schemeClr val="bg1">
+                      <a:lumMod val="85000"/>
+                    </a:schemeClr>
+                  </a:solidFill>
+                  <a:latin typeface="Open Sans" panose="020B0606030504020204" pitchFamily="34" charset="0"/>
+                  <a:ea typeface="Open Sans" panose="020B0606030504020204" pitchFamily="34" charset="0"/>
+                  <a:cs typeface="Open Sans" panose="020B0606030504020204" pitchFamily="34" charset="0"/>
+                </a:rPr>
+                <a:t>fuelTotal</a:t>
+              </a:r>
+              <a:r>
+                <a:rPr lang="en-US" sz="1200" dirty="0">
+                  <a:solidFill>
+                    <a:schemeClr val="bg1">
+                      <a:lumMod val="85000"/>
+                    </a:schemeClr>
+                  </a:solidFill>
+                  <a:latin typeface="Open Sans" panose="020B0606030504020204" pitchFamily="34" charset="0"/>
+                  <a:ea typeface="Open Sans" panose="020B0606030504020204" pitchFamily="34" charset="0"/>
+                  <a:cs typeface="Open Sans" panose="020B0606030504020204" pitchFamily="34" charset="0"/>
+                </a:rPr>
+                <a:t> = 0</a:t>
+              </a:r>
+            </a:p>
+          </p:txBody>
+        </p:sp>
+        <p:sp>
+          <p:nvSpPr>
+            <p:cNvPr id="74" name="Rectangle 73">
+              <a:extLst>
+                <a:ext uri="{FF2B5EF4-FFF2-40B4-BE49-F238E27FC236}">
+                  <a16:creationId xmlns:a16="http://schemas.microsoft.com/office/drawing/2014/main" id="{4A81F4A5-42EF-B37D-C025-6FA0E47C555A}"/>
+                </a:ext>
+              </a:extLst>
+            </p:cNvPr>
+            <p:cNvSpPr/>
+            <p:nvPr/>
+          </p:nvSpPr>
+          <p:spPr>
+            <a:xfrm>
+              <a:off x="7385382" y="2893197"/>
+              <a:ext cx="1844844" cy="548640"/>
+            </a:xfrm>
+            <a:prstGeom prst="rect">
+              <a:avLst/>
+            </a:prstGeom>
+            <a:noFill/>
+            <a:ln>
+              <a:solidFill>
+                <a:schemeClr val="accent6">
+                  <a:lumMod val="60000"/>
+                  <a:lumOff val="40000"/>
+                </a:schemeClr>
+              </a:solidFill>
+            </a:ln>
+          </p:spPr>
+          <p:style>
+            <a:lnRef idx="2">
+              <a:schemeClr val="accent1">
+                <a:shade val="50000"/>
+              </a:schemeClr>
+            </a:lnRef>
+            <a:fillRef idx="1">
+              <a:schemeClr val="accent1"/>
+            </a:fillRef>
+            <a:effectRef idx="0">
+              <a:schemeClr val="accent1"/>
+            </a:effectRef>
+            <a:fontRef idx="minor">
+              <a:schemeClr val="lt1"/>
+            </a:fontRef>
+          </p:style>
+          <p:txBody>
+            <a:bodyPr rtlCol="0" anchor="ctr"/>
+            <a:lstStyle/>
+            <a:p>
+              <a:pPr algn="ctr"/>
+              <a:r>
+                <a:rPr lang="en-US" sz="1200" dirty="0" err="1">
+                  <a:solidFill>
+                    <a:schemeClr val="bg1">
+                      <a:lumMod val="85000"/>
+                    </a:schemeClr>
+                  </a:solidFill>
+                  <a:latin typeface="Open Sans" panose="020B0606030504020204" pitchFamily="34" charset="0"/>
+                  <a:ea typeface="Open Sans" panose="020B0606030504020204" pitchFamily="34" charset="0"/>
+                  <a:cs typeface="Open Sans" panose="020B0606030504020204" pitchFamily="34" charset="0"/>
+                </a:rPr>
+                <a:t>fuelAverage</a:t>
+              </a:r>
+              <a:r>
+                <a:rPr lang="en-US" sz="1200" dirty="0">
+                  <a:solidFill>
+                    <a:schemeClr val="bg1">
+                      <a:lumMod val="85000"/>
+                    </a:schemeClr>
+                  </a:solidFill>
+                  <a:latin typeface="Open Sans" panose="020B0606030504020204" pitchFamily="34" charset="0"/>
+                  <a:ea typeface="Open Sans" panose="020B0606030504020204" pitchFamily="34" charset="0"/>
+                  <a:cs typeface="Open Sans" panose="020B0606030504020204" pitchFamily="34" charset="0"/>
+                </a:rPr>
+                <a:t> </a:t>
+              </a:r>
+            </a:p>
+            <a:p>
+              <a:pPr algn="ctr"/>
+              <a:r>
+                <a:rPr lang="en-US" sz="1200" dirty="0">
+                  <a:solidFill>
+                    <a:schemeClr val="bg1">
+                      <a:lumMod val="85000"/>
+                    </a:schemeClr>
+                  </a:solidFill>
+                  <a:latin typeface="Open Sans" panose="020B0606030504020204" pitchFamily="34" charset="0"/>
+                  <a:ea typeface="Open Sans" panose="020B0606030504020204" pitchFamily="34" charset="0"/>
+                  <a:cs typeface="Open Sans" panose="020B0606030504020204" pitchFamily="34" charset="0"/>
+                </a:rPr>
+                <a:t>= </a:t>
+              </a:r>
+              <a:r>
+                <a:rPr lang="en-US" sz="1200" dirty="0" err="1">
+                  <a:solidFill>
+                    <a:schemeClr val="bg1">
+                      <a:lumMod val="85000"/>
+                    </a:schemeClr>
+                  </a:solidFill>
+                  <a:latin typeface="Open Sans" panose="020B0606030504020204" pitchFamily="34" charset="0"/>
+                  <a:ea typeface="Open Sans" panose="020B0606030504020204" pitchFamily="34" charset="0"/>
+                  <a:cs typeface="Open Sans" panose="020B0606030504020204" pitchFamily="34" charset="0"/>
+                </a:rPr>
+                <a:t>fuelTotal</a:t>
+              </a:r>
+              <a:r>
+                <a:rPr lang="en-US" sz="1200" dirty="0">
+                  <a:solidFill>
+                    <a:schemeClr val="bg1">
+                      <a:lumMod val="85000"/>
+                    </a:schemeClr>
+                  </a:solidFill>
+                  <a:latin typeface="Open Sans" panose="020B0606030504020204" pitchFamily="34" charset="0"/>
+                  <a:ea typeface="Open Sans" panose="020B0606030504020204" pitchFamily="34" charset="0"/>
+                  <a:cs typeface="Open Sans" panose="020B0606030504020204" pitchFamily="34" charset="0"/>
+                </a:rPr>
+                <a:t> / 10</a:t>
+              </a:r>
+            </a:p>
+          </p:txBody>
+        </p:sp>
+        <p:sp>
+          <p:nvSpPr>
+            <p:cNvPr id="75" name="Flowchart: Data 74">
+              <a:extLst>
+                <a:ext uri="{FF2B5EF4-FFF2-40B4-BE49-F238E27FC236}">
+                  <a16:creationId xmlns:a16="http://schemas.microsoft.com/office/drawing/2014/main" id="{684F63EE-4E36-A045-0D95-769D7FC961BB}"/>
+                </a:ext>
+              </a:extLst>
+            </p:cNvPr>
+            <p:cNvSpPr/>
+            <p:nvPr/>
+          </p:nvSpPr>
+          <p:spPr>
+            <a:xfrm>
+              <a:off x="7385383" y="1345321"/>
+              <a:ext cx="1844844" cy="489284"/>
+            </a:xfrm>
+            <a:prstGeom prst="flowChartInputOutput">
+              <a:avLst/>
+            </a:prstGeom>
+            <a:noFill/>
+            <a:ln>
+              <a:solidFill>
+                <a:srgbClr val="CC99FF"/>
+              </a:solidFill>
+            </a:ln>
+          </p:spPr>
+          <p:style>
+            <a:lnRef idx="2">
+              <a:schemeClr val="accent1">
+                <a:shade val="50000"/>
+              </a:schemeClr>
+            </a:lnRef>
+            <a:fillRef idx="1">
+              <a:schemeClr val="accent1"/>
+            </a:fillRef>
+            <a:effectRef idx="0">
+              <a:schemeClr val="accent1"/>
+            </a:effectRef>
+            <a:fontRef idx="minor">
+              <a:schemeClr val="lt1"/>
+            </a:fontRef>
+          </p:style>
+          <p:txBody>
+            <a:bodyPr rtlCol="0" anchor="ctr"/>
+            <a:lstStyle/>
+            <a:p>
+              <a:pPr algn="ctr"/>
+              <a:r>
+                <a:rPr lang="en-US" sz="1200" dirty="0">
+                  <a:solidFill>
+                    <a:schemeClr val="bg1">
+                      <a:lumMod val="85000"/>
+                    </a:schemeClr>
+                  </a:solidFill>
+                  <a:latin typeface="Open Sans" panose="020B0606030504020204" pitchFamily="34" charset="0"/>
+                  <a:ea typeface="Open Sans" panose="020B0606030504020204" pitchFamily="34" charset="0"/>
+                  <a:cs typeface="Open Sans" panose="020B0606030504020204" pitchFamily="34" charset="0"/>
+                </a:rPr>
+                <a:t>Print </a:t>
+              </a:r>
+              <a:r>
+                <a:rPr lang="en-US" sz="1200" dirty="0" err="1">
+                  <a:solidFill>
+                    <a:schemeClr val="bg1">
+                      <a:lumMod val="85000"/>
+                    </a:schemeClr>
+                  </a:solidFill>
+                  <a:latin typeface="Open Sans" panose="020B0606030504020204" pitchFamily="34" charset="0"/>
+                  <a:ea typeface="Open Sans" panose="020B0606030504020204" pitchFamily="34" charset="0"/>
+                  <a:cs typeface="Open Sans" panose="020B0606030504020204" pitchFamily="34" charset="0"/>
+                </a:rPr>
+                <a:t>fuelAverage</a:t>
+              </a:r>
+              <a:endParaRPr lang="en-US" sz="1200" dirty="0">
+                <a:solidFill>
+                  <a:schemeClr val="bg1">
+                    <a:lumMod val="85000"/>
+                  </a:schemeClr>
+                </a:solidFill>
+                <a:latin typeface="Open Sans" panose="020B0606030504020204" pitchFamily="34" charset="0"/>
+                <a:ea typeface="Open Sans" panose="020B0606030504020204" pitchFamily="34" charset="0"/>
+                <a:cs typeface="Open Sans" panose="020B0606030504020204" pitchFamily="34" charset="0"/>
+              </a:endParaRPr>
+            </a:p>
+          </p:txBody>
+        </p:sp>
+        <p:cxnSp>
+          <p:nvCxnSpPr>
+            <p:cNvPr id="77" name="Straight Arrow Connector 76">
+              <a:extLst>
+                <a:ext uri="{FF2B5EF4-FFF2-40B4-BE49-F238E27FC236}">
+                  <a16:creationId xmlns:a16="http://schemas.microsoft.com/office/drawing/2014/main" id="{1D493174-AF50-AD3E-7D89-DFF87E1527B6}"/>
+                </a:ext>
+              </a:extLst>
+            </p:cNvPr>
+            <p:cNvCxnSpPr>
+              <a:stCxn id="67" idx="3"/>
+              <a:endCxn id="74" idx="1"/>
+            </p:cNvCxnSpPr>
+            <p:nvPr/>
+          </p:nvCxnSpPr>
+          <p:spPr>
+            <a:xfrm>
+              <a:off x="5093366" y="3167517"/>
+              <a:ext cx="2292016" cy="0"/>
+            </a:xfrm>
+            <a:prstGeom prst="straightConnector1">
+              <a:avLst/>
+            </a:prstGeom>
+            <a:ln w="12700">
+              <a:solidFill>
+                <a:srgbClr val="FF7C80"/>
+              </a:solidFill>
+              <a:tailEnd type="triangle"/>
+            </a:ln>
+          </p:spPr>
+          <p:style>
+            <a:lnRef idx="1">
+              <a:schemeClr val="accent1"/>
+            </a:lnRef>
+            <a:fillRef idx="0">
+              <a:schemeClr val="accent1"/>
+            </a:fillRef>
+            <a:effectRef idx="0">
+              <a:schemeClr val="accent1"/>
+            </a:effectRef>
+            <a:fontRef idx="minor">
+              <a:schemeClr val="tx1"/>
+            </a:fontRef>
+          </p:style>
+        </p:cxnSp>
+        <p:cxnSp>
+          <p:nvCxnSpPr>
+            <p:cNvPr id="79" name="Straight Arrow Connector 78">
+              <a:extLst>
+                <a:ext uri="{FF2B5EF4-FFF2-40B4-BE49-F238E27FC236}">
+                  <a16:creationId xmlns:a16="http://schemas.microsoft.com/office/drawing/2014/main" id="{A47C1441-3809-A476-5D5E-6ACC8E21A66F}"/>
+                </a:ext>
+              </a:extLst>
+            </p:cNvPr>
+            <p:cNvCxnSpPr>
+              <a:stCxn id="67" idx="2"/>
+              <a:endCxn id="66" idx="1"/>
+            </p:cNvCxnSpPr>
+            <p:nvPr/>
+          </p:nvCxnSpPr>
+          <p:spPr>
+            <a:xfrm>
+              <a:off x="4170944" y="3640759"/>
+              <a:ext cx="0" cy="279437"/>
+            </a:xfrm>
+            <a:prstGeom prst="straightConnector1">
+              <a:avLst/>
+            </a:prstGeom>
+            <a:ln w="12700">
+              <a:solidFill>
+                <a:srgbClr val="FF7C80"/>
+              </a:solidFill>
+              <a:tailEnd type="triangle"/>
+            </a:ln>
+          </p:spPr>
+          <p:style>
+            <a:lnRef idx="1">
+              <a:schemeClr val="accent1"/>
+            </a:lnRef>
+            <a:fillRef idx="0">
+              <a:schemeClr val="accent1"/>
+            </a:fillRef>
+            <a:effectRef idx="0">
+              <a:schemeClr val="accent1"/>
+            </a:effectRef>
+            <a:fontRef idx="minor">
+              <a:schemeClr val="tx1"/>
+            </a:fontRef>
+          </p:style>
+        </p:cxnSp>
+        <p:cxnSp>
+          <p:nvCxnSpPr>
+            <p:cNvPr id="81" name="Straight Arrow Connector 80">
+              <a:extLst>
+                <a:ext uri="{FF2B5EF4-FFF2-40B4-BE49-F238E27FC236}">
+                  <a16:creationId xmlns:a16="http://schemas.microsoft.com/office/drawing/2014/main" id="{690EC676-D84B-AFD1-3E14-DA417ADD77B7}"/>
+                </a:ext>
+              </a:extLst>
+            </p:cNvPr>
+            <p:cNvCxnSpPr>
+              <a:stCxn id="66" idx="4"/>
+              <a:endCxn id="68" idx="1"/>
+            </p:cNvCxnSpPr>
+            <p:nvPr/>
+          </p:nvCxnSpPr>
+          <p:spPr>
+            <a:xfrm>
+              <a:off x="4170944" y="4409480"/>
+              <a:ext cx="0" cy="279437"/>
+            </a:xfrm>
+            <a:prstGeom prst="straightConnector1">
+              <a:avLst/>
+            </a:prstGeom>
+            <a:ln w="12700">
+              <a:solidFill>
+                <a:schemeClr val="accent1">
+                  <a:lumMod val="60000"/>
+                  <a:lumOff val="40000"/>
+                </a:schemeClr>
+              </a:solidFill>
+              <a:tailEnd type="triangle"/>
+            </a:ln>
+          </p:spPr>
+          <p:style>
+            <a:lnRef idx="1">
+              <a:schemeClr val="accent1"/>
+            </a:lnRef>
+            <a:fillRef idx="0">
+              <a:schemeClr val="accent1"/>
+            </a:fillRef>
+            <a:effectRef idx="0">
+              <a:schemeClr val="accent1"/>
+            </a:effectRef>
+            <a:fontRef idx="minor">
+              <a:schemeClr val="tx1"/>
+            </a:fontRef>
+          </p:style>
+        </p:cxnSp>
+        <p:cxnSp>
+          <p:nvCxnSpPr>
+            <p:cNvPr id="83" name="Straight Arrow Connector 82">
+              <a:extLst>
+                <a:ext uri="{FF2B5EF4-FFF2-40B4-BE49-F238E27FC236}">
+                  <a16:creationId xmlns:a16="http://schemas.microsoft.com/office/drawing/2014/main" id="{18A5F89D-42FE-4B51-2643-BDF6DF6B8D53}"/>
+                </a:ext>
+              </a:extLst>
+            </p:cNvPr>
+            <p:cNvCxnSpPr>
+              <a:stCxn id="68" idx="4"/>
+              <a:endCxn id="69" idx="1"/>
+            </p:cNvCxnSpPr>
+            <p:nvPr/>
+          </p:nvCxnSpPr>
+          <p:spPr>
+            <a:xfrm>
+              <a:off x="4170944" y="5178201"/>
+              <a:ext cx="0" cy="280738"/>
+            </a:xfrm>
+            <a:prstGeom prst="straightConnector1">
+              <a:avLst/>
+            </a:prstGeom>
+            <a:ln w="12700">
+              <a:solidFill>
+                <a:schemeClr val="accent1">
+                  <a:lumMod val="60000"/>
+                  <a:lumOff val="40000"/>
+                </a:schemeClr>
+              </a:solidFill>
+              <a:tailEnd type="triangle"/>
+            </a:ln>
+          </p:spPr>
+          <p:style>
+            <a:lnRef idx="1">
+              <a:schemeClr val="accent1"/>
+            </a:lnRef>
+            <a:fillRef idx="0">
+              <a:schemeClr val="accent1"/>
+            </a:fillRef>
+            <a:effectRef idx="0">
+              <a:schemeClr val="accent1"/>
+            </a:effectRef>
+            <a:fontRef idx="minor">
+              <a:schemeClr val="tx1"/>
+            </a:fontRef>
+          </p:style>
+        </p:cxnSp>
+        <p:cxnSp>
+          <p:nvCxnSpPr>
+            <p:cNvPr id="85" name="Connector: Elbow 84">
+              <a:extLst>
+                <a:ext uri="{FF2B5EF4-FFF2-40B4-BE49-F238E27FC236}">
+                  <a16:creationId xmlns:a16="http://schemas.microsoft.com/office/drawing/2014/main" id="{917AD0E8-A145-131B-A3E8-1CE3025C4A7D}"/>
+                </a:ext>
+              </a:extLst>
+            </p:cNvPr>
+            <p:cNvCxnSpPr>
+              <a:cxnSpLocks/>
+              <a:stCxn id="69" idx="4"/>
+              <a:endCxn id="70" idx="0"/>
+            </p:cNvCxnSpPr>
+            <p:nvPr/>
+          </p:nvCxnSpPr>
+          <p:spPr>
+            <a:xfrm rot="5400000" flipH="1" flipV="1">
+              <a:off x="4385354" y="3676108"/>
+              <a:ext cx="2057705" cy="2486526"/>
+            </a:xfrm>
+            <a:prstGeom prst="bentConnector5">
+              <a:avLst>
+                <a:gd name="adj1" fmla="val -11109"/>
+                <a:gd name="adj2" fmla="val 48710"/>
+                <a:gd name="adj3" fmla="val 111109"/>
+              </a:avLst>
+            </a:prstGeom>
+            <a:ln w="12700">
+              <a:solidFill>
+                <a:schemeClr val="accent1">
+                  <a:lumMod val="60000"/>
+                  <a:lumOff val="40000"/>
+                </a:schemeClr>
+              </a:solidFill>
+              <a:tailEnd type="triangle"/>
+            </a:ln>
+          </p:spPr>
+          <p:style>
+            <a:lnRef idx="1">
+              <a:schemeClr val="accent1"/>
+            </a:lnRef>
+            <a:fillRef idx="0">
+              <a:schemeClr val="accent1"/>
+            </a:fillRef>
+            <a:effectRef idx="0">
+              <a:schemeClr val="accent1"/>
+            </a:effectRef>
+            <a:fontRef idx="minor">
+              <a:schemeClr val="tx1"/>
+            </a:fontRef>
+          </p:style>
+        </p:cxnSp>
+        <p:cxnSp>
+          <p:nvCxnSpPr>
+            <p:cNvPr id="92" name="Straight Arrow Connector 91">
+              <a:extLst>
+                <a:ext uri="{FF2B5EF4-FFF2-40B4-BE49-F238E27FC236}">
+                  <a16:creationId xmlns:a16="http://schemas.microsoft.com/office/drawing/2014/main" id="{66ADBACC-8219-8E29-97BA-22333E6B86FD}"/>
+                </a:ext>
+              </a:extLst>
+            </p:cNvPr>
+            <p:cNvCxnSpPr>
+              <a:cxnSpLocks/>
+              <a:stCxn id="70" idx="2"/>
+              <a:endCxn id="71" idx="0"/>
+            </p:cNvCxnSpPr>
+            <p:nvPr/>
+          </p:nvCxnSpPr>
+          <p:spPr>
+            <a:xfrm>
+              <a:off x="6657470" y="4439158"/>
+              <a:ext cx="0" cy="990103"/>
+            </a:xfrm>
+            <a:prstGeom prst="straightConnector1">
+              <a:avLst/>
+            </a:prstGeom>
+            <a:ln w="12700">
+              <a:solidFill>
+                <a:schemeClr val="bg1">
+                  <a:lumMod val="75000"/>
+                </a:schemeClr>
+              </a:solidFill>
+              <a:tailEnd type="triangle"/>
+            </a:ln>
+          </p:spPr>
+          <p:style>
+            <a:lnRef idx="1">
+              <a:schemeClr val="accent1"/>
+            </a:lnRef>
+            <a:fillRef idx="0">
+              <a:schemeClr val="accent1"/>
+            </a:fillRef>
+            <a:effectRef idx="0">
+              <a:schemeClr val="accent1"/>
+            </a:effectRef>
+            <a:fontRef idx="minor">
+              <a:schemeClr val="tx1"/>
+            </a:fontRef>
+          </p:style>
+        </p:cxnSp>
+        <p:cxnSp>
+          <p:nvCxnSpPr>
+            <p:cNvPr id="96" name="Connector: Elbow 95">
+              <a:extLst>
+                <a:ext uri="{FF2B5EF4-FFF2-40B4-BE49-F238E27FC236}">
+                  <a16:creationId xmlns:a16="http://schemas.microsoft.com/office/drawing/2014/main" id="{FF52E375-0C08-2700-4E04-6BD7DA2A4E38}"/>
+                </a:ext>
+              </a:extLst>
+            </p:cNvPr>
+            <p:cNvCxnSpPr>
+              <a:stCxn id="71" idx="2"/>
+              <a:endCxn id="67" idx="1"/>
+            </p:cNvCxnSpPr>
+            <p:nvPr/>
+          </p:nvCxnSpPr>
+          <p:spPr>
+            <a:xfrm rot="5400000" flipH="1">
+              <a:off x="3547804" y="2868235"/>
+              <a:ext cx="2810384" cy="3408948"/>
+            </a:xfrm>
+            <a:prstGeom prst="bentConnector4">
+              <a:avLst>
+                <a:gd name="adj1" fmla="val -13557"/>
+                <a:gd name="adj2" fmla="val 108353"/>
+              </a:avLst>
+            </a:prstGeom>
+            <a:ln w="12700">
+              <a:solidFill>
+                <a:schemeClr val="bg1">
+                  <a:lumMod val="75000"/>
+                </a:schemeClr>
+              </a:solidFill>
+              <a:tailEnd type="triangle"/>
+            </a:ln>
+          </p:spPr>
+          <p:style>
+            <a:lnRef idx="1">
+              <a:schemeClr val="accent1"/>
+            </a:lnRef>
+            <a:fillRef idx="0">
+              <a:schemeClr val="accent1"/>
+            </a:fillRef>
+            <a:effectRef idx="0">
+              <a:schemeClr val="accent1"/>
+            </a:effectRef>
+            <a:fontRef idx="minor">
+              <a:schemeClr val="tx1"/>
+            </a:fontRef>
+          </p:style>
+        </p:cxnSp>
+        <p:cxnSp>
+          <p:nvCxnSpPr>
+            <p:cNvPr id="101" name="Connector: Elbow 100">
+              <a:extLst>
+                <a:ext uri="{FF2B5EF4-FFF2-40B4-BE49-F238E27FC236}">
+                  <a16:creationId xmlns:a16="http://schemas.microsoft.com/office/drawing/2014/main" id="{DCB421A3-030B-F6CE-F600-40F213081DF2}"/>
+                </a:ext>
+              </a:extLst>
+            </p:cNvPr>
+            <p:cNvCxnSpPr>
+              <a:cxnSpLocks/>
+              <a:stCxn id="72" idx="2"/>
+              <a:endCxn id="67" idx="0"/>
+            </p:cNvCxnSpPr>
+            <p:nvPr/>
+          </p:nvCxnSpPr>
+          <p:spPr>
+            <a:xfrm rot="16200000" flipH="1">
+              <a:off x="3886492" y="2409823"/>
+              <a:ext cx="282154" cy="286749"/>
+            </a:xfrm>
+            <a:prstGeom prst="bentConnector3">
+              <a:avLst>
+                <a:gd name="adj1" fmla="val 50000"/>
+              </a:avLst>
+            </a:prstGeom>
+            <a:ln w="12700">
+              <a:solidFill>
+                <a:schemeClr val="bg1">
+                  <a:lumMod val="75000"/>
+                </a:schemeClr>
+              </a:solidFill>
+              <a:tailEnd type="triangle"/>
+            </a:ln>
+          </p:spPr>
+          <p:style>
+            <a:lnRef idx="1">
+              <a:schemeClr val="accent1"/>
+            </a:lnRef>
+            <a:fillRef idx="0">
+              <a:schemeClr val="accent1"/>
+            </a:fillRef>
+            <a:effectRef idx="0">
+              <a:schemeClr val="accent1"/>
+            </a:effectRef>
+            <a:fontRef idx="minor">
+              <a:schemeClr val="tx1"/>
+            </a:fontRef>
+          </p:style>
+        </p:cxnSp>
+        <p:cxnSp>
+          <p:nvCxnSpPr>
+            <p:cNvPr id="104" name="Straight Arrow Connector 103">
+              <a:extLst>
+                <a:ext uri="{FF2B5EF4-FFF2-40B4-BE49-F238E27FC236}">
+                  <a16:creationId xmlns:a16="http://schemas.microsoft.com/office/drawing/2014/main" id="{93584013-2A8F-3A6E-7D71-5200F3E714A1}"/>
+                </a:ext>
+              </a:extLst>
+            </p:cNvPr>
+            <p:cNvCxnSpPr>
+              <a:stCxn id="74" idx="0"/>
+              <a:endCxn id="75" idx="4"/>
+            </p:cNvCxnSpPr>
+            <p:nvPr/>
+          </p:nvCxnSpPr>
+          <p:spPr>
+            <a:xfrm flipV="1">
+              <a:off x="8307804" y="1834605"/>
+              <a:ext cx="1" cy="1058592"/>
+            </a:xfrm>
+            <a:prstGeom prst="straightConnector1">
+              <a:avLst/>
+            </a:prstGeom>
+            <a:ln w="12700">
+              <a:solidFill>
+                <a:schemeClr val="bg1">
+                  <a:lumMod val="75000"/>
+                </a:schemeClr>
+              </a:solidFill>
+              <a:tailEnd type="triangle"/>
+            </a:ln>
+          </p:spPr>
+          <p:style>
+            <a:lnRef idx="1">
+              <a:schemeClr val="accent1"/>
+            </a:lnRef>
+            <a:fillRef idx="0">
+              <a:schemeClr val="accent1"/>
+            </a:fillRef>
+            <a:effectRef idx="0">
+              <a:schemeClr val="accent1"/>
+            </a:effectRef>
+            <a:fontRef idx="minor">
+              <a:schemeClr val="tx1"/>
+            </a:fontRef>
+          </p:style>
+        </p:cxnSp>
+        <p:sp>
+          <p:nvSpPr>
+            <p:cNvPr id="105" name="TextBox 104">
+              <a:extLst>
+                <a:ext uri="{FF2B5EF4-FFF2-40B4-BE49-F238E27FC236}">
+                  <a16:creationId xmlns:a16="http://schemas.microsoft.com/office/drawing/2014/main" id="{CA6D9989-D172-1DF5-26E4-002EE3C34FD1}"/>
+                </a:ext>
+              </a:extLst>
+            </p:cNvPr>
+            <p:cNvSpPr txBox="1"/>
+            <p:nvPr/>
+          </p:nvSpPr>
+          <p:spPr>
+            <a:xfrm>
+              <a:off x="4170942" y="3627139"/>
+              <a:ext cx="269626" cy="276999"/>
+            </a:xfrm>
+            <a:prstGeom prst="rect">
+              <a:avLst/>
+            </a:prstGeom>
+            <a:noFill/>
+          </p:spPr>
+          <p:txBody>
+            <a:bodyPr wrap="none" rtlCol="0">
+              <a:spAutoFit/>
+            </a:bodyPr>
+            <a:lstStyle/>
+            <a:p>
+              <a:r>
+                <a:rPr lang="en-US" sz="1200" dirty="0">
+                  <a:solidFill>
+                    <a:srgbClr val="FF7C80"/>
+                  </a:solidFill>
+                  <a:latin typeface="Open Sans" panose="020B0606030504020204" pitchFamily="34" charset="0"/>
+                  <a:ea typeface="Open Sans" panose="020B0606030504020204" pitchFamily="34" charset="0"/>
+                  <a:cs typeface="Open Sans" panose="020B0606030504020204" pitchFamily="34" charset="0"/>
+                </a:rPr>
+                <a:t>T</a:t>
+              </a:r>
+            </a:p>
+          </p:txBody>
+        </p:sp>
+        <p:sp>
+          <p:nvSpPr>
+            <p:cNvPr id="106" name="TextBox 105">
+              <a:extLst>
+                <a:ext uri="{FF2B5EF4-FFF2-40B4-BE49-F238E27FC236}">
+                  <a16:creationId xmlns:a16="http://schemas.microsoft.com/office/drawing/2014/main" id="{FABC71A6-A0F6-BC15-E6BB-91CD8178A771}"/>
+                </a:ext>
+              </a:extLst>
+            </p:cNvPr>
+            <p:cNvSpPr txBox="1"/>
+            <p:nvPr/>
+          </p:nvSpPr>
+          <p:spPr>
+            <a:xfrm>
+              <a:off x="5093366" y="2893197"/>
+              <a:ext cx="269626" cy="276999"/>
+            </a:xfrm>
+            <a:prstGeom prst="rect">
+              <a:avLst/>
+            </a:prstGeom>
+            <a:noFill/>
+          </p:spPr>
+          <p:txBody>
+            <a:bodyPr wrap="none" rtlCol="0">
+              <a:spAutoFit/>
+            </a:bodyPr>
+            <a:lstStyle/>
+            <a:p>
+              <a:r>
+                <a:rPr lang="en-US" sz="1200" dirty="0">
+                  <a:solidFill>
+                    <a:srgbClr val="FF7C80"/>
+                  </a:solidFill>
+                  <a:latin typeface="Open Sans" panose="020B0606030504020204" pitchFamily="34" charset="0"/>
+                  <a:ea typeface="Open Sans" panose="020B0606030504020204" pitchFamily="34" charset="0"/>
+                  <a:cs typeface="Open Sans" panose="020B0606030504020204" pitchFamily="34" charset="0"/>
+                </a:rPr>
+                <a:t>F</a:t>
+              </a:r>
+            </a:p>
+          </p:txBody>
+        </p:sp>
+      </p:grpSp>
+    </p:spTree>
+    <p:extLst>
+      <p:ext uri="{BB962C8B-B14F-4D97-AF65-F5344CB8AC3E}">
+        <p14:creationId xmlns:p14="http://schemas.microsoft.com/office/powerpoint/2010/main" val="2424013946"/>
       </p:ext>
     </p:extLst>
   </p:cSld>

</xml_diff>

<commit_message>
Added flowchart for PSPM1819 Q4
</commit_message>
<xml_diff>
--- a/Past Year Theory Questions/Resources/resources.pptx
+++ b/Past Year Theory Questions/Resources/resources.pptx
@@ -7,6 +7,7 @@
   <p:sldIdLst>
     <p:sldId id="257" r:id="rId2"/>
     <p:sldId id="258" r:id="rId3"/>
+    <p:sldId id="259" r:id="rId4"/>
   </p:sldIdLst>
   <p:sldSz cx="12192000" cy="6858000"/>
   <p:notesSz cx="6858000" cy="9144000"/>
@@ -260,7 +261,7 @@
           <a:p>
             <a:fld id="{34BBF2E1-1C0D-4B66-AD27-CA9E57E33A5F}" type="datetimeFigureOut">
               <a:rPr lang="en-US" smtClean="0"/>
-              <a:t>01-May-22</a:t>
+              <a:t>03-May-22</a:t>
             </a:fld>
             <a:endParaRPr lang="en-US"/>
           </a:p>
@@ -458,7 +459,7 @@
           <a:p>
             <a:fld id="{34BBF2E1-1C0D-4B66-AD27-CA9E57E33A5F}" type="datetimeFigureOut">
               <a:rPr lang="en-US" smtClean="0"/>
-              <a:t>01-May-22</a:t>
+              <a:t>03-May-22</a:t>
             </a:fld>
             <a:endParaRPr lang="en-US"/>
           </a:p>
@@ -666,7 +667,7 @@
           <a:p>
             <a:fld id="{34BBF2E1-1C0D-4B66-AD27-CA9E57E33A5F}" type="datetimeFigureOut">
               <a:rPr lang="en-US" smtClean="0"/>
-              <a:t>01-May-22</a:t>
+              <a:t>03-May-22</a:t>
             </a:fld>
             <a:endParaRPr lang="en-US"/>
           </a:p>
@@ -864,7 +865,7 @@
           <a:p>
             <a:fld id="{34BBF2E1-1C0D-4B66-AD27-CA9E57E33A5F}" type="datetimeFigureOut">
               <a:rPr lang="en-US" smtClean="0"/>
-              <a:t>01-May-22</a:t>
+              <a:t>03-May-22</a:t>
             </a:fld>
             <a:endParaRPr lang="en-US"/>
           </a:p>
@@ -1139,7 +1140,7 @@
           <a:p>
             <a:fld id="{34BBF2E1-1C0D-4B66-AD27-CA9E57E33A5F}" type="datetimeFigureOut">
               <a:rPr lang="en-US" smtClean="0"/>
-              <a:t>01-May-22</a:t>
+              <a:t>03-May-22</a:t>
             </a:fld>
             <a:endParaRPr lang="en-US"/>
           </a:p>
@@ -1404,7 +1405,7 @@
           <a:p>
             <a:fld id="{34BBF2E1-1C0D-4B66-AD27-CA9E57E33A5F}" type="datetimeFigureOut">
               <a:rPr lang="en-US" smtClean="0"/>
-              <a:t>01-May-22</a:t>
+              <a:t>03-May-22</a:t>
             </a:fld>
             <a:endParaRPr lang="en-US"/>
           </a:p>
@@ -1816,7 +1817,7 @@
           <a:p>
             <a:fld id="{34BBF2E1-1C0D-4B66-AD27-CA9E57E33A5F}" type="datetimeFigureOut">
               <a:rPr lang="en-US" smtClean="0"/>
-              <a:t>01-May-22</a:t>
+              <a:t>03-May-22</a:t>
             </a:fld>
             <a:endParaRPr lang="en-US"/>
           </a:p>
@@ -1957,7 +1958,7 @@
           <a:p>
             <a:fld id="{34BBF2E1-1C0D-4B66-AD27-CA9E57E33A5F}" type="datetimeFigureOut">
               <a:rPr lang="en-US" smtClean="0"/>
-              <a:t>01-May-22</a:t>
+              <a:t>03-May-22</a:t>
             </a:fld>
             <a:endParaRPr lang="en-US"/>
           </a:p>
@@ -2070,7 +2071,7 @@
           <a:p>
             <a:fld id="{34BBF2E1-1C0D-4B66-AD27-CA9E57E33A5F}" type="datetimeFigureOut">
               <a:rPr lang="en-US" smtClean="0"/>
-              <a:t>01-May-22</a:t>
+              <a:t>03-May-22</a:t>
             </a:fld>
             <a:endParaRPr lang="en-US"/>
           </a:p>
@@ -2381,7 +2382,7 @@
           <a:p>
             <a:fld id="{34BBF2E1-1C0D-4B66-AD27-CA9E57E33A5F}" type="datetimeFigureOut">
               <a:rPr lang="en-US" smtClean="0"/>
-              <a:t>01-May-22</a:t>
+              <a:t>03-May-22</a:t>
             </a:fld>
             <a:endParaRPr lang="en-US"/>
           </a:p>
@@ -2669,7 +2670,7 @@
           <a:p>
             <a:fld id="{34BBF2E1-1C0D-4B66-AD27-CA9E57E33A5F}" type="datetimeFigureOut">
               <a:rPr lang="en-US" smtClean="0"/>
-              <a:t>01-May-22</a:t>
+              <a:t>03-May-22</a:t>
             </a:fld>
             <a:endParaRPr lang="en-US"/>
           </a:p>
@@ -2910,7 +2911,7 @@
           <a:p>
             <a:fld id="{34BBF2E1-1C0D-4B66-AD27-CA9E57E33A5F}" type="datetimeFigureOut">
               <a:rPr lang="en-US" smtClean="0"/>
-              <a:t>01-May-22</a:t>
+              <a:t>03-May-22</a:t>
             </a:fld>
             <a:endParaRPr lang="en-US"/>
           </a:p>
@@ -6845,6 +6846,1339 @@
 </p:sld>
 </file>
 
+<file path=ppt/slides/slide3.xml><?xml version="1.0" encoding="utf-8"?>
+<p:sld xmlns:a="http://schemas.openxmlformats.org/drawingml/2006/main" xmlns:r="http://schemas.openxmlformats.org/officeDocument/2006/relationships" xmlns:p="http://schemas.openxmlformats.org/presentationml/2006/main">
+  <p:cSld>
+    <p:spTree>
+      <p:nvGrpSpPr>
+        <p:cNvPr id="1" name=""/>
+        <p:cNvGrpSpPr/>
+        <p:nvPr/>
+      </p:nvGrpSpPr>
+      <p:grpSpPr>
+        <a:xfrm>
+          <a:off x="0" y="0"/>
+          <a:ext cx="0" cy="0"/>
+          <a:chOff x="0" y="0"/>
+          <a:chExt cx="0" cy="0"/>
+        </a:xfrm>
+      </p:grpSpPr>
+      <p:grpSp>
+        <p:nvGrpSpPr>
+          <p:cNvPr id="25" name="Group 24">
+            <a:extLst>
+              <a:ext uri="{FF2B5EF4-FFF2-40B4-BE49-F238E27FC236}">
+                <a16:creationId xmlns:a16="http://schemas.microsoft.com/office/drawing/2014/main" id="{BDBF73B5-4B19-9D01-F0BA-C1AB2036860F}"/>
+              </a:ext>
+            </a:extLst>
+          </p:cNvPr>
+          <p:cNvGrpSpPr/>
+          <p:nvPr/>
+        </p:nvGrpSpPr>
+        <p:grpSpPr>
+          <a:xfrm>
+            <a:off x="2594810" y="729915"/>
+            <a:ext cx="7002379" cy="5398170"/>
+            <a:chOff x="2594810" y="729915"/>
+            <a:chExt cx="7002379" cy="5398170"/>
+          </a:xfrm>
+        </p:grpSpPr>
+        <p:sp>
+          <p:nvSpPr>
+            <p:cNvPr id="108" name="Rectangle 107">
+              <a:extLst>
+                <a:ext uri="{FF2B5EF4-FFF2-40B4-BE49-F238E27FC236}">
+                  <a16:creationId xmlns:a16="http://schemas.microsoft.com/office/drawing/2014/main" id="{F5A5FD62-A99C-04B6-706B-DEE9B81AF541}"/>
+                </a:ext>
+              </a:extLst>
+            </p:cNvPr>
+            <p:cNvSpPr/>
+            <p:nvPr/>
+          </p:nvSpPr>
+          <p:spPr>
+            <a:xfrm>
+              <a:off x="2594810" y="729915"/>
+              <a:ext cx="7002379" cy="5398170"/>
+            </a:xfrm>
+            <a:prstGeom prst="rect">
+              <a:avLst/>
+            </a:prstGeom>
+            <a:solidFill>
+              <a:schemeClr val="tx1">
+                <a:lumMod val="85000"/>
+                <a:lumOff val="15000"/>
+              </a:schemeClr>
+            </a:solidFill>
+            <a:ln>
+              <a:noFill/>
+            </a:ln>
+          </p:spPr>
+          <p:style>
+            <a:lnRef idx="2">
+              <a:schemeClr val="accent1">
+                <a:shade val="50000"/>
+              </a:schemeClr>
+            </a:lnRef>
+            <a:fillRef idx="1">
+              <a:schemeClr val="accent1"/>
+            </a:fillRef>
+            <a:effectRef idx="0">
+              <a:schemeClr val="accent1"/>
+            </a:effectRef>
+            <a:fontRef idx="minor">
+              <a:schemeClr val="lt1"/>
+            </a:fontRef>
+          </p:style>
+          <p:txBody>
+            <a:bodyPr rtlCol="0" anchor="ctr"/>
+            <a:lstStyle/>
+            <a:p>
+              <a:pPr algn="ctr"/>
+              <a:endParaRPr lang="en-US" dirty="0"/>
+            </a:p>
+          </p:txBody>
+        </p:sp>
+        <p:grpSp>
+          <p:nvGrpSpPr>
+            <p:cNvPr id="24" name="Group 23">
+              <a:extLst>
+                <a:ext uri="{FF2B5EF4-FFF2-40B4-BE49-F238E27FC236}">
+                  <a16:creationId xmlns:a16="http://schemas.microsoft.com/office/drawing/2014/main" id="{ED73E4EB-41A8-2244-34E0-6995A3F8145D}"/>
+                </a:ext>
+              </a:extLst>
+            </p:cNvPr>
+            <p:cNvGrpSpPr/>
+            <p:nvPr/>
+          </p:nvGrpSpPr>
+          <p:grpSpPr>
+            <a:xfrm>
+              <a:off x="2961773" y="1096667"/>
+              <a:ext cx="6268454" cy="4440454"/>
+              <a:chOff x="2961773" y="706851"/>
+              <a:chExt cx="6268454" cy="4440454"/>
+            </a:xfrm>
+          </p:grpSpPr>
+          <p:sp>
+            <p:nvSpPr>
+              <p:cNvPr id="59" name="Flowchart: Terminator 58">
+                <a:extLst>
+                  <a:ext uri="{FF2B5EF4-FFF2-40B4-BE49-F238E27FC236}">
+                    <a16:creationId xmlns:a16="http://schemas.microsoft.com/office/drawing/2014/main" id="{D7554AAC-5F81-46CA-BA4E-6CDF6B8CC5AD}"/>
+                  </a:ext>
+                </a:extLst>
+              </p:cNvPr>
+              <p:cNvSpPr/>
+              <p:nvPr/>
+            </p:nvSpPr>
+            <p:spPr>
+              <a:xfrm>
+                <a:off x="3358816" y="706851"/>
+                <a:ext cx="1050758" cy="341690"/>
+              </a:xfrm>
+              <a:prstGeom prst="flowChartTerminator">
+                <a:avLst/>
+              </a:prstGeom>
+              <a:noFill/>
+              <a:ln>
+                <a:solidFill>
+                  <a:schemeClr val="bg1">
+                    <a:lumMod val="75000"/>
+                  </a:schemeClr>
+                </a:solidFill>
+              </a:ln>
+            </p:spPr>
+            <p:style>
+              <a:lnRef idx="2">
+                <a:schemeClr val="accent1">
+                  <a:shade val="50000"/>
+                </a:schemeClr>
+              </a:lnRef>
+              <a:fillRef idx="1">
+                <a:schemeClr val="accent1"/>
+              </a:fillRef>
+              <a:effectRef idx="0">
+                <a:schemeClr val="accent1"/>
+              </a:effectRef>
+              <a:fontRef idx="minor">
+                <a:schemeClr val="lt1"/>
+              </a:fontRef>
+            </p:style>
+            <p:txBody>
+              <a:bodyPr rtlCol="0" anchor="ctr"/>
+              <a:lstStyle/>
+              <a:p>
+                <a:pPr algn="ctr"/>
+                <a:r>
+                  <a:rPr lang="en-US" sz="1200" dirty="0">
+                    <a:solidFill>
+                      <a:schemeClr val="bg1">
+                        <a:lumMod val="85000"/>
+                      </a:schemeClr>
+                    </a:solidFill>
+                    <a:latin typeface="Open Sans" panose="020B0606030504020204" pitchFamily="34" charset="0"/>
+                    <a:ea typeface="Open Sans" panose="020B0606030504020204" pitchFamily="34" charset="0"/>
+                    <a:cs typeface="Open Sans" panose="020B0606030504020204" pitchFamily="34" charset="0"/>
+                  </a:rPr>
+                  <a:t>Start</a:t>
+                </a:r>
+              </a:p>
+            </p:txBody>
+          </p:sp>
+          <p:sp>
+            <p:nvSpPr>
+              <p:cNvPr id="60" name="Flowchart: Terminator 59">
+                <a:extLst>
+                  <a:ext uri="{FF2B5EF4-FFF2-40B4-BE49-F238E27FC236}">
+                    <a16:creationId xmlns:a16="http://schemas.microsoft.com/office/drawing/2014/main" id="{103191FC-37A5-724C-C214-882B4B9F6C89}"/>
+                  </a:ext>
+                </a:extLst>
+              </p:cNvPr>
+              <p:cNvSpPr/>
+              <p:nvPr/>
+            </p:nvSpPr>
+            <p:spPr>
+              <a:xfrm>
+                <a:off x="7782425" y="706851"/>
+                <a:ext cx="1050758" cy="341690"/>
+              </a:xfrm>
+              <a:prstGeom prst="flowChartTerminator">
+                <a:avLst/>
+              </a:prstGeom>
+              <a:noFill/>
+              <a:ln>
+                <a:solidFill>
+                  <a:schemeClr val="bg1">
+                    <a:lumMod val="75000"/>
+                  </a:schemeClr>
+                </a:solidFill>
+              </a:ln>
+            </p:spPr>
+            <p:style>
+              <a:lnRef idx="2">
+                <a:schemeClr val="accent1">
+                  <a:shade val="50000"/>
+                </a:schemeClr>
+              </a:lnRef>
+              <a:fillRef idx="1">
+                <a:schemeClr val="accent1"/>
+              </a:fillRef>
+              <a:effectRef idx="0">
+                <a:schemeClr val="accent1"/>
+              </a:effectRef>
+              <a:fontRef idx="minor">
+                <a:schemeClr val="lt1"/>
+              </a:fontRef>
+            </p:style>
+            <p:txBody>
+              <a:bodyPr rtlCol="0" anchor="ctr"/>
+              <a:lstStyle/>
+              <a:p>
+                <a:pPr algn="ctr"/>
+                <a:r>
+                  <a:rPr lang="en-US" sz="1200" dirty="0">
+                    <a:solidFill>
+                      <a:schemeClr val="bg1">
+                        <a:lumMod val="85000"/>
+                      </a:schemeClr>
+                    </a:solidFill>
+                    <a:latin typeface="Open Sans" panose="020B0606030504020204" pitchFamily="34" charset="0"/>
+                    <a:ea typeface="Open Sans" panose="020B0606030504020204" pitchFamily="34" charset="0"/>
+                    <a:cs typeface="Open Sans" panose="020B0606030504020204" pitchFamily="34" charset="0"/>
+                  </a:rPr>
+                  <a:t>Stop</a:t>
+                </a:r>
+              </a:p>
+            </p:txBody>
+          </p:sp>
+          <p:cxnSp>
+            <p:nvCxnSpPr>
+              <p:cNvPr id="61" name="Straight Arrow Connector 60">
+                <a:extLst>
+                  <a:ext uri="{FF2B5EF4-FFF2-40B4-BE49-F238E27FC236}">
+                    <a16:creationId xmlns:a16="http://schemas.microsoft.com/office/drawing/2014/main" id="{A1BBCFB3-141A-F3B8-67BE-C05995E64053}"/>
+                  </a:ext>
+                </a:extLst>
+              </p:cNvPr>
+              <p:cNvCxnSpPr>
+                <a:cxnSpLocks/>
+                <a:stCxn id="59" idx="2"/>
+              </p:cNvCxnSpPr>
+              <p:nvPr/>
+            </p:nvCxnSpPr>
+            <p:spPr>
+              <a:xfrm>
+                <a:off x="3884195" y="1048541"/>
+                <a:ext cx="0" cy="296780"/>
+              </a:xfrm>
+              <a:prstGeom prst="straightConnector1">
+                <a:avLst/>
+              </a:prstGeom>
+              <a:ln w="12700">
+                <a:solidFill>
+                  <a:schemeClr val="bg1">
+                    <a:lumMod val="75000"/>
+                  </a:schemeClr>
+                </a:solidFill>
+                <a:tailEnd type="triangle"/>
+              </a:ln>
+            </p:spPr>
+            <p:style>
+              <a:lnRef idx="1">
+                <a:schemeClr val="accent1"/>
+              </a:lnRef>
+              <a:fillRef idx="0">
+                <a:schemeClr val="accent1"/>
+              </a:fillRef>
+              <a:effectRef idx="0">
+                <a:schemeClr val="accent1"/>
+              </a:effectRef>
+              <a:fontRef idx="minor">
+                <a:schemeClr val="tx1"/>
+              </a:fontRef>
+            </p:style>
+          </p:cxnSp>
+          <p:sp>
+            <p:nvSpPr>
+              <p:cNvPr id="64" name="Rectangle 63">
+                <a:extLst>
+                  <a:ext uri="{FF2B5EF4-FFF2-40B4-BE49-F238E27FC236}">
+                    <a16:creationId xmlns:a16="http://schemas.microsoft.com/office/drawing/2014/main" id="{5052184B-AC25-3BA4-D865-84420C9A2C6C}"/>
+                  </a:ext>
+                </a:extLst>
+              </p:cNvPr>
+              <p:cNvSpPr/>
+              <p:nvPr/>
+            </p:nvSpPr>
+            <p:spPr>
+              <a:xfrm>
+                <a:off x="2961773" y="1345321"/>
+                <a:ext cx="1844844" cy="393032"/>
+              </a:xfrm>
+              <a:prstGeom prst="rect">
+                <a:avLst/>
+              </a:prstGeom>
+              <a:noFill/>
+              <a:ln>
+                <a:solidFill>
+                  <a:schemeClr val="accent6">
+                    <a:lumMod val="60000"/>
+                    <a:lumOff val="40000"/>
+                  </a:schemeClr>
+                </a:solidFill>
+              </a:ln>
+            </p:spPr>
+            <p:style>
+              <a:lnRef idx="2">
+                <a:schemeClr val="accent1">
+                  <a:shade val="50000"/>
+                </a:schemeClr>
+              </a:lnRef>
+              <a:fillRef idx="1">
+                <a:schemeClr val="accent1"/>
+              </a:fillRef>
+              <a:effectRef idx="0">
+                <a:schemeClr val="accent1"/>
+              </a:effectRef>
+              <a:fontRef idx="minor">
+                <a:schemeClr val="lt1"/>
+              </a:fontRef>
+            </p:style>
+            <p:txBody>
+              <a:bodyPr rtlCol="0" anchor="ctr"/>
+              <a:lstStyle/>
+              <a:p>
+                <a:pPr algn="ctr"/>
+                <a:r>
+                  <a:rPr lang="en-US" sz="1200" dirty="0" err="1">
+                    <a:solidFill>
+                      <a:schemeClr val="bg1">
+                        <a:lumMod val="85000"/>
+                      </a:schemeClr>
+                    </a:solidFill>
+                    <a:latin typeface="Open Sans" panose="020B0606030504020204" pitchFamily="34" charset="0"/>
+                    <a:ea typeface="Open Sans" panose="020B0606030504020204" pitchFamily="34" charset="0"/>
+                    <a:cs typeface="Open Sans" panose="020B0606030504020204" pitchFamily="34" charset="0"/>
+                  </a:rPr>
+                  <a:t>i</a:t>
+                </a:r>
+                <a:r>
+                  <a:rPr lang="en-US" sz="1200" dirty="0">
+                    <a:solidFill>
+                      <a:schemeClr val="bg1">
+                        <a:lumMod val="85000"/>
+                      </a:schemeClr>
+                    </a:solidFill>
+                    <a:latin typeface="Open Sans" panose="020B0606030504020204" pitchFamily="34" charset="0"/>
+                    <a:ea typeface="Open Sans" panose="020B0606030504020204" pitchFamily="34" charset="0"/>
+                    <a:cs typeface="Open Sans" panose="020B0606030504020204" pitchFamily="34" charset="0"/>
+                  </a:rPr>
+                  <a:t> = 100</a:t>
+                </a:r>
+              </a:p>
+            </p:txBody>
+          </p:sp>
+          <p:cxnSp>
+            <p:nvCxnSpPr>
+              <p:cNvPr id="65" name="Straight Arrow Connector 64">
+                <a:extLst>
+                  <a:ext uri="{FF2B5EF4-FFF2-40B4-BE49-F238E27FC236}">
+                    <a16:creationId xmlns:a16="http://schemas.microsoft.com/office/drawing/2014/main" id="{C47DC224-7648-7A50-0797-89D1EC17589F}"/>
+                  </a:ext>
+                </a:extLst>
+              </p:cNvPr>
+              <p:cNvCxnSpPr>
+                <a:cxnSpLocks/>
+              </p:cNvCxnSpPr>
+              <p:nvPr/>
+            </p:nvCxnSpPr>
+            <p:spPr>
+              <a:xfrm>
+                <a:off x="6096000" y="1738353"/>
+                <a:ext cx="0" cy="296780"/>
+              </a:xfrm>
+              <a:prstGeom prst="straightConnector1">
+                <a:avLst/>
+              </a:prstGeom>
+              <a:ln w="12700">
+                <a:solidFill>
+                  <a:schemeClr val="bg1">
+                    <a:lumMod val="75000"/>
+                  </a:schemeClr>
+                </a:solidFill>
+                <a:tailEnd type="triangle"/>
+              </a:ln>
+            </p:spPr>
+            <p:style>
+              <a:lnRef idx="1">
+                <a:schemeClr val="accent1"/>
+              </a:lnRef>
+              <a:fillRef idx="0">
+                <a:schemeClr val="accent1"/>
+              </a:fillRef>
+              <a:effectRef idx="0">
+                <a:schemeClr val="accent1"/>
+              </a:effectRef>
+              <a:fontRef idx="minor">
+                <a:schemeClr val="tx1"/>
+              </a:fontRef>
+            </p:style>
+          </p:cxnSp>
+          <p:sp>
+            <p:nvSpPr>
+              <p:cNvPr id="67" name="Flowchart: Decision 66">
+                <a:extLst>
+                  <a:ext uri="{FF2B5EF4-FFF2-40B4-BE49-F238E27FC236}">
+                    <a16:creationId xmlns:a16="http://schemas.microsoft.com/office/drawing/2014/main" id="{A3DDEFFD-6E92-1CB4-EE4D-6CD3E04860A6}"/>
+                  </a:ext>
+                </a:extLst>
+              </p:cNvPr>
+              <p:cNvSpPr/>
+              <p:nvPr/>
+            </p:nvSpPr>
+            <p:spPr>
+              <a:xfrm>
+                <a:off x="5173578" y="2035133"/>
+                <a:ext cx="1844844" cy="946484"/>
+              </a:xfrm>
+              <a:prstGeom prst="flowChartDecision">
+                <a:avLst/>
+              </a:prstGeom>
+              <a:noFill/>
+              <a:ln>
+                <a:solidFill>
+                  <a:srgbClr val="FF7C80"/>
+                </a:solidFill>
+              </a:ln>
+            </p:spPr>
+            <p:style>
+              <a:lnRef idx="2">
+                <a:schemeClr val="accent1">
+                  <a:shade val="50000"/>
+                </a:schemeClr>
+              </a:lnRef>
+              <a:fillRef idx="1">
+                <a:schemeClr val="accent1"/>
+              </a:fillRef>
+              <a:effectRef idx="0">
+                <a:schemeClr val="accent1"/>
+              </a:effectRef>
+              <a:fontRef idx="minor">
+                <a:schemeClr val="lt1"/>
+              </a:fontRef>
+            </p:style>
+            <p:txBody>
+              <a:bodyPr rtlCol="0" anchor="ctr"/>
+              <a:lstStyle/>
+              <a:p>
+                <a:pPr algn="ctr"/>
+                <a:r>
+                  <a:rPr lang="en-US" sz="1200" dirty="0" err="1">
+                    <a:solidFill>
+                      <a:schemeClr val="bg1">
+                        <a:lumMod val="85000"/>
+                      </a:schemeClr>
+                    </a:solidFill>
+                    <a:latin typeface="Open Sans" panose="020B0606030504020204" pitchFamily="34" charset="0"/>
+                    <a:ea typeface="Open Sans" panose="020B0606030504020204" pitchFamily="34" charset="0"/>
+                    <a:cs typeface="Open Sans" panose="020B0606030504020204" pitchFamily="34" charset="0"/>
+                  </a:rPr>
+                  <a:t>i</a:t>
+                </a:r>
+                <a:r>
+                  <a:rPr lang="en-US" sz="1200" dirty="0">
+                    <a:solidFill>
+                      <a:schemeClr val="bg1">
+                        <a:lumMod val="85000"/>
+                      </a:schemeClr>
+                    </a:solidFill>
+                    <a:latin typeface="Open Sans" panose="020B0606030504020204" pitchFamily="34" charset="0"/>
+                    <a:ea typeface="Open Sans" panose="020B0606030504020204" pitchFamily="34" charset="0"/>
+                    <a:cs typeface="Open Sans" panose="020B0606030504020204" pitchFamily="34" charset="0"/>
+                  </a:rPr>
+                  <a:t> &lt;= 700</a:t>
+                </a:r>
+              </a:p>
+            </p:txBody>
+          </p:sp>
+          <p:sp>
+            <p:nvSpPr>
+              <p:cNvPr id="75" name="Flowchart: Data 74">
+                <a:extLst>
+                  <a:ext uri="{FF2B5EF4-FFF2-40B4-BE49-F238E27FC236}">
+                    <a16:creationId xmlns:a16="http://schemas.microsoft.com/office/drawing/2014/main" id="{684F63EE-4E36-A045-0D95-769D7FC961BB}"/>
+                  </a:ext>
+                </a:extLst>
+              </p:cNvPr>
+              <p:cNvSpPr/>
+              <p:nvPr/>
+            </p:nvSpPr>
+            <p:spPr>
+              <a:xfrm>
+                <a:off x="7385383" y="1345321"/>
+                <a:ext cx="1844844" cy="489284"/>
+              </a:xfrm>
+              <a:prstGeom prst="flowChartInputOutput">
+                <a:avLst/>
+              </a:prstGeom>
+              <a:noFill/>
+              <a:ln>
+                <a:solidFill>
+                  <a:srgbClr val="CC99FF"/>
+                </a:solidFill>
+              </a:ln>
+            </p:spPr>
+            <p:style>
+              <a:lnRef idx="2">
+                <a:schemeClr val="accent1">
+                  <a:shade val="50000"/>
+                </a:schemeClr>
+              </a:lnRef>
+              <a:fillRef idx="1">
+                <a:schemeClr val="accent1"/>
+              </a:fillRef>
+              <a:effectRef idx="0">
+                <a:schemeClr val="accent1"/>
+              </a:effectRef>
+              <a:fontRef idx="minor">
+                <a:schemeClr val="lt1"/>
+              </a:fontRef>
+            </p:style>
+            <p:txBody>
+              <a:bodyPr rtlCol="0" anchor="ctr"/>
+              <a:lstStyle/>
+              <a:p>
+                <a:pPr algn="ctr"/>
+                <a:r>
+                  <a:rPr lang="en-US" sz="1200" dirty="0">
+                    <a:solidFill>
+                      <a:schemeClr val="bg1">
+                        <a:lumMod val="85000"/>
+                      </a:schemeClr>
+                    </a:solidFill>
+                    <a:latin typeface="Open Sans" panose="020B0606030504020204" pitchFamily="34" charset="0"/>
+                    <a:ea typeface="Open Sans" panose="020B0606030504020204" pitchFamily="34" charset="0"/>
+                    <a:cs typeface="Open Sans" panose="020B0606030504020204" pitchFamily="34" charset="0"/>
+                  </a:rPr>
+                  <a:t>Print sum</a:t>
+                </a:r>
+              </a:p>
+            </p:txBody>
+          </p:sp>
+          <p:sp>
+            <p:nvSpPr>
+              <p:cNvPr id="34" name="Flowchart: Data 33">
+                <a:extLst>
+                  <a:ext uri="{FF2B5EF4-FFF2-40B4-BE49-F238E27FC236}">
+                    <a16:creationId xmlns:a16="http://schemas.microsoft.com/office/drawing/2014/main" id="{C068F42B-FC9B-7C07-A3C3-5B6E85BF9353}"/>
+                  </a:ext>
+                </a:extLst>
+              </p:cNvPr>
+              <p:cNvSpPr/>
+              <p:nvPr/>
+            </p:nvSpPr>
+            <p:spPr>
+              <a:xfrm>
+                <a:off x="5173578" y="3278397"/>
+                <a:ext cx="1844844" cy="489284"/>
+              </a:xfrm>
+              <a:prstGeom prst="flowChartInputOutput">
+                <a:avLst/>
+              </a:prstGeom>
+              <a:noFill/>
+              <a:ln>
+                <a:solidFill>
+                  <a:srgbClr val="CC99FF"/>
+                </a:solidFill>
+              </a:ln>
+            </p:spPr>
+            <p:style>
+              <a:lnRef idx="2">
+                <a:schemeClr val="accent1">
+                  <a:shade val="50000"/>
+                </a:schemeClr>
+              </a:lnRef>
+              <a:fillRef idx="1">
+                <a:schemeClr val="accent1"/>
+              </a:fillRef>
+              <a:effectRef idx="0">
+                <a:schemeClr val="accent1"/>
+              </a:effectRef>
+              <a:fontRef idx="minor">
+                <a:schemeClr val="lt1"/>
+              </a:fontRef>
+            </p:style>
+            <p:txBody>
+              <a:bodyPr rtlCol="0" anchor="ctr"/>
+              <a:lstStyle/>
+              <a:p>
+                <a:pPr algn="ctr"/>
+                <a:r>
+                  <a:rPr lang="en-US" sz="1200" dirty="0">
+                    <a:solidFill>
+                      <a:schemeClr val="bg1">
+                        <a:lumMod val="85000"/>
+                      </a:schemeClr>
+                    </a:solidFill>
+                    <a:latin typeface="Open Sans" panose="020B0606030504020204" pitchFamily="34" charset="0"/>
+                    <a:ea typeface="Open Sans" panose="020B0606030504020204" pitchFamily="34" charset="0"/>
+                    <a:cs typeface="Open Sans" panose="020B0606030504020204" pitchFamily="34" charset="0"/>
+                  </a:rPr>
+                  <a:t>Print </a:t>
+                </a:r>
+                <a:r>
+                  <a:rPr lang="en-US" sz="1200" dirty="0" err="1">
+                    <a:solidFill>
+                      <a:schemeClr val="bg1">
+                        <a:lumMod val="85000"/>
+                      </a:schemeClr>
+                    </a:solidFill>
+                    <a:latin typeface="Open Sans" panose="020B0606030504020204" pitchFamily="34" charset="0"/>
+                    <a:ea typeface="Open Sans" panose="020B0606030504020204" pitchFamily="34" charset="0"/>
+                    <a:cs typeface="Open Sans" panose="020B0606030504020204" pitchFamily="34" charset="0"/>
+                  </a:rPr>
+                  <a:t>i</a:t>
+                </a:r>
+                <a:endParaRPr lang="en-US" sz="1200" dirty="0">
+                  <a:solidFill>
+                    <a:schemeClr val="bg1">
+                      <a:lumMod val="85000"/>
+                    </a:schemeClr>
+                  </a:solidFill>
+                  <a:latin typeface="Open Sans" panose="020B0606030504020204" pitchFamily="34" charset="0"/>
+                  <a:ea typeface="Open Sans" panose="020B0606030504020204" pitchFamily="34" charset="0"/>
+                  <a:cs typeface="Open Sans" panose="020B0606030504020204" pitchFamily="34" charset="0"/>
+                </a:endParaRPr>
+              </a:p>
+            </p:txBody>
+          </p:sp>
+          <p:sp>
+            <p:nvSpPr>
+              <p:cNvPr id="35" name="Rectangle 34">
+                <a:extLst>
+                  <a:ext uri="{FF2B5EF4-FFF2-40B4-BE49-F238E27FC236}">
+                    <a16:creationId xmlns:a16="http://schemas.microsoft.com/office/drawing/2014/main" id="{080E8C81-0E82-643C-765B-A810B47F2192}"/>
+                  </a:ext>
+                </a:extLst>
+              </p:cNvPr>
+              <p:cNvSpPr/>
+              <p:nvPr/>
+            </p:nvSpPr>
+            <p:spPr>
+              <a:xfrm>
+                <a:off x="5173578" y="4064461"/>
+                <a:ext cx="1844844" cy="393032"/>
+              </a:xfrm>
+              <a:prstGeom prst="rect">
+                <a:avLst/>
+              </a:prstGeom>
+              <a:noFill/>
+              <a:ln>
+                <a:solidFill>
+                  <a:schemeClr val="accent6">
+                    <a:lumMod val="60000"/>
+                    <a:lumOff val="40000"/>
+                  </a:schemeClr>
+                </a:solidFill>
+              </a:ln>
+            </p:spPr>
+            <p:style>
+              <a:lnRef idx="2">
+                <a:schemeClr val="accent1">
+                  <a:shade val="50000"/>
+                </a:schemeClr>
+              </a:lnRef>
+              <a:fillRef idx="1">
+                <a:schemeClr val="accent1"/>
+              </a:fillRef>
+              <a:effectRef idx="0">
+                <a:schemeClr val="accent1"/>
+              </a:effectRef>
+              <a:fontRef idx="minor">
+                <a:schemeClr val="lt1"/>
+              </a:fontRef>
+            </p:style>
+            <p:txBody>
+              <a:bodyPr rtlCol="0" anchor="ctr"/>
+              <a:lstStyle/>
+              <a:p>
+                <a:pPr algn="ctr"/>
+                <a:r>
+                  <a:rPr lang="en-US" sz="1200" dirty="0">
+                    <a:solidFill>
+                      <a:schemeClr val="bg1">
+                        <a:lumMod val="85000"/>
+                      </a:schemeClr>
+                    </a:solidFill>
+                    <a:latin typeface="Open Sans" panose="020B0606030504020204" pitchFamily="34" charset="0"/>
+                    <a:ea typeface="Open Sans" panose="020B0606030504020204" pitchFamily="34" charset="0"/>
+                    <a:cs typeface="Open Sans" panose="020B0606030504020204" pitchFamily="34" charset="0"/>
+                  </a:rPr>
+                  <a:t>sum = sum + </a:t>
+                </a:r>
+                <a:r>
+                  <a:rPr lang="en-US" sz="1200" dirty="0" err="1">
+                    <a:solidFill>
+                      <a:schemeClr val="bg1">
+                        <a:lumMod val="85000"/>
+                      </a:schemeClr>
+                    </a:solidFill>
+                    <a:latin typeface="Open Sans" panose="020B0606030504020204" pitchFamily="34" charset="0"/>
+                    <a:ea typeface="Open Sans" panose="020B0606030504020204" pitchFamily="34" charset="0"/>
+                    <a:cs typeface="Open Sans" panose="020B0606030504020204" pitchFamily="34" charset="0"/>
+                  </a:rPr>
+                  <a:t>i</a:t>
+                </a:r>
+                <a:endParaRPr lang="en-US" sz="1200" dirty="0">
+                  <a:solidFill>
+                    <a:schemeClr val="bg1">
+                      <a:lumMod val="85000"/>
+                    </a:schemeClr>
+                  </a:solidFill>
+                  <a:latin typeface="Open Sans" panose="020B0606030504020204" pitchFamily="34" charset="0"/>
+                  <a:ea typeface="Open Sans" panose="020B0606030504020204" pitchFamily="34" charset="0"/>
+                  <a:cs typeface="Open Sans" panose="020B0606030504020204" pitchFamily="34" charset="0"/>
+                </a:endParaRPr>
+              </a:p>
+            </p:txBody>
+          </p:sp>
+          <p:sp>
+            <p:nvSpPr>
+              <p:cNvPr id="36" name="Rectangle 35">
+                <a:extLst>
+                  <a:ext uri="{FF2B5EF4-FFF2-40B4-BE49-F238E27FC236}">
+                    <a16:creationId xmlns:a16="http://schemas.microsoft.com/office/drawing/2014/main" id="{64085C50-F8E5-1BF2-A526-7E84C738D5F5}"/>
+                  </a:ext>
+                </a:extLst>
+              </p:cNvPr>
+              <p:cNvSpPr/>
+              <p:nvPr/>
+            </p:nvSpPr>
+            <p:spPr>
+              <a:xfrm>
+                <a:off x="5173578" y="4754273"/>
+                <a:ext cx="1844844" cy="393032"/>
+              </a:xfrm>
+              <a:prstGeom prst="rect">
+                <a:avLst/>
+              </a:prstGeom>
+              <a:noFill/>
+              <a:ln>
+                <a:solidFill>
+                  <a:schemeClr val="accent6">
+                    <a:lumMod val="60000"/>
+                    <a:lumOff val="40000"/>
+                  </a:schemeClr>
+                </a:solidFill>
+              </a:ln>
+            </p:spPr>
+            <p:style>
+              <a:lnRef idx="2">
+                <a:schemeClr val="accent1">
+                  <a:shade val="50000"/>
+                </a:schemeClr>
+              </a:lnRef>
+              <a:fillRef idx="1">
+                <a:schemeClr val="accent1"/>
+              </a:fillRef>
+              <a:effectRef idx="0">
+                <a:schemeClr val="accent1"/>
+              </a:effectRef>
+              <a:fontRef idx="minor">
+                <a:schemeClr val="lt1"/>
+              </a:fontRef>
+            </p:style>
+            <p:txBody>
+              <a:bodyPr rtlCol="0" anchor="ctr"/>
+              <a:lstStyle/>
+              <a:p>
+                <a:pPr algn="ctr"/>
+                <a:r>
+                  <a:rPr lang="en-US" sz="1200" dirty="0" err="1">
+                    <a:solidFill>
+                      <a:schemeClr val="bg1">
+                        <a:lumMod val="85000"/>
+                      </a:schemeClr>
+                    </a:solidFill>
+                    <a:latin typeface="Open Sans" panose="020B0606030504020204" pitchFamily="34" charset="0"/>
+                    <a:ea typeface="Open Sans" panose="020B0606030504020204" pitchFamily="34" charset="0"/>
+                    <a:cs typeface="Open Sans" panose="020B0606030504020204" pitchFamily="34" charset="0"/>
+                  </a:rPr>
+                  <a:t>i</a:t>
+                </a:r>
+                <a:r>
+                  <a:rPr lang="en-US" sz="1200" dirty="0">
+                    <a:solidFill>
+                      <a:schemeClr val="bg1">
+                        <a:lumMod val="85000"/>
+                      </a:schemeClr>
+                    </a:solidFill>
+                    <a:latin typeface="Open Sans" panose="020B0606030504020204" pitchFamily="34" charset="0"/>
+                    <a:ea typeface="Open Sans" panose="020B0606030504020204" pitchFamily="34" charset="0"/>
+                    <a:cs typeface="Open Sans" panose="020B0606030504020204" pitchFamily="34" charset="0"/>
+                  </a:rPr>
+                  <a:t> = </a:t>
+                </a:r>
+                <a:r>
+                  <a:rPr lang="en-US" sz="1200" dirty="0" err="1">
+                    <a:solidFill>
+                      <a:schemeClr val="bg1">
+                        <a:lumMod val="85000"/>
+                      </a:schemeClr>
+                    </a:solidFill>
+                    <a:latin typeface="Open Sans" panose="020B0606030504020204" pitchFamily="34" charset="0"/>
+                    <a:ea typeface="Open Sans" panose="020B0606030504020204" pitchFamily="34" charset="0"/>
+                    <a:cs typeface="Open Sans" panose="020B0606030504020204" pitchFamily="34" charset="0"/>
+                  </a:rPr>
+                  <a:t>i</a:t>
+                </a:r>
+                <a:r>
+                  <a:rPr lang="en-US" sz="1200" dirty="0">
+                    <a:solidFill>
+                      <a:schemeClr val="bg1">
+                        <a:lumMod val="85000"/>
+                      </a:schemeClr>
+                    </a:solidFill>
+                    <a:latin typeface="Open Sans" panose="020B0606030504020204" pitchFamily="34" charset="0"/>
+                    <a:ea typeface="Open Sans" panose="020B0606030504020204" pitchFamily="34" charset="0"/>
+                    <a:cs typeface="Open Sans" panose="020B0606030504020204" pitchFamily="34" charset="0"/>
+                  </a:rPr>
+                  <a:t> + 2</a:t>
+                </a:r>
+              </a:p>
+            </p:txBody>
+          </p:sp>
+          <p:sp>
+            <p:nvSpPr>
+              <p:cNvPr id="37" name="Rectangle 36">
+                <a:extLst>
+                  <a:ext uri="{FF2B5EF4-FFF2-40B4-BE49-F238E27FC236}">
+                    <a16:creationId xmlns:a16="http://schemas.microsoft.com/office/drawing/2014/main" id="{23528CA3-0F5F-E54D-2272-AEAFD2D9C312}"/>
+                  </a:ext>
+                </a:extLst>
+              </p:cNvPr>
+              <p:cNvSpPr/>
+              <p:nvPr/>
+            </p:nvSpPr>
+            <p:spPr>
+              <a:xfrm>
+                <a:off x="5173578" y="1345321"/>
+                <a:ext cx="1844844" cy="393032"/>
+              </a:xfrm>
+              <a:prstGeom prst="rect">
+                <a:avLst/>
+              </a:prstGeom>
+              <a:noFill/>
+              <a:ln>
+                <a:solidFill>
+                  <a:schemeClr val="accent6">
+                    <a:lumMod val="60000"/>
+                    <a:lumOff val="40000"/>
+                  </a:schemeClr>
+                </a:solidFill>
+              </a:ln>
+            </p:spPr>
+            <p:style>
+              <a:lnRef idx="2">
+                <a:schemeClr val="accent1">
+                  <a:shade val="50000"/>
+                </a:schemeClr>
+              </a:lnRef>
+              <a:fillRef idx="1">
+                <a:schemeClr val="accent1"/>
+              </a:fillRef>
+              <a:effectRef idx="0">
+                <a:schemeClr val="accent1"/>
+              </a:effectRef>
+              <a:fontRef idx="minor">
+                <a:schemeClr val="lt1"/>
+              </a:fontRef>
+            </p:style>
+            <p:txBody>
+              <a:bodyPr rtlCol="0" anchor="ctr"/>
+              <a:lstStyle/>
+              <a:p>
+                <a:pPr algn="ctr"/>
+                <a:r>
+                  <a:rPr lang="en-US" sz="1200" dirty="0">
+                    <a:solidFill>
+                      <a:schemeClr val="bg1">
+                        <a:lumMod val="85000"/>
+                      </a:schemeClr>
+                    </a:solidFill>
+                    <a:latin typeface="Open Sans" panose="020B0606030504020204" pitchFamily="34" charset="0"/>
+                    <a:ea typeface="Open Sans" panose="020B0606030504020204" pitchFamily="34" charset="0"/>
+                    <a:cs typeface="Open Sans" panose="020B0606030504020204" pitchFamily="34" charset="0"/>
+                  </a:rPr>
+                  <a:t>sum = 0</a:t>
+                </a:r>
+              </a:p>
+            </p:txBody>
+          </p:sp>
+          <p:cxnSp>
+            <p:nvCxnSpPr>
+              <p:cNvPr id="7" name="Straight Arrow Connector 6">
+                <a:extLst>
+                  <a:ext uri="{FF2B5EF4-FFF2-40B4-BE49-F238E27FC236}">
+                    <a16:creationId xmlns:a16="http://schemas.microsoft.com/office/drawing/2014/main" id="{3005ECC2-3DE7-3DEE-D432-0FECF52F5A68}"/>
+                  </a:ext>
+                </a:extLst>
+              </p:cNvPr>
+              <p:cNvCxnSpPr>
+                <a:stCxn id="64" idx="3"/>
+                <a:endCxn id="37" idx="1"/>
+              </p:cNvCxnSpPr>
+              <p:nvPr/>
+            </p:nvCxnSpPr>
+            <p:spPr>
+              <a:xfrm>
+                <a:off x="4806617" y="1541837"/>
+                <a:ext cx="366961" cy="0"/>
+              </a:xfrm>
+              <a:prstGeom prst="straightConnector1">
+                <a:avLst/>
+              </a:prstGeom>
+              <a:ln w="12700">
+                <a:solidFill>
+                  <a:schemeClr val="bg1">
+                    <a:lumMod val="75000"/>
+                  </a:schemeClr>
+                </a:solidFill>
+                <a:tailEnd type="triangle"/>
+              </a:ln>
+            </p:spPr>
+            <p:style>
+              <a:lnRef idx="1">
+                <a:schemeClr val="accent1"/>
+              </a:lnRef>
+              <a:fillRef idx="0">
+                <a:schemeClr val="accent1"/>
+              </a:fillRef>
+              <a:effectRef idx="0">
+                <a:schemeClr val="accent1"/>
+              </a:effectRef>
+              <a:fontRef idx="minor">
+                <a:schemeClr val="tx1"/>
+              </a:fontRef>
+            </p:style>
+          </p:cxnSp>
+          <p:cxnSp>
+            <p:nvCxnSpPr>
+              <p:cNvPr id="9" name="Straight Arrow Connector 8">
+                <a:extLst>
+                  <a:ext uri="{FF2B5EF4-FFF2-40B4-BE49-F238E27FC236}">
+                    <a16:creationId xmlns:a16="http://schemas.microsoft.com/office/drawing/2014/main" id="{40C135DC-C24C-65CE-3DE1-ED84419025B0}"/>
+                  </a:ext>
+                </a:extLst>
+              </p:cNvPr>
+              <p:cNvCxnSpPr>
+                <a:stCxn id="67" idx="2"/>
+                <a:endCxn id="34" idx="1"/>
+              </p:cNvCxnSpPr>
+              <p:nvPr/>
+            </p:nvCxnSpPr>
+            <p:spPr>
+              <a:xfrm>
+                <a:off x="6096000" y="2981617"/>
+                <a:ext cx="0" cy="296780"/>
+              </a:xfrm>
+              <a:prstGeom prst="straightConnector1">
+                <a:avLst/>
+              </a:prstGeom>
+              <a:ln w="12700">
+                <a:solidFill>
+                  <a:srgbClr val="FF7C80"/>
+                </a:solidFill>
+                <a:tailEnd type="triangle"/>
+              </a:ln>
+            </p:spPr>
+            <p:style>
+              <a:lnRef idx="1">
+                <a:schemeClr val="accent1"/>
+              </a:lnRef>
+              <a:fillRef idx="0">
+                <a:schemeClr val="accent1"/>
+              </a:fillRef>
+              <a:effectRef idx="0">
+                <a:schemeClr val="accent1"/>
+              </a:effectRef>
+              <a:fontRef idx="minor">
+                <a:schemeClr val="tx1"/>
+              </a:fontRef>
+            </p:style>
+          </p:cxnSp>
+          <p:cxnSp>
+            <p:nvCxnSpPr>
+              <p:cNvPr id="11" name="Straight Arrow Connector 10">
+                <a:extLst>
+                  <a:ext uri="{FF2B5EF4-FFF2-40B4-BE49-F238E27FC236}">
+                    <a16:creationId xmlns:a16="http://schemas.microsoft.com/office/drawing/2014/main" id="{6230CA79-B78B-DEB3-1524-0A3C2B4CA92A}"/>
+                  </a:ext>
+                </a:extLst>
+              </p:cNvPr>
+              <p:cNvCxnSpPr>
+                <a:stCxn id="34" idx="4"/>
+                <a:endCxn id="35" idx="0"/>
+              </p:cNvCxnSpPr>
+              <p:nvPr/>
+            </p:nvCxnSpPr>
+            <p:spPr>
+              <a:xfrm>
+                <a:off x="6096000" y="3767681"/>
+                <a:ext cx="0" cy="296780"/>
+              </a:xfrm>
+              <a:prstGeom prst="straightConnector1">
+                <a:avLst/>
+              </a:prstGeom>
+              <a:ln w="12700">
+                <a:solidFill>
+                  <a:srgbClr val="CC66FF"/>
+                </a:solidFill>
+                <a:tailEnd type="triangle"/>
+              </a:ln>
+            </p:spPr>
+            <p:style>
+              <a:lnRef idx="1">
+                <a:schemeClr val="accent1"/>
+              </a:lnRef>
+              <a:fillRef idx="0">
+                <a:schemeClr val="accent1"/>
+              </a:fillRef>
+              <a:effectRef idx="0">
+                <a:schemeClr val="accent1"/>
+              </a:effectRef>
+              <a:fontRef idx="minor">
+                <a:schemeClr val="tx1"/>
+              </a:fontRef>
+            </p:style>
+          </p:cxnSp>
+          <p:cxnSp>
+            <p:nvCxnSpPr>
+              <p:cNvPr id="15" name="Straight Arrow Connector 14">
+                <a:extLst>
+                  <a:ext uri="{FF2B5EF4-FFF2-40B4-BE49-F238E27FC236}">
+                    <a16:creationId xmlns:a16="http://schemas.microsoft.com/office/drawing/2014/main" id="{12AE5968-5F41-DE31-EB3D-58F455327D09}"/>
+                  </a:ext>
+                </a:extLst>
+              </p:cNvPr>
+              <p:cNvCxnSpPr>
+                <a:stCxn id="35" idx="2"/>
+                <a:endCxn id="36" idx="0"/>
+              </p:cNvCxnSpPr>
+              <p:nvPr/>
+            </p:nvCxnSpPr>
+            <p:spPr>
+              <a:xfrm>
+                <a:off x="6096000" y="4457493"/>
+                <a:ext cx="0" cy="296780"/>
+              </a:xfrm>
+              <a:prstGeom prst="straightConnector1">
+                <a:avLst/>
+              </a:prstGeom>
+              <a:ln w="12700">
+                <a:solidFill>
+                  <a:schemeClr val="bg1">
+                    <a:lumMod val="75000"/>
+                  </a:schemeClr>
+                </a:solidFill>
+                <a:tailEnd type="triangle"/>
+              </a:ln>
+            </p:spPr>
+            <p:style>
+              <a:lnRef idx="1">
+                <a:schemeClr val="accent1"/>
+              </a:lnRef>
+              <a:fillRef idx="0">
+                <a:schemeClr val="accent1"/>
+              </a:fillRef>
+              <a:effectRef idx="0">
+                <a:schemeClr val="accent1"/>
+              </a:effectRef>
+              <a:fontRef idx="minor">
+                <a:schemeClr val="tx1"/>
+              </a:fontRef>
+            </p:style>
+          </p:cxnSp>
+          <p:cxnSp>
+            <p:nvCxnSpPr>
+              <p:cNvPr id="17" name="Connector: Elbow 16">
+                <a:extLst>
+                  <a:ext uri="{FF2B5EF4-FFF2-40B4-BE49-F238E27FC236}">
+                    <a16:creationId xmlns:a16="http://schemas.microsoft.com/office/drawing/2014/main" id="{F8617AEC-E163-710B-EC68-E8241241C06D}"/>
+                  </a:ext>
+                </a:extLst>
+              </p:cNvPr>
+              <p:cNvCxnSpPr>
+                <a:stCxn id="36" idx="2"/>
+                <a:endCxn id="67" idx="1"/>
+              </p:cNvCxnSpPr>
+              <p:nvPr/>
+            </p:nvCxnSpPr>
+            <p:spPr>
+              <a:xfrm rot="5400000" flipH="1">
+                <a:off x="4315324" y="3366629"/>
+                <a:ext cx="2638930" cy="922422"/>
+              </a:xfrm>
+              <a:prstGeom prst="bentConnector4">
+                <a:avLst>
+                  <a:gd name="adj1" fmla="val -8663"/>
+                  <a:gd name="adj2" fmla="val 149131"/>
+                </a:avLst>
+              </a:prstGeom>
+              <a:ln w="12700">
+                <a:solidFill>
+                  <a:schemeClr val="bg1">
+                    <a:lumMod val="75000"/>
+                  </a:schemeClr>
+                </a:solidFill>
+                <a:tailEnd type="triangle"/>
+              </a:ln>
+            </p:spPr>
+            <p:style>
+              <a:lnRef idx="1">
+                <a:schemeClr val="accent1"/>
+              </a:lnRef>
+              <a:fillRef idx="0">
+                <a:schemeClr val="accent1"/>
+              </a:fillRef>
+              <a:effectRef idx="0">
+                <a:schemeClr val="accent1"/>
+              </a:effectRef>
+              <a:fontRef idx="minor">
+                <a:schemeClr val="tx1"/>
+              </a:fontRef>
+            </p:style>
+          </p:cxnSp>
+          <p:cxnSp>
+            <p:nvCxnSpPr>
+              <p:cNvPr id="21" name="Connector: Elbow 20">
+                <a:extLst>
+                  <a:ext uri="{FF2B5EF4-FFF2-40B4-BE49-F238E27FC236}">
+                    <a16:creationId xmlns:a16="http://schemas.microsoft.com/office/drawing/2014/main" id="{CD090BE0-3FB9-1414-2C27-9D88E06AE6E9}"/>
+                  </a:ext>
+                </a:extLst>
+              </p:cNvPr>
+              <p:cNvCxnSpPr>
+                <a:stCxn id="67" idx="3"/>
+                <a:endCxn id="75" idx="4"/>
+              </p:cNvCxnSpPr>
+              <p:nvPr/>
+            </p:nvCxnSpPr>
+            <p:spPr>
+              <a:xfrm flipV="1">
+                <a:off x="7018422" y="1834605"/>
+                <a:ext cx="1289383" cy="673770"/>
+              </a:xfrm>
+              <a:prstGeom prst="bentConnector2">
+                <a:avLst/>
+              </a:prstGeom>
+              <a:ln w="12700">
+                <a:solidFill>
+                  <a:srgbClr val="FF7C80"/>
+                </a:solidFill>
+                <a:tailEnd type="triangle"/>
+              </a:ln>
+            </p:spPr>
+            <p:style>
+              <a:lnRef idx="1">
+                <a:schemeClr val="accent1"/>
+              </a:lnRef>
+              <a:fillRef idx="0">
+                <a:schemeClr val="accent1"/>
+              </a:fillRef>
+              <a:effectRef idx="0">
+                <a:schemeClr val="accent1"/>
+              </a:effectRef>
+              <a:fontRef idx="minor">
+                <a:schemeClr val="tx1"/>
+              </a:fontRef>
+            </p:style>
+          </p:cxnSp>
+          <p:cxnSp>
+            <p:nvCxnSpPr>
+              <p:cNvPr id="23" name="Straight Arrow Connector 22">
+                <a:extLst>
+                  <a:ext uri="{FF2B5EF4-FFF2-40B4-BE49-F238E27FC236}">
+                    <a16:creationId xmlns:a16="http://schemas.microsoft.com/office/drawing/2014/main" id="{17A29C5F-EAC5-F8E8-D1A0-D7DC353B7D7F}"/>
+                  </a:ext>
+                </a:extLst>
+              </p:cNvPr>
+              <p:cNvCxnSpPr>
+                <a:stCxn id="75" idx="1"/>
+                <a:endCxn id="60" idx="2"/>
+              </p:cNvCxnSpPr>
+              <p:nvPr/>
+            </p:nvCxnSpPr>
+            <p:spPr>
+              <a:xfrm flipH="1" flipV="1">
+                <a:off x="8307804" y="1048541"/>
+                <a:ext cx="1" cy="296780"/>
+              </a:xfrm>
+              <a:prstGeom prst="straightConnector1">
+                <a:avLst/>
+              </a:prstGeom>
+              <a:ln w="12700">
+                <a:solidFill>
+                  <a:schemeClr val="bg1">
+                    <a:lumMod val="75000"/>
+                  </a:schemeClr>
+                </a:solidFill>
+                <a:tailEnd type="triangle"/>
+              </a:ln>
+            </p:spPr>
+            <p:style>
+              <a:lnRef idx="1">
+                <a:schemeClr val="accent1"/>
+              </a:lnRef>
+              <a:fillRef idx="0">
+                <a:schemeClr val="accent1"/>
+              </a:fillRef>
+              <a:effectRef idx="0">
+                <a:schemeClr val="accent1"/>
+              </a:effectRef>
+              <a:fontRef idx="minor">
+                <a:schemeClr val="tx1"/>
+              </a:fontRef>
+            </p:style>
+          </p:cxnSp>
+          <p:sp>
+            <p:nvSpPr>
+              <p:cNvPr id="56" name="TextBox 55">
+                <a:extLst>
+                  <a:ext uri="{FF2B5EF4-FFF2-40B4-BE49-F238E27FC236}">
+                    <a16:creationId xmlns:a16="http://schemas.microsoft.com/office/drawing/2014/main" id="{A55BD023-459D-2AAA-69ED-17610668702B}"/>
+                  </a:ext>
+                </a:extLst>
+              </p:cNvPr>
+              <p:cNvSpPr txBox="1"/>
+              <p:nvPr/>
+            </p:nvSpPr>
+            <p:spPr>
+              <a:xfrm>
+                <a:off x="7018421" y="2231376"/>
+                <a:ext cx="269626" cy="276999"/>
+              </a:xfrm>
+              <a:prstGeom prst="rect">
+                <a:avLst/>
+              </a:prstGeom>
+              <a:noFill/>
+            </p:spPr>
+            <p:txBody>
+              <a:bodyPr wrap="none" rtlCol="0">
+                <a:spAutoFit/>
+              </a:bodyPr>
+              <a:lstStyle/>
+              <a:p>
+                <a:r>
+                  <a:rPr lang="en-US" sz="1200" dirty="0">
+                    <a:solidFill>
+                      <a:srgbClr val="FF7C80"/>
+                    </a:solidFill>
+                    <a:latin typeface="Open Sans" panose="020B0606030504020204" pitchFamily="34" charset="0"/>
+                    <a:ea typeface="Open Sans" panose="020B0606030504020204" pitchFamily="34" charset="0"/>
+                    <a:cs typeface="Open Sans" panose="020B0606030504020204" pitchFamily="34" charset="0"/>
+                  </a:rPr>
+                  <a:t>F</a:t>
+                </a:r>
+              </a:p>
+            </p:txBody>
+          </p:sp>
+          <p:sp>
+            <p:nvSpPr>
+              <p:cNvPr id="57" name="TextBox 56">
+                <a:extLst>
+                  <a:ext uri="{FF2B5EF4-FFF2-40B4-BE49-F238E27FC236}">
+                    <a16:creationId xmlns:a16="http://schemas.microsoft.com/office/drawing/2014/main" id="{9C2FBB7E-F1C0-C575-D7BA-55AD0E300D41}"/>
+                  </a:ext>
+                </a:extLst>
+              </p:cNvPr>
+              <p:cNvSpPr txBox="1"/>
+              <p:nvPr/>
+            </p:nvSpPr>
+            <p:spPr>
+              <a:xfrm>
+                <a:off x="6095999" y="2981617"/>
+                <a:ext cx="269626" cy="276999"/>
+              </a:xfrm>
+              <a:prstGeom prst="rect">
+                <a:avLst/>
+              </a:prstGeom>
+              <a:noFill/>
+            </p:spPr>
+            <p:txBody>
+              <a:bodyPr wrap="none" rtlCol="0">
+                <a:spAutoFit/>
+              </a:bodyPr>
+              <a:lstStyle/>
+              <a:p>
+                <a:r>
+                  <a:rPr lang="en-US" sz="1200" dirty="0">
+                    <a:solidFill>
+                      <a:srgbClr val="FF7C80"/>
+                    </a:solidFill>
+                    <a:latin typeface="Open Sans" panose="020B0606030504020204" pitchFamily="34" charset="0"/>
+                    <a:ea typeface="Open Sans" panose="020B0606030504020204" pitchFamily="34" charset="0"/>
+                    <a:cs typeface="Open Sans" panose="020B0606030504020204" pitchFamily="34" charset="0"/>
+                  </a:rPr>
+                  <a:t>T</a:t>
+                </a:r>
+              </a:p>
+            </p:txBody>
+          </p:sp>
+        </p:grpSp>
+      </p:grpSp>
+    </p:spTree>
+    <p:extLst>
+      <p:ext uri="{BB962C8B-B14F-4D97-AF65-F5344CB8AC3E}">
+        <p14:creationId xmlns:p14="http://schemas.microsoft.com/office/powerpoint/2010/main" val="1080749222"/>
+      </p:ext>
+    </p:extLst>
+  </p:cSld>
+  <p:clrMapOvr>
+    <a:masterClrMapping/>
+  </p:clrMapOvr>
+</p:sld>
+</file>
+
 <file path=ppt/theme/theme1.xml><?xml version="1.0" encoding="utf-8"?>
 <a:theme xmlns:a="http://schemas.openxmlformats.org/drawingml/2006/main" name="Office Theme">
   <a:themeElements>

</xml_diff>

<commit_message>
Added Flowchart for PSPM1920 Q4
</commit_message>
<xml_diff>
--- a/Past Year Theory Questions/Resources/resources.pptx
+++ b/Past Year Theory Questions/Resources/resources.pptx
@@ -8,6 +8,7 @@
     <p:sldId id="257" r:id="rId2"/>
     <p:sldId id="258" r:id="rId3"/>
     <p:sldId id="259" r:id="rId4"/>
+    <p:sldId id="260" r:id="rId5"/>
   </p:sldIdLst>
   <p:sldSz cx="12192000" cy="6858000"/>
   <p:notesSz cx="6858000" cy="9144000"/>
@@ -261,7 +262,7 @@
           <a:p>
             <a:fld id="{34BBF2E1-1C0D-4B66-AD27-CA9E57E33A5F}" type="datetimeFigureOut">
               <a:rPr lang="en-US" smtClean="0"/>
-              <a:t>03-May-22</a:t>
+              <a:t>05-May-22</a:t>
             </a:fld>
             <a:endParaRPr lang="en-US"/>
           </a:p>
@@ -459,7 +460,7 @@
           <a:p>
             <a:fld id="{34BBF2E1-1C0D-4B66-AD27-CA9E57E33A5F}" type="datetimeFigureOut">
               <a:rPr lang="en-US" smtClean="0"/>
-              <a:t>03-May-22</a:t>
+              <a:t>05-May-22</a:t>
             </a:fld>
             <a:endParaRPr lang="en-US"/>
           </a:p>
@@ -667,7 +668,7 @@
           <a:p>
             <a:fld id="{34BBF2E1-1C0D-4B66-AD27-CA9E57E33A5F}" type="datetimeFigureOut">
               <a:rPr lang="en-US" smtClean="0"/>
-              <a:t>03-May-22</a:t>
+              <a:t>05-May-22</a:t>
             </a:fld>
             <a:endParaRPr lang="en-US"/>
           </a:p>
@@ -865,7 +866,7 @@
           <a:p>
             <a:fld id="{34BBF2E1-1C0D-4B66-AD27-CA9E57E33A5F}" type="datetimeFigureOut">
               <a:rPr lang="en-US" smtClean="0"/>
-              <a:t>03-May-22</a:t>
+              <a:t>05-May-22</a:t>
             </a:fld>
             <a:endParaRPr lang="en-US"/>
           </a:p>
@@ -1140,7 +1141,7 @@
           <a:p>
             <a:fld id="{34BBF2E1-1C0D-4B66-AD27-CA9E57E33A5F}" type="datetimeFigureOut">
               <a:rPr lang="en-US" smtClean="0"/>
-              <a:t>03-May-22</a:t>
+              <a:t>05-May-22</a:t>
             </a:fld>
             <a:endParaRPr lang="en-US"/>
           </a:p>
@@ -1405,7 +1406,7 @@
           <a:p>
             <a:fld id="{34BBF2E1-1C0D-4B66-AD27-CA9E57E33A5F}" type="datetimeFigureOut">
               <a:rPr lang="en-US" smtClean="0"/>
-              <a:t>03-May-22</a:t>
+              <a:t>05-May-22</a:t>
             </a:fld>
             <a:endParaRPr lang="en-US"/>
           </a:p>
@@ -1817,7 +1818,7 @@
           <a:p>
             <a:fld id="{34BBF2E1-1C0D-4B66-AD27-CA9E57E33A5F}" type="datetimeFigureOut">
               <a:rPr lang="en-US" smtClean="0"/>
-              <a:t>03-May-22</a:t>
+              <a:t>05-May-22</a:t>
             </a:fld>
             <a:endParaRPr lang="en-US"/>
           </a:p>
@@ -1958,7 +1959,7 @@
           <a:p>
             <a:fld id="{34BBF2E1-1C0D-4B66-AD27-CA9E57E33A5F}" type="datetimeFigureOut">
               <a:rPr lang="en-US" smtClean="0"/>
-              <a:t>03-May-22</a:t>
+              <a:t>05-May-22</a:t>
             </a:fld>
             <a:endParaRPr lang="en-US"/>
           </a:p>
@@ -2071,7 +2072,7 @@
           <a:p>
             <a:fld id="{34BBF2E1-1C0D-4B66-AD27-CA9E57E33A5F}" type="datetimeFigureOut">
               <a:rPr lang="en-US" smtClean="0"/>
-              <a:t>03-May-22</a:t>
+              <a:t>05-May-22</a:t>
             </a:fld>
             <a:endParaRPr lang="en-US"/>
           </a:p>
@@ -2382,7 +2383,7 @@
           <a:p>
             <a:fld id="{34BBF2E1-1C0D-4B66-AD27-CA9E57E33A5F}" type="datetimeFigureOut">
               <a:rPr lang="en-US" smtClean="0"/>
-              <a:t>03-May-22</a:t>
+              <a:t>05-May-22</a:t>
             </a:fld>
             <a:endParaRPr lang="en-US"/>
           </a:p>
@@ -2670,7 +2671,7 @@
           <a:p>
             <a:fld id="{34BBF2E1-1C0D-4B66-AD27-CA9E57E33A5F}" type="datetimeFigureOut">
               <a:rPr lang="en-US" smtClean="0"/>
-              <a:t>03-May-22</a:t>
+              <a:t>05-May-22</a:t>
             </a:fld>
             <a:endParaRPr lang="en-US"/>
           </a:p>
@@ -2911,7 +2912,7 @@
           <a:p>
             <a:fld id="{34BBF2E1-1C0D-4B66-AD27-CA9E57E33A5F}" type="datetimeFigureOut">
               <a:rPr lang="en-US" smtClean="0"/>
-              <a:t>03-May-22</a:t>
+              <a:t>05-May-22</a:t>
             </a:fld>
             <a:endParaRPr lang="en-US"/>
           </a:p>
@@ -8179,6 +8180,921 @@
 </p:sld>
 </file>
 
+<file path=ppt/slides/slide4.xml><?xml version="1.0" encoding="utf-8"?>
+<p:sld xmlns:a="http://schemas.openxmlformats.org/drawingml/2006/main" xmlns:r="http://schemas.openxmlformats.org/officeDocument/2006/relationships" xmlns:p="http://schemas.openxmlformats.org/presentationml/2006/main">
+  <p:cSld>
+    <p:spTree>
+      <p:nvGrpSpPr>
+        <p:cNvPr id="1" name=""/>
+        <p:cNvGrpSpPr/>
+        <p:nvPr/>
+      </p:nvGrpSpPr>
+      <p:grpSpPr>
+        <a:xfrm>
+          <a:off x="0" y="0"/>
+          <a:ext cx="0" cy="0"/>
+          <a:chOff x="0" y="0"/>
+          <a:chExt cx="0" cy="0"/>
+        </a:xfrm>
+      </p:grpSpPr>
+      <p:grpSp>
+        <p:nvGrpSpPr>
+          <p:cNvPr id="19" name="Group 18">
+            <a:extLst>
+              <a:ext uri="{FF2B5EF4-FFF2-40B4-BE49-F238E27FC236}">
+                <a16:creationId xmlns:a16="http://schemas.microsoft.com/office/drawing/2014/main" id="{8923718F-75CD-ADB8-FAF4-B06928EFF083}"/>
+              </a:ext>
+            </a:extLst>
+          </p:cNvPr>
+          <p:cNvGrpSpPr/>
+          <p:nvPr/>
+        </p:nvGrpSpPr>
+        <p:grpSpPr>
+          <a:xfrm>
+            <a:off x="2594810" y="1748589"/>
+            <a:ext cx="7002379" cy="3360822"/>
+            <a:chOff x="1921041" y="729915"/>
+            <a:chExt cx="7002379" cy="3360822"/>
+          </a:xfrm>
+        </p:grpSpPr>
+        <p:sp>
+          <p:nvSpPr>
+            <p:cNvPr id="108" name="Rectangle 107">
+              <a:extLst>
+                <a:ext uri="{FF2B5EF4-FFF2-40B4-BE49-F238E27FC236}">
+                  <a16:creationId xmlns:a16="http://schemas.microsoft.com/office/drawing/2014/main" id="{F5A5FD62-A99C-04B6-706B-DEE9B81AF541}"/>
+                </a:ext>
+              </a:extLst>
+            </p:cNvPr>
+            <p:cNvSpPr/>
+            <p:nvPr/>
+          </p:nvSpPr>
+          <p:spPr>
+            <a:xfrm>
+              <a:off x="1921041" y="729915"/>
+              <a:ext cx="7002379" cy="3360822"/>
+            </a:xfrm>
+            <a:prstGeom prst="rect">
+              <a:avLst/>
+            </a:prstGeom>
+            <a:solidFill>
+              <a:schemeClr val="tx1">
+                <a:lumMod val="85000"/>
+                <a:lumOff val="15000"/>
+              </a:schemeClr>
+            </a:solidFill>
+            <a:ln>
+              <a:noFill/>
+            </a:ln>
+          </p:spPr>
+          <p:style>
+            <a:lnRef idx="2">
+              <a:schemeClr val="accent1">
+                <a:shade val="50000"/>
+              </a:schemeClr>
+            </a:lnRef>
+            <a:fillRef idx="1">
+              <a:schemeClr val="accent1"/>
+            </a:fillRef>
+            <a:effectRef idx="0">
+              <a:schemeClr val="accent1"/>
+            </a:effectRef>
+            <a:fontRef idx="minor">
+              <a:schemeClr val="lt1"/>
+            </a:fontRef>
+          </p:style>
+          <p:txBody>
+            <a:bodyPr rtlCol="0" anchor="ctr"/>
+            <a:lstStyle/>
+            <a:p>
+              <a:pPr algn="ctr"/>
+              <a:endParaRPr lang="en-US" dirty="0"/>
+            </a:p>
+          </p:txBody>
+        </p:sp>
+        <p:sp>
+          <p:nvSpPr>
+            <p:cNvPr id="59" name="Flowchart: Terminator 58">
+              <a:extLst>
+                <a:ext uri="{FF2B5EF4-FFF2-40B4-BE49-F238E27FC236}">
+                  <a16:creationId xmlns:a16="http://schemas.microsoft.com/office/drawing/2014/main" id="{D7554AAC-5F81-46CA-BA4E-6CDF6B8CC5AD}"/>
+                </a:ext>
+              </a:extLst>
+            </p:cNvPr>
+            <p:cNvSpPr/>
+            <p:nvPr/>
+          </p:nvSpPr>
+          <p:spPr>
+            <a:xfrm>
+              <a:off x="2685047" y="1096667"/>
+              <a:ext cx="1050758" cy="341690"/>
+            </a:xfrm>
+            <a:prstGeom prst="flowChartTerminator">
+              <a:avLst/>
+            </a:prstGeom>
+            <a:noFill/>
+            <a:ln>
+              <a:solidFill>
+                <a:schemeClr val="bg1">
+                  <a:lumMod val="75000"/>
+                </a:schemeClr>
+              </a:solidFill>
+            </a:ln>
+          </p:spPr>
+          <p:style>
+            <a:lnRef idx="2">
+              <a:schemeClr val="accent1">
+                <a:shade val="50000"/>
+              </a:schemeClr>
+            </a:lnRef>
+            <a:fillRef idx="1">
+              <a:schemeClr val="accent1"/>
+            </a:fillRef>
+            <a:effectRef idx="0">
+              <a:schemeClr val="accent1"/>
+            </a:effectRef>
+            <a:fontRef idx="minor">
+              <a:schemeClr val="lt1"/>
+            </a:fontRef>
+          </p:style>
+          <p:txBody>
+            <a:bodyPr rtlCol="0" anchor="ctr"/>
+            <a:lstStyle/>
+            <a:p>
+              <a:pPr algn="ctr"/>
+              <a:r>
+                <a:rPr lang="en-US" sz="1200" dirty="0">
+                  <a:solidFill>
+                    <a:schemeClr val="bg1">
+                      <a:lumMod val="85000"/>
+                    </a:schemeClr>
+                  </a:solidFill>
+                  <a:latin typeface="Open Sans" panose="020B0606030504020204" pitchFamily="34" charset="0"/>
+                  <a:ea typeface="Open Sans" panose="020B0606030504020204" pitchFamily="34" charset="0"/>
+                  <a:cs typeface="Open Sans" panose="020B0606030504020204" pitchFamily="34" charset="0"/>
+                </a:rPr>
+                <a:t>Start</a:t>
+              </a:r>
+            </a:p>
+          </p:txBody>
+        </p:sp>
+        <p:sp>
+          <p:nvSpPr>
+            <p:cNvPr id="60" name="Flowchart: Terminator 59">
+              <a:extLst>
+                <a:ext uri="{FF2B5EF4-FFF2-40B4-BE49-F238E27FC236}">
+                  <a16:creationId xmlns:a16="http://schemas.microsoft.com/office/drawing/2014/main" id="{103191FC-37A5-724C-C214-882B4B9F6C89}"/>
+                </a:ext>
+              </a:extLst>
+            </p:cNvPr>
+            <p:cNvSpPr/>
+            <p:nvPr/>
+          </p:nvSpPr>
+          <p:spPr>
+            <a:xfrm>
+              <a:off x="7108656" y="1096667"/>
+              <a:ext cx="1050758" cy="341690"/>
+            </a:xfrm>
+            <a:prstGeom prst="flowChartTerminator">
+              <a:avLst/>
+            </a:prstGeom>
+            <a:noFill/>
+            <a:ln>
+              <a:solidFill>
+                <a:schemeClr val="bg1">
+                  <a:lumMod val="75000"/>
+                </a:schemeClr>
+              </a:solidFill>
+            </a:ln>
+          </p:spPr>
+          <p:style>
+            <a:lnRef idx="2">
+              <a:schemeClr val="accent1">
+                <a:shade val="50000"/>
+              </a:schemeClr>
+            </a:lnRef>
+            <a:fillRef idx="1">
+              <a:schemeClr val="accent1"/>
+            </a:fillRef>
+            <a:effectRef idx="0">
+              <a:schemeClr val="accent1"/>
+            </a:effectRef>
+            <a:fontRef idx="minor">
+              <a:schemeClr val="lt1"/>
+            </a:fontRef>
+          </p:style>
+          <p:txBody>
+            <a:bodyPr rtlCol="0" anchor="ctr"/>
+            <a:lstStyle/>
+            <a:p>
+              <a:pPr algn="ctr"/>
+              <a:r>
+                <a:rPr lang="en-US" sz="1200" dirty="0">
+                  <a:solidFill>
+                    <a:schemeClr val="bg1">
+                      <a:lumMod val="85000"/>
+                    </a:schemeClr>
+                  </a:solidFill>
+                  <a:latin typeface="Open Sans" panose="020B0606030504020204" pitchFamily="34" charset="0"/>
+                  <a:ea typeface="Open Sans" panose="020B0606030504020204" pitchFamily="34" charset="0"/>
+                  <a:cs typeface="Open Sans" panose="020B0606030504020204" pitchFamily="34" charset="0"/>
+                </a:rPr>
+                <a:t>Stop</a:t>
+              </a:r>
+            </a:p>
+          </p:txBody>
+        </p:sp>
+        <p:cxnSp>
+          <p:nvCxnSpPr>
+            <p:cNvPr id="61" name="Straight Arrow Connector 60">
+              <a:extLst>
+                <a:ext uri="{FF2B5EF4-FFF2-40B4-BE49-F238E27FC236}">
+                  <a16:creationId xmlns:a16="http://schemas.microsoft.com/office/drawing/2014/main" id="{A1BBCFB3-141A-F3B8-67BE-C05995E64053}"/>
+                </a:ext>
+              </a:extLst>
+            </p:cNvPr>
+            <p:cNvCxnSpPr>
+              <a:cxnSpLocks/>
+              <a:stCxn id="59" idx="2"/>
+            </p:cNvCxnSpPr>
+            <p:nvPr/>
+          </p:nvCxnSpPr>
+          <p:spPr>
+            <a:xfrm>
+              <a:off x="3210426" y="1438357"/>
+              <a:ext cx="0" cy="296780"/>
+            </a:xfrm>
+            <a:prstGeom prst="straightConnector1">
+              <a:avLst/>
+            </a:prstGeom>
+            <a:ln w="12700">
+              <a:solidFill>
+                <a:schemeClr val="bg1">
+                  <a:lumMod val="75000"/>
+                </a:schemeClr>
+              </a:solidFill>
+              <a:tailEnd type="triangle"/>
+            </a:ln>
+          </p:spPr>
+          <p:style>
+            <a:lnRef idx="1">
+              <a:schemeClr val="accent1"/>
+            </a:lnRef>
+            <a:fillRef idx="0">
+              <a:schemeClr val="accent1"/>
+            </a:fillRef>
+            <a:effectRef idx="0">
+              <a:schemeClr val="accent1"/>
+            </a:effectRef>
+            <a:fontRef idx="minor">
+              <a:schemeClr val="tx1"/>
+            </a:fontRef>
+          </p:style>
+        </p:cxnSp>
+        <p:sp>
+          <p:nvSpPr>
+            <p:cNvPr id="67" name="Flowchart: Decision 66">
+              <a:extLst>
+                <a:ext uri="{FF2B5EF4-FFF2-40B4-BE49-F238E27FC236}">
+                  <a16:creationId xmlns:a16="http://schemas.microsoft.com/office/drawing/2014/main" id="{A3DDEFFD-6E92-1CB4-EE4D-6CD3E04860A6}"/>
+                </a:ext>
+              </a:extLst>
+            </p:cNvPr>
+            <p:cNvSpPr/>
+            <p:nvPr/>
+          </p:nvSpPr>
+          <p:spPr>
+            <a:xfrm>
+              <a:off x="2288004" y="2498427"/>
+              <a:ext cx="1844844" cy="946484"/>
+            </a:xfrm>
+            <a:prstGeom prst="flowChartDecision">
+              <a:avLst/>
+            </a:prstGeom>
+            <a:noFill/>
+            <a:ln>
+              <a:solidFill>
+                <a:srgbClr val="FF7C80"/>
+              </a:solidFill>
+            </a:ln>
+          </p:spPr>
+          <p:style>
+            <a:lnRef idx="2">
+              <a:schemeClr val="accent1">
+                <a:shade val="50000"/>
+              </a:schemeClr>
+            </a:lnRef>
+            <a:fillRef idx="1">
+              <a:schemeClr val="accent1"/>
+            </a:fillRef>
+            <a:effectRef idx="0">
+              <a:schemeClr val="accent1"/>
+            </a:effectRef>
+            <a:fontRef idx="minor">
+              <a:schemeClr val="lt1"/>
+            </a:fontRef>
+          </p:style>
+          <p:txBody>
+            <a:bodyPr rtlCol="0" anchor="ctr"/>
+            <a:lstStyle/>
+            <a:p>
+              <a:pPr algn="ctr"/>
+              <a:endParaRPr lang="en-US" sz="1200" dirty="0">
+                <a:solidFill>
+                  <a:schemeClr val="bg1">
+                    <a:lumMod val="85000"/>
+                  </a:schemeClr>
+                </a:solidFill>
+                <a:latin typeface="Open Sans" panose="020B0606030504020204" pitchFamily="34" charset="0"/>
+                <a:ea typeface="Open Sans" panose="020B0606030504020204" pitchFamily="34" charset="0"/>
+                <a:cs typeface="Open Sans" panose="020B0606030504020204" pitchFamily="34" charset="0"/>
+              </a:endParaRPr>
+            </a:p>
+          </p:txBody>
+        </p:sp>
+        <p:sp>
+          <p:nvSpPr>
+            <p:cNvPr id="75" name="Flowchart: Data 74">
+              <a:extLst>
+                <a:ext uri="{FF2B5EF4-FFF2-40B4-BE49-F238E27FC236}">
+                  <a16:creationId xmlns:a16="http://schemas.microsoft.com/office/drawing/2014/main" id="{684F63EE-4E36-A045-0D95-769D7FC961BB}"/>
+                </a:ext>
+              </a:extLst>
+            </p:cNvPr>
+            <p:cNvSpPr/>
+            <p:nvPr/>
+          </p:nvSpPr>
+          <p:spPr>
+            <a:xfrm>
+              <a:off x="6711614" y="1735137"/>
+              <a:ext cx="1844844" cy="489284"/>
+            </a:xfrm>
+            <a:prstGeom prst="flowChartInputOutput">
+              <a:avLst/>
+            </a:prstGeom>
+            <a:noFill/>
+            <a:ln>
+              <a:solidFill>
+                <a:srgbClr val="CC99FF"/>
+              </a:solidFill>
+            </a:ln>
+          </p:spPr>
+          <p:style>
+            <a:lnRef idx="2">
+              <a:schemeClr val="accent1">
+                <a:shade val="50000"/>
+              </a:schemeClr>
+            </a:lnRef>
+            <a:fillRef idx="1">
+              <a:schemeClr val="accent1"/>
+            </a:fillRef>
+            <a:effectRef idx="0">
+              <a:schemeClr val="accent1"/>
+            </a:effectRef>
+            <a:fontRef idx="minor">
+              <a:schemeClr val="lt1"/>
+            </a:fontRef>
+          </p:style>
+          <p:txBody>
+            <a:bodyPr rtlCol="0" anchor="ctr"/>
+            <a:lstStyle/>
+            <a:p>
+              <a:pPr algn="ctr"/>
+              <a:r>
+                <a:rPr lang="en-US" sz="1200" dirty="0">
+                  <a:solidFill>
+                    <a:schemeClr val="bg1">
+                      <a:lumMod val="85000"/>
+                    </a:schemeClr>
+                  </a:solidFill>
+                  <a:latin typeface="Open Sans" panose="020B0606030504020204" pitchFamily="34" charset="0"/>
+                  <a:ea typeface="Open Sans" panose="020B0606030504020204" pitchFamily="34" charset="0"/>
+                  <a:cs typeface="Open Sans" panose="020B0606030504020204" pitchFamily="34" charset="0"/>
+                </a:rPr>
+                <a:t>Print “Weekends”</a:t>
+              </a:r>
+            </a:p>
+          </p:txBody>
+        </p:sp>
+        <p:sp>
+          <p:nvSpPr>
+            <p:cNvPr id="34" name="Flowchart: Data 33">
+              <a:extLst>
+                <a:ext uri="{FF2B5EF4-FFF2-40B4-BE49-F238E27FC236}">
+                  <a16:creationId xmlns:a16="http://schemas.microsoft.com/office/drawing/2014/main" id="{C068F42B-FC9B-7C07-A3C3-5B6E85BF9353}"/>
+                </a:ext>
+              </a:extLst>
+            </p:cNvPr>
+            <p:cNvSpPr/>
+            <p:nvPr/>
+          </p:nvSpPr>
+          <p:spPr>
+            <a:xfrm>
+              <a:off x="4499807" y="1729706"/>
+              <a:ext cx="1844844" cy="489284"/>
+            </a:xfrm>
+            <a:prstGeom prst="flowChartInputOutput">
+              <a:avLst/>
+            </a:prstGeom>
+            <a:noFill/>
+            <a:ln>
+              <a:solidFill>
+                <a:srgbClr val="CC99FF"/>
+              </a:solidFill>
+            </a:ln>
+          </p:spPr>
+          <p:style>
+            <a:lnRef idx="2">
+              <a:schemeClr val="accent1">
+                <a:shade val="50000"/>
+              </a:schemeClr>
+            </a:lnRef>
+            <a:fillRef idx="1">
+              <a:schemeClr val="accent1"/>
+            </a:fillRef>
+            <a:effectRef idx="0">
+              <a:schemeClr val="accent1"/>
+            </a:effectRef>
+            <a:fontRef idx="minor">
+              <a:schemeClr val="lt1"/>
+            </a:fontRef>
+          </p:style>
+          <p:txBody>
+            <a:bodyPr rtlCol="0" anchor="ctr"/>
+            <a:lstStyle/>
+            <a:p>
+              <a:pPr algn="ctr"/>
+              <a:r>
+                <a:rPr lang="en-US" sz="1200" dirty="0">
+                  <a:solidFill>
+                    <a:schemeClr val="bg1">
+                      <a:lumMod val="85000"/>
+                    </a:schemeClr>
+                  </a:solidFill>
+                  <a:latin typeface="Open Sans" panose="020B0606030504020204" pitchFamily="34" charset="0"/>
+                  <a:ea typeface="Open Sans" panose="020B0606030504020204" pitchFamily="34" charset="0"/>
+                  <a:cs typeface="Open Sans" panose="020B0606030504020204" pitchFamily="34" charset="0"/>
+                </a:rPr>
+                <a:t>Print “Weekdays”</a:t>
+              </a:r>
+            </a:p>
+          </p:txBody>
+        </p:sp>
+        <p:sp>
+          <p:nvSpPr>
+            <p:cNvPr id="56" name="TextBox 55">
+              <a:extLst>
+                <a:ext uri="{FF2B5EF4-FFF2-40B4-BE49-F238E27FC236}">
+                  <a16:creationId xmlns:a16="http://schemas.microsoft.com/office/drawing/2014/main" id="{A55BD023-459D-2AAA-69ED-17610668702B}"/>
+                </a:ext>
+              </a:extLst>
+            </p:cNvPr>
+            <p:cNvSpPr txBox="1"/>
+            <p:nvPr/>
+          </p:nvSpPr>
+          <p:spPr>
+            <a:xfrm>
+              <a:off x="4132847" y="2694670"/>
+              <a:ext cx="269626" cy="276999"/>
+            </a:xfrm>
+            <a:prstGeom prst="rect">
+              <a:avLst/>
+            </a:prstGeom>
+            <a:noFill/>
+          </p:spPr>
+          <p:txBody>
+            <a:bodyPr wrap="none" rtlCol="0">
+              <a:spAutoFit/>
+            </a:bodyPr>
+            <a:lstStyle/>
+            <a:p>
+              <a:r>
+                <a:rPr lang="en-US" sz="1200" dirty="0">
+                  <a:solidFill>
+                    <a:srgbClr val="FF7C80"/>
+                  </a:solidFill>
+                  <a:latin typeface="Open Sans" panose="020B0606030504020204" pitchFamily="34" charset="0"/>
+                  <a:ea typeface="Open Sans" panose="020B0606030504020204" pitchFamily="34" charset="0"/>
+                  <a:cs typeface="Open Sans" panose="020B0606030504020204" pitchFamily="34" charset="0"/>
+                </a:rPr>
+                <a:t>F</a:t>
+              </a:r>
+            </a:p>
+          </p:txBody>
+        </p:sp>
+        <p:sp>
+          <p:nvSpPr>
+            <p:cNvPr id="57" name="TextBox 56">
+              <a:extLst>
+                <a:ext uri="{FF2B5EF4-FFF2-40B4-BE49-F238E27FC236}">
+                  <a16:creationId xmlns:a16="http://schemas.microsoft.com/office/drawing/2014/main" id="{9C2FBB7E-F1C0-C575-D7BA-55AD0E300D41}"/>
+                </a:ext>
+              </a:extLst>
+            </p:cNvPr>
+            <p:cNvSpPr txBox="1"/>
+            <p:nvPr/>
+          </p:nvSpPr>
+          <p:spPr>
+            <a:xfrm>
+              <a:off x="2936164" y="3444911"/>
+              <a:ext cx="269626" cy="276999"/>
+            </a:xfrm>
+            <a:prstGeom prst="rect">
+              <a:avLst/>
+            </a:prstGeom>
+            <a:noFill/>
+          </p:spPr>
+          <p:txBody>
+            <a:bodyPr wrap="none" rtlCol="0">
+              <a:spAutoFit/>
+            </a:bodyPr>
+            <a:lstStyle/>
+            <a:p>
+              <a:r>
+                <a:rPr lang="en-US" sz="1200" dirty="0">
+                  <a:solidFill>
+                    <a:srgbClr val="FF7C80"/>
+                  </a:solidFill>
+                  <a:latin typeface="Open Sans" panose="020B0606030504020204" pitchFamily="34" charset="0"/>
+                  <a:ea typeface="Open Sans" panose="020B0606030504020204" pitchFamily="34" charset="0"/>
+                  <a:cs typeface="Open Sans" panose="020B0606030504020204" pitchFamily="34" charset="0"/>
+                </a:rPr>
+                <a:t>T</a:t>
+              </a:r>
+            </a:p>
+          </p:txBody>
+        </p:sp>
+        <p:sp>
+          <p:nvSpPr>
+            <p:cNvPr id="26" name="Flowchart: Data 25">
+              <a:extLst>
+                <a:ext uri="{FF2B5EF4-FFF2-40B4-BE49-F238E27FC236}">
+                  <a16:creationId xmlns:a16="http://schemas.microsoft.com/office/drawing/2014/main" id="{94D191EB-608A-2C67-B420-0EA65677B979}"/>
+                </a:ext>
+              </a:extLst>
+            </p:cNvPr>
+            <p:cNvSpPr/>
+            <p:nvPr/>
+          </p:nvSpPr>
+          <p:spPr>
+            <a:xfrm>
+              <a:off x="2288004" y="1729706"/>
+              <a:ext cx="1844844" cy="489284"/>
+            </a:xfrm>
+            <a:prstGeom prst="flowChartInputOutput">
+              <a:avLst/>
+            </a:prstGeom>
+            <a:noFill/>
+            <a:ln>
+              <a:solidFill>
+                <a:schemeClr val="accent1">
+                  <a:lumMod val="60000"/>
+                  <a:lumOff val="40000"/>
+                </a:schemeClr>
+              </a:solidFill>
+            </a:ln>
+          </p:spPr>
+          <p:style>
+            <a:lnRef idx="2">
+              <a:schemeClr val="accent1">
+                <a:shade val="50000"/>
+              </a:schemeClr>
+            </a:lnRef>
+            <a:fillRef idx="1">
+              <a:schemeClr val="accent1"/>
+            </a:fillRef>
+            <a:effectRef idx="0">
+              <a:schemeClr val="accent1"/>
+            </a:effectRef>
+            <a:fontRef idx="minor">
+              <a:schemeClr val="lt1"/>
+            </a:fontRef>
+          </p:style>
+          <p:txBody>
+            <a:bodyPr rtlCol="0" anchor="ctr"/>
+            <a:lstStyle/>
+            <a:p>
+              <a:pPr algn="ctr"/>
+              <a:r>
+                <a:rPr lang="en-US" sz="1200" dirty="0">
+                  <a:solidFill>
+                    <a:schemeClr val="bg1">
+                      <a:lumMod val="85000"/>
+                    </a:schemeClr>
+                  </a:solidFill>
+                  <a:latin typeface="Open Sans" panose="020B0606030504020204" pitchFamily="34" charset="0"/>
+                  <a:ea typeface="Open Sans" panose="020B0606030504020204" pitchFamily="34" charset="0"/>
+                  <a:cs typeface="Open Sans" panose="020B0606030504020204" pitchFamily="34" charset="0"/>
+                </a:rPr>
+                <a:t>Read day</a:t>
+              </a:r>
+            </a:p>
+          </p:txBody>
+        </p:sp>
+        <p:cxnSp>
+          <p:nvCxnSpPr>
+            <p:cNvPr id="27" name="Straight Arrow Connector 26">
+              <a:extLst>
+                <a:ext uri="{FF2B5EF4-FFF2-40B4-BE49-F238E27FC236}">
+                  <a16:creationId xmlns:a16="http://schemas.microsoft.com/office/drawing/2014/main" id="{E6C1CD8F-BB27-923B-995E-D457BDF8CD6D}"/>
+                </a:ext>
+              </a:extLst>
+            </p:cNvPr>
+            <p:cNvCxnSpPr>
+              <a:stCxn id="26" idx="4"/>
+            </p:cNvCxnSpPr>
+            <p:nvPr/>
+          </p:nvCxnSpPr>
+          <p:spPr>
+            <a:xfrm>
+              <a:off x="3210426" y="2218990"/>
+              <a:ext cx="0" cy="279437"/>
+            </a:xfrm>
+            <a:prstGeom prst="straightConnector1">
+              <a:avLst/>
+            </a:prstGeom>
+            <a:ln w="12700">
+              <a:solidFill>
+                <a:schemeClr val="accent1">
+                  <a:lumMod val="60000"/>
+                  <a:lumOff val="40000"/>
+                </a:schemeClr>
+              </a:solidFill>
+              <a:tailEnd type="triangle"/>
+            </a:ln>
+          </p:spPr>
+          <p:style>
+            <a:lnRef idx="1">
+              <a:schemeClr val="accent1"/>
+            </a:lnRef>
+            <a:fillRef idx="0">
+              <a:schemeClr val="accent1"/>
+            </a:fillRef>
+            <a:effectRef idx="0">
+              <a:schemeClr val="accent1"/>
+            </a:effectRef>
+            <a:fontRef idx="minor">
+              <a:schemeClr val="tx1"/>
+            </a:fontRef>
+          </p:style>
+        </p:cxnSp>
+        <p:sp>
+          <p:nvSpPr>
+            <p:cNvPr id="29" name="TextBox 28">
+              <a:extLst>
+                <a:ext uri="{FF2B5EF4-FFF2-40B4-BE49-F238E27FC236}">
+                  <a16:creationId xmlns:a16="http://schemas.microsoft.com/office/drawing/2014/main" id="{9B9578FD-969E-FDBD-7974-C728CC62A66D}"/>
+                </a:ext>
+              </a:extLst>
+            </p:cNvPr>
+            <p:cNvSpPr txBox="1"/>
+            <p:nvPr/>
+          </p:nvSpPr>
+          <p:spPr>
+            <a:xfrm>
+              <a:off x="2528554" y="2768234"/>
+              <a:ext cx="1354472" cy="461665"/>
+            </a:xfrm>
+            <a:prstGeom prst="rect">
+              <a:avLst/>
+            </a:prstGeom>
+            <a:noFill/>
+          </p:spPr>
+          <p:txBody>
+            <a:bodyPr wrap="square">
+              <a:spAutoFit/>
+            </a:bodyPr>
+            <a:lstStyle/>
+            <a:p>
+              <a:pPr algn="ctr"/>
+              <a:r>
+                <a:rPr lang="en-US" sz="1200" dirty="0">
+                  <a:solidFill>
+                    <a:schemeClr val="bg1">
+                      <a:lumMod val="85000"/>
+                    </a:schemeClr>
+                  </a:solidFill>
+                  <a:latin typeface="Open Sans" panose="020B0606030504020204" pitchFamily="34" charset="0"/>
+                  <a:ea typeface="Open Sans" panose="020B0606030504020204" pitchFamily="34" charset="0"/>
+                  <a:cs typeface="Open Sans" panose="020B0606030504020204" pitchFamily="34" charset="0"/>
+                </a:rPr>
+                <a:t>day == “Sat“ ||</a:t>
+              </a:r>
+            </a:p>
+            <a:p>
+              <a:pPr algn="ctr"/>
+              <a:r>
+                <a:rPr lang="en-US" sz="1200" dirty="0">
+                  <a:solidFill>
+                    <a:schemeClr val="bg1">
+                      <a:lumMod val="85000"/>
+                    </a:schemeClr>
+                  </a:solidFill>
+                  <a:latin typeface="Open Sans" panose="020B0606030504020204" pitchFamily="34" charset="0"/>
+                  <a:ea typeface="Open Sans" panose="020B0606030504020204" pitchFamily="34" charset="0"/>
+                  <a:cs typeface="Open Sans" panose="020B0606030504020204" pitchFamily="34" charset="0"/>
+                </a:rPr>
+                <a:t> day == “Sun”</a:t>
+              </a:r>
+            </a:p>
+          </p:txBody>
+        </p:sp>
+        <p:cxnSp>
+          <p:nvCxnSpPr>
+            <p:cNvPr id="8" name="Connector: Elbow 7">
+              <a:extLst>
+                <a:ext uri="{FF2B5EF4-FFF2-40B4-BE49-F238E27FC236}">
+                  <a16:creationId xmlns:a16="http://schemas.microsoft.com/office/drawing/2014/main" id="{46F5171C-A699-CA44-80EE-E05C1E6010FB}"/>
+                </a:ext>
+              </a:extLst>
+            </p:cNvPr>
+            <p:cNvCxnSpPr>
+              <a:stCxn id="67" idx="3"/>
+              <a:endCxn id="34" idx="4"/>
+            </p:cNvCxnSpPr>
+            <p:nvPr/>
+          </p:nvCxnSpPr>
+          <p:spPr>
+            <a:xfrm flipV="1">
+              <a:off x="4132848" y="2218990"/>
+              <a:ext cx="1289381" cy="752679"/>
+            </a:xfrm>
+            <a:prstGeom prst="bentConnector2">
+              <a:avLst/>
+            </a:prstGeom>
+            <a:ln w="12700">
+              <a:solidFill>
+                <a:srgbClr val="FF7C80"/>
+              </a:solidFill>
+              <a:tailEnd type="triangle"/>
+            </a:ln>
+          </p:spPr>
+          <p:style>
+            <a:lnRef idx="1">
+              <a:schemeClr val="accent1"/>
+            </a:lnRef>
+            <a:fillRef idx="0">
+              <a:schemeClr val="accent1"/>
+            </a:fillRef>
+            <a:effectRef idx="0">
+              <a:schemeClr val="accent1"/>
+            </a:effectRef>
+            <a:fontRef idx="minor">
+              <a:schemeClr val="tx1"/>
+            </a:fontRef>
+          </p:style>
+        </p:cxnSp>
+        <p:cxnSp>
+          <p:nvCxnSpPr>
+            <p:cNvPr id="12" name="Connector: Elbow 11">
+              <a:extLst>
+                <a:ext uri="{FF2B5EF4-FFF2-40B4-BE49-F238E27FC236}">
+                  <a16:creationId xmlns:a16="http://schemas.microsoft.com/office/drawing/2014/main" id="{960C5DFA-4CF2-27FB-BF88-D9F959F3CF83}"/>
+                </a:ext>
+              </a:extLst>
+            </p:cNvPr>
+            <p:cNvCxnSpPr>
+              <a:stCxn id="67" idx="2"/>
+              <a:endCxn id="75" idx="4"/>
+            </p:cNvCxnSpPr>
+            <p:nvPr/>
+          </p:nvCxnSpPr>
+          <p:spPr>
+            <a:xfrm rot="5400000" flipH="1" flipV="1">
+              <a:off x="4811986" y="622861"/>
+              <a:ext cx="1220490" cy="4423610"/>
+            </a:xfrm>
+            <a:prstGeom prst="bentConnector3">
+              <a:avLst>
+                <a:gd name="adj1" fmla="val -18730"/>
+              </a:avLst>
+            </a:prstGeom>
+            <a:ln w="12700">
+              <a:solidFill>
+                <a:srgbClr val="FF7C80"/>
+              </a:solidFill>
+              <a:tailEnd type="triangle"/>
+            </a:ln>
+          </p:spPr>
+          <p:style>
+            <a:lnRef idx="1">
+              <a:schemeClr val="accent1"/>
+            </a:lnRef>
+            <a:fillRef idx="0">
+              <a:schemeClr val="accent1"/>
+            </a:fillRef>
+            <a:effectRef idx="0">
+              <a:schemeClr val="accent1"/>
+            </a:effectRef>
+            <a:fontRef idx="minor">
+              <a:schemeClr val="tx1"/>
+            </a:fontRef>
+          </p:style>
+        </p:cxnSp>
+        <p:cxnSp>
+          <p:nvCxnSpPr>
+            <p:cNvPr id="14" name="Connector: Elbow 13">
+              <a:extLst>
+                <a:ext uri="{FF2B5EF4-FFF2-40B4-BE49-F238E27FC236}">
+                  <a16:creationId xmlns:a16="http://schemas.microsoft.com/office/drawing/2014/main" id="{7BAFFD29-F3D7-830D-267D-C22E05C53C0B}"/>
+                </a:ext>
+              </a:extLst>
+            </p:cNvPr>
+            <p:cNvCxnSpPr>
+              <a:stCxn id="34" idx="1"/>
+              <a:endCxn id="60" idx="1"/>
+            </p:cNvCxnSpPr>
+            <p:nvPr/>
+          </p:nvCxnSpPr>
+          <p:spPr>
+            <a:xfrm rot="5400000" flipH="1" flipV="1">
+              <a:off x="6034345" y="655396"/>
+              <a:ext cx="462194" cy="1686427"/>
+            </a:xfrm>
+            <a:prstGeom prst="bentConnector2">
+              <a:avLst/>
+            </a:prstGeom>
+            <a:ln w="12700">
+              <a:solidFill>
+                <a:srgbClr val="CC99FF"/>
+              </a:solidFill>
+              <a:tailEnd type="triangle"/>
+            </a:ln>
+          </p:spPr>
+          <p:style>
+            <a:lnRef idx="1">
+              <a:schemeClr val="accent1"/>
+            </a:lnRef>
+            <a:fillRef idx="0">
+              <a:schemeClr val="accent1"/>
+            </a:fillRef>
+            <a:effectRef idx="0">
+              <a:schemeClr val="accent1"/>
+            </a:effectRef>
+            <a:fontRef idx="minor">
+              <a:schemeClr val="tx1"/>
+            </a:fontRef>
+          </p:style>
+        </p:cxnSp>
+        <p:cxnSp>
+          <p:nvCxnSpPr>
+            <p:cNvPr id="18" name="Straight Arrow Connector 17">
+              <a:extLst>
+                <a:ext uri="{FF2B5EF4-FFF2-40B4-BE49-F238E27FC236}">
+                  <a16:creationId xmlns:a16="http://schemas.microsoft.com/office/drawing/2014/main" id="{28D76C1F-C45D-8EEF-E187-E9E48161CAB0}"/>
+                </a:ext>
+              </a:extLst>
+            </p:cNvPr>
+            <p:cNvCxnSpPr>
+              <a:stCxn id="75" idx="1"/>
+              <a:endCxn id="60" idx="2"/>
+            </p:cNvCxnSpPr>
+            <p:nvPr/>
+          </p:nvCxnSpPr>
+          <p:spPr>
+            <a:xfrm flipH="1" flipV="1">
+              <a:off x="7634035" y="1438357"/>
+              <a:ext cx="1" cy="296780"/>
+            </a:xfrm>
+            <a:prstGeom prst="straightConnector1">
+              <a:avLst/>
+            </a:prstGeom>
+            <a:ln w="12700">
+              <a:solidFill>
+                <a:srgbClr val="CC99FF"/>
+              </a:solidFill>
+              <a:tailEnd type="triangle"/>
+            </a:ln>
+          </p:spPr>
+          <p:style>
+            <a:lnRef idx="1">
+              <a:schemeClr val="accent1"/>
+            </a:lnRef>
+            <a:fillRef idx="0">
+              <a:schemeClr val="accent1"/>
+            </a:fillRef>
+            <a:effectRef idx="0">
+              <a:schemeClr val="accent1"/>
+            </a:effectRef>
+            <a:fontRef idx="minor">
+              <a:schemeClr val="tx1"/>
+            </a:fontRef>
+          </p:style>
+        </p:cxnSp>
+      </p:grpSp>
+    </p:spTree>
+    <p:extLst>
+      <p:ext uri="{BB962C8B-B14F-4D97-AF65-F5344CB8AC3E}">
+        <p14:creationId xmlns:p14="http://schemas.microsoft.com/office/powerpoint/2010/main" val="3074968271"/>
+      </p:ext>
+    </p:extLst>
+  </p:cSld>
+  <p:clrMapOvr>
+    <a:masterClrMapping/>
+  </p:clrMapOvr>
+</p:sld>
+</file>
+
 <file path=ppt/theme/theme1.xml><?xml version="1.0" encoding="utf-8"?>
 <a:theme xmlns:a="http://schemas.openxmlformats.org/drawingml/2006/main" name="Office Theme">
   <a:themeElements>

</xml_diff>

<commit_message>
Changed Background Color for Flowcharts to Fit with GitHub Dark Theme Background
</commit_message>
<xml_diff>
--- a/Past Year Theory Questions/Resources/resources.pptx
+++ b/Past Year Theory Questions/Resources/resources.pptx
@@ -8238,10 +8238,7 @@
               <a:avLst/>
             </a:prstGeom>
             <a:solidFill>
-              <a:schemeClr val="tx1">
-                <a:lumMod val="85000"/>
-                <a:lumOff val="15000"/>
-              </a:schemeClr>
+              <a:srgbClr val="0F1017"/>
             </a:solidFill>
             <a:ln>
               <a:noFill/>

</xml_diff>

<commit_message>
Added Flowchart for PSPM2021 Q2
</commit_message>
<xml_diff>
--- a/Past Year Theory Questions/Resources/resources.pptx
+++ b/Past Year Theory Questions/Resources/resources.pptx
@@ -9,6 +9,7 @@
     <p:sldId id="258" r:id="rId3"/>
     <p:sldId id="259" r:id="rId4"/>
     <p:sldId id="260" r:id="rId5"/>
+    <p:sldId id="261" r:id="rId6"/>
   </p:sldIdLst>
   <p:sldSz cx="12192000" cy="6858000"/>
   <p:notesSz cx="6858000" cy="9144000"/>
@@ -262,7 +263,7 @@
           <a:p>
             <a:fld id="{34BBF2E1-1C0D-4B66-AD27-CA9E57E33A5F}" type="datetimeFigureOut">
               <a:rPr lang="en-US" smtClean="0"/>
-              <a:t>05-May-22</a:t>
+              <a:t>06-May-22</a:t>
             </a:fld>
             <a:endParaRPr lang="en-US"/>
           </a:p>
@@ -460,7 +461,7 @@
           <a:p>
             <a:fld id="{34BBF2E1-1C0D-4B66-AD27-CA9E57E33A5F}" type="datetimeFigureOut">
               <a:rPr lang="en-US" smtClean="0"/>
-              <a:t>05-May-22</a:t>
+              <a:t>06-May-22</a:t>
             </a:fld>
             <a:endParaRPr lang="en-US"/>
           </a:p>
@@ -668,7 +669,7 @@
           <a:p>
             <a:fld id="{34BBF2E1-1C0D-4B66-AD27-CA9E57E33A5F}" type="datetimeFigureOut">
               <a:rPr lang="en-US" smtClean="0"/>
-              <a:t>05-May-22</a:t>
+              <a:t>06-May-22</a:t>
             </a:fld>
             <a:endParaRPr lang="en-US"/>
           </a:p>
@@ -866,7 +867,7 @@
           <a:p>
             <a:fld id="{34BBF2E1-1C0D-4B66-AD27-CA9E57E33A5F}" type="datetimeFigureOut">
               <a:rPr lang="en-US" smtClean="0"/>
-              <a:t>05-May-22</a:t>
+              <a:t>06-May-22</a:t>
             </a:fld>
             <a:endParaRPr lang="en-US"/>
           </a:p>
@@ -1141,7 +1142,7 @@
           <a:p>
             <a:fld id="{34BBF2E1-1C0D-4B66-AD27-CA9E57E33A5F}" type="datetimeFigureOut">
               <a:rPr lang="en-US" smtClean="0"/>
-              <a:t>05-May-22</a:t>
+              <a:t>06-May-22</a:t>
             </a:fld>
             <a:endParaRPr lang="en-US"/>
           </a:p>
@@ -1406,7 +1407,7 @@
           <a:p>
             <a:fld id="{34BBF2E1-1C0D-4B66-AD27-CA9E57E33A5F}" type="datetimeFigureOut">
               <a:rPr lang="en-US" smtClean="0"/>
-              <a:t>05-May-22</a:t>
+              <a:t>06-May-22</a:t>
             </a:fld>
             <a:endParaRPr lang="en-US"/>
           </a:p>
@@ -1818,7 +1819,7 @@
           <a:p>
             <a:fld id="{34BBF2E1-1C0D-4B66-AD27-CA9E57E33A5F}" type="datetimeFigureOut">
               <a:rPr lang="en-US" smtClean="0"/>
-              <a:t>05-May-22</a:t>
+              <a:t>06-May-22</a:t>
             </a:fld>
             <a:endParaRPr lang="en-US"/>
           </a:p>
@@ -1959,7 +1960,7 @@
           <a:p>
             <a:fld id="{34BBF2E1-1C0D-4B66-AD27-CA9E57E33A5F}" type="datetimeFigureOut">
               <a:rPr lang="en-US" smtClean="0"/>
-              <a:t>05-May-22</a:t>
+              <a:t>06-May-22</a:t>
             </a:fld>
             <a:endParaRPr lang="en-US"/>
           </a:p>
@@ -2072,7 +2073,7 @@
           <a:p>
             <a:fld id="{34BBF2E1-1C0D-4B66-AD27-CA9E57E33A5F}" type="datetimeFigureOut">
               <a:rPr lang="en-US" smtClean="0"/>
-              <a:t>05-May-22</a:t>
+              <a:t>06-May-22</a:t>
             </a:fld>
             <a:endParaRPr lang="en-US"/>
           </a:p>
@@ -2383,7 +2384,7 @@
           <a:p>
             <a:fld id="{34BBF2E1-1C0D-4B66-AD27-CA9E57E33A5F}" type="datetimeFigureOut">
               <a:rPr lang="en-US" smtClean="0"/>
-              <a:t>05-May-22</a:t>
+              <a:t>06-May-22</a:t>
             </a:fld>
             <a:endParaRPr lang="en-US"/>
           </a:p>
@@ -2671,7 +2672,7 @@
           <a:p>
             <a:fld id="{34BBF2E1-1C0D-4B66-AD27-CA9E57E33A5F}" type="datetimeFigureOut">
               <a:rPr lang="en-US" smtClean="0"/>
-              <a:t>05-May-22</a:t>
+              <a:t>06-May-22</a:t>
             </a:fld>
             <a:endParaRPr lang="en-US"/>
           </a:p>
@@ -2912,7 +2913,7 @@
           <a:p>
             <a:fld id="{34BBF2E1-1C0D-4B66-AD27-CA9E57E33A5F}" type="datetimeFigureOut">
               <a:rPr lang="en-US" smtClean="0"/>
-              <a:t>05-May-22</a:t>
+              <a:t>06-May-22</a:t>
             </a:fld>
             <a:endParaRPr lang="en-US"/>
           </a:p>
@@ -9096,6 +9097,2593 @@
 </p:sld>
 </file>
 
+<file path=ppt/slides/slide5.xml><?xml version="1.0" encoding="utf-8"?>
+<p:sld xmlns:a="http://schemas.openxmlformats.org/drawingml/2006/main" xmlns:r="http://schemas.openxmlformats.org/officeDocument/2006/relationships" xmlns:p="http://schemas.openxmlformats.org/presentationml/2006/main">
+  <p:cSld>
+    <p:spTree>
+      <p:nvGrpSpPr>
+        <p:cNvPr id="1" name=""/>
+        <p:cNvGrpSpPr/>
+        <p:nvPr/>
+      </p:nvGrpSpPr>
+      <p:grpSpPr>
+        <a:xfrm>
+          <a:off x="0" y="0"/>
+          <a:ext cx="0" cy="0"/>
+          <a:chOff x="0" y="0"/>
+          <a:chExt cx="0" cy="0"/>
+        </a:xfrm>
+      </p:grpSpPr>
+      <p:grpSp>
+        <p:nvGrpSpPr>
+          <p:cNvPr id="114" name="Group 113">
+            <a:extLst>
+              <a:ext uri="{FF2B5EF4-FFF2-40B4-BE49-F238E27FC236}">
+                <a16:creationId xmlns:a16="http://schemas.microsoft.com/office/drawing/2014/main" id="{573F88BC-8C7D-A558-B3D6-BC4EB511BE67}"/>
+              </a:ext>
+            </a:extLst>
+          </p:cNvPr>
+          <p:cNvGrpSpPr/>
+          <p:nvPr/>
+        </p:nvGrpSpPr>
+        <p:grpSpPr>
+          <a:xfrm>
+            <a:off x="736146" y="743724"/>
+            <a:ext cx="10719707" cy="5370552"/>
+            <a:chOff x="736146" y="466725"/>
+            <a:chExt cx="10719707" cy="5370552"/>
+          </a:xfrm>
+        </p:grpSpPr>
+        <p:sp>
+          <p:nvSpPr>
+            <p:cNvPr id="108" name="Rectangle 107">
+              <a:extLst>
+                <a:ext uri="{FF2B5EF4-FFF2-40B4-BE49-F238E27FC236}">
+                  <a16:creationId xmlns:a16="http://schemas.microsoft.com/office/drawing/2014/main" id="{F5A5FD62-A99C-04B6-706B-DEE9B81AF541}"/>
+                </a:ext>
+              </a:extLst>
+            </p:cNvPr>
+            <p:cNvSpPr/>
+            <p:nvPr/>
+          </p:nvSpPr>
+          <p:spPr>
+            <a:xfrm>
+              <a:off x="736146" y="466725"/>
+              <a:ext cx="10719707" cy="5370552"/>
+            </a:xfrm>
+            <a:prstGeom prst="rect">
+              <a:avLst/>
+            </a:prstGeom>
+            <a:solidFill>
+              <a:srgbClr val="0F1017"/>
+            </a:solidFill>
+            <a:ln w="12700">
+              <a:solidFill>
+                <a:schemeClr val="bg1">
+                  <a:lumMod val="75000"/>
+                </a:schemeClr>
+              </a:solidFill>
+            </a:ln>
+          </p:spPr>
+          <p:style>
+            <a:lnRef idx="2">
+              <a:schemeClr val="accent1">
+                <a:shade val="50000"/>
+              </a:schemeClr>
+            </a:lnRef>
+            <a:fillRef idx="1">
+              <a:schemeClr val="accent1"/>
+            </a:fillRef>
+            <a:effectRef idx="0">
+              <a:schemeClr val="accent1"/>
+            </a:effectRef>
+            <a:fontRef idx="minor">
+              <a:schemeClr val="lt1"/>
+            </a:fontRef>
+          </p:style>
+          <p:txBody>
+            <a:bodyPr rtlCol="0" anchor="ctr"/>
+            <a:lstStyle/>
+            <a:p>
+              <a:pPr algn="ctr"/>
+              <a:endParaRPr lang="en-US" sz="1800" dirty="0">
+                <a:solidFill>
+                  <a:schemeClr val="bg1">
+                    <a:lumMod val="85000"/>
+                  </a:schemeClr>
+                </a:solidFill>
+                <a:latin typeface="Open Sans" panose="020B0606030504020204" pitchFamily="34" charset="0"/>
+                <a:ea typeface="Open Sans" panose="020B0606030504020204" pitchFamily="34" charset="0"/>
+                <a:cs typeface="Open Sans" panose="020B0606030504020204" pitchFamily="34" charset="0"/>
+              </a:endParaRPr>
+            </a:p>
+          </p:txBody>
+        </p:sp>
+        <p:grpSp>
+          <p:nvGrpSpPr>
+            <p:cNvPr id="113" name="Group 112">
+              <a:extLst>
+                <a:ext uri="{FF2B5EF4-FFF2-40B4-BE49-F238E27FC236}">
+                  <a16:creationId xmlns:a16="http://schemas.microsoft.com/office/drawing/2014/main" id="{75A09C32-0389-2F9B-CECD-7350F08CF4BC}"/>
+                </a:ext>
+              </a:extLst>
+            </p:cNvPr>
+            <p:cNvGrpSpPr/>
+            <p:nvPr/>
+          </p:nvGrpSpPr>
+          <p:grpSpPr>
+            <a:xfrm>
+              <a:off x="1214152" y="864655"/>
+              <a:ext cx="9763694" cy="4574693"/>
+              <a:chOff x="949145" y="803757"/>
+              <a:chExt cx="9763694" cy="4574693"/>
+            </a:xfrm>
+          </p:grpSpPr>
+          <p:sp>
+            <p:nvSpPr>
+              <p:cNvPr id="59" name="Flowchart: Terminator 58">
+                <a:extLst>
+                  <a:ext uri="{FF2B5EF4-FFF2-40B4-BE49-F238E27FC236}">
+                    <a16:creationId xmlns:a16="http://schemas.microsoft.com/office/drawing/2014/main" id="{D7554AAC-5F81-46CA-BA4E-6CDF6B8CC5AD}"/>
+                  </a:ext>
+                </a:extLst>
+              </p:cNvPr>
+              <p:cNvSpPr/>
+              <p:nvPr/>
+            </p:nvSpPr>
+            <p:spPr>
+              <a:xfrm>
+                <a:off x="1350824" y="803757"/>
+                <a:ext cx="1050758" cy="341690"/>
+              </a:xfrm>
+              <a:prstGeom prst="flowChartTerminator">
+                <a:avLst/>
+              </a:prstGeom>
+              <a:noFill/>
+              <a:ln>
+                <a:solidFill>
+                  <a:schemeClr val="bg1">
+                    <a:lumMod val="75000"/>
+                  </a:schemeClr>
+                </a:solidFill>
+              </a:ln>
+            </p:spPr>
+            <p:style>
+              <a:lnRef idx="2">
+                <a:schemeClr val="accent1">
+                  <a:shade val="50000"/>
+                </a:schemeClr>
+              </a:lnRef>
+              <a:fillRef idx="1">
+                <a:schemeClr val="accent1"/>
+              </a:fillRef>
+              <a:effectRef idx="0">
+                <a:schemeClr val="accent1"/>
+              </a:effectRef>
+              <a:fontRef idx="minor">
+                <a:schemeClr val="lt1"/>
+              </a:fontRef>
+            </p:style>
+            <p:txBody>
+              <a:bodyPr rtlCol="0" anchor="ctr"/>
+              <a:lstStyle/>
+              <a:p>
+                <a:pPr algn="ctr"/>
+                <a:r>
+                  <a:rPr lang="en-US" sz="1200" dirty="0">
+                    <a:solidFill>
+                      <a:schemeClr val="bg1">
+                        <a:lumMod val="85000"/>
+                      </a:schemeClr>
+                    </a:solidFill>
+                    <a:latin typeface="Open Sans" panose="020B0606030504020204" pitchFamily="34" charset="0"/>
+                    <a:ea typeface="Open Sans" panose="020B0606030504020204" pitchFamily="34" charset="0"/>
+                    <a:cs typeface="Open Sans" panose="020B0606030504020204" pitchFamily="34" charset="0"/>
+                  </a:rPr>
+                  <a:t>Start</a:t>
+                </a:r>
+              </a:p>
+            </p:txBody>
+          </p:sp>
+          <p:sp>
+            <p:nvSpPr>
+              <p:cNvPr id="60" name="Flowchart: Terminator 59">
+                <a:extLst>
+                  <a:ext uri="{FF2B5EF4-FFF2-40B4-BE49-F238E27FC236}">
+                    <a16:creationId xmlns:a16="http://schemas.microsoft.com/office/drawing/2014/main" id="{103191FC-37A5-724C-C214-882B4B9F6C89}"/>
+                  </a:ext>
+                </a:extLst>
+              </p:cNvPr>
+              <p:cNvSpPr/>
+              <p:nvPr/>
+            </p:nvSpPr>
+            <p:spPr>
+              <a:xfrm>
+                <a:off x="9265037" y="803757"/>
+                <a:ext cx="1050758" cy="341690"/>
+              </a:xfrm>
+              <a:prstGeom prst="flowChartTerminator">
+                <a:avLst/>
+              </a:prstGeom>
+              <a:noFill/>
+              <a:ln>
+                <a:solidFill>
+                  <a:schemeClr val="bg1">
+                    <a:lumMod val="75000"/>
+                  </a:schemeClr>
+                </a:solidFill>
+              </a:ln>
+            </p:spPr>
+            <p:style>
+              <a:lnRef idx="2">
+                <a:schemeClr val="accent1">
+                  <a:shade val="50000"/>
+                </a:schemeClr>
+              </a:lnRef>
+              <a:fillRef idx="1">
+                <a:schemeClr val="accent1"/>
+              </a:fillRef>
+              <a:effectRef idx="0">
+                <a:schemeClr val="accent1"/>
+              </a:effectRef>
+              <a:fontRef idx="minor">
+                <a:schemeClr val="lt1"/>
+              </a:fontRef>
+            </p:style>
+            <p:txBody>
+              <a:bodyPr rtlCol="0" anchor="ctr"/>
+              <a:lstStyle/>
+              <a:p>
+                <a:pPr algn="ctr"/>
+                <a:r>
+                  <a:rPr lang="en-US" sz="1200" dirty="0">
+                    <a:solidFill>
+                      <a:schemeClr val="bg1">
+                        <a:lumMod val="85000"/>
+                      </a:schemeClr>
+                    </a:solidFill>
+                    <a:latin typeface="Open Sans" panose="020B0606030504020204" pitchFamily="34" charset="0"/>
+                    <a:ea typeface="Open Sans" panose="020B0606030504020204" pitchFamily="34" charset="0"/>
+                    <a:cs typeface="Open Sans" panose="020B0606030504020204" pitchFamily="34" charset="0"/>
+                  </a:rPr>
+                  <a:t>Stop</a:t>
+                </a:r>
+              </a:p>
+            </p:txBody>
+          </p:sp>
+          <p:cxnSp>
+            <p:nvCxnSpPr>
+              <p:cNvPr id="61" name="Straight Arrow Connector 60">
+                <a:extLst>
+                  <a:ext uri="{FF2B5EF4-FFF2-40B4-BE49-F238E27FC236}">
+                    <a16:creationId xmlns:a16="http://schemas.microsoft.com/office/drawing/2014/main" id="{A1BBCFB3-141A-F3B8-67BE-C05995E64053}"/>
+                  </a:ext>
+                </a:extLst>
+              </p:cNvPr>
+              <p:cNvCxnSpPr>
+                <a:cxnSpLocks/>
+                <a:stCxn id="59" idx="2"/>
+              </p:cNvCxnSpPr>
+              <p:nvPr/>
+            </p:nvCxnSpPr>
+            <p:spPr>
+              <a:xfrm>
+                <a:off x="1876203" y="1145447"/>
+                <a:ext cx="0" cy="296780"/>
+              </a:xfrm>
+              <a:prstGeom prst="straightConnector1">
+                <a:avLst/>
+              </a:prstGeom>
+              <a:ln w="12700">
+                <a:solidFill>
+                  <a:schemeClr val="bg1">
+                    <a:lumMod val="75000"/>
+                  </a:schemeClr>
+                </a:solidFill>
+                <a:tailEnd type="triangle"/>
+              </a:ln>
+            </p:spPr>
+            <p:style>
+              <a:lnRef idx="1">
+                <a:schemeClr val="accent1"/>
+              </a:lnRef>
+              <a:fillRef idx="0">
+                <a:schemeClr val="accent1"/>
+              </a:fillRef>
+              <a:effectRef idx="0">
+                <a:schemeClr val="accent1"/>
+              </a:effectRef>
+              <a:fontRef idx="minor">
+                <a:schemeClr val="tx1"/>
+              </a:fontRef>
+            </p:style>
+          </p:cxnSp>
+          <p:sp>
+            <p:nvSpPr>
+              <p:cNvPr id="67" name="Flowchart: Decision 66">
+                <a:extLst>
+                  <a:ext uri="{FF2B5EF4-FFF2-40B4-BE49-F238E27FC236}">
+                    <a16:creationId xmlns:a16="http://schemas.microsoft.com/office/drawing/2014/main" id="{A3DDEFFD-6E92-1CB4-EE4D-6CD3E04860A6}"/>
+                  </a:ext>
+                </a:extLst>
+              </p:cNvPr>
+              <p:cNvSpPr/>
+              <p:nvPr/>
+            </p:nvSpPr>
+            <p:spPr>
+              <a:xfrm>
+                <a:off x="953781" y="2205517"/>
+                <a:ext cx="1844844" cy="946484"/>
+              </a:xfrm>
+              <a:prstGeom prst="flowChartDecision">
+                <a:avLst/>
+              </a:prstGeom>
+              <a:noFill/>
+              <a:ln>
+                <a:solidFill>
+                  <a:srgbClr val="FF7C80"/>
+                </a:solidFill>
+              </a:ln>
+            </p:spPr>
+            <p:style>
+              <a:lnRef idx="2">
+                <a:schemeClr val="accent1">
+                  <a:shade val="50000"/>
+                </a:schemeClr>
+              </a:lnRef>
+              <a:fillRef idx="1">
+                <a:schemeClr val="accent1"/>
+              </a:fillRef>
+              <a:effectRef idx="0">
+                <a:schemeClr val="accent1"/>
+              </a:effectRef>
+              <a:fontRef idx="minor">
+                <a:schemeClr val="lt1"/>
+              </a:fontRef>
+            </p:style>
+            <p:txBody>
+              <a:bodyPr rtlCol="0" anchor="ctr"/>
+              <a:lstStyle/>
+              <a:p>
+                <a:pPr algn="ctr"/>
+                <a:endParaRPr lang="en-US" sz="1200" dirty="0">
+                  <a:solidFill>
+                    <a:schemeClr val="bg1">
+                      <a:lumMod val="85000"/>
+                    </a:schemeClr>
+                  </a:solidFill>
+                  <a:latin typeface="Open Sans" panose="020B0606030504020204" pitchFamily="34" charset="0"/>
+                  <a:ea typeface="Open Sans" panose="020B0606030504020204" pitchFamily="34" charset="0"/>
+                  <a:cs typeface="Open Sans" panose="020B0606030504020204" pitchFamily="34" charset="0"/>
+                </a:endParaRPr>
+              </a:p>
+            </p:txBody>
+          </p:sp>
+          <p:sp>
+            <p:nvSpPr>
+              <p:cNvPr id="75" name="Flowchart: Data 74">
+                <a:extLst>
+                  <a:ext uri="{FF2B5EF4-FFF2-40B4-BE49-F238E27FC236}">
+                    <a16:creationId xmlns:a16="http://schemas.microsoft.com/office/drawing/2014/main" id="{684F63EE-4E36-A045-0D95-769D7FC961BB}"/>
+                  </a:ext>
+                </a:extLst>
+              </p:cNvPr>
+              <p:cNvSpPr/>
+              <p:nvPr/>
+            </p:nvSpPr>
+            <p:spPr>
+              <a:xfrm>
+                <a:off x="8867995" y="1442227"/>
+                <a:ext cx="1844844" cy="489284"/>
+              </a:xfrm>
+              <a:prstGeom prst="flowChartInputOutput">
+                <a:avLst/>
+              </a:prstGeom>
+              <a:noFill/>
+              <a:ln>
+                <a:solidFill>
+                  <a:srgbClr val="CC99FF"/>
+                </a:solidFill>
+              </a:ln>
+            </p:spPr>
+            <p:style>
+              <a:lnRef idx="2">
+                <a:schemeClr val="accent1">
+                  <a:shade val="50000"/>
+                </a:schemeClr>
+              </a:lnRef>
+              <a:fillRef idx="1">
+                <a:schemeClr val="accent1"/>
+              </a:fillRef>
+              <a:effectRef idx="0">
+                <a:schemeClr val="accent1"/>
+              </a:effectRef>
+              <a:fontRef idx="minor">
+                <a:schemeClr val="lt1"/>
+              </a:fontRef>
+            </p:style>
+            <p:txBody>
+              <a:bodyPr rtlCol="0" anchor="ctr"/>
+              <a:lstStyle/>
+              <a:p>
+                <a:pPr algn="ctr"/>
+                <a:r>
+                  <a:rPr lang="en-US" sz="1200" dirty="0">
+                    <a:solidFill>
+                      <a:schemeClr val="bg1">
+                        <a:lumMod val="85000"/>
+                      </a:schemeClr>
+                    </a:solidFill>
+                    <a:latin typeface="Open Sans" panose="020B0606030504020204" pitchFamily="34" charset="0"/>
+                    <a:ea typeface="Open Sans" panose="020B0606030504020204" pitchFamily="34" charset="0"/>
+                    <a:cs typeface="Open Sans" panose="020B0606030504020204" pitchFamily="34" charset="0"/>
+                  </a:rPr>
+                  <a:t>Print grade</a:t>
+                </a:r>
+              </a:p>
+            </p:txBody>
+          </p:sp>
+          <p:sp>
+            <p:nvSpPr>
+              <p:cNvPr id="34" name="Flowchart: Data 33">
+                <a:extLst>
+                  <a:ext uri="{FF2B5EF4-FFF2-40B4-BE49-F238E27FC236}">
+                    <a16:creationId xmlns:a16="http://schemas.microsoft.com/office/drawing/2014/main" id="{C068F42B-FC9B-7C07-A3C3-5B6E85BF9353}"/>
+                  </a:ext>
+                </a:extLst>
+              </p:cNvPr>
+              <p:cNvSpPr/>
+              <p:nvPr/>
+            </p:nvSpPr>
+            <p:spPr>
+              <a:xfrm>
+                <a:off x="3165583" y="1436796"/>
+                <a:ext cx="1847088" cy="489284"/>
+              </a:xfrm>
+              <a:prstGeom prst="flowChartInputOutput">
+                <a:avLst/>
+              </a:prstGeom>
+              <a:noFill/>
+              <a:ln>
+                <a:solidFill>
+                  <a:srgbClr val="CC99FF"/>
+                </a:solidFill>
+              </a:ln>
+            </p:spPr>
+            <p:style>
+              <a:lnRef idx="2">
+                <a:schemeClr val="accent1">
+                  <a:shade val="50000"/>
+                </a:schemeClr>
+              </a:lnRef>
+              <a:fillRef idx="1">
+                <a:schemeClr val="accent1"/>
+              </a:fillRef>
+              <a:effectRef idx="0">
+                <a:schemeClr val="accent1"/>
+              </a:effectRef>
+              <a:fontRef idx="minor">
+                <a:schemeClr val="lt1"/>
+              </a:fontRef>
+            </p:style>
+            <p:txBody>
+              <a:bodyPr rtlCol="0" anchor="ctr"/>
+              <a:lstStyle/>
+              <a:p>
+                <a:pPr algn="ctr"/>
+                <a:r>
+                  <a:rPr lang="en-US" sz="1200" dirty="0">
+                    <a:solidFill>
+                      <a:schemeClr val="bg1">
+                        <a:lumMod val="85000"/>
+                      </a:schemeClr>
+                    </a:solidFill>
+                    <a:latin typeface="Open Sans" panose="020B0606030504020204" pitchFamily="34" charset="0"/>
+                    <a:ea typeface="Open Sans" panose="020B0606030504020204" pitchFamily="34" charset="0"/>
+                    <a:cs typeface="Open Sans" panose="020B0606030504020204" pitchFamily="34" charset="0"/>
+                  </a:rPr>
+                  <a:t>Print error</a:t>
+                </a:r>
+              </a:p>
+            </p:txBody>
+          </p:sp>
+          <p:sp>
+            <p:nvSpPr>
+              <p:cNvPr id="56" name="TextBox 55">
+                <a:extLst>
+                  <a:ext uri="{FF2B5EF4-FFF2-40B4-BE49-F238E27FC236}">
+                    <a16:creationId xmlns:a16="http://schemas.microsoft.com/office/drawing/2014/main" id="{A55BD023-459D-2AAA-69ED-17610668702B}"/>
+                  </a:ext>
+                </a:extLst>
+              </p:cNvPr>
+              <p:cNvSpPr txBox="1"/>
+              <p:nvPr/>
+            </p:nvSpPr>
+            <p:spPr>
+              <a:xfrm>
+                <a:off x="2798624" y="2401760"/>
+                <a:ext cx="269626" cy="276999"/>
+              </a:xfrm>
+              <a:prstGeom prst="rect">
+                <a:avLst/>
+              </a:prstGeom>
+              <a:noFill/>
+            </p:spPr>
+            <p:txBody>
+              <a:bodyPr wrap="none" rtlCol="0">
+                <a:spAutoFit/>
+              </a:bodyPr>
+              <a:lstStyle/>
+              <a:p>
+                <a:r>
+                  <a:rPr lang="en-US" sz="1200" dirty="0">
+                    <a:solidFill>
+                      <a:srgbClr val="FF7C80"/>
+                    </a:solidFill>
+                    <a:latin typeface="Open Sans" panose="020B0606030504020204" pitchFamily="34" charset="0"/>
+                    <a:ea typeface="Open Sans" panose="020B0606030504020204" pitchFamily="34" charset="0"/>
+                    <a:cs typeface="Open Sans" panose="020B0606030504020204" pitchFamily="34" charset="0"/>
+                  </a:rPr>
+                  <a:t>T</a:t>
+                </a:r>
+              </a:p>
+            </p:txBody>
+          </p:sp>
+          <p:sp>
+            <p:nvSpPr>
+              <p:cNvPr id="57" name="TextBox 56">
+                <a:extLst>
+                  <a:ext uri="{FF2B5EF4-FFF2-40B4-BE49-F238E27FC236}">
+                    <a16:creationId xmlns:a16="http://schemas.microsoft.com/office/drawing/2014/main" id="{9C2FBB7E-F1C0-C575-D7BA-55AD0E300D41}"/>
+                  </a:ext>
+                </a:extLst>
+              </p:cNvPr>
+              <p:cNvSpPr txBox="1"/>
+              <p:nvPr/>
+            </p:nvSpPr>
+            <p:spPr>
+              <a:xfrm>
+                <a:off x="1601941" y="3152001"/>
+                <a:ext cx="269626" cy="276999"/>
+              </a:xfrm>
+              <a:prstGeom prst="rect">
+                <a:avLst/>
+              </a:prstGeom>
+              <a:noFill/>
+            </p:spPr>
+            <p:txBody>
+              <a:bodyPr wrap="none" rtlCol="0">
+                <a:spAutoFit/>
+              </a:bodyPr>
+              <a:lstStyle/>
+              <a:p>
+                <a:r>
+                  <a:rPr lang="en-US" sz="1200" dirty="0">
+                    <a:solidFill>
+                      <a:srgbClr val="FF7C80"/>
+                    </a:solidFill>
+                    <a:latin typeface="Open Sans" panose="020B0606030504020204" pitchFamily="34" charset="0"/>
+                    <a:ea typeface="Open Sans" panose="020B0606030504020204" pitchFamily="34" charset="0"/>
+                    <a:cs typeface="Open Sans" panose="020B0606030504020204" pitchFamily="34" charset="0"/>
+                  </a:rPr>
+                  <a:t>F</a:t>
+                </a:r>
+              </a:p>
+            </p:txBody>
+          </p:sp>
+          <p:sp>
+            <p:nvSpPr>
+              <p:cNvPr id="26" name="Flowchart: Data 25">
+                <a:extLst>
+                  <a:ext uri="{FF2B5EF4-FFF2-40B4-BE49-F238E27FC236}">
+                    <a16:creationId xmlns:a16="http://schemas.microsoft.com/office/drawing/2014/main" id="{94D191EB-608A-2C67-B420-0EA65677B979}"/>
+                  </a:ext>
+                </a:extLst>
+              </p:cNvPr>
+              <p:cNvSpPr/>
+              <p:nvPr/>
+            </p:nvSpPr>
+            <p:spPr>
+              <a:xfrm>
+                <a:off x="953781" y="1436796"/>
+                <a:ext cx="1844844" cy="489284"/>
+              </a:xfrm>
+              <a:prstGeom prst="flowChartInputOutput">
+                <a:avLst/>
+              </a:prstGeom>
+              <a:noFill/>
+              <a:ln>
+                <a:solidFill>
+                  <a:schemeClr val="accent1">
+                    <a:lumMod val="60000"/>
+                    <a:lumOff val="40000"/>
+                  </a:schemeClr>
+                </a:solidFill>
+              </a:ln>
+            </p:spPr>
+            <p:style>
+              <a:lnRef idx="2">
+                <a:schemeClr val="accent1">
+                  <a:shade val="50000"/>
+                </a:schemeClr>
+              </a:lnRef>
+              <a:fillRef idx="1">
+                <a:schemeClr val="accent1"/>
+              </a:fillRef>
+              <a:effectRef idx="0">
+                <a:schemeClr val="accent1"/>
+              </a:effectRef>
+              <a:fontRef idx="minor">
+                <a:schemeClr val="lt1"/>
+              </a:fontRef>
+            </p:style>
+            <p:txBody>
+              <a:bodyPr rtlCol="0" anchor="ctr"/>
+              <a:lstStyle/>
+              <a:p>
+                <a:pPr algn="ctr"/>
+                <a:r>
+                  <a:rPr lang="en-US" sz="1200" dirty="0">
+                    <a:solidFill>
+                      <a:schemeClr val="bg1">
+                        <a:lumMod val="85000"/>
+                      </a:schemeClr>
+                    </a:solidFill>
+                    <a:latin typeface="Open Sans" panose="020B0606030504020204" pitchFamily="34" charset="0"/>
+                    <a:ea typeface="Open Sans" panose="020B0606030504020204" pitchFamily="34" charset="0"/>
+                    <a:cs typeface="Open Sans" panose="020B0606030504020204" pitchFamily="34" charset="0"/>
+                  </a:rPr>
+                  <a:t>Read mark</a:t>
+                </a:r>
+              </a:p>
+            </p:txBody>
+          </p:sp>
+          <p:cxnSp>
+            <p:nvCxnSpPr>
+              <p:cNvPr id="27" name="Straight Arrow Connector 26">
+                <a:extLst>
+                  <a:ext uri="{FF2B5EF4-FFF2-40B4-BE49-F238E27FC236}">
+                    <a16:creationId xmlns:a16="http://schemas.microsoft.com/office/drawing/2014/main" id="{E6C1CD8F-BB27-923B-995E-D457BDF8CD6D}"/>
+                  </a:ext>
+                </a:extLst>
+              </p:cNvPr>
+              <p:cNvCxnSpPr>
+                <a:stCxn id="26" idx="4"/>
+              </p:cNvCxnSpPr>
+              <p:nvPr/>
+            </p:nvCxnSpPr>
+            <p:spPr>
+              <a:xfrm>
+                <a:off x="1876203" y="1926080"/>
+                <a:ext cx="0" cy="279437"/>
+              </a:xfrm>
+              <a:prstGeom prst="straightConnector1">
+                <a:avLst/>
+              </a:prstGeom>
+              <a:ln w="12700">
+                <a:solidFill>
+                  <a:schemeClr val="accent1">
+                    <a:lumMod val="60000"/>
+                    <a:lumOff val="40000"/>
+                  </a:schemeClr>
+                </a:solidFill>
+                <a:tailEnd type="triangle"/>
+              </a:ln>
+            </p:spPr>
+            <p:style>
+              <a:lnRef idx="1">
+                <a:schemeClr val="accent1"/>
+              </a:lnRef>
+              <a:fillRef idx="0">
+                <a:schemeClr val="accent1"/>
+              </a:fillRef>
+              <a:effectRef idx="0">
+                <a:schemeClr val="accent1"/>
+              </a:effectRef>
+              <a:fontRef idx="minor">
+                <a:schemeClr val="tx1"/>
+              </a:fontRef>
+            </p:style>
+          </p:cxnSp>
+          <p:sp>
+            <p:nvSpPr>
+              <p:cNvPr id="29" name="TextBox 28">
+                <a:extLst>
+                  <a:ext uri="{FF2B5EF4-FFF2-40B4-BE49-F238E27FC236}">
+                    <a16:creationId xmlns:a16="http://schemas.microsoft.com/office/drawing/2014/main" id="{9B9578FD-969E-FDBD-7974-C728CC62A66D}"/>
+                  </a:ext>
+                </a:extLst>
+              </p:cNvPr>
+              <p:cNvSpPr txBox="1"/>
+              <p:nvPr/>
+            </p:nvSpPr>
+            <p:spPr>
+              <a:xfrm>
+                <a:off x="1194331" y="2475324"/>
+                <a:ext cx="1354472" cy="461665"/>
+              </a:xfrm>
+              <a:prstGeom prst="rect">
+                <a:avLst/>
+              </a:prstGeom>
+              <a:noFill/>
+            </p:spPr>
+            <p:txBody>
+              <a:bodyPr wrap="square">
+                <a:spAutoFit/>
+              </a:bodyPr>
+              <a:lstStyle/>
+              <a:p>
+                <a:pPr algn="ctr"/>
+                <a:r>
+                  <a:rPr lang="en-US" sz="1200" dirty="0">
+                    <a:solidFill>
+                      <a:schemeClr val="bg1">
+                        <a:lumMod val="85000"/>
+                      </a:schemeClr>
+                    </a:solidFill>
+                    <a:latin typeface="Open Sans" panose="020B0606030504020204" pitchFamily="34" charset="0"/>
+                    <a:ea typeface="Open Sans" panose="020B0606030504020204" pitchFamily="34" charset="0"/>
+                    <a:cs typeface="Open Sans" panose="020B0606030504020204" pitchFamily="34" charset="0"/>
+                  </a:rPr>
+                  <a:t>mark &gt; 100 ||</a:t>
+                </a:r>
+              </a:p>
+              <a:p>
+                <a:pPr algn="ctr"/>
+                <a:r>
+                  <a:rPr lang="en-US" sz="1200" dirty="0">
+                    <a:solidFill>
+                      <a:schemeClr val="bg1">
+                        <a:lumMod val="85000"/>
+                      </a:schemeClr>
+                    </a:solidFill>
+                    <a:latin typeface="Open Sans" panose="020B0606030504020204" pitchFamily="34" charset="0"/>
+                    <a:ea typeface="Open Sans" panose="020B0606030504020204" pitchFamily="34" charset="0"/>
+                    <a:cs typeface="Open Sans" panose="020B0606030504020204" pitchFamily="34" charset="0"/>
+                  </a:rPr>
+                  <a:t>mark &lt; 0</a:t>
+                </a:r>
+              </a:p>
+            </p:txBody>
+          </p:sp>
+          <p:cxnSp>
+            <p:nvCxnSpPr>
+              <p:cNvPr id="14" name="Connector: Elbow 13">
+                <a:extLst>
+                  <a:ext uri="{FF2B5EF4-FFF2-40B4-BE49-F238E27FC236}">
+                    <a16:creationId xmlns:a16="http://schemas.microsoft.com/office/drawing/2014/main" id="{7BAFFD29-F3D7-830D-267D-C22E05C53C0B}"/>
+                  </a:ext>
+                </a:extLst>
+              </p:cNvPr>
+              <p:cNvCxnSpPr>
+                <a:cxnSpLocks/>
+                <a:stCxn id="34" idx="1"/>
+                <a:endCxn id="60" idx="1"/>
+              </p:cNvCxnSpPr>
+              <p:nvPr/>
+            </p:nvCxnSpPr>
+            <p:spPr>
+              <a:xfrm rot="5400000" flipH="1" flipV="1">
+                <a:off x="6445985" y="-1382256"/>
+                <a:ext cx="462194" cy="5175910"/>
+              </a:xfrm>
+              <a:prstGeom prst="bentConnector2">
+                <a:avLst/>
+              </a:prstGeom>
+              <a:ln w="12700">
+                <a:solidFill>
+                  <a:srgbClr val="CC99FF"/>
+                </a:solidFill>
+                <a:tailEnd type="triangle"/>
+              </a:ln>
+            </p:spPr>
+            <p:style>
+              <a:lnRef idx="1">
+                <a:schemeClr val="accent1"/>
+              </a:lnRef>
+              <a:fillRef idx="0">
+                <a:schemeClr val="accent1"/>
+              </a:fillRef>
+              <a:effectRef idx="0">
+                <a:schemeClr val="accent1"/>
+              </a:effectRef>
+              <a:fontRef idx="minor">
+                <a:schemeClr val="tx1"/>
+              </a:fontRef>
+            </p:style>
+          </p:cxnSp>
+          <p:cxnSp>
+            <p:nvCxnSpPr>
+              <p:cNvPr id="18" name="Straight Arrow Connector 17">
+                <a:extLst>
+                  <a:ext uri="{FF2B5EF4-FFF2-40B4-BE49-F238E27FC236}">
+                    <a16:creationId xmlns:a16="http://schemas.microsoft.com/office/drawing/2014/main" id="{28D76C1F-C45D-8EEF-E187-E9E48161CAB0}"/>
+                  </a:ext>
+                </a:extLst>
+              </p:cNvPr>
+              <p:cNvCxnSpPr>
+                <a:cxnSpLocks/>
+                <a:stCxn id="75" idx="1"/>
+                <a:endCxn id="60" idx="2"/>
+              </p:cNvCxnSpPr>
+              <p:nvPr/>
+            </p:nvCxnSpPr>
+            <p:spPr>
+              <a:xfrm flipH="1" flipV="1">
+                <a:off x="9790416" y="1145447"/>
+                <a:ext cx="1" cy="296780"/>
+              </a:xfrm>
+              <a:prstGeom prst="straightConnector1">
+                <a:avLst/>
+              </a:prstGeom>
+              <a:ln w="12700">
+                <a:solidFill>
+                  <a:srgbClr val="CC99FF"/>
+                </a:solidFill>
+                <a:tailEnd type="triangle"/>
+              </a:ln>
+            </p:spPr>
+            <p:style>
+              <a:lnRef idx="1">
+                <a:schemeClr val="accent1"/>
+              </a:lnRef>
+              <a:fillRef idx="0">
+                <a:schemeClr val="accent1"/>
+              </a:fillRef>
+              <a:effectRef idx="0">
+                <a:schemeClr val="accent1"/>
+              </a:effectRef>
+              <a:fontRef idx="minor">
+                <a:schemeClr val="tx1"/>
+              </a:fontRef>
+            </p:style>
+          </p:cxnSp>
+          <p:sp>
+            <p:nvSpPr>
+              <p:cNvPr id="20" name="Flowchart: Decision 19">
+                <a:extLst>
+                  <a:ext uri="{FF2B5EF4-FFF2-40B4-BE49-F238E27FC236}">
+                    <a16:creationId xmlns:a16="http://schemas.microsoft.com/office/drawing/2014/main" id="{30BAFB15-77D0-E596-8420-DCFF2E8C83B2}"/>
+                  </a:ext>
+                </a:extLst>
+              </p:cNvPr>
+              <p:cNvSpPr/>
+              <p:nvPr/>
+            </p:nvSpPr>
+            <p:spPr>
+              <a:xfrm>
+                <a:off x="953781" y="3438940"/>
+                <a:ext cx="1844844" cy="946484"/>
+              </a:xfrm>
+              <a:prstGeom prst="flowChartDecision">
+                <a:avLst/>
+              </a:prstGeom>
+              <a:noFill/>
+              <a:ln>
+                <a:solidFill>
+                  <a:srgbClr val="FF7C80"/>
+                </a:solidFill>
+              </a:ln>
+            </p:spPr>
+            <p:style>
+              <a:lnRef idx="2">
+                <a:schemeClr val="accent1">
+                  <a:shade val="50000"/>
+                </a:schemeClr>
+              </a:lnRef>
+              <a:fillRef idx="1">
+                <a:schemeClr val="accent1"/>
+              </a:fillRef>
+              <a:effectRef idx="0">
+                <a:schemeClr val="accent1"/>
+              </a:effectRef>
+              <a:fontRef idx="minor">
+                <a:schemeClr val="lt1"/>
+              </a:fontRef>
+            </p:style>
+            <p:txBody>
+              <a:bodyPr rtlCol="0" anchor="ctr"/>
+              <a:lstStyle/>
+              <a:p>
+                <a:pPr algn="ctr"/>
+                <a:r>
+                  <a:rPr lang="en-US" sz="1200" dirty="0">
+                    <a:solidFill>
+                      <a:schemeClr val="bg1">
+                        <a:lumMod val="85000"/>
+                      </a:schemeClr>
+                    </a:solidFill>
+                    <a:latin typeface="Open Sans" panose="020B0606030504020204" pitchFamily="34" charset="0"/>
+                    <a:ea typeface="Open Sans" panose="020B0606030504020204" pitchFamily="34" charset="0"/>
+                    <a:cs typeface="Open Sans" panose="020B0606030504020204" pitchFamily="34" charset="0"/>
+                  </a:rPr>
+                  <a:t>mark &gt;= 80</a:t>
+                </a:r>
+              </a:p>
+            </p:txBody>
+          </p:sp>
+          <p:sp>
+            <p:nvSpPr>
+              <p:cNvPr id="22" name="Flowchart: Decision 21">
+                <a:extLst>
+                  <a:ext uri="{FF2B5EF4-FFF2-40B4-BE49-F238E27FC236}">
+                    <a16:creationId xmlns:a16="http://schemas.microsoft.com/office/drawing/2014/main" id="{9E8E48AB-E3E0-A94C-C315-FD051F779113}"/>
+                  </a:ext>
+                </a:extLst>
+              </p:cNvPr>
+              <p:cNvSpPr/>
+              <p:nvPr/>
+            </p:nvSpPr>
+            <p:spPr>
+              <a:xfrm>
+                <a:off x="3165584" y="3438940"/>
+                <a:ext cx="1844844" cy="946484"/>
+              </a:xfrm>
+              <a:prstGeom prst="flowChartDecision">
+                <a:avLst/>
+              </a:prstGeom>
+              <a:noFill/>
+              <a:ln>
+                <a:solidFill>
+                  <a:srgbClr val="FF7C80"/>
+                </a:solidFill>
+              </a:ln>
+            </p:spPr>
+            <p:style>
+              <a:lnRef idx="2">
+                <a:schemeClr val="accent1">
+                  <a:shade val="50000"/>
+                </a:schemeClr>
+              </a:lnRef>
+              <a:fillRef idx="1">
+                <a:schemeClr val="accent1"/>
+              </a:fillRef>
+              <a:effectRef idx="0">
+                <a:schemeClr val="accent1"/>
+              </a:effectRef>
+              <a:fontRef idx="minor">
+                <a:schemeClr val="lt1"/>
+              </a:fontRef>
+            </p:style>
+            <p:txBody>
+              <a:bodyPr rtlCol="0" anchor="ctr"/>
+              <a:lstStyle/>
+              <a:p>
+                <a:pPr algn="ctr"/>
+                <a:r>
+                  <a:rPr lang="en-US" sz="1200" dirty="0">
+                    <a:solidFill>
+                      <a:schemeClr val="bg1">
+                        <a:lumMod val="85000"/>
+                      </a:schemeClr>
+                    </a:solidFill>
+                    <a:latin typeface="Open Sans" panose="020B0606030504020204" pitchFamily="34" charset="0"/>
+                    <a:ea typeface="Open Sans" panose="020B0606030504020204" pitchFamily="34" charset="0"/>
+                    <a:cs typeface="Open Sans" panose="020B0606030504020204" pitchFamily="34" charset="0"/>
+                  </a:rPr>
+                  <a:t>mark &gt;= 65</a:t>
+                </a:r>
+              </a:p>
+            </p:txBody>
+          </p:sp>
+          <p:sp>
+            <p:nvSpPr>
+              <p:cNvPr id="28" name="Flowchart: Decision 27">
+                <a:extLst>
+                  <a:ext uri="{FF2B5EF4-FFF2-40B4-BE49-F238E27FC236}">
+                    <a16:creationId xmlns:a16="http://schemas.microsoft.com/office/drawing/2014/main" id="{FBA9B877-9AD3-7DF7-7E2A-2BA505564A0D}"/>
+                  </a:ext>
+                </a:extLst>
+              </p:cNvPr>
+              <p:cNvSpPr/>
+              <p:nvPr/>
+            </p:nvSpPr>
+            <p:spPr>
+              <a:xfrm>
+                <a:off x="5377387" y="3438940"/>
+                <a:ext cx="1844844" cy="946484"/>
+              </a:xfrm>
+              <a:prstGeom prst="flowChartDecision">
+                <a:avLst/>
+              </a:prstGeom>
+              <a:noFill/>
+              <a:ln>
+                <a:solidFill>
+                  <a:srgbClr val="FF7C80"/>
+                </a:solidFill>
+              </a:ln>
+            </p:spPr>
+            <p:style>
+              <a:lnRef idx="2">
+                <a:schemeClr val="accent1">
+                  <a:shade val="50000"/>
+                </a:schemeClr>
+              </a:lnRef>
+              <a:fillRef idx="1">
+                <a:schemeClr val="accent1"/>
+              </a:fillRef>
+              <a:effectRef idx="0">
+                <a:schemeClr val="accent1"/>
+              </a:effectRef>
+              <a:fontRef idx="minor">
+                <a:schemeClr val="lt1"/>
+              </a:fontRef>
+            </p:style>
+            <p:txBody>
+              <a:bodyPr rtlCol="0" anchor="ctr"/>
+              <a:lstStyle/>
+              <a:p>
+                <a:pPr algn="ctr"/>
+                <a:r>
+                  <a:rPr lang="en-US" sz="1200" dirty="0">
+                    <a:solidFill>
+                      <a:schemeClr val="bg1">
+                        <a:lumMod val="85000"/>
+                      </a:schemeClr>
+                    </a:solidFill>
+                    <a:latin typeface="Open Sans" panose="020B0606030504020204" pitchFamily="34" charset="0"/>
+                    <a:ea typeface="Open Sans" panose="020B0606030504020204" pitchFamily="34" charset="0"/>
+                    <a:cs typeface="Open Sans" panose="020B0606030504020204" pitchFamily="34" charset="0"/>
+                  </a:rPr>
+                  <a:t>mark &gt;= 50</a:t>
+                </a:r>
+              </a:p>
+            </p:txBody>
+          </p:sp>
+          <p:sp>
+            <p:nvSpPr>
+              <p:cNvPr id="35" name="Flowchart: Decision 34">
+                <a:extLst>
+                  <a:ext uri="{FF2B5EF4-FFF2-40B4-BE49-F238E27FC236}">
+                    <a16:creationId xmlns:a16="http://schemas.microsoft.com/office/drawing/2014/main" id="{8FD02BFE-2D5F-FB26-234A-793A03DC0C91}"/>
+                  </a:ext>
+                </a:extLst>
+              </p:cNvPr>
+              <p:cNvSpPr/>
+              <p:nvPr/>
+            </p:nvSpPr>
+            <p:spPr>
+              <a:xfrm>
+                <a:off x="7589190" y="3438940"/>
+                <a:ext cx="1844844" cy="946484"/>
+              </a:xfrm>
+              <a:prstGeom prst="flowChartDecision">
+                <a:avLst/>
+              </a:prstGeom>
+              <a:noFill/>
+              <a:ln>
+                <a:solidFill>
+                  <a:srgbClr val="FF7C80"/>
+                </a:solidFill>
+              </a:ln>
+            </p:spPr>
+            <p:style>
+              <a:lnRef idx="2">
+                <a:schemeClr val="accent1">
+                  <a:shade val="50000"/>
+                </a:schemeClr>
+              </a:lnRef>
+              <a:fillRef idx="1">
+                <a:schemeClr val="accent1"/>
+              </a:fillRef>
+              <a:effectRef idx="0">
+                <a:schemeClr val="accent1"/>
+              </a:effectRef>
+              <a:fontRef idx="minor">
+                <a:schemeClr val="lt1"/>
+              </a:fontRef>
+            </p:style>
+            <p:txBody>
+              <a:bodyPr rtlCol="0" anchor="ctr"/>
+              <a:lstStyle/>
+              <a:p>
+                <a:pPr algn="ctr"/>
+                <a:r>
+                  <a:rPr lang="en-US" sz="1200" dirty="0">
+                    <a:solidFill>
+                      <a:schemeClr val="bg1">
+                        <a:lumMod val="85000"/>
+                      </a:schemeClr>
+                    </a:solidFill>
+                    <a:latin typeface="Open Sans" panose="020B0606030504020204" pitchFamily="34" charset="0"/>
+                    <a:ea typeface="Open Sans" panose="020B0606030504020204" pitchFamily="34" charset="0"/>
+                    <a:cs typeface="Open Sans" panose="020B0606030504020204" pitchFamily="34" charset="0"/>
+                  </a:rPr>
+                  <a:t>mark &gt;= 50</a:t>
+                </a:r>
+              </a:p>
+            </p:txBody>
+          </p:sp>
+          <p:sp>
+            <p:nvSpPr>
+              <p:cNvPr id="45" name="Rectangle 44">
+                <a:extLst>
+                  <a:ext uri="{FF2B5EF4-FFF2-40B4-BE49-F238E27FC236}">
+                    <a16:creationId xmlns:a16="http://schemas.microsoft.com/office/drawing/2014/main" id="{E55B8FAD-359E-053A-9AE9-04CBA7A87417}"/>
+                  </a:ext>
+                </a:extLst>
+              </p:cNvPr>
+              <p:cNvSpPr/>
+              <p:nvPr/>
+            </p:nvSpPr>
+            <p:spPr>
+              <a:xfrm>
+                <a:off x="949145" y="4672363"/>
+                <a:ext cx="1844844" cy="393032"/>
+              </a:xfrm>
+              <a:prstGeom prst="rect">
+                <a:avLst/>
+              </a:prstGeom>
+              <a:noFill/>
+              <a:ln>
+                <a:solidFill>
+                  <a:schemeClr val="accent6">
+                    <a:lumMod val="60000"/>
+                    <a:lumOff val="40000"/>
+                  </a:schemeClr>
+                </a:solidFill>
+              </a:ln>
+            </p:spPr>
+            <p:style>
+              <a:lnRef idx="2">
+                <a:schemeClr val="accent1">
+                  <a:shade val="50000"/>
+                </a:schemeClr>
+              </a:lnRef>
+              <a:fillRef idx="1">
+                <a:schemeClr val="accent1"/>
+              </a:fillRef>
+              <a:effectRef idx="0">
+                <a:schemeClr val="accent1"/>
+              </a:effectRef>
+              <a:fontRef idx="minor">
+                <a:schemeClr val="lt1"/>
+              </a:fontRef>
+            </p:style>
+            <p:txBody>
+              <a:bodyPr rtlCol="0" anchor="ctr"/>
+              <a:lstStyle/>
+              <a:p>
+                <a:pPr algn="ctr"/>
+                <a:r>
+                  <a:rPr lang="en-US" sz="1200" dirty="0">
+                    <a:solidFill>
+                      <a:schemeClr val="bg1">
+                        <a:lumMod val="85000"/>
+                      </a:schemeClr>
+                    </a:solidFill>
+                    <a:latin typeface="Open Sans" panose="020B0606030504020204" pitchFamily="34" charset="0"/>
+                    <a:ea typeface="Open Sans" panose="020B0606030504020204" pitchFamily="34" charset="0"/>
+                    <a:cs typeface="Open Sans" panose="020B0606030504020204" pitchFamily="34" charset="0"/>
+                  </a:rPr>
+                  <a:t>grade = A</a:t>
+                </a:r>
+              </a:p>
+            </p:txBody>
+          </p:sp>
+          <p:sp>
+            <p:nvSpPr>
+              <p:cNvPr id="46" name="Rectangle 45">
+                <a:extLst>
+                  <a:ext uri="{FF2B5EF4-FFF2-40B4-BE49-F238E27FC236}">
+                    <a16:creationId xmlns:a16="http://schemas.microsoft.com/office/drawing/2014/main" id="{E58D2640-1D49-96D0-AE5C-1485860C5605}"/>
+                  </a:ext>
+                </a:extLst>
+              </p:cNvPr>
+              <p:cNvSpPr/>
+              <p:nvPr/>
+            </p:nvSpPr>
+            <p:spPr>
+              <a:xfrm>
+                <a:off x="3165583" y="4672363"/>
+                <a:ext cx="1844844" cy="393032"/>
+              </a:xfrm>
+              <a:prstGeom prst="rect">
+                <a:avLst/>
+              </a:prstGeom>
+              <a:noFill/>
+              <a:ln>
+                <a:solidFill>
+                  <a:schemeClr val="accent6">
+                    <a:lumMod val="60000"/>
+                    <a:lumOff val="40000"/>
+                  </a:schemeClr>
+                </a:solidFill>
+              </a:ln>
+            </p:spPr>
+            <p:style>
+              <a:lnRef idx="2">
+                <a:schemeClr val="accent1">
+                  <a:shade val="50000"/>
+                </a:schemeClr>
+              </a:lnRef>
+              <a:fillRef idx="1">
+                <a:schemeClr val="accent1"/>
+              </a:fillRef>
+              <a:effectRef idx="0">
+                <a:schemeClr val="accent1"/>
+              </a:effectRef>
+              <a:fontRef idx="minor">
+                <a:schemeClr val="lt1"/>
+              </a:fontRef>
+            </p:style>
+            <p:txBody>
+              <a:bodyPr rtlCol="0" anchor="ctr"/>
+              <a:lstStyle/>
+              <a:p>
+                <a:pPr algn="ctr"/>
+                <a:r>
+                  <a:rPr lang="en-US" sz="1200" dirty="0">
+                    <a:solidFill>
+                      <a:schemeClr val="bg1">
+                        <a:lumMod val="85000"/>
+                      </a:schemeClr>
+                    </a:solidFill>
+                    <a:latin typeface="Open Sans" panose="020B0606030504020204" pitchFamily="34" charset="0"/>
+                    <a:ea typeface="Open Sans" panose="020B0606030504020204" pitchFamily="34" charset="0"/>
+                    <a:cs typeface="Open Sans" panose="020B0606030504020204" pitchFamily="34" charset="0"/>
+                  </a:rPr>
+                  <a:t>grade = B</a:t>
+                </a:r>
+              </a:p>
+            </p:txBody>
+          </p:sp>
+          <p:sp>
+            <p:nvSpPr>
+              <p:cNvPr id="53" name="Rectangle 52">
+                <a:extLst>
+                  <a:ext uri="{FF2B5EF4-FFF2-40B4-BE49-F238E27FC236}">
+                    <a16:creationId xmlns:a16="http://schemas.microsoft.com/office/drawing/2014/main" id="{70E4E27E-F59D-407E-0904-C704C1A9B209}"/>
+                  </a:ext>
+                </a:extLst>
+              </p:cNvPr>
+              <p:cNvSpPr/>
+              <p:nvPr/>
+            </p:nvSpPr>
+            <p:spPr>
+              <a:xfrm>
+                <a:off x="5377387" y="4672363"/>
+                <a:ext cx="1844844" cy="393032"/>
+              </a:xfrm>
+              <a:prstGeom prst="rect">
+                <a:avLst/>
+              </a:prstGeom>
+              <a:noFill/>
+              <a:ln>
+                <a:solidFill>
+                  <a:schemeClr val="accent6">
+                    <a:lumMod val="60000"/>
+                    <a:lumOff val="40000"/>
+                  </a:schemeClr>
+                </a:solidFill>
+              </a:ln>
+            </p:spPr>
+            <p:style>
+              <a:lnRef idx="2">
+                <a:schemeClr val="accent1">
+                  <a:shade val="50000"/>
+                </a:schemeClr>
+              </a:lnRef>
+              <a:fillRef idx="1">
+                <a:schemeClr val="accent1"/>
+              </a:fillRef>
+              <a:effectRef idx="0">
+                <a:schemeClr val="accent1"/>
+              </a:effectRef>
+              <a:fontRef idx="minor">
+                <a:schemeClr val="lt1"/>
+              </a:fontRef>
+            </p:style>
+            <p:txBody>
+              <a:bodyPr rtlCol="0" anchor="ctr"/>
+              <a:lstStyle/>
+              <a:p>
+                <a:pPr algn="ctr"/>
+                <a:r>
+                  <a:rPr lang="en-US" sz="1200" dirty="0">
+                    <a:solidFill>
+                      <a:schemeClr val="bg1">
+                        <a:lumMod val="85000"/>
+                      </a:schemeClr>
+                    </a:solidFill>
+                    <a:latin typeface="Open Sans" panose="020B0606030504020204" pitchFamily="34" charset="0"/>
+                    <a:ea typeface="Open Sans" panose="020B0606030504020204" pitchFamily="34" charset="0"/>
+                    <a:cs typeface="Open Sans" panose="020B0606030504020204" pitchFamily="34" charset="0"/>
+                  </a:rPr>
+                  <a:t>grade = C</a:t>
+                </a:r>
+              </a:p>
+            </p:txBody>
+          </p:sp>
+          <p:sp>
+            <p:nvSpPr>
+              <p:cNvPr id="54" name="Rectangle 53">
+                <a:extLst>
+                  <a:ext uri="{FF2B5EF4-FFF2-40B4-BE49-F238E27FC236}">
+                    <a16:creationId xmlns:a16="http://schemas.microsoft.com/office/drawing/2014/main" id="{6615053B-C92C-45F8-0C19-BF024B442222}"/>
+                  </a:ext>
+                </a:extLst>
+              </p:cNvPr>
+              <p:cNvSpPr/>
+              <p:nvPr/>
+            </p:nvSpPr>
+            <p:spPr>
+              <a:xfrm>
+                <a:off x="7591919" y="4672363"/>
+                <a:ext cx="1844844" cy="393032"/>
+              </a:xfrm>
+              <a:prstGeom prst="rect">
+                <a:avLst/>
+              </a:prstGeom>
+              <a:noFill/>
+              <a:ln>
+                <a:solidFill>
+                  <a:schemeClr val="accent6">
+                    <a:lumMod val="60000"/>
+                    <a:lumOff val="40000"/>
+                  </a:schemeClr>
+                </a:solidFill>
+              </a:ln>
+            </p:spPr>
+            <p:style>
+              <a:lnRef idx="2">
+                <a:schemeClr val="accent1">
+                  <a:shade val="50000"/>
+                </a:schemeClr>
+              </a:lnRef>
+              <a:fillRef idx="1">
+                <a:schemeClr val="accent1"/>
+              </a:fillRef>
+              <a:effectRef idx="0">
+                <a:schemeClr val="accent1"/>
+              </a:effectRef>
+              <a:fontRef idx="minor">
+                <a:schemeClr val="lt1"/>
+              </a:fontRef>
+            </p:style>
+            <p:txBody>
+              <a:bodyPr rtlCol="0" anchor="ctr"/>
+              <a:lstStyle/>
+              <a:p>
+                <a:pPr algn="ctr"/>
+                <a:r>
+                  <a:rPr lang="en-US" sz="1200" dirty="0">
+                    <a:solidFill>
+                      <a:schemeClr val="bg1">
+                        <a:lumMod val="85000"/>
+                      </a:schemeClr>
+                    </a:solidFill>
+                    <a:latin typeface="Open Sans" panose="020B0606030504020204" pitchFamily="34" charset="0"/>
+                    <a:ea typeface="Open Sans" panose="020B0606030504020204" pitchFamily="34" charset="0"/>
+                    <a:cs typeface="Open Sans" panose="020B0606030504020204" pitchFamily="34" charset="0"/>
+                  </a:rPr>
+                  <a:t>grade = D</a:t>
+                </a:r>
+              </a:p>
+            </p:txBody>
+          </p:sp>
+          <p:sp>
+            <p:nvSpPr>
+              <p:cNvPr id="55" name="Rectangle 54">
+                <a:extLst>
+                  <a:ext uri="{FF2B5EF4-FFF2-40B4-BE49-F238E27FC236}">
+                    <a16:creationId xmlns:a16="http://schemas.microsoft.com/office/drawing/2014/main" id="{7BAA7A72-F91A-2270-293F-899656069CBC}"/>
+                  </a:ext>
+                </a:extLst>
+              </p:cNvPr>
+              <p:cNvSpPr/>
+              <p:nvPr/>
+            </p:nvSpPr>
+            <p:spPr>
+              <a:xfrm>
+                <a:off x="7591919" y="2758969"/>
+                <a:ext cx="1844844" cy="393032"/>
+              </a:xfrm>
+              <a:prstGeom prst="rect">
+                <a:avLst/>
+              </a:prstGeom>
+              <a:noFill/>
+              <a:ln>
+                <a:solidFill>
+                  <a:schemeClr val="accent6">
+                    <a:lumMod val="60000"/>
+                    <a:lumOff val="40000"/>
+                  </a:schemeClr>
+                </a:solidFill>
+              </a:ln>
+            </p:spPr>
+            <p:style>
+              <a:lnRef idx="2">
+                <a:schemeClr val="accent1">
+                  <a:shade val="50000"/>
+                </a:schemeClr>
+              </a:lnRef>
+              <a:fillRef idx="1">
+                <a:schemeClr val="accent1"/>
+              </a:fillRef>
+              <a:effectRef idx="0">
+                <a:schemeClr val="accent1"/>
+              </a:effectRef>
+              <a:fontRef idx="minor">
+                <a:schemeClr val="lt1"/>
+              </a:fontRef>
+            </p:style>
+            <p:txBody>
+              <a:bodyPr rtlCol="0" anchor="ctr"/>
+              <a:lstStyle/>
+              <a:p>
+                <a:pPr algn="ctr"/>
+                <a:r>
+                  <a:rPr lang="en-US" sz="1200" dirty="0">
+                    <a:solidFill>
+                      <a:schemeClr val="bg1">
+                        <a:lumMod val="85000"/>
+                      </a:schemeClr>
+                    </a:solidFill>
+                    <a:latin typeface="Open Sans" panose="020B0606030504020204" pitchFamily="34" charset="0"/>
+                    <a:ea typeface="Open Sans" panose="020B0606030504020204" pitchFamily="34" charset="0"/>
+                    <a:cs typeface="Open Sans" panose="020B0606030504020204" pitchFamily="34" charset="0"/>
+                  </a:rPr>
+                  <a:t>grade = E</a:t>
+                </a:r>
+              </a:p>
+            </p:txBody>
+          </p:sp>
+          <p:cxnSp>
+            <p:nvCxnSpPr>
+              <p:cNvPr id="38" name="Straight Arrow Connector 37">
+                <a:extLst>
+                  <a:ext uri="{FF2B5EF4-FFF2-40B4-BE49-F238E27FC236}">
+                    <a16:creationId xmlns:a16="http://schemas.microsoft.com/office/drawing/2014/main" id="{DF1727F8-CD25-7178-1A25-A257F2BCADA0}"/>
+                  </a:ext>
+                </a:extLst>
+              </p:cNvPr>
+              <p:cNvCxnSpPr>
+                <a:stCxn id="67" idx="2"/>
+                <a:endCxn id="20" idx="0"/>
+              </p:cNvCxnSpPr>
+              <p:nvPr/>
+            </p:nvCxnSpPr>
+            <p:spPr>
+              <a:xfrm>
+                <a:off x="1876203" y="3152001"/>
+                <a:ext cx="0" cy="286939"/>
+              </a:xfrm>
+              <a:prstGeom prst="straightConnector1">
+                <a:avLst/>
+              </a:prstGeom>
+              <a:ln w="12700">
+                <a:solidFill>
+                  <a:srgbClr val="FF7C80"/>
+                </a:solidFill>
+                <a:tailEnd type="triangle"/>
+              </a:ln>
+            </p:spPr>
+            <p:style>
+              <a:lnRef idx="1">
+                <a:schemeClr val="accent1"/>
+              </a:lnRef>
+              <a:fillRef idx="0">
+                <a:schemeClr val="accent1"/>
+              </a:fillRef>
+              <a:effectRef idx="0">
+                <a:schemeClr val="accent1"/>
+              </a:effectRef>
+              <a:fontRef idx="minor">
+                <a:schemeClr val="tx1"/>
+              </a:fontRef>
+            </p:style>
+          </p:cxnSp>
+          <p:cxnSp>
+            <p:nvCxnSpPr>
+              <p:cNvPr id="40" name="Straight Arrow Connector 39">
+                <a:extLst>
+                  <a:ext uri="{FF2B5EF4-FFF2-40B4-BE49-F238E27FC236}">
+                    <a16:creationId xmlns:a16="http://schemas.microsoft.com/office/drawing/2014/main" id="{730E9198-70EC-A277-6FA3-D8C3C4080431}"/>
+                  </a:ext>
+                </a:extLst>
+              </p:cNvPr>
+              <p:cNvCxnSpPr>
+                <a:stCxn id="20" idx="3"/>
+                <a:endCxn id="22" idx="1"/>
+              </p:cNvCxnSpPr>
+              <p:nvPr/>
+            </p:nvCxnSpPr>
+            <p:spPr>
+              <a:xfrm>
+                <a:off x="2798625" y="3912182"/>
+                <a:ext cx="366959" cy="0"/>
+              </a:xfrm>
+              <a:prstGeom prst="straightConnector1">
+                <a:avLst/>
+              </a:prstGeom>
+              <a:ln w="12700">
+                <a:solidFill>
+                  <a:srgbClr val="FF7C80"/>
+                </a:solidFill>
+                <a:tailEnd type="triangle"/>
+              </a:ln>
+            </p:spPr>
+            <p:style>
+              <a:lnRef idx="1">
+                <a:schemeClr val="accent1"/>
+              </a:lnRef>
+              <a:fillRef idx="0">
+                <a:schemeClr val="accent1"/>
+              </a:fillRef>
+              <a:effectRef idx="0">
+                <a:schemeClr val="accent1"/>
+              </a:effectRef>
+              <a:fontRef idx="minor">
+                <a:schemeClr val="tx1"/>
+              </a:fontRef>
+            </p:style>
+          </p:cxnSp>
+          <p:cxnSp>
+            <p:nvCxnSpPr>
+              <p:cNvPr id="42" name="Straight Arrow Connector 41">
+                <a:extLst>
+                  <a:ext uri="{FF2B5EF4-FFF2-40B4-BE49-F238E27FC236}">
+                    <a16:creationId xmlns:a16="http://schemas.microsoft.com/office/drawing/2014/main" id="{02A15361-63D1-4FB8-B208-CD3925DFD07E}"/>
+                  </a:ext>
+                </a:extLst>
+              </p:cNvPr>
+              <p:cNvCxnSpPr>
+                <a:stCxn id="22" idx="3"/>
+                <a:endCxn id="28" idx="1"/>
+              </p:cNvCxnSpPr>
+              <p:nvPr/>
+            </p:nvCxnSpPr>
+            <p:spPr>
+              <a:xfrm>
+                <a:off x="5010428" y="3912182"/>
+                <a:ext cx="366959" cy="0"/>
+              </a:xfrm>
+              <a:prstGeom prst="straightConnector1">
+                <a:avLst/>
+              </a:prstGeom>
+              <a:ln w="12700">
+                <a:solidFill>
+                  <a:srgbClr val="FF7C80"/>
+                </a:solidFill>
+                <a:tailEnd type="triangle"/>
+              </a:ln>
+            </p:spPr>
+            <p:style>
+              <a:lnRef idx="1">
+                <a:schemeClr val="accent1"/>
+              </a:lnRef>
+              <a:fillRef idx="0">
+                <a:schemeClr val="accent1"/>
+              </a:fillRef>
+              <a:effectRef idx="0">
+                <a:schemeClr val="accent1"/>
+              </a:effectRef>
+              <a:fontRef idx="minor">
+                <a:schemeClr val="tx1"/>
+              </a:fontRef>
+            </p:style>
+          </p:cxnSp>
+          <p:cxnSp>
+            <p:nvCxnSpPr>
+              <p:cNvPr id="44" name="Straight Arrow Connector 43">
+                <a:extLst>
+                  <a:ext uri="{FF2B5EF4-FFF2-40B4-BE49-F238E27FC236}">
+                    <a16:creationId xmlns:a16="http://schemas.microsoft.com/office/drawing/2014/main" id="{70503018-AFBA-80E5-3DFE-1424DB593629}"/>
+                  </a:ext>
+                </a:extLst>
+              </p:cNvPr>
+              <p:cNvCxnSpPr>
+                <a:stCxn id="28" idx="3"/>
+                <a:endCxn id="35" idx="1"/>
+              </p:cNvCxnSpPr>
+              <p:nvPr/>
+            </p:nvCxnSpPr>
+            <p:spPr>
+              <a:xfrm>
+                <a:off x="7222231" y="3912182"/>
+                <a:ext cx="366959" cy="0"/>
+              </a:xfrm>
+              <a:prstGeom prst="straightConnector1">
+                <a:avLst/>
+              </a:prstGeom>
+              <a:ln w="12700">
+                <a:solidFill>
+                  <a:srgbClr val="FF7C80"/>
+                </a:solidFill>
+                <a:tailEnd type="triangle"/>
+              </a:ln>
+            </p:spPr>
+            <p:style>
+              <a:lnRef idx="1">
+                <a:schemeClr val="accent1"/>
+              </a:lnRef>
+              <a:fillRef idx="0">
+                <a:schemeClr val="accent1"/>
+              </a:fillRef>
+              <a:effectRef idx="0">
+                <a:schemeClr val="accent1"/>
+              </a:effectRef>
+              <a:fontRef idx="minor">
+                <a:schemeClr val="tx1"/>
+              </a:fontRef>
+            </p:style>
+          </p:cxnSp>
+          <p:cxnSp>
+            <p:nvCxnSpPr>
+              <p:cNvPr id="62" name="Straight Arrow Connector 61">
+                <a:extLst>
+                  <a:ext uri="{FF2B5EF4-FFF2-40B4-BE49-F238E27FC236}">
+                    <a16:creationId xmlns:a16="http://schemas.microsoft.com/office/drawing/2014/main" id="{1233EE50-681B-608E-9A1C-E3B8C56A1199}"/>
+                  </a:ext>
+                </a:extLst>
+              </p:cNvPr>
+              <p:cNvCxnSpPr>
+                <a:stCxn id="35" idx="0"/>
+                <a:endCxn id="55" idx="2"/>
+              </p:cNvCxnSpPr>
+              <p:nvPr/>
+            </p:nvCxnSpPr>
+            <p:spPr>
+              <a:xfrm flipV="1">
+                <a:off x="8511612" y="3152001"/>
+                <a:ext cx="2729" cy="286939"/>
+              </a:xfrm>
+              <a:prstGeom prst="straightConnector1">
+                <a:avLst/>
+              </a:prstGeom>
+              <a:ln w="12700">
+                <a:solidFill>
+                  <a:srgbClr val="FF7C80"/>
+                </a:solidFill>
+                <a:tailEnd type="triangle"/>
+              </a:ln>
+            </p:spPr>
+            <p:style>
+              <a:lnRef idx="1">
+                <a:schemeClr val="accent1"/>
+              </a:lnRef>
+              <a:fillRef idx="0">
+                <a:schemeClr val="accent1"/>
+              </a:fillRef>
+              <a:effectRef idx="0">
+                <a:schemeClr val="accent1"/>
+              </a:effectRef>
+              <a:fontRef idx="minor">
+                <a:schemeClr val="tx1"/>
+              </a:fontRef>
+            </p:style>
+          </p:cxnSp>
+          <p:cxnSp>
+            <p:nvCxnSpPr>
+              <p:cNvPr id="64" name="Straight Arrow Connector 63">
+                <a:extLst>
+                  <a:ext uri="{FF2B5EF4-FFF2-40B4-BE49-F238E27FC236}">
+                    <a16:creationId xmlns:a16="http://schemas.microsoft.com/office/drawing/2014/main" id="{F532C1C0-6B21-2607-77C8-133D3361B5AE}"/>
+                  </a:ext>
+                </a:extLst>
+              </p:cNvPr>
+              <p:cNvCxnSpPr>
+                <a:stCxn id="20" idx="2"/>
+                <a:endCxn id="45" idx="0"/>
+              </p:cNvCxnSpPr>
+              <p:nvPr/>
+            </p:nvCxnSpPr>
+            <p:spPr>
+              <a:xfrm flipH="1">
+                <a:off x="1871567" y="4385424"/>
+                <a:ext cx="4636" cy="286939"/>
+              </a:xfrm>
+              <a:prstGeom prst="straightConnector1">
+                <a:avLst/>
+              </a:prstGeom>
+              <a:ln w="12700">
+                <a:solidFill>
+                  <a:srgbClr val="FF7C80"/>
+                </a:solidFill>
+                <a:tailEnd type="triangle"/>
+              </a:ln>
+            </p:spPr>
+            <p:style>
+              <a:lnRef idx="1">
+                <a:schemeClr val="accent1"/>
+              </a:lnRef>
+              <a:fillRef idx="0">
+                <a:schemeClr val="accent1"/>
+              </a:fillRef>
+              <a:effectRef idx="0">
+                <a:schemeClr val="accent1"/>
+              </a:effectRef>
+              <a:fontRef idx="minor">
+                <a:schemeClr val="tx1"/>
+              </a:fontRef>
+            </p:style>
+          </p:cxnSp>
+          <p:cxnSp>
+            <p:nvCxnSpPr>
+              <p:cNvPr id="66" name="Straight Arrow Connector 65">
+                <a:extLst>
+                  <a:ext uri="{FF2B5EF4-FFF2-40B4-BE49-F238E27FC236}">
+                    <a16:creationId xmlns:a16="http://schemas.microsoft.com/office/drawing/2014/main" id="{F0D80A01-AAB7-3216-56B0-A5CE06CC571C}"/>
+                  </a:ext>
+                </a:extLst>
+              </p:cNvPr>
+              <p:cNvCxnSpPr>
+                <a:stCxn id="22" idx="2"/>
+                <a:endCxn id="46" idx="0"/>
+              </p:cNvCxnSpPr>
+              <p:nvPr/>
+            </p:nvCxnSpPr>
+            <p:spPr>
+              <a:xfrm flipH="1">
+                <a:off x="4088005" y="4385424"/>
+                <a:ext cx="1" cy="286939"/>
+              </a:xfrm>
+              <a:prstGeom prst="straightConnector1">
+                <a:avLst/>
+              </a:prstGeom>
+              <a:ln w="12700">
+                <a:solidFill>
+                  <a:srgbClr val="FF7C80"/>
+                </a:solidFill>
+                <a:tailEnd type="triangle"/>
+              </a:ln>
+            </p:spPr>
+            <p:style>
+              <a:lnRef idx="1">
+                <a:schemeClr val="accent1"/>
+              </a:lnRef>
+              <a:fillRef idx="0">
+                <a:schemeClr val="accent1"/>
+              </a:fillRef>
+              <a:effectRef idx="0">
+                <a:schemeClr val="accent1"/>
+              </a:effectRef>
+              <a:fontRef idx="minor">
+                <a:schemeClr val="tx1"/>
+              </a:fontRef>
+            </p:style>
+          </p:cxnSp>
+          <p:cxnSp>
+            <p:nvCxnSpPr>
+              <p:cNvPr id="69" name="Straight Arrow Connector 68">
+                <a:extLst>
+                  <a:ext uri="{FF2B5EF4-FFF2-40B4-BE49-F238E27FC236}">
+                    <a16:creationId xmlns:a16="http://schemas.microsoft.com/office/drawing/2014/main" id="{578E5BC9-4F12-78CC-D84C-8D89A8636919}"/>
+                  </a:ext>
+                </a:extLst>
+              </p:cNvPr>
+              <p:cNvCxnSpPr>
+                <a:stCxn id="28" idx="2"/>
+                <a:endCxn id="53" idx="0"/>
+              </p:cNvCxnSpPr>
+              <p:nvPr/>
+            </p:nvCxnSpPr>
+            <p:spPr>
+              <a:xfrm>
+                <a:off x="6299809" y="4385424"/>
+                <a:ext cx="0" cy="286939"/>
+              </a:xfrm>
+              <a:prstGeom prst="straightConnector1">
+                <a:avLst/>
+              </a:prstGeom>
+              <a:ln w="12700">
+                <a:solidFill>
+                  <a:srgbClr val="FF7C80"/>
+                </a:solidFill>
+                <a:tailEnd type="triangle"/>
+              </a:ln>
+            </p:spPr>
+            <p:style>
+              <a:lnRef idx="1">
+                <a:schemeClr val="accent1"/>
+              </a:lnRef>
+              <a:fillRef idx="0">
+                <a:schemeClr val="accent1"/>
+              </a:fillRef>
+              <a:effectRef idx="0">
+                <a:schemeClr val="accent1"/>
+              </a:effectRef>
+              <a:fontRef idx="minor">
+                <a:schemeClr val="tx1"/>
+              </a:fontRef>
+            </p:style>
+          </p:cxnSp>
+          <p:cxnSp>
+            <p:nvCxnSpPr>
+              <p:cNvPr id="71" name="Straight Arrow Connector 70">
+                <a:extLst>
+                  <a:ext uri="{FF2B5EF4-FFF2-40B4-BE49-F238E27FC236}">
+                    <a16:creationId xmlns:a16="http://schemas.microsoft.com/office/drawing/2014/main" id="{285AEEB8-CE64-D98A-EF6C-67AC89C59A83}"/>
+                  </a:ext>
+                </a:extLst>
+              </p:cNvPr>
+              <p:cNvCxnSpPr>
+                <a:stCxn id="35" idx="2"/>
+                <a:endCxn id="54" idx="0"/>
+              </p:cNvCxnSpPr>
+              <p:nvPr/>
+            </p:nvCxnSpPr>
+            <p:spPr>
+              <a:xfrm>
+                <a:off x="8511612" y="4385424"/>
+                <a:ext cx="2729" cy="286939"/>
+              </a:xfrm>
+              <a:prstGeom prst="straightConnector1">
+                <a:avLst/>
+              </a:prstGeom>
+              <a:ln w="12700">
+                <a:solidFill>
+                  <a:srgbClr val="FF7C80"/>
+                </a:solidFill>
+                <a:tailEnd type="triangle"/>
+              </a:ln>
+            </p:spPr>
+            <p:style>
+              <a:lnRef idx="1">
+                <a:schemeClr val="accent1"/>
+              </a:lnRef>
+              <a:fillRef idx="0">
+                <a:schemeClr val="accent1"/>
+              </a:fillRef>
+              <a:effectRef idx="0">
+                <a:schemeClr val="accent1"/>
+              </a:effectRef>
+              <a:fontRef idx="minor">
+                <a:schemeClr val="tx1"/>
+              </a:fontRef>
+            </p:style>
+          </p:cxnSp>
+          <p:sp>
+            <p:nvSpPr>
+              <p:cNvPr id="74" name="TextBox 73">
+                <a:extLst>
+                  <a:ext uri="{FF2B5EF4-FFF2-40B4-BE49-F238E27FC236}">
+                    <a16:creationId xmlns:a16="http://schemas.microsoft.com/office/drawing/2014/main" id="{D1EF71AA-0AAE-0DD8-6FC5-3FB7CD854737}"/>
+                  </a:ext>
+                </a:extLst>
+              </p:cNvPr>
+              <p:cNvSpPr txBox="1"/>
+              <p:nvPr/>
+            </p:nvSpPr>
+            <p:spPr>
+              <a:xfrm>
+                <a:off x="2798624" y="3635183"/>
+                <a:ext cx="269626" cy="276999"/>
+              </a:xfrm>
+              <a:prstGeom prst="rect">
+                <a:avLst/>
+              </a:prstGeom>
+              <a:noFill/>
+            </p:spPr>
+            <p:txBody>
+              <a:bodyPr wrap="none" rtlCol="0">
+                <a:spAutoFit/>
+              </a:bodyPr>
+              <a:lstStyle/>
+              <a:p>
+                <a:r>
+                  <a:rPr lang="en-US" sz="1200" dirty="0">
+                    <a:solidFill>
+                      <a:srgbClr val="FF7C80"/>
+                    </a:solidFill>
+                    <a:latin typeface="Open Sans" panose="020B0606030504020204" pitchFamily="34" charset="0"/>
+                    <a:ea typeface="Open Sans" panose="020B0606030504020204" pitchFamily="34" charset="0"/>
+                    <a:cs typeface="Open Sans" panose="020B0606030504020204" pitchFamily="34" charset="0"/>
+                  </a:rPr>
+                  <a:t>F</a:t>
+                </a:r>
+              </a:p>
+            </p:txBody>
+          </p:sp>
+          <p:sp>
+            <p:nvSpPr>
+              <p:cNvPr id="76" name="TextBox 75">
+                <a:extLst>
+                  <a:ext uri="{FF2B5EF4-FFF2-40B4-BE49-F238E27FC236}">
+                    <a16:creationId xmlns:a16="http://schemas.microsoft.com/office/drawing/2014/main" id="{F6624D32-307F-BEE8-5DCC-79846F034670}"/>
+                  </a:ext>
+                </a:extLst>
+              </p:cNvPr>
+              <p:cNvSpPr txBox="1"/>
+              <p:nvPr/>
+            </p:nvSpPr>
+            <p:spPr>
+              <a:xfrm>
+                <a:off x="1601941" y="4390393"/>
+                <a:ext cx="269626" cy="276999"/>
+              </a:xfrm>
+              <a:prstGeom prst="rect">
+                <a:avLst/>
+              </a:prstGeom>
+              <a:noFill/>
+            </p:spPr>
+            <p:txBody>
+              <a:bodyPr wrap="none" rtlCol="0">
+                <a:spAutoFit/>
+              </a:bodyPr>
+              <a:lstStyle/>
+              <a:p>
+                <a:r>
+                  <a:rPr lang="en-US" sz="1200" dirty="0">
+                    <a:solidFill>
+                      <a:srgbClr val="FF7C80"/>
+                    </a:solidFill>
+                    <a:latin typeface="Open Sans" panose="020B0606030504020204" pitchFamily="34" charset="0"/>
+                    <a:ea typeface="Open Sans" panose="020B0606030504020204" pitchFamily="34" charset="0"/>
+                    <a:cs typeface="Open Sans" panose="020B0606030504020204" pitchFamily="34" charset="0"/>
+                  </a:rPr>
+                  <a:t>T</a:t>
+                </a:r>
+              </a:p>
+            </p:txBody>
+          </p:sp>
+          <p:sp>
+            <p:nvSpPr>
+              <p:cNvPr id="77" name="TextBox 76">
+                <a:extLst>
+                  <a:ext uri="{FF2B5EF4-FFF2-40B4-BE49-F238E27FC236}">
+                    <a16:creationId xmlns:a16="http://schemas.microsoft.com/office/drawing/2014/main" id="{5C9F1F96-B8EC-B177-7727-0DD07CA04EA6}"/>
+                  </a:ext>
+                </a:extLst>
+              </p:cNvPr>
+              <p:cNvSpPr txBox="1"/>
+              <p:nvPr/>
+            </p:nvSpPr>
+            <p:spPr>
+              <a:xfrm>
+                <a:off x="5019297" y="3635183"/>
+                <a:ext cx="269626" cy="276999"/>
+              </a:xfrm>
+              <a:prstGeom prst="rect">
+                <a:avLst/>
+              </a:prstGeom>
+              <a:noFill/>
+            </p:spPr>
+            <p:txBody>
+              <a:bodyPr wrap="none" rtlCol="0">
+                <a:spAutoFit/>
+              </a:bodyPr>
+              <a:lstStyle/>
+              <a:p>
+                <a:r>
+                  <a:rPr lang="en-US" sz="1200" dirty="0">
+                    <a:solidFill>
+                      <a:srgbClr val="FF7C80"/>
+                    </a:solidFill>
+                    <a:latin typeface="Open Sans" panose="020B0606030504020204" pitchFamily="34" charset="0"/>
+                    <a:ea typeface="Open Sans" panose="020B0606030504020204" pitchFamily="34" charset="0"/>
+                    <a:cs typeface="Open Sans" panose="020B0606030504020204" pitchFamily="34" charset="0"/>
+                  </a:rPr>
+                  <a:t>F</a:t>
+                </a:r>
+              </a:p>
+            </p:txBody>
+          </p:sp>
+          <p:sp>
+            <p:nvSpPr>
+              <p:cNvPr id="78" name="TextBox 77">
+                <a:extLst>
+                  <a:ext uri="{FF2B5EF4-FFF2-40B4-BE49-F238E27FC236}">
+                    <a16:creationId xmlns:a16="http://schemas.microsoft.com/office/drawing/2014/main" id="{E29F5D91-4B83-F5CA-3F1C-010A1ADF72D4}"/>
+                  </a:ext>
+                </a:extLst>
+              </p:cNvPr>
+              <p:cNvSpPr txBox="1"/>
+              <p:nvPr/>
+            </p:nvSpPr>
+            <p:spPr>
+              <a:xfrm>
+                <a:off x="3822614" y="4390393"/>
+                <a:ext cx="269626" cy="276999"/>
+              </a:xfrm>
+              <a:prstGeom prst="rect">
+                <a:avLst/>
+              </a:prstGeom>
+              <a:noFill/>
+            </p:spPr>
+            <p:txBody>
+              <a:bodyPr wrap="none" rtlCol="0">
+                <a:spAutoFit/>
+              </a:bodyPr>
+              <a:lstStyle/>
+              <a:p>
+                <a:r>
+                  <a:rPr lang="en-US" sz="1200" dirty="0">
+                    <a:solidFill>
+                      <a:srgbClr val="FF7C80"/>
+                    </a:solidFill>
+                    <a:latin typeface="Open Sans" panose="020B0606030504020204" pitchFamily="34" charset="0"/>
+                    <a:ea typeface="Open Sans" panose="020B0606030504020204" pitchFamily="34" charset="0"/>
+                    <a:cs typeface="Open Sans" panose="020B0606030504020204" pitchFamily="34" charset="0"/>
+                  </a:rPr>
+                  <a:t>T</a:t>
+                </a:r>
+              </a:p>
+            </p:txBody>
+          </p:sp>
+          <p:sp>
+            <p:nvSpPr>
+              <p:cNvPr id="82" name="TextBox 81">
+                <a:extLst>
+                  <a:ext uri="{FF2B5EF4-FFF2-40B4-BE49-F238E27FC236}">
+                    <a16:creationId xmlns:a16="http://schemas.microsoft.com/office/drawing/2014/main" id="{0D3FEACD-787A-D654-4E26-8AC8A53E9365}"/>
+                  </a:ext>
+                </a:extLst>
+              </p:cNvPr>
+              <p:cNvSpPr txBox="1"/>
+              <p:nvPr/>
+            </p:nvSpPr>
+            <p:spPr>
+              <a:xfrm>
+                <a:off x="7222229" y="3635183"/>
+                <a:ext cx="269626" cy="276999"/>
+              </a:xfrm>
+              <a:prstGeom prst="rect">
+                <a:avLst/>
+              </a:prstGeom>
+              <a:noFill/>
+            </p:spPr>
+            <p:txBody>
+              <a:bodyPr wrap="none" rtlCol="0">
+                <a:spAutoFit/>
+              </a:bodyPr>
+              <a:lstStyle/>
+              <a:p>
+                <a:r>
+                  <a:rPr lang="en-US" sz="1200" dirty="0">
+                    <a:solidFill>
+                      <a:srgbClr val="FF7C80"/>
+                    </a:solidFill>
+                    <a:latin typeface="Open Sans" panose="020B0606030504020204" pitchFamily="34" charset="0"/>
+                    <a:ea typeface="Open Sans" panose="020B0606030504020204" pitchFamily="34" charset="0"/>
+                    <a:cs typeface="Open Sans" panose="020B0606030504020204" pitchFamily="34" charset="0"/>
+                  </a:rPr>
+                  <a:t>F</a:t>
+                </a:r>
+              </a:p>
+            </p:txBody>
+          </p:sp>
+          <p:sp>
+            <p:nvSpPr>
+              <p:cNvPr id="83" name="TextBox 82">
+                <a:extLst>
+                  <a:ext uri="{FF2B5EF4-FFF2-40B4-BE49-F238E27FC236}">
+                    <a16:creationId xmlns:a16="http://schemas.microsoft.com/office/drawing/2014/main" id="{CC87D525-81D7-76D0-DBD2-E726203B2481}"/>
+                  </a:ext>
+                </a:extLst>
+              </p:cNvPr>
+              <p:cNvSpPr txBox="1"/>
+              <p:nvPr/>
+            </p:nvSpPr>
+            <p:spPr>
+              <a:xfrm>
+                <a:off x="6025546" y="4390393"/>
+                <a:ext cx="269626" cy="276999"/>
+              </a:xfrm>
+              <a:prstGeom prst="rect">
+                <a:avLst/>
+              </a:prstGeom>
+              <a:noFill/>
+            </p:spPr>
+            <p:txBody>
+              <a:bodyPr wrap="none" rtlCol="0">
+                <a:spAutoFit/>
+              </a:bodyPr>
+              <a:lstStyle/>
+              <a:p>
+                <a:r>
+                  <a:rPr lang="en-US" sz="1200" dirty="0">
+                    <a:solidFill>
+                      <a:srgbClr val="FF7C80"/>
+                    </a:solidFill>
+                    <a:latin typeface="Open Sans" panose="020B0606030504020204" pitchFamily="34" charset="0"/>
+                    <a:ea typeface="Open Sans" panose="020B0606030504020204" pitchFamily="34" charset="0"/>
+                    <a:cs typeface="Open Sans" panose="020B0606030504020204" pitchFamily="34" charset="0"/>
+                  </a:rPr>
+                  <a:t>T</a:t>
+                </a:r>
+              </a:p>
+            </p:txBody>
+          </p:sp>
+          <p:sp>
+            <p:nvSpPr>
+              <p:cNvPr id="84" name="TextBox 83">
+                <a:extLst>
+                  <a:ext uri="{FF2B5EF4-FFF2-40B4-BE49-F238E27FC236}">
+                    <a16:creationId xmlns:a16="http://schemas.microsoft.com/office/drawing/2014/main" id="{D15610B5-26A8-9DD5-2D77-13B8049C8742}"/>
+                  </a:ext>
+                </a:extLst>
+              </p:cNvPr>
+              <p:cNvSpPr txBox="1"/>
+              <p:nvPr/>
+            </p:nvSpPr>
+            <p:spPr>
+              <a:xfrm>
+                <a:off x="8244604" y="3192579"/>
+                <a:ext cx="269626" cy="276999"/>
+              </a:xfrm>
+              <a:prstGeom prst="rect">
+                <a:avLst/>
+              </a:prstGeom>
+              <a:noFill/>
+            </p:spPr>
+            <p:txBody>
+              <a:bodyPr wrap="none" rtlCol="0">
+                <a:spAutoFit/>
+              </a:bodyPr>
+              <a:lstStyle/>
+              <a:p>
+                <a:r>
+                  <a:rPr lang="en-US" sz="1200" dirty="0">
+                    <a:solidFill>
+                      <a:srgbClr val="FF7C80"/>
+                    </a:solidFill>
+                    <a:latin typeface="Open Sans" panose="020B0606030504020204" pitchFamily="34" charset="0"/>
+                    <a:ea typeface="Open Sans" panose="020B0606030504020204" pitchFamily="34" charset="0"/>
+                    <a:cs typeface="Open Sans" panose="020B0606030504020204" pitchFamily="34" charset="0"/>
+                  </a:rPr>
+                  <a:t>F</a:t>
+                </a:r>
+              </a:p>
+            </p:txBody>
+          </p:sp>
+          <p:sp>
+            <p:nvSpPr>
+              <p:cNvPr id="85" name="TextBox 84">
+                <a:extLst>
+                  <a:ext uri="{FF2B5EF4-FFF2-40B4-BE49-F238E27FC236}">
+                    <a16:creationId xmlns:a16="http://schemas.microsoft.com/office/drawing/2014/main" id="{244B5E01-C908-8696-D83D-81602D9C2DC7}"/>
+                  </a:ext>
+                </a:extLst>
+              </p:cNvPr>
+              <p:cNvSpPr txBox="1"/>
+              <p:nvPr/>
+            </p:nvSpPr>
+            <p:spPr>
+              <a:xfrm>
+                <a:off x="8233117" y="4390393"/>
+                <a:ext cx="269626" cy="276999"/>
+              </a:xfrm>
+              <a:prstGeom prst="rect">
+                <a:avLst/>
+              </a:prstGeom>
+              <a:noFill/>
+            </p:spPr>
+            <p:txBody>
+              <a:bodyPr wrap="none" rtlCol="0">
+                <a:spAutoFit/>
+              </a:bodyPr>
+              <a:lstStyle/>
+              <a:p>
+                <a:r>
+                  <a:rPr lang="en-US" sz="1200" dirty="0">
+                    <a:solidFill>
+                      <a:srgbClr val="FF7C80"/>
+                    </a:solidFill>
+                    <a:latin typeface="Open Sans" panose="020B0606030504020204" pitchFamily="34" charset="0"/>
+                    <a:ea typeface="Open Sans" panose="020B0606030504020204" pitchFamily="34" charset="0"/>
+                    <a:cs typeface="Open Sans" panose="020B0606030504020204" pitchFamily="34" charset="0"/>
+                  </a:rPr>
+                  <a:t>T</a:t>
+                </a:r>
+              </a:p>
+            </p:txBody>
+          </p:sp>
+          <p:sp>
+            <p:nvSpPr>
+              <p:cNvPr id="86" name="Rectangle 85">
+                <a:extLst>
+                  <a:ext uri="{FF2B5EF4-FFF2-40B4-BE49-F238E27FC236}">
+                    <a16:creationId xmlns:a16="http://schemas.microsoft.com/office/drawing/2014/main" id="{520307CD-C4D3-5D0E-178F-E71B48DD1D34}"/>
+                  </a:ext>
+                </a:extLst>
+              </p:cNvPr>
+              <p:cNvSpPr/>
+              <p:nvPr/>
+            </p:nvSpPr>
+            <p:spPr>
+              <a:xfrm>
+                <a:off x="3165583" y="2322223"/>
+                <a:ext cx="1844844" cy="720573"/>
+              </a:xfrm>
+              <a:prstGeom prst="rect">
+                <a:avLst/>
+              </a:prstGeom>
+              <a:noFill/>
+              <a:ln>
+                <a:solidFill>
+                  <a:schemeClr val="accent6">
+                    <a:lumMod val="60000"/>
+                    <a:lumOff val="40000"/>
+                  </a:schemeClr>
+                </a:solidFill>
+              </a:ln>
+            </p:spPr>
+            <p:style>
+              <a:lnRef idx="2">
+                <a:schemeClr val="accent1">
+                  <a:shade val="50000"/>
+                </a:schemeClr>
+              </a:lnRef>
+              <a:fillRef idx="1">
+                <a:schemeClr val="accent1"/>
+              </a:fillRef>
+              <a:effectRef idx="0">
+                <a:schemeClr val="accent1"/>
+              </a:effectRef>
+              <a:fontRef idx="minor">
+                <a:schemeClr val="lt1"/>
+              </a:fontRef>
+            </p:style>
+            <p:txBody>
+              <a:bodyPr rtlCol="0" anchor="ctr"/>
+              <a:lstStyle/>
+              <a:p>
+                <a:pPr algn="ctr"/>
+                <a:r>
+                  <a:rPr lang="en-US" sz="1100" kern="1200" dirty="0">
+                    <a:solidFill>
+                      <a:srgbClr val="D9D9D9"/>
+                    </a:solidFill>
+                    <a:effectLst/>
+                    <a:latin typeface="Open Sans" panose="020B0606030504020204" pitchFamily="34" charset="0"/>
+                    <a:ea typeface="Open Sans" panose="020B0606030504020204" pitchFamily="34" charset="0"/>
+                    <a:cs typeface="Open Sans" panose="020B0606030504020204" pitchFamily="34" charset="0"/>
+                  </a:rPr>
+                  <a:t>error = “Range of mark should be between 0 to 100”</a:t>
+                </a:r>
+                <a:endParaRPr lang="en-US" sz="900" dirty="0">
+                  <a:solidFill>
+                    <a:schemeClr val="bg1">
+                      <a:lumMod val="85000"/>
+                    </a:schemeClr>
+                  </a:solidFill>
+                  <a:latin typeface="Open Sans" panose="020B0606030504020204" pitchFamily="34" charset="0"/>
+                  <a:ea typeface="Open Sans" panose="020B0606030504020204" pitchFamily="34" charset="0"/>
+                  <a:cs typeface="Open Sans" panose="020B0606030504020204" pitchFamily="34" charset="0"/>
+                </a:endParaRPr>
+              </a:p>
+            </p:txBody>
+          </p:sp>
+          <p:cxnSp>
+            <p:nvCxnSpPr>
+              <p:cNvPr id="89" name="Straight Arrow Connector 88">
+                <a:extLst>
+                  <a:ext uri="{FF2B5EF4-FFF2-40B4-BE49-F238E27FC236}">
+                    <a16:creationId xmlns:a16="http://schemas.microsoft.com/office/drawing/2014/main" id="{CB9E9438-CC6C-4232-61E0-D4F88B81667E}"/>
+                  </a:ext>
+                </a:extLst>
+              </p:cNvPr>
+              <p:cNvCxnSpPr>
+                <a:stCxn id="67" idx="3"/>
+                <a:endCxn id="86" idx="1"/>
+              </p:cNvCxnSpPr>
+              <p:nvPr/>
+            </p:nvCxnSpPr>
+            <p:spPr>
+              <a:xfrm>
+                <a:off x="2798625" y="2678759"/>
+                <a:ext cx="366958" cy="3751"/>
+              </a:xfrm>
+              <a:prstGeom prst="straightConnector1">
+                <a:avLst/>
+              </a:prstGeom>
+              <a:ln w="12700">
+                <a:solidFill>
+                  <a:srgbClr val="FF7C80"/>
+                </a:solidFill>
+                <a:tailEnd type="triangle"/>
+              </a:ln>
+            </p:spPr>
+            <p:style>
+              <a:lnRef idx="1">
+                <a:schemeClr val="accent1"/>
+              </a:lnRef>
+              <a:fillRef idx="0">
+                <a:schemeClr val="accent1"/>
+              </a:fillRef>
+              <a:effectRef idx="0">
+                <a:schemeClr val="accent1"/>
+              </a:effectRef>
+              <a:fontRef idx="minor">
+                <a:schemeClr val="tx1"/>
+              </a:fontRef>
+            </p:style>
+          </p:cxnSp>
+          <p:cxnSp>
+            <p:nvCxnSpPr>
+              <p:cNvPr id="91" name="Straight Arrow Connector 90">
+                <a:extLst>
+                  <a:ext uri="{FF2B5EF4-FFF2-40B4-BE49-F238E27FC236}">
+                    <a16:creationId xmlns:a16="http://schemas.microsoft.com/office/drawing/2014/main" id="{258A699F-12AE-768E-2B50-FEF59C3F0B45}"/>
+                  </a:ext>
+                </a:extLst>
+              </p:cNvPr>
+              <p:cNvCxnSpPr>
+                <a:stCxn id="86" idx="0"/>
+                <a:endCxn id="34" idx="4"/>
+              </p:cNvCxnSpPr>
+              <p:nvPr/>
+            </p:nvCxnSpPr>
+            <p:spPr>
+              <a:xfrm flipV="1">
+                <a:off x="4088005" y="1926080"/>
+                <a:ext cx="1122" cy="396143"/>
+              </a:xfrm>
+              <a:prstGeom prst="straightConnector1">
+                <a:avLst/>
+              </a:prstGeom>
+              <a:ln w="12700">
+                <a:solidFill>
+                  <a:schemeClr val="bg1">
+                    <a:lumMod val="75000"/>
+                  </a:schemeClr>
+                </a:solidFill>
+                <a:tailEnd type="triangle"/>
+              </a:ln>
+            </p:spPr>
+            <p:style>
+              <a:lnRef idx="1">
+                <a:schemeClr val="accent1"/>
+              </a:lnRef>
+              <a:fillRef idx="0">
+                <a:schemeClr val="accent1"/>
+              </a:fillRef>
+              <a:effectRef idx="0">
+                <a:schemeClr val="accent1"/>
+              </a:effectRef>
+              <a:fontRef idx="minor">
+                <a:schemeClr val="tx1"/>
+              </a:fontRef>
+            </p:style>
+          </p:cxnSp>
+          <p:cxnSp>
+            <p:nvCxnSpPr>
+              <p:cNvPr id="95" name="Connector: Elbow 94">
+                <a:extLst>
+                  <a:ext uri="{FF2B5EF4-FFF2-40B4-BE49-F238E27FC236}">
+                    <a16:creationId xmlns:a16="http://schemas.microsoft.com/office/drawing/2014/main" id="{E845F079-712B-1359-4778-998BE36C5C86}"/>
+                  </a:ext>
+                </a:extLst>
+              </p:cNvPr>
+              <p:cNvCxnSpPr>
+                <a:stCxn id="45" idx="2"/>
+                <a:endCxn id="75" idx="4"/>
+              </p:cNvCxnSpPr>
+              <p:nvPr/>
+            </p:nvCxnSpPr>
+            <p:spPr>
+              <a:xfrm rot="5400000" flipH="1" flipV="1">
+                <a:off x="4264050" y="-460972"/>
+                <a:ext cx="3133884" cy="7918850"/>
+              </a:xfrm>
+              <a:prstGeom prst="bentConnector3">
+                <a:avLst>
+                  <a:gd name="adj1" fmla="val -9725"/>
+                </a:avLst>
+              </a:prstGeom>
+              <a:ln w="12700">
+                <a:solidFill>
+                  <a:schemeClr val="bg1">
+                    <a:lumMod val="75000"/>
+                  </a:schemeClr>
+                </a:solidFill>
+                <a:tailEnd type="triangle"/>
+              </a:ln>
+            </p:spPr>
+            <p:style>
+              <a:lnRef idx="1">
+                <a:schemeClr val="accent1"/>
+              </a:lnRef>
+              <a:fillRef idx="0">
+                <a:schemeClr val="accent1"/>
+              </a:fillRef>
+              <a:effectRef idx="0">
+                <a:schemeClr val="accent1"/>
+              </a:effectRef>
+              <a:fontRef idx="minor">
+                <a:schemeClr val="tx1"/>
+              </a:fontRef>
+            </p:style>
+          </p:cxnSp>
+          <p:cxnSp>
+            <p:nvCxnSpPr>
+              <p:cNvPr id="98" name="Connector: Elbow 97">
+                <a:extLst>
+                  <a:ext uri="{FF2B5EF4-FFF2-40B4-BE49-F238E27FC236}">
+                    <a16:creationId xmlns:a16="http://schemas.microsoft.com/office/drawing/2014/main" id="{8DA868EF-5E00-6EF7-40AC-D4065B4E781F}"/>
+                  </a:ext>
+                </a:extLst>
+              </p:cNvPr>
+              <p:cNvCxnSpPr>
+                <a:stCxn id="55" idx="0"/>
+                <a:endCxn id="75" idx="2"/>
+              </p:cNvCxnSpPr>
+              <p:nvPr/>
+            </p:nvCxnSpPr>
+            <p:spPr>
+              <a:xfrm rot="5400000" flipH="1" flipV="1">
+                <a:off x="8247360" y="1953850"/>
+                <a:ext cx="1072100" cy="538138"/>
+              </a:xfrm>
+              <a:prstGeom prst="bentConnector2">
+                <a:avLst/>
+              </a:prstGeom>
+              <a:ln w="12700">
+                <a:solidFill>
+                  <a:schemeClr val="bg1">
+                    <a:lumMod val="75000"/>
+                  </a:schemeClr>
+                </a:solidFill>
+                <a:tailEnd type="triangle"/>
+              </a:ln>
+            </p:spPr>
+            <p:style>
+              <a:lnRef idx="1">
+                <a:schemeClr val="accent1"/>
+              </a:lnRef>
+              <a:fillRef idx="0">
+                <a:schemeClr val="accent1"/>
+              </a:fillRef>
+              <a:effectRef idx="0">
+                <a:schemeClr val="accent1"/>
+              </a:effectRef>
+              <a:fontRef idx="minor">
+                <a:schemeClr val="tx1"/>
+              </a:fontRef>
+            </p:style>
+          </p:cxnSp>
+          <p:cxnSp>
+            <p:nvCxnSpPr>
+              <p:cNvPr id="100" name="Straight Connector 99">
+                <a:extLst>
+                  <a:ext uri="{FF2B5EF4-FFF2-40B4-BE49-F238E27FC236}">
+                    <a16:creationId xmlns:a16="http://schemas.microsoft.com/office/drawing/2014/main" id="{5BE41543-7919-2F46-EB2A-1610BEDCFFB6}"/>
+                  </a:ext>
+                </a:extLst>
+              </p:cNvPr>
+              <p:cNvCxnSpPr>
+                <a:stCxn id="46" idx="2"/>
+              </p:cNvCxnSpPr>
+              <p:nvPr/>
+            </p:nvCxnSpPr>
+            <p:spPr>
+              <a:xfrm>
+                <a:off x="4088005" y="5065395"/>
+                <a:ext cx="0" cy="313055"/>
+              </a:xfrm>
+              <a:prstGeom prst="line">
+                <a:avLst/>
+              </a:prstGeom>
+              <a:ln w="12700">
+                <a:solidFill>
+                  <a:schemeClr val="bg1">
+                    <a:lumMod val="75000"/>
+                  </a:schemeClr>
+                </a:solidFill>
+              </a:ln>
+            </p:spPr>
+            <p:style>
+              <a:lnRef idx="1">
+                <a:schemeClr val="accent1"/>
+              </a:lnRef>
+              <a:fillRef idx="0">
+                <a:schemeClr val="accent1"/>
+              </a:fillRef>
+              <a:effectRef idx="0">
+                <a:schemeClr val="accent1"/>
+              </a:effectRef>
+              <a:fontRef idx="minor">
+                <a:schemeClr val="tx1"/>
+              </a:fontRef>
+            </p:style>
+          </p:cxnSp>
+          <p:cxnSp>
+            <p:nvCxnSpPr>
+              <p:cNvPr id="102" name="Straight Connector 101">
+                <a:extLst>
+                  <a:ext uri="{FF2B5EF4-FFF2-40B4-BE49-F238E27FC236}">
+                    <a16:creationId xmlns:a16="http://schemas.microsoft.com/office/drawing/2014/main" id="{6676E667-5B8B-E194-9EFC-14743E96631C}"/>
+                  </a:ext>
+                </a:extLst>
+              </p:cNvPr>
+              <p:cNvCxnSpPr>
+                <a:stCxn id="53" idx="2"/>
+              </p:cNvCxnSpPr>
+              <p:nvPr/>
+            </p:nvCxnSpPr>
+            <p:spPr>
+              <a:xfrm flipH="1">
+                <a:off x="6295172" y="5065395"/>
+                <a:ext cx="4637" cy="300355"/>
+              </a:xfrm>
+              <a:prstGeom prst="line">
+                <a:avLst/>
+              </a:prstGeom>
+              <a:ln w="12700">
+                <a:solidFill>
+                  <a:schemeClr val="bg1">
+                    <a:lumMod val="75000"/>
+                  </a:schemeClr>
+                </a:solidFill>
+              </a:ln>
+            </p:spPr>
+            <p:style>
+              <a:lnRef idx="1">
+                <a:schemeClr val="accent1"/>
+              </a:lnRef>
+              <a:fillRef idx="0">
+                <a:schemeClr val="accent1"/>
+              </a:fillRef>
+              <a:effectRef idx="0">
+                <a:schemeClr val="accent1"/>
+              </a:effectRef>
+              <a:fontRef idx="minor">
+                <a:schemeClr val="tx1"/>
+              </a:fontRef>
+            </p:style>
+          </p:cxnSp>
+          <p:cxnSp>
+            <p:nvCxnSpPr>
+              <p:cNvPr id="104" name="Straight Connector 103">
+                <a:extLst>
+                  <a:ext uri="{FF2B5EF4-FFF2-40B4-BE49-F238E27FC236}">
+                    <a16:creationId xmlns:a16="http://schemas.microsoft.com/office/drawing/2014/main" id="{4560EC18-FC92-97C2-79C6-07628ACE78A0}"/>
+                  </a:ext>
+                </a:extLst>
+              </p:cNvPr>
+              <p:cNvCxnSpPr>
+                <a:stCxn id="54" idx="2"/>
+              </p:cNvCxnSpPr>
+              <p:nvPr/>
+            </p:nvCxnSpPr>
+            <p:spPr>
+              <a:xfrm flipH="1">
+                <a:off x="8511612" y="5065395"/>
+                <a:ext cx="2729" cy="313055"/>
+              </a:xfrm>
+              <a:prstGeom prst="line">
+                <a:avLst/>
+              </a:prstGeom>
+              <a:ln w="12700">
+                <a:solidFill>
+                  <a:schemeClr val="bg1">
+                    <a:lumMod val="75000"/>
+                  </a:schemeClr>
+                </a:solidFill>
+              </a:ln>
+            </p:spPr>
+            <p:style>
+              <a:lnRef idx="1">
+                <a:schemeClr val="accent1"/>
+              </a:lnRef>
+              <a:fillRef idx="0">
+                <a:schemeClr val="accent1"/>
+              </a:fillRef>
+              <a:effectRef idx="0">
+                <a:schemeClr val="accent1"/>
+              </a:effectRef>
+              <a:fontRef idx="minor">
+                <a:schemeClr val="tx1"/>
+              </a:fontRef>
+            </p:style>
+          </p:cxnSp>
+        </p:grpSp>
+      </p:grpSp>
+    </p:spTree>
+    <p:extLst>
+      <p:ext uri="{BB962C8B-B14F-4D97-AF65-F5344CB8AC3E}">
+        <p14:creationId xmlns:p14="http://schemas.microsoft.com/office/powerpoint/2010/main" val="609381779"/>
+      </p:ext>
+    </p:extLst>
+  </p:cSld>
+  <p:clrMapOvr>
+    <a:masterClrMapping/>
+  </p:clrMapOvr>
+</p:sld>
+</file>
+
 <file path=ppt/theme/theme1.xml><?xml version="1.0" encoding="utf-8"?>
 <a:theme xmlns:a="http://schemas.openxmlformats.org/drawingml/2006/main" name="Office Theme">
   <a:themeElements>

</xml_diff>

<commit_message>
Added Flowchart for PrePSPM2021_KMKt
</commit_message>
<xml_diff>
--- a/Past Year Theory Questions/Resources/resources.pptx
+++ b/Past Year Theory Questions/Resources/resources.pptx
@@ -10,6 +10,7 @@
     <p:sldId id="259" r:id="rId4"/>
     <p:sldId id="260" r:id="rId5"/>
     <p:sldId id="261" r:id="rId6"/>
+    <p:sldId id="262" r:id="rId7"/>
   </p:sldIdLst>
   <p:sldSz cx="12192000" cy="6858000"/>
   <p:notesSz cx="6858000" cy="9144000"/>
@@ -263,7 +264,7 @@
           <a:p>
             <a:fld id="{34BBF2E1-1C0D-4B66-AD27-CA9E57E33A5F}" type="datetimeFigureOut">
               <a:rPr lang="en-US" smtClean="0"/>
-              <a:t>06-May-22</a:t>
+              <a:t>11-May-22</a:t>
             </a:fld>
             <a:endParaRPr lang="en-US"/>
           </a:p>
@@ -461,7 +462,7 @@
           <a:p>
             <a:fld id="{34BBF2E1-1C0D-4B66-AD27-CA9E57E33A5F}" type="datetimeFigureOut">
               <a:rPr lang="en-US" smtClean="0"/>
-              <a:t>06-May-22</a:t>
+              <a:t>11-May-22</a:t>
             </a:fld>
             <a:endParaRPr lang="en-US"/>
           </a:p>
@@ -669,7 +670,7 @@
           <a:p>
             <a:fld id="{34BBF2E1-1C0D-4B66-AD27-CA9E57E33A5F}" type="datetimeFigureOut">
               <a:rPr lang="en-US" smtClean="0"/>
-              <a:t>06-May-22</a:t>
+              <a:t>11-May-22</a:t>
             </a:fld>
             <a:endParaRPr lang="en-US"/>
           </a:p>
@@ -867,7 +868,7 @@
           <a:p>
             <a:fld id="{34BBF2E1-1C0D-4B66-AD27-CA9E57E33A5F}" type="datetimeFigureOut">
               <a:rPr lang="en-US" smtClean="0"/>
-              <a:t>06-May-22</a:t>
+              <a:t>11-May-22</a:t>
             </a:fld>
             <a:endParaRPr lang="en-US"/>
           </a:p>
@@ -1142,7 +1143,7 @@
           <a:p>
             <a:fld id="{34BBF2E1-1C0D-4B66-AD27-CA9E57E33A5F}" type="datetimeFigureOut">
               <a:rPr lang="en-US" smtClean="0"/>
-              <a:t>06-May-22</a:t>
+              <a:t>11-May-22</a:t>
             </a:fld>
             <a:endParaRPr lang="en-US"/>
           </a:p>
@@ -1407,7 +1408,7 @@
           <a:p>
             <a:fld id="{34BBF2E1-1C0D-4B66-AD27-CA9E57E33A5F}" type="datetimeFigureOut">
               <a:rPr lang="en-US" smtClean="0"/>
-              <a:t>06-May-22</a:t>
+              <a:t>11-May-22</a:t>
             </a:fld>
             <a:endParaRPr lang="en-US"/>
           </a:p>
@@ -1819,7 +1820,7 @@
           <a:p>
             <a:fld id="{34BBF2E1-1C0D-4B66-AD27-CA9E57E33A5F}" type="datetimeFigureOut">
               <a:rPr lang="en-US" smtClean="0"/>
-              <a:t>06-May-22</a:t>
+              <a:t>11-May-22</a:t>
             </a:fld>
             <a:endParaRPr lang="en-US"/>
           </a:p>
@@ -1960,7 +1961,7 @@
           <a:p>
             <a:fld id="{34BBF2E1-1C0D-4B66-AD27-CA9E57E33A5F}" type="datetimeFigureOut">
               <a:rPr lang="en-US" smtClean="0"/>
-              <a:t>06-May-22</a:t>
+              <a:t>11-May-22</a:t>
             </a:fld>
             <a:endParaRPr lang="en-US"/>
           </a:p>
@@ -2073,7 +2074,7 @@
           <a:p>
             <a:fld id="{34BBF2E1-1C0D-4B66-AD27-CA9E57E33A5F}" type="datetimeFigureOut">
               <a:rPr lang="en-US" smtClean="0"/>
-              <a:t>06-May-22</a:t>
+              <a:t>11-May-22</a:t>
             </a:fld>
             <a:endParaRPr lang="en-US"/>
           </a:p>
@@ -2384,7 +2385,7 @@
           <a:p>
             <a:fld id="{34BBF2E1-1C0D-4B66-AD27-CA9E57E33A5F}" type="datetimeFigureOut">
               <a:rPr lang="en-US" smtClean="0"/>
-              <a:t>06-May-22</a:t>
+              <a:t>11-May-22</a:t>
             </a:fld>
             <a:endParaRPr lang="en-US"/>
           </a:p>
@@ -2672,7 +2673,7 @@
           <a:p>
             <a:fld id="{34BBF2E1-1C0D-4B66-AD27-CA9E57E33A5F}" type="datetimeFigureOut">
               <a:rPr lang="en-US" smtClean="0"/>
-              <a:t>06-May-22</a:t>
+              <a:t>11-May-22</a:t>
             </a:fld>
             <a:endParaRPr lang="en-US"/>
           </a:p>
@@ -2913,7 +2914,7 @@
           <a:p>
             <a:fld id="{34BBF2E1-1C0D-4B66-AD27-CA9E57E33A5F}" type="datetimeFigureOut">
               <a:rPr lang="en-US" smtClean="0"/>
-              <a:t>06-May-22</a:t>
+              <a:t>11-May-22</a:t>
             </a:fld>
             <a:endParaRPr lang="en-US"/>
           </a:p>
@@ -11684,6 +11685,967 @@
 </p:sld>
 </file>
 
+<file path=ppt/slides/slide6.xml><?xml version="1.0" encoding="utf-8"?>
+<p:sld xmlns:a="http://schemas.openxmlformats.org/drawingml/2006/main" xmlns:r="http://schemas.openxmlformats.org/officeDocument/2006/relationships" xmlns:p="http://schemas.openxmlformats.org/presentationml/2006/main">
+  <p:cSld>
+    <p:spTree>
+      <p:nvGrpSpPr>
+        <p:cNvPr id="1" name=""/>
+        <p:cNvGrpSpPr/>
+        <p:nvPr/>
+      </p:nvGrpSpPr>
+      <p:grpSpPr>
+        <a:xfrm>
+          <a:off x="0" y="0"/>
+          <a:ext cx="0" cy="0"/>
+          <a:chOff x="0" y="0"/>
+          <a:chExt cx="0" cy="0"/>
+        </a:xfrm>
+      </p:grpSpPr>
+      <p:grpSp>
+        <p:nvGrpSpPr>
+          <p:cNvPr id="35" name="Group 34">
+            <a:extLst>
+              <a:ext uri="{FF2B5EF4-FFF2-40B4-BE49-F238E27FC236}">
+                <a16:creationId xmlns:a16="http://schemas.microsoft.com/office/drawing/2014/main" id="{79C598C1-18C8-D627-ACB4-B1E45C9EEAC6}"/>
+              </a:ext>
+            </a:extLst>
+          </p:cNvPr>
+          <p:cNvGrpSpPr/>
+          <p:nvPr/>
+        </p:nvGrpSpPr>
+        <p:grpSpPr>
+          <a:xfrm>
+            <a:off x="2594810" y="1748589"/>
+            <a:ext cx="7002379" cy="2956761"/>
+            <a:chOff x="2594810" y="1748589"/>
+            <a:chExt cx="7002379" cy="2956761"/>
+          </a:xfrm>
+        </p:grpSpPr>
+        <p:sp>
+          <p:nvSpPr>
+            <p:cNvPr id="108" name="Rectangle 107">
+              <a:extLst>
+                <a:ext uri="{FF2B5EF4-FFF2-40B4-BE49-F238E27FC236}">
+                  <a16:creationId xmlns:a16="http://schemas.microsoft.com/office/drawing/2014/main" id="{F5A5FD62-A99C-04B6-706B-DEE9B81AF541}"/>
+                </a:ext>
+              </a:extLst>
+            </p:cNvPr>
+            <p:cNvSpPr/>
+            <p:nvPr/>
+          </p:nvSpPr>
+          <p:spPr>
+            <a:xfrm>
+              <a:off x="2594810" y="1748589"/>
+              <a:ext cx="7002379" cy="2956761"/>
+            </a:xfrm>
+            <a:prstGeom prst="rect">
+              <a:avLst/>
+            </a:prstGeom>
+            <a:solidFill>
+              <a:srgbClr val="0F1017"/>
+            </a:solidFill>
+            <a:ln w="12700">
+              <a:solidFill>
+                <a:schemeClr val="bg1">
+                  <a:lumMod val="75000"/>
+                </a:schemeClr>
+              </a:solidFill>
+            </a:ln>
+          </p:spPr>
+          <p:style>
+            <a:lnRef idx="2">
+              <a:schemeClr val="accent1">
+                <a:shade val="50000"/>
+              </a:schemeClr>
+            </a:lnRef>
+            <a:fillRef idx="1">
+              <a:schemeClr val="accent1"/>
+            </a:fillRef>
+            <a:effectRef idx="0">
+              <a:schemeClr val="accent1"/>
+            </a:effectRef>
+            <a:fontRef idx="minor">
+              <a:schemeClr val="lt1"/>
+            </a:fontRef>
+          </p:style>
+          <p:txBody>
+            <a:bodyPr rtlCol="0" anchor="ctr"/>
+            <a:lstStyle/>
+            <a:p>
+              <a:pPr algn="ctr"/>
+              <a:endParaRPr lang="en-US" dirty="0"/>
+            </a:p>
+          </p:txBody>
+        </p:sp>
+        <p:sp>
+          <p:nvSpPr>
+            <p:cNvPr id="59" name="Flowchart: Terminator 58">
+              <a:extLst>
+                <a:ext uri="{FF2B5EF4-FFF2-40B4-BE49-F238E27FC236}">
+                  <a16:creationId xmlns:a16="http://schemas.microsoft.com/office/drawing/2014/main" id="{D7554AAC-5F81-46CA-BA4E-6CDF6B8CC5AD}"/>
+                </a:ext>
+              </a:extLst>
+            </p:cNvPr>
+            <p:cNvSpPr/>
+            <p:nvPr/>
+          </p:nvSpPr>
+          <p:spPr>
+            <a:xfrm>
+              <a:off x="3358815" y="2156035"/>
+              <a:ext cx="1050758" cy="341690"/>
+            </a:xfrm>
+            <a:prstGeom prst="flowChartTerminator">
+              <a:avLst/>
+            </a:prstGeom>
+            <a:noFill/>
+            <a:ln>
+              <a:solidFill>
+                <a:schemeClr val="bg1">
+                  <a:lumMod val="75000"/>
+                </a:schemeClr>
+              </a:solidFill>
+            </a:ln>
+          </p:spPr>
+          <p:style>
+            <a:lnRef idx="2">
+              <a:schemeClr val="accent1">
+                <a:shade val="50000"/>
+              </a:schemeClr>
+            </a:lnRef>
+            <a:fillRef idx="1">
+              <a:schemeClr val="accent1"/>
+            </a:fillRef>
+            <a:effectRef idx="0">
+              <a:schemeClr val="accent1"/>
+            </a:effectRef>
+            <a:fontRef idx="minor">
+              <a:schemeClr val="lt1"/>
+            </a:fontRef>
+          </p:style>
+          <p:txBody>
+            <a:bodyPr rtlCol="0" anchor="ctr"/>
+            <a:lstStyle/>
+            <a:p>
+              <a:pPr algn="ctr"/>
+              <a:r>
+                <a:rPr lang="en-US" sz="1200" dirty="0">
+                  <a:solidFill>
+                    <a:schemeClr val="bg1">
+                      <a:lumMod val="85000"/>
+                    </a:schemeClr>
+                  </a:solidFill>
+                  <a:latin typeface="Open Sans" panose="020B0606030504020204" pitchFamily="34" charset="0"/>
+                  <a:ea typeface="Open Sans" panose="020B0606030504020204" pitchFamily="34" charset="0"/>
+                  <a:cs typeface="Open Sans" panose="020B0606030504020204" pitchFamily="34" charset="0"/>
+                </a:rPr>
+                <a:t>Start</a:t>
+              </a:r>
+            </a:p>
+          </p:txBody>
+        </p:sp>
+        <p:sp>
+          <p:nvSpPr>
+            <p:cNvPr id="60" name="Flowchart: Terminator 59">
+              <a:extLst>
+                <a:ext uri="{FF2B5EF4-FFF2-40B4-BE49-F238E27FC236}">
+                  <a16:creationId xmlns:a16="http://schemas.microsoft.com/office/drawing/2014/main" id="{103191FC-37A5-724C-C214-882B4B9F6C89}"/>
+                </a:ext>
+              </a:extLst>
+            </p:cNvPr>
+            <p:cNvSpPr/>
+            <p:nvPr/>
+          </p:nvSpPr>
+          <p:spPr>
+            <a:xfrm>
+              <a:off x="7782424" y="2156035"/>
+              <a:ext cx="1050758" cy="341690"/>
+            </a:xfrm>
+            <a:prstGeom prst="flowChartTerminator">
+              <a:avLst/>
+            </a:prstGeom>
+            <a:noFill/>
+            <a:ln>
+              <a:solidFill>
+                <a:schemeClr val="bg1">
+                  <a:lumMod val="75000"/>
+                </a:schemeClr>
+              </a:solidFill>
+            </a:ln>
+          </p:spPr>
+          <p:style>
+            <a:lnRef idx="2">
+              <a:schemeClr val="accent1">
+                <a:shade val="50000"/>
+              </a:schemeClr>
+            </a:lnRef>
+            <a:fillRef idx="1">
+              <a:schemeClr val="accent1"/>
+            </a:fillRef>
+            <a:effectRef idx="0">
+              <a:schemeClr val="accent1"/>
+            </a:effectRef>
+            <a:fontRef idx="minor">
+              <a:schemeClr val="lt1"/>
+            </a:fontRef>
+          </p:style>
+          <p:txBody>
+            <a:bodyPr rtlCol="0" anchor="ctr"/>
+            <a:lstStyle/>
+            <a:p>
+              <a:pPr algn="ctr"/>
+              <a:r>
+                <a:rPr lang="en-US" sz="1200" dirty="0">
+                  <a:solidFill>
+                    <a:schemeClr val="bg1">
+                      <a:lumMod val="85000"/>
+                    </a:schemeClr>
+                  </a:solidFill>
+                  <a:latin typeface="Open Sans" panose="020B0606030504020204" pitchFamily="34" charset="0"/>
+                  <a:ea typeface="Open Sans" panose="020B0606030504020204" pitchFamily="34" charset="0"/>
+                  <a:cs typeface="Open Sans" panose="020B0606030504020204" pitchFamily="34" charset="0"/>
+                </a:rPr>
+                <a:t>Stop</a:t>
+              </a:r>
+            </a:p>
+          </p:txBody>
+        </p:sp>
+        <p:cxnSp>
+          <p:nvCxnSpPr>
+            <p:cNvPr id="61" name="Straight Arrow Connector 60">
+              <a:extLst>
+                <a:ext uri="{FF2B5EF4-FFF2-40B4-BE49-F238E27FC236}">
+                  <a16:creationId xmlns:a16="http://schemas.microsoft.com/office/drawing/2014/main" id="{A1BBCFB3-141A-F3B8-67BE-C05995E64053}"/>
+                </a:ext>
+              </a:extLst>
+            </p:cNvPr>
+            <p:cNvCxnSpPr>
+              <a:cxnSpLocks/>
+              <a:stCxn id="59" idx="2"/>
+              <a:endCxn id="20" idx="0"/>
+            </p:cNvCxnSpPr>
+            <p:nvPr/>
+          </p:nvCxnSpPr>
+          <p:spPr>
+            <a:xfrm>
+              <a:off x="3884194" y="2497725"/>
+              <a:ext cx="0" cy="346411"/>
+            </a:xfrm>
+            <a:prstGeom prst="straightConnector1">
+              <a:avLst/>
+            </a:prstGeom>
+            <a:ln w="12700">
+              <a:solidFill>
+                <a:schemeClr val="bg1">
+                  <a:lumMod val="75000"/>
+                </a:schemeClr>
+              </a:solidFill>
+              <a:tailEnd type="triangle"/>
+            </a:ln>
+          </p:spPr>
+          <p:style>
+            <a:lnRef idx="1">
+              <a:schemeClr val="accent1"/>
+            </a:lnRef>
+            <a:fillRef idx="0">
+              <a:schemeClr val="accent1"/>
+            </a:fillRef>
+            <a:effectRef idx="0">
+              <a:schemeClr val="accent1"/>
+            </a:effectRef>
+            <a:fontRef idx="minor">
+              <a:schemeClr val="tx1"/>
+            </a:fontRef>
+          </p:style>
+        </p:cxnSp>
+        <p:sp>
+          <p:nvSpPr>
+            <p:cNvPr id="67" name="Flowchart: Decision 66">
+              <a:extLst>
+                <a:ext uri="{FF2B5EF4-FFF2-40B4-BE49-F238E27FC236}">
+                  <a16:creationId xmlns:a16="http://schemas.microsoft.com/office/drawing/2014/main" id="{A3DDEFFD-6E92-1CB4-EE4D-6CD3E04860A6}"/>
+                </a:ext>
+              </a:extLst>
+            </p:cNvPr>
+            <p:cNvSpPr/>
+            <p:nvPr/>
+          </p:nvSpPr>
+          <p:spPr>
+            <a:xfrm>
+              <a:off x="5173577" y="2565905"/>
+              <a:ext cx="1844844" cy="946484"/>
+            </a:xfrm>
+            <a:prstGeom prst="flowChartDecision">
+              <a:avLst/>
+            </a:prstGeom>
+            <a:noFill/>
+            <a:ln>
+              <a:solidFill>
+                <a:srgbClr val="FF7C80"/>
+              </a:solidFill>
+            </a:ln>
+          </p:spPr>
+          <p:style>
+            <a:lnRef idx="2">
+              <a:schemeClr val="accent1">
+                <a:shade val="50000"/>
+              </a:schemeClr>
+            </a:lnRef>
+            <a:fillRef idx="1">
+              <a:schemeClr val="accent1"/>
+            </a:fillRef>
+            <a:effectRef idx="0">
+              <a:schemeClr val="accent1"/>
+            </a:effectRef>
+            <a:fontRef idx="minor">
+              <a:schemeClr val="lt1"/>
+            </a:fontRef>
+          </p:style>
+          <p:txBody>
+            <a:bodyPr rtlCol="0" anchor="ctr"/>
+            <a:lstStyle/>
+            <a:p>
+              <a:pPr algn="ctr"/>
+              <a:r>
+                <a:rPr lang="en-US" sz="1200" dirty="0" err="1">
+                  <a:solidFill>
+                    <a:schemeClr val="bg1">
+                      <a:lumMod val="85000"/>
+                    </a:schemeClr>
+                  </a:solidFill>
+                  <a:latin typeface="Open Sans" panose="020B0606030504020204" pitchFamily="34" charset="0"/>
+                  <a:ea typeface="Open Sans" panose="020B0606030504020204" pitchFamily="34" charset="0"/>
+                  <a:cs typeface="Open Sans" panose="020B0606030504020204" pitchFamily="34" charset="0"/>
+                </a:rPr>
+                <a:t>i</a:t>
+              </a:r>
+              <a:r>
+                <a:rPr lang="en-US" sz="1200" dirty="0">
+                  <a:solidFill>
+                    <a:schemeClr val="bg1">
+                      <a:lumMod val="85000"/>
+                    </a:schemeClr>
+                  </a:solidFill>
+                  <a:latin typeface="Open Sans" panose="020B0606030504020204" pitchFamily="34" charset="0"/>
+                  <a:ea typeface="Open Sans" panose="020B0606030504020204" pitchFamily="34" charset="0"/>
+                  <a:cs typeface="Open Sans" panose="020B0606030504020204" pitchFamily="34" charset="0"/>
+                </a:rPr>
+                <a:t> &lt;= 50</a:t>
+              </a:r>
+            </a:p>
+          </p:txBody>
+        </p:sp>
+        <p:sp>
+          <p:nvSpPr>
+            <p:cNvPr id="75" name="Flowchart: Data 74">
+              <a:extLst>
+                <a:ext uri="{FF2B5EF4-FFF2-40B4-BE49-F238E27FC236}">
+                  <a16:creationId xmlns:a16="http://schemas.microsoft.com/office/drawing/2014/main" id="{684F63EE-4E36-A045-0D95-769D7FC961BB}"/>
+                </a:ext>
+              </a:extLst>
+            </p:cNvPr>
+            <p:cNvSpPr/>
+            <p:nvPr/>
+          </p:nvSpPr>
+          <p:spPr>
+            <a:xfrm>
+              <a:off x="7385382" y="3808620"/>
+              <a:ext cx="1844844" cy="489284"/>
+            </a:xfrm>
+            <a:prstGeom prst="flowChartInputOutput">
+              <a:avLst/>
+            </a:prstGeom>
+            <a:noFill/>
+            <a:ln>
+              <a:solidFill>
+                <a:srgbClr val="CC99FF"/>
+              </a:solidFill>
+            </a:ln>
+          </p:spPr>
+          <p:style>
+            <a:lnRef idx="2">
+              <a:schemeClr val="accent1">
+                <a:shade val="50000"/>
+              </a:schemeClr>
+            </a:lnRef>
+            <a:fillRef idx="1">
+              <a:schemeClr val="accent1"/>
+            </a:fillRef>
+            <a:effectRef idx="0">
+              <a:schemeClr val="accent1"/>
+            </a:effectRef>
+            <a:fontRef idx="minor">
+              <a:schemeClr val="lt1"/>
+            </a:fontRef>
+          </p:style>
+          <p:txBody>
+            <a:bodyPr rtlCol="0" anchor="ctr"/>
+            <a:lstStyle/>
+            <a:p>
+              <a:pPr algn="ctr"/>
+              <a:r>
+                <a:rPr lang="en-US" sz="1200" dirty="0">
+                  <a:solidFill>
+                    <a:schemeClr val="bg1">
+                      <a:lumMod val="85000"/>
+                    </a:schemeClr>
+                  </a:solidFill>
+                  <a:latin typeface="Open Sans" panose="020B0606030504020204" pitchFamily="34" charset="0"/>
+                  <a:ea typeface="Open Sans" panose="020B0606030504020204" pitchFamily="34" charset="0"/>
+                  <a:cs typeface="Open Sans" panose="020B0606030504020204" pitchFamily="34" charset="0"/>
+                </a:rPr>
+                <a:t>Print </a:t>
+              </a:r>
+              <a:r>
+                <a:rPr lang="en-US" sz="1200" dirty="0" err="1">
+                  <a:solidFill>
+                    <a:schemeClr val="bg1">
+                      <a:lumMod val="85000"/>
+                    </a:schemeClr>
+                  </a:solidFill>
+                  <a:latin typeface="Open Sans" panose="020B0606030504020204" pitchFamily="34" charset="0"/>
+                  <a:ea typeface="Open Sans" panose="020B0606030504020204" pitchFamily="34" charset="0"/>
+                  <a:cs typeface="Open Sans" panose="020B0606030504020204" pitchFamily="34" charset="0"/>
+                </a:rPr>
+                <a:t>i</a:t>
+              </a:r>
+              <a:endParaRPr lang="en-US" sz="1200" dirty="0">
+                <a:solidFill>
+                  <a:schemeClr val="bg1">
+                    <a:lumMod val="85000"/>
+                  </a:schemeClr>
+                </a:solidFill>
+                <a:latin typeface="Open Sans" panose="020B0606030504020204" pitchFamily="34" charset="0"/>
+                <a:ea typeface="Open Sans" panose="020B0606030504020204" pitchFamily="34" charset="0"/>
+                <a:cs typeface="Open Sans" panose="020B0606030504020204" pitchFamily="34" charset="0"/>
+              </a:endParaRPr>
+            </a:p>
+          </p:txBody>
+        </p:sp>
+        <p:sp>
+          <p:nvSpPr>
+            <p:cNvPr id="20" name="Rectangle 19">
+              <a:extLst>
+                <a:ext uri="{FF2B5EF4-FFF2-40B4-BE49-F238E27FC236}">
+                  <a16:creationId xmlns:a16="http://schemas.microsoft.com/office/drawing/2014/main" id="{AD2F0CBE-E290-AF6A-A271-56988121E62F}"/>
+                </a:ext>
+              </a:extLst>
+            </p:cNvPr>
+            <p:cNvSpPr/>
+            <p:nvPr/>
+          </p:nvSpPr>
+          <p:spPr>
+            <a:xfrm>
+              <a:off x="2961772" y="2844136"/>
+              <a:ext cx="1844844" cy="393032"/>
+            </a:xfrm>
+            <a:prstGeom prst="rect">
+              <a:avLst/>
+            </a:prstGeom>
+            <a:noFill/>
+            <a:ln>
+              <a:solidFill>
+                <a:schemeClr val="accent6">
+                  <a:lumMod val="60000"/>
+                  <a:lumOff val="40000"/>
+                </a:schemeClr>
+              </a:solidFill>
+            </a:ln>
+          </p:spPr>
+          <p:style>
+            <a:lnRef idx="2">
+              <a:schemeClr val="accent1">
+                <a:shade val="50000"/>
+              </a:schemeClr>
+            </a:lnRef>
+            <a:fillRef idx="1">
+              <a:schemeClr val="accent1"/>
+            </a:fillRef>
+            <a:effectRef idx="0">
+              <a:schemeClr val="accent1"/>
+            </a:effectRef>
+            <a:fontRef idx="minor">
+              <a:schemeClr val="lt1"/>
+            </a:fontRef>
+          </p:style>
+          <p:txBody>
+            <a:bodyPr rtlCol="0" anchor="ctr"/>
+            <a:lstStyle/>
+            <a:p>
+              <a:pPr algn="ctr"/>
+              <a:r>
+                <a:rPr lang="en-US" sz="1200" dirty="0" err="1">
+                  <a:solidFill>
+                    <a:schemeClr val="bg1">
+                      <a:lumMod val="85000"/>
+                    </a:schemeClr>
+                  </a:solidFill>
+                  <a:latin typeface="Open Sans" panose="020B0606030504020204" pitchFamily="34" charset="0"/>
+                  <a:ea typeface="Open Sans" panose="020B0606030504020204" pitchFamily="34" charset="0"/>
+                  <a:cs typeface="Open Sans" panose="020B0606030504020204" pitchFamily="34" charset="0"/>
+                </a:rPr>
+                <a:t>i</a:t>
+              </a:r>
+              <a:r>
+                <a:rPr lang="en-US" sz="1200" dirty="0">
+                  <a:solidFill>
+                    <a:schemeClr val="bg1">
+                      <a:lumMod val="85000"/>
+                    </a:schemeClr>
+                  </a:solidFill>
+                  <a:latin typeface="Open Sans" panose="020B0606030504020204" pitchFamily="34" charset="0"/>
+                  <a:ea typeface="Open Sans" panose="020B0606030504020204" pitchFamily="34" charset="0"/>
+                  <a:cs typeface="Open Sans" panose="020B0606030504020204" pitchFamily="34" charset="0"/>
+                </a:rPr>
+                <a:t> = 0</a:t>
+              </a:r>
+            </a:p>
+          </p:txBody>
+        </p:sp>
+        <p:sp>
+          <p:nvSpPr>
+            <p:cNvPr id="21" name="Flowchart: Decision 20">
+              <a:extLst>
+                <a:ext uri="{FF2B5EF4-FFF2-40B4-BE49-F238E27FC236}">
+                  <a16:creationId xmlns:a16="http://schemas.microsoft.com/office/drawing/2014/main" id="{3824004F-F1DE-D420-D4F0-D8A2BB715992}"/>
+                </a:ext>
+              </a:extLst>
+            </p:cNvPr>
+            <p:cNvSpPr/>
+            <p:nvPr/>
+          </p:nvSpPr>
+          <p:spPr>
+            <a:xfrm>
+              <a:off x="7385381" y="2565905"/>
+              <a:ext cx="1844844" cy="946484"/>
+            </a:xfrm>
+            <a:prstGeom prst="flowChartDecision">
+              <a:avLst/>
+            </a:prstGeom>
+            <a:noFill/>
+            <a:ln>
+              <a:solidFill>
+                <a:srgbClr val="FF7C80"/>
+              </a:solidFill>
+            </a:ln>
+          </p:spPr>
+          <p:style>
+            <a:lnRef idx="2">
+              <a:schemeClr val="accent1">
+                <a:shade val="50000"/>
+              </a:schemeClr>
+            </a:lnRef>
+            <a:fillRef idx="1">
+              <a:schemeClr val="accent1"/>
+            </a:fillRef>
+            <a:effectRef idx="0">
+              <a:schemeClr val="accent1"/>
+            </a:effectRef>
+            <a:fontRef idx="minor">
+              <a:schemeClr val="lt1"/>
+            </a:fontRef>
+          </p:style>
+          <p:txBody>
+            <a:bodyPr rtlCol="0" anchor="ctr"/>
+            <a:lstStyle/>
+            <a:p>
+              <a:pPr algn="ctr"/>
+              <a:r>
+                <a:rPr lang="en-US" sz="1200" dirty="0" err="1">
+                  <a:solidFill>
+                    <a:schemeClr val="bg1">
+                      <a:lumMod val="85000"/>
+                    </a:schemeClr>
+                  </a:solidFill>
+                  <a:latin typeface="Open Sans" panose="020B0606030504020204" pitchFamily="34" charset="0"/>
+                  <a:ea typeface="Open Sans" panose="020B0606030504020204" pitchFamily="34" charset="0"/>
+                  <a:cs typeface="Open Sans" panose="020B0606030504020204" pitchFamily="34" charset="0"/>
+                </a:rPr>
+                <a:t>i</a:t>
+              </a:r>
+              <a:r>
+                <a:rPr lang="en-US" sz="1200" dirty="0">
+                  <a:solidFill>
+                    <a:schemeClr val="bg1">
+                      <a:lumMod val="85000"/>
+                    </a:schemeClr>
+                  </a:solidFill>
+                  <a:latin typeface="Open Sans" panose="020B0606030504020204" pitchFamily="34" charset="0"/>
+                  <a:ea typeface="Open Sans" panose="020B0606030504020204" pitchFamily="34" charset="0"/>
+                  <a:cs typeface="Open Sans" panose="020B0606030504020204" pitchFamily="34" charset="0"/>
+                </a:rPr>
+                <a:t> % 5 == 0</a:t>
+              </a:r>
+            </a:p>
+          </p:txBody>
+        </p:sp>
+        <p:cxnSp>
+          <p:nvCxnSpPr>
+            <p:cNvPr id="10" name="Straight Arrow Connector 9">
+              <a:extLst>
+                <a:ext uri="{FF2B5EF4-FFF2-40B4-BE49-F238E27FC236}">
+                  <a16:creationId xmlns:a16="http://schemas.microsoft.com/office/drawing/2014/main" id="{2F6AC1B8-239A-F135-FD9C-168EC4E94999}"/>
+                </a:ext>
+              </a:extLst>
+            </p:cNvPr>
+            <p:cNvCxnSpPr>
+              <a:stCxn id="20" idx="3"/>
+              <a:endCxn id="67" idx="1"/>
+            </p:cNvCxnSpPr>
+            <p:nvPr/>
+          </p:nvCxnSpPr>
+          <p:spPr>
+            <a:xfrm flipV="1">
+              <a:off x="4806616" y="3039147"/>
+              <a:ext cx="366961" cy="1505"/>
+            </a:xfrm>
+            <a:prstGeom prst="straightConnector1">
+              <a:avLst/>
+            </a:prstGeom>
+            <a:ln w="12700">
+              <a:solidFill>
+                <a:schemeClr val="bg1">
+                  <a:lumMod val="75000"/>
+                </a:schemeClr>
+              </a:solidFill>
+              <a:tailEnd type="triangle"/>
+            </a:ln>
+          </p:spPr>
+          <p:style>
+            <a:lnRef idx="1">
+              <a:schemeClr val="accent1"/>
+            </a:lnRef>
+            <a:fillRef idx="0">
+              <a:schemeClr val="accent1"/>
+            </a:fillRef>
+            <a:effectRef idx="0">
+              <a:schemeClr val="accent1"/>
+            </a:effectRef>
+            <a:fontRef idx="minor">
+              <a:schemeClr val="tx1"/>
+            </a:fontRef>
+          </p:style>
+        </p:cxnSp>
+        <p:cxnSp>
+          <p:nvCxnSpPr>
+            <p:cNvPr id="13" name="Straight Arrow Connector 12">
+              <a:extLst>
+                <a:ext uri="{FF2B5EF4-FFF2-40B4-BE49-F238E27FC236}">
+                  <a16:creationId xmlns:a16="http://schemas.microsoft.com/office/drawing/2014/main" id="{54550317-4993-EEF0-F3D3-BDA0DB9977B4}"/>
+                </a:ext>
+              </a:extLst>
+            </p:cNvPr>
+            <p:cNvCxnSpPr>
+              <a:stCxn id="67" idx="3"/>
+              <a:endCxn id="21" idx="1"/>
+            </p:cNvCxnSpPr>
+            <p:nvPr/>
+          </p:nvCxnSpPr>
+          <p:spPr>
+            <a:xfrm>
+              <a:off x="7018421" y="3039147"/>
+              <a:ext cx="366960" cy="0"/>
+            </a:xfrm>
+            <a:prstGeom prst="straightConnector1">
+              <a:avLst/>
+            </a:prstGeom>
+            <a:ln w="12700">
+              <a:solidFill>
+                <a:srgbClr val="FF7C80"/>
+              </a:solidFill>
+              <a:tailEnd type="triangle"/>
+            </a:ln>
+          </p:spPr>
+          <p:style>
+            <a:lnRef idx="1">
+              <a:schemeClr val="accent1"/>
+            </a:lnRef>
+            <a:fillRef idx="0">
+              <a:schemeClr val="accent1"/>
+            </a:fillRef>
+            <a:effectRef idx="0">
+              <a:schemeClr val="accent1"/>
+            </a:effectRef>
+            <a:fontRef idx="minor">
+              <a:schemeClr val="tx1"/>
+            </a:fontRef>
+          </p:style>
+        </p:cxnSp>
+        <p:cxnSp>
+          <p:nvCxnSpPr>
+            <p:cNvPr id="16" name="Connector: Elbow 15">
+              <a:extLst>
+                <a:ext uri="{FF2B5EF4-FFF2-40B4-BE49-F238E27FC236}">
+                  <a16:creationId xmlns:a16="http://schemas.microsoft.com/office/drawing/2014/main" id="{F472CEBB-6B76-3476-2C45-7E2271A9E5D8}"/>
+                </a:ext>
+              </a:extLst>
+            </p:cNvPr>
+            <p:cNvCxnSpPr>
+              <a:stCxn id="67" idx="0"/>
+              <a:endCxn id="60" idx="1"/>
+            </p:cNvCxnSpPr>
+            <p:nvPr/>
+          </p:nvCxnSpPr>
+          <p:spPr>
+            <a:xfrm rot="5400000" flipH="1" flipV="1">
+              <a:off x="6819699" y="1603181"/>
+              <a:ext cx="239025" cy="1686425"/>
+            </a:xfrm>
+            <a:prstGeom prst="bentConnector2">
+              <a:avLst/>
+            </a:prstGeom>
+            <a:ln w="12700">
+              <a:solidFill>
+                <a:srgbClr val="FF7C80"/>
+              </a:solidFill>
+              <a:tailEnd type="triangle"/>
+            </a:ln>
+          </p:spPr>
+          <p:style>
+            <a:lnRef idx="1">
+              <a:schemeClr val="accent1"/>
+            </a:lnRef>
+            <a:fillRef idx="0">
+              <a:schemeClr val="accent1"/>
+            </a:fillRef>
+            <a:effectRef idx="0">
+              <a:schemeClr val="accent1"/>
+            </a:effectRef>
+            <a:fontRef idx="minor">
+              <a:schemeClr val="tx1"/>
+            </a:fontRef>
+          </p:style>
+        </p:cxnSp>
+        <p:cxnSp>
+          <p:nvCxnSpPr>
+            <p:cNvPr id="22" name="Straight Arrow Connector 21">
+              <a:extLst>
+                <a:ext uri="{FF2B5EF4-FFF2-40B4-BE49-F238E27FC236}">
+                  <a16:creationId xmlns:a16="http://schemas.microsoft.com/office/drawing/2014/main" id="{C93C3D2B-5EEB-A880-91FF-A74A8B29363E}"/>
+                </a:ext>
+              </a:extLst>
+            </p:cNvPr>
+            <p:cNvCxnSpPr>
+              <a:stCxn id="21" idx="2"/>
+              <a:endCxn id="75" idx="1"/>
+            </p:cNvCxnSpPr>
+            <p:nvPr/>
+          </p:nvCxnSpPr>
+          <p:spPr>
+            <a:xfrm>
+              <a:off x="8307803" y="3512389"/>
+              <a:ext cx="1" cy="296231"/>
+            </a:xfrm>
+            <a:prstGeom prst="straightConnector1">
+              <a:avLst/>
+            </a:prstGeom>
+            <a:ln w="12700">
+              <a:solidFill>
+                <a:srgbClr val="FF7C80"/>
+              </a:solidFill>
+              <a:tailEnd type="triangle"/>
+            </a:ln>
+          </p:spPr>
+          <p:style>
+            <a:lnRef idx="1">
+              <a:schemeClr val="accent1"/>
+            </a:lnRef>
+            <a:fillRef idx="0">
+              <a:schemeClr val="accent1"/>
+            </a:fillRef>
+            <a:effectRef idx="0">
+              <a:schemeClr val="accent1"/>
+            </a:effectRef>
+            <a:fontRef idx="minor">
+              <a:schemeClr val="tx1"/>
+            </a:fontRef>
+          </p:style>
+        </p:cxnSp>
+        <p:cxnSp>
+          <p:nvCxnSpPr>
+            <p:cNvPr id="31" name="Connector: Elbow 30">
+              <a:extLst>
+                <a:ext uri="{FF2B5EF4-FFF2-40B4-BE49-F238E27FC236}">
+                  <a16:creationId xmlns:a16="http://schemas.microsoft.com/office/drawing/2014/main" id="{EF36A2B1-B672-156F-D2EE-1F68E4273D97}"/>
+                </a:ext>
+              </a:extLst>
+            </p:cNvPr>
+            <p:cNvCxnSpPr>
+              <a:stCxn id="75" idx="2"/>
+              <a:endCxn id="20" idx="2"/>
+            </p:cNvCxnSpPr>
+            <p:nvPr/>
+          </p:nvCxnSpPr>
+          <p:spPr>
+            <a:xfrm rot="10800000">
+              <a:off x="3884194" y="3237168"/>
+              <a:ext cx="3685672" cy="816094"/>
+            </a:xfrm>
+            <a:prstGeom prst="bentConnector2">
+              <a:avLst/>
+            </a:prstGeom>
+            <a:ln w="12700">
+              <a:solidFill>
+                <a:srgbClr val="CC99FF"/>
+              </a:solidFill>
+              <a:tailEnd type="triangle"/>
+            </a:ln>
+          </p:spPr>
+          <p:style>
+            <a:lnRef idx="1">
+              <a:schemeClr val="accent1"/>
+            </a:lnRef>
+            <a:fillRef idx="0">
+              <a:schemeClr val="accent1"/>
+            </a:fillRef>
+            <a:effectRef idx="0">
+              <a:schemeClr val="accent1"/>
+            </a:effectRef>
+            <a:fontRef idx="minor">
+              <a:schemeClr val="tx1"/>
+            </a:fontRef>
+          </p:style>
+        </p:cxnSp>
+        <p:sp>
+          <p:nvSpPr>
+            <p:cNvPr id="43" name="TextBox 42">
+              <a:extLst>
+                <a:ext uri="{FF2B5EF4-FFF2-40B4-BE49-F238E27FC236}">
+                  <a16:creationId xmlns:a16="http://schemas.microsoft.com/office/drawing/2014/main" id="{3911334E-A337-B074-DFC5-4DE2B6EC6370}"/>
+                </a:ext>
+              </a:extLst>
+            </p:cNvPr>
+            <p:cNvSpPr txBox="1"/>
+            <p:nvPr/>
+          </p:nvSpPr>
+          <p:spPr>
+            <a:xfrm>
+              <a:off x="5826372" y="2314809"/>
+              <a:ext cx="269626" cy="276999"/>
+            </a:xfrm>
+            <a:prstGeom prst="rect">
+              <a:avLst/>
+            </a:prstGeom>
+            <a:noFill/>
+          </p:spPr>
+          <p:txBody>
+            <a:bodyPr wrap="none" rtlCol="0">
+              <a:spAutoFit/>
+            </a:bodyPr>
+            <a:lstStyle/>
+            <a:p>
+              <a:r>
+                <a:rPr lang="en-US" sz="1200" dirty="0">
+                  <a:solidFill>
+                    <a:srgbClr val="FF7C80"/>
+                  </a:solidFill>
+                  <a:latin typeface="Open Sans" panose="020B0606030504020204" pitchFamily="34" charset="0"/>
+                  <a:ea typeface="Open Sans" panose="020B0606030504020204" pitchFamily="34" charset="0"/>
+                  <a:cs typeface="Open Sans" panose="020B0606030504020204" pitchFamily="34" charset="0"/>
+                </a:rPr>
+                <a:t>F</a:t>
+              </a:r>
+            </a:p>
+          </p:txBody>
+        </p:sp>
+        <p:sp>
+          <p:nvSpPr>
+            <p:cNvPr id="44" name="TextBox 43">
+              <a:extLst>
+                <a:ext uri="{FF2B5EF4-FFF2-40B4-BE49-F238E27FC236}">
+                  <a16:creationId xmlns:a16="http://schemas.microsoft.com/office/drawing/2014/main" id="{07F0D28E-E066-CE47-C44C-3FF0D40BCC2B}"/>
+                </a:ext>
+              </a:extLst>
+            </p:cNvPr>
+            <p:cNvSpPr txBox="1"/>
+            <p:nvPr/>
+          </p:nvSpPr>
+          <p:spPr>
+            <a:xfrm>
+              <a:off x="7018417" y="2762421"/>
+              <a:ext cx="269626" cy="276999"/>
+            </a:xfrm>
+            <a:prstGeom prst="rect">
+              <a:avLst/>
+            </a:prstGeom>
+            <a:noFill/>
+          </p:spPr>
+          <p:txBody>
+            <a:bodyPr wrap="none" rtlCol="0">
+              <a:spAutoFit/>
+            </a:bodyPr>
+            <a:lstStyle/>
+            <a:p>
+              <a:r>
+                <a:rPr lang="en-US" sz="1200" dirty="0">
+                  <a:solidFill>
+                    <a:srgbClr val="FF7C80"/>
+                  </a:solidFill>
+                  <a:latin typeface="Open Sans" panose="020B0606030504020204" pitchFamily="34" charset="0"/>
+                  <a:ea typeface="Open Sans" panose="020B0606030504020204" pitchFamily="34" charset="0"/>
+                  <a:cs typeface="Open Sans" panose="020B0606030504020204" pitchFamily="34" charset="0"/>
+                </a:rPr>
+                <a:t>T</a:t>
+              </a:r>
+            </a:p>
+          </p:txBody>
+        </p:sp>
+        <p:sp>
+          <p:nvSpPr>
+            <p:cNvPr id="45" name="TextBox 44">
+              <a:extLst>
+                <a:ext uri="{FF2B5EF4-FFF2-40B4-BE49-F238E27FC236}">
+                  <a16:creationId xmlns:a16="http://schemas.microsoft.com/office/drawing/2014/main" id="{C5E31F02-B0DE-D9F5-5293-325560FD0976}"/>
+                </a:ext>
+              </a:extLst>
+            </p:cNvPr>
+            <p:cNvSpPr txBox="1"/>
+            <p:nvPr/>
+          </p:nvSpPr>
+          <p:spPr>
+            <a:xfrm>
+              <a:off x="8307803" y="3512389"/>
+              <a:ext cx="269626" cy="276999"/>
+            </a:xfrm>
+            <a:prstGeom prst="rect">
+              <a:avLst/>
+            </a:prstGeom>
+            <a:noFill/>
+          </p:spPr>
+          <p:txBody>
+            <a:bodyPr wrap="none" rtlCol="0">
+              <a:spAutoFit/>
+            </a:bodyPr>
+            <a:lstStyle/>
+            <a:p>
+              <a:r>
+                <a:rPr lang="en-US" sz="1200" dirty="0">
+                  <a:solidFill>
+                    <a:srgbClr val="FF7C80"/>
+                  </a:solidFill>
+                  <a:latin typeface="Open Sans" panose="020B0606030504020204" pitchFamily="34" charset="0"/>
+                  <a:ea typeface="Open Sans" panose="020B0606030504020204" pitchFamily="34" charset="0"/>
+                  <a:cs typeface="Open Sans" panose="020B0606030504020204" pitchFamily="34" charset="0"/>
+                </a:rPr>
+                <a:t>T</a:t>
+              </a:r>
+            </a:p>
+          </p:txBody>
+        </p:sp>
+      </p:grpSp>
+    </p:spTree>
+    <p:extLst>
+      <p:ext uri="{BB962C8B-B14F-4D97-AF65-F5344CB8AC3E}">
+        <p14:creationId xmlns:p14="http://schemas.microsoft.com/office/powerpoint/2010/main" val="2635097550"/>
+      </p:ext>
+    </p:extLst>
+  </p:cSld>
+  <p:clrMapOvr>
+    <a:masterClrMapping/>
+  </p:clrMapOvr>
+</p:sld>
+</file>
+
 <file path=ppt/theme/theme1.xml><?xml version="1.0" encoding="utf-8"?>
 <a:theme xmlns:a="http://schemas.openxmlformats.org/drawingml/2006/main" name="Office Theme">
   <a:themeElements>

</xml_diff>

<commit_message>
Added Flowchart for PrePSPM2021_KMM
</commit_message>
<xml_diff>
--- a/Past Year Theory Questions/Resources/resources.pptx
+++ b/Past Year Theory Questions/Resources/resources.pptx
@@ -11,6 +11,7 @@
     <p:sldId id="260" r:id="rId5"/>
     <p:sldId id="261" r:id="rId6"/>
     <p:sldId id="262" r:id="rId7"/>
+    <p:sldId id="263" r:id="rId8"/>
   </p:sldIdLst>
   <p:sldSz cx="12192000" cy="6858000"/>
   <p:notesSz cx="6858000" cy="9144000"/>
@@ -264,7 +265,7 @@
           <a:p>
             <a:fld id="{34BBF2E1-1C0D-4B66-AD27-CA9E57E33A5F}" type="datetimeFigureOut">
               <a:rPr lang="en-US" smtClean="0"/>
-              <a:t>11-May-22</a:t>
+              <a:t>15-May-22</a:t>
             </a:fld>
             <a:endParaRPr lang="en-US"/>
           </a:p>
@@ -462,7 +463,7 @@
           <a:p>
             <a:fld id="{34BBF2E1-1C0D-4B66-AD27-CA9E57E33A5F}" type="datetimeFigureOut">
               <a:rPr lang="en-US" smtClean="0"/>
-              <a:t>11-May-22</a:t>
+              <a:t>15-May-22</a:t>
             </a:fld>
             <a:endParaRPr lang="en-US"/>
           </a:p>
@@ -670,7 +671,7 @@
           <a:p>
             <a:fld id="{34BBF2E1-1C0D-4B66-AD27-CA9E57E33A5F}" type="datetimeFigureOut">
               <a:rPr lang="en-US" smtClean="0"/>
-              <a:t>11-May-22</a:t>
+              <a:t>15-May-22</a:t>
             </a:fld>
             <a:endParaRPr lang="en-US"/>
           </a:p>
@@ -868,7 +869,7 @@
           <a:p>
             <a:fld id="{34BBF2E1-1C0D-4B66-AD27-CA9E57E33A5F}" type="datetimeFigureOut">
               <a:rPr lang="en-US" smtClean="0"/>
-              <a:t>11-May-22</a:t>
+              <a:t>15-May-22</a:t>
             </a:fld>
             <a:endParaRPr lang="en-US"/>
           </a:p>
@@ -1143,7 +1144,7 @@
           <a:p>
             <a:fld id="{34BBF2E1-1C0D-4B66-AD27-CA9E57E33A5F}" type="datetimeFigureOut">
               <a:rPr lang="en-US" smtClean="0"/>
-              <a:t>11-May-22</a:t>
+              <a:t>15-May-22</a:t>
             </a:fld>
             <a:endParaRPr lang="en-US"/>
           </a:p>
@@ -1408,7 +1409,7 @@
           <a:p>
             <a:fld id="{34BBF2E1-1C0D-4B66-AD27-CA9E57E33A5F}" type="datetimeFigureOut">
               <a:rPr lang="en-US" smtClean="0"/>
-              <a:t>11-May-22</a:t>
+              <a:t>15-May-22</a:t>
             </a:fld>
             <a:endParaRPr lang="en-US"/>
           </a:p>
@@ -1820,7 +1821,7 @@
           <a:p>
             <a:fld id="{34BBF2E1-1C0D-4B66-AD27-CA9E57E33A5F}" type="datetimeFigureOut">
               <a:rPr lang="en-US" smtClean="0"/>
-              <a:t>11-May-22</a:t>
+              <a:t>15-May-22</a:t>
             </a:fld>
             <a:endParaRPr lang="en-US"/>
           </a:p>
@@ -1961,7 +1962,7 @@
           <a:p>
             <a:fld id="{34BBF2E1-1C0D-4B66-AD27-CA9E57E33A5F}" type="datetimeFigureOut">
               <a:rPr lang="en-US" smtClean="0"/>
-              <a:t>11-May-22</a:t>
+              <a:t>15-May-22</a:t>
             </a:fld>
             <a:endParaRPr lang="en-US"/>
           </a:p>
@@ -2074,7 +2075,7 @@
           <a:p>
             <a:fld id="{34BBF2E1-1C0D-4B66-AD27-CA9E57E33A5F}" type="datetimeFigureOut">
               <a:rPr lang="en-US" smtClean="0"/>
-              <a:t>11-May-22</a:t>
+              <a:t>15-May-22</a:t>
             </a:fld>
             <a:endParaRPr lang="en-US"/>
           </a:p>
@@ -2385,7 +2386,7 @@
           <a:p>
             <a:fld id="{34BBF2E1-1C0D-4B66-AD27-CA9E57E33A5F}" type="datetimeFigureOut">
               <a:rPr lang="en-US" smtClean="0"/>
-              <a:t>11-May-22</a:t>
+              <a:t>15-May-22</a:t>
             </a:fld>
             <a:endParaRPr lang="en-US"/>
           </a:p>
@@ -2673,7 +2674,7 @@
           <a:p>
             <a:fld id="{34BBF2E1-1C0D-4B66-AD27-CA9E57E33A5F}" type="datetimeFigureOut">
               <a:rPr lang="en-US" smtClean="0"/>
-              <a:t>11-May-22</a:t>
+              <a:t>15-May-22</a:t>
             </a:fld>
             <a:endParaRPr lang="en-US"/>
           </a:p>
@@ -2914,7 +2915,7 @@
           <a:p>
             <a:fld id="{34BBF2E1-1C0D-4B66-AD27-CA9E57E33A5F}" type="datetimeFigureOut">
               <a:rPr lang="en-US" smtClean="0"/>
-              <a:t>11-May-22</a:t>
+              <a:t>15-May-22</a:t>
             </a:fld>
             <a:endParaRPr lang="en-US"/>
           </a:p>
@@ -12646,6 +12647,1022 @@
 </p:sld>
 </file>
 
+<file path=ppt/slides/slide7.xml><?xml version="1.0" encoding="utf-8"?>
+<p:sld xmlns:a="http://schemas.openxmlformats.org/drawingml/2006/main" xmlns:r="http://schemas.openxmlformats.org/officeDocument/2006/relationships" xmlns:p="http://schemas.openxmlformats.org/presentationml/2006/main">
+  <p:cSld>
+    <p:spTree>
+      <p:nvGrpSpPr>
+        <p:cNvPr id="1" name=""/>
+        <p:cNvGrpSpPr/>
+        <p:nvPr/>
+      </p:nvGrpSpPr>
+      <p:grpSpPr>
+        <a:xfrm>
+          <a:off x="0" y="0"/>
+          <a:ext cx="0" cy="0"/>
+          <a:chOff x="0" y="0"/>
+          <a:chExt cx="0" cy="0"/>
+        </a:xfrm>
+      </p:grpSpPr>
+      <p:grpSp>
+        <p:nvGrpSpPr>
+          <p:cNvPr id="10" name="Group 9">
+            <a:extLst>
+              <a:ext uri="{FF2B5EF4-FFF2-40B4-BE49-F238E27FC236}">
+                <a16:creationId xmlns:a16="http://schemas.microsoft.com/office/drawing/2014/main" id="{D17DD080-721A-D8B5-6DBD-BDB4E2CB213A}"/>
+              </a:ext>
+            </a:extLst>
+          </p:cNvPr>
+          <p:cNvGrpSpPr/>
+          <p:nvPr/>
+        </p:nvGrpSpPr>
+        <p:grpSpPr>
+          <a:xfrm>
+            <a:off x="2488066" y="1587566"/>
+            <a:ext cx="7215868" cy="3682868"/>
+            <a:chOff x="736147" y="1183821"/>
+            <a:chExt cx="7215868" cy="3682868"/>
+          </a:xfrm>
+        </p:grpSpPr>
+        <p:sp>
+          <p:nvSpPr>
+            <p:cNvPr id="108" name="Rectangle 107">
+              <a:extLst>
+                <a:ext uri="{FF2B5EF4-FFF2-40B4-BE49-F238E27FC236}">
+                  <a16:creationId xmlns:a16="http://schemas.microsoft.com/office/drawing/2014/main" id="{F5A5FD62-A99C-04B6-706B-DEE9B81AF541}"/>
+                </a:ext>
+              </a:extLst>
+            </p:cNvPr>
+            <p:cNvSpPr/>
+            <p:nvPr/>
+          </p:nvSpPr>
+          <p:spPr>
+            <a:xfrm>
+              <a:off x="736147" y="1183821"/>
+              <a:ext cx="7215868" cy="3682868"/>
+            </a:xfrm>
+            <a:prstGeom prst="rect">
+              <a:avLst/>
+            </a:prstGeom>
+            <a:solidFill>
+              <a:srgbClr val="0F1017"/>
+            </a:solidFill>
+            <a:ln w="12700">
+              <a:solidFill>
+                <a:schemeClr val="bg1">
+                  <a:lumMod val="75000"/>
+                </a:schemeClr>
+              </a:solidFill>
+            </a:ln>
+          </p:spPr>
+          <p:style>
+            <a:lnRef idx="2">
+              <a:schemeClr val="accent1">
+                <a:shade val="50000"/>
+              </a:schemeClr>
+            </a:lnRef>
+            <a:fillRef idx="1">
+              <a:schemeClr val="accent1"/>
+            </a:fillRef>
+            <a:effectRef idx="0">
+              <a:schemeClr val="accent1"/>
+            </a:effectRef>
+            <a:fontRef idx="minor">
+              <a:schemeClr val="lt1"/>
+            </a:fontRef>
+          </p:style>
+          <p:txBody>
+            <a:bodyPr rtlCol="0" anchor="ctr"/>
+            <a:lstStyle/>
+            <a:p>
+              <a:pPr algn="ctr"/>
+              <a:endParaRPr lang="en-US" sz="1800" dirty="0">
+                <a:solidFill>
+                  <a:schemeClr val="bg1">
+                    <a:lumMod val="85000"/>
+                  </a:schemeClr>
+                </a:solidFill>
+                <a:latin typeface="Open Sans" panose="020B0606030504020204" pitchFamily="34" charset="0"/>
+                <a:ea typeface="Open Sans" panose="020B0606030504020204" pitchFamily="34" charset="0"/>
+                <a:cs typeface="Open Sans" panose="020B0606030504020204" pitchFamily="34" charset="0"/>
+              </a:endParaRPr>
+            </a:p>
+          </p:txBody>
+        </p:sp>
+        <p:sp>
+          <p:nvSpPr>
+            <p:cNvPr id="59" name="Flowchart: Terminator 58">
+              <a:extLst>
+                <a:ext uri="{FF2B5EF4-FFF2-40B4-BE49-F238E27FC236}">
+                  <a16:creationId xmlns:a16="http://schemas.microsoft.com/office/drawing/2014/main" id="{D7554AAC-5F81-46CA-BA4E-6CDF6B8CC5AD}"/>
+                </a:ext>
+              </a:extLst>
+            </p:cNvPr>
+            <p:cNvSpPr/>
+            <p:nvPr/>
+          </p:nvSpPr>
+          <p:spPr>
+            <a:xfrm>
+              <a:off x="1609869" y="1678889"/>
+              <a:ext cx="1050758" cy="341690"/>
+            </a:xfrm>
+            <a:prstGeom prst="flowChartTerminator">
+              <a:avLst/>
+            </a:prstGeom>
+            <a:noFill/>
+            <a:ln>
+              <a:solidFill>
+                <a:schemeClr val="bg1">
+                  <a:lumMod val="75000"/>
+                </a:schemeClr>
+              </a:solidFill>
+            </a:ln>
+          </p:spPr>
+          <p:style>
+            <a:lnRef idx="2">
+              <a:schemeClr val="accent1">
+                <a:shade val="50000"/>
+              </a:schemeClr>
+            </a:lnRef>
+            <a:fillRef idx="1">
+              <a:schemeClr val="accent1"/>
+            </a:fillRef>
+            <a:effectRef idx="0">
+              <a:schemeClr val="accent1"/>
+            </a:effectRef>
+            <a:fontRef idx="minor">
+              <a:schemeClr val="lt1"/>
+            </a:fontRef>
+          </p:style>
+          <p:txBody>
+            <a:bodyPr rtlCol="0" anchor="ctr"/>
+            <a:lstStyle/>
+            <a:p>
+              <a:pPr algn="ctr"/>
+              <a:r>
+                <a:rPr lang="en-US" sz="1200" dirty="0">
+                  <a:solidFill>
+                    <a:schemeClr val="bg1">
+                      <a:lumMod val="85000"/>
+                    </a:schemeClr>
+                  </a:solidFill>
+                  <a:latin typeface="Open Sans" panose="020B0606030504020204" pitchFamily="34" charset="0"/>
+                  <a:ea typeface="Open Sans" panose="020B0606030504020204" pitchFamily="34" charset="0"/>
+                  <a:cs typeface="Open Sans" panose="020B0606030504020204" pitchFamily="34" charset="0"/>
+                </a:rPr>
+                <a:t>Start</a:t>
+              </a:r>
+            </a:p>
+          </p:txBody>
+        </p:sp>
+        <p:sp>
+          <p:nvSpPr>
+            <p:cNvPr id="60" name="Flowchart: Terminator 59">
+              <a:extLst>
+                <a:ext uri="{FF2B5EF4-FFF2-40B4-BE49-F238E27FC236}">
+                  <a16:creationId xmlns:a16="http://schemas.microsoft.com/office/drawing/2014/main" id="{103191FC-37A5-724C-C214-882B4B9F6C89}"/>
+                </a:ext>
+              </a:extLst>
+            </p:cNvPr>
+            <p:cNvSpPr/>
+            <p:nvPr/>
+          </p:nvSpPr>
+          <p:spPr>
+            <a:xfrm>
+              <a:off x="6027534" y="1678889"/>
+              <a:ext cx="1050758" cy="341690"/>
+            </a:xfrm>
+            <a:prstGeom prst="flowChartTerminator">
+              <a:avLst/>
+            </a:prstGeom>
+            <a:noFill/>
+            <a:ln>
+              <a:solidFill>
+                <a:schemeClr val="bg1">
+                  <a:lumMod val="75000"/>
+                </a:schemeClr>
+              </a:solidFill>
+            </a:ln>
+          </p:spPr>
+          <p:style>
+            <a:lnRef idx="2">
+              <a:schemeClr val="accent1">
+                <a:shade val="50000"/>
+              </a:schemeClr>
+            </a:lnRef>
+            <a:fillRef idx="1">
+              <a:schemeClr val="accent1"/>
+            </a:fillRef>
+            <a:effectRef idx="0">
+              <a:schemeClr val="accent1"/>
+            </a:effectRef>
+            <a:fontRef idx="minor">
+              <a:schemeClr val="lt1"/>
+            </a:fontRef>
+          </p:style>
+          <p:txBody>
+            <a:bodyPr rtlCol="0" anchor="ctr"/>
+            <a:lstStyle/>
+            <a:p>
+              <a:pPr algn="ctr"/>
+              <a:r>
+                <a:rPr lang="en-US" sz="1200" dirty="0">
+                  <a:solidFill>
+                    <a:schemeClr val="bg1">
+                      <a:lumMod val="85000"/>
+                    </a:schemeClr>
+                  </a:solidFill>
+                  <a:latin typeface="Open Sans" panose="020B0606030504020204" pitchFamily="34" charset="0"/>
+                  <a:ea typeface="Open Sans" panose="020B0606030504020204" pitchFamily="34" charset="0"/>
+                  <a:cs typeface="Open Sans" panose="020B0606030504020204" pitchFamily="34" charset="0"/>
+                </a:rPr>
+                <a:t>Stop</a:t>
+              </a:r>
+            </a:p>
+          </p:txBody>
+        </p:sp>
+        <p:cxnSp>
+          <p:nvCxnSpPr>
+            <p:cNvPr id="61" name="Straight Arrow Connector 60">
+              <a:extLst>
+                <a:ext uri="{FF2B5EF4-FFF2-40B4-BE49-F238E27FC236}">
+                  <a16:creationId xmlns:a16="http://schemas.microsoft.com/office/drawing/2014/main" id="{A1BBCFB3-141A-F3B8-67BE-C05995E64053}"/>
+                </a:ext>
+              </a:extLst>
+            </p:cNvPr>
+            <p:cNvCxnSpPr>
+              <a:cxnSpLocks/>
+              <a:stCxn id="59" idx="2"/>
+            </p:cNvCxnSpPr>
+            <p:nvPr/>
+          </p:nvCxnSpPr>
+          <p:spPr>
+            <a:xfrm>
+              <a:off x="2135248" y="2020579"/>
+              <a:ext cx="0" cy="296780"/>
+            </a:xfrm>
+            <a:prstGeom prst="straightConnector1">
+              <a:avLst/>
+            </a:prstGeom>
+            <a:ln w="12700">
+              <a:solidFill>
+                <a:schemeClr val="bg1">
+                  <a:lumMod val="75000"/>
+                </a:schemeClr>
+              </a:solidFill>
+              <a:tailEnd type="triangle"/>
+            </a:ln>
+          </p:spPr>
+          <p:style>
+            <a:lnRef idx="1">
+              <a:schemeClr val="accent1"/>
+            </a:lnRef>
+            <a:fillRef idx="0">
+              <a:schemeClr val="accent1"/>
+            </a:fillRef>
+            <a:effectRef idx="0">
+              <a:schemeClr val="accent1"/>
+            </a:effectRef>
+            <a:fontRef idx="minor">
+              <a:schemeClr val="tx1"/>
+            </a:fontRef>
+          </p:style>
+        </p:cxnSp>
+        <p:sp>
+          <p:nvSpPr>
+            <p:cNvPr id="75" name="Flowchart: Data 74">
+              <a:extLst>
+                <a:ext uri="{FF2B5EF4-FFF2-40B4-BE49-F238E27FC236}">
+                  <a16:creationId xmlns:a16="http://schemas.microsoft.com/office/drawing/2014/main" id="{684F63EE-4E36-A045-0D95-769D7FC961BB}"/>
+                </a:ext>
+              </a:extLst>
+            </p:cNvPr>
+            <p:cNvSpPr/>
+            <p:nvPr/>
+          </p:nvSpPr>
+          <p:spPr>
+            <a:xfrm>
+              <a:off x="5630492" y="2317359"/>
+              <a:ext cx="1844844" cy="489284"/>
+            </a:xfrm>
+            <a:prstGeom prst="flowChartInputOutput">
+              <a:avLst/>
+            </a:prstGeom>
+            <a:noFill/>
+            <a:ln>
+              <a:solidFill>
+                <a:srgbClr val="CC99FF"/>
+              </a:solidFill>
+            </a:ln>
+          </p:spPr>
+          <p:style>
+            <a:lnRef idx="2">
+              <a:schemeClr val="accent1">
+                <a:shade val="50000"/>
+              </a:schemeClr>
+            </a:lnRef>
+            <a:fillRef idx="1">
+              <a:schemeClr val="accent1"/>
+            </a:fillRef>
+            <a:effectRef idx="0">
+              <a:schemeClr val="accent1"/>
+            </a:effectRef>
+            <a:fontRef idx="minor">
+              <a:schemeClr val="lt1"/>
+            </a:fontRef>
+          </p:style>
+          <p:txBody>
+            <a:bodyPr rtlCol="0" anchor="ctr"/>
+            <a:lstStyle/>
+            <a:p>
+              <a:pPr algn="ctr"/>
+              <a:r>
+                <a:rPr lang="en-US" sz="1200" dirty="0">
+                  <a:solidFill>
+                    <a:schemeClr val="bg1">
+                      <a:lumMod val="85000"/>
+                    </a:schemeClr>
+                  </a:solidFill>
+                  <a:latin typeface="Open Sans" panose="020B0606030504020204" pitchFamily="34" charset="0"/>
+                  <a:ea typeface="Open Sans" panose="020B0606030504020204" pitchFamily="34" charset="0"/>
+                  <a:cs typeface="Open Sans" panose="020B0606030504020204" pitchFamily="34" charset="0"/>
+                </a:rPr>
+                <a:t>Print </a:t>
+              </a:r>
+              <a:r>
+                <a:rPr lang="en-US" sz="1200" dirty="0" err="1">
+                  <a:solidFill>
+                    <a:schemeClr val="bg1">
+                      <a:lumMod val="85000"/>
+                    </a:schemeClr>
+                  </a:solidFill>
+                  <a:latin typeface="Open Sans" panose="020B0606030504020204" pitchFamily="34" charset="0"/>
+                  <a:ea typeface="Open Sans" panose="020B0606030504020204" pitchFamily="34" charset="0"/>
+                  <a:cs typeface="Open Sans" panose="020B0606030504020204" pitchFamily="34" charset="0"/>
+                </a:rPr>
+                <a:t>priceFinal</a:t>
+              </a:r>
+              <a:endParaRPr lang="en-US" sz="1200" dirty="0">
+                <a:solidFill>
+                  <a:schemeClr val="bg1">
+                    <a:lumMod val="85000"/>
+                  </a:schemeClr>
+                </a:solidFill>
+                <a:latin typeface="Open Sans" panose="020B0606030504020204" pitchFamily="34" charset="0"/>
+                <a:ea typeface="Open Sans" panose="020B0606030504020204" pitchFamily="34" charset="0"/>
+                <a:cs typeface="Open Sans" panose="020B0606030504020204" pitchFamily="34" charset="0"/>
+              </a:endParaRPr>
+            </a:p>
+          </p:txBody>
+        </p:sp>
+        <p:sp>
+          <p:nvSpPr>
+            <p:cNvPr id="26" name="Flowchart: Data 25">
+              <a:extLst>
+                <a:ext uri="{FF2B5EF4-FFF2-40B4-BE49-F238E27FC236}">
+                  <a16:creationId xmlns:a16="http://schemas.microsoft.com/office/drawing/2014/main" id="{94D191EB-608A-2C67-B420-0EA65677B979}"/>
+                </a:ext>
+              </a:extLst>
+            </p:cNvPr>
+            <p:cNvSpPr/>
+            <p:nvPr/>
+          </p:nvSpPr>
+          <p:spPr>
+            <a:xfrm>
+              <a:off x="3421659" y="2313029"/>
+              <a:ext cx="1844844" cy="489284"/>
+            </a:xfrm>
+            <a:prstGeom prst="flowChartInputOutput">
+              <a:avLst/>
+            </a:prstGeom>
+            <a:noFill/>
+            <a:ln>
+              <a:solidFill>
+                <a:schemeClr val="accent1">
+                  <a:lumMod val="60000"/>
+                  <a:lumOff val="40000"/>
+                </a:schemeClr>
+              </a:solidFill>
+            </a:ln>
+          </p:spPr>
+          <p:style>
+            <a:lnRef idx="2">
+              <a:schemeClr val="accent1">
+                <a:shade val="50000"/>
+              </a:schemeClr>
+            </a:lnRef>
+            <a:fillRef idx="1">
+              <a:schemeClr val="accent1"/>
+            </a:fillRef>
+            <a:effectRef idx="0">
+              <a:schemeClr val="accent1"/>
+            </a:effectRef>
+            <a:fontRef idx="minor">
+              <a:schemeClr val="lt1"/>
+            </a:fontRef>
+          </p:style>
+          <p:txBody>
+            <a:bodyPr rtlCol="0" anchor="ctr"/>
+            <a:lstStyle/>
+            <a:p>
+              <a:pPr algn="ctr"/>
+              <a:r>
+                <a:rPr lang="en-US" sz="1200" dirty="0">
+                  <a:solidFill>
+                    <a:schemeClr val="bg1">
+                      <a:lumMod val="85000"/>
+                    </a:schemeClr>
+                  </a:solidFill>
+                  <a:latin typeface="Open Sans" panose="020B0606030504020204" pitchFamily="34" charset="0"/>
+                  <a:ea typeface="Open Sans" panose="020B0606030504020204" pitchFamily="34" charset="0"/>
+                  <a:cs typeface="Open Sans" panose="020B0606030504020204" pitchFamily="34" charset="0"/>
+                </a:rPr>
+                <a:t>Read </a:t>
+              </a:r>
+              <a:r>
+                <a:rPr lang="en-US" sz="1200" dirty="0" err="1">
+                  <a:solidFill>
+                    <a:schemeClr val="bg1">
+                      <a:lumMod val="85000"/>
+                    </a:schemeClr>
+                  </a:solidFill>
+                  <a:latin typeface="Open Sans" panose="020B0606030504020204" pitchFamily="34" charset="0"/>
+                  <a:ea typeface="Open Sans" panose="020B0606030504020204" pitchFamily="34" charset="0"/>
+                  <a:cs typeface="Open Sans" panose="020B0606030504020204" pitchFamily="34" charset="0"/>
+                </a:rPr>
+                <a:t>bookCount</a:t>
+              </a:r>
+              <a:endParaRPr lang="en-US" sz="1200" dirty="0">
+                <a:solidFill>
+                  <a:schemeClr val="bg1">
+                    <a:lumMod val="85000"/>
+                  </a:schemeClr>
+                </a:solidFill>
+                <a:latin typeface="Open Sans" panose="020B0606030504020204" pitchFamily="34" charset="0"/>
+                <a:ea typeface="Open Sans" panose="020B0606030504020204" pitchFamily="34" charset="0"/>
+                <a:cs typeface="Open Sans" panose="020B0606030504020204" pitchFamily="34" charset="0"/>
+              </a:endParaRPr>
+            </a:p>
+          </p:txBody>
+        </p:sp>
+        <p:cxnSp>
+          <p:nvCxnSpPr>
+            <p:cNvPr id="27" name="Straight Arrow Connector 26">
+              <a:extLst>
+                <a:ext uri="{FF2B5EF4-FFF2-40B4-BE49-F238E27FC236}">
+                  <a16:creationId xmlns:a16="http://schemas.microsoft.com/office/drawing/2014/main" id="{E6C1CD8F-BB27-923B-995E-D457BDF8CD6D}"/>
+                </a:ext>
+              </a:extLst>
+            </p:cNvPr>
+            <p:cNvCxnSpPr>
+              <a:stCxn id="26" idx="4"/>
+            </p:cNvCxnSpPr>
+            <p:nvPr/>
+          </p:nvCxnSpPr>
+          <p:spPr>
+            <a:xfrm>
+              <a:off x="4344081" y="2802313"/>
+              <a:ext cx="0" cy="279437"/>
+            </a:xfrm>
+            <a:prstGeom prst="straightConnector1">
+              <a:avLst/>
+            </a:prstGeom>
+            <a:ln w="12700">
+              <a:solidFill>
+                <a:schemeClr val="accent1">
+                  <a:lumMod val="60000"/>
+                  <a:lumOff val="40000"/>
+                </a:schemeClr>
+              </a:solidFill>
+              <a:tailEnd type="triangle"/>
+            </a:ln>
+          </p:spPr>
+          <p:style>
+            <a:lnRef idx="1">
+              <a:schemeClr val="accent1"/>
+            </a:lnRef>
+            <a:fillRef idx="0">
+              <a:schemeClr val="accent1"/>
+            </a:fillRef>
+            <a:effectRef idx="0">
+              <a:schemeClr val="accent1"/>
+            </a:effectRef>
+            <a:fontRef idx="minor">
+              <a:schemeClr val="tx1"/>
+            </a:fontRef>
+          </p:style>
+        </p:cxnSp>
+        <p:cxnSp>
+          <p:nvCxnSpPr>
+            <p:cNvPr id="18" name="Straight Arrow Connector 17">
+              <a:extLst>
+                <a:ext uri="{FF2B5EF4-FFF2-40B4-BE49-F238E27FC236}">
+                  <a16:creationId xmlns:a16="http://schemas.microsoft.com/office/drawing/2014/main" id="{28D76C1F-C45D-8EEF-E187-E9E48161CAB0}"/>
+                </a:ext>
+              </a:extLst>
+            </p:cNvPr>
+            <p:cNvCxnSpPr>
+              <a:cxnSpLocks/>
+              <a:stCxn id="75" idx="1"/>
+              <a:endCxn id="60" idx="2"/>
+            </p:cNvCxnSpPr>
+            <p:nvPr/>
+          </p:nvCxnSpPr>
+          <p:spPr>
+            <a:xfrm flipH="1" flipV="1">
+              <a:off x="6552913" y="2020579"/>
+              <a:ext cx="1" cy="296780"/>
+            </a:xfrm>
+            <a:prstGeom prst="straightConnector1">
+              <a:avLst/>
+            </a:prstGeom>
+            <a:ln w="12700">
+              <a:solidFill>
+                <a:srgbClr val="CC99FF"/>
+              </a:solidFill>
+              <a:tailEnd type="triangle"/>
+            </a:ln>
+          </p:spPr>
+          <p:style>
+            <a:lnRef idx="1">
+              <a:schemeClr val="accent1"/>
+            </a:lnRef>
+            <a:fillRef idx="0">
+              <a:schemeClr val="accent1"/>
+            </a:fillRef>
+            <a:effectRef idx="0">
+              <a:schemeClr val="accent1"/>
+            </a:effectRef>
+            <a:fontRef idx="minor">
+              <a:schemeClr val="tx1"/>
+            </a:fontRef>
+          </p:style>
+        </p:cxnSp>
+        <p:sp>
+          <p:nvSpPr>
+            <p:cNvPr id="63" name="Flowchart: Data 62">
+              <a:extLst>
+                <a:ext uri="{FF2B5EF4-FFF2-40B4-BE49-F238E27FC236}">
+                  <a16:creationId xmlns:a16="http://schemas.microsoft.com/office/drawing/2014/main" id="{752BB034-E0C6-F27B-06F8-D396E9CC8B63}"/>
+                </a:ext>
+              </a:extLst>
+            </p:cNvPr>
+            <p:cNvSpPr/>
+            <p:nvPr/>
+          </p:nvSpPr>
+          <p:spPr>
+            <a:xfrm>
+              <a:off x="1212826" y="2313029"/>
+              <a:ext cx="1844844" cy="489284"/>
+            </a:xfrm>
+            <a:prstGeom prst="flowChartInputOutput">
+              <a:avLst/>
+            </a:prstGeom>
+            <a:noFill/>
+            <a:ln>
+              <a:solidFill>
+                <a:schemeClr val="accent1">
+                  <a:lumMod val="60000"/>
+                  <a:lumOff val="40000"/>
+                </a:schemeClr>
+              </a:solidFill>
+            </a:ln>
+          </p:spPr>
+          <p:style>
+            <a:lnRef idx="2">
+              <a:schemeClr val="accent1">
+                <a:shade val="50000"/>
+              </a:schemeClr>
+            </a:lnRef>
+            <a:fillRef idx="1">
+              <a:schemeClr val="accent1"/>
+            </a:fillRef>
+            <a:effectRef idx="0">
+              <a:schemeClr val="accent1"/>
+            </a:effectRef>
+            <a:fontRef idx="minor">
+              <a:schemeClr val="lt1"/>
+            </a:fontRef>
+          </p:style>
+          <p:txBody>
+            <a:bodyPr rtlCol="0" anchor="ctr"/>
+            <a:lstStyle/>
+            <a:p>
+              <a:pPr algn="ctr"/>
+              <a:r>
+                <a:rPr lang="en-US" sz="1200" dirty="0">
+                  <a:solidFill>
+                    <a:schemeClr val="bg1">
+                      <a:lumMod val="85000"/>
+                    </a:schemeClr>
+                  </a:solidFill>
+                  <a:latin typeface="Open Sans" panose="020B0606030504020204" pitchFamily="34" charset="0"/>
+                  <a:ea typeface="Open Sans" panose="020B0606030504020204" pitchFamily="34" charset="0"/>
+                  <a:cs typeface="Open Sans" panose="020B0606030504020204" pitchFamily="34" charset="0"/>
+                </a:rPr>
+                <a:t>Read </a:t>
+              </a:r>
+              <a:r>
+                <a:rPr lang="en-US" sz="1200" dirty="0" err="1">
+                  <a:solidFill>
+                    <a:schemeClr val="bg1">
+                      <a:lumMod val="85000"/>
+                    </a:schemeClr>
+                  </a:solidFill>
+                  <a:latin typeface="Open Sans" panose="020B0606030504020204" pitchFamily="34" charset="0"/>
+                  <a:ea typeface="Open Sans" panose="020B0606030504020204" pitchFamily="34" charset="0"/>
+                  <a:cs typeface="Open Sans" panose="020B0606030504020204" pitchFamily="34" charset="0"/>
+                </a:rPr>
+                <a:t>priceTotal</a:t>
+              </a:r>
+              <a:endParaRPr lang="en-US" sz="1200" dirty="0">
+                <a:solidFill>
+                  <a:schemeClr val="bg1">
+                    <a:lumMod val="85000"/>
+                  </a:schemeClr>
+                </a:solidFill>
+                <a:latin typeface="Open Sans" panose="020B0606030504020204" pitchFamily="34" charset="0"/>
+                <a:ea typeface="Open Sans" panose="020B0606030504020204" pitchFamily="34" charset="0"/>
+                <a:cs typeface="Open Sans" panose="020B0606030504020204" pitchFamily="34" charset="0"/>
+              </a:endParaRPr>
+            </a:p>
+          </p:txBody>
+        </p:sp>
+        <p:sp>
+          <p:nvSpPr>
+            <p:cNvPr id="68" name="Rectangle 67">
+              <a:extLst>
+                <a:ext uri="{FF2B5EF4-FFF2-40B4-BE49-F238E27FC236}">
+                  <a16:creationId xmlns:a16="http://schemas.microsoft.com/office/drawing/2014/main" id="{EC6BDF28-4C84-0A97-9753-8A2FBD426824}"/>
+                </a:ext>
+              </a:extLst>
+            </p:cNvPr>
+            <p:cNvSpPr/>
+            <p:nvPr/>
+          </p:nvSpPr>
+          <p:spPr>
+            <a:xfrm>
+              <a:off x="3421659" y="3103501"/>
+              <a:ext cx="1844844" cy="393032"/>
+            </a:xfrm>
+            <a:prstGeom prst="rect">
+              <a:avLst/>
+            </a:prstGeom>
+            <a:noFill/>
+            <a:ln>
+              <a:solidFill>
+                <a:schemeClr val="accent6">
+                  <a:lumMod val="60000"/>
+                  <a:lumOff val="40000"/>
+                </a:schemeClr>
+              </a:solidFill>
+            </a:ln>
+          </p:spPr>
+          <p:style>
+            <a:lnRef idx="2">
+              <a:schemeClr val="accent1">
+                <a:shade val="50000"/>
+              </a:schemeClr>
+            </a:lnRef>
+            <a:fillRef idx="1">
+              <a:schemeClr val="accent1"/>
+            </a:fillRef>
+            <a:effectRef idx="0">
+              <a:schemeClr val="accent1"/>
+            </a:effectRef>
+            <a:fontRef idx="minor">
+              <a:schemeClr val="lt1"/>
+            </a:fontRef>
+          </p:style>
+          <p:txBody>
+            <a:bodyPr rtlCol="0" anchor="ctr"/>
+            <a:lstStyle/>
+            <a:p>
+              <a:pPr algn="ctr"/>
+              <a:r>
+                <a:rPr lang="en-US" sz="1200" dirty="0">
+                  <a:solidFill>
+                    <a:schemeClr val="bg1">
+                      <a:lumMod val="85000"/>
+                    </a:schemeClr>
+                  </a:solidFill>
+                  <a:latin typeface="Open Sans" panose="020B0606030504020204" pitchFamily="34" charset="0"/>
+                  <a:ea typeface="Open Sans" panose="020B0606030504020204" pitchFamily="34" charset="0"/>
+                  <a:cs typeface="Open Sans" panose="020B0606030504020204" pitchFamily="34" charset="0"/>
+                </a:rPr>
+                <a:t>tax = 0.075 * </a:t>
+              </a:r>
+              <a:r>
+                <a:rPr lang="en-US" sz="1200" dirty="0" err="1">
+                  <a:solidFill>
+                    <a:schemeClr val="bg1">
+                      <a:lumMod val="85000"/>
+                    </a:schemeClr>
+                  </a:solidFill>
+                  <a:latin typeface="Open Sans" panose="020B0606030504020204" pitchFamily="34" charset="0"/>
+                  <a:ea typeface="Open Sans" panose="020B0606030504020204" pitchFamily="34" charset="0"/>
+                  <a:cs typeface="Open Sans" panose="020B0606030504020204" pitchFamily="34" charset="0"/>
+                </a:rPr>
+                <a:t>priceTotal</a:t>
+              </a:r>
+              <a:endParaRPr lang="en-US" sz="1200" dirty="0">
+                <a:solidFill>
+                  <a:schemeClr val="bg1">
+                    <a:lumMod val="85000"/>
+                  </a:schemeClr>
+                </a:solidFill>
+                <a:latin typeface="Open Sans" panose="020B0606030504020204" pitchFamily="34" charset="0"/>
+                <a:ea typeface="Open Sans" panose="020B0606030504020204" pitchFamily="34" charset="0"/>
+                <a:cs typeface="Open Sans" panose="020B0606030504020204" pitchFamily="34" charset="0"/>
+              </a:endParaRPr>
+            </a:p>
+          </p:txBody>
+        </p:sp>
+        <p:sp>
+          <p:nvSpPr>
+            <p:cNvPr id="70" name="Rectangle 69">
+              <a:extLst>
+                <a:ext uri="{FF2B5EF4-FFF2-40B4-BE49-F238E27FC236}">
+                  <a16:creationId xmlns:a16="http://schemas.microsoft.com/office/drawing/2014/main" id="{E24C22BA-07A1-D6D9-9D7E-0E33B60C0818}"/>
+                </a:ext>
+              </a:extLst>
+            </p:cNvPr>
+            <p:cNvSpPr/>
+            <p:nvPr/>
+          </p:nvSpPr>
+          <p:spPr>
+            <a:xfrm>
+              <a:off x="3421659" y="3822982"/>
+              <a:ext cx="1844844" cy="548640"/>
+            </a:xfrm>
+            <a:prstGeom prst="rect">
+              <a:avLst/>
+            </a:prstGeom>
+            <a:noFill/>
+            <a:ln>
+              <a:solidFill>
+                <a:schemeClr val="accent6">
+                  <a:lumMod val="60000"/>
+                  <a:lumOff val="40000"/>
+                </a:schemeClr>
+              </a:solidFill>
+            </a:ln>
+          </p:spPr>
+          <p:style>
+            <a:lnRef idx="2">
+              <a:schemeClr val="accent1">
+                <a:shade val="50000"/>
+              </a:schemeClr>
+            </a:lnRef>
+            <a:fillRef idx="1">
+              <a:schemeClr val="accent1"/>
+            </a:fillRef>
+            <a:effectRef idx="0">
+              <a:schemeClr val="accent1"/>
+            </a:effectRef>
+            <a:fontRef idx="minor">
+              <a:schemeClr val="lt1"/>
+            </a:fontRef>
+          </p:style>
+          <p:txBody>
+            <a:bodyPr rtlCol="0" anchor="ctr"/>
+            <a:lstStyle/>
+            <a:p>
+              <a:pPr algn="ctr"/>
+              <a:r>
+                <a:rPr lang="en-US" sz="1200" dirty="0" err="1">
+                  <a:solidFill>
+                    <a:schemeClr val="bg1">
+                      <a:lumMod val="85000"/>
+                    </a:schemeClr>
+                  </a:solidFill>
+                  <a:latin typeface="Open Sans" panose="020B0606030504020204" pitchFamily="34" charset="0"/>
+                  <a:ea typeface="Open Sans" panose="020B0606030504020204" pitchFamily="34" charset="0"/>
+                  <a:cs typeface="Open Sans" panose="020B0606030504020204" pitchFamily="34" charset="0"/>
+                </a:rPr>
+                <a:t>priceFinal</a:t>
+              </a:r>
+              <a:r>
+                <a:rPr lang="en-US" sz="1200" dirty="0">
+                  <a:solidFill>
+                    <a:schemeClr val="bg1">
+                      <a:lumMod val="85000"/>
+                    </a:schemeClr>
+                  </a:solidFill>
+                  <a:latin typeface="Open Sans" panose="020B0606030504020204" pitchFamily="34" charset="0"/>
+                  <a:ea typeface="Open Sans" panose="020B0606030504020204" pitchFamily="34" charset="0"/>
+                  <a:cs typeface="Open Sans" panose="020B0606030504020204" pitchFamily="34" charset="0"/>
+                </a:rPr>
+                <a:t> = </a:t>
+              </a:r>
+              <a:r>
+                <a:rPr lang="en-US" sz="1200" dirty="0" err="1">
+                  <a:solidFill>
+                    <a:schemeClr val="bg1">
+                      <a:lumMod val="85000"/>
+                    </a:schemeClr>
+                  </a:solidFill>
+                  <a:latin typeface="Open Sans" panose="020B0606030504020204" pitchFamily="34" charset="0"/>
+                  <a:ea typeface="Open Sans" panose="020B0606030504020204" pitchFamily="34" charset="0"/>
+                  <a:cs typeface="Open Sans" panose="020B0606030504020204" pitchFamily="34" charset="0"/>
+                </a:rPr>
+                <a:t>priceTotal</a:t>
+              </a:r>
+              <a:r>
+                <a:rPr lang="en-US" sz="1200" dirty="0">
+                  <a:solidFill>
+                    <a:schemeClr val="bg1">
+                      <a:lumMod val="85000"/>
+                    </a:schemeClr>
+                  </a:solidFill>
+                  <a:latin typeface="Open Sans" panose="020B0606030504020204" pitchFamily="34" charset="0"/>
+                  <a:ea typeface="Open Sans" panose="020B0606030504020204" pitchFamily="34" charset="0"/>
+                  <a:cs typeface="Open Sans" panose="020B0606030504020204" pitchFamily="34" charset="0"/>
+                </a:rPr>
+                <a:t> + tax + 2 * </a:t>
+              </a:r>
+              <a:r>
+                <a:rPr lang="en-US" sz="1200" dirty="0" err="1">
+                  <a:solidFill>
+                    <a:schemeClr val="bg1">
+                      <a:lumMod val="85000"/>
+                    </a:schemeClr>
+                  </a:solidFill>
+                  <a:latin typeface="Open Sans" panose="020B0606030504020204" pitchFamily="34" charset="0"/>
+                  <a:ea typeface="Open Sans" panose="020B0606030504020204" pitchFamily="34" charset="0"/>
+                  <a:cs typeface="Open Sans" panose="020B0606030504020204" pitchFamily="34" charset="0"/>
+                </a:rPr>
+                <a:t>bookCount</a:t>
+              </a:r>
+              <a:endParaRPr lang="en-US" sz="1200" dirty="0">
+                <a:solidFill>
+                  <a:schemeClr val="bg1">
+                    <a:lumMod val="85000"/>
+                  </a:schemeClr>
+                </a:solidFill>
+                <a:latin typeface="Open Sans" panose="020B0606030504020204" pitchFamily="34" charset="0"/>
+                <a:ea typeface="Open Sans" panose="020B0606030504020204" pitchFamily="34" charset="0"/>
+                <a:cs typeface="Open Sans" panose="020B0606030504020204" pitchFamily="34" charset="0"/>
+              </a:endParaRPr>
+            </a:p>
+          </p:txBody>
+        </p:sp>
+        <p:cxnSp>
+          <p:nvCxnSpPr>
+            <p:cNvPr id="4" name="Straight Arrow Connector 3">
+              <a:extLst>
+                <a:ext uri="{FF2B5EF4-FFF2-40B4-BE49-F238E27FC236}">
+                  <a16:creationId xmlns:a16="http://schemas.microsoft.com/office/drawing/2014/main" id="{84887B67-AE70-4F05-F775-376A6D2F5457}"/>
+                </a:ext>
+              </a:extLst>
+            </p:cNvPr>
+            <p:cNvCxnSpPr>
+              <a:stCxn id="63" idx="5"/>
+              <a:endCxn id="26" idx="2"/>
+            </p:cNvCxnSpPr>
+            <p:nvPr/>
+          </p:nvCxnSpPr>
+          <p:spPr>
+            <a:xfrm>
+              <a:off x="2873186" y="2557671"/>
+              <a:ext cx="732957" cy="0"/>
+            </a:xfrm>
+            <a:prstGeom prst="straightConnector1">
+              <a:avLst/>
+            </a:prstGeom>
+            <a:ln w="12700">
+              <a:solidFill>
+                <a:schemeClr val="accent1">
+                  <a:lumMod val="60000"/>
+                  <a:lumOff val="40000"/>
+                </a:schemeClr>
+              </a:solidFill>
+              <a:tailEnd type="triangle"/>
+            </a:ln>
+          </p:spPr>
+          <p:style>
+            <a:lnRef idx="1">
+              <a:schemeClr val="accent1"/>
+            </a:lnRef>
+            <a:fillRef idx="0">
+              <a:schemeClr val="accent1"/>
+            </a:fillRef>
+            <a:effectRef idx="0">
+              <a:schemeClr val="accent1"/>
+            </a:effectRef>
+            <a:fontRef idx="minor">
+              <a:schemeClr val="tx1"/>
+            </a:fontRef>
+          </p:style>
+        </p:cxnSp>
+        <p:cxnSp>
+          <p:nvCxnSpPr>
+            <p:cNvPr id="6" name="Straight Arrow Connector 5">
+              <a:extLst>
+                <a:ext uri="{FF2B5EF4-FFF2-40B4-BE49-F238E27FC236}">
+                  <a16:creationId xmlns:a16="http://schemas.microsoft.com/office/drawing/2014/main" id="{483C0894-391A-D1E9-D114-3D99FDA38F87}"/>
+                </a:ext>
+              </a:extLst>
+            </p:cNvPr>
+            <p:cNvCxnSpPr>
+              <a:stCxn id="68" idx="2"/>
+              <a:endCxn id="70" idx="0"/>
+            </p:cNvCxnSpPr>
+            <p:nvPr/>
+          </p:nvCxnSpPr>
+          <p:spPr>
+            <a:xfrm>
+              <a:off x="4344081" y="3496533"/>
+              <a:ext cx="0" cy="326449"/>
+            </a:xfrm>
+            <a:prstGeom prst="straightConnector1">
+              <a:avLst/>
+            </a:prstGeom>
+            <a:ln w="12700">
+              <a:solidFill>
+                <a:schemeClr val="bg1">
+                  <a:lumMod val="75000"/>
+                </a:schemeClr>
+              </a:solidFill>
+              <a:tailEnd type="triangle"/>
+            </a:ln>
+          </p:spPr>
+          <p:style>
+            <a:lnRef idx="1">
+              <a:schemeClr val="accent1"/>
+            </a:lnRef>
+            <a:fillRef idx="0">
+              <a:schemeClr val="accent1"/>
+            </a:fillRef>
+            <a:effectRef idx="0">
+              <a:schemeClr val="accent1"/>
+            </a:effectRef>
+            <a:fontRef idx="minor">
+              <a:schemeClr val="tx1"/>
+            </a:fontRef>
+          </p:style>
+        </p:cxnSp>
+        <p:cxnSp>
+          <p:nvCxnSpPr>
+            <p:cNvPr id="8" name="Connector: Elbow 7">
+              <a:extLst>
+                <a:ext uri="{FF2B5EF4-FFF2-40B4-BE49-F238E27FC236}">
+                  <a16:creationId xmlns:a16="http://schemas.microsoft.com/office/drawing/2014/main" id="{ABB3758C-8070-0975-F0A0-8D58A9A255A7}"/>
+                </a:ext>
+              </a:extLst>
+            </p:cNvPr>
+            <p:cNvCxnSpPr>
+              <a:stCxn id="70" idx="3"/>
+              <a:endCxn id="75" idx="4"/>
+            </p:cNvCxnSpPr>
+            <p:nvPr/>
+          </p:nvCxnSpPr>
+          <p:spPr>
+            <a:xfrm flipV="1">
+              <a:off x="5266503" y="2806643"/>
+              <a:ext cx="1286411" cy="1290659"/>
+            </a:xfrm>
+            <a:prstGeom prst="bentConnector2">
+              <a:avLst/>
+            </a:prstGeom>
+            <a:ln w="12700">
+              <a:solidFill>
+                <a:schemeClr val="bg1">
+                  <a:lumMod val="75000"/>
+                </a:schemeClr>
+              </a:solidFill>
+              <a:tailEnd type="triangle"/>
+            </a:ln>
+          </p:spPr>
+          <p:style>
+            <a:lnRef idx="1">
+              <a:schemeClr val="accent1"/>
+            </a:lnRef>
+            <a:fillRef idx="0">
+              <a:schemeClr val="accent1"/>
+            </a:fillRef>
+            <a:effectRef idx="0">
+              <a:schemeClr val="accent1"/>
+            </a:effectRef>
+            <a:fontRef idx="minor">
+              <a:schemeClr val="tx1"/>
+            </a:fontRef>
+          </p:style>
+        </p:cxnSp>
+      </p:grpSp>
+    </p:spTree>
+    <p:extLst>
+      <p:ext uri="{BB962C8B-B14F-4D97-AF65-F5344CB8AC3E}">
+        <p14:creationId xmlns:p14="http://schemas.microsoft.com/office/powerpoint/2010/main" val="3342572528"/>
+      </p:ext>
+    </p:extLst>
+  </p:cSld>
+  <p:clrMapOvr>
+    <a:masterClrMapping/>
+  </p:clrMapOvr>
+</p:sld>
+</file>
+
 <file path=ppt/theme/theme1.xml><?xml version="1.0" encoding="utf-8"?>
 <a:theme xmlns:a="http://schemas.openxmlformats.org/drawingml/2006/main" name="Office Theme">
   <a:themeElements>

</xml_diff>

<commit_message>
Added Another Flowchart for PrePSPM2021_KMM
</commit_message>
<xml_diff>
--- a/Past Year Theory Questions/Resources/resources.pptx
+++ b/Past Year Theory Questions/Resources/resources.pptx
@@ -12,6 +12,7 @@
     <p:sldId id="261" r:id="rId6"/>
     <p:sldId id="262" r:id="rId7"/>
     <p:sldId id="263" r:id="rId8"/>
+    <p:sldId id="264" r:id="rId9"/>
   </p:sldIdLst>
   <p:sldSz cx="12192000" cy="6858000"/>
   <p:notesSz cx="6858000" cy="9144000"/>
@@ -3332,1666 +3333,1645 @@
           <a:chExt cx="0" cy="0"/>
         </a:xfrm>
       </p:grpSpPr>
-      <p:grpSp>
-        <p:nvGrpSpPr>
-          <p:cNvPr id="22" name="Group 21">
+      <p:sp>
+        <p:nvSpPr>
+          <p:cNvPr id="3" name="Rectangle 2">
             <a:extLst>
               <a:ext uri="{FF2B5EF4-FFF2-40B4-BE49-F238E27FC236}">
-                <a16:creationId xmlns:a16="http://schemas.microsoft.com/office/drawing/2014/main" id="{87B95432-9386-120B-AD51-A60D700807AC}"/>
+                <a16:creationId xmlns:a16="http://schemas.microsoft.com/office/drawing/2014/main" id="{7B91276D-045C-4FD2-954B-EB07433662E9}"/>
               </a:ext>
             </a:extLst>
           </p:cNvPr>
-          <p:cNvGrpSpPr/>
+          <p:cNvSpPr/>
           <p:nvPr/>
-        </p:nvGrpSpPr>
-        <p:grpSpPr>
+        </p:nvSpPr>
+        <p:spPr>
           <a:xfrm>
             <a:off x="2594810" y="169092"/>
             <a:ext cx="7002379" cy="6519816"/>
-            <a:chOff x="2594810" y="228600"/>
-            <a:chExt cx="7002379" cy="6519816"/>
           </a:xfrm>
-        </p:grpSpPr>
-        <p:sp>
-          <p:nvSpPr>
-            <p:cNvPr id="3" name="Rectangle 2">
-              <a:extLst>
-                <a:ext uri="{FF2B5EF4-FFF2-40B4-BE49-F238E27FC236}">
-                  <a16:creationId xmlns:a16="http://schemas.microsoft.com/office/drawing/2014/main" id="{7B91276D-045C-4FD2-954B-EB07433662E9}"/>
-                </a:ext>
-              </a:extLst>
-            </p:cNvPr>
-            <p:cNvSpPr/>
-            <p:nvPr/>
-          </p:nvSpPr>
-          <p:spPr>
-            <a:xfrm>
-              <a:off x="2594810" y="228600"/>
-              <a:ext cx="7002379" cy="6519816"/>
-            </a:xfrm>
-            <a:prstGeom prst="rect">
-              <a:avLst/>
-            </a:prstGeom>
+          <a:prstGeom prst="rect">
+            <a:avLst/>
+          </a:prstGeom>
+          <a:solidFill>
+            <a:schemeClr val="tx1">
+              <a:lumMod val="85000"/>
+              <a:lumOff val="15000"/>
+            </a:schemeClr>
+          </a:solidFill>
+          <a:ln>
+            <a:noFill/>
+          </a:ln>
+        </p:spPr>
+        <p:style>
+          <a:lnRef idx="2">
+            <a:schemeClr val="accent1">
+              <a:shade val="50000"/>
+            </a:schemeClr>
+          </a:lnRef>
+          <a:fillRef idx="1">
+            <a:schemeClr val="accent1"/>
+          </a:fillRef>
+          <a:effectRef idx="0">
+            <a:schemeClr val="accent1"/>
+          </a:effectRef>
+          <a:fontRef idx="minor">
+            <a:schemeClr val="lt1"/>
+          </a:fontRef>
+        </p:style>
+        <p:txBody>
+          <a:bodyPr rtlCol="0" anchor="ctr"/>
+          <a:lstStyle/>
+          <a:p>
+            <a:pPr algn="ctr"/>
+            <a:endParaRPr lang="en-US" dirty="0"/>
+          </a:p>
+        </p:txBody>
+      </p:sp>
+      <p:sp>
+        <p:nvSpPr>
+          <p:cNvPr id="2" name="Flowchart: Data 1">
+            <a:extLst>
+              <a:ext uri="{FF2B5EF4-FFF2-40B4-BE49-F238E27FC236}">
+                <a16:creationId xmlns:a16="http://schemas.microsoft.com/office/drawing/2014/main" id="{28F59F68-13F2-4B32-82DB-6EB574B2D1A9}"/>
+              </a:ext>
+            </a:extLst>
+          </p:cNvPr>
+          <p:cNvSpPr/>
+          <p:nvPr/>
+        </p:nvSpPr>
+        <p:spPr>
+          <a:xfrm>
+            <a:off x="2955757" y="1485842"/>
+            <a:ext cx="1844844" cy="489284"/>
+          </a:xfrm>
+          <a:prstGeom prst="flowChartInputOutput">
+            <a:avLst/>
+          </a:prstGeom>
+          <a:noFill/>
+          <a:ln>
             <a:solidFill>
-              <a:schemeClr val="tx1">
-                <a:lumMod val="85000"/>
-                <a:lumOff val="15000"/>
+              <a:schemeClr val="accent1">
+                <a:lumMod val="60000"/>
+                <a:lumOff val="40000"/>
               </a:schemeClr>
             </a:solidFill>
-            <a:ln>
-              <a:noFill/>
-            </a:ln>
-          </p:spPr>
-          <p:style>
-            <a:lnRef idx="2">
+          </a:ln>
+        </p:spPr>
+        <p:style>
+          <a:lnRef idx="2">
+            <a:schemeClr val="accent1">
+              <a:shade val="50000"/>
+            </a:schemeClr>
+          </a:lnRef>
+          <a:fillRef idx="1">
+            <a:schemeClr val="accent1"/>
+          </a:fillRef>
+          <a:effectRef idx="0">
+            <a:schemeClr val="accent1"/>
+          </a:effectRef>
+          <a:fontRef idx="minor">
+            <a:schemeClr val="lt1"/>
+          </a:fontRef>
+        </p:style>
+        <p:txBody>
+          <a:bodyPr rtlCol="0" anchor="ctr"/>
+          <a:lstStyle/>
+          <a:p>
+            <a:pPr algn="ctr"/>
+            <a:r>
+              <a:rPr lang="en-US" sz="1200" dirty="0">
+                <a:solidFill>
+                  <a:schemeClr val="bg1">
+                    <a:lumMod val="85000"/>
+                  </a:schemeClr>
+                </a:solidFill>
+                <a:latin typeface="Open Sans" panose="020B0606030504020204" pitchFamily="34" charset="0"/>
+                <a:ea typeface="Open Sans" panose="020B0606030504020204" pitchFamily="34" charset="0"/>
+                <a:cs typeface="Open Sans" panose="020B0606030504020204" pitchFamily="34" charset="0"/>
+              </a:rPr>
+              <a:t>Read hour</a:t>
+            </a:r>
+          </a:p>
+        </p:txBody>
+      </p:sp>
+      <p:sp>
+        <p:nvSpPr>
+          <p:cNvPr id="4" name="Flowchart: Decision 3">
+            <a:extLst>
+              <a:ext uri="{FF2B5EF4-FFF2-40B4-BE49-F238E27FC236}">
+                <a16:creationId xmlns:a16="http://schemas.microsoft.com/office/drawing/2014/main" id="{1B56FC5E-4065-4A70-BFA0-754CEBDBDF32}"/>
+              </a:ext>
+            </a:extLst>
+          </p:cNvPr>
+          <p:cNvSpPr/>
+          <p:nvPr/>
+        </p:nvSpPr>
+        <p:spPr>
+          <a:xfrm>
+            <a:off x="2955757" y="2271906"/>
+            <a:ext cx="1844844" cy="946484"/>
+          </a:xfrm>
+          <a:prstGeom prst="flowChartDecision">
+            <a:avLst/>
+          </a:prstGeom>
+          <a:noFill/>
+          <a:ln>
+            <a:solidFill>
+              <a:srgbClr val="FF7C80"/>
+            </a:solidFill>
+          </a:ln>
+        </p:spPr>
+        <p:style>
+          <a:lnRef idx="2">
+            <a:schemeClr val="accent1">
+              <a:shade val="50000"/>
+            </a:schemeClr>
+          </a:lnRef>
+          <a:fillRef idx="1">
+            <a:schemeClr val="accent1"/>
+          </a:fillRef>
+          <a:effectRef idx="0">
+            <a:schemeClr val="accent1"/>
+          </a:effectRef>
+          <a:fontRef idx="minor">
+            <a:schemeClr val="lt1"/>
+          </a:fontRef>
+        </p:style>
+        <p:txBody>
+          <a:bodyPr rtlCol="0" anchor="ctr"/>
+          <a:lstStyle/>
+          <a:p>
+            <a:pPr algn="ctr"/>
+            <a:r>
+              <a:rPr lang="en-US" sz="1200" dirty="0">
+                <a:solidFill>
+                  <a:schemeClr val="bg1">
+                    <a:lumMod val="85000"/>
+                  </a:schemeClr>
+                </a:solidFill>
+                <a:latin typeface="Open Sans" panose="020B0606030504020204" pitchFamily="34" charset="0"/>
+                <a:ea typeface="Open Sans" panose="020B0606030504020204" pitchFamily="34" charset="0"/>
+                <a:cs typeface="Open Sans" panose="020B0606030504020204" pitchFamily="34" charset="0"/>
+              </a:rPr>
+              <a:t>hour &gt; 7</a:t>
+            </a:r>
+          </a:p>
+        </p:txBody>
+      </p:sp>
+      <p:sp>
+        <p:nvSpPr>
+          <p:cNvPr id="7" name="Flowchart: Decision 6">
+            <a:extLst>
+              <a:ext uri="{FF2B5EF4-FFF2-40B4-BE49-F238E27FC236}">
+                <a16:creationId xmlns:a16="http://schemas.microsoft.com/office/drawing/2014/main" id="{1AE8724F-01CD-48A2-A4D7-888DE810E9C4}"/>
+              </a:ext>
+            </a:extLst>
+          </p:cNvPr>
+          <p:cNvSpPr/>
+          <p:nvPr/>
+        </p:nvSpPr>
+        <p:spPr>
+          <a:xfrm>
+            <a:off x="2955757" y="3515170"/>
+            <a:ext cx="1844844" cy="946484"/>
+          </a:xfrm>
+          <a:prstGeom prst="flowChartDecision">
+            <a:avLst/>
+          </a:prstGeom>
+          <a:noFill/>
+          <a:ln>
+            <a:solidFill>
+              <a:srgbClr val="FF7C80"/>
+            </a:solidFill>
+          </a:ln>
+        </p:spPr>
+        <p:style>
+          <a:lnRef idx="2">
+            <a:schemeClr val="accent1">
+              <a:shade val="50000"/>
+            </a:schemeClr>
+          </a:lnRef>
+          <a:fillRef idx="1">
+            <a:schemeClr val="accent1"/>
+          </a:fillRef>
+          <a:effectRef idx="0">
+            <a:schemeClr val="accent1"/>
+          </a:effectRef>
+          <a:fontRef idx="minor">
+            <a:schemeClr val="lt1"/>
+          </a:fontRef>
+        </p:style>
+        <p:txBody>
+          <a:bodyPr rtlCol="0" anchor="ctr"/>
+          <a:lstStyle/>
+          <a:p>
+            <a:pPr algn="ctr"/>
+            <a:r>
+              <a:rPr lang="en-US" sz="1200" dirty="0">
+                <a:solidFill>
+                  <a:schemeClr val="bg1">
+                    <a:lumMod val="85000"/>
+                  </a:schemeClr>
+                </a:solidFill>
+                <a:latin typeface="Open Sans" panose="020B0606030504020204" pitchFamily="34" charset="0"/>
+                <a:ea typeface="Open Sans" panose="020B0606030504020204" pitchFamily="34" charset="0"/>
+                <a:cs typeface="Open Sans" panose="020B0606030504020204" pitchFamily="34" charset="0"/>
+              </a:rPr>
+              <a:t>hour &gt; 5</a:t>
+            </a:r>
+          </a:p>
+        </p:txBody>
+      </p:sp>
+      <p:sp>
+        <p:nvSpPr>
+          <p:cNvPr id="8" name="Flowchart: Decision 7">
+            <a:extLst>
+              <a:ext uri="{FF2B5EF4-FFF2-40B4-BE49-F238E27FC236}">
+                <a16:creationId xmlns:a16="http://schemas.microsoft.com/office/drawing/2014/main" id="{BE14D555-F1F8-437B-99EF-3DC9B8DEAF5A}"/>
+              </a:ext>
+            </a:extLst>
+          </p:cNvPr>
+          <p:cNvSpPr/>
+          <p:nvPr/>
+        </p:nvSpPr>
+        <p:spPr>
+          <a:xfrm>
+            <a:off x="2955757" y="4758434"/>
+            <a:ext cx="1844844" cy="946484"/>
+          </a:xfrm>
+          <a:prstGeom prst="flowChartDecision">
+            <a:avLst/>
+          </a:prstGeom>
+          <a:noFill/>
+          <a:ln>
+            <a:solidFill>
+              <a:srgbClr val="FF7C80"/>
+            </a:solidFill>
+          </a:ln>
+        </p:spPr>
+        <p:style>
+          <a:lnRef idx="2">
+            <a:schemeClr val="accent1">
+              <a:shade val="50000"/>
+            </a:schemeClr>
+          </a:lnRef>
+          <a:fillRef idx="1">
+            <a:schemeClr val="accent1"/>
+          </a:fillRef>
+          <a:effectRef idx="0">
+            <a:schemeClr val="accent1"/>
+          </a:effectRef>
+          <a:fontRef idx="minor">
+            <a:schemeClr val="lt1"/>
+          </a:fontRef>
+        </p:style>
+        <p:txBody>
+          <a:bodyPr rtlCol="0" anchor="ctr"/>
+          <a:lstStyle/>
+          <a:p>
+            <a:pPr algn="ctr"/>
+            <a:r>
+              <a:rPr lang="en-US" sz="1200" dirty="0">
+                <a:solidFill>
+                  <a:schemeClr val="bg1">
+                    <a:lumMod val="85000"/>
+                  </a:schemeClr>
+                </a:solidFill>
+                <a:latin typeface="Open Sans" panose="020B0606030504020204" pitchFamily="34" charset="0"/>
+                <a:ea typeface="Open Sans" panose="020B0606030504020204" pitchFamily="34" charset="0"/>
+                <a:cs typeface="Open Sans" panose="020B0606030504020204" pitchFamily="34" charset="0"/>
+              </a:rPr>
+              <a:t>hour &gt; 3</a:t>
+            </a:r>
+          </a:p>
+        </p:txBody>
+      </p:sp>
+      <p:cxnSp>
+        <p:nvCxnSpPr>
+          <p:cNvPr id="10" name="Straight Arrow Connector 9">
+            <a:extLst>
+              <a:ext uri="{FF2B5EF4-FFF2-40B4-BE49-F238E27FC236}">
+                <a16:creationId xmlns:a16="http://schemas.microsoft.com/office/drawing/2014/main" id="{3C71FA0F-D010-4470-A4DA-37400D7EA02F}"/>
+              </a:ext>
+            </a:extLst>
+          </p:cNvPr>
+          <p:cNvCxnSpPr>
+            <a:stCxn id="2" idx="4"/>
+            <a:endCxn id="4" idx="0"/>
+          </p:cNvCxnSpPr>
+          <p:nvPr/>
+        </p:nvCxnSpPr>
+        <p:spPr>
+          <a:xfrm>
+            <a:off x="3878179" y="1975126"/>
+            <a:ext cx="0" cy="296780"/>
+          </a:xfrm>
+          <a:prstGeom prst="straightConnector1">
+            <a:avLst/>
+          </a:prstGeom>
+          <a:ln w="12700">
+            <a:solidFill>
               <a:schemeClr val="accent1">
-                <a:shade val="50000"/>
+                <a:lumMod val="60000"/>
+                <a:lumOff val="40000"/>
               </a:schemeClr>
-            </a:lnRef>
-            <a:fillRef idx="1">
-              <a:schemeClr val="accent1"/>
-            </a:fillRef>
-            <a:effectRef idx="0">
-              <a:schemeClr val="accent1"/>
-            </a:effectRef>
-            <a:fontRef idx="minor">
-              <a:schemeClr val="lt1"/>
-            </a:fontRef>
-          </p:style>
-          <p:txBody>
-            <a:bodyPr rtlCol="0" anchor="ctr"/>
-            <a:lstStyle/>
-            <a:p>
-              <a:pPr algn="ctr"/>
-              <a:endParaRPr lang="en-US" dirty="0"/>
-            </a:p>
-          </p:txBody>
-        </p:sp>
-        <p:sp>
-          <p:nvSpPr>
-            <p:cNvPr id="2" name="Flowchart: Data 1">
-              <a:extLst>
-                <a:ext uri="{FF2B5EF4-FFF2-40B4-BE49-F238E27FC236}">
-                  <a16:creationId xmlns:a16="http://schemas.microsoft.com/office/drawing/2014/main" id="{28F59F68-13F2-4B32-82DB-6EB574B2D1A9}"/>
-                </a:ext>
-              </a:extLst>
-            </p:cNvPr>
-            <p:cNvSpPr/>
-            <p:nvPr/>
-          </p:nvSpPr>
-          <p:spPr>
-            <a:xfrm>
-              <a:off x="2955757" y="1545350"/>
-              <a:ext cx="1844844" cy="489284"/>
-            </a:xfrm>
-            <a:prstGeom prst="flowChartInputOutput">
-              <a:avLst/>
-            </a:prstGeom>
-            <a:noFill/>
-            <a:ln>
-              <a:solidFill>
-                <a:schemeClr val="accent1">
-                  <a:lumMod val="60000"/>
-                  <a:lumOff val="40000"/>
-                </a:schemeClr>
-              </a:solidFill>
-            </a:ln>
-          </p:spPr>
-          <p:style>
-            <a:lnRef idx="2">
-              <a:schemeClr val="accent1">
-                <a:shade val="50000"/>
+            </a:solidFill>
+            <a:tailEnd type="triangle"/>
+          </a:ln>
+        </p:spPr>
+        <p:style>
+          <a:lnRef idx="1">
+            <a:schemeClr val="accent1"/>
+          </a:lnRef>
+          <a:fillRef idx="0">
+            <a:schemeClr val="accent1"/>
+          </a:fillRef>
+          <a:effectRef idx="0">
+            <a:schemeClr val="accent1"/>
+          </a:effectRef>
+          <a:fontRef idx="minor">
+            <a:schemeClr val="tx1"/>
+          </a:fontRef>
+        </p:style>
+      </p:cxnSp>
+      <p:sp>
+        <p:nvSpPr>
+          <p:cNvPr id="11" name="Rectangle 10">
+            <a:extLst>
+              <a:ext uri="{FF2B5EF4-FFF2-40B4-BE49-F238E27FC236}">
+                <a16:creationId xmlns:a16="http://schemas.microsoft.com/office/drawing/2014/main" id="{948C2A8F-0239-4D44-9E68-CA7453A5CA77}"/>
+              </a:ext>
+            </a:extLst>
+          </p:cNvPr>
+          <p:cNvSpPr/>
+          <p:nvPr/>
+        </p:nvSpPr>
+        <p:spPr>
+          <a:xfrm>
+            <a:off x="5177587" y="2548632"/>
+            <a:ext cx="1844844" cy="393032"/>
+          </a:xfrm>
+          <a:prstGeom prst="rect">
+            <a:avLst/>
+          </a:prstGeom>
+          <a:noFill/>
+          <a:ln>
+            <a:solidFill>
+              <a:schemeClr val="accent6">
+                <a:lumMod val="60000"/>
+                <a:lumOff val="40000"/>
               </a:schemeClr>
-            </a:lnRef>
-            <a:fillRef idx="1">
-              <a:schemeClr val="accent1"/>
-            </a:fillRef>
-            <a:effectRef idx="0">
-              <a:schemeClr val="accent1"/>
-            </a:effectRef>
-            <a:fontRef idx="minor">
-              <a:schemeClr val="lt1"/>
-            </a:fontRef>
-          </p:style>
-          <p:txBody>
-            <a:bodyPr rtlCol="0" anchor="ctr"/>
-            <a:lstStyle/>
-            <a:p>
-              <a:pPr algn="ctr"/>
-              <a:r>
-                <a:rPr lang="en-US" sz="1200" dirty="0">
-                  <a:solidFill>
-                    <a:schemeClr val="bg1">
-                      <a:lumMod val="85000"/>
-                    </a:schemeClr>
-                  </a:solidFill>
-                  <a:latin typeface="Open Sans" panose="020B0606030504020204" pitchFamily="34" charset="0"/>
-                  <a:ea typeface="Open Sans" panose="020B0606030504020204" pitchFamily="34" charset="0"/>
-                  <a:cs typeface="Open Sans" panose="020B0606030504020204" pitchFamily="34" charset="0"/>
-                </a:rPr>
-                <a:t>Read hour</a:t>
-              </a:r>
-            </a:p>
-          </p:txBody>
-        </p:sp>
-        <p:sp>
-          <p:nvSpPr>
-            <p:cNvPr id="4" name="Flowchart: Decision 3">
-              <a:extLst>
-                <a:ext uri="{FF2B5EF4-FFF2-40B4-BE49-F238E27FC236}">
-                  <a16:creationId xmlns:a16="http://schemas.microsoft.com/office/drawing/2014/main" id="{1B56FC5E-4065-4A70-BFA0-754CEBDBDF32}"/>
-                </a:ext>
-              </a:extLst>
-            </p:cNvPr>
-            <p:cNvSpPr/>
-            <p:nvPr/>
-          </p:nvSpPr>
-          <p:spPr>
-            <a:xfrm>
-              <a:off x="2955757" y="2331414"/>
-              <a:ext cx="1844844" cy="946484"/>
-            </a:xfrm>
-            <a:prstGeom prst="flowChartDecision">
-              <a:avLst/>
-            </a:prstGeom>
-            <a:noFill/>
-            <a:ln>
-              <a:solidFill>
-                <a:srgbClr val="FF7C80"/>
-              </a:solidFill>
-            </a:ln>
-          </p:spPr>
-          <p:style>
-            <a:lnRef idx="2">
-              <a:schemeClr val="accent1">
-                <a:shade val="50000"/>
+            </a:solidFill>
+          </a:ln>
+        </p:spPr>
+        <p:style>
+          <a:lnRef idx="2">
+            <a:schemeClr val="accent1">
+              <a:shade val="50000"/>
+            </a:schemeClr>
+          </a:lnRef>
+          <a:fillRef idx="1">
+            <a:schemeClr val="accent1"/>
+          </a:fillRef>
+          <a:effectRef idx="0">
+            <a:schemeClr val="accent1"/>
+          </a:effectRef>
+          <a:fontRef idx="minor">
+            <a:schemeClr val="lt1"/>
+          </a:fontRef>
+        </p:style>
+        <p:txBody>
+          <a:bodyPr rtlCol="0" anchor="ctr"/>
+          <a:lstStyle/>
+          <a:p>
+            <a:pPr algn="ctr"/>
+            <a:r>
+              <a:rPr lang="en-US" sz="1200" dirty="0">
+                <a:solidFill>
+                  <a:schemeClr val="bg1">
+                    <a:lumMod val="85000"/>
+                  </a:schemeClr>
+                </a:solidFill>
+                <a:latin typeface="Open Sans" panose="020B0606030504020204" pitchFamily="34" charset="0"/>
+                <a:ea typeface="Open Sans" panose="020B0606030504020204" pitchFamily="34" charset="0"/>
+                <a:cs typeface="Open Sans" panose="020B0606030504020204" pitchFamily="34" charset="0"/>
+              </a:rPr>
+              <a:t>Fee = 25.00</a:t>
+            </a:r>
+          </a:p>
+        </p:txBody>
+      </p:sp>
+      <p:sp>
+        <p:nvSpPr>
+          <p:cNvPr id="12" name="Rectangle 11">
+            <a:extLst>
+              <a:ext uri="{FF2B5EF4-FFF2-40B4-BE49-F238E27FC236}">
+                <a16:creationId xmlns:a16="http://schemas.microsoft.com/office/drawing/2014/main" id="{59E60FBA-E7D1-474B-9288-DE527C1FC37C}"/>
+              </a:ext>
+            </a:extLst>
+          </p:cNvPr>
+          <p:cNvSpPr/>
+          <p:nvPr/>
+        </p:nvSpPr>
+        <p:spPr>
+          <a:xfrm>
+            <a:off x="5177587" y="3713690"/>
+            <a:ext cx="1844844" cy="549443"/>
+          </a:xfrm>
+          <a:prstGeom prst="rect">
+            <a:avLst/>
+          </a:prstGeom>
+          <a:noFill/>
+          <a:ln>
+            <a:solidFill>
+              <a:schemeClr val="accent6">
+                <a:lumMod val="60000"/>
+                <a:lumOff val="40000"/>
               </a:schemeClr>
-            </a:lnRef>
-            <a:fillRef idx="1">
-              <a:schemeClr val="accent1"/>
-            </a:fillRef>
-            <a:effectRef idx="0">
-              <a:schemeClr val="accent1"/>
-            </a:effectRef>
-            <a:fontRef idx="minor">
-              <a:schemeClr val="lt1"/>
-            </a:fontRef>
-          </p:style>
-          <p:txBody>
-            <a:bodyPr rtlCol="0" anchor="ctr"/>
-            <a:lstStyle/>
-            <a:p>
-              <a:pPr algn="ctr"/>
-              <a:r>
-                <a:rPr lang="en-US" sz="1200" dirty="0">
-                  <a:solidFill>
-                    <a:schemeClr val="bg1">
-                      <a:lumMod val="85000"/>
-                    </a:schemeClr>
-                  </a:solidFill>
-                  <a:latin typeface="Open Sans" panose="020B0606030504020204" pitchFamily="34" charset="0"/>
-                  <a:ea typeface="Open Sans" panose="020B0606030504020204" pitchFamily="34" charset="0"/>
-                  <a:cs typeface="Open Sans" panose="020B0606030504020204" pitchFamily="34" charset="0"/>
-                </a:rPr>
-                <a:t>hour &gt; 7</a:t>
-              </a:r>
-            </a:p>
-          </p:txBody>
-        </p:sp>
-        <p:sp>
-          <p:nvSpPr>
-            <p:cNvPr id="7" name="Flowchart: Decision 6">
-              <a:extLst>
-                <a:ext uri="{FF2B5EF4-FFF2-40B4-BE49-F238E27FC236}">
-                  <a16:creationId xmlns:a16="http://schemas.microsoft.com/office/drawing/2014/main" id="{1AE8724F-01CD-48A2-A4D7-888DE810E9C4}"/>
-                </a:ext>
-              </a:extLst>
-            </p:cNvPr>
-            <p:cNvSpPr/>
-            <p:nvPr/>
-          </p:nvSpPr>
-          <p:spPr>
-            <a:xfrm>
-              <a:off x="2955757" y="3574678"/>
-              <a:ext cx="1844844" cy="946484"/>
-            </a:xfrm>
-            <a:prstGeom prst="flowChartDecision">
-              <a:avLst/>
-            </a:prstGeom>
-            <a:noFill/>
-            <a:ln>
-              <a:solidFill>
-                <a:srgbClr val="FF7C80"/>
-              </a:solidFill>
-            </a:ln>
-          </p:spPr>
-          <p:style>
-            <a:lnRef idx="2">
-              <a:schemeClr val="accent1">
-                <a:shade val="50000"/>
+            </a:solidFill>
+          </a:ln>
+        </p:spPr>
+        <p:style>
+          <a:lnRef idx="2">
+            <a:schemeClr val="accent1">
+              <a:shade val="50000"/>
+            </a:schemeClr>
+          </a:lnRef>
+          <a:fillRef idx="1">
+            <a:schemeClr val="accent1"/>
+          </a:fillRef>
+          <a:effectRef idx="0">
+            <a:schemeClr val="accent1"/>
+          </a:effectRef>
+          <a:fontRef idx="minor">
+            <a:schemeClr val="lt1"/>
+          </a:fontRef>
+        </p:style>
+        <p:txBody>
+          <a:bodyPr rtlCol="0" anchor="ctr"/>
+          <a:lstStyle/>
+          <a:p>
+            <a:pPr algn="ctr"/>
+            <a:r>
+              <a:rPr lang="en-US" sz="1200" dirty="0">
+                <a:solidFill>
+                  <a:schemeClr val="bg1">
+                    <a:lumMod val="85000"/>
+                  </a:schemeClr>
+                </a:solidFill>
+                <a:latin typeface="Open Sans" panose="020B0606030504020204" pitchFamily="34" charset="0"/>
+                <a:ea typeface="Open Sans" panose="020B0606030504020204" pitchFamily="34" charset="0"/>
+                <a:cs typeface="Open Sans" panose="020B0606030504020204" pitchFamily="34" charset="0"/>
+              </a:rPr>
+              <a:t>Fee = 4.00*3 + 3.00*2 </a:t>
+            </a:r>
+          </a:p>
+          <a:p>
+            <a:pPr algn="ctr"/>
+            <a:r>
+              <a:rPr lang="en-US" sz="1200" dirty="0">
+                <a:solidFill>
+                  <a:schemeClr val="bg1">
+                    <a:lumMod val="85000"/>
+                  </a:schemeClr>
+                </a:solidFill>
+                <a:latin typeface="Open Sans" panose="020B0606030504020204" pitchFamily="34" charset="0"/>
+                <a:ea typeface="Open Sans" panose="020B0606030504020204" pitchFamily="34" charset="0"/>
+                <a:cs typeface="Open Sans" panose="020B0606030504020204" pitchFamily="34" charset="0"/>
+              </a:rPr>
+              <a:t>+ 2.50*(hour – 5)</a:t>
+            </a:r>
+          </a:p>
+        </p:txBody>
+      </p:sp>
+      <p:sp>
+        <p:nvSpPr>
+          <p:cNvPr id="13" name="Rectangle 12">
+            <a:extLst>
+              <a:ext uri="{FF2B5EF4-FFF2-40B4-BE49-F238E27FC236}">
+                <a16:creationId xmlns:a16="http://schemas.microsoft.com/office/drawing/2014/main" id="{1A7BACE9-4D58-4158-9C2E-F6E74C3A2A51}"/>
+              </a:ext>
+            </a:extLst>
+          </p:cNvPr>
+          <p:cNvSpPr/>
+          <p:nvPr/>
+        </p:nvSpPr>
+        <p:spPr>
+          <a:xfrm>
+            <a:off x="5177587" y="4960764"/>
+            <a:ext cx="1844844" cy="548640"/>
+          </a:xfrm>
+          <a:prstGeom prst="rect">
+            <a:avLst/>
+          </a:prstGeom>
+          <a:noFill/>
+          <a:ln>
+            <a:solidFill>
+              <a:schemeClr val="accent6">
+                <a:lumMod val="60000"/>
+                <a:lumOff val="40000"/>
               </a:schemeClr>
-            </a:lnRef>
-            <a:fillRef idx="1">
-              <a:schemeClr val="accent1"/>
-            </a:fillRef>
-            <a:effectRef idx="0">
-              <a:schemeClr val="accent1"/>
-            </a:effectRef>
-            <a:fontRef idx="minor">
-              <a:schemeClr val="lt1"/>
-            </a:fontRef>
-          </p:style>
-          <p:txBody>
-            <a:bodyPr rtlCol="0" anchor="ctr"/>
-            <a:lstStyle/>
-            <a:p>
-              <a:pPr algn="ctr"/>
-              <a:r>
-                <a:rPr lang="en-US" sz="1200" dirty="0">
-                  <a:solidFill>
-                    <a:schemeClr val="bg1">
-                      <a:lumMod val="85000"/>
-                    </a:schemeClr>
-                  </a:solidFill>
-                  <a:latin typeface="Open Sans" panose="020B0606030504020204" pitchFamily="34" charset="0"/>
-                  <a:ea typeface="Open Sans" panose="020B0606030504020204" pitchFamily="34" charset="0"/>
-                  <a:cs typeface="Open Sans" panose="020B0606030504020204" pitchFamily="34" charset="0"/>
-                </a:rPr>
-                <a:t>hour &gt; 5</a:t>
-              </a:r>
-            </a:p>
-          </p:txBody>
-        </p:sp>
-        <p:sp>
-          <p:nvSpPr>
-            <p:cNvPr id="8" name="Flowchart: Decision 7">
-              <a:extLst>
-                <a:ext uri="{FF2B5EF4-FFF2-40B4-BE49-F238E27FC236}">
-                  <a16:creationId xmlns:a16="http://schemas.microsoft.com/office/drawing/2014/main" id="{BE14D555-F1F8-437B-99EF-3DC9B8DEAF5A}"/>
-                </a:ext>
-              </a:extLst>
-            </p:cNvPr>
-            <p:cNvSpPr/>
-            <p:nvPr/>
-          </p:nvSpPr>
-          <p:spPr>
-            <a:xfrm>
-              <a:off x="2955757" y="4817942"/>
-              <a:ext cx="1844844" cy="946484"/>
-            </a:xfrm>
-            <a:prstGeom prst="flowChartDecision">
-              <a:avLst/>
-            </a:prstGeom>
-            <a:noFill/>
-            <a:ln>
-              <a:solidFill>
-                <a:srgbClr val="FF7C80"/>
-              </a:solidFill>
-            </a:ln>
-          </p:spPr>
-          <p:style>
-            <a:lnRef idx="2">
-              <a:schemeClr val="accent1">
-                <a:shade val="50000"/>
+            </a:solidFill>
+          </a:ln>
+        </p:spPr>
+        <p:style>
+          <a:lnRef idx="2">
+            <a:schemeClr val="accent1">
+              <a:shade val="50000"/>
+            </a:schemeClr>
+          </a:lnRef>
+          <a:fillRef idx="1">
+            <a:schemeClr val="accent1"/>
+          </a:fillRef>
+          <a:effectRef idx="0">
+            <a:schemeClr val="accent1"/>
+          </a:effectRef>
+          <a:fontRef idx="minor">
+            <a:schemeClr val="lt1"/>
+          </a:fontRef>
+        </p:style>
+        <p:txBody>
+          <a:bodyPr rtlCol="0" anchor="ctr"/>
+          <a:lstStyle/>
+          <a:p>
+            <a:pPr algn="ctr"/>
+            <a:r>
+              <a:rPr lang="en-US" sz="1200" dirty="0">
+                <a:solidFill>
+                  <a:schemeClr val="bg1">
+                    <a:lumMod val="85000"/>
+                  </a:schemeClr>
+                </a:solidFill>
+                <a:latin typeface="Open Sans" panose="020B0606030504020204" pitchFamily="34" charset="0"/>
+                <a:ea typeface="Open Sans" panose="020B0606030504020204" pitchFamily="34" charset="0"/>
+                <a:cs typeface="Open Sans" panose="020B0606030504020204" pitchFamily="34" charset="0"/>
+              </a:rPr>
+              <a:t>Fee = 4.00*3 </a:t>
+            </a:r>
+          </a:p>
+          <a:p>
+            <a:pPr algn="ctr"/>
+            <a:r>
+              <a:rPr lang="en-US" sz="1200" dirty="0">
+                <a:solidFill>
+                  <a:schemeClr val="bg1">
+                    <a:lumMod val="85000"/>
+                  </a:schemeClr>
+                </a:solidFill>
+                <a:latin typeface="Open Sans" panose="020B0606030504020204" pitchFamily="34" charset="0"/>
+                <a:ea typeface="Open Sans" panose="020B0606030504020204" pitchFamily="34" charset="0"/>
+                <a:cs typeface="Open Sans" panose="020B0606030504020204" pitchFamily="34" charset="0"/>
+              </a:rPr>
+              <a:t>– 3.00*(hour – 3)</a:t>
+            </a:r>
+          </a:p>
+        </p:txBody>
+      </p:sp>
+      <p:cxnSp>
+        <p:nvCxnSpPr>
+          <p:cNvPr id="14" name="Straight Arrow Connector 13">
+            <a:extLst>
+              <a:ext uri="{FF2B5EF4-FFF2-40B4-BE49-F238E27FC236}">
+                <a16:creationId xmlns:a16="http://schemas.microsoft.com/office/drawing/2014/main" id="{6E956648-8245-4E91-969E-DA818A0EE312}"/>
+              </a:ext>
+            </a:extLst>
+          </p:cNvPr>
+          <p:cNvCxnSpPr/>
+          <p:nvPr/>
+        </p:nvCxnSpPr>
+        <p:spPr>
+          <a:xfrm>
+            <a:off x="3878179" y="3218390"/>
+            <a:ext cx="0" cy="296780"/>
+          </a:xfrm>
+          <a:prstGeom prst="straightConnector1">
+            <a:avLst/>
+          </a:prstGeom>
+          <a:ln w="12700">
+            <a:solidFill>
+              <a:srgbClr val="FF7C80"/>
+            </a:solidFill>
+            <a:tailEnd type="triangle"/>
+          </a:ln>
+        </p:spPr>
+        <p:style>
+          <a:lnRef idx="1">
+            <a:schemeClr val="accent1"/>
+          </a:lnRef>
+          <a:fillRef idx="0">
+            <a:schemeClr val="accent1"/>
+          </a:fillRef>
+          <a:effectRef idx="0">
+            <a:schemeClr val="accent1"/>
+          </a:effectRef>
+          <a:fontRef idx="minor">
+            <a:schemeClr val="tx1"/>
+          </a:fontRef>
+        </p:style>
+      </p:cxnSp>
+      <p:cxnSp>
+        <p:nvCxnSpPr>
+          <p:cNvPr id="15" name="Straight Arrow Connector 14">
+            <a:extLst>
+              <a:ext uri="{FF2B5EF4-FFF2-40B4-BE49-F238E27FC236}">
+                <a16:creationId xmlns:a16="http://schemas.microsoft.com/office/drawing/2014/main" id="{3721F831-D501-454D-81EE-0C02699D1E2A}"/>
+              </a:ext>
+            </a:extLst>
+          </p:cNvPr>
+          <p:cNvCxnSpPr/>
+          <p:nvPr/>
+        </p:nvCxnSpPr>
+        <p:spPr>
+          <a:xfrm>
+            <a:off x="3878179" y="4461654"/>
+            <a:ext cx="0" cy="296780"/>
+          </a:xfrm>
+          <a:prstGeom prst="straightConnector1">
+            <a:avLst/>
+          </a:prstGeom>
+          <a:ln w="12700">
+            <a:solidFill>
+              <a:srgbClr val="FF7C80"/>
+            </a:solidFill>
+            <a:tailEnd type="triangle"/>
+          </a:ln>
+        </p:spPr>
+        <p:style>
+          <a:lnRef idx="1">
+            <a:schemeClr val="accent1"/>
+          </a:lnRef>
+          <a:fillRef idx="0">
+            <a:schemeClr val="accent1"/>
+          </a:fillRef>
+          <a:effectRef idx="0">
+            <a:schemeClr val="accent1"/>
+          </a:effectRef>
+          <a:fontRef idx="minor">
+            <a:schemeClr val="tx1"/>
+          </a:fontRef>
+        </p:style>
+      </p:cxnSp>
+      <p:cxnSp>
+        <p:nvCxnSpPr>
+          <p:cNvPr id="19" name="Straight Arrow Connector 18">
+            <a:extLst>
+              <a:ext uri="{FF2B5EF4-FFF2-40B4-BE49-F238E27FC236}">
+                <a16:creationId xmlns:a16="http://schemas.microsoft.com/office/drawing/2014/main" id="{3B5CE5DB-7A65-4FDD-B4F3-0AAB62E0E486}"/>
+              </a:ext>
+            </a:extLst>
+          </p:cNvPr>
+          <p:cNvCxnSpPr>
+            <a:stCxn id="4" idx="3"/>
+            <a:endCxn id="11" idx="1"/>
+          </p:cNvCxnSpPr>
+          <p:nvPr/>
+        </p:nvCxnSpPr>
+        <p:spPr>
+          <a:xfrm>
+            <a:off x="4800601" y="2745148"/>
+            <a:ext cx="376986" cy="0"/>
+          </a:xfrm>
+          <a:prstGeom prst="straightConnector1">
+            <a:avLst/>
+          </a:prstGeom>
+          <a:ln w="12700">
+            <a:solidFill>
+              <a:srgbClr val="FF7C80"/>
+            </a:solidFill>
+            <a:tailEnd type="triangle"/>
+          </a:ln>
+        </p:spPr>
+        <p:style>
+          <a:lnRef idx="1">
+            <a:schemeClr val="accent1"/>
+          </a:lnRef>
+          <a:fillRef idx="0">
+            <a:schemeClr val="accent1"/>
+          </a:fillRef>
+          <a:effectRef idx="0">
+            <a:schemeClr val="accent1"/>
+          </a:effectRef>
+          <a:fontRef idx="minor">
+            <a:schemeClr val="tx1"/>
+          </a:fontRef>
+        </p:style>
+      </p:cxnSp>
+      <p:cxnSp>
+        <p:nvCxnSpPr>
+          <p:cNvPr id="20" name="Straight Arrow Connector 19">
+            <a:extLst>
+              <a:ext uri="{FF2B5EF4-FFF2-40B4-BE49-F238E27FC236}">
+                <a16:creationId xmlns:a16="http://schemas.microsoft.com/office/drawing/2014/main" id="{844786FB-3790-4EB5-B3D7-F42BA9824AC0}"/>
+              </a:ext>
+            </a:extLst>
+          </p:cNvPr>
+          <p:cNvCxnSpPr/>
+          <p:nvPr/>
+        </p:nvCxnSpPr>
+        <p:spPr>
+          <a:xfrm>
+            <a:off x="4800601" y="3988411"/>
+            <a:ext cx="376986" cy="0"/>
+          </a:xfrm>
+          <a:prstGeom prst="straightConnector1">
+            <a:avLst/>
+          </a:prstGeom>
+          <a:ln w="12700">
+            <a:solidFill>
+              <a:srgbClr val="FF7C80"/>
+            </a:solidFill>
+            <a:tailEnd type="triangle"/>
+          </a:ln>
+        </p:spPr>
+        <p:style>
+          <a:lnRef idx="1">
+            <a:schemeClr val="accent1"/>
+          </a:lnRef>
+          <a:fillRef idx="0">
+            <a:schemeClr val="accent1"/>
+          </a:fillRef>
+          <a:effectRef idx="0">
+            <a:schemeClr val="accent1"/>
+          </a:effectRef>
+          <a:fontRef idx="minor">
+            <a:schemeClr val="tx1"/>
+          </a:fontRef>
+        </p:style>
+      </p:cxnSp>
+      <p:cxnSp>
+        <p:nvCxnSpPr>
+          <p:cNvPr id="21" name="Straight Arrow Connector 20">
+            <a:extLst>
+              <a:ext uri="{FF2B5EF4-FFF2-40B4-BE49-F238E27FC236}">
+                <a16:creationId xmlns:a16="http://schemas.microsoft.com/office/drawing/2014/main" id="{B81CB08E-A669-408D-BD9C-BEEA5DDBDBF5}"/>
+              </a:ext>
+            </a:extLst>
+          </p:cNvPr>
+          <p:cNvCxnSpPr/>
+          <p:nvPr/>
+        </p:nvCxnSpPr>
+        <p:spPr>
+          <a:xfrm>
+            <a:off x="4800601" y="5231675"/>
+            <a:ext cx="376986" cy="0"/>
+          </a:xfrm>
+          <a:prstGeom prst="straightConnector1">
+            <a:avLst/>
+          </a:prstGeom>
+          <a:ln w="12700">
+            <a:solidFill>
+              <a:srgbClr val="FF7C80"/>
+            </a:solidFill>
+            <a:tailEnd type="triangle"/>
+          </a:ln>
+        </p:spPr>
+        <p:style>
+          <a:lnRef idx="1">
+            <a:schemeClr val="accent1"/>
+          </a:lnRef>
+          <a:fillRef idx="0">
+            <a:schemeClr val="accent1"/>
+          </a:fillRef>
+          <a:effectRef idx="0">
+            <a:schemeClr val="accent1"/>
+          </a:effectRef>
+          <a:fontRef idx="minor">
+            <a:schemeClr val="tx1"/>
+          </a:fontRef>
+        </p:style>
+      </p:cxnSp>
+      <p:sp>
+        <p:nvSpPr>
+          <p:cNvPr id="30" name="Rectangle 29">
+            <a:extLst>
+              <a:ext uri="{FF2B5EF4-FFF2-40B4-BE49-F238E27FC236}">
+                <a16:creationId xmlns:a16="http://schemas.microsoft.com/office/drawing/2014/main" id="{712A489D-A621-4FE4-ACF6-D76866D938EF}"/>
+              </a:ext>
+            </a:extLst>
+          </p:cNvPr>
+          <p:cNvSpPr/>
+          <p:nvPr/>
+        </p:nvSpPr>
+        <p:spPr>
+          <a:xfrm>
+            <a:off x="5177587" y="5805181"/>
+            <a:ext cx="1844844" cy="393032"/>
+          </a:xfrm>
+          <a:prstGeom prst="rect">
+            <a:avLst/>
+          </a:prstGeom>
+          <a:noFill/>
+          <a:ln>
+            <a:solidFill>
+              <a:schemeClr val="accent6">
+                <a:lumMod val="60000"/>
+                <a:lumOff val="40000"/>
               </a:schemeClr>
-            </a:lnRef>
-            <a:fillRef idx="1">
-              <a:schemeClr val="accent1"/>
-            </a:fillRef>
-            <a:effectRef idx="0">
-              <a:schemeClr val="accent1"/>
-            </a:effectRef>
-            <a:fontRef idx="minor">
-              <a:schemeClr val="lt1"/>
-            </a:fontRef>
-          </p:style>
-          <p:txBody>
-            <a:bodyPr rtlCol="0" anchor="ctr"/>
-            <a:lstStyle/>
-            <a:p>
-              <a:pPr algn="ctr"/>
-              <a:r>
-                <a:rPr lang="en-US" sz="1200" dirty="0">
-                  <a:solidFill>
-                    <a:schemeClr val="bg1">
-                      <a:lumMod val="85000"/>
-                    </a:schemeClr>
-                  </a:solidFill>
-                  <a:latin typeface="Open Sans" panose="020B0606030504020204" pitchFamily="34" charset="0"/>
-                  <a:ea typeface="Open Sans" panose="020B0606030504020204" pitchFamily="34" charset="0"/>
-                  <a:cs typeface="Open Sans" panose="020B0606030504020204" pitchFamily="34" charset="0"/>
-                </a:rPr>
-                <a:t>hour &gt; 3</a:t>
-              </a:r>
-            </a:p>
-          </p:txBody>
-        </p:sp>
-        <p:cxnSp>
-          <p:nvCxnSpPr>
-            <p:cNvPr id="10" name="Straight Arrow Connector 9">
-              <a:extLst>
-                <a:ext uri="{FF2B5EF4-FFF2-40B4-BE49-F238E27FC236}">
-                  <a16:creationId xmlns:a16="http://schemas.microsoft.com/office/drawing/2014/main" id="{3C71FA0F-D010-4470-A4DA-37400D7EA02F}"/>
-                </a:ext>
-              </a:extLst>
-            </p:cNvPr>
-            <p:cNvCxnSpPr>
-              <a:stCxn id="2" idx="4"/>
-              <a:endCxn id="4" idx="0"/>
-            </p:cNvCxnSpPr>
-            <p:nvPr/>
-          </p:nvCxnSpPr>
-          <p:spPr>
-            <a:xfrm>
-              <a:off x="3878179" y="2034634"/>
-              <a:ext cx="0" cy="296780"/>
-            </a:xfrm>
-            <a:prstGeom prst="straightConnector1">
-              <a:avLst/>
-            </a:prstGeom>
-            <a:ln w="12700">
-              <a:solidFill>
-                <a:schemeClr val="accent1">
-                  <a:lumMod val="60000"/>
-                  <a:lumOff val="40000"/>
-                </a:schemeClr>
-              </a:solidFill>
-              <a:tailEnd type="triangle"/>
-            </a:ln>
-          </p:spPr>
-          <p:style>
-            <a:lnRef idx="1">
-              <a:schemeClr val="accent1"/>
-            </a:lnRef>
-            <a:fillRef idx="0">
-              <a:schemeClr val="accent1"/>
-            </a:fillRef>
-            <a:effectRef idx="0">
-              <a:schemeClr val="accent1"/>
-            </a:effectRef>
-            <a:fontRef idx="minor">
-              <a:schemeClr val="tx1"/>
-            </a:fontRef>
-          </p:style>
-        </p:cxnSp>
-        <p:sp>
-          <p:nvSpPr>
-            <p:cNvPr id="11" name="Rectangle 10">
-              <a:extLst>
-                <a:ext uri="{FF2B5EF4-FFF2-40B4-BE49-F238E27FC236}">
-                  <a16:creationId xmlns:a16="http://schemas.microsoft.com/office/drawing/2014/main" id="{948C2A8F-0239-4D44-9E68-CA7453A5CA77}"/>
-                </a:ext>
-              </a:extLst>
-            </p:cNvPr>
-            <p:cNvSpPr/>
-            <p:nvPr/>
-          </p:nvSpPr>
-          <p:spPr>
-            <a:xfrm>
-              <a:off x="5177587" y="2608140"/>
-              <a:ext cx="1844844" cy="393032"/>
-            </a:xfrm>
-            <a:prstGeom prst="rect">
-              <a:avLst/>
-            </a:prstGeom>
-            <a:noFill/>
-            <a:ln>
-              <a:solidFill>
-                <a:schemeClr val="accent6">
-                  <a:lumMod val="60000"/>
-                  <a:lumOff val="40000"/>
-                </a:schemeClr>
-              </a:solidFill>
-            </a:ln>
-          </p:spPr>
-          <p:style>
-            <a:lnRef idx="2">
-              <a:schemeClr val="accent1">
-                <a:shade val="50000"/>
+            </a:solidFill>
+          </a:ln>
+        </p:spPr>
+        <p:style>
+          <a:lnRef idx="2">
+            <a:schemeClr val="accent1">
+              <a:shade val="50000"/>
+            </a:schemeClr>
+          </a:lnRef>
+          <a:fillRef idx="1">
+            <a:schemeClr val="accent1"/>
+          </a:fillRef>
+          <a:effectRef idx="0">
+            <a:schemeClr val="accent1"/>
+          </a:effectRef>
+          <a:fontRef idx="minor">
+            <a:schemeClr val="lt1"/>
+          </a:fontRef>
+        </p:style>
+        <p:txBody>
+          <a:bodyPr rtlCol="0" anchor="ctr"/>
+          <a:lstStyle/>
+          <a:p>
+            <a:pPr algn="ctr"/>
+            <a:r>
+              <a:rPr lang="en-US" sz="1200" dirty="0">
+                <a:solidFill>
+                  <a:schemeClr val="bg1">
+                    <a:lumMod val="85000"/>
+                  </a:schemeClr>
+                </a:solidFill>
+                <a:latin typeface="Open Sans" panose="020B0606030504020204" pitchFamily="34" charset="0"/>
+                <a:ea typeface="Open Sans" panose="020B0606030504020204" pitchFamily="34" charset="0"/>
+                <a:cs typeface="Open Sans" panose="020B0606030504020204" pitchFamily="34" charset="0"/>
+              </a:rPr>
+              <a:t>Fee = 4.00*hour</a:t>
+            </a:r>
+          </a:p>
+        </p:txBody>
+      </p:sp>
+      <p:cxnSp>
+        <p:nvCxnSpPr>
+          <p:cNvPr id="35" name="Connector: Elbow 34">
+            <a:extLst>
+              <a:ext uri="{FF2B5EF4-FFF2-40B4-BE49-F238E27FC236}">
+                <a16:creationId xmlns:a16="http://schemas.microsoft.com/office/drawing/2014/main" id="{44F8E138-8730-4986-859D-6909BD3EA4CE}"/>
+              </a:ext>
+            </a:extLst>
+          </p:cNvPr>
+          <p:cNvCxnSpPr>
+            <a:stCxn id="8" idx="2"/>
+            <a:endCxn id="30" idx="1"/>
+          </p:cNvCxnSpPr>
+          <p:nvPr/>
+        </p:nvCxnSpPr>
+        <p:spPr>
+          <a:xfrm rot="16200000" flipH="1">
+            <a:off x="4379494" y="5203603"/>
+            <a:ext cx="296779" cy="1299408"/>
+          </a:xfrm>
+          <a:prstGeom prst="bentConnector2">
+            <a:avLst/>
+          </a:prstGeom>
+          <a:ln w="12700">
+            <a:solidFill>
+              <a:srgbClr val="FF7C80"/>
+            </a:solidFill>
+            <a:tailEnd type="triangle"/>
+          </a:ln>
+        </p:spPr>
+        <p:style>
+          <a:lnRef idx="1">
+            <a:schemeClr val="accent1"/>
+          </a:lnRef>
+          <a:fillRef idx="0">
+            <a:schemeClr val="accent1"/>
+          </a:fillRef>
+          <a:effectRef idx="0">
+            <a:schemeClr val="accent1"/>
+          </a:effectRef>
+          <a:fontRef idx="minor">
+            <a:schemeClr val="tx1"/>
+          </a:fontRef>
+        </p:style>
+      </p:cxnSp>
+      <p:sp>
+        <p:nvSpPr>
+          <p:cNvPr id="36" name="TextBox 35">
+            <a:extLst>
+              <a:ext uri="{FF2B5EF4-FFF2-40B4-BE49-F238E27FC236}">
+                <a16:creationId xmlns:a16="http://schemas.microsoft.com/office/drawing/2014/main" id="{026FF1F1-338C-4F48-8811-F9243B273734}"/>
+              </a:ext>
+            </a:extLst>
+          </p:cNvPr>
+          <p:cNvSpPr txBox="1"/>
+          <p:nvPr/>
+        </p:nvSpPr>
+        <p:spPr>
+          <a:xfrm>
+            <a:off x="4854281" y="2467011"/>
+            <a:ext cx="269626" cy="276999"/>
+          </a:xfrm>
+          <a:prstGeom prst="rect">
+            <a:avLst/>
+          </a:prstGeom>
+          <a:noFill/>
+        </p:spPr>
+        <p:txBody>
+          <a:bodyPr wrap="none" rtlCol="0">
+            <a:spAutoFit/>
+          </a:bodyPr>
+          <a:lstStyle/>
+          <a:p>
+            <a:r>
+              <a:rPr lang="en-US" sz="1200" dirty="0">
+                <a:solidFill>
+                  <a:srgbClr val="FF7C80"/>
+                </a:solidFill>
+                <a:latin typeface="Open Sans" panose="020B0606030504020204" pitchFamily="34" charset="0"/>
+                <a:ea typeface="Open Sans" panose="020B0606030504020204" pitchFamily="34" charset="0"/>
+                <a:cs typeface="Open Sans" panose="020B0606030504020204" pitchFamily="34" charset="0"/>
+              </a:rPr>
+              <a:t>T</a:t>
+            </a:r>
+          </a:p>
+        </p:txBody>
+      </p:sp>
+      <p:sp>
+        <p:nvSpPr>
+          <p:cNvPr id="37" name="TextBox 36">
+            <a:extLst>
+              <a:ext uri="{FF2B5EF4-FFF2-40B4-BE49-F238E27FC236}">
+                <a16:creationId xmlns:a16="http://schemas.microsoft.com/office/drawing/2014/main" id="{021392A3-D0C9-4305-86BD-5332188EA6CB}"/>
+              </a:ext>
+            </a:extLst>
+          </p:cNvPr>
+          <p:cNvSpPr txBox="1"/>
+          <p:nvPr/>
+        </p:nvSpPr>
+        <p:spPr>
+          <a:xfrm>
+            <a:off x="4854281" y="3710274"/>
+            <a:ext cx="269626" cy="276999"/>
+          </a:xfrm>
+          <a:prstGeom prst="rect">
+            <a:avLst/>
+          </a:prstGeom>
+          <a:noFill/>
+        </p:spPr>
+        <p:txBody>
+          <a:bodyPr wrap="none" rtlCol="0">
+            <a:spAutoFit/>
+          </a:bodyPr>
+          <a:lstStyle/>
+          <a:p>
+            <a:r>
+              <a:rPr lang="en-US" sz="1200" dirty="0">
+                <a:solidFill>
+                  <a:srgbClr val="FF7C80"/>
+                </a:solidFill>
+                <a:latin typeface="Open Sans" panose="020B0606030504020204" pitchFamily="34" charset="0"/>
+                <a:ea typeface="Open Sans" panose="020B0606030504020204" pitchFamily="34" charset="0"/>
+                <a:cs typeface="Open Sans" panose="020B0606030504020204" pitchFamily="34" charset="0"/>
+              </a:rPr>
+              <a:t>T</a:t>
+            </a:r>
+          </a:p>
+        </p:txBody>
+      </p:sp>
+      <p:sp>
+        <p:nvSpPr>
+          <p:cNvPr id="38" name="TextBox 37">
+            <a:extLst>
+              <a:ext uri="{FF2B5EF4-FFF2-40B4-BE49-F238E27FC236}">
+                <a16:creationId xmlns:a16="http://schemas.microsoft.com/office/drawing/2014/main" id="{741830F2-B1C3-4F7F-A19A-609F9A3B848C}"/>
+              </a:ext>
+            </a:extLst>
+          </p:cNvPr>
+          <p:cNvSpPr txBox="1"/>
+          <p:nvPr/>
+        </p:nvSpPr>
+        <p:spPr>
+          <a:xfrm>
+            <a:off x="4854281" y="4952398"/>
+            <a:ext cx="269626" cy="276999"/>
+          </a:xfrm>
+          <a:prstGeom prst="rect">
+            <a:avLst/>
+          </a:prstGeom>
+          <a:noFill/>
+        </p:spPr>
+        <p:txBody>
+          <a:bodyPr wrap="none" rtlCol="0">
+            <a:spAutoFit/>
+          </a:bodyPr>
+          <a:lstStyle/>
+          <a:p>
+            <a:r>
+              <a:rPr lang="en-US" sz="1200" dirty="0">
+                <a:solidFill>
+                  <a:srgbClr val="FF7C80"/>
+                </a:solidFill>
+                <a:latin typeface="Open Sans" panose="020B0606030504020204" pitchFamily="34" charset="0"/>
+                <a:ea typeface="Open Sans" panose="020B0606030504020204" pitchFamily="34" charset="0"/>
+                <a:cs typeface="Open Sans" panose="020B0606030504020204" pitchFamily="34" charset="0"/>
+              </a:rPr>
+              <a:t>T</a:t>
+            </a:r>
+          </a:p>
+        </p:txBody>
+      </p:sp>
+      <p:sp>
+        <p:nvSpPr>
+          <p:cNvPr id="39" name="TextBox 38">
+            <a:extLst>
+              <a:ext uri="{FF2B5EF4-FFF2-40B4-BE49-F238E27FC236}">
+                <a16:creationId xmlns:a16="http://schemas.microsoft.com/office/drawing/2014/main" id="{C8B085BA-4F97-4C99-BDA6-87889E1F708C}"/>
+              </a:ext>
+            </a:extLst>
+          </p:cNvPr>
+          <p:cNvSpPr txBox="1"/>
+          <p:nvPr/>
+        </p:nvSpPr>
+        <p:spPr>
+          <a:xfrm>
+            <a:off x="3608553" y="3218389"/>
+            <a:ext cx="269626" cy="276999"/>
+          </a:xfrm>
+          <a:prstGeom prst="rect">
+            <a:avLst/>
+          </a:prstGeom>
+          <a:noFill/>
+        </p:spPr>
+        <p:txBody>
+          <a:bodyPr wrap="none" rtlCol="0">
+            <a:spAutoFit/>
+          </a:bodyPr>
+          <a:lstStyle/>
+          <a:p>
+            <a:r>
+              <a:rPr lang="en-US" sz="1200" dirty="0">
+                <a:solidFill>
+                  <a:srgbClr val="FF7C80"/>
+                </a:solidFill>
+                <a:latin typeface="Open Sans" panose="020B0606030504020204" pitchFamily="34" charset="0"/>
+                <a:ea typeface="Open Sans" panose="020B0606030504020204" pitchFamily="34" charset="0"/>
+                <a:cs typeface="Open Sans" panose="020B0606030504020204" pitchFamily="34" charset="0"/>
+              </a:rPr>
+              <a:t>F</a:t>
+            </a:r>
+          </a:p>
+        </p:txBody>
+      </p:sp>
+      <p:sp>
+        <p:nvSpPr>
+          <p:cNvPr id="40" name="TextBox 39">
+            <a:extLst>
+              <a:ext uri="{FF2B5EF4-FFF2-40B4-BE49-F238E27FC236}">
+                <a16:creationId xmlns:a16="http://schemas.microsoft.com/office/drawing/2014/main" id="{D6D47987-88FE-4262-88A7-BD01262D32EB}"/>
+              </a:ext>
+            </a:extLst>
+          </p:cNvPr>
+          <p:cNvSpPr txBox="1"/>
+          <p:nvPr/>
+        </p:nvSpPr>
+        <p:spPr>
+          <a:xfrm>
+            <a:off x="3608553" y="4461653"/>
+            <a:ext cx="269626" cy="276999"/>
+          </a:xfrm>
+          <a:prstGeom prst="rect">
+            <a:avLst/>
+          </a:prstGeom>
+          <a:noFill/>
+        </p:spPr>
+        <p:txBody>
+          <a:bodyPr wrap="none" rtlCol="0">
+            <a:spAutoFit/>
+          </a:bodyPr>
+          <a:lstStyle/>
+          <a:p>
+            <a:r>
+              <a:rPr lang="en-US" sz="1200" dirty="0">
+                <a:solidFill>
+                  <a:srgbClr val="FF7C80"/>
+                </a:solidFill>
+                <a:latin typeface="Open Sans" panose="020B0606030504020204" pitchFamily="34" charset="0"/>
+                <a:ea typeface="Open Sans" panose="020B0606030504020204" pitchFamily="34" charset="0"/>
+                <a:cs typeface="Open Sans" panose="020B0606030504020204" pitchFamily="34" charset="0"/>
+              </a:rPr>
+              <a:t>F</a:t>
+            </a:r>
+          </a:p>
+        </p:txBody>
+      </p:sp>
+      <p:sp>
+        <p:nvSpPr>
+          <p:cNvPr id="41" name="TextBox 40">
+            <a:extLst>
+              <a:ext uri="{FF2B5EF4-FFF2-40B4-BE49-F238E27FC236}">
+                <a16:creationId xmlns:a16="http://schemas.microsoft.com/office/drawing/2014/main" id="{DDE17185-5F1B-431F-8A40-25E814C364CC}"/>
+              </a:ext>
+            </a:extLst>
+          </p:cNvPr>
+          <p:cNvSpPr txBox="1"/>
+          <p:nvPr/>
+        </p:nvSpPr>
+        <p:spPr>
+          <a:xfrm>
+            <a:off x="3608553" y="5704916"/>
+            <a:ext cx="269626" cy="276999"/>
+          </a:xfrm>
+          <a:prstGeom prst="rect">
+            <a:avLst/>
+          </a:prstGeom>
+          <a:noFill/>
+        </p:spPr>
+        <p:txBody>
+          <a:bodyPr wrap="none" rtlCol="0">
+            <a:spAutoFit/>
+          </a:bodyPr>
+          <a:lstStyle/>
+          <a:p>
+            <a:r>
+              <a:rPr lang="en-US" sz="1200" dirty="0">
+                <a:solidFill>
+                  <a:srgbClr val="FF7C80"/>
+                </a:solidFill>
+                <a:latin typeface="Open Sans" panose="020B0606030504020204" pitchFamily="34" charset="0"/>
+                <a:ea typeface="Open Sans" panose="020B0606030504020204" pitchFamily="34" charset="0"/>
+                <a:cs typeface="Open Sans" panose="020B0606030504020204" pitchFamily="34" charset="0"/>
+              </a:rPr>
+              <a:t>F</a:t>
+            </a:r>
+          </a:p>
+        </p:txBody>
+      </p:sp>
+      <p:sp>
+        <p:nvSpPr>
+          <p:cNvPr id="43" name="Flowchart: Data 42">
+            <a:extLst>
+              <a:ext uri="{FF2B5EF4-FFF2-40B4-BE49-F238E27FC236}">
+                <a16:creationId xmlns:a16="http://schemas.microsoft.com/office/drawing/2014/main" id="{83FFD052-AEAD-4743-812A-CEECDBB42BF6}"/>
+              </a:ext>
+            </a:extLst>
+          </p:cNvPr>
+          <p:cNvSpPr/>
+          <p:nvPr/>
+        </p:nvSpPr>
+        <p:spPr>
+          <a:xfrm>
+            <a:off x="7379367" y="1485842"/>
+            <a:ext cx="1844844" cy="489284"/>
+          </a:xfrm>
+          <a:prstGeom prst="flowChartInputOutput">
+            <a:avLst/>
+          </a:prstGeom>
+          <a:noFill/>
+          <a:ln>
+            <a:solidFill>
+              <a:srgbClr val="CC99FF"/>
+            </a:solidFill>
+          </a:ln>
+        </p:spPr>
+        <p:style>
+          <a:lnRef idx="2">
+            <a:schemeClr val="accent1">
+              <a:shade val="50000"/>
+            </a:schemeClr>
+          </a:lnRef>
+          <a:fillRef idx="1">
+            <a:schemeClr val="accent1"/>
+          </a:fillRef>
+          <a:effectRef idx="0">
+            <a:schemeClr val="accent1"/>
+          </a:effectRef>
+          <a:fontRef idx="minor">
+            <a:schemeClr val="lt1"/>
+          </a:fontRef>
+        </p:style>
+        <p:txBody>
+          <a:bodyPr rtlCol="0" anchor="ctr"/>
+          <a:lstStyle/>
+          <a:p>
+            <a:pPr algn="ctr"/>
+            <a:r>
+              <a:rPr lang="en-US" sz="1200" dirty="0">
+                <a:solidFill>
+                  <a:schemeClr val="bg1">
+                    <a:lumMod val="85000"/>
+                  </a:schemeClr>
+                </a:solidFill>
+                <a:latin typeface="Open Sans" panose="020B0606030504020204" pitchFamily="34" charset="0"/>
+                <a:ea typeface="Open Sans" panose="020B0606030504020204" pitchFamily="34" charset="0"/>
+                <a:cs typeface="Open Sans" panose="020B0606030504020204" pitchFamily="34" charset="0"/>
+              </a:rPr>
+              <a:t>Print fee</a:t>
+            </a:r>
+          </a:p>
+        </p:txBody>
+      </p:sp>
+      <p:cxnSp>
+        <p:nvCxnSpPr>
+          <p:cNvPr id="47" name="Connector: Elbow 46">
+            <a:extLst>
+              <a:ext uri="{FF2B5EF4-FFF2-40B4-BE49-F238E27FC236}">
+                <a16:creationId xmlns:a16="http://schemas.microsoft.com/office/drawing/2014/main" id="{ED230FEA-0465-4B2C-A3B8-43A79370BD23}"/>
+              </a:ext>
+            </a:extLst>
+          </p:cNvPr>
+          <p:cNvCxnSpPr>
+            <a:cxnSpLocks/>
+            <a:stCxn id="30" idx="3"/>
+            <a:endCxn id="43" idx="4"/>
+          </p:cNvCxnSpPr>
+          <p:nvPr/>
+        </p:nvCxnSpPr>
+        <p:spPr>
+          <a:xfrm flipV="1">
+            <a:off x="7022431" y="1975126"/>
+            <a:ext cx="1279358" cy="4026571"/>
+          </a:xfrm>
+          <a:prstGeom prst="bentConnector2">
+            <a:avLst/>
+          </a:prstGeom>
+          <a:ln w="12700">
+            <a:solidFill>
+              <a:schemeClr val="bg1">
+                <a:lumMod val="75000"/>
               </a:schemeClr>
-            </a:lnRef>
-            <a:fillRef idx="1">
-              <a:schemeClr val="accent1"/>
-            </a:fillRef>
-            <a:effectRef idx="0">
-              <a:schemeClr val="accent1"/>
-            </a:effectRef>
-            <a:fontRef idx="minor">
-              <a:schemeClr val="lt1"/>
-            </a:fontRef>
-          </p:style>
-          <p:txBody>
-            <a:bodyPr rtlCol="0" anchor="ctr"/>
-            <a:lstStyle/>
-            <a:p>
-              <a:pPr algn="ctr"/>
-              <a:r>
-                <a:rPr lang="en-US" sz="1200" dirty="0">
-                  <a:solidFill>
-                    <a:schemeClr val="bg1">
-                      <a:lumMod val="85000"/>
-                    </a:schemeClr>
-                  </a:solidFill>
-                  <a:latin typeface="Open Sans" panose="020B0606030504020204" pitchFamily="34" charset="0"/>
-                  <a:ea typeface="Open Sans" panose="020B0606030504020204" pitchFamily="34" charset="0"/>
-                  <a:cs typeface="Open Sans" panose="020B0606030504020204" pitchFamily="34" charset="0"/>
-                </a:rPr>
-                <a:t>Fee = 25.00</a:t>
-              </a:r>
-            </a:p>
-          </p:txBody>
-        </p:sp>
-        <p:sp>
-          <p:nvSpPr>
-            <p:cNvPr id="12" name="Rectangle 11">
-              <a:extLst>
-                <a:ext uri="{FF2B5EF4-FFF2-40B4-BE49-F238E27FC236}">
-                  <a16:creationId xmlns:a16="http://schemas.microsoft.com/office/drawing/2014/main" id="{59E60FBA-E7D1-474B-9288-DE527C1FC37C}"/>
-                </a:ext>
-              </a:extLst>
-            </p:cNvPr>
-            <p:cNvSpPr/>
-            <p:nvPr/>
-          </p:nvSpPr>
-          <p:spPr>
-            <a:xfrm>
-              <a:off x="5177587" y="3773198"/>
-              <a:ext cx="1844844" cy="549443"/>
-            </a:xfrm>
-            <a:prstGeom prst="rect">
-              <a:avLst/>
-            </a:prstGeom>
-            <a:noFill/>
-            <a:ln>
-              <a:solidFill>
-                <a:schemeClr val="accent6">
-                  <a:lumMod val="60000"/>
-                  <a:lumOff val="40000"/>
-                </a:schemeClr>
-              </a:solidFill>
-            </a:ln>
-          </p:spPr>
-          <p:style>
-            <a:lnRef idx="2">
-              <a:schemeClr val="accent1">
-                <a:shade val="50000"/>
+            </a:solidFill>
+            <a:tailEnd type="triangle"/>
+          </a:ln>
+        </p:spPr>
+        <p:style>
+          <a:lnRef idx="1">
+            <a:schemeClr val="accent1"/>
+          </a:lnRef>
+          <a:fillRef idx="0">
+            <a:schemeClr val="accent1"/>
+          </a:fillRef>
+          <a:effectRef idx="0">
+            <a:schemeClr val="accent1"/>
+          </a:effectRef>
+          <a:fontRef idx="minor">
+            <a:schemeClr val="tx1"/>
+          </a:fontRef>
+        </p:style>
+      </p:cxnSp>
+      <p:cxnSp>
+        <p:nvCxnSpPr>
+          <p:cNvPr id="55" name="Straight Connector 54">
+            <a:extLst>
+              <a:ext uri="{FF2B5EF4-FFF2-40B4-BE49-F238E27FC236}">
+                <a16:creationId xmlns:a16="http://schemas.microsoft.com/office/drawing/2014/main" id="{926EFA16-9636-40DD-B5F7-F2E2EEF1914D}"/>
+              </a:ext>
+            </a:extLst>
+          </p:cNvPr>
+          <p:cNvCxnSpPr>
+            <a:stCxn id="11" idx="3"/>
+          </p:cNvCxnSpPr>
+          <p:nvPr/>
+        </p:nvCxnSpPr>
+        <p:spPr>
+          <a:xfrm flipV="1">
+            <a:off x="7022431" y="2744010"/>
+            <a:ext cx="1279357" cy="1138"/>
+          </a:xfrm>
+          <a:prstGeom prst="line">
+            <a:avLst/>
+          </a:prstGeom>
+          <a:ln w="12700">
+            <a:solidFill>
+              <a:schemeClr val="bg1">
+                <a:lumMod val="75000"/>
               </a:schemeClr>
-            </a:lnRef>
-            <a:fillRef idx="1">
-              <a:schemeClr val="accent1"/>
-            </a:fillRef>
-            <a:effectRef idx="0">
-              <a:schemeClr val="accent1"/>
-            </a:effectRef>
-            <a:fontRef idx="minor">
-              <a:schemeClr val="lt1"/>
-            </a:fontRef>
-          </p:style>
-          <p:txBody>
-            <a:bodyPr rtlCol="0" anchor="ctr"/>
-            <a:lstStyle/>
-            <a:p>
-              <a:pPr algn="ctr"/>
-              <a:r>
-                <a:rPr lang="en-US" sz="1200" dirty="0">
-                  <a:solidFill>
-                    <a:schemeClr val="bg1">
-                      <a:lumMod val="85000"/>
-                    </a:schemeClr>
-                  </a:solidFill>
-                  <a:latin typeface="Open Sans" panose="020B0606030504020204" pitchFamily="34" charset="0"/>
-                  <a:ea typeface="Open Sans" panose="020B0606030504020204" pitchFamily="34" charset="0"/>
-                  <a:cs typeface="Open Sans" panose="020B0606030504020204" pitchFamily="34" charset="0"/>
-                </a:rPr>
-                <a:t>Fee = 4.00*3 + 3.00*2 </a:t>
-              </a:r>
-            </a:p>
-            <a:p>
-              <a:pPr algn="ctr"/>
-              <a:r>
-                <a:rPr lang="en-US" sz="1200" dirty="0">
-                  <a:solidFill>
-                    <a:schemeClr val="bg1">
-                      <a:lumMod val="85000"/>
-                    </a:schemeClr>
-                  </a:solidFill>
-                  <a:latin typeface="Open Sans" panose="020B0606030504020204" pitchFamily="34" charset="0"/>
-                  <a:ea typeface="Open Sans" panose="020B0606030504020204" pitchFamily="34" charset="0"/>
-                  <a:cs typeface="Open Sans" panose="020B0606030504020204" pitchFamily="34" charset="0"/>
-                </a:rPr>
-                <a:t>+ 2.50*(hour – 5)</a:t>
-              </a:r>
-            </a:p>
-          </p:txBody>
-        </p:sp>
-        <p:sp>
-          <p:nvSpPr>
-            <p:cNvPr id="13" name="Rectangle 12">
-              <a:extLst>
-                <a:ext uri="{FF2B5EF4-FFF2-40B4-BE49-F238E27FC236}">
-                  <a16:creationId xmlns:a16="http://schemas.microsoft.com/office/drawing/2014/main" id="{1A7BACE9-4D58-4158-9C2E-F6E74C3A2A51}"/>
-                </a:ext>
-              </a:extLst>
-            </p:cNvPr>
-            <p:cNvSpPr/>
-            <p:nvPr/>
-          </p:nvSpPr>
-          <p:spPr>
-            <a:xfrm>
-              <a:off x="5177587" y="5020272"/>
-              <a:ext cx="1844844" cy="548640"/>
-            </a:xfrm>
-            <a:prstGeom prst="rect">
-              <a:avLst/>
-            </a:prstGeom>
-            <a:noFill/>
-            <a:ln>
-              <a:solidFill>
-                <a:schemeClr val="accent6">
-                  <a:lumMod val="60000"/>
-                  <a:lumOff val="40000"/>
-                </a:schemeClr>
-              </a:solidFill>
-            </a:ln>
-          </p:spPr>
-          <p:style>
-            <a:lnRef idx="2">
-              <a:schemeClr val="accent1">
-                <a:shade val="50000"/>
+            </a:solidFill>
+          </a:ln>
+        </p:spPr>
+        <p:style>
+          <a:lnRef idx="1">
+            <a:schemeClr val="accent1"/>
+          </a:lnRef>
+          <a:fillRef idx="0">
+            <a:schemeClr val="accent1"/>
+          </a:fillRef>
+          <a:effectRef idx="0">
+            <a:schemeClr val="accent1"/>
+          </a:effectRef>
+          <a:fontRef idx="minor">
+            <a:schemeClr val="tx1"/>
+          </a:fontRef>
+        </p:style>
+      </p:cxnSp>
+      <p:cxnSp>
+        <p:nvCxnSpPr>
+          <p:cNvPr id="56" name="Straight Connector 55">
+            <a:extLst>
+              <a:ext uri="{FF2B5EF4-FFF2-40B4-BE49-F238E27FC236}">
+                <a16:creationId xmlns:a16="http://schemas.microsoft.com/office/drawing/2014/main" id="{183936C0-B393-49D7-A7EF-57AAEC68FD3E}"/>
+              </a:ext>
+            </a:extLst>
+          </p:cNvPr>
+          <p:cNvCxnSpPr/>
+          <p:nvPr/>
+        </p:nvCxnSpPr>
+        <p:spPr>
+          <a:xfrm flipV="1">
+            <a:off x="7022431" y="3987273"/>
+            <a:ext cx="1279357" cy="1138"/>
+          </a:xfrm>
+          <a:prstGeom prst="line">
+            <a:avLst/>
+          </a:prstGeom>
+          <a:ln w="12700">
+            <a:solidFill>
+              <a:schemeClr val="bg1">
+                <a:lumMod val="75000"/>
               </a:schemeClr>
-            </a:lnRef>
-            <a:fillRef idx="1">
-              <a:schemeClr val="accent1"/>
-            </a:fillRef>
-            <a:effectRef idx="0">
-              <a:schemeClr val="accent1"/>
-            </a:effectRef>
-            <a:fontRef idx="minor">
-              <a:schemeClr val="lt1"/>
-            </a:fontRef>
-          </p:style>
-          <p:txBody>
-            <a:bodyPr rtlCol="0" anchor="ctr"/>
-            <a:lstStyle/>
-            <a:p>
-              <a:pPr algn="ctr"/>
-              <a:r>
-                <a:rPr lang="en-US" sz="1200" dirty="0">
-                  <a:solidFill>
-                    <a:schemeClr val="bg1">
-                      <a:lumMod val="85000"/>
-                    </a:schemeClr>
-                  </a:solidFill>
-                  <a:latin typeface="Open Sans" panose="020B0606030504020204" pitchFamily="34" charset="0"/>
-                  <a:ea typeface="Open Sans" panose="020B0606030504020204" pitchFamily="34" charset="0"/>
-                  <a:cs typeface="Open Sans" panose="020B0606030504020204" pitchFamily="34" charset="0"/>
-                </a:rPr>
-                <a:t>Fee = 4.00*3 </a:t>
-              </a:r>
-            </a:p>
-            <a:p>
-              <a:pPr algn="ctr"/>
-              <a:r>
-                <a:rPr lang="en-US" sz="1200" dirty="0">
-                  <a:solidFill>
-                    <a:schemeClr val="bg1">
-                      <a:lumMod val="85000"/>
-                    </a:schemeClr>
-                  </a:solidFill>
-                  <a:latin typeface="Open Sans" panose="020B0606030504020204" pitchFamily="34" charset="0"/>
-                  <a:ea typeface="Open Sans" panose="020B0606030504020204" pitchFamily="34" charset="0"/>
-                  <a:cs typeface="Open Sans" panose="020B0606030504020204" pitchFamily="34" charset="0"/>
-                </a:rPr>
-                <a:t>– 3.00*(hour – 3)</a:t>
-              </a:r>
-            </a:p>
-          </p:txBody>
-        </p:sp>
-        <p:cxnSp>
-          <p:nvCxnSpPr>
-            <p:cNvPr id="14" name="Straight Arrow Connector 13">
-              <a:extLst>
-                <a:ext uri="{FF2B5EF4-FFF2-40B4-BE49-F238E27FC236}">
-                  <a16:creationId xmlns:a16="http://schemas.microsoft.com/office/drawing/2014/main" id="{6E956648-8245-4E91-969E-DA818A0EE312}"/>
-                </a:ext>
-              </a:extLst>
-            </p:cNvPr>
-            <p:cNvCxnSpPr/>
-            <p:nvPr/>
-          </p:nvCxnSpPr>
-          <p:spPr>
-            <a:xfrm>
-              <a:off x="3878179" y="3277898"/>
-              <a:ext cx="0" cy="296780"/>
-            </a:xfrm>
-            <a:prstGeom prst="straightConnector1">
-              <a:avLst/>
-            </a:prstGeom>
-            <a:ln w="12700">
-              <a:solidFill>
-                <a:srgbClr val="FF7C80"/>
-              </a:solidFill>
-              <a:tailEnd type="triangle"/>
-            </a:ln>
-          </p:spPr>
-          <p:style>
-            <a:lnRef idx="1">
-              <a:schemeClr val="accent1"/>
-            </a:lnRef>
-            <a:fillRef idx="0">
-              <a:schemeClr val="accent1"/>
-            </a:fillRef>
-            <a:effectRef idx="0">
-              <a:schemeClr val="accent1"/>
-            </a:effectRef>
-            <a:fontRef idx="minor">
-              <a:schemeClr val="tx1"/>
-            </a:fontRef>
-          </p:style>
-        </p:cxnSp>
-        <p:cxnSp>
-          <p:nvCxnSpPr>
-            <p:cNvPr id="15" name="Straight Arrow Connector 14">
-              <a:extLst>
-                <a:ext uri="{FF2B5EF4-FFF2-40B4-BE49-F238E27FC236}">
-                  <a16:creationId xmlns:a16="http://schemas.microsoft.com/office/drawing/2014/main" id="{3721F831-D501-454D-81EE-0C02699D1E2A}"/>
-                </a:ext>
-              </a:extLst>
-            </p:cNvPr>
-            <p:cNvCxnSpPr/>
-            <p:nvPr/>
-          </p:nvCxnSpPr>
-          <p:spPr>
-            <a:xfrm>
-              <a:off x="3878179" y="4521162"/>
-              <a:ext cx="0" cy="296780"/>
-            </a:xfrm>
-            <a:prstGeom prst="straightConnector1">
-              <a:avLst/>
-            </a:prstGeom>
-            <a:ln w="12700">
-              <a:solidFill>
-                <a:srgbClr val="FF7C80"/>
-              </a:solidFill>
-              <a:tailEnd type="triangle"/>
-            </a:ln>
-          </p:spPr>
-          <p:style>
-            <a:lnRef idx="1">
-              <a:schemeClr val="accent1"/>
-            </a:lnRef>
-            <a:fillRef idx="0">
-              <a:schemeClr val="accent1"/>
-            </a:fillRef>
-            <a:effectRef idx="0">
-              <a:schemeClr val="accent1"/>
-            </a:effectRef>
-            <a:fontRef idx="minor">
-              <a:schemeClr val="tx1"/>
-            </a:fontRef>
-          </p:style>
-        </p:cxnSp>
-        <p:cxnSp>
-          <p:nvCxnSpPr>
-            <p:cNvPr id="19" name="Straight Arrow Connector 18">
-              <a:extLst>
-                <a:ext uri="{FF2B5EF4-FFF2-40B4-BE49-F238E27FC236}">
-                  <a16:creationId xmlns:a16="http://schemas.microsoft.com/office/drawing/2014/main" id="{3B5CE5DB-7A65-4FDD-B4F3-0AAB62E0E486}"/>
-                </a:ext>
-              </a:extLst>
-            </p:cNvPr>
-            <p:cNvCxnSpPr>
-              <a:stCxn id="4" idx="3"/>
-              <a:endCxn id="11" idx="1"/>
-            </p:cNvCxnSpPr>
-            <p:nvPr/>
-          </p:nvCxnSpPr>
-          <p:spPr>
-            <a:xfrm>
-              <a:off x="4800601" y="2804656"/>
-              <a:ext cx="376986" cy="0"/>
-            </a:xfrm>
-            <a:prstGeom prst="straightConnector1">
-              <a:avLst/>
-            </a:prstGeom>
-            <a:ln w="12700">
-              <a:solidFill>
-                <a:srgbClr val="FF7C80"/>
-              </a:solidFill>
-              <a:tailEnd type="triangle"/>
-            </a:ln>
-          </p:spPr>
-          <p:style>
-            <a:lnRef idx="1">
-              <a:schemeClr val="accent1"/>
-            </a:lnRef>
-            <a:fillRef idx="0">
-              <a:schemeClr val="accent1"/>
-            </a:fillRef>
-            <a:effectRef idx="0">
-              <a:schemeClr val="accent1"/>
-            </a:effectRef>
-            <a:fontRef idx="minor">
-              <a:schemeClr val="tx1"/>
-            </a:fontRef>
-          </p:style>
-        </p:cxnSp>
-        <p:cxnSp>
-          <p:nvCxnSpPr>
-            <p:cNvPr id="20" name="Straight Arrow Connector 19">
-              <a:extLst>
-                <a:ext uri="{FF2B5EF4-FFF2-40B4-BE49-F238E27FC236}">
-                  <a16:creationId xmlns:a16="http://schemas.microsoft.com/office/drawing/2014/main" id="{844786FB-3790-4EB5-B3D7-F42BA9824AC0}"/>
-                </a:ext>
-              </a:extLst>
-            </p:cNvPr>
-            <p:cNvCxnSpPr/>
-            <p:nvPr/>
-          </p:nvCxnSpPr>
-          <p:spPr>
-            <a:xfrm>
-              <a:off x="4800601" y="4047919"/>
-              <a:ext cx="376986" cy="0"/>
-            </a:xfrm>
-            <a:prstGeom prst="straightConnector1">
-              <a:avLst/>
-            </a:prstGeom>
-            <a:ln w="12700">
-              <a:solidFill>
-                <a:srgbClr val="FF7C80"/>
-              </a:solidFill>
-              <a:tailEnd type="triangle"/>
-            </a:ln>
-          </p:spPr>
-          <p:style>
-            <a:lnRef idx="1">
-              <a:schemeClr val="accent1"/>
-            </a:lnRef>
-            <a:fillRef idx="0">
-              <a:schemeClr val="accent1"/>
-            </a:fillRef>
-            <a:effectRef idx="0">
-              <a:schemeClr val="accent1"/>
-            </a:effectRef>
-            <a:fontRef idx="minor">
-              <a:schemeClr val="tx1"/>
-            </a:fontRef>
-          </p:style>
-        </p:cxnSp>
-        <p:cxnSp>
-          <p:nvCxnSpPr>
-            <p:cNvPr id="21" name="Straight Arrow Connector 20">
-              <a:extLst>
-                <a:ext uri="{FF2B5EF4-FFF2-40B4-BE49-F238E27FC236}">
-                  <a16:creationId xmlns:a16="http://schemas.microsoft.com/office/drawing/2014/main" id="{B81CB08E-A669-408D-BD9C-BEEA5DDBDBF5}"/>
-                </a:ext>
-              </a:extLst>
-            </p:cNvPr>
-            <p:cNvCxnSpPr/>
-            <p:nvPr/>
-          </p:nvCxnSpPr>
-          <p:spPr>
-            <a:xfrm>
-              <a:off x="4800601" y="5291183"/>
-              <a:ext cx="376986" cy="0"/>
-            </a:xfrm>
-            <a:prstGeom prst="straightConnector1">
-              <a:avLst/>
-            </a:prstGeom>
-            <a:ln w="12700">
-              <a:solidFill>
-                <a:srgbClr val="FF7C80"/>
-              </a:solidFill>
-              <a:tailEnd type="triangle"/>
-            </a:ln>
-          </p:spPr>
-          <p:style>
-            <a:lnRef idx="1">
-              <a:schemeClr val="accent1"/>
-            </a:lnRef>
-            <a:fillRef idx="0">
-              <a:schemeClr val="accent1"/>
-            </a:fillRef>
-            <a:effectRef idx="0">
-              <a:schemeClr val="accent1"/>
-            </a:effectRef>
-            <a:fontRef idx="minor">
-              <a:schemeClr val="tx1"/>
-            </a:fontRef>
-          </p:style>
-        </p:cxnSp>
-        <p:sp>
-          <p:nvSpPr>
-            <p:cNvPr id="30" name="Rectangle 29">
-              <a:extLst>
-                <a:ext uri="{FF2B5EF4-FFF2-40B4-BE49-F238E27FC236}">
-                  <a16:creationId xmlns:a16="http://schemas.microsoft.com/office/drawing/2014/main" id="{712A489D-A621-4FE4-ACF6-D76866D938EF}"/>
-                </a:ext>
-              </a:extLst>
-            </p:cNvPr>
-            <p:cNvSpPr/>
-            <p:nvPr/>
-          </p:nvSpPr>
-          <p:spPr>
-            <a:xfrm>
-              <a:off x="5177587" y="5864689"/>
-              <a:ext cx="1844844" cy="393032"/>
-            </a:xfrm>
-            <a:prstGeom prst="rect">
-              <a:avLst/>
-            </a:prstGeom>
-            <a:noFill/>
-            <a:ln>
-              <a:solidFill>
-                <a:schemeClr val="accent6">
-                  <a:lumMod val="60000"/>
-                  <a:lumOff val="40000"/>
-                </a:schemeClr>
-              </a:solidFill>
-            </a:ln>
-          </p:spPr>
-          <p:style>
-            <a:lnRef idx="2">
-              <a:schemeClr val="accent1">
-                <a:shade val="50000"/>
+            </a:solidFill>
+          </a:ln>
+        </p:spPr>
+        <p:style>
+          <a:lnRef idx="1">
+            <a:schemeClr val="accent1"/>
+          </a:lnRef>
+          <a:fillRef idx="0">
+            <a:schemeClr val="accent1"/>
+          </a:fillRef>
+          <a:effectRef idx="0">
+            <a:schemeClr val="accent1"/>
+          </a:effectRef>
+          <a:fontRef idx="minor">
+            <a:schemeClr val="tx1"/>
+          </a:fontRef>
+        </p:style>
+      </p:cxnSp>
+      <p:cxnSp>
+        <p:nvCxnSpPr>
+          <p:cNvPr id="57" name="Straight Connector 56">
+            <a:extLst>
+              <a:ext uri="{FF2B5EF4-FFF2-40B4-BE49-F238E27FC236}">
+                <a16:creationId xmlns:a16="http://schemas.microsoft.com/office/drawing/2014/main" id="{8B5C6E0D-2DE4-439E-9595-609E8DBADFE6}"/>
+              </a:ext>
+            </a:extLst>
+          </p:cNvPr>
+          <p:cNvCxnSpPr/>
+          <p:nvPr/>
+        </p:nvCxnSpPr>
+        <p:spPr>
+          <a:xfrm flipV="1">
+            <a:off x="7022431" y="5229397"/>
+            <a:ext cx="1279357" cy="1138"/>
+          </a:xfrm>
+          <a:prstGeom prst="line">
+            <a:avLst/>
+          </a:prstGeom>
+          <a:ln w="12700">
+            <a:solidFill>
+              <a:schemeClr val="bg1">
+                <a:lumMod val="75000"/>
               </a:schemeClr>
-            </a:lnRef>
-            <a:fillRef idx="1">
-              <a:schemeClr val="accent1"/>
-            </a:fillRef>
-            <a:effectRef idx="0">
-              <a:schemeClr val="accent1"/>
-            </a:effectRef>
-            <a:fontRef idx="minor">
-              <a:schemeClr val="lt1"/>
-            </a:fontRef>
-          </p:style>
-          <p:txBody>
-            <a:bodyPr rtlCol="0" anchor="ctr"/>
-            <a:lstStyle/>
-            <a:p>
-              <a:pPr algn="ctr"/>
-              <a:r>
-                <a:rPr lang="en-US" sz="1200" dirty="0">
-                  <a:solidFill>
-                    <a:schemeClr val="bg1">
-                      <a:lumMod val="85000"/>
-                    </a:schemeClr>
-                  </a:solidFill>
-                  <a:latin typeface="Open Sans" panose="020B0606030504020204" pitchFamily="34" charset="0"/>
-                  <a:ea typeface="Open Sans" panose="020B0606030504020204" pitchFamily="34" charset="0"/>
-                  <a:cs typeface="Open Sans" panose="020B0606030504020204" pitchFamily="34" charset="0"/>
-                </a:rPr>
-                <a:t>Fee = 4.00*hour</a:t>
-              </a:r>
-            </a:p>
-          </p:txBody>
-        </p:sp>
-        <p:cxnSp>
-          <p:nvCxnSpPr>
-            <p:cNvPr id="35" name="Connector: Elbow 34">
-              <a:extLst>
-                <a:ext uri="{FF2B5EF4-FFF2-40B4-BE49-F238E27FC236}">
-                  <a16:creationId xmlns:a16="http://schemas.microsoft.com/office/drawing/2014/main" id="{44F8E138-8730-4986-859D-6909BD3EA4CE}"/>
-                </a:ext>
-              </a:extLst>
-            </p:cNvPr>
-            <p:cNvCxnSpPr>
-              <a:stCxn id="8" idx="2"/>
-              <a:endCxn id="30" idx="1"/>
-            </p:cNvCxnSpPr>
-            <p:nvPr/>
-          </p:nvCxnSpPr>
-          <p:spPr>
-            <a:xfrm rot="16200000" flipH="1">
-              <a:off x="4379494" y="5263111"/>
-              <a:ext cx="296779" cy="1299408"/>
-            </a:xfrm>
-            <a:prstGeom prst="bentConnector2">
-              <a:avLst/>
-            </a:prstGeom>
-            <a:ln w="12700">
-              <a:solidFill>
-                <a:srgbClr val="FF7C80"/>
-              </a:solidFill>
-              <a:tailEnd type="triangle"/>
-            </a:ln>
-          </p:spPr>
-          <p:style>
-            <a:lnRef idx="1">
-              <a:schemeClr val="accent1"/>
-            </a:lnRef>
-            <a:fillRef idx="0">
-              <a:schemeClr val="accent1"/>
-            </a:fillRef>
-            <a:effectRef idx="0">
-              <a:schemeClr val="accent1"/>
-            </a:effectRef>
-            <a:fontRef idx="minor">
-              <a:schemeClr val="tx1"/>
-            </a:fontRef>
-          </p:style>
-        </p:cxnSp>
-        <p:sp>
-          <p:nvSpPr>
-            <p:cNvPr id="36" name="TextBox 35">
-              <a:extLst>
-                <a:ext uri="{FF2B5EF4-FFF2-40B4-BE49-F238E27FC236}">
-                  <a16:creationId xmlns:a16="http://schemas.microsoft.com/office/drawing/2014/main" id="{026FF1F1-338C-4F48-8811-F9243B273734}"/>
-                </a:ext>
-              </a:extLst>
-            </p:cNvPr>
-            <p:cNvSpPr txBox="1"/>
-            <p:nvPr/>
-          </p:nvSpPr>
-          <p:spPr>
-            <a:xfrm>
-              <a:off x="4854281" y="2526519"/>
-              <a:ext cx="269626" cy="276999"/>
-            </a:xfrm>
-            <a:prstGeom prst="rect">
-              <a:avLst/>
-            </a:prstGeom>
-            <a:noFill/>
-          </p:spPr>
-          <p:txBody>
-            <a:bodyPr wrap="none" rtlCol="0">
-              <a:spAutoFit/>
-            </a:bodyPr>
-            <a:lstStyle/>
-            <a:p>
-              <a:r>
-                <a:rPr lang="en-US" sz="1200" dirty="0">
-                  <a:solidFill>
-                    <a:srgbClr val="FF7C80"/>
-                  </a:solidFill>
-                  <a:latin typeface="Open Sans" panose="020B0606030504020204" pitchFamily="34" charset="0"/>
-                  <a:ea typeface="Open Sans" panose="020B0606030504020204" pitchFamily="34" charset="0"/>
-                  <a:cs typeface="Open Sans" panose="020B0606030504020204" pitchFamily="34" charset="0"/>
-                </a:rPr>
-                <a:t>T</a:t>
-              </a:r>
-            </a:p>
-          </p:txBody>
-        </p:sp>
-        <p:sp>
-          <p:nvSpPr>
-            <p:cNvPr id="37" name="TextBox 36">
-              <a:extLst>
-                <a:ext uri="{FF2B5EF4-FFF2-40B4-BE49-F238E27FC236}">
-                  <a16:creationId xmlns:a16="http://schemas.microsoft.com/office/drawing/2014/main" id="{021392A3-D0C9-4305-86BD-5332188EA6CB}"/>
-                </a:ext>
-              </a:extLst>
-            </p:cNvPr>
-            <p:cNvSpPr txBox="1"/>
-            <p:nvPr/>
-          </p:nvSpPr>
-          <p:spPr>
-            <a:xfrm>
-              <a:off x="4854281" y="3769782"/>
-              <a:ext cx="269626" cy="276999"/>
-            </a:xfrm>
-            <a:prstGeom prst="rect">
-              <a:avLst/>
-            </a:prstGeom>
-            <a:noFill/>
-          </p:spPr>
-          <p:txBody>
-            <a:bodyPr wrap="none" rtlCol="0">
-              <a:spAutoFit/>
-            </a:bodyPr>
-            <a:lstStyle/>
-            <a:p>
-              <a:r>
-                <a:rPr lang="en-US" sz="1200" dirty="0">
-                  <a:solidFill>
-                    <a:srgbClr val="FF7C80"/>
-                  </a:solidFill>
-                  <a:latin typeface="Open Sans" panose="020B0606030504020204" pitchFamily="34" charset="0"/>
-                  <a:ea typeface="Open Sans" panose="020B0606030504020204" pitchFamily="34" charset="0"/>
-                  <a:cs typeface="Open Sans" panose="020B0606030504020204" pitchFamily="34" charset="0"/>
-                </a:rPr>
-                <a:t>T</a:t>
-              </a:r>
-            </a:p>
-          </p:txBody>
-        </p:sp>
-        <p:sp>
-          <p:nvSpPr>
-            <p:cNvPr id="38" name="TextBox 37">
-              <a:extLst>
-                <a:ext uri="{FF2B5EF4-FFF2-40B4-BE49-F238E27FC236}">
-                  <a16:creationId xmlns:a16="http://schemas.microsoft.com/office/drawing/2014/main" id="{741830F2-B1C3-4F7F-A19A-609F9A3B848C}"/>
-                </a:ext>
-              </a:extLst>
-            </p:cNvPr>
-            <p:cNvSpPr txBox="1"/>
-            <p:nvPr/>
-          </p:nvSpPr>
-          <p:spPr>
-            <a:xfrm>
-              <a:off x="4854281" y="5011906"/>
-              <a:ext cx="269626" cy="276999"/>
-            </a:xfrm>
-            <a:prstGeom prst="rect">
-              <a:avLst/>
-            </a:prstGeom>
-            <a:noFill/>
-          </p:spPr>
-          <p:txBody>
-            <a:bodyPr wrap="none" rtlCol="0">
-              <a:spAutoFit/>
-            </a:bodyPr>
-            <a:lstStyle/>
-            <a:p>
-              <a:r>
-                <a:rPr lang="en-US" sz="1200" dirty="0">
-                  <a:solidFill>
-                    <a:srgbClr val="FF7C80"/>
-                  </a:solidFill>
-                  <a:latin typeface="Open Sans" panose="020B0606030504020204" pitchFamily="34" charset="0"/>
-                  <a:ea typeface="Open Sans" panose="020B0606030504020204" pitchFamily="34" charset="0"/>
-                  <a:cs typeface="Open Sans" panose="020B0606030504020204" pitchFamily="34" charset="0"/>
-                </a:rPr>
-                <a:t>T</a:t>
-              </a:r>
-            </a:p>
-          </p:txBody>
-        </p:sp>
-        <p:sp>
-          <p:nvSpPr>
-            <p:cNvPr id="39" name="TextBox 38">
-              <a:extLst>
-                <a:ext uri="{FF2B5EF4-FFF2-40B4-BE49-F238E27FC236}">
-                  <a16:creationId xmlns:a16="http://schemas.microsoft.com/office/drawing/2014/main" id="{C8B085BA-4F97-4C99-BDA6-87889E1F708C}"/>
-                </a:ext>
-              </a:extLst>
-            </p:cNvPr>
-            <p:cNvSpPr txBox="1"/>
-            <p:nvPr/>
-          </p:nvSpPr>
-          <p:spPr>
-            <a:xfrm>
-              <a:off x="3608553" y="3277897"/>
-              <a:ext cx="269626" cy="276999"/>
-            </a:xfrm>
-            <a:prstGeom prst="rect">
-              <a:avLst/>
-            </a:prstGeom>
-            <a:noFill/>
-          </p:spPr>
-          <p:txBody>
-            <a:bodyPr wrap="none" rtlCol="0">
-              <a:spAutoFit/>
-            </a:bodyPr>
-            <a:lstStyle/>
-            <a:p>
-              <a:r>
-                <a:rPr lang="en-US" sz="1200" dirty="0">
-                  <a:solidFill>
-                    <a:srgbClr val="FF7C80"/>
-                  </a:solidFill>
-                  <a:latin typeface="Open Sans" panose="020B0606030504020204" pitchFamily="34" charset="0"/>
-                  <a:ea typeface="Open Sans" panose="020B0606030504020204" pitchFamily="34" charset="0"/>
-                  <a:cs typeface="Open Sans" panose="020B0606030504020204" pitchFamily="34" charset="0"/>
-                </a:rPr>
-                <a:t>F</a:t>
-              </a:r>
-            </a:p>
-          </p:txBody>
-        </p:sp>
-        <p:sp>
-          <p:nvSpPr>
-            <p:cNvPr id="40" name="TextBox 39">
-              <a:extLst>
-                <a:ext uri="{FF2B5EF4-FFF2-40B4-BE49-F238E27FC236}">
-                  <a16:creationId xmlns:a16="http://schemas.microsoft.com/office/drawing/2014/main" id="{D6D47987-88FE-4262-88A7-BD01262D32EB}"/>
-                </a:ext>
-              </a:extLst>
-            </p:cNvPr>
-            <p:cNvSpPr txBox="1"/>
-            <p:nvPr/>
-          </p:nvSpPr>
-          <p:spPr>
-            <a:xfrm>
-              <a:off x="3608553" y="4521161"/>
-              <a:ext cx="269626" cy="276999"/>
-            </a:xfrm>
-            <a:prstGeom prst="rect">
-              <a:avLst/>
-            </a:prstGeom>
-            <a:noFill/>
-          </p:spPr>
-          <p:txBody>
-            <a:bodyPr wrap="none" rtlCol="0">
-              <a:spAutoFit/>
-            </a:bodyPr>
-            <a:lstStyle/>
-            <a:p>
-              <a:r>
-                <a:rPr lang="en-US" sz="1200" dirty="0">
-                  <a:solidFill>
-                    <a:srgbClr val="FF7C80"/>
-                  </a:solidFill>
-                  <a:latin typeface="Open Sans" panose="020B0606030504020204" pitchFamily="34" charset="0"/>
-                  <a:ea typeface="Open Sans" panose="020B0606030504020204" pitchFamily="34" charset="0"/>
-                  <a:cs typeface="Open Sans" panose="020B0606030504020204" pitchFamily="34" charset="0"/>
-                </a:rPr>
-                <a:t>F</a:t>
-              </a:r>
-            </a:p>
-          </p:txBody>
-        </p:sp>
-        <p:sp>
-          <p:nvSpPr>
-            <p:cNvPr id="41" name="TextBox 40">
-              <a:extLst>
-                <a:ext uri="{FF2B5EF4-FFF2-40B4-BE49-F238E27FC236}">
-                  <a16:creationId xmlns:a16="http://schemas.microsoft.com/office/drawing/2014/main" id="{DDE17185-5F1B-431F-8A40-25E814C364CC}"/>
-                </a:ext>
-              </a:extLst>
-            </p:cNvPr>
-            <p:cNvSpPr txBox="1"/>
-            <p:nvPr/>
-          </p:nvSpPr>
-          <p:spPr>
-            <a:xfrm>
-              <a:off x="3608553" y="5764424"/>
-              <a:ext cx="269626" cy="276999"/>
-            </a:xfrm>
-            <a:prstGeom prst="rect">
-              <a:avLst/>
-            </a:prstGeom>
-            <a:noFill/>
-          </p:spPr>
-          <p:txBody>
-            <a:bodyPr wrap="none" rtlCol="0">
-              <a:spAutoFit/>
-            </a:bodyPr>
-            <a:lstStyle/>
-            <a:p>
-              <a:r>
-                <a:rPr lang="en-US" sz="1200" dirty="0">
-                  <a:solidFill>
-                    <a:srgbClr val="FF7C80"/>
-                  </a:solidFill>
-                  <a:latin typeface="Open Sans" panose="020B0606030504020204" pitchFamily="34" charset="0"/>
-                  <a:ea typeface="Open Sans" panose="020B0606030504020204" pitchFamily="34" charset="0"/>
-                  <a:cs typeface="Open Sans" panose="020B0606030504020204" pitchFamily="34" charset="0"/>
-                </a:rPr>
-                <a:t>F</a:t>
-              </a:r>
-            </a:p>
-          </p:txBody>
-        </p:sp>
-        <p:sp>
-          <p:nvSpPr>
-            <p:cNvPr id="43" name="Flowchart: Data 42">
-              <a:extLst>
-                <a:ext uri="{FF2B5EF4-FFF2-40B4-BE49-F238E27FC236}">
-                  <a16:creationId xmlns:a16="http://schemas.microsoft.com/office/drawing/2014/main" id="{83FFD052-AEAD-4743-812A-CEECDBB42BF6}"/>
-                </a:ext>
-              </a:extLst>
-            </p:cNvPr>
-            <p:cNvSpPr/>
-            <p:nvPr/>
-          </p:nvSpPr>
-          <p:spPr>
-            <a:xfrm>
-              <a:off x="7379367" y="1545350"/>
-              <a:ext cx="1844844" cy="489284"/>
-            </a:xfrm>
-            <a:prstGeom prst="flowChartInputOutput">
-              <a:avLst/>
-            </a:prstGeom>
-            <a:noFill/>
-            <a:ln>
-              <a:solidFill>
-                <a:srgbClr val="CC99FF"/>
-              </a:solidFill>
-            </a:ln>
-          </p:spPr>
-          <p:style>
-            <a:lnRef idx="2">
-              <a:schemeClr val="accent1">
-                <a:shade val="50000"/>
+            </a:solidFill>
+          </a:ln>
+        </p:spPr>
+        <p:style>
+          <a:lnRef idx="1">
+            <a:schemeClr val="accent1"/>
+          </a:lnRef>
+          <a:fillRef idx="0">
+            <a:schemeClr val="accent1"/>
+          </a:fillRef>
+          <a:effectRef idx="0">
+            <a:schemeClr val="accent1"/>
+          </a:effectRef>
+          <a:fontRef idx="minor">
+            <a:schemeClr val="tx1"/>
+          </a:fontRef>
+        </p:style>
+      </p:cxnSp>
+      <p:sp>
+        <p:nvSpPr>
+          <p:cNvPr id="5" name="Flowchart: Terminator 4">
+            <a:extLst>
+              <a:ext uri="{FF2B5EF4-FFF2-40B4-BE49-F238E27FC236}">
+                <a16:creationId xmlns:a16="http://schemas.microsoft.com/office/drawing/2014/main" id="{DEDE428B-CAC6-B926-1BE9-AEB7B568CFF2}"/>
+              </a:ext>
+            </a:extLst>
+          </p:cNvPr>
+          <p:cNvSpPr/>
+          <p:nvPr/>
+        </p:nvSpPr>
+        <p:spPr>
+          <a:xfrm>
+            <a:off x="3352800" y="699778"/>
+            <a:ext cx="1050758" cy="489284"/>
+          </a:xfrm>
+          <a:prstGeom prst="flowChartTerminator">
+            <a:avLst/>
+          </a:prstGeom>
+          <a:noFill/>
+          <a:ln>
+            <a:solidFill>
+              <a:schemeClr val="bg1">
+                <a:lumMod val="75000"/>
               </a:schemeClr>
-            </a:lnRef>
-            <a:fillRef idx="1">
-              <a:schemeClr val="accent1"/>
-            </a:fillRef>
-            <a:effectRef idx="0">
-              <a:schemeClr val="accent1"/>
-            </a:effectRef>
-            <a:fontRef idx="minor">
-              <a:schemeClr val="lt1"/>
-            </a:fontRef>
-          </p:style>
-          <p:txBody>
-            <a:bodyPr rtlCol="0" anchor="ctr"/>
-            <a:lstStyle/>
-            <a:p>
-              <a:pPr algn="ctr"/>
-              <a:r>
-                <a:rPr lang="en-US" sz="1200" dirty="0">
-                  <a:solidFill>
-                    <a:schemeClr val="bg1">
-                      <a:lumMod val="85000"/>
-                    </a:schemeClr>
-                  </a:solidFill>
-                  <a:latin typeface="Open Sans" panose="020B0606030504020204" pitchFamily="34" charset="0"/>
-                  <a:ea typeface="Open Sans" panose="020B0606030504020204" pitchFamily="34" charset="0"/>
-                  <a:cs typeface="Open Sans" panose="020B0606030504020204" pitchFamily="34" charset="0"/>
-                </a:rPr>
-                <a:t>Print fee</a:t>
-              </a:r>
-            </a:p>
-          </p:txBody>
-        </p:sp>
-        <p:cxnSp>
-          <p:nvCxnSpPr>
-            <p:cNvPr id="47" name="Connector: Elbow 46">
-              <a:extLst>
-                <a:ext uri="{FF2B5EF4-FFF2-40B4-BE49-F238E27FC236}">
-                  <a16:creationId xmlns:a16="http://schemas.microsoft.com/office/drawing/2014/main" id="{ED230FEA-0465-4B2C-A3B8-43A79370BD23}"/>
-                </a:ext>
-              </a:extLst>
-            </p:cNvPr>
-            <p:cNvCxnSpPr>
-              <a:cxnSpLocks/>
-              <a:stCxn id="30" idx="3"/>
-              <a:endCxn id="43" idx="4"/>
-            </p:cNvCxnSpPr>
-            <p:nvPr/>
-          </p:nvCxnSpPr>
-          <p:spPr>
-            <a:xfrm flipV="1">
-              <a:off x="7022431" y="2034634"/>
-              <a:ext cx="1279358" cy="4026571"/>
-            </a:xfrm>
-            <a:prstGeom prst="bentConnector2">
-              <a:avLst/>
-            </a:prstGeom>
-            <a:ln w="12700">
-              <a:solidFill>
-                <a:schemeClr val="bg1">
-                  <a:lumMod val="75000"/>
-                </a:schemeClr>
-              </a:solidFill>
-              <a:tailEnd type="triangle"/>
-            </a:ln>
-          </p:spPr>
-          <p:style>
-            <a:lnRef idx="1">
-              <a:schemeClr val="accent1"/>
-            </a:lnRef>
-            <a:fillRef idx="0">
-              <a:schemeClr val="accent1"/>
-            </a:fillRef>
-            <a:effectRef idx="0">
-              <a:schemeClr val="accent1"/>
-            </a:effectRef>
-            <a:fontRef idx="minor">
-              <a:schemeClr val="tx1"/>
-            </a:fontRef>
-          </p:style>
-        </p:cxnSp>
-        <p:cxnSp>
-          <p:nvCxnSpPr>
-            <p:cNvPr id="55" name="Straight Connector 54">
-              <a:extLst>
-                <a:ext uri="{FF2B5EF4-FFF2-40B4-BE49-F238E27FC236}">
-                  <a16:creationId xmlns:a16="http://schemas.microsoft.com/office/drawing/2014/main" id="{926EFA16-9636-40DD-B5F7-F2E2EEF1914D}"/>
-                </a:ext>
-              </a:extLst>
-            </p:cNvPr>
-            <p:cNvCxnSpPr>
-              <a:stCxn id="11" idx="3"/>
-            </p:cNvCxnSpPr>
-            <p:nvPr/>
-          </p:nvCxnSpPr>
-          <p:spPr>
-            <a:xfrm flipV="1">
-              <a:off x="7022431" y="2803518"/>
-              <a:ext cx="1279357" cy="1138"/>
-            </a:xfrm>
-            <a:prstGeom prst="line">
-              <a:avLst/>
-            </a:prstGeom>
-            <a:ln w="12700">
-              <a:solidFill>
-                <a:schemeClr val="bg1">
-                  <a:lumMod val="75000"/>
-                </a:schemeClr>
-              </a:solidFill>
-            </a:ln>
-          </p:spPr>
-          <p:style>
-            <a:lnRef idx="1">
-              <a:schemeClr val="accent1"/>
-            </a:lnRef>
-            <a:fillRef idx="0">
-              <a:schemeClr val="accent1"/>
-            </a:fillRef>
-            <a:effectRef idx="0">
-              <a:schemeClr val="accent1"/>
-            </a:effectRef>
-            <a:fontRef idx="minor">
-              <a:schemeClr val="tx1"/>
-            </a:fontRef>
-          </p:style>
-        </p:cxnSp>
-        <p:cxnSp>
-          <p:nvCxnSpPr>
-            <p:cNvPr id="56" name="Straight Connector 55">
-              <a:extLst>
-                <a:ext uri="{FF2B5EF4-FFF2-40B4-BE49-F238E27FC236}">
-                  <a16:creationId xmlns:a16="http://schemas.microsoft.com/office/drawing/2014/main" id="{183936C0-B393-49D7-A7EF-57AAEC68FD3E}"/>
-                </a:ext>
-              </a:extLst>
-            </p:cNvPr>
-            <p:cNvCxnSpPr/>
-            <p:nvPr/>
-          </p:nvCxnSpPr>
-          <p:spPr>
-            <a:xfrm flipV="1">
-              <a:off x="7022431" y="4046781"/>
-              <a:ext cx="1279357" cy="1138"/>
-            </a:xfrm>
-            <a:prstGeom prst="line">
-              <a:avLst/>
-            </a:prstGeom>
-            <a:ln w="12700">
-              <a:solidFill>
-                <a:schemeClr val="bg1">
-                  <a:lumMod val="75000"/>
-                </a:schemeClr>
-              </a:solidFill>
-            </a:ln>
-          </p:spPr>
-          <p:style>
-            <a:lnRef idx="1">
-              <a:schemeClr val="accent1"/>
-            </a:lnRef>
-            <a:fillRef idx="0">
-              <a:schemeClr val="accent1"/>
-            </a:fillRef>
-            <a:effectRef idx="0">
-              <a:schemeClr val="accent1"/>
-            </a:effectRef>
-            <a:fontRef idx="minor">
-              <a:schemeClr val="tx1"/>
-            </a:fontRef>
-          </p:style>
-        </p:cxnSp>
-        <p:cxnSp>
-          <p:nvCxnSpPr>
-            <p:cNvPr id="57" name="Straight Connector 56">
-              <a:extLst>
-                <a:ext uri="{FF2B5EF4-FFF2-40B4-BE49-F238E27FC236}">
-                  <a16:creationId xmlns:a16="http://schemas.microsoft.com/office/drawing/2014/main" id="{8B5C6E0D-2DE4-439E-9595-609E8DBADFE6}"/>
-                </a:ext>
-              </a:extLst>
-            </p:cNvPr>
-            <p:cNvCxnSpPr/>
-            <p:nvPr/>
-          </p:nvCxnSpPr>
-          <p:spPr>
-            <a:xfrm flipV="1">
-              <a:off x="7022431" y="5288905"/>
-              <a:ext cx="1279357" cy="1138"/>
-            </a:xfrm>
-            <a:prstGeom prst="line">
-              <a:avLst/>
-            </a:prstGeom>
-            <a:ln w="12700">
-              <a:solidFill>
-                <a:schemeClr val="bg1">
-                  <a:lumMod val="75000"/>
-                </a:schemeClr>
-              </a:solidFill>
-            </a:ln>
-          </p:spPr>
-          <p:style>
-            <a:lnRef idx="1">
-              <a:schemeClr val="accent1"/>
-            </a:lnRef>
-            <a:fillRef idx="0">
-              <a:schemeClr val="accent1"/>
-            </a:fillRef>
-            <a:effectRef idx="0">
-              <a:schemeClr val="accent1"/>
-            </a:effectRef>
-            <a:fontRef idx="minor">
-              <a:schemeClr val="tx1"/>
-            </a:fontRef>
-          </p:style>
-        </p:cxnSp>
-        <p:sp>
-          <p:nvSpPr>
-            <p:cNvPr id="5" name="Flowchart: Terminator 4">
-              <a:extLst>
-                <a:ext uri="{FF2B5EF4-FFF2-40B4-BE49-F238E27FC236}">
-                  <a16:creationId xmlns:a16="http://schemas.microsoft.com/office/drawing/2014/main" id="{DEDE428B-CAC6-B926-1BE9-AEB7B568CFF2}"/>
-                </a:ext>
-              </a:extLst>
-            </p:cNvPr>
-            <p:cNvSpPr/>
-            <p:nvPr/>
-          </p:nvSpPr>
-          <p:spPr>
-            <a:xfrm>
-              <a:off x="3352800" y="759286"/>
-              <a:ext cx="1050758" cy="489284"/>
-            </a:xfrm>
-            <a:prstGeom prst="flowChartTerminator">
-              <a:avLst/>
-            </a:prstGeom>
-            <a:noFill/>
-            <a:ln>
-              <a:solidFill>
-                <a:schemeClr val="bg1">
-                  <a:lumMod val="75000"/>
-                </a:schemeClr>
-              </a:solidFill>
-            </a:ln>
-          </p:spPr>
-          <p:style>
-            <a:lnRef idx="2">
-              <a:schemeClr val="accent1">
-                <a:shade val="50000"/>
+            </a:solidFill>
+          </a:ln>
+        </p:spPr>
+        <p:style>
+          <a:lnRef idx="2">
+            <a:schemeClr val="accent1">
+              <a:shade val="50000"/>
+            </a:schemeClr>
+          </a:lnRef>
+          <a:fillRef idx="1">
+            <a:schemeClr val="accent1"/>
+          </a:fillRef>
+          <a:effectRef idx="0">
+            <a:schemeClr val="accent1"/>
+          </a:effectRef>
+          <a:fontRef idx="minor">
+            <a:schemeClr val="lt1"/>
+          </a:fontRef>
+        </p:style>
+        <p:txBody>
+          <a:bodyPr rtlCol="0" anchor="ctr"/>
+          <a:lstStyle/>
+          <a:p>
+            <a:pPr algn="ctr"/>
+            <a:r>
+              <a:rPr lang="en-US" sz="1200" dirty="0">
+                <a:solidFill>
+                  <a:schemeClr val="bg1">
+                    <a:lumMod val="85000"/>
+                  </a:schemeClr>
+                </a:solidFill>
+                <a:latin typeface="Open Sans" panose="020B0606030504020204" pitchFamily="34" charset="0"/>
+                <a:ea typeface="Open Sans" panose="020B0606030504020204" pitchFamily="34" charset="0"/>
+                <a:cs typeface="Open Sans" panose="020B0606030504020204" pitchFamily="34" charset="0"/>
+              </a:rPr>
+              <a:t>Start</a:t>
+            </a:r>
+          </a:p>
+        </p:txBody>
+      </p:sp>
+      <p:sp>
+        <p:nvSpPr>
+          <p:cNvPr id="46" name="Flowchart: Terminator 45">
+            <a:extLst>
+              <a:ext uri="{FF2B5EF4-FFF2-40B4-BE49-F238E27FC236}">
+                <a16:creationId xmlns:a16="http://schemas.microsoft.com/office/drawing/2014/main" id="{E48E25D2-5C41-2F10-F5CF-D8F02FC6E93A}"/>
+              </a:ext>
+            </a:extLst>
+          </p:cNvPr>
+          <p:cNvSpPr/>
+          <p:nvPr/>
+        </p:nvSpPr>
+        <p:spPr>
+          <a:xfrm>
+            <a:off x="7776409" y="699778"/>
+            <a:ext cx="1050758" cy="489284"/>
+          </a:xfrm>
+          <a:prstGeom prst="flowChartTerminator">
+            <a:avLst/>
+          </a:prstGeom>
+          <a:noFill/>
+          <a:ln>
+            <a:solidFill>
+              <a:schemeClr val="bg1">
+                <a:lumMod val="75000"/>
               </a:schemeClr>
-            </a:lnRef>
-            <a:fillRef idx="1">
-              <a:schemeClr val="accent1"/>
-            </a:fillRef>
-            <a:effectRef idx="0">
-              <a:schemeClr val="accent1"/>
-            </a:effectRef>
-            <a:fontRef idx="minor">
-              <a:schemeClr val="lt1"/>
-            </a:fontRef>
-          </p:style>
-          <p:txBody>
-            <a:bodyPr rtlCol="0" anchor="ctr"/>
-            <a:lstStyle/>
-            <a:p>
-              <a:pPr algn="ctr"/>
-              <a:r>
-                <a:rPr lang="en-US" sz="1200" dirty="0">
-                  <a:solidFill>
-                    <a:schemeClr val="bg1">
-                      <a:lumMod val="85000"/>
-                    </a:schemeClr>
-                  </a:solidFill>
-                  <a:latin typeface="Open Sans" panose="020B0606030504020204" pitchFamily="34" charset="0"/>
-                  <a:ea typeface="Open Sans" panose="020B0606030504020204" pitchFamily="34" charset="0"/>
-                  <a:cs typeface="Open Sans" panose="020B0606030504020204" pitchFamily="34" charset="0"/>
-                </a:rPr>
-                <a:t>Start</a:t>
-              </a:r>
-            </a:p>
-          </p:txBody>
-        </p:sp>
-        <p:sp>
-          <p:nvSpPr>
-            <p:cNvPr id="46" name="Flowchart: Terminator 45">
-              <a:extLst>
-                <a:ext uri="{FF2B5EF4-FFF2-40B4-BE49-F238E27FC236}">
-                  <a16:creationId xmlns:a16="http://schemas.microsoft.com/office/drawing/2014/main" id="{E48E25D2-5C41-2F10-F5CF-D8F02FC6E93A}"/>
-                </a:ext>
-              </a:extLst>
-            </p:cNvPr>
-            <p:cNvSpPr/>
-            <p:nvPr/>
-          </p:nvSpPr>
-          <p:spPr>
-            <a:xfrm>
-              <a:off x="7776409" y="759286"/>
-              <a:ext cx="1050758" cy="489284"/>
-            </a:xfrm>
-            <a:prstGeom prst="flowChartTerminator">
-              <a:avLst/>
-            </a:prstGeom>
-            <a:noFill/>
-            <a:ln>
-              <a:solidFill>
-                <a:schemeClr val="bg1">
-                  <a:lumMod val="75000"/>
-                </a:schemeClr>
-              </a:solidFill>
-            </a:ln>
-          </p:spPr>
-          <p:style>
-            <a:lnRef idx="2">
-              <a:schemeClr val="accent1">
-                <a:shade val="50000"/>
+            </a:solidFill>
+          </a:ln>
+        </p:spPr>
+        <p:style>
+          <a:lnRef idx="2">
+            <a:schemeClr val="accent1">
+              <a:shade val="50000"/>
+            </a:schemeClr>
+          </a:lnRef>
+          <a:fillRef idx="1">
+            <a:schemeClr val="accent1"/>
+          </a:fillRef>
+          <a:effectRef idx="0">
+            <a:schemeClr val="accent1"/>
+          </a:effectRef>
+          <a:fontRef idx="minor">
+            <a:schemeClr val="lt1"/>
+          </a:fontRef>
+        </p:style>
+        <p:txBody>
+          <a:bodyPr rtlCol="0" anchor="ctr"/>
+          <a:lstStyle/>
+          <a:p>
+            <a:pPr algn="ctr"/>
+            <a:r>
+              <a:rPr lang="en-US" sz="1200" dirty="0">
+                <a:solidFill>
+                  <a:schemeClr val="bg1">
+                    <a:lumMod val="85000"/>
+                  </a:schemeClr>
+                </a:solidFill>
+                <a:latin typeface="Open Sans" panose="020B0606030504020204" pitchFamily="34" charset="0"/>
+                <a:ea typeface="Open Sans" panose="020B0606030504020204" pitchFamily="34" charset="0"/>
+                <a:cs typeface="Open Sans" panose="020B0606030504020204" pitchFamily="34" charset="0"/>
+              </a:rPr>
+              <a:t>Stop</a:t>
+            </a:r>
+          </a:p>
+        </p:txBody>
+      </p:sp>
+      <p:cxnSp>
+        <p:nvCxnSpPr>
+          <p:cNvPr id="9" name="Straight Arrow Connector 8">
+            <a:extLst>
+              <a:ext uri="{FF2B5EF4-FFF2-40B4-BE49-F238E27FC236}">
+                <a16:creationId xmlns:a16="http://schemas.microsoft.com/office/drawing/2014/main" id="{7A548BF5-95C9-2B30-17CF-B10813B86142}"/>
+              </a:ext>
+            </a:extLst>
+          </p:cNvPr>
+          <p:cNvCxnSpPr>
+            <a:stCxn id="5" idx="2"/>
+            <a:endCxn id="2" idx="1"/>
+          </p:cNvCxnSpPr>
+          <p:nvPr/>
+        </p:nvCxnSpPr>
+        <p:spPr>
+          <a:xfrm>
+            <a:off x="3878179" y="1189062"/>
+            <a:ext cx="0" cy="296780"/>
+          </a:xfrm>
+          <a:prstGeom prst="straightConnector1">
+            <a:avLst/>
+          </a:prstGeom>
+          <a:ln w="12700">
+            <a:solidFill>
+              <a:schemeClr val="bg1">
+                <a:lumMod val="75000"/>
               </a:schemeClr>
-            </a:lnRef>
-            <a:fillRef idx="1">
-              <a:schemeClr val="accent1"/>
-            </a:fillRef>
-            <a:effectRef idx="0">
-              <a:schemeClr val="accent1"/>
-            </a:effectRef>
-            <a:fontRef idx="minor">
-              <a:schemeClr val="lt1"/>
-            </a:fontRef>
-          </p:style>
-          <p:txBody>
-            <a:bodyPr rtlCol="0" anchor="ctr"/>
-            <a:lstStyle/>
-            <a:p>
-              <a:pPr algn="ctr"/>
-              <a:r>
-                <a:rPr lang="en-US" sz="1200" dirty="0">
-                  <a:solidFill>
-                    <a:schemeClr val="bg1">
-                      <a:lumMod val="85000"/>
-                    </a:schemeClr>
-                  </a:solidFill>
-                  <a:latin typeface="Open Sans" panose="020B0606030504020204" pitchFamily="34" charset="0"/>
-                  <a:ea typeface="Open Sans" panose="020B0606030504020204" pitchFamily="34" charset="0"/>
-                  <a:cs typeface="Open Sans" panose="020B0606030504020204" pitchFamily="34" charset="0"/>
-                </a:rPr>
-                <a:t>Stop</a:t>
-              </a:r>
-            </a:p>
-          </p:txBody>
-        </p:sp>
-        <p:cxnSp>
-          <p:nvCxnSpPr>
-            <p:cNvPr id="9" name="Straight Arrow Connector 8">
-              <a:extLst>
-                <a:ext uri="{FF2B5EF4-FFF2-40B4-BE49-F238E27FC236}">
-                  <a16:creationId xmlns:a16="http://schemas.microsoft.com/office/drawing/2014/main" id="{7A548BF5-95C9-2B30-17CF-B10813B86142}"/>
-                </a:ext>
-              </a:extLst>
-            </p:cNvPr>
-            <p:cNvCxnSpPr>
-              <a:stCxn id="5" idx="2"/>
-              <a:endCxn id="2" idx="1"/>
-            </p:cNvCxnSpPr>
-            <p:nvPr/>
-          </p:nvCxnSpPr>
-          <p:spPr>
-            <a:xfrm>
-              <a:off x="3878179" y="1248570"/>
-              <a:ext cx="0" cy="296780"/>
-            </a:xfrm>
-            <a:prstGeom prst="straightConnector1">
-              <a:avLst/>
-            </a:prstGeom>
-            <a:ln w="12700">
-              <a:solidFill>
-                <a:schemeClr val="bg1">
-                  <a:lumMod val="75000"/>
-                </a:schemeClr>
-              </a:solidFill>
-              <a:tailEnd type="triangle"/>
-            </a:ln>
-          </p:spPr>
-          <p:style>
-            <a:lnRef idx="1">
-              <a:schemeClr val="accent1"/>
-            </a:lnRef>
-            <a:fillRef idx="0">
-              <a:schemeClr val="accent1"/>
-            </a:fillRef>
-            <a:effectRef idx="0">
-              <a:schemeClr val="accent1"/>
-            </a:effectRef>
-            <a:fontRef idx="minor">
-              <a:schemeClr val="tx1"/>
-            </a:fontRef>
-          </p:style>
-        </p:cxnSp>
-        <p:cxnSp>
-          <p:nvCxnSpPr>
-            <p:cNvPr id="17" name="Straight Arrow Connector 16">
-              <a:extLst>
-                <a:ext uri="{FF2B5EF4-FFF2-40B4-BE49-F238E27FC236}">
-                  <a16:creationId xmlns:a16="http://schemas.microsoft.com/office/drawing/2014/main" id="{1D382808-0FB6-9DFC-5D11-C21C8027C421}"/>
-                </a:ext>
-              </a:extLst>
-            </p:cNvPr>
-            <p:cNvCxnSpPr>
-              <a:cxnSpLocks/>
-              <a:endCxn id="46" idx="2"/>
-            </p:cNvCxnSpPr>
-            <p:nvPr/>
-          </p:nvCxnSpPr>
-          <p:spPr>
-            <a:xfrm flipV="1">
-              <a:off x="8301788" y="1248570"/>
-              <a:ext cx="0" cy="296780"/>
-            </a:xfrm>
-            <a:prstGeom prst="straightConnector1">
-              <a:avLst/>
-            </a:prstGeom>
-            <a:ln w="12700">
-              <a:solidFill>
-                <a:srgbClr val="CC99FF"/>
-              </a:solidFill>
-              <a:tailEnd type="triangle"/>
-            </a:ln>
-          </p:spPr>
-          <p:style>
-            <a:lnRef idx="1">
-              <a:schemeClr val="accent1"/>
-            </a:lnRef>
-            <a:fillRef idx="0">
-              <a:schemeClr val="accent1"/>
-            </a:fillRef>
-            <a:effectRef idx="0">
-              <a:schemeClr val="accent1"/>
-            </a:effectRef>
-            <a:fontRef idx="minor">
-              <a:schemeClr val="tx1"/>
-            </a:fontRef>
-          </p:style>
-        </p:cxnSp>
-      </p:grpSp>
+            </a:solidFill>
+            <a:tailEnd type="triangle"/>
+          </a:ln>
+        </p:spPr>
+        <p:style>
+          <a:lnRef idx="1">
+            <a:schemeClr val="accent1"/>
+          </a:lnRef>
+          <a:fillRef idx="0">
+            <a:schemeClr val="accent1"/>
+          </a:fillRef>
+          <a:effectRef idx="0">
+            <a:schemeClr val="accent1"/>
+          </a:effectRef>
+          <a:fontRef idx="minor">
+            <a:schemeClr val="tx1"/>
+          </a:fontRef>
+        </p:style>
+      </p:cxnSp>
+      <p:cxnSp>
+        <p:nvCxnSpPr>
+          <p:cNvPr id="17" name="Straight Arrow Connector 16">
+            <a:extLst>
+              <a:ext uri="{FF2B5EF4-FFF2-40B4-BE49-F238E27FC236}">
+                <a16:creationId xmlns:a16="http://schemas.microsoft.com/office/drawing/2014/main" id="{1D382808-0FB6-9DFC-5D11-C21C8027C421}"/>
+              </a:ext>
+            </a:extLst>
+          </p:cNvPr>
+          <p:cNvCxnSpPr>
+            <a:cxnSpLocks/>
+            <a:endCxn id="46" idx="2"/>
+          </p:cNvCxnSpPr>
+          <p:nvPr/>
+        </p:nvCxnSpPr>
+        <p:spPr>
+          <a:xfrm flipV="1">
+            <a:off x="8301788" y="1189062"/>
+            <a:ext cx="0" cy="296780"/>
+          </a:xfrm>
+          <a:prstGeom prst="straightConnector1">
+            <a:avLst/>
+          </a:prstGeom>
+          <a:ln w="12700">
+            <a:solidFill>
+              <a:srgbClr val="CC99FF"/>
+            </a:solidFill>
+            <a:tailEnd type="triangle"/>
+          </a:ln>
+        </p:spPr>
+        <p:style>
+          <a:lnRef idx="1">
+            <a:schemeClr val="accent1"/>
+          </a:lnRef>
+          <a:fillRef idx="0">
+            <a:schemeClr val="accent1"/>
+          </a:fillRef>
+          <a:effectRef idx="0">
+            <a:schemeClr val="accent1"/>
+          </a:effectRef>
+          <a:fontRef idx="minor">
+            <a:schemeClr val="tx1"/>
+          </a:fontRef>
+        </p:style>
+      </p:cxnSp>
     </p:spTree>
     <p:extLst>
       <p:ext uri="{BB962C8B-B14F-4D97-AF65-F5344CB8AC3E}">
@@ -13663,6 +13643,1024 @@
 </p:sld>
 </file>
 
+<file path=ppt/slides/slide8.xml><?xml version="1.0" encoding="utf-8"?>
+<p:sld xmlns:a="http://schemas.openxmlformats.org/drawingml/2006/main" xmlns:r="http://schemas.openxmlformats.org/officeDocument/2006/relationships" xmlns:p="http://schemas.openxmlformats.org/presentationml/2006/main">
+  <p:cSld>
+    <p:spTree>
+      <p:nvGrpSpPr>
+        <p:cNvPr id="1" name=""/>
+        <p:cNvGrpSpPr/>
+        <p:nvPr/>
+      </p:nvGrpSpPr>
+      <p:grpSpPr>
+        <a:xfrm>
+          <a:off x="0" y="0"/>
+          <a:ext cx="0" cy="0"/>
+          <a:chOff x="0" y="0"/>
+          <a:chExt cx="0" cy="0"/>
+        </a:xfrm>
+      </p:grpSpPr>
+      <p:grpSp>
+        <p:nvGrpSpPr>
+          <p:cNvPr id="14" name="Group 13">
+            <a:extLst>
+              <a:ext uri="{FF2B5EF4-FFF2-40B4-BE49-F238E27FC236}">
+                <a16:creationId xmlns:a16="http://schemas.microsoft.com/office/drawing/2014/main" id="{02E97777-1F3E-176C-3364-FD4F2B8E2CD3}"/>
+              </a:ext>
+            </a:extLst>
+          </p:cNvPr>
+          <p:cNvGrpSpPr/>
+          <p:nvPr/>
+        </p:nvGrpSpPr>
+        <p:grpSpPr>
+          <a:xfrm>
+            <a:off x="2488066" y="1499635"/>
+            <a:ext cx="7215868" cy="3858729"/>
+            <a:chOff x="2488066" y="336282"/>
+            <a:chExt cx="7215868" cy="3858729"/>
+          </a:xfrm>
+        </p:grpSpPr>
+        <p:sp>
+          <p:nvSpPr>
+            <p:cNvPr id="108" name="Rectangle 107">
+              <a:extLst>
+                <a:ext uri="{FF2B5EF4-FFF2-40B4-BE49-F238E27FC236}">
+                  <a16:creationId xmlns:a16="http://schemas.microsoft.com/office/drawing/2014/main" id="{F5A5FD62-A99C-04B6-706B-DEE9B81AF541}"/>
+                </a:ext>
+              </a:extLst>
+            </p:cNvPr>
+            <p:cNvSpPr/>
+            <p:nvPr/>
+          </p:nvSpPr>
+          <p:spPr>
+            <a:xfrm>
+              <a:off x="2488066" y="336282"/>
+              <a:ext cx="7215868" cy="3858729"/>
+            </a:xfrm>
+            <a:prstGeom prst="rect">
+              <a:avLst/>
+            </a:prstGeom>
+            <a:solidFill>
+              <a:srgbClr val="0F1017"/>
+            </a:solidFill>
+            <a:ln w="12700">
+              <a:solidFill>
+                <a:schemeClr val="bg1">
+                  <a:lumMod val="75000"/>
+                </a:schemeClr>
+              </a:solidFill>
+            </a:ln>
+          </p:spPr>
+          <p:style>
+            <a:lnRef idx="2">
+              <a:schemeClr val="accent1">
+                <a:shade val="50000"/>
+              </a:schemeClr>
+            </a:lnRef>
+            <a:fillRef idx="1">
+              <a:schemeClr val="accent1"/>
+            </a:fillRef>
+            <a:effectRef idx="0">
+              <a:schemeClr val="accent1"/>
+            </a:effectRef>
+            <a:fontRef idx="minor">
+              <a:schemeClr val="lt1"/>
+            </a:fontRef>
+          </p:style>
+          <p:txBody>
+            <a:bodyPr rtlCol="0" anchor="ctr"/>
+            <a:lstStyle/>
+            <a:p>
+              <a:pPr algn="ctr"/>
+              <a:endParaRPr lang="en-US" sz="1800" dirty="0">
+                <a:solidFill>
+                  <a:schemeClr val="bg1">
+                    <a:lumMod val="85000"/>
+                  </a:schemeClr>
+                </a:solidFill>
+                <a:latin typeface="Open Sans" panose="020B0606030504020204" pitchFamily="34" charset="0"/>
+                <a:ea typeface="Open Sans" panose="020B0606030504020204" pitchFamily="34" charset="0"/>
+                <a:cs typeface="Open Sans" panose="020B0606030504020204" pitchFamily="34" charset="0"/>
+              </a:endParaRPr>
+            </a:p>
+          </p:txBody>
+        </p:sp>
+        <p:grpSp>
+          <p:nvGrpSpPr>
+            <p:cNvPr id="13" name="Group 12">
+              <a:extLst>
+                <a:ext uri="{FF2B5EF4-FFF2-40B4-BE49-F238E27FC236}">
+                  <a16:creationId xmlns:a16="http://schemas.microsoft.com/office/drawing/2014/main" id="{29AAC410-065F-093B-03CD-FB9D4FA1DA79}"/>
+                </a:ext>
+              </a:extLst>
+            </p:cNvPr>
+            <p:cNvGrpSpPr/>
+            <p:nvPr/>
+          </p:nvGrpSpPr>
+          <p:grpSpPr>
+            <a:xfrm>
+              <a:off x="2961773" y="834058"/>
+              <a:ext cx="6268454" cy="2863176"/>
+              <a:chOff x="2951748" y="831350"/>
+              <a:chExt cx="6268454" cy="2863176"/>
+            </a:xfrm>
+          </p:grpSpPr>
+          <p:sp>
+            <p:nvSpPr>
+              <p:cNvPr id="59" name="Flowchart: Terminator 58">
+                <a:extLst>
+                  <a:ext uri="{FF2B5EF4-FFF2-40B4-BE49-F238E27FC236}">
+                    <a16:creationId xmlns:a16="http://schemas.microsoft.com/office/drawing/2014/main" id="{D7554AAC-5F81-46CA-BA4E-6CDF6B8CC5AD}"/>
+                  </a:ext>
+                </a:extLst>
+              </p:cNvPr>
+              <p:cNvSpPr/>
+              <p:nvPr/>
+            </p:nvSpPr>
+            <p:spPr>
+              <a:xfrm>
+                <a:off x="3361788" y="831350"/>
+                <a:ext cx="1050758" cy="341690"/>
+              </a:xfrm>
+              <a:prstGeom prst="flowChartTerminator">
+                <a:avLst/>
+              </a:prstGeom>
+              <a:noFill/>
+              <a:ln>
+                <a:solidFill>
+                  <a:schemeClr val="bg1">
+                    <a:lumMod val="75000"/>
+                  </a:schemeClr>
+                </a:solidFill>
+              </a:ln>
+            </p:spPr>
+            <p:style>
+              <a:lnRef idx="2">
+                <a:schemeClr val="accent1">
+                  <a:shade val="50000"/>
+                </a:schemeClr>
+              </a:lnRef>
+              <a:fillRef idx="1">
+                <a:schemeClr val="accent1"/>
+              </a:fillRef>
+              <a:effectRef idx="0">
+                <a:schemeClr val="accent1"/>
+              </a:effectRef>
+              <a:fontRef idx="minor">
+                <a:schemeClr val="lt1"/>
+              </a:fontRef>
+            </p:style>
+            <p:txBody>
+              <a:bodyPr rtlCol="0" anchor="ctr"/>
+              <a:lstStyle/>
+              <a:p>
+                <a:pPr algn="ctr"/>
+                <a:r>
+                  <a:rPr lang="en-US" sz="1200" dirty="0">
+                    <a:solidFill>
+                      <a:schemeClr val="bg1">
+                        <a:lumMod val="85000"/>
+                      </a:schemeClr>
+                    </a:solidFill>
+                    <a:latin typeface="Open Sans" panose="020B0606030504020204" pitchFamily="34" charset="0"/>
+                    <a:ea typeface="Open Sans" panose="020B0606030504020204" pitchFamily="34" charset="0"/>
+                    <a:cs typeface="Open Sans" panose="020B0606030504020204" pitchFamily="34" charset="0"/>
+                  </a:rPr>
+                  <a:t>Start</a:t>
+                </a:r>
+              </a:p>
+            </p:txBody>
+          </p:sp>
+          <p:sp>
+            <p:nvSpPr>
+              <p:cNvPr id="60" name="Flowchart: Terminator 59">
+                <a:extLst>
+                  <a:ext uri="{FF2B5EF4-FFF2-40B4-BE49-F238E27FC236}">
+                    <a16:creationId xmlns:a16="http://schemas.microsoft.com/office/drawing/2014/main" id="{103191FC-37A5-724C-C214-882B4B9F6C89}"/>
+                  </a:ext>
+                </a:extLst>
+              </p:cNvPr>
+              <p:cNvSpPr/>
+              <p:nvPr/>
+            </p:nvSpPr>
+            <p:spPr>
+              <a:xfrm>
+                <a:off x="7779453" y="831350"/>
+                <a:ext cx="1050758" cy="341690"/>
+              </a:xfrm>
+              <a:prstGeom prst="flowChartTerminator">
+                <a:avLst/>
+              </a:prstGeom>
+              <a:noFill/>
+              <a:ln>
+                <a:solidFill>
+                  <a:schemeClr val="bg1">
+                    <a:lumMod val="75000"/>
+                  </a:schemeClr>
+                </a:solidFill>
+              </a:ln>
+            </p:spPr>
+            <p:style>
+              <a:lnRef idx="2">
+                <a:schemeClr val="accent1">
+                  <a:shade val="50000"/>
+                </a:schemeClr>
+              </a:lnRef>
+              <a:fillRef idx="1">
+                <a:schemeClr val="accent1"/>
+              </a:fillRef>
+              <a:effectRef idx="0">
+                <a:schemeClr val="accent1"/>
+              </a:effectRef>
+              <a:fontRef idx="minor">
+                <a:schemeClr val="lt1"/>
+              </a:fontRef>
+            </p:style>
+            <p:txBody>
+              <a:bodyPr rtlCol="0" anchor="ctr"/>
+              <a:lstStyle/>
+              <a:p>
+                <a:pPr algn="ctr"/>
+                <a:r>
+                  <a:rPr lang="en-US" sz="1200" dirty="0">
+                    <a:solidFill>
+                      <a:schemeClr val="bg1">
+                        <a:lumMod val="85000"/>
+                      </a:schemeClr>
+                    </a:solidFill>
+                    <a:latin typeface="Open Sans" panose="020B0606030504020204" pitchFamily="34" charset="0"/>
+                    <a:ea typeface="Open Sans" panose="020B0606030504020204" pitchFamily="34" charset="0"/>
+                    <a:cs typeface="Open Sans" panose="020B0606030504020204" pitchFamily="34" charset="0"/>
+                  </a:rPr>
+                  <a:t>Stop</a:t>
+                </a:r>
+              </a:p>
+            </p:txBody>
+          </p:sp>
+          <p:cxnSp>
+            <p:nvCxnSpPr>
+              <p:cNvPr id="61" name="Straight Arrow Connector 60">
+                <a:extLst>
+                  <a:ext uri="{FF2B5EF4-FFF2-40B4-BE49-F238E27FC236}">
+                    <a16:creationId xmlns:a16="http://schemas.microsoft.com/office/drawing/2014/main" id="{A1BBCFB3-141A-F3B8-67BE-C05995E64053}"/>
+                  </a:ext>
+                </a:extLst>
+              </p:cNvPr>
+              <p:cNvCxnSpPr>
+                <a:cxnSpLocks/>
+                <a:stCxn id="59" idx="2"/>
+              </p:cNvCxnSpPr>
+              <p:nvPr/>
+            </p:nvCxnSpPr>
+            <p:spPr>
+              <a:xfrm>
+                <a:off x="3887167" y="1173040"/>
+                <a:ext cx="0" cy="296780"/>
+              </a:xfrm>
+              <a:prstGeom prst="straightConnector1">
+                <a:avLst/>
+              </a:prstGeom>
+              <a:ln w="12700">
+                <a:solidFill>
+                  <a:schemeClr val="bg1">
+                    <a:lumMod val="75000"/>
+                  </a:schemeClr>
+                </a:solidFill>
+                <a:tailEnd type="triangle"/>
+              </a:ln>
+            </p:spPr>
+            <p:style>
+              <a:lnRef idx="1">
+                <a:schemeClr val="accent1"/>
+              </a:lnRef>
+              <a:fillRef idx="0">
+                <a:schemeClr val="accent1"/>
+              </a:fillRef>
+              <a:effectRef idx="0">
+                <a:schemeClr val="accent1"/>
+              </a:effectRef>
+              <a:fontRef idx="minor">
+                <a:schemeClr val="tx1"/>
+              </a:fontRef>
+            </p:style>
+          </p:cxnSp>
+          <p:cxnSp>
+            <p:nvCxnSpPr>
+              <p:cNvPr id="18" name="Straight Arrow Connector 17">
+                <a:extLst>
+                  <a:ext uri="{FF2B5EF4-FFF2-40B4-BE49-F238E27FC236}">
+                    <a16:creationId xmlns:a16="http://schemas.microsoft.com/office/drawing/2014/main" id="{28D76C1F-C45D-8EEF-E187-E9E48161CAB0}"/>
+                  </a:ext>
+                </a:extLst>
+              </p:cNvPr>
+              <p:cNvCxnSpPr>
+                <a:cxnSpLocks/>
+                <a:endCxn id="60" idx="2"/>
+              </p:cNvCxnSpPr>
+              <p:nvPr/>
+            </p:nvCxnSpPr>
+            <p:spPr>
+              <a:xfrm flipH="1" flipV="1">
+                <a:off x="8304832" y="1173040"/>
+                <a:ext cx="1" cy="296780"/>
+              </a:xfrm>
+              <a:prstGeom prst="straightConnector1">
+                <a:avLst/>
+              </a:prstGeom>
+              <a:ln w="12700">
+                <a:solidFill>
+                  <a:srgbClr val="CC99FF"/>
+                </a:solidFill>
+                <a:tailEnd type="triangle"/>
+              </a:ln>
+            </p:spPr>
+            <p:style>
+              <a:lnRef idx="1">
+                <a:schemeClr val="accent1"/>
+              </a:lnRef>
+              <a:fillRef idx="0">
+                <a:schemeClr val="accent1"/>
+              </a:fillRef>
+              <a:effectRef idx="0">
+                <a:schemeClr val="accent1"/>
+              </a:effectRef>
+              <a:fontRef idx="minor">
+                <a:schemeClr val="tx1"/>
+              </a:fontRef>
+            </p:style>
+          </p:cxnSp>
+          <p:sp>
+            <p:nvSpPr>
+              <p:cNvPr id="17" name="Flowchart: Data 16">
+                <a:extLst>
+                  <a:ext uri="{FF2B5EF4-FFF2-40B4-BE49-F238E27FC236}">
+                    <a16:creationId xmlns:a16="http://schemas.microsoft.com/office/drawing/2014/main" id="{9C67D293-3D10-0039-9433-BEABC94896D0}"/>
+                  </a:ext>
+                </a:extLst>
+              </p:cNvPr>
+              <p:cNvSpPr/>
+              <p:nvPr/>
+            </p:nvSpPr>
+            <p:spPr>
+              <a:xfrm>
+                <a:off x="2951748" y="1469820"/>
+                <a:ext cx="1844844" cy="489284"/>
+              </a:xfrm>
+              <a:prstGeom prst="flowChartInputOutput">
+                <a:avLst/>
+              </a:prstGeom>
+              <a:noFill/>
+              <a:ln>
+                <a:solidFill>
+                  <a:schemeClr val="accent1">
+                    <a:lumMod val="60000"/>
+                    <a:lumOff val="40000"/>
+                  </a:schemeClr>
+                </a:solidFill>
+              </a:ln>
+            </p:spPr>
+            <p:style>
+              <a:lnRef idx="2">
+                <a:schemeClr val="accent1">
+                  <a:shade val="50000"/>
+                </a:schemeClr>
+              </a:lnRef>
+              <a:fillRef idx="1">
+                <a:schemeClr val="accent1"/>
+              </a:fillRef>
+              <a:effectRef idx="0">
+                <a:schemeClr val="accent1"/>
+              </a:effectRef>
+              <a:fontRef idx="minor">
+                <a:schemeClr val="lt1"/>
+              </a:fontRef>
+            </p:style>
+            <p:txBody>
+              <a:bodyPr rtlCol="0" anchor="ctr"/>
+              <a:lstStyle/>
+              <a:p>
+                <a:pPr algn="ctr"/>
+                <a:r>
+                  <a:rPr lang="en-US" sz="1200" dirty="0">
+                    <a:solidFill>
+                      <a:schemeClr val="bg1">
+                        <a:lumMod val="85000"/>
+                      </a:schemeClr>
+                    </a:solidFill>
+                    <a:latin typeface="Open Sans" panose="020B0606030504020204" pitchFamily="34" charset="0"/>
+                    <a:ea typeface="Open Sans" panose="020B0606030504020204" pitchFamily="34" charset="0"/>
+                    <a:cs typeface="Open Sans" panose="020B0606030504020204" pitchFamily="34" charset="0"/>
+                  </a:rPr>
+                  <a:t>Read hour</a:t>
+                </a:r>
+              </a:p>
+            </p:txBody>
+          </p:sp>
+          <p:sp>
+            <p:nvSpPr>
+              <p:cNvPr id="19" name="Flowchart: Decision 18">
+                <a:extLst>
+                  <a:ext uri="{FF2B5EF4-FFF2-40B4-BE49-F238E27FC236}">
+                    <a16:creationId xmlns:a16="http://schemas.microsoft.com/office/drawing/2014/main" id="{F686A1FD-7758-FB63-015D-2C1E4D95A81C}"/>
+                  </a:ext>
+                </a:extLst>
+              </p:cNvPr>
+              <p:cNvSpPr/>
+              <p:nvPr/>
+            </p:nvSpPr>
+            <p:spPr>
+              <a:xfrm>
+                <a:off x="2951748" y="2255884"/>
+                <a:ext cx="1844844" cy="946484"/>
+              </a:xfrm>
+              <a:prstGeom prst="flowChartDecision">
+                <a:avLst/>
+              </a:prstGeom>
+              <a:noFill/>
+              <a:ln>
+                <a:solidFill>
+                  <a:srgbClr val="FF7C80"/>
+                </a:solidFill>
+              </a:ln>
+            </p:spPr>
+            <p:style>
+              <a:lnRef idx="2">
+                <a:schemeClr val="accent1">
+                  <a:shade val="50000"/>
+                </a:schemeClr>
+              </a:lnRef>
+              <a:fillRef idx="1">
+                <a:schemeClr val="accent1"/>
+              </a:fillRef>
+              <a:effectRef idx="0">
+                <a:schemeClr val="accent1"/>
+              </a:effectRef>
+              <a:fontRef idx="minor">
+                <a:schemeClr val="lt1"/>
+              </a:fontRef>
+            </p:style>
+            <p:txBody>
+              <a:bodyPr rtlCol="0" anchor="ctr"/>
+              <a:lstStyle/>
+              <a:p>
+                <a:pPr algn="ctr"/>
+                <a:r>
+                  <a:rPr lang="en-US" sz="1200" dirty="0">
+                    <a:solidFill>
+                      <a:schemeClr val="bg1">
+                        <a:lumMod val="85000"/>
+                      </a:schemeClr>
+                    </a:solidFill>
+                    <a:latin typeface="Open Sans" panose="020B0606030504020204" pitchFamily="34" charset="0"/>
+                    <a:ea typeface="Open Sans" panose="020B0606030504020204" pitchFamily="34" charset="0"/>
+                    <a:cs typeface="Open Sans" panose="020B0606030504020204" pitchFamily="34" charset="0"/>
+                  </a:rPr>
+                  <a:t>hour &gt; 12</a:t>
+                </a:r>
+              </a:p>
+            </p:txBody>
+          </p:sp>
+          <p:cxnSp>
+            <p:nvCxnSpPr>
+              <p:cNvPr id="22" name="Straight Arrow Connector 21">
+                <a:extLst>
+                  <a:ext uri="{FF2B5EF4-FFF2-40B4-BE49-F238E27FC236}">
+                    <a16:creationId xmlns:a16="http://schemas.microsoft.com/office/drawing/2014/main" id="{2E44111D-A9CC-1470-CFB5-647C64C32AE6}"/>
+                  </a:ext>
+                </a:extLst>
+              </p:cNvPr>
+              <p:cNvCxnSpPr>
+                <a:stCxn id="17" idx="4"/>
+                <a:endCxn id="19" idx="0"/>
+              </p:cNvCxnSpPr>
+              <p:nvPr/>
+            </p:nvCxnSpPr>
+            <p:spPr>
+              <a:xfrm>
+                <a:off x="3874170" y="1959104"/>
+                <a:ext cx="0" cy="296780"/>
+              </a:xfrm>
+              <a:prstGeom prst="straightConnector1">
+                <a:avLst/>
+              </a:prstGeom>
+              <a:ln w="12700">
+                <a:solidFill>
+                  <a:schemeClr val="accent1">
+                    <a:lumMod val="60000"/>
+                    <a:lumOff val="40000"/>
+                  </a:schemeClr>
+                </a:solidFill>
+                <a:tailEnd type="triangle"/>
+              </a:ln>
+            </p:spPr>
+            <p:style>
+              <a:lnRef idx="1">
+                <a:schemeClr val="accent1"/>
+              </a:lnRef>
+              <a:fillRef idx="0">
+                <a:schemeClr val="accent1"/>
+              </a:fillRef>
+              <a:effectRef idx="0">
+                <a:schemeClr val="accent1"/>
+              </a:effectRef>
+              <a:fontRef idx="minor">
+                <a:schemeClr val="tx1"/>
+              </a:fontRef>
+            </p:style>
+          </p:cxnSp>
+          <p:sp>
+            <p:nvSpPr>
+              <p:cNvPr id="23" name="Rectangle 22">
+                <a:extLst>
+                  <a:ext uri="{FF2B5EF4-FFF2-40B4-BE49-F238E27FC236}">
+                    <a16:creationId xmlns:a16="http://schemas.microsoft.com/office/drawing/2014/main" id="{74C77F9B-31BB-BC1E-CFB5-1FD306F88E07}"/>
+                  </a:ext>
+                </a:extLst>
+              </p:cNvPr>
+              <p:cNvSpPr/>
+              <p:nvPr/>
+            </p:nvSpPr>
+            <p:spPr>
+              <a:xfrm>
+                <a:off x="5173578" y="2459362"/>
+                <a:ext cx="1844844" cy="548640"/>
+              </a:xfrm>
+              <a:prstGeom prst="rect">
+                <a:avLst/>
+              </a:prstGeom>
+              <a:noFill/>
+              <a:ln>
+                <a:solidFill>
+                  <a:schemeClr val="accent6">
+                    <a:lumMod val="60000"/>
+                    <a:lumOff val="40000"/>
+                  </a:schemeClr>
+                </a:solidFill>
+              </a:ln>
+            </p:spPr>
+            <p:style>
+              <a:lnRef idx="2">
+                <a:schemeClr val="accent1">
+                  <a:shade val="50000"/>
+                </a:schemeClr>
+              </a:lnRef>
+              <a:fillRef idx="1">
+                <a:schemeClr val="accent1"/>
+              </a:fillRef>
+              <a:effectRef idx="0">
+                <a:schemeClr val="accent1"/>
+              </a:effectRef>
+              <a:fontRef idx="minor">
+                <a:schemeClr val="lt1"/>
+              </a:fontRef>
+            </p:style>
+            <p:txBody>
+              <a:bodyPr rtlCol="0" anchor="ctr"/>
+              <a:lstStyle/>
+              <a:p>
+                <a:pPr algn="ctr"/>
+                <a:r>
+                  <a:rPr lang="en-US" sz="1200" dirty="0">
+                    <a:solidFill>
+                      <a:schemeClr val="bg1">
+                        <a:lumMod val="85000"/>
+                      </a:schemeClr>
+                    </a:solidFill>
+                    <a:latin typeface="Open Sans" panose="020B0606030504020204" pitchFamily="34" charset="0"/>
+                    <a:ea typeface="Open Sans" panose="020B0606030504020204" pitchFamily="34" charset="0"/>
+                    <a:cs typeface="Open Sans" panose="020B0606030504020204" pitchFamily="34" charset="0"/>
+                  </a:rPr>
+                  <a:t>allowance = 12 * 100 + </a:t>
+                </a:r>
+              </a:p>
+              <a:p>
+                <a:pPr algn="ctr"/>
+                <a:r>
+                  <a:rPr lang="en-US" sz="1200" dirty="0">
+                    <a:solidFill>
+                      <a:schemeClr val="bg1">
+                        <a:lumMod val="85000"/>
+                      </a:schemeClr>
+                    </a:solidFill>
+                    <a:latin typeface="Open Sans" panose="020B0606030504020204" pitchFamily="34" charset="0"/>
+                    <a:ea typeface="Open Sans" panose="020B0606030504020204" pitchFamily="34" charset="0"/>
+                    <a:cs typeface="Open Sans" panose="020B0606030504020204" pitchFamily="34" charset="0"/>
+                  </a:rPr>
+                  <a:t>(hour – 12 ) * 50</a:t>
+                </a:r>
+              </a:p>
+            </p:txBody>
+          </p:sp>
+          <p:sp>
+            <p:nvSpPr>
+              <p:cNvPr id="33" name="Rectangle 32">
+                <a:extLst>
+                  <a:ext uri="{FF2B5EF4-FFF2-40B4-BE49-F238E27FC236}">
+                    <a16:creationId xmlns:a16="http://schemas.microsoft.com/office/drawing/2014/main" id="{F7BAACCF-F54F-0C78-3078-658F66426F29}"/>
+                  </a:ext>
+                </a:extLst>
+              </p:cNvPr>
+              <p:cNvSpPr/>
+              <p:nvPr/>
+            </p:nvSpPr>
+            <p:spPr>
+              <a:xfrm>
+                <a:off x="5173578" y="3301494"/>
+                <a:ext cx="1844844" cy="393032"/>
+              </a:xfrm>
+              <a:prstGeom prst="rect">
+                <a:avLst/>
+              </a:prstGeom>
+              <a:noFill/>
+              <a:ln>
+                <a:solidFill>
+                  <a:schemeClr val="accent6">
+                    <a:lumMod val="60000"/>
+                    <a:lumOff val="40000"/>
+                  </a:schemeClr>
+                </a:solidFill>
+              </a:ln>
+            </p:spPr>
+            <p:style>
+              <a:lnRef idx="2">
+                <a:schemeClr val="accent1">
+                  <a:shade val="50000"/>
+                </a:schemeClr>
+              </a:lnRef>
+              <a:fillRef idx="1">
+                <a:schemeClr val="accent1"/>
+              </a:fillRef>
+              <a:effectRef idx="0">
+                <a:schemeClr val="accent1"/>
+              </a:effectRef>
+              <a:fontRef idx="minor">
+                <a:schemeClr val="lt1"/>
+              </a:fontRef>
+            </p:style>
+            <p:txBody>
+              <a:bodyPr rtlCol="0" anchor="ctr"/>
+              <a:lstStyle/>
+              <a:p>
+                <a:pPr algn="ctr"/>
+                <a:r>
+                  <a:rPr lang="en-US" sz="1200" dirty="0">
+                    <a:solidFill>
+                      <a:schemeClr val="bg1">
+                        <a:lumMod val="85000"/>
+                      </a:schemeClr>
+                    </a:solidFill>
+                    <a:latin typeface="Open Sans" panose="020B0606030504020204" pitchFamily="34" charset="0"/>
+                    <a:ea typeface="Open Sans" panose="020B0606030504020204" pitchFamily="34" charset="0"/>
+                    <a:cs typeface="Open Sans" panose="020B0606030504020204" pitchFamily="34" charset="0"/>
+                  </a:rPr>
+                  <a:t>allowance = hour * 100</a:t>
+                </a:r>
+              </a:p>
+            </p:txBody>
+          </p:sp>
+          <p:cxnSp>
+            <p:nvCxnSpPr>
+              <p:cNvPr id="34" name="Connector: Elbow 33">
+                <a:extLst>
+                  <a:ext uri="{FF2B5EF4-FFF2-40B4-BE49-F238E27FC236}">
+                    <a16:creationId xmlns:a16="http://schemas.microsoft.com/office/drawing/2014/main" id="{471CC8EC-D426-D9D1-DD76-2066DE613333}"/>
+                  </a:ext>
+                </a:extLst>
+              </p:cNvPr>
+              <p:cNvCxnSpPr>
+                <a:cxnSpLocks/>
+                <a:endCxn id="33" idx="1"/>
+              </p:cNvCxnSpPr>
+              <p:nvPr/>
+            </p:nvCxnSpPr>
+            <p:spPr>
+              <a:xfrm rot="16200000" flipH="1">
+                <a:off x="4375485" y="2699916"/>
+                <a:ext cx="296779" cy="1299408"/>
+              </a:xfrm>
+              <a:prstGeom prst="bentConnector2">
+                <a:avLst/>
+              </a:prstGeom>
+              <a:ln w="12700">
+                <a:solidFill>
+                  <a:srgbClr val="FF7C80"/>
+                </a:solidFill>
+                <a:tailEnd type="triangle"/>
+              </a:ln>
+            </p:spPr>
+            <p:style>
+              <a:lnRef idx="1">
+                <a:schemeClr val="accent1"/>
+              </a:lnRef>
+              <a:fillRef idx="0">
+                <a:schemeClr val="accent1"/>
+              </a:fillRef>
+              <a:effectRef idx="0">
+                <a:schemeClr val="accent1"/>
+              </a:effectRef>
+              <a:fontRef idx="minor">
+                <a:schemeClr val="tx1"/>
+              </a:fontRef>
+            </p:style>
+          </p:cxnSp>
+          <p:sp>
+            <p:nvSpPr>
+              <p:cNvPr id="40" name="TextBox 39">
+                <a:extLst>
+                  <a:ext uri="{FF2B5EF4-FFF2-40B4-BE49-F238E27FC236}">
+                    <a16:creationId xmlns:a16="http://schemas.microsoft.com/office/drawing/2014/main" id="{76AE0D0B-8177-07D5-789B-EED3B5BB964A}"/>
+                  </a:ext>
+                </a:extLst>
+              </p:cNvPr>
+              <p:cNvSpPr txBox="1"/>
+              <p:nvPr/>
+            </p:nvSpPr>
+            <p:spPr>
+              <a:xfrm>
+                <a:off x="3604544" y="3201229"/>
+                <a:ext cx="269626" cy="276999"/>
+              </a:xfrm>
+              <a:prstGeom prst="rect">
+                <a:avLst/>
+              </a:prstGeom>
+              <a:noFill/>
+            </p:spPr>
+            <p:txBody>
+              <a:bodyPr wrap="none" rtlCol="0">
+                <a:spAutoFit/>
+              </a:bodyPr>
+              <a:lstStyle/>
+              <a:p>
+                <a:r>
+                  <a:rPr lang="en-US" sz="1200" dirty="0">
+                    <a:solidFill>
+                      <a:srgbClr val="FF7C80"/>
+                    </a:solidFill>
+                    <a:latin typeface="Open Sans" panose="020B0606030504020204" pitchFamily="34" charset="0"/>
+                    <a:ea typeface="Open Sans" panose="020B0606030504020204" pitchFamily="34" charset="0"/>
+                    <a:cs typeface="Open Sans" panose="020B0606030504020204" pitchFamily="34" charset="0"/>
+                  </a:rPr>
+                  <a:t>F</a:t>
+                </a:r>
+              </a:p>
+            </p:txBody>
+          </p:sp>
+          <p:sp>
+            <p:nvSpPr>
+              <p:cNvPr id="41" name="Flowchart: Data 40">
+                <a:extLst>
+                  <a:ext uri="{FF2B5EF4-FFF2-40B4-BE49-F238E27FC236}">
+                    <a16:creationId xmlns:a16="http://schemas.microsoft.com/office/drawing/2014/main" id="{05EA567D-BF83-DA3D-9ED7-2BA3CE5720F6}"/>
+                  </a:ext>
+                </a:extLst>
+              </p:cNvPr>
+              <p:cNvSpPr/>
+              <p:nvPr/>
+            </p:nvSpPr>
+            <p:spPr>
+              <a:xfrm>
+                <a:off x="7375358" y="1469820"/>
+                <a:ext cx="1844844" cy="489284"/>
+              </a:xfrm>
+              <a:prstGeom prst="flowChartInputOutput">
+                <a:avLst/>
+              </a:prstGeom>
+              <a:noFill/>
+              <a:ln>
+                <a:solidFill>
+                  <a:srgbClr val="CC99FF"/>
+                </a:solidFill>
+              </a:ln>
+            </p:spPr>
+            <p:style>
+              <a:lnRef idx="2">
+                <a:schemeClr val="accent1">
+                  <a:shade val="50000"/>
+                </a:schemeClr>
+              </a:lnRef>
+              <a:fillRef idx="1">
+                <a:schemeClr val="accent1"/>
+              </a:fillRef>
+              <a:effectRef idx="0">
+                <a:schemeClr val="accent1"/>
+              </a:effectRef>
+              <a:fontRef idx="minor">
+                <a:schemeClr val="lt1"/>
+              </a:fontRef>
+            </p:style>
+            <p:txBody>
+              <a:bodyPr rtlCol="0" anchor="ctr"/>
+              <a:lstStyle/>
+              <a:p>
+                <a:pPr algn="ctr"/>
+                <a:r>
+                  <a:rPr lang="en-US" sz="1200" dirty="0">
+                    <a:solidFill>
+                      <a:schemeClr val="bg1">
+                        <a:lumMod val="85000"/>
+                      </a:schemeClr>
+                    </a:solidFill>
+                    <a:latin typeface="Open Sans" panose="020B0606030504020204" pitchFamily="34" charset="0"/>
+                    <a:ea typeface="Open Sans" panose="020B0606030504020204" pitchFamily="34" charset="0"/>
+                    <a:cs typeface="Open Sans" panose="020B0606030504020204" pitchFamily="34" charset="0"/>
+                  </a:rPr>
+                  <a:t>Print allowance</a:t>
+                </a:r>
+              </a:p>
+            </p:txBody>
+          </p:sp>
+          <p:cxnSp>
+            <p:nvCxnSpPr>
+              <p:cNvPr id="42" name="Connector: Elbow 41">
+                <a:extLst>
+                  <a:ext uri="{FF2B5EF4-FFF2-40B4-BE49-F238E27FC236}">
+                    <a16:creationId xmlns:a16="http://schemas.microsoft.com/office/drawing/2014/main" id="{472EC0BF-7402-CCE8-EE65-687C99E9F3C0}"/>
+                  </a:ext>
+                </a:extLst>
+              </p:cNvPr>
+              <p:cNvCxnSpPr>
+                <a:cxnSpLocks/>
+                <a:stCxn id="33" idx="3"/>
+                <a:endCxn id="41" idx="4"/>
+              </p:cNvCxnSpPr>
+              <p:nvPr/>
+            </p:nvCxnSpPr>
+            <p:spPr>
+              <a:xfrm flipV="1">
+                <a:off x="7018422" y="1959104"/>
+                <a:ext cx="1279358" cy="1538906"/>
+              </a:xfrm>
+              <a:prstGeom prst="bentConnector2">
+                <a:avLst/>
+              </a:prstGeom>
+              <a:ln w="12700">
+                <a:solidFill>
+                  <a:schemeClr val="bg1">
+                    <a:lumMod val="75000"/>
+                  </a:schemeClr>
+                </a:solidFill>
+                <a:tailEnd type="triangle"/>
+              </a:ln>
+            </p:spPr>
+            <p:style>
+              <a:lnRef idx="1">
+                <a:schemeClr val="accent1"/>
+              </a:lnRef>
+              <a:fillRef idx="0">
+                <a:schemeClr val="accent1"/>
+              </a:fillRef>
+              <a:effectRef idx="0">
+                <a:schemeClr val="accent1"/>
+              </a:effectRef>
+              <a:fontRef idx="minor">
+                <a:schemeClr val="tx1"/>
+              </a:fontRef>
+            </p:style>
+          </p:cxnSp>
+          <p:cxnSp>
+            <p:nvCxnSpPr>
+              <p:cNvPr id="47" name="Straight Arrow Connector 46">
+                <a:extLst>
+                  <a:ext uri="{FF2B5EF4-FFF2-40B4-BE49-F238E27FC236}">
+                    <a16:creationId xmlns:a16="http://schemas.microsoft.com/office/drawing/2014/main" id="{76843882-A9A0-F10A-A34C-F59A9202B394}"/>
+                  </a:ext>
+                </a:extLst>
+              </p:cNvPr>
+              <p:cNvCxnSpPr/>
+              <p:nvPr/>
+            </p:nvCxnSpPr>
+            <p:spPr>
+              <a:xfrm>
+                <a:off x="4796592" y="2729126"/>
+                <a:ext cx="376986" cy="0"/>
+              </a:xfrm>
+              <a:prstGeom prst="straightConnector1">
+                <a:avLst/>
+              </a:prstGeom>
+              <a:ln w="12700">
+                <a:solidFill>
+                  <a:srgbClr val="FF7C80"/>
+                </a:solidFill>
+                <a:tailEnd type="triangle"/>
+              </a:ln>
+            </p:spPr>
+            <p:style>
+              <a:lnRef idx="1">
+                <a:schemeClr val="accent1"/>
+              </a:lnRef>
+              <a:fillRef idx="0">
+                <a:schemeClr val="accent1"/>
+              </a:fillRef>
+              <a:effectRef idx="0">
+                <a:schemeClr val="accent1"/>
+              </a:effectRef>
+              <a:fontRef idx="minor">
+                <a:schemeClr val="tx1"/>
+              </a:fontRef>
+            </p:style>
+          </p:cxnSp>
+          <p:sp>
+            <p:nvSpPr>
+              <p:cNvPr id="48" name="TextBox 47">
+                <a:extLst>
+                  <a:ext uri="{FF2B5EF4-FFF2-40B4-BE49-F238E27FC236}">
+                    <a16:creationId xmlns:a16="http://schemas.microsoft.com/office/drawing/2014/main" id="{37764B92-6EAF-519A-BF4F-BBBEE74ED796}"/>
+                  </a:ext>
+                </a:extLst>
+              </p:cNvPr>
+              <p:cNvSpPr txBox="1"/>
+              <p:nvPr/>
+            </p:nvSpPr>
+            <p:spPr>
+              <a:xfrm>
+                <a:off x="4850272" y="2450989"/>
+                <a:ext cx="269626" cy="276999"/>
+              </a:xfrm>
+              <a:prstGeom prst="rect">
+                <a:avLst/>
+              </a:prstGeom>
+              <a:noFill/>
+            </p:spPr>
+            <p:txBody>
+              <a:bodyPr wrap="none" rtlCol="0">
+                <a:spAutoFit/>
+              </a:bodyPr>
+              <a:lstStyle/>
+              <a:p>
+                <a:r>
+                  <a:rPr lang="en-US" sz="1200" dirty="0">
+                    <a:solidFill>
+                      <a:srgbClr val="FF7C80"/>
+                    </a:solidFill>
+                    <a:latin typeface="Open Sans" panose="020B0606030504020204" pitchFamily="34" charset="0"/>
+                    <a:ea typeface="Open Sans" panose="020B0606030504020204" pitchFamily="34" charset="0"/>
+                    <a:cs typeface="Open Sans" panose="020B0606030504020204" pitchFamily="34" charset="0"/>
+                  </a:rPr>
+                  <a:t>T</a:t>
+                </a:r>
+              </a:p>
+            </p:txBody>
+          </p:sp>
+          <p:cxnSp>
+            <p:nvCxnSpPr>
+              <p:cNvPr id="12" name="Straight Connector 11">
+                <a:extLst>
+                  <a:ext uri="{FF2B5EF4-FFF2-40B4-BE49-F238E27FC236}">
+                    <a16:creationId xmlns:a16="http://schemas.microsoft.com/office/drawing/2014/main" id="{A3DA82D6-A38D-CD05-FF8F-BCBA97F4F5DA}"/>
+                  </a:ext>
+                </a:extLst>
+              </p:cNvPr>
+              <p:cNvCxnSpPr>
+                <a:stCxn id="23" idx="3"/>
+              </p:cNvCxnSpPr>
+              <p:nvPr/>
+            </p:nvCxnSpPr>
+            <p:spPr>
+              <a:xfrm flipV="1">
+                <a:off x="7018422" y="2727988"/>
+                <a:ext cx="1286410" cy="5694"/>
+              </a:xfrm>
+              <a:prstGeom prst="line">
+                <a:avLst/>
+              </a:prstGeom>
+              <a:ln w="12700">
+                <a:solidFill>
+                  <a:schemeClr val="bg1">
+                    <a:lumMod val="75000"/>
+                  </a:schemeClr>
+                </a:solidFill>
+              </a:ln>
+            </p:spPr>
+            <p:style>
+              <a:lnRef idx="1">
+                <a:schemeClr val="accent1"/>
+              </a:lnRef>
+              <a:fillRef idx="0">
+                <a:schemeClr val="accent1"/>
+              </a:fillRef>
+              <a:effectRef idx="0">
+                <a:schemeClr val="accent1"/>
+              </a:effectRef>
+              <a:fontRef idx="minor">
+                <a:schemeClr val="tx1"/>
+              </a:fontRef>
+            </p:style>
+          </p:cxnSp>
+        </p:grpSp>
+      </p:grpSp>
+    </p:spTree>
+    <p:extLst>
+      <p:ext uri="{BB962C8B-B14F-4D97-AF65-F5344CB8AC3E}">
+        <p14:creationId xmlns:p14="http://schemas.microsoft.com/office/powerpoint/2010/main" val="2262971189"/>
+      </p:ext>
+    </p:extLst>
+  </p:cSld>
+  <p:clrMapOvr>
+    <a:masterClrMapping/>
+  </p:clrMapOvr>
+</p:sld>
+</file>
+
 <file path=ppt/theme/theme1.xml><?xml version="1.0" encoding="utf-8"?>
 <a:theme xmlns:a="http://schemas.openxmlformats.org/drawingml/2006/main" name="Office Theme">
   <a:themeElements>

</xml_diff>

<commit_message>
Added Flowchart for PrePSPM2021_KMNS
</commit_message>
<xml_diff>
--- a/Past Year Theory Questions/Resources/resources.pptx
+++ b/Past Year Theory Questions/Resources/resources.pptx
@@ -14,6 +14,7 @@
     <p:sldId id="263" r:id="rId8"/>
     <p:sldId id="264" r:id="rId9"/>
     <p:sldId id="265" r:id="rId10"/>
+    <p:sldId id="266" r:id="rId11"/>
   </p:sldIdLst>
   <p:sldSz cx="12192000" cy="6858000"/>
   <p:notesSz cx="6858000" cy="9144000"/>
@@ -4986,6 +4987,909 @@
 </p:sld>
 </file>
 
+<file path=ppt/slides/slide10.xml><?xml version="1.0" encoding="utf-8"?>
+<p:sld xmlns:a="http://schemas.openxmlformats.org/drawingml/2006/main" xmlns:r="http://schemas.openxmlformats.org/officeDocument/2006/relationships" xmlns:p="http://schemas.openxmlformats.org/presentationml/2006/main">
+  <p:cSld>
+    <p:spTree>
+      <p:nvGrpSpPr>
+        <p:cNvPr id="1" name=""/>
+        <p:cNvGrpSpPr/>
+        <p:nvPr/>
+      </p:nvGrpSpPr>
+      <p:grpSpPr>
+        <a:xfrm>
+          <a:off x="0" y="0"/>
+          <a:ext cx="0" cy="0"/>
+          <a:chOff x="0" y="0"/>
+          <a:chExt cx="0" cy="0"/>
+        </a:xfrm>
+      </p:grpSpPr>
+      <p:grpSp>
+        <p:nvGrpSpPr>
+          <p:cNvPr id="5" name="Group 4">
+            <a:extLst>
+              <a:ext uri="{FF2B5EF4-FFF2-40B4-BE49-F238E27FC236}">
+                <a16:creationId xmlns:a16="http://schemas.microsoft.com/office/drawing/2014/main" id="{30F50D98-7248-C0AD-4D35-0B1AC863AB24}"/>
+              </a:ext>
+            </a:extLst>
+          </p:cNvPr>
+          <p:cNvGrpSpPr/>
+          <p:nvPr/>
+        </p:nvGrpSpPr>
+        <p:grpSpPr>
+          <a:xfrm>
+            <a:off x="2488066" y="1587566"/>
+            <a:ext cx="7215868" cy="3192981"/>
+            <a:chOff x="2488066" y="1587566"/>
+            <a:chExt cx="7215868" cy="3192981"/>
+          </a:xfrm>
+        </p:grpSpPr>
+        <p:sp>
+          <p:nvSpPr>
+            <p:cNvPr id="108" name="Rectangle 107">
+              <a:extLst>
+                <a:ext uri="{FF2B5EF4-FFF2-40B4-BE49-F238E27FC236}">
+                  <a16:creationId xmlns:a16="http://schemas.microsoft.com/office/drawing/2014/main" id="{F5A5FD62-A99C-04B6-706B-DEE9B81AF541}"/>
+                </a:ext>
+              </a:extLst>
+            </p:cNvPr>
+            <p:cNvSpPr/>
+            <p:nvPr/>
+          </p:nvSpPr>
+          <p:spPr>
+            <a:xfrm>
+              <a:off x="2488066" y="1587566"/>
+              <a:ext cx="7215868" cy="3192981"/>
+            </a:xfrm>
+            <a:prstGeom prst="rect">
+              <a:avLst/>
+            </a:prstGeom>
+            <a:solidFill>
+              <a:srgbClr val="0F1017"/>
+            </a:solidFill>
+            <a:ln w="12700">
+              <a:solidFill>
+                <a:schemeClr val="bg1">
+                  <a:lumMod val="75000"/>
+                </a:schemeClr>
+              </a:solidFill>
+            </a:ln>
+          </p:spPr>
+          <p:style>
+            <a:lnRef idx="2">
+              <a:schemeClr val="accent1">
+                <a:shade val="50000"/>
+              </a:schemeClr>
+            </a:lnRef>
+            <a:fillRef idx="1">
+              <a:schemeClr val="accent1"/>
+            </a:fillRef>
+            <a:effectRef idx="0">
+              <a:schemeClr val="accent1"/>
+            </a:effectRef>
+            <a:fontRef idx="minor">
+              <a:schemeClr val="lt1"/>
+            </a:fontRef>
+          </p:style>
+          <p:txBody>
+            <a:bodyPr rtlCol="0" anchor="ctr"/>
+            <a:lstStyle/>
+            <a:p>
+              <a:pPr algn="ctr"/>
+              <a:endParaRPr lang="en-US" sz="1800" dirty="0">
+                <a:solidFill>
+                  <a:schemeClr val="bg1">
+                    <a:lumMod val="85000"/>
+                  </a:schemeClr>
+                </a:solidFill>
+                <a:latin typeface="Open Sans" panose="020B0606030504020204" pitchFamily="34" charset="0"/>
+                <a:ea typeface="Open Sans" panose="020B0606030504020204" pitchFamily="34" charset="0"/>
+                <a:cs typeface="Open Sans" panose="020B0606030504020204" pitchFamily="34" charset="0"/>
+              </a:endParaRPr>
+            </a:p>
+          </p:txBody>
+        </p:sp>
+        <p:grpSp>
+          <p:nvGrpSpPr>
+            <p:cNvPr id="3" name="Group 2">
+              <a:extLst>
+                <a:ext uri="{FF2B5EF4-FFF2-40B4-BE49-F238E27FC236}">
+                  <a16:creationId xmlns:a16="http://schemas.microsoft.com/office/drawing/2014/main" id="{7C9F1C24-5BB4-D0DB-776B-F75561BA153A}"/>
+                </a:ext>
+              </a:extLst>
+            </p:cNvPr>
+            <p:cNvGrpSpPr/>
+            <p:nvPr/>
+          </p:nvGrpSpPr>
+          <p:grpSpPr>
+            <a:xfrm>
+              <a:off x="2964745" y="2121438"/>
+              <a:ext cx="6262510" cy="2125237"/>
+              <a:chOff x="2964745" y="2082634"/>
+              <a:chExt cx="6262510" cy="2125237"/>
+            </a:xfrm>
+          </p:grpSpPr>
+          <p:sp>
+            <p:nvSpPr>
+              <p:cNvPr id="59" name="Flowchart: Terminator 58">
+                <a:extLst>
+                  <a:ext uri="{FF2B5EF4-FFF2-40B4-BE49-F238E27FC236}">
+                    <a16:creationId xmlns:a16="http://schemas.microsoft.com/office/drawing/2014/main" id="{D7554AAC-5F81-46CA-BA4E-6CDF6B8CC5AD}"/>
+                  </a:ext>
+                </a:extLst>
+              </p:cNvPr>
+              <p:cNvSpPr/>
+              <p:nvPr/>
+            </p:nvSpPr>
+            <p:spPr>
+              <a:xfrm>
+                <a:off x="3361788" y="2082634"/>
+                <a:ext cx="1050758" cy="341690"/>
+              </a:xfrm>
+              <a:prstGeom prst="flowChartTerminator">
+                <a:avLst/>
+              </a:prstGeom>
+              <a:noFill/>
+              <a:ln>
+                <a:solidFill>
+                  <a:schemeClr val="bg1">
+                    <a:lumMod val="75000"/>
+                  </a:schemeClr>
+                </a:solidFill>
+              </a:ln>
+            </p:spPr>
+            <p:style>
+              <a:lnRef idx="2">
+                <a:schemeClr val="accent1">
+                  <a:shade val="50000"/>
+                </a:schemeClr>
+              </a:lnRef>
+              <a:fillRef idx="1">
+                <a:schemeClr val="accent1"/>
+              </a:fillRef>
+              <a:effectRef idx="0">
+                <a:schemeClr val="accent1"/>
+              </a:effectRef>
+              <a:fontRef idx="minor">
+                <a:schemeClr val="lt1"/>
+              </a:fontRef>
+            </p:style>
+            <p:txBody>
+              <a:bodyPr rtlCol="0" anchor="ctr"/>
+              <a:lstStyle/>
+              <a:p>
+                <a:pPr algn="ctr"/>
+                <a:r>
+                  <a:rPr lang="en-US" sz="1200" dirty="0">
+                    <a:solidFill>
+                      <a:schemeClr val="bg1">
+                        <a:lumMod val="85000"/>
+                      </a:schemeClr>
+                    </a:solidFill>
+                    <a:latin typeface="Open Sans" panose="020B0606030504020204" pitchFamily="34" charset="0"/>
+                    <a:ea typeface="Open Sans" panose="020B0606030504020204" pitchFamily="34" charset="0"/>
+                    <a:cs typeface="Open Sans" panose="020B0606030504020204" pitchFamily="34" charset="0"/>
+                  </a:rPr>
+                  <a:t>Start</a:t>
+                </a:r>
+              </a:p>
+            </p:txBody>
+          </p:sp>
+          <p:sp>
+            <p:nvSpPr>
+              <p:cNvPr id="60" name="Flowchart: Terminator 59">
+                <a:extLst>
+                  <a:ext uri="{FF2B5EF4-FFF2-40B4-BE49-F238E27FC236}">
+                    <a16:creationId xmlns:a16="http://schemas.microsoft.com/office/drawing/2014/main" id="{103191FC-37A5-724C-C214-882B4B9F6C89}"/>
+                  </a:ext>
+                </a:extLst>
+              </p:cNvPr>
+              <p:cNvSpPr/>
+              <p:nvPr/>
+            </p:nvSpPr>
+            <p:spPr>
+              <a:xfrm>
+                <a:off x="7779453" y="2082634"/>
+                <a:ext cx="1050758" cy="341690"/>
+              </a:xfrm>
+              <a:prstGeom prst="flowChartTerminator">
+                <a:avLst/>
+              </a:prstGeom>
+              <a:noFill/>
+              <a:ln>
+                <a:solidFill>
+                  <a:schemeClr val="bg1">
+                    <a:lumMod val="75000"/>
+                  </a:schemeClr>
+                </a:solidFill>
+              </a:ln>
+            </p:spPr>
+            <p:style>
+              <a:lnRef idx="2">
+                <a:schemeClr val="accent1">
+                  <a:shade val="50000"/>
+                </a:schemeClr>
+              </a:lnRef>
+              <a:fillRef idx="1">
+                <a:schemeClr val="accent1"/>
+              </a:fillRef>
+              <a:effectRef idx="0">
+                <a:schemeClr val="accent1"/>
+              </a:effectRef>
+              <a:fontRef idx="minor">
+                <a:schemeClr val="lt1"/>
+              </a:fontRef>
+            </p:style>
+            <p:txBody>
+              <a:bodyPr rtlCol="0" anchor="ctr"/>
+              <a:lstStyle/>
+              <a:p>
+                <a:pPr algn="ctr"/>
+                <a:r>
+                  <a:rPr lang="en-US" sz="1200" dirty="0">
+                    <a:solidFill>
+                      <a:schemeClr val="bg1">
+                        <a:lumMod val="85000"/>
+                      </a:schemeClr>
+                    </a:solidFill>
+                    <a:latin typeface="Open Sans" panose="020B0606030504020204" pitchFamily="34" charset="0"/>
+                    <a:ea typeface="Open Sans" panose="020B0606030504020204" pitchFamily="34" charset="0"/>
+                    <a:cs typeface="Open Sans" panose="020B0606030504020204" pitchFamily="34" charset="0"/>
+                  </a:rPr>
+                  <a:t>Stop</a:t>
+                </a:r>
+              </a:p>
+            </p:txBody>
+          </p:sp>
+          <p:cxnSp>
+            <p:nvCxnSpPr>
+              <p:cNvPr id="61" name="Straight Arrow Connector 60">
+                <a:extLst>
+                  <a:ext uri="{FF2B5EF4-FFF2-40B4-BE49-F238E27FC236}">
+                    <a16:creationId xmlns:a16="http://schemas.microsoft.com/office/drawing/2014/main" id="{A1BBCFB3-141A-F3B8-67BE-C05995E64053}"/>
+                  </a:ext>
+                </a:extLst>
+              </p:cNvPr>
+              <p:cNvCxnSpPr>
+                <a:cxnSpLocks/>
+                <a:stCxn id="59" idx="2"/>
+              </p:cNvCxnSpPr>
+              <p:nvPr/>
+            </p:nvCxnSpPr>
+            <p:spPr>
+              <a:xfrm>
+                <a:off x="3887167" y="2424324"/>
+                <a:ext cx="0" cy="296780"/>
+              </a:xfrm>
+              <a:prstGeom prst="straightConnector1">
+                <a:avLst/>
+              </a:prstGeom>
+              <a:ln w="12700">
+                <a:solidFill>
+                  <a:schemeClr val="bg1">
+                    <a:lumMod val="75000"/>
+                  </a:schemeClr>
+                </a:solidFill>
+                <a:tailEnd type="triangle"/>
+              </a:ln>
+            </p:spPr>
+            <p:style>
+              <a:lnRef idx="1">
+                <a:schemeClr val="accent1"/>
+              </a:lnRef>
+              <a:fillRef idx="0">
+                <a:schemeClr val="accent1"/>
+              </a:fillRef>
+              <a:effectRef idx="0">
+                <a:schemeClr val="accent1"/>
+              </a:effectRef>
+              <a:fontRef idx="minor">
+                <a:schemeClr val="tx1"/>
+              </a:fontRef>
+            </p:style>
+          </p:cxnSp>
+          <p:sp>
+            <p:nvSpPr>
+              <p:cNvPr id="75" name="Flowchart: Data 74">
+                <a:extLst>
+                  <a:ext uri="{FF2B5EF4-FFF2-40B4-BE49-F238E27FC236}">
+                    <a16:creationId xmlns:a16="http://schemas.microsoft.com/office/drawing/2014/main" id="{684F63EE-4E36-A045-0D95-769D7FC961BB}"/>
+                  </a:ext>
+                </a:extLst>
+              </p:cNvPr>
+              <p:cNvSpPr/>
+              <p:nvPr/>
+            </p:nvSpPr>
+            <p:spPr>
+              <a:xfrm>
+                <a:off x="7382411" y="2721104"/>
+                <a:ext cx="1844844" cy="489284"/>
+              </a:xfrm>
+              <a:prstGeom prst="flowChartInputOutput">
+                <a:avLst/>
+              </a:prstGeom>
+              <a:noFill/>
+              <a:ln>
+                <a:solidFill>
+                  <a:srgbClr val="CC99FF"/>
+                </a:solidFill>
+              </a:ln>
+            </p:spPr>
+            <p:style>
+              <a:lnRef idx="2">
+                <a:schemeClr val="accent1">
+                  <a:shade val="50000"/>
+                </a:schemeClr>
+              </a:lnRef>
+              <a:fillRef idx="1">
+                <a:schemeClr val="accent1"/>
+              </a:fillRef>
+              <a:effectRef idx="0">
+                <a:schemeClr val="accent1"/>
+              </a:effectRef>
+              <a:fontRef idx="minor">
+                <a:schemeClr val="lt1"/>
+              </a:fontRef>
+            </p:style>
+            <p:txBody>
+              <a:bodyPr rtlCol="0" anchor="ctr"/>
+              <a:lstStyle/>
+              <a:p>
+                <a:pPr algn="ctr"/>
+                <a:r>
+                  <a:rPr lang="en-US" sz="1200" dirty="0">
+                    <a:solidFill>
+                      <a:schemeClr val="bg1">
+                        <a:lumMod val="85000"/>
+                      </a:schemeClr>
+                    </a:solidFill>
+                    <a:latin typeface="Open Sans" panose="020B0606030504020204" pitchFamily="34" charset="0"/>
+                    <a:ea typeface="Open Sans" panose="020B0606030504020204" pitchFamily="34" charset="0"/>
+                    <a:cs typeface="Open Sans" panose="020B0606030504020204" pitchFamily="34" charset="0"/>
+                  </a:rPr>
+                  <a:t>Print </a:t>
+                </a:r>
+                <a:r>
+                  <a:rPr lang="en-US" sz="1200" dirty="0" err="1">
+                    <a:solidFill>
+                      <a:schemeClr val="bg1">
+                        <a:lumMod val="85000"/>
+                      </a:schemeClr>
+                    </a:solidFill>
+                    <a:latin typeface="Open Sans" panose="020B0606030504020204" pitchFamily="34" charset="0"/>
+                    <a:ea typeface="Open Sans" panose="020B0606030504020204" pitchFamily="34" charset="0"/>
+                    <a:cs typeface="Open Sans" panose="020B0606030504020204" pitchFamily="34" charset="0"/>
+                  </a:rPr>
+                  <a:t>priceFinal</a:t>
+                </a:r>
+                <a:endParaRPr lang="en-US" sz="1200" dirty="0">
+                  <a:solidFill>
+                    <a:schemeClr val="bg1">
+                      <a:lumMod val="85000"/>
+                    </a:schemeClr>
+                  </a:solidFill>
+                  <a:latin typeface="Open Sans" panose="020B0606030504020204" pitchFamily="34" charset="0"/>
+                  <a:ea typeface="Open Sans" panose="020B0606030504020204" pitchFamily="34" charset="0"/>
+                  <a:cs typeface="Open Sans" panose="020B0606030504020204" pitchFamily="34" charset="0"/>
+                </a:endParaRPr>
+              </a:p>
+            </p:txBody>
+          </p:sp>
+          <p:sp>
+            <p:nvSpPr>
+              <p:cNvPr id="26" name="Flowchart: Data 25">
+                <a:extLst>
+                  <a:ext uri="{FF2B5EF4-FFF2-40B4-BE49-F238E27FC236}">
+                    <a16:creationId xmlns:a16="http://schemas.microsoft.com/office/drawing/2014/main" id="{94D191EB-608A-2C67-B420-0EA65677B979}"/>
+                  </a:ext>
+                </a:extLst>
+              </p:cNvPr>
+              <p:cNvSpPr/>
+              <p:nvPr/>
+            </p:nvSpPr>
+            <p:spPr>
+              <a:xfrm>
+                <a:off x="5173578" y="2716774"/>
+                <a:ext cx="1844844" cy="489284"/>
+              </a:xfrm>
+              <a:prstGeom prst="flowChartInputOutput">
+                <a:avLst/>
+              </a:prstGeom>
+              <a:noFill/>
+              <a:ln>
+                <a:solidFill>
+                  <a:schemeClr val="accent1">
+                    <a:lumMod val="60000"/>
+                    <a:lumOff val="40000"/>
+                  </a:schemeClr>
+                </a:solidFill>
+              </a:ln>
+            </p:spPr>
+            <p:style>
+              <a:lnRef idx="2">
+                <a:schemeClr val="accent1">
+                  <a:shade val="50000"/>
+                </a:schemeClr>
+              </a:lnRef>
+              <a:fillRef idx="1">
+                <a:schemeClr val="accent1"/>
+              </a:fillRef>
+              <a:effectRef idx="0">
+                <a:schemeClr val="accent1"/>
+              </a:effectRef>
+              <a:fontRef idx="minor">
+                <a:schemeClr val="lt1"/>
+              </a:fontRef>
+            </p:style>
+            <p:txBody>
+              <a:bodyPr rtlCol="0" anchor="ctr"/>
+              <a:lstStyle/>
+              <a:p>
+                <a:pPr algn="ctr"/>
+                <a:r>
+                  <a:rPr lang="en-US" sz="1200" dirty="0">
+                    <a:solidFill>
+                      <a:schemeClr val="bg1">
+                        <a:lumMod val="85000"/>
+                      </a:schemeClr>
+                    </a:solidFill>
+                    <a:latin typeface="Open Sans" panose="020B0606030504020204" pitchFamily="34" charset="0"/>
+                    <a:ea typeface="Open Sans" panose="020B0606030504020204" pitchFamily="34" charset="0"/>
+                    <a:cs typeface="Open Sans" panose="020B0606030504020204" pitchFamily="34" charset="0"/>
+                  </a:rPr>
+                  <a:t>Read </a:t>
+                </a:r>
+                <a:r>
+                  <a:rPr lang="en-US" sz="1200" dirty="0" err="1">
+                    <a:solidFill>
+                      <a:schemeClr val="bg1">
+                        <a:lumMod val="85000"/>
+                      </a:schemeClr>
+                    </a:solidFill>
+                    <a:latin typeface="Open Sans" panose="020B0606030504020204" pitchFamily="34" charset="0"/>
+                    <a:ea typeface="Open Sans" panose="020B0606030504020204" pitchFamily="34" charset="0"/>
+                    <a:cs typeface="Open Sans" panose="020B0606030504020204" pitchFamily="34" charset="0"/>
+                  </a:rPr>
+                  <a:t>grapeCount</a:t>
+                </a:r>
+                <a:endParaRPr lang="en-US" sz="1200" dirty="0">
+                  <a:solidFill>
+                    <a:schemeClr val="bg1">
+                      <a:lumMod val="85000"/>
+                    </a:schemeClr>
+                  </a:solidFill>
+                  <a:latin typeface="Open Sans" panose="020B0606030504020204" pitchFamily="34" charset="0"/>
+                  <a:ea typeface="Open Sans" panose="020B0606030504020204" pitchFamily="34" charset="0"/>
+                  <a:cs typeface="Open Sans" panose="020B0606030504020204" pitchFamily="34" charset="0"/>
+                </a:endParaRPr>
+              </a:p>
+            </p:txBody>
+          </p:sp>
+          <p:cxnSp>
+            <p:nvCxnSpPr>
+              <p:cNvPr id="27" name="Straight Arrow Connector 26">
+                <a:extLst>
+                  <a:ext uri="{FF2B5EF4-FFF2-40B4-BE49-F238E27FC236}">
+                    <a16:creationId xmlns:a16="http://schemas.microsoft.com/office/drawing/2014/main" id="{E6C1CD8F-BB27-923B-995E-D457BDF8CD6D}"/>
+                  </a:ext>
+                </a:extLst>
+              </p:cNvPr>
+              <p:cNvCxnSpPr>
+                <a:stCxn id="26" idx="4"/>
+              </p:cNvCxnSpPr>
+              <p:nvPr/>
+            </p:nvCxnSpPr>
+            <p:spPr>
+              <a:xfrm>
+                <a:off x="6096000" y="3206058"/>
+                <a:ext cx="0" cy="279437"/>
+              </a:xfrm>
+              <a:prstGeom prst="straightConnector1">
+                <a:avLst/>
+              </a:prstGeom>
+              <a:ln w="12700">
+                <a:solidFill>
+                  <a:schemeClr val="accent1">
+                    <a:lumMod val="60000"/>
+                    <a:lumOff val="40000"/>
+                  </a:schemeClr>
+                </a:solidFill>
+                <a:tailEnd type="triangle"/>
+              </a:ln>
+            </p:spPr>
+            <p:style>
+              <a:lnRef idx="1">
+                <a:schemeClr val="accent1"/>
+              </a:lnRef>
+              <a:fillRef idx="0">
+                <a:schemeClr val="accent1"/>
+              </a:fillRef>
+              <a:effectRef idx="0">
+                <a:schemeClr val="accent1"/>
+              </a:effectRef>
+              <a:fontRef idx="minor">
+                <a:schemeClr val="tx1"/>
+              </a:fontRef>
+            </p:style>
+          </p:cxnSp>
+          <p:cxnSp>
+            <p:nvCxnSpPr>
+              <p:cNvPr id="18" name="Straight Arrow Connector 17">
+                <a:extLst>
+                  <a:ext uri="{FF2B5EF4-FFF2-40B4-BE49-F238E27FC236}">
+                    <a16:creationId xmlns:a16="http://schemas.microsoft.com/office/drawing/2014/main" id="{28D76C1F-C45D-8EEF-E187-E9E48161CAB0}"/>
+                  </a:ext>
+                </a:extLst>
+              </p:cNvPr>
+              <p:cNvCxnSpPr>
+                <a:cxnSpLocks/>
+                <a:stCxn id="75" idx="1"/>
+                <a:endCxn id="60" idx="2"/>
+              </p:cNvCxnSpPr>
+              <p:nvPr/>
+            </p:nvCxnSpPr>
+            <p:spPr>
+              <a:xfrm flipH="1" flipV="1">
+                <a:off x="8304832" y="2424324"/>
+                <a:ext cx="1" cy="296780"/>
+              </a:xfrm>
+              <a:prstGeom prst="straightConnector1">
+                <a:avLst/>
+              </a:prstGeom>
+              <a:ln w="12700">
+                <a:solidFill>
+                  <a:srgbClr val="CC99FF"/>
+                </a:solidFill>
+                <a:tailEnd type="triangle"/>
+              </a:ln>
+            </p:spPr>
+            <p:style>
+              <a:lnRef idx="1">
+                <a:schemeClr val="accent1"/>
+              </a:lnRef>
+              <a:fillRef idx="0">
+                <a:schemeClr val="accent1"/>
+              </a:fillRef>
+              <a:effectRef idx="0">
+                <a:schemeClr val="accent1"/>
+              </a:effectRef>
+              <a:fontRef idx="minor">
+                <a:schemeClr val="tx1"/>
+              </a:fontRef>
+            </p:style>
+          </p:cxnSp>
+          <p:sp>
+            <p:nvSpPr>
+              <p:cNvPr id="63" name="Flowchart: Data 62">
+                <a:extLst>
+                  <a:ext uri="{FF2B5EF4-FFF2-40B4-BE49-F238E27FC236}">
+                    <a16:creationId xmlns:a16="http://schemas.microsoft.com/office/drawing/2014/main" id="{752BB034-E0C6-F27B-06F8-D396E9CC8B63}"/>
+                  </a:ext>
+                </a:extLst>
+              </p:cNvPr>
+              <p:cNvSpPr/>
+              <p:nvPr/>
+            </p:nvSpPr>
+            <p:spPr>
+              <a:xfrm>
+                <a:off x="2964745" y="2716774"/>
+                <a:ext cx="1844844" cy="489284"/>
+              </a:xfrm>
+              <a:prstGeom prst="flowChartInputOutput">
+                <a:avLst/>
+              </a:prstGeom>
+              <a:noFill/>
+              <a:ln>
+                <a:solidFill>
+                  <a:schemeClr val="accent1">
+                    <a:lumMod val="60000"/>
+                    <a:lumOff val="40000"/>
+                  </a:schemeClr>
+                </a:solidFill>
+              </a:ln>
+            </p:spPr>
+            <p:style>
+              <a:lnRef idx="2">
+                <a:schemeClr val="accent1">
+                  <a:shade val="50000"/>
+                </a:schemeClr>
+              </a:lnRef>
+              <a:fillRef idx="1">
+                <a:schemeClr val="accent1"/>
+              </a:fillRef>
+              <a:effectRef idx="0">
+                <a:schemeClr val="accent1"/>
+              </a:effectRef>
+              <a:fontRef idx="minor">
+                <a:schemeClr val="lt1"/>
+              </a:fontRef>
+            </p:style>
+            <p:txBody>
+              <a:bodyPr rtlCol="0" anchor="ctr"/>
+              <a:lstStyle/>
+              <a:p>
+                <a:pPr algn="ctr"/>
+                <a:r>
+                  <a:rPr lang="en-US" sz="1200" dirty="0">
+                    <a:solidFill>
+                      <a:schemeClr val="bg1">
+                        <a:lumMod val="85000"/>
+                      </a:schemeClr>
+                    </a:solidFill>
+                    <a:latin typeface="Open Sans" panose="020B0606030504020204" pitchFamily="34" charset="0"/>
+                    <a:ea typeface="Open Sans" panose="020B0606030504020204" pitchFamily="34" charset="0"/>
+                    <a:cs typeface="Open Sans" panose="020B0606030504020204" pitchFamily="34" charset="0"/>
+                  </a:rPr>
+                  <a:t>Read </a:t>
+                </a:r>
+                <a:r>
+                  <a:rPr lang="en-US" sz="1200" dirty="0" err="1">
+                    <a:solidFill>
+                      <a:schemeClr val="bg1">
+                        <a:lumMod val="85000"/>
+                      </a:schemeClr>
+                    </a:solidFill>
+                    <a:latin typeface="Open Sans" panose="020B0606030504020204" pitchFamily="34" charset="0"/>
+                    <a:ea typeface="Open Sans" panose="020B0606030504020204" pitchFamily="34" charset="0"/>
+                    <a:cs typeface="Open Sans" panose="020B0606030504020204" pitchFamily="34" charset="0"/>
+                  </a:rPr>
+                  <a:t>appleCount</a:t>
+                </a:r>
+                <a:endParaRPr lang="en-US" sz="1200" dirty="0">
+                  <a:solidFill>
+                    <a:schemeClr val="bg1">
+                      <a:lumMod val="85000"/>
+                    </a:schemeClr>
+                  </a:solidFill>
+                  <a:latin typeface="Open Sans" panose="020B0606030504020204" pitchFamily="34" charset="0"/>
+                  <a:ea typeface="Open Sans" panose="020B0606030504020204" pitchFamily="34" charset="0"/>
+                  <a:cs typeface="Open Sans" panose="020B0606030504020204" pitchFamily="34" charset="0"/>
+                </a:endParaRPr>
+              </a:p>
+            </p:txBody>
+          </p:sp>
+          <p:sp>
+            <p:nvSpPr>
+              <p:cNvPr id="70" name="Rectangle 69">
+                <a:extLst>
+                  <a:ext uri="{FF2B5EF4-FFF2-40B4-BE49-F238E27FC236}">
+                    <a16:creationId xmlns:a16="http://schemas.microsoft.com/office/drawing/2014/main" id="{E24C22BA-07A1-D6D9-9D7E-0E33B60C0818}"/>
+                  </a:ext>
+                </a:extLst>
+              </p:cNvPr>
+              <p:cNvSpPr/>
+              <p:nvPr/>
+            </p:nvSpPr>
+            <p:spPr>
+              <a:xfrm>
+                <a:off x="5173578" y="3485495"/>
+                <a:ext cx="1844844" cy="722376"/>
+              </a:xfrm>
+              <a:prstGeom prst="rect">
+                <a:avLst/>
+              </a:prstGeom>
+              <a:noFill/>
+              <a:ln>
+                <a:solidFill>
+                  <a:schemeClr val="accent6">
+                    <a:lumMod val="60000"/>
+                    <a:lumOff val="40000"/>
+                  </a:schemeClr>
+                </a:solidFill>
+              </a:ln>
+            </p:spPr>
+            <p:style>
+              <a:lnRef idx="2">
+                <a:schemeClr val="accent1">
+                  <a:shade val="50000"/>
+                </a:schemeClr>
+              </a:lnRef>
+              <a:fillRef idx="1">
+                <a:schemeClr val="accent1"/>
+              </a:fillRef>
+              <a:effectRef idx="0">
+                <a:schemeClr val="accent1"/>
+              </a:effectRef>
+              <a:fontRef idx="minor">
+                <a:schemeClr val="lt1"/>
+              </a:fontRef>
+            </p:style>
+            <p:txBody>
+              <a:bodyPr rtlCol="0" anchor="ctr"/>
+              <a:lstStyle/>
+              <a:p>
+                <a:pPr algn="ctr"/>
+                <a:r>
+                  <a:rPr lang="en-US" sz="1200" dirty="0" err="1">
+                    <a:solidFill>
+                      <a:schemeClr val="bg1">
+                        <a:lumMod val="85000"/>
+                      </a:schemeClr>
+                    </a:solidFill>
+                    <a:latin typeface="Open Sans" panose="020B0606030504020204" pitchFamily="34" charset="0"/>
+                    <a:ea typeface="Open Sans" panose="020B0606030504020204" pitchFamily="34" charset="0"/>
+                    <a:cs typeface="Open Sans" panose="020B0606030504020204" pitchFamily="34" charset="0"/>
+                  </a:rPr>
+                  <a:t>priceFinal</a:t>
+                </a:r>
+                <a:r>
+                  <a:rPr lang="en-US" sz="1200" dirty="0">
+                    <a:solidFill>
+                      <a:schemeClr val="bg1">
+                        <a:lumMod val="85000"/>
+                      </a:schemeClr>
+                    </a:solidFill>
+                    <a:latin typeface="Open Sans" panose="020B0606030504020204" pitchFamily="34" charset="0"/>
+                    <a:ea typeface="Open Sans" panose="020B0606030504020204" pitchFamily="34" charset="0"/>
+                    <a:cs typeface="Open Sans" panose="020B0606030504020204" pitchFamily="34" charset="0"/>
+                  </a:rPr>
+                  <a:t> = </a:t>
+                </a:r>
+                <a:r>
+                  <a:rPr lang="en-US" sz="1200" dirty="0" err="1">
+                    <a:solidFill>
+                      <a:schemeClr val="bg1">
+                        <a:lumMod val="85000"/>
+                      </a:schemeClr>
+                    </a:solidFill>
+                    <a:latin typeface="Open Sans" panose="020B0606030504020204" pitchFamily="34" charset="0"/>
+                    <a:ea typeface="Open Sans" panose="020B0606030504020204" pitchFamily="34" charset="0"/>
+                    <a:cs typeface="Open Sans" panose="020B0606030504020204" pitchFamily="34" charset="0"/>
+                  </a:rPr>
+                  <a:t>appleCount</a:t>
+                </a:r>
+                <a:r>
+                  <a:rPr lang="en-US" sz="1200" dirty="0">
+                    <a:solidFill>
+                      <a:schemeClr val="bg1">
+                        <a:lumMod val="85000"/>
+                      </a:schemeClr>
+                    </a:solidFill>
+                    <a:latin typeface="Open Sans" panose="020B0606030504020204" pitchFamily="34" charset="0"/>
+                    <a:ea typeface="Open Sans" panose="020B0606030504020204" pitchFamily="34" charset="0"/>
+                    <a:cs typeface="Open Sans" panose="020B0606030504020204" pitchFamily="34" charset="0"/>
+                  </a:rPr>
+                  <a:t> * 4.0 + </a:t>
+                </a:r>
+                <a:r>
+                  <a:rPr lang="en-US" sz="1200" dirty="0" err="1">
+                    <a:solidFill>
+                      <a:schemeClr val="bg1">
+                        <a:lumMod val="85000"/>
+                      </a:schemeClr>
+                    </a:solidFill>
+                    <a:latin typeface="Open Sans" panose="020B0606030504020204" pitchFamily="34" charset="0"/>
+                    <a:ea typeface="Open Sans" panose="020B0606030504020204" pitchFamily="34" charset="0"/>
+                    <a:cs typeface="Open Sans" panose="020B0606030504020204" pitchFamily="34" charset="0"/>
+                  </a:rPr>
+                  <a:t>grapeCount</a:t>
+                </a:r>
+                <a:r>
+                  <a:rPr lang="en-US" sz="1200" dirty="0">
+                    <a:solidFill>
+                      <a:schemeClr val="bg1">
+                        <a:lumMod val="85000"/>
+                      </a:schemeClr>
+                    </a:solidFill>
+                    <a:latin typeface="Open Sans" panose="020B0606030504020204" pitchFamily="34" charset="0"/>
+                    <a:ea typeface="Open Sans" panose="020B0606030504020204" pitchFamily="34" charset="0"/>
+                    <a:cs typeface="Open Sans" panose="020B0606030504020204" pitchFamily="34" charset="0"/>
+                  </a:rPr>
+                  <a:t> * 6.50</a:t>
+                </a:r>
+              </a:p>
+            </p:txBody>
+          </p:sp>
+          <p:cxnSp>
+            <p:nvCxnSpPr>
+              <p:cNvPr id="4" name="Straight Arrow Connector 3">
+                <a:extLst>
+                  <a:ext uri="{FF2B5EF4-FFF2-40B4-BE49-F238E27FC236}">
+                    <a16:creationId xmlns:a16="http://schemas.microsoft.com/office/drawing/2014/main" id="{84887B67-AE70-4F05-F775-376A6D2F5457}"/>
+                  </a:ext>
+                </a:extLst>
+              </p:cNvPr>
+              <p:cNvCxnSpPr>
+                <a:stCxn id="63" idx="5"/>
+                <a:endCxn id="26" idx="2"/>
+              </p:cNvCxnSpPr>
+              <p:nvPr/>
+            </p:nvCxnSpPr>
+            <p:spPr>
+              <a:xfrm>
+                <a:off x="4625105" y="2961416"/>
+                <a:ext cx="732957" cy="0"/>
+              </a:xfrm>
+              <a:prstGeom prst="straightConnector1">
+                <a:avLst/>
+              </a:prstGeom>
+              <a:ln w="12700">
+                <a:solidFill>
+                  <a:schemeClr val="accent1">
+                    <a:lumMod val="60000"/>
+                    <a:lumOff val="40000"/>
+                  </a:schemeClr>
+                </a:solidFill>
+                <a:tailEnd type="triangle"/>
+              </a:ln>
+            </p:spPr>
+            <p:style>
+              <a:lnRef idx="1">
+                <a:schemeClr val="accent1"/>
+              </a:lnRef>
+              <a:fillRef idx="0">
+                <a:schemeClr val="accent1"/>
+              </a:fillRef>
+              <a:effectRef idx="0">
+                <a:schemeClr val="accent1"/>
+              </a:effectRef>
+              <a:fontRef idx="minor">
+                <a:schemeClr val="tx1"/>
+              </a:fontRef>
+            </p:style>
+          </p:cxnSp>
+          <p:cxnSp>
+            <p:nvCxnSpPr>
+              <p:cNvPr id="8" name="Connector: Elbow 7">
+                <a:extLst>
+                  <a:ext uri="{FF2B5EF4-FFF2-40B4-BE49-F238E27FC236}">
+                    <a16:creationId xmlns:a16="http://schemas.microsoft.com/office/drawing/2014/main" id="{ABB3758C-8070-0975-F0A0-8D58A9A255A7}"/>
+                  </a:ext>
+                </a:extLst>
+              </p:cNvPr>
+              <p:cNvCxnSpPr>
+                <a:stCxn id="70" idx="3"/>
+                <a:endCxn id="75" idx="4"/>
+              </p:cNvCxnSpPr>
+              <p:nvPr/>
+            </p:nvCxnSpPr>
+            <p:spPr>
+              <a:xfrm flipV="1">
+                <a:off x="7018422" y="3210388"/>
+                <a:ext cx="1286411" cy="636295"/>
+              </a:xfrm>
+              <a:prstGeom prst="bentConnector2">
+                <a:avLst/>
+              </a:prstGeom>
+              <a:ln w="12700">
+                <a:solidFill>
+                  <a:schemeClr val="bg1">
+                    <a:lumMod val="75000"/>
+                  </a:schemeClr>
+                </a:solidFill>
+                <a:tailEnd type="triangle"/>
+              </a:ln>
+            </p:spPr>
+            <p:style>
+              <a:lnRef idx="1">
+                <a:schemeClr val="accent1"/>
+              </a:lnRef>
+              <a:fillRef idx="0">
+                <a:schemeClr val="accent1"/>
+              </a:fillRef>
+              <a:effectRef idx="0">
+                <a:schemeClr val="accent1"/>
+              </a:effectRef>
+              <a:fontRef idx="minor">
+                <a:schemeClr val="tx1"/>
+              </a:fontRef>
+            </p:style>
+          </p:cxnSp>
+        </p:grpSp>
+      </p:grpSp>
+    </p:spTree>
+    <p:extLst>
+      <p:ext uri="{BB962C8B-B14F-4D97-AF65-F5344CB8AC3E}">
+        <p14:creationId xmlns:p14="http://schemas.microsoft.com/office/powerpoint/2010/main" val="75639505"/>
+      </p:ext>
+    </p:extLst>
+  </p:cSld>
+  <p:clrMapOvr>
+    <a:masterClrMapping/>
+  </p:clrMapOvr>
+</p:sld>
+</file>
+
 <file path=ppt/slides/slide2.xml><?xml version="1.0" encoding="utf-8"?>
 <p:sld xmlns:a="http://schemas.openxmlformats.org/drawingml/2006/main" xmlns:r="http://schemas.openxmlformats.org/officeDocument/2006/relationships" xmlns:p="http://schemas.openxmlformats.org/presentationml/2006/main">
   <p:cSld>

</xml_diff>

<commit_message>
Added Flowchart for Q5 of PrePSPM1920_KMPP.md
</commit_message>
<xml_diff>
--- a/Past Year Theory Questions/Resources/resources.pptx
+++ b/Past Year Theory Questions/Resources/resources.pptx
@@ -15,6 +15,7 @@
     <p:sldId id="264" r:id="rId9"/>
     <p:sldId id="265" r:id="rId10"/>
     <p:sldId id="266" r:id="rId11"/>
+    <p:sldId id="267" r:id="rId12"/>
   </p:sldIdLst>
   <p:sldSz cx="12192000" cy="6858000"/>
   <p:notesSz cx="6858000" cy="9144000"/>
@@ -5890,6 +5891,1331 @@
 </p:sld>
 </file>
 
+<file path=ppt/slides/slide11.xml><?xml version="1.0" encoding="utf-8"?>
+<p:sld xmlns:a="http://schemas.openxmlformats.org/drawingml/2006/main" xmlns:r="http://schemas.openxmlformats.org/officeDocument/2006/relationships" xmlns:p="http://schemas.openxmlformats.org/presentationml/2006/main">
+  <p:cSld>
+    <p:spTree>
+      <p:nvGrpSpPr>
+        <p:cNvPr id="1" name=""/>
+        <p:cNvGrpSpPr/>
+        <p:nvPr/>
+      </p:nvGrpSpPr>
+      <p:grpSpPr>
+        <a:xfrm>
+          <a:off x="0" y="0"/>
+          <a:ext cx="0" cy="0"/>
+          <a:chOff x="0" y="0"/>
+          <a:chExt cx="0" cy="0"/>
+        </a:xfrm>
+      </p:grpSpPr>
+      <p:grpSp>
+        <p:nvGrpSpPr>
+          <p:cNvPr id="68" name="Group 67">
+            <a:extLst>
+              <a:ext uri="{FF2B5EF4-FFF2-40B4-BE49-F238E27FC236}">
+                <a16:creationId xmlns:a16="http://schemas.microsoft.com/office/drawing/2014/main" id="{D92E17DE-5033-6494-37F4-3B116355CCEF}"/>
+              </a:ext>
+            </a:extLst>
+          </p:cNvPr>
+          <p:cNvGrpSpPr/>
+          <p:nvPr/>
+        </p:nvGrpSpPr>
+        <p:grpSpPr>
+          <a:xfrm>
+            <a:off x="2594810" y="1706880"/>
+            <a:ext cx="7002379" cy="4086124"/>
+            <a:chOff x="2594810" y="1706880"/>
+            <a:chExt cx="7002379" cy="4086124"/>
+          </a:xfrm>
+        </p:grpSpPr>
+        <p:sp>
+          <p:nvSpPr>
+            <p:cNvPr id="108" name="Rectangle 107">
+              <a:extLst>
+                <a:ext uri="{FF2B5EF4-FFF2-40B4-BE49-F238E27FC236}">
+                  <a16:creationId xmlns:a16="http://schemas.microsoft.com/office/drawing/2014/main" id="{F5A5FD62-A99C-04B6-706B-DEE9B81AF541}"/>
+                </a:ext>
+              </a:extLst>
+            </p:cNvPr>
+            <p:cNvSpPr/>
+            <p:nvPr/>
+          </p:nvSpPr>
+          <p:spPr>
+            <a:xfrm>
+              <a:off x="2594810" y="1706880"/>
+              <a:ext cx="7002379" cy="4086124"/>
+            </a:xfrm>
+            <a:prstGeom prst="rect">
+              <a:avLst/>
+            </a:prstGeom>
+            <a:solidFill>
+              <a:srgbClr val="0F1017"/>
+            </a:solidFill>
+            <a:ln w="12700">
+              <a:solidFill>
+                <a:schemeClr val="bg1">
+                  <a:lumMod val="75000"/>
+                </a:schemeClr>
+              </a:solidFill>
+            </a:ln>
+          </p:spPr>
+          <p:style>
+            <a:lnRef idx="2">
+              <a:schemeClr val="accent1">
+                <a:shade val="50000"/>
+              </a:schemeClr>
+            </a:lnRef>
+            <a:fillRef idx="1">
+              <a:schemeClr val="accent1"/>
+            </a:fillRef>
+            <a:effectRef idx="0">
+              <a:schemeClr val="accent1"/>
+            </a:effectRef>
+            <a:fontRef idx="minor">
+              <a:schemeClr val="lt1"/>
+            </a:fontRef>
+          </p:style>
+          <p:txBody>
+            <a:bodyPr rtlCol="0" anchor="ctr"/>
+            <a:lstStyle/>
+            <a:p>
+              <a:pPr algn="ctr"/>
+              <a:endParaRPr lang="en-US" dirty="0"/>
+            </a:p>
+          </p:txBody>
+        </p:sp>
+        <p:grpSp>
+          <p:nvGrpSpPr>
+            <p:cNvPr id="66" name="Group 65">
+              <a:extLst>
+                <a:ext uri="{FF2B5EF4-FFF2-40B4-BE49-F238E27FC236}">
+                  <a16:creationId xmlns:a16="http://schemas.microsoft.com/office/drawing/2014/main" id="{CDB5421A-61F6-AB91-5C40-D38C18892E52}"/>
+                </a:ext>
+              </a:extLst>
+            </p:cNvPr>
+            <p:cNvGrpSpPr/>
+            <p:nvPr/>
+          </p:nvGrpSpPr>
+          <p:grpSpPr>
+            <a:xfrm>
+              <a:off x="2961772" y="2171575"/>
+              <a:ext cx="6268454" cy="3156734"/>
+              <a:chOff x="2961772" y="2156035"/>
+              <a:chExt cx="6268454" cy="3156734"/>
+            </a:xfrm>
+          </p:grpSpPr>
+          <p:sp>
+            <p:nvSpPr>
+              <p:cNvPr id="59" name="Flowchart: Terminator 58">
+                <a:extLst>
+                  <a:ext uri="{FF2B5EF4-FFF2-40B4-BE49-F238E27FC236}">
+                    <a16:creationId xmlns:a16="http://schemas.microsoft.com/office/drawing/2014/main" id="{D7554AAC-5F81-46CA-BA4E-6CDF6B8CC5AD}"/>
+                  </a:ext>
+                </a:extLst>
+              </p:cNvPr>
+              <p:cNvSpPr/>
+              <p:nvPr/>
+            </p:nvSpPr>
+            <p:spPr>
+              <a:xfrm>
+                <a:off x="3358815" y="2156035"/>
+                <a:ext cx="1050758" cy="341690"/>
+              </a:xfrm>
+              <a:prstGeom prst="flowChartTerminator">
+                <a:avLst/>
+              </a:prstGeom>
+              <a:noFill/>
+              <a:ln>
+                <a:solidFill>
+                  <a:schemeClr val="bg1">
+                    <a:lumMod val="75000"/>
+                  </a:schemeClr>
+                </a:solidFill>
+              </a:ln>
+            </p:spPr>
+            <p:style>
+              <a:lnRef idx="2">
+                <a:schemeClr val="accent1">
+                  <a:shade val="50000"/>
+                </a:schemeClr>
+              </a:lnRef>
+              <a:fillRef idx="1">
+                <a:schemeClr val="accent1"/>
+              </a:fillRef>
+              <a:effectRef idx="0">
+                <a:schemeClr val="accent1"/>
+              </a:effectRef>
+              <a:fontRef idx="minor">
+                <a:schemeClr val="lt1"/>
+              </a:fontRef>
+            </p:style>
+            <p:txBody>
+              <a:bodyPr rtlCol="0" anchor="ctr"/>
+              <a:lstStyle/>
+              <a:p>
+                <a:pPr algn="ctr"/>
+                <a:r>
+                  <a:rPr lang="en-US" sz="1200" dirty="0">
+                    <a:solidFill>
+                      <a:schemeClr val="bg1">
+                        <a:lumMod val="85000"/>
+                      </a:schemeClr>
+                    </a:solidFill>
+                    <a:latin typeface="Open Sans" panose="020B0606030504020204" pitchFamily="34" charset="0"/>
+                    <a:ea typeface="Open Sans" panose="020B0606030504020204" pitchFamily="34" charset="0"/>
+                    <a:cs typeface="Open Sans" panose="020B0606030504020204" pitchFamily="34" charset="0"/>
+                  </a:rPr>
+                  <a:t>Start</a:t>
+                </a:r>
+              </a:p>
+            </p:txBody>
+          </p:sp>
+          <p:sp>
+            <p:nvSpPr>
+              <p:cNvPr id="60" name="Flowchart: Terminator 59">
+                <a:extLst>
+                  <a:ext uri="{FF2B5EF4-FFF2-40B4-BE49-F238E27FC236}">
+                    <a16:creationId xmlns:a16="http://schemas.microsoft.com/office/drawing/2014/main" id="{103191FC-37A5-724C-C214-882B4B9F6C89}"/>
+                  </a:ext>
+                </a:extLst>
+              </p:cNvPr>
+              <p:cNvSpPr/>
+              <p:nvPr/>
+            </p:nvSpPr>
+            <p:spPr>
+              <a:xfrm>
+                <a:off x="7782424" y="2156035"/>
+                <a:ext cx="1050758" cy="341690"/>
+              </a:xfrm>
+              <a:prstGeom prst="flowChartTerminator">
+                <a:avLst/>
+              </a:prstGeom>
+              <a:noFill/>
+              <a:ln>
+                <a:solidFill>
+                  <a:schemeClr val="bg1">
+                    <a:lumMod val="75000"/>
+                  </a:schemeClr>
+                </a:solidFill>
+              </a:ln>
+            </p:spPr>
+            <p:style>
+              <a:lnRef idx="2">
+                <a:schemeClr val="accent1">
+                  <a:shade val="50000"/>
+                </a:schemeClr>
+              </a:lnRef>
+              <a:fillRef idx="1">
+                <a:schemeClr val="accent1"/>
+              </a:fillRef>
+              <a:effectRef idx="0">
+                <a:schemeClr val="accent1"/>
+              </a:effectRef>
+              <a:fontRef idx="minor">
+                <a:schemeClr val="lt1"/>
+              </a:fontRef>
+            </p:style>
+            <p:txBody>
+              <a:bodyPr rtlCol="0" anchor="ctr"/>
+              <a:lstStyle/>
+              <a:p>
+                <a:pPr algn="ctr"/>
+                <a:r>
+                  <a:rPr lang="en-US" sz="1200" dirty="0">
+                    <a:solidFill>
+                      <a:schemeClr val="bg1">
+                        <a:lumMod val="85000"/>
+                      </a:schemeClr>
+                    </a:solidFill>
+                    <a:latin typeface="Open Sans" panose="020B0606030504020204" pitchFamily="34" charset="0"/>
+                    <a:ea typeface="Open Sans" panose="020B0606030504020204" pitchFamily="34" charset="0"/>
+                    <a:cs typeface="Open Sans" panose="020B0606030504020204" pitchFamily="34" charset="0"/>
+                  </a:rPr>
+                  <a:t>Stop</a:t>
+                </a:r>
+              </a:p>
+            </p:txBody>
+          </p:sp>
+          <p:sp>
+            <p:nvSpPr>
+              <p:cNvPr id="67" name="Flowchart: Decision 66">
+                <a:extLst>
+                  <a:ext uri="{FF2B5EF4-FFF2-40B4-BE49-F238E27FC236}">
+                    <a16:creationId xmlns:a16="http://schemas.microsoft.com/office/drawing/2014/main" id="{A3DDEFFD-6E92-1CB4-EE4D-6CD3E04860A6}"/>
+                  </a:ext>
+                </a:extLst>
+              </p:cNvPr>
+              <p:cNvSpPr/>
+              <p:nvPr/>
+            </p:nvSpPr>
+            <p:spPr>
+              <a:xfrm>
+                <a:off x="5173577" y="3580770"/>
+                <a:ext cx="1844844" cy="946484"/>
+              </a:xfrm>
+              <a:prstGeom prst="flowChartDecision">
+                <a:avLst/>
+              </a:prstGeom>
+              <a:noFill/>
+              <a:ln>
+                <a:solidFill>
+                  <a:srgbClr val="FF7C80"/>
+                </a:solidFill>
+              </a:ln>
+            </p:spPr>
+            <p:style>
+              <a:lnRef idx="2">
+                <a:schemeClr val="accent1">
+                  <a:shade val="50000"/>
+                </a:schemeClr>
+              </a:lnRef>
+              <a:fillRef idx="1">
+                <a:schemeClr val="accent1"/>
+              </a:fillRef>
+              <a:effectRef idx="0">
+                <a:schemeClr val="accent1"/>
+              </a:effectRef>
+              <a:fontRef idx="minor">
+                <a:schemeClr val="lt1"/>
+              </a:fontRef>
+            </p:style>
+            <p:txBody>
+              <a:bodyPr rtlCol="0" anchor="ctr"/>
+              <a:lstStyle/>
+              <a:p>
+                <a:pPr algn="ctr"/>
+                <a:r>
+                  <a:rPr lang="en-US" sz="1200" dirty="0" err="1">
+                    <a:solidFill>
+                      <a:schemeClr val="bg1">
+                        <a:lumMod val="85000"/>
+                      </a:schemeClr>
+                    </a:solidFill>
+                    <a:latin typeface="Open Sans" panose="020B0606030504020204" pitchFamily="34" charset="0"/>
+                    <a:ea typeface="Open Sans" panose="020B0606030504020204" pitchFamily="34" charset="0"/>
+                    <a:cs typeface="Open Sans" panose="020B0606030504020204" pitchFamily="34" charset="0"/>
+                  </a:rPr>
+                  <a:t>i</a:t>
+                </a:r>
+                <a:r>
+                  <a:rPr lang="en-US" sz="1200" dirty="0">
+                    <a:solidFill>
+                      <a:schemeClr val="bg1">
+                        <a:lumMod val="85000"/>
+                      </a:schemeClr>
+                    </a:solidFill>
+                    <a:latin typeface="Open Sans" panose="020B0606030504020204" pitchFamily="34" charset="0"/>
+                    <a:ea typeface="Open Sans" panose="020B0606030504020204" pitchFamily="34" charset="0"/>
+                    <a:cs typeface="Open Sans" panose="020B0606030504020204" pitchFamily="34" charset="0"/>
+                  </a:rPr>
+                  <a:t> &lt;= N</a:t>
+                </a:r>
+              </a:p>
+            </p:txBody>
+          </p:sp>
+          <p:sp>
+            <p:nvSpPr>
+              <p:cNvPr id="75" name="Flowchart: Data 74">
+                <a:extLst>
+                  <a:ext uri="{FF2B5EF4-FFF2-40B4-BE49-F238E27FC236}">
+                    <a16:creationId xmlns:a16="http://schemas.microsoft.com/office/drawing/2014/main" id="{684F63EE-4E36-A045-0D95-769D7FC961BB}"/>
+                  </a:ext>
+                </a:extLst>
+              </p:cNvPr>
+              <p:cNvSpPr/>
+              <p:nvPr/>
+            </p:nvSpPr>
+            <p:spPr>
+              <a:xfrm>
+                <a:off x="7385382" y="4823485"/>
+                <a:ext cx="1844844" cy="489284"/>
+              </a:xfrm>
+              <a:prstGeom prst="flowChartInputOutput">
+                <a:avLst/>
+              </a:prstGeom>
+              <a:noFill/>
+              <a:ln>
+                <a:solidFill>
+                  <a:srgbClr val="CC99FF"/>
+                </a:solidFill>
+              </a:ln>
+            </p:spPr>
+            <p:style>
+              <a:lnRef idx="2">
+                <a:schemeClr val="accent1">
+                  <a:shade val="50000"/>
+                </a:schemeClr>
+              </a:lnRef>
+              <a:fillRef idx="1">
+                <a:schemeClr val="accent1"/>
+              </a:fillRef>
+              <a:effectRef idx="0">
+                <a:schemeClr val="accent1"/>
+              </a:effectRef>
+              <a:fontRef idx="minor">
+                <a:schemeClr val="lt1"/>
+              </a:fontRef>
+            </p:style>
+            <p:txBody>
+              <a:bodyPr rtlCol="0" anchor="ctr"/>
+              <a:lstStyle/>
+              <a:p>
+                <a:pPr algn="ctr"/>
+                <a:r>
+                  <a:rPr lang="en-US" sz="1200" dirty="0">
+                    <a:solidFill>
+                      <a:schemeClr val="bg1">
+                        <a:lumMod val="85000"/>
+                      </a:schemeClr>
+                    </a:solidFill>
+                    <a:latin typeface="Open Sans" panose="020B0606030504020204" pitchFamily="34" charset="0"/>
+                    <a:ea typeface="Open Sans" panose="020B0606030504020204" pitchFamily="34" charset="0"/>
+                    <a:cs typeface="Open Sans" panose="020B0606030504020204" pitchFamily="34" charset="0"/>
+                  </a:rPr>
+                  <a:t>Print mark</a:t>
+                </a:r>
+              </a:p>
+            </p:txBody>
+          </p:sp>
+          <p:sp>
+            <p:nvSpPr>
+              <p:cNvPr id="20" name="Rectangle 19">
+                <a:extLst>
+                  <a:ext uri="{FF2B5EF4-FFF2-40B4-BE49-F238E27FC236}">
+                    <a16:creationId xmlns:a16="http://schemas.microsoft.com/office/drawing/2014/main" id="{AD2F0CBE-E290-AF6A-A271-56988121E62F}"/>
+                  </a:ext>
+                </a:extLst>
+              </p:cNvPr>
+              <p:cNvSpPr/>
+              <p:nvPr/>
+            </p:nvSpPr>
+            <p:spPr>
+              <a:xfrm>
+                <a:off x="2961772" y="3857496"/>
+                <a:ext cx="1844844" cy="393032"/>
+              </a:xfrm>
+              <a:prstGeom prst="rect">
+                <a:avLst/>
+              </a:prstGeom>
+              <a:noFill/>
+              <a:ln>
+                <a:solidFill>
+                  <a:schemeClr val="accent6">
+                    <a:lumMod val="60000"/>
+                    <a:lumOff val="40000"/>
+                  </a:schemeClr>
+                </a:solidFill>
+              </a:ln>
+            </p:spPr>
+            <p:style>
+              <a:lnRef idx="2">
+                <a:schemeClr val="accent1">
+                  <a:shade val="50000"/>
+                </a:schemeClr>
+              </a:lnRef>
+              <a:fillRef idx="1">
+                <a:schemeClr val="accent1"/>
+              </a:fillRef>
+              <a:effectRef idx="0">
+                <a:schemeClr val="accent1"/>
+              </a:effectRef>
+              <a:fontRef idx="minor">
+                <a:schemeClr val="lt1"/>
+              </a:fontRef>
+            </p:style>
+            <p:txBody>
+              <a:bodyPr rtlCol="0" anchor="ctr"/>
+              <a:lstStyle/>
+              <a:p>
+                <a:pPr algn="ctr"/>
+                <a:r>
+                  <a:rPr lang="en-US" sz="1200" dirty="0" err="1">
+                    <a:solidFill>
+                      <a:schemeClr val="bg1">
+                        <a:lumMod val="85000"/>
+                      </a:schemeClr>
+                    </a:solidFill>
+                    <a:latin typeface="Open Sans" panose="020B0606030504020204" pitchFamily="34" charset="0"/>
+                    <a:ea typeface="Open Sans" panose="020B0606030504020204" pitchFamily="34" charset="0"/>
+                    <a:cs typeface="Open Sans" panose="020B0606030504020204" pitchFamily="34" charset="0"/>
+                  </a:rPr>
+                  <a:t>i</a:t>
+                </a:r>
+                <a:r>
+                  <a:rPr lang="en-US" sz="1200" dirty="0">
+                    <a:solidFill>
+                      <a:schemeClr val="bg1">
+                        <a:lumMod val="85000"/>
+                      </a:schemeClr>
+                    </a:solidFill>
+                    <a:latin typeface="Open Sans" panose="020B0606030504020204" pitchFamily="34" charset="0"/>
+                    <a:ea typeface="Open Sans" panose="020B0606030504020204" pitchFamily="34" charset="0"/>
+                    <a:cs typeface="Open Sans" panose="020B0606030504020204" pitchFamily="34" charset="0"/>
+                  </a:rPr>
+                  <a:t> = 0</a:t>
+                </a:r>
+              </a:p>
+            </p:txBody>
+          </p:sp>
+          <p:sp>
+            <p:nvSpPr>
+              <p:cNvPr id="21" name="Flowchart: Decision 20">
+                <a:extLst>
+                  <a:ext uri="{FF2B5EF4-FFF2-40B4-BE49-F238E27FC236}">
+                    <a16:creationId xmlns:a16="http://schemas.microsoft.com/office/drawing/2014/main" id="{3824004F-F1DE-D420-D4F0-D8A2BB715992}"/>
+                  </a:ext>
+                </a:extLst>
+              </p:cNvPr>
+              <p:cNvSpPr/>
+              <p:nvPr/>
+            </p:nvSpPr>
+            <p:spPr>
+              <a:xfrm>
+                <a:off x="7385381" y="3580770"/>
+                <a:ext cx="1844844" cy="946484"/>
+              </a:xfrm>
+              <a:prstGeom prst="flowChartDecision">
+                <a:avLst/>
+              </a:prstGeom>
+              <a:noFill/>
+              <a:ln>
+                <a:solidFill>
+                  <a:srgbClr val="FF7C80"/>
+                </a:solidFill>
+              </a:ln>
+            </p:spPr>
+            <p:style>
+              <a:lnRef idx="2">
+                <a:schemeClr val="accent1">
+                  <a:shade val="50000"/>
+                </a:schemeClr>
+              </a:lnRef>
+              <a:fillRef idx="1">
+                <a:schemeClr val="accent1"/>
+              </a:fillRef>
+              <a:effectRef idx="0">
+                <a:schemeClr val="accent1"/>
+              </a:effectRef>
+              <a:fontRef idx="minor">
+                <a:schemeClr val="lt1"/>
+              </a:fontRef>
+            </p:style>
+            <p:txBody>
+              <a:bodyPr rtlCol="0" anchor="ctr"/>
+              <a:lstStyle/>
+              <a:p>
+                <a:pPr algn="ctr"/>
+                <a:r>
+                  <a:rPr lang="en-US" sz="1200" dirty="0">
+                    <a:solidFill>
+                      <a:schemeClr val="bg1">
+                        <a:lumMod val="85000"/>
+                      </a:schemeClr>
+                    </a:solidFill>
+                    <a:latin typeface="Open Sans" panose="020B0606030504020204" pitchFamily="34" charset="0"/>
+                    <a:ea typeface="Open Sans" panose="020B0606030504020204" pitchFamily="34" charset="0"/>
+                    <a:cs typeface="Open Sans" panose="020B0606030504020204" pitchFamily="34" charset="0"/>
+                  </a:rPr>
+                  <a:t>mark &lt; 40</a:t>
+                </a:r>
+              </a:p>
+            </p:txBody>
+          </p:sp>
+          <p:cxnSp>
+            <p:nvCxnSpPr>
+              <p:cNvPr id="10" name="Straight Arrow Connector 9">
+                <a:extLst>
+                  <a:ext uri="{FF2B5EF4-FFF2-40B4-BE49-F238E27FC236}">
+                    <a16:creationId xmlns:a16="http://schemas.microsoft.com/office/drawing/2014/main" id="{2F6AC1B8-239A-F135-FD9C-168EC4E94999}"/>
+                  </a:ext>
+                </a:extLst>
+              </p:cNvPr>
+              <p:cNvCxnSpPr>
+                <a:stCxn id="20" idx="3"/>
+                <a:endCxn id="67" idx="1"/>
+              </p:cNvCxnSpPr>
+              <p:nvPr/>
+            </p:nvCxnSpPr>
+            <p:spPr>
+              <a:xfrm>
+                <a:off x="4806616" y="4054012"/>
+                <a:ext cx="366961" cy="0"/>
+              </a:xfrm>
+              <a:prstGeom prst="straightConnector1">
+                <a:avLst/>
+              </a:prstGeom>
+              <a:ln w="12700">
+                <a:solidFill>
+                  <a:schemeClr val="bg1">
+                    <a:lumMod val="75000"/>
+                  </a:schemeClr>
+                </a:solidFill>
+                <a:tailEnd type="triangle"/>
+              </a:ln>
+            </p:spPr>
+            <p:style>
+              <a:lnRef idx="1">
+                <a:schemeClr val="accent1"/>
+              </a:lnRef>
+              <a:fillRef idx="0">
+                <a:schemeClr val="accent1"/>
+              </a:fillRef>
+              <a:effectRef idx="0">
+                <a:schemeClr val="accent1"/>
+              </a:effectRef>
+              <a:fontRef idx="minor">
+                <a:schemeClr val="tx1"/>
+              </a:fontRef>
+            </p:style>
+          </p:cxnSp>
+          <p:cxnSp>
+            <p:nvCxnSpPr>
+              <p:cNvPr id="13" name="Straight Arrow Connector 12">
+                <a:extLst>
+                  <a:ext uri="{FF2B5EF4-FFF2-40B4-BE49-F238E27FC236}">
+                    <a16:creationId xmlns:a16="http://schemas.microsoft.com/office/drawing/2014/main" id="{54550317-4993-EEF0-F3D3-BDA0DB9977B4}"/>
+                  </a:ext>
+                </a:extLst>
+              </p:cNvPr>
+              <p:cNvCxnSpPr>
+                <a:stCxn id="67" idx="3"/>
+                <a:endCxn id="21" idx="1"/>
+              </p:cNvCxnSpPr>
+              <p:nvPr/>
+            </p:nvCxnSpPr>
+            <p:spPr>
+              <a:xfrm>
+                <a:off x="7018421" y="4054012"/>
+                <a:ext cx="366960" cy="0"/>
+              </a:xfrm>
+              <a:prstGeom prst="straightConnector1">
+                <a:avLst/>
+              </a:prstGeom>
+              <a:ln w="12700">
+                <a:solidFill>
+                  <a:srgbClr val="FF7C80"/>
+                </a:solidFill>
+                <a:tailEnd type="triangle"/>
+              </a:ln>
+            </p:spPr>
+            <p:style>
+              <a:lnRef idx="1">
+                <a:schemeClr val="accent1"/>
+              </a:lnRef>
+              <a:fillRef idx="0">
+                <a:schemeClr val="accent1"/>
+              </a:fillRef>
+              <a:effectRef idx="0">
+                <a:schemeClr val="accent1"/>
+              </a:effectRef>
+              <a:fontRef idx="minor">
+                <a:schemeClr val="tx1"/>
+              </a:fontRef>
+            </p:style>
+          </p:cxnSp>
+          <p:cxnSp>
+            <p:nvCxnSpPr>
+              <p:cNvPr id="22" name="Straight Arrow Connector 21">
+                <a:extLst>
+                  <a:ext uri="{FF2B5EF4-FFF2-40B4-BE49-F238E27FC236}">
+                    <a16:creationId xmlns:a16="http://schemas.microsoft.com/office/drawing/2014/main" id="{C93C3D2B-5EEB-A880-91FF-A74A8B29363E}"/>
+                  </a:ext>
+                </a:extLst>
+              </p:cNvPr>
+              <p:cNvCxnSpPr>
+                <a:stCxn id="21" idx="2"/>
+                <a:endCxn id="75" idx="1"/>
+              </p:cNvCxnSpPr>
+              <p:nvPr/>
+            </p:nvCxnSpPr>
+            <p:spPr>
+              <a:xfrm>
+                <a:off x="8307803" y="4527254"/>
+                <a:ext cx="1" cy="296231"/>
+              </a:xfrm>
+              <a:prstGeom prst="straightConnector1">
+                <a:avLst/>
+              </a:prstGeom>
+              <a:ln w="12700">
+                <a:solidFill>
+                  <a:srgbClr val="FF7C80"/>
+                </a:solidFill>
+                <a:tailEnd type="triangle"/>
+              </a:ln>
+            </p:spPr>
+            <p:style>
+              <a:lnRef idx="1">
+                <a:schemeClr val="accent1"/>
+              </a:lnRef>
+              <a:fillRef idx="0">
+                <a:schemeClr val="accent1"/>
+              </a:fillRef>
+              <a:effectRef idx="0">
+                <a:schemeClr val="accent1"/>
+              </a:effectRef>
+              <a:fontRef idx="minor">
+                <a:schemeClr val="tx1"/>
+              </a:fontRef>
+            </p:style>
+          </p:cxnSp>
+          <p:sp>
+            <p:nvSpPr>
+              <p:cNvPr id="45" name="TextBox 44">
+                <a:extLst>
+                  <a:ext uri="{FF2B5EF4-FFF2-40B4-BE49-F238E27FC236}">
+                    <a16:creationId xmlns:a16="http://schemas.microsoft.com/office/drawing/2014/main" id="{C5E31F02-B0DE-D9F5-5293-325560FD0976}"/>
+                  </a:ext>
+                </a:extLst>
+              </p:cNvPr>
+              <p:cNvSpPr txBox="1"/>
+              <p:nvPr/>
+            </p:nvSpPr>
+            <p:spPr>
+              <a:xfrm>
+                <a:off x="8307803" y="4527254"/>
+                <a:ext cx="269626" cy="276999"/>
+              </a:xfrm>
+              <a:prstGeom prst="rect">
+                <a:avLst/>
+              </a:prstGeom>
+              <a:noFill/>
+            </p:spPr>
+            <p:txBody>
+              <a:bodyPr wrap="none" rtlCol="0">
+                <a:spAutoFit/>
+              </a:bodyPr>
+              <a:lstStyle/>
+              <a:p>
+                <a:r>
+                  <a:rPr lang="en-US" sz="1200" dirty="0">
+                    <a:solidFill>
+                      <a:srgbClr val="FF7C80"/>
+                    </a:solidFill>
+                    <a:latin typeface="Open Sans" panose="020B0606030504020204" pitchFamily="34" charset="0"/>
+                    <a:ea typeface="Open Sans" panose="020B0606030504020204" pitchFamily="34" charset="0"/>
+                    <a:cs typeface="Open Sans" panose="020B0606030504020204" pitchFamily="34" charset="0"/>
+                  </a:rPr>
+                  <a:t>T</a:t>
+                </a:r>
+              </a:p>
+            </p:txBody>
+          </p:sp>
+          <p:cxnSp>
+            <p:nvCxnSpPr>
+              <p:cNvPr id="36" name="Straight Arrow Connector 35">
+                <a:extLst>
+                  <a:ext uri="{FF2B5EF4-FFF2-40B4-BE49-F238E27FC236}">
+                    <a16:creationId xmlns:a16="http://schemas.microsoft.com/office/drawing/2014/main" id="{568BF687-F5BA-932E-B18D-0F79DFC9DCA1}"/>
+                  </a:ext>
+                </a:extLst>
+              </p:cNvPr>
+              <p:cNvCxnSpPr>
+                <a:cxnSpLocks/>
+                <a:stCxn id="59" idx="2"/>
+                <a:endCxn id="37" idx="1"/>
+              </p:cNvCxnSpPr>
+              <p:nvPr/>
+            </p:nvCxnSpPr>
+            <p:spPr>
+              <a:xfrm>
+                <a:off x="3884194" y="2497725"/>
+                <a:ext cx="1" cy="297698"/>
+              </a:xfrm>
+              <a:prstGeom prst="straightConnector1">
+                <a:avLst/>
+              </a:prstGeom>
+              <a:ln w="12700">
+                <a:solidFill>
+                  <a:schemeClr val="bg1">
+                    <a:lumMod val="75000"/>
+                  </a:schemeClr>
+                </a:solidFill>
+                <a:tailEnd type="triangle"/>
+              </a:ln>
+            </p:spPr>
+            <p:style>
+              <a:lnRef idx="1">
+                <a:schemeClr val="accent1"/>
+              </a:lnRef>
+              <a:fillRef idx="0">
+                <a:schemeClr val="accent1"/>
+              </a:fillRef>
+              <a:effectRef idx="0">
+                <a:schemeClr val="accent1"/>
+              </a:effectRef>
+              <a:fontRef idx="minor">
+                <a:schemeClr val="tx1"/>
+              </a:fontRef>
+            </p:style>
+          </p:cxnSp>
+          <p:sp>
+            <p:nvSpPr>
+              <p:cNvPr id="37" name="Flowchart: Data 36">
+                <a:extLst>
+                  <a:ext uri="{FF2B5EF4-FFF2-40B4-BE49-F238E27FC236}">
+                    <a16:creationId xmlns:a16="http://schemas.microsoft.com/office/drawing/2014/main" id="{3495D873-3AD6-01B1-727C-443D9829022E}"/>
+                  </a:ext>
+                </a:extLst>
+              </p:cNvPr>
+              <p:cNvSpPr/>
+              <p:nvPr/>
+            </p:nvSpPr>
+            <p:spPr>
+              <a:xfrm>
+                <a:off x="2961773" y="2795423"/>
+                <a:ext cx="1844844" cy="489284"/>
+              </a:xfrm>
+              <a:prstGeom prst="flowChartInputOutput">
+                <a:avLst/>
+              </a:prstGeom>
+              <a:noFill/>
+              <a:ln>
+                <a:solidFill>
+                  <a:schemeClr val="accent1">
+                    <a:lumMod val="60000"/>
+                    <a:lumOff val="40000"/>
+                  </a:schemeClr>
+                </a:solidFill>
+              </a:ln>
+            </p:spPr>
+            <p:style>
+              <a:lnRef idx="2">
+                <a:schemeClr val="accent1">
+                  <a:shade val="50000"/>
+                </a:schemeClr>
+              </a:lnRef>
+              <a:fillRef idx="1">
+                <a:schemeClr val="accent1"/>
+              </a:fillRef>
+              <a:effectRef idx="0">
+                <a:schemeClr val="accent1"/>
+              </a:effectRef>
+              <a:fontRef idx="minor">
+                <a:schemeClr val="lt1"/>
+              </a:fontRef>
+            </p:style>
+            <p:txBody>
+              <a:bodyPr rtlCol="0" anchor="ctr"/>
+              <a:lstStyle/>
+              <a:p>
+                <a:pPr algn="ctr"/>
+                <a:r>
+                  <a:rPr lang="en-US" sz="1200" dirty="0">
+                    <a:solidFill>
+                      <a:schemeClr val="bg1">
+                        <a:lumMod val="85000"/>
+                      </a:schemeClr>
+                    </a:solidFill>
+                    <a:latin typeface="Open Sans" panose="020B0606030504020204" pitchFamily="34" charset="0"/>
+                    <a:ea typeface="Open Sans" panose="020B0606030504020204" pitchFamily="34" charset="0"/>
+                    <a:cs typeface="Open Sans" panose="020B0606030504020204" pitchFamily="34" charset="0"/>
+                  </a:rPr>
+                  <a:t>Read N</a:t>
+                </a:r>
+              </a:p>
+            </p:txBody>
+          </p:sp>
+          <p:cxnSp>
+            <p:nvCxnSpPr>
+              <p:cNvPr id="38" name="Straight Arrow Connector 37">
+                <a:extLst>
+                  <a:ext uri="{FF2B5EF4-FFF2-40B4-BE49-F238E27FC236}">
+                    <a16:creationId xmlns:a16="http://schemas.microsoft.com/office/drawing/2014/main" id="{F1D4DEB8-0E8C-D781-1911-28932EE3D2E3}"/>
+                  </a:ext>
+                </a:extLst>
+              </p:cNvPr>
+              <p:cNvCxnSpPr>
+                <a:cxnSpLocks/>
+                <a:stCxn id="37" idx="4"/>
+                <a:endCxn id="20" idx="0"/>
+              </p:cNvCxnSpPr>
+              <p:nvPr/>
+            </p:nvCxnSpPr>
+            <p:spPr>
+              <a:xfrm flipH="1">
+                <a:off x="3884194" y="3284707"/>
+                <a:ext cx="1" cy="572789"/>
+              </a:xfrm>
+              <a:prstGeom prst="straightConnector1">
+                <a:avLst/>
+              </a:prstGeom>
+              <a:ln w="12700">
+                <a:solidFill>
+                  <a:schemeClr val="accent1">
+                    <a:lumMod val="60000"/>
+                    <a:lumOff val="40000"/>
+                  </a:schemeClr>
+                </a:solidFill>
+                <a:tailEnd type="triangle"/>
+              </a:ln>
+            </p:spPr>
+            <p:style>
+              <a:lnRef idx="1">
+                <a:schemeClr val="accent1"/>
+              </a:lnRef>
+              <a:fillRef idx="0">
+                <a:schemeClr val="accent1"/>
+              </a:fillRef>
+              <a:effectRef idx="0">
+                <a:schemeClr val="accent1"/>
+              </a:effectRef>
+              <a:fontRef idx="minor">
+                <a:schemeClr val="tx1"/>
+              </a:fontRef>
+            </p:style>
+          </p:cxnSp>
+          <p:sp>
+            <p:nvSpPr>
+              <p:cNvPr id="52" name="Flowchart: Data 51">
+                <a:extLst>
+                  <a:ext uri="{FF2B5EF4-FFF2-40B4-BE49-F238E27FC236}">
+                    <a16:creationId xmlns:a16="http://schemas.microsoft.com/office/drawing/2014/main" id="{835BAFCA-5FC2-47A2-AF17-AADD33D441E6}"/>
+                  </a:ext>
+                </a:extLst>
+              </p:cNvPr>
+              <p:cNvSpPr/>
+              <p:nvPr/>
+            </p:nvSpPr>
+            <p:spPr>
+              <a:xfrm>
+                <a:off x="7385381" y="2793788"/>
+                <a:ext cx="1844844" cy="489284"/>
+              </a:xfrm>
+              <a:prstGeom prst="flowChartInputOutput">
+                <a:avLst/>
+              </a:prstGeom>
+              <a:noFill/>
+              <a:ln>
+                <a:solidFill>
+                  <a:srgbClr val="CC99FF"/>
+                </a:solidFill>
+              </a:ln>
+            </p:spPr>
+            <p:style>
+              <a:lnRef idx="2">
+                <a:schemeClr val="accent1">
+                  <a:shade val="50000"/>
+                </a:schemeClr>
+              </a:lnRef>
+              <a:fillRef idx="1">
+                <a:schemeClr val="accent1"/>
+              </a:fillRef>
+              <a:effectRef idx="0">
+                <a:schemeClr val="accent1"/>
+              </a:effectRef>
+              <a:fontRef idx="minor">
+                <a:schemeClr val="lt1"/>
+              </a:fontRef>
+            </p:style>
+            <p:txBody>
+              <a:bodyPr rtlCol="0" anchor="ctr"/>
+              <a:lstStyle/>
+              <a:p>
+                <a:pPr algn="ctr"/>
+                <a:r>
+                  <a:rPr lang="en-US" sz="1200" dirty="0">
+                    <a:solidFill>
+                      <a:schemeClr val="bg1">
+                        <a:lumMod val="85000"/>
+                      </a:schemeClr>
+                    </a:solidFill>
+                    <a:latin typeface="Open Sans" panose="020B0606030504020204" pitchFamily="34" charset="0"/>
+                    <a:ea typeface="Open Sans" panose="020B0606030504020204" pitchFamily="34" charset="0"/>
+                    <a:cs typeface="Open Sans" panose="020B0606030504020204" pitchFamily="34" charset="0"/>
+                  </a:rPr>
+                  <a:t>Print mark</a:t>
+                </a:r>
+              </a:p>
+            </p:txBody>
+          </p:sp>
+          <p:sp>
+            <p:nvSpPr>
+              <p:cNvPr id="58" name="Rectangle 57">
+                <a:extLst>
+                  <a:ext uri="{FF2B5EF4-FFF2-40B4-BE49-F238E27FC236}">
+                    <a16:creationId xmlns:a16="http://schemas.microsoft.com/office/drawing/2014/main" id="{4DFB1827-7C55-F36D-2C44-B36EB1BA24C5}"/>
+                  </a:ext>
+                </a:extLst>
+              </p:cNvPr>
+              <p:cNvSpPr/>
+              <p:nvPr/>
+            </p:nvSpPr>
+            <p:spPr>
+              <a:xfrm>
+                <a:off x="5171569" y="4871611"/>
+                <a:ext cx="1844844" cy="393032"/>
+              </a:xfrm>
+              <a:prstGeom prst="rect">
+                <a:avLst/>
+              </a:prstGeom>
+              <a:noFill/>
+              <a:ln>
+                <a:solidFill>
+                  <a:schemeClr val="accent6">
+                    <a:lumMod val="60000"/>
+                    <a:lumOff val="40000"/>
+                  </a:schemeClr>
+                </a:solidFill>
+              </a:ln>
+            </p:spPr>
+            <p:style>
+              <a:lnRef idx="2">
+                <a:schemeClr val="accent1">
+                  <a:shade val="50000"/>
+                </a:schemeClr>
+              </a:lnRef>
+              <a:fillRef idx="1">
+                <a:schemeClr val="accent1"/>
+              </a:fillRef>
+              <a:effectRef idx="0">
+                <a:schemeClr val="accent1"/>
+              </a:effectRef>
+              <a:fontRef idx="minor">
+                <a:schemeClr val="lt1"/>
+              </a:fontRef>
+            </p:style>
+            <p:txBody>
+              <a:bodyPr rtlCol="0" anchor="ctr"/>
+              <a:lstStyle/>
+              <a:p>
+                <a:pPr algn="ctr"/>
+                <a:r>
+                  <a:rPr lang="en-US" sz="1200" dirty="0" err="1">
+                    <a:solidFill>
+                      <a:schemeClr val="bg1">
+                        <a:lumMod val="85000"/>
+                      </a:schemeClr>
+                    </a:solidFill>
+                    <a:latin typeface="Open Sans" panose="020B0606030504020204" pitchFamily="34" charset="0"/>
+                    <a:ea typeface="Open Sans" panose="020B0606030504020204" pitchFamily="34" charset="0"/>
+                    <a:cs typeface="Open Sans" panose="020B0606030504020204" pitchFamily="34" charset="0"/>
+                  </a:rPr>
+                  <a:t>i</a:t>
+                </a:r>
+                <a:r>
+                  <a:rPr lang="en-US" sz="1200" dirty="0">
+                    <a:solidFill>
+                      <a:schemeClr val="bg1">
+                        <a:lumMod val="85000"/>
+                      </a:schemeClr>
+                    </a:solidFill>
+                    <a:latin typeface="Open Sans" panose="020B0606030504020204" pitchFamily="34" charset="0"/>
+                    <a:ea typeface="Open Sans" panose="020B0606030504020204" pitchFamily="34" charset="0"/>
+                    <a:cs typeface="Open Sans" panose="020B0606030504020204" pitchFamily="34" charset="0"/>
+                  </a:rPr>
+                  <a:t> = </a:t>
+                </a:r>
+                <a:r>
+                  <a:rPr lang="en-US" sz="1200" dirty="0" err="1">
+                    <a:solidFill>
+                      <a:schemeClr val="bg1">
+                        <a:lumMod val="85000"/>
+                      </a:schemeClr>
+                    </a:solidFill>
+                    <a:latin typeface="Open Sans" panose="020B0606030504020204" pitchFamily="34" charset="0"/>
+                    <a:ea typeface="Open Sans" panose="020B0606030504020204" pitchFamily="34" charset="0"/>
+                    <a:cs typeface="Open Sans" panose="020B0606030504020204" pitchFamily="34" charset="0"/>
+                  </a:rPr>
+                  <a:t>i</a:t>
+                </a:r>
+                <a:r>
+                  <a:rPr lang="en-US" sz="1200" dirty="0">
+                    <a:solidFill>
+                      <a:schemeClr val="bg1">
+                        <a:lumMod val="85000"/>
+                      </a:schemeClr>
+                    </a:solidFill>
+                    <a:latin typeface="Open Sans" panose="020B0606030504020204" pitchFamily="34" charset="0"/>
+                    <a:ea typeface="Open Sans" panose="020B0606030504020204" pitchFamily="34" charset="0"/>
+                    <a:cs typeface="Open Sans" panose="020B0606030504020204" pitchFamily="34" charset="0"/>
+                  </a:rPr>
+                  <a:t> + 1</a:t>
+                </a:r>
+              </a:p>
+            </p:txBody>
+          </p:sp>
+          <p:cxnSp>
+            <p:nvCxnSpPr>
+              <p:cNvPr id="54" name="Connector: Elbow 53">
+                <a:extLst>
+                  <a:ext uri="{FF2B5EF4-FFF2-40B4-BE49-F238E27FC236}">
+                    <a16:creationId xmlns:a16="http://schemas.microsoft.com/office/drawing/2014/main" id="{A8A89BB7-6723-3D19-0A73-819447D54662}"/>
+                  </a:ext>
+                </a:extLst>
+              </p:cNvPr>
+              <p:cNvCxnSpPr>
+                <a:stCxn id="67" idx="0"/>
+                <a:endCxn id="52" idx="2"/>
+              </p:cNvCxnSpPr>
+              <p:nvPr/>
+            </p:nvCxnSpPr>
+            <p:spPr>
+              <a:xfrm rot="5400000" flipH="1" flipV="1">
+                <a:off x="6561762" y="2572667"/>
+                <a:ext cx="542340" cy="1473866"/>
+              </a:xfrm>
+              <a:prstGeom prst="bentConnector2">
+                <a:avLst/>
+              </a:prstGeom>
+              <a:ln w="12700">
+                <a:solidFill>
+                  <a:srgbClr val="FF7C80"/>
+                </a:solidFill>
+                <a:tailEnd type="triangle"/>
+              </a:ln>
+            </p:spPr>
+            <p:style>
+              <a:lnRef idx="1">
+                <a:schemeClr val="accent1"/>
+              </a:lnRef>
+              <a:fillRef idx="0">
+                <a:schemeClr val="accent1"/>
+              </a:fillRef>
+              <a:effectRef idx="0">
+                <a:schemeClr val="accent1"/>
+              </a:effectRef>
+              <a:fontRef idx="minor">
+                <a:schemeClr val="tx1"/>
+              </a:fontRef>
+            </p:style>
+          </p:cxnSp>
+          <p:cxnSp>
+            <p:nvCxnSpPr>
+              <p:cNvPr id="56" name="Straight Arrow Connector 55">
+                <a:extLst>
+                  <a:ext uri="{FF2B5EF4-FFF2-40B4-BE49-F238E27FC236}">
+                    <a16:creationId xmlns:a16="http://schemas.microsoft.com/office/drawing/2014/main" id="{C1A5E18D-EF07-20FF-30C3-637E64F33600}"/>
+                  </a:ext>
+                </a:extLst>
+              </p:cNvPr>
+              <p:cNvCxnSpPr>
+                <a:stCxn id="52" idx="1"/>
+                <a:endCxn id="60" idx="2"/>
+              </p:cNvCxnSpPr>
+              <p:nvPr/>
+            </p:nvCxnSpPr>
+            <p:spPr>
+              <a:xfrm flipV="1">
+                <a:off x="8307803" y="2497725"/>
+                <a:ext cx="0" cy="296063"/>
+              </a:xfrm>
+              <a:prstGeom prst="straightConnector1">
+                <a:avLst/>
+              </a:prstGeom>
+              <a:ln w="12700">
+                <a:solidFill>
+                  <a:srgbClr val="CC99FF"/>
+                </a:solidFill>
+                <a:tailEnd type="triangle"/>
+              </a:ln>
+            </p:spPr>
+            <p:style>
+              <a:lnRef idx="1">
+                <a:schemeClr val="accent1"/>
+              </a:lnRef>
+              <a:fillRef idx="0">
+                <a:schemeClr val="accent1"/>
+              </a:fillRef>
+              <a:effectRef idx="0">
+                <a:schemeClr val="accent1"/>
+              </a:effectRef>
+              <a:fontRef idx="minor">
+                <a:schemeClr val="tx1"/>
+              </a:fontRef>
+            </p:style>
+          </p:cxnSp>
+          <p:cxnSp>
+            <p:nvCxnSpPr>
+              <p:cNvPr id="62" name="Straight Arrow Connector 61">
+                <a:extLst>
+                  <a:ext uri="{FF2B5EF4-FFF2-40B4-BE49-F238E27FC236}">
+                    <a16:creationId xmlns:a16="http://schemas.microsoft.com/office/drawing/2014/main" id="{04D21F0D-7AC8-EBC6-9B8A-3FCB20E0BE12}"/>
+                  </a:ext>
+                </a:extLst>
+              </p:cNvPr>
+              <p:cNvCxnSpPr>
+                <a:stCxn id="75" idx="2"/>
+                <a:endCxn id="58" idx="3"/>
+              </p:cNvCxnSpPr>
+              <p:nvPr/>
+            </p:nvCxnSpPr>
+            <p:spPr>
+              <a:xfrm flipH="1">
+                <a:off x="7016413" y="5068127"/>
+                <a:ext cx="553453" cy="0"/>
+              </a:xfrm>
+              <a:prstGeom prst="straightConnector1">
+                <a:avLst/>
+              </a:prstGeom>
+              <a:ln w="12700">
+                <a:solidFill>
+                  <a:srgbClr val="CC99FF"/>
+                </a:solidFill>
+                <a:tailEnd type="triangle"/>
+              </a:ln>
+            </p:spPr>
+            <p:style>
+              <a:lnRef idx="1">
+                <a:schemeClr val="accent1"/>
+              </a:lnRef>
+              <a:fillRef idx="0">
+                <a:schemeClr val="accent1"/>
+              </a:fillRef>
+              <a:effectRef idx="0">
+                <a:schemeClr val="accent1"/>
+              </a:effectRef>
+              <a:fontRef idx="minor">
+                <a:schemeClr val="tx1"/>
+              </a:fontRef>
+            </p:style>
+          </p:cxnSp>
+          <p:cxnSp>
+            <p:nvCxnSpPr>
+              <p:cNvPr id="64" name="Straight Arrow Connector 63">
+                <a:extLst>
+                  <a:ext uri="{FF2B5EF4-FFF2-40B4-BE49-F238E27FC236}">
+                    <a16:creationId xmlns:a16="http://schemas.microsoft.com/office/drawing/2014/main" id="{DFEB3211-9022-38B4-BD74-93A671E53809}"/>
+                  </a:ext>
+                </a:extLst>
+              </p:cNvPr>
+              <p:cNvCxnSpPr>
+                <a:cxnSpLocks/>
+                <a:stCxn id="58" idx="0"/>
+                <a:endCxn id="67" idx="2"/>
+              </p:cNvCxnSpPr>
+              <p:nvPr/>
+            </p:nvCxnSpPr>
+            <p:spPr>
+              <a:xfrm flipV="1">
+                <a:off x="6093991" y="4527254"/>
+                <a:ext cx="2008" cy="344357"/>
+              </a:xfrm>
+              <a:prstGeom prst="straightConnector1">
+                <a:avLst/>
+              </a:prstGeom>
+              <a:ln w="12700">
+                <a:solidFill>
+                  <a:schemeClr val="bg1">
+                    <a:lumMod val="75000"/>
+                  </a:schemeClr>
+                </a:solidFill>
+                <a:tailEnd type="triangle"/>
+              </a:ln>
+            </p:spPr>
+            <p:style>
+              <a:lnRef idx="1">
+                <a:schemeClr val="accent1"/>
+              </a:lnRef>
+              <a:fillRef idx="0">
+                <a:schemeClr val="accent1"/>
+              </a:fillRef>
+              <a:effectRef idx="0">
+                <a:schemeClr val="accent1"/>
+              </a:effectRef>
+              <a:fontRef idx="minor">
+                <a:schemeClr val="tx1"/>
+              </a:fontRef>
+            </p:style>
+          </p:cxnSp>
+          <p:sp>
+            <p:nvSpPr>
+              <p:cNvPr id="69" name="TextBox 68">
+                <a:extLst>
+                  <a:ext uri="{FF2B5EF4-FFF2-40B4-BE49-F238E27FC236}">
+                    <a16:creationId xmlns:a16="http://schemas.microsoft.com/office/drawing/2014/main" id="{B27B65E5-14C9-607C-0393-0190D5701E9F}"/>
+                  </a:ext>
+                </a:extLst>
+              </p:cNvPr>
+              <p:cNvSpPr txBox="1"/>
+              <p:nvPr/>
+            </p:nvSpPr>
+            <p:spPr>
+              <a:xfrm>
+                <a:off x="7016413" y="3786627"/>
+                <a:ext cx="269626" cy="276999"/>
+              </a:xfrm>
+              <a:prstGeom prst="rect">
+                <a:avLst/>
+              </a:prstGeom>
+              <a:noFill/>
+            </p:spPr>
+            <p:txBody>
+              <a:bodyPr wrap="none" rtlCol="0">
+                <a:spAutoFit/>
+              </a:bodyPr>
+              <a:lstStyle/>
+              <a:p>
+                <a:r>
+                  <a:rPr lang="en-US" sz="1200" dirty="0">
+                    <a:solidFill>
+                      <a:srgbClr val="FF7C80"/>
+                    </a:solidFill>
+                    <a:latin typeface="Open Sans" panose="020B0606030504020204" pitchFamily="34" charset="0"/>
+                    <a:ea typeface="Open Sans" panose="020B0606030504020204" pitchFamily="34" charset="0"/>
+                    <a:cs typeface="Open Sans" panose="020B0606030504020204" pitchFamily="34" charset="0"/>
+                  </a:rPr>
+                  <a:t>T</a:t>
+                </a:r>
+              </a:p>
+            </p:txBody>
+          </p:sp>
+          <p:sp>
+            <p:nvSpPr>
+              <p:cNvPr id="70" name="TextBox 69">
+                <a:extLst>
+                  <a:ext uri="{FF2B5EF4-FFF2-40B4-BE49-F238E27FC236}">
+                    <a16:creationId xmlns:a16="http://schemas.microsoft.com/office/drawing/2014/main" id="{EB1B8C6F-315E-E8C9-2635-8E68D5F0AB2C}"/>
+                  </a:ext>
+                </a:extLst>
+              </p:cNvPr>
+              <p:cNvSpPr txBox="1"/>
+              <p:nvPr/>
+            </p:nvSpPr>
+            <p:spPr>
+              <a:xfrm>
+                <a:off x="5828381" y="3306742"/>
+                <a:ext cx="269626" cy="276999"/>
+              </a:xfrm>
+              <a:prstGeom prst="rect">
+                <a:avLst/>
+              </a:prstGeom>
+              <a:noFill/>
+            </p:spPr>
+            <p:txBody>
+              <a:bodyPr wrap="none" rtlCol="0">
+                <a:spAutoFit/>
+              </a:bodyPr>
+              <a:lstStyle/>
+              <a:p>
+                <a:r>
+                  <a:rPr lang="en-US" sz="1200" dirty="0">
+                    <a:solidFill>
+                      <a:srgbClr val="FF7C80"/>
+                    </a:solidFill>
+                    <a:latin typeface="Open Sans" panose="020B0606030504020204" pitchFamily="34" charset="0"/>
+                    <a:ea typeface="Open Sans" panose="020B0606030504020204" pitchFamily="34" charset="0"/>
+                    <a:cs typeface="Open Sans" panose="020B0606030504020204" pitchFamily="34" charset="0"/>
+                  </a:rPr>
+                  <a:t>F</a:t>
+                </a:r>
+              </a:p>
+            </p:txBody>
+          </p:sp>
+        </p:grpSp>
+      </p:grpSp>
+    </p:spTree>
+    <p:extLst>
+      <p:ext uri="{BB962C8B-B14F-4D97-AF65-F5344CB8AC3E}">
+        <p14:creationId xmlns:p14="http://schemas.microsoft.com/office/powerpoint/2010/main" val="2790336761"/>
+      </p:ext>
+    </p:extLst>
+  </p:cSld>
+  <p:clrMapOvr>
+    <a:masterClrMapping/>
+  </p:clrMapOvr>
+</p:sld>
+</file>
+
 <file path=ppt/slides/slide2.xml><?xml version="1.0" encoding="utf-8"?>
 <p:sld xmlns:a="http://schemas.openxmlformats.org/drawingml/2006/main" xmlns:r="http://schemas.openxmlformats.org/officeDocument/2006/relationships" xmlns:p="http://schemas.openxmlformats.org/presentationml/2006/main">
   <p:cSld>

</xml_diff>

<commit_message>
Added Flowchart for Q6 of PrePSPM1920_KMJ
</commit_message>
<xml_diff>
--- a/Past Year Theory Questions/Resources/resources.pptx
+++ b/Past Year Theory Questions/Resources/resources.pptx
@@ -16,6 +16,7 @@
     <p:sldId id="265" r:id="rId10"/>
     <p:sldId id="266" r:id="rId11"/>
     <p:sldId id="267" r:id="rId12"/>
+    <p:sldId id="268" r:id="rId13"/>
   </p:sldIdLst>
   <p:sldSz cx="12192000" cy="6858000"/>
   <p:notesSz cx="6858000" cy="9144000"/>
@@ -269,7 +270,7 @@
           <a:p>
             <a:fld id="{34BBF2E1-1C0D-4B66-AD27-CA9E57E33A5F}" type="datetimeFigureOut">
               <a:rPr lang="en-US" smtClean="0"/>
-              <a:t>15-May-22</a:t>
+              <a:t>16-May-22</a:t>
             </a:fld>
             <a:endParaRPr lang="en-US"/>
           </a:p>
@@ -467,7 +468,7 @@
           <a:p>
             <a:fld id="{34BBF2E1-1C0D-4B66-AD27-CA9E57E33A5F}" type="datetimeFigureOut">
               <a:rPr lang="en-US" smtClean="0"/>
-              <a:t>15-May-22</a:t>
+              <a:t>16-May-22</a:t>
             </a:fld>
             <a:endParaRPr lang="en-US"/>
           </a:p>
@@ -675,7 +676,7 @@
           <a:p>
             <a:fld id="{34BBF2E1-1C0D-4B66-AD27-CA9E57E33A5F}" type="datetimeFigureOut">
               <a:rPr lang="en-US" smtClean="0"/>
-              <a:t>15-May-22</a:t>
+              <a:t>16-May-22</a:t>
             </a:fld>
             <a:endParaRPr lang="en-US"/>
           </a:p>
@@ -873,7 +874,7 @@
           <a:p>
             <a:fld id="{34BBF2E1-1C0D-4B66-AD27-CA9E57E33A5F}" type="datetimeFigureOut">
               <a:rPr lang="en-US" smtClean="0"/>
-              <a:t>15-May-22</a:t>
+              <a:t>16-May-22</a:t>
             </a:fld>
             <a:endParaRPr lang="en-US"/>
           </a:p>
@@ -1148,7 +1149,7 @@
           <a:p>
             <a:fld id="{34BBF2E1-1C0D-4B66-AD27-CA9E57E33A5F}" type="datetimeFigureOut">
               <a:rPr lang="en-US" smtClean="0"/>
-              <a:t>15-May-22</a:t>
+              <a:t>16-May-22</a:t>
             </a:fld>
             <a:endParaRPr lang="en-US"/>
           </a:p>
@@ -1413,7 +1414,7 @@
           <a:p>
             <a:fld id="{34BBF2E1-1C0D-4B66-AD27-CA9E57E33A5F}" type="datetimeFigureOut">
               <a:rPr lang="en-US" smtClean="0"/>
-              <a:t>15-May-22</a:t>
+              <a:t>16-May-22</a:t>
             </a:fld>
             <a:endParaRPr lang="en-US"/>
           </a:p>
@@ -1825,7 +1826,7 @@
           <a:p>
             <a:fld id="{34BBF2E1-1C0D-4B66-AD27-CA9E57E33A5F}" type="datetimeFigureOut">
               <a:rPr lang="en-US" smtClean="0"/>
-              <a:t>15-May-22</a:t>
+              <a:t>16-May-22</a:t>
             </a:fld>
             <a:endParaRPr lang="en-US"/>
           </a:p>
@@ -1966,7 +1967,7 @@
           <a:p>
             <a:fld id="{34BBF2E1-1C0D-4B66-AD27-CA9E57E33A5F}" type="datetimeFigureOut">
               <a:rPr lang="en-US" smtClean="0"/>
-              <a:t>15-May-22</a:t>
+              <a:t>16-May-22</a:t>
             </a:fld>
             <a:endParaRPr lang="en-US"/>
           </a:p>
@@ -2079,7 +2080,7 @@
           <a:p>
             <a:fld id="{34BBF2E1-1C0D-4B66-AD27-CA9E57E33A5F}" type="datetimeFigureOut">
               <a:rPr lang="en-US" smtClean="0"/>
-              <a:t>15-May-22</a:t>
+              <a:t>16-May-22</a:t>
             </a:fld>
             <a:endParaRPr lang="en-US"/>
           </a:p>
@@ -2390,7 +2391,7 @@
           <a:p>
             <a:fld id="{34BBF2E1-1C0D-4B66-AD27-CA9E57E33A5F}" type="datetimeFigureOut">
               <a:rPr lang="en-US" smtClean="0"/>
-              <a:t>15-May-22</a:t>
+              <a:t>16-May-22</a:t>
             </a:fld>
             <a:endParaRPr lang="en-US"/>
           </a:p>
@@ -2678,7 +2679,7 @@
           <a:p>
             <a:fld id="{34BBF2E1-1C0D-4B66-AD27-CA9E57E33A5F}" type="datetimeFigureOut">
               <a:rPr lang="en-US" smtClean="0"/>
-              <a:t>15-May-22</a:t>
+              <a:t>16-May-22</a:t>
             </a:fld>
             <a:endParaRPr lang="en-US"/>
           </a:p>
@@ -2919,7 +2920,7 @@
           <a:p>
             <a:fld id="{34BBF2E1-1C0D-4B66-AD27-CA9E57E33A5F}" type="datetimeFigureOut">
               <a:rPr lang="en-US" smtClean="0"/>
-              <a:t>15-May-22</a:t>
+              <a:t>16-May-22</a:t>
             </a:fld>
             <a:endParaRPr lang="en-US"/>
           </a:p>
@@ -5019,7 +5020,7 @@
         </p:nvGrpSpPr>
         <p:grpSpPr>
           <a:xfrm>
-            <a:off x="2488066" y="1587566"/>
+            <a:off x="2488066" y="1832509"/>
             <a:ext cx="7215868" cy="3192981"/>
             <a:chOff x="2488066" y="1587566"/>
             <a:chExt cx="7215868" cy="3192981"/>
@@ -5922,7 +5923,7 @@
         </p:nvGrpSpPr>
         <p:grpSpPr>
           <a:xfrm>
-            <a:off x="2594810" y="1706880"/>
+            <a:off x="2594810" y="1385938"/>
             <a:ext cx="7002379" cy="4086124"/>
             <a:chOff x="2594810" y="1706880"/>
             <a:chExt cx="7002379" cy="4086124"/>
@@ -7207,6 +7208,1184 @@
     <p:extLst>
       <p:ext uri="{BB962C8B-B14F-4D97-AF65-F5344CB8AC3E}">
         <p14:creationId xmlns:p14="http://schemas.microsoft.com/office/powerpoint/2010/main" val="2790336761"/>
+      </p:ext>
+    </p:extLst>
+  </p:cSld>
+  <p:clrMapOvr>
+    <a:masterClrMapping/>
+  </p:clrMapOvr>
+</p:sld>
+</file>
+
+<file path=ppt/slides/slide12.xml><?xml version="1.0" encoding="utf-8"?>
+<p:sld xmlns:a="http://schemas.openxmlformats.org/drawingml/2006/main" xmlns:r="http://schemas.openxmlformats.org/officeDocument/2006/relationships" xmlns:p="http://schemas.openxmlformats.org/presentationml/2006/main">
+  <p:cSld>
+    <p:spTree>
+      <p:nvGrpSpPr>
+        <p:cNvPr id="1" name=""/>
+        <p:cNvGrpSpPr/>
+        <p:nvPr/>
+      </p:nvGrpSpPr>
+      <p:grpSpPr>
+        <a:xfrm>
+          <a:off x="0" y="0"/>
+          <a:ext cx="0" cy="0"/>
+          <a:chOff x="0" y="0"/>
+          <a:chExt cx="0" cy="0"/>
+        </a:xfrm>
+      </p:grpSpPr>
+      <p:grpSp>
+        <p:nvGrpSpPr>
+          <p:cNvPr id="19" name="Group 18">
+            <a:extLst>
+              <a:ext uri="{FF2B5EF4-FFF2-40B4-BE49-F238E27FC236}">
+                <a16:creationId xmlns:a16="http://schemas.microsoft.com/office/drawing/2014/main" id="{86CD8CAC-AE59-12FB-AAD7-44DCD10FFD9C}"/>
+              </a:ext>
+            </a:extLst>
+          </p:cNvPr>
+          <p:cNvGrpSpPr/>
+          <p:nvPr/>
+        </p:nvGrpSpPr>
+        <p:grpSpPr>
+          <a:xfrm>
+            <a:off x="2594810" y="1499937"/>
+            <a:ext cx="7002379" cy="3858126"/>
+            <a:chOff x="2594810" y="1499937"/>
+            <a:chExt cx="7002379" cy="3858126"/>
+          </a:xfrm>
+        </p:grpSpPr>
+        <p:sp>
+          <p:nvSpPr>
+            <p:cNvPr id="108" name="Rectangle 107">
+              <a:extLst>
+                <a:ext uri="{FF2B5EF4-FFF2-40B4-BE49-F238E27FC236}">
+                  <a16:creationId xmlns:a16="http://schemas.microsoft.com/office/drawing/2014/main" id="{F5A5FD62-A99C-04B6-706B-DEE9B81AF541}"/>
+                </a:ext>
+              </a:extLst>
+            </p:cNvPr>
+            <p:cNvSpPr/>
+            <p:nvPr/>
+          </p:nvSpPr>
+          <p:spPr>
+            <a:xfrm>
+              <a:off x="2594810" y="1499937"/>
+              <a:ext cx="7002379" cy="3858126"/>
+            </a:xfrm>
+            <a:prstGeom prst="rect">
+              <a:avLst/>
+            </a:prstGeom>
+            <a:solidFill>
+              <a:srgbClr val="0F1017"/>
+            </a:solidFill>
+            <a:ln w="12700">
+              <a:solidFill>
+                <a:schemeClr val="bg1">
+                  <a:lumMod val="75000"/>
+                </a:schemeClr>
+              </a:solidFill>
+            </a:ln>
+          </p:spPr>
+          <p:style>
+            <a:lnRef idx="2">
+              <a:schemeClr val="accent1">
+                <a:shade val="50000"/>
+              </a:schemeClr>
+            </a:lnRef>
+            <a:fillRef idx="1">
+              <a:schemeClr val="accent1"/>
+            </a:fillRef>
+            <a:effectRef idx="0">
+              <a:schemeClr val="accent1"/>
+            </a:effectRef>
+            <a:fontRef idx="minor">
+              <a:schemeClr val="lt1"/>
+            </a:fontRef>
+          </p:style>
+          <p:txBody>
+            <a:bodyPr rtlCol="0" anchor="ctr"/>
+            <a:lstStyle/>
+            <a:p>
+              <a:pPr algn="ctr"/>
+              <a:endParaRPr lang="en-US" dirty="0"/>
+            </a:p>
+          </p:txBody>
+        </p:sp>
+        <p:grpSp>
+          <p:nvGrpSpPr>
+            <p:cNvPr id="18" name="Group 17">
+              <a:extLst>
+                <a:ext uri="{FF2B5EF4-FFF2-40B4-BE49-F238E27FC236}">
+                  <a16:creationId xmlns:a16="http://schemas.microsoft.com/office/drawing/2014/main" id="{6948F5FB-0CD7-2650-682F-636FFD28E2AD}"/>
+                </a:ext>
+              </a:extLst>
+            </p:cNvPr>
+            <p:cNvGrpSpPr/>
+            <p:nvPr/>
+          </p:nvGrpSpPr>
+          <p:grpSpPr>
+            <a:xfrm>
+              <a:off x="2961773" y="2106231"/>
+              <a:ext cx="6268452" cy="2645538"/>
+              <a:chOff x="2961773" y="1850633"/>
+              <a:chExt cx="6268452" cy="2645538"/>
+            </a:xfrm>
+          </p:grpSpPr>
+          <p:sp>
+            <p:nvSpPr>
+              <p:cNvPr id="59" name="Flowchart: Terminator 58">
+                <a:extLst>
+                  <a:ext uri="{FF2B5EF4-FFF2-40B4-BE49-F238E27FC236}">
+                    <a16:creationId xmlns:a16="http://schemas.microsoft.com/office/drawing/2014/main" id="{D7554AAC-5F81-46CA-BA4E-6CDF6B8CC5AD}"/>
+                  </a:ext>
+                </a:extLst>
+              </p:cNvPr>
+              <p:cNvSpPr/>
+              <p:nvPr/>
+            </p:nvSpPr>
+            <p:spPr>
+              <a:xfrm>
+                <a:off x="3358815" y="1850633"/>
+                <a:ext cx="1050758" cy="341690"/>
+              </a:xfrm>
+              <a:prstGeom prst="flowChartTerminator">
+                <a:avLst/>
+              </a:prstGeom>
+              <a:noFill/>
+              <a:ln>
+                <a:solidFill>
+                  <a:schemeClr val="bg1">
+                    <a:lumMod val="75000"/>
+                  </a:schemeClr>
+                </a:solidFill>
+              </a:ln>
+            </p:spPr>
+            <p:style>
+              <a:lnRef idx="2">
+                <a:schemeClr val="accent1">
+                  <a:shade val="50000"/>
+                </a:schemeClr>
+              </a:lnRef>
+              <a:fillRef idx="1">
+                <a:schemeClr val="accent1"/>
+              </a:fillRef>
+              <a:effectRef idx="0">
+                <a:schemeClr val="accent1"/>
+              </a:effectRef>
+              <a:fontRef idx="minor">
+                <a:schemeClr val="lt1"/>
+              </a:fontRef>
+            </p:style>
+            <p:txBody>
+              <a:bodyPr rtlCol="0" anchor="ctr"/>
+              <a:lstStyle/>
+              <a:p>
+                <a:pPr algn="ctr"/>
+                <a:r>
+                  <a:rPr lang="en-US" sz="1200" dirty="0">
+                    <a:solidFill>
+                      <a:schemeClr val="bg1">
+                        <a:lumMod val="85000"/>
+                      </a:schemeClr>
+                    </a:solidFill>
+                    <a:latin typeface="Open Sans" panose="020B0606030504020204" pitchFamily="34" charset="0"/>
+                    <a:ea typeface="Open Sans" panose="020B0606030504020204" pitchFamily="34" charset="0"/>
+                    <a:cs typeface="Open Sans" panose="020B0606030504020204" pitchFamily="34" charset="0"/>
+                  </a:rPr>
+                  <a:t>Start</a:t>
+                </a:r>
+              </a:p>
+            </p:txBody>
+          </p:sp>
+          <p:sp>
+            <p:nvSpPr>
+              <p:cNvPr id="60" name="Flowchart: Terminator 59">
+                <a:extLst>
+                  <a:ext uri="{FF2B5EF4-FFF2-40B4-BE49-F238E27FC236}">
+                    <a16:creationId xmlns:a16="http://schemas.microsoft.com/office/drawing/2014/main" id="{103191FC-37A5-724C-C214-882B4B9F6C89}"/>
+                  </a:ext>
+                </a:extLst>
+              </p:cNvPr>
+              <p:cNvSpPr/>
+              <p:nvPr/>
+            </p:nvSpPr>
+            <p:spPr>
+              <a:xfrm>
+                <a:off x="7782424" y="1850633"/>
+                <a:ext cx="1050758" cy="341690"/>
+              </a:xfrm>
+              <a:prstGeom prst="flowChartTerminator">
+                <a:avLst/>
+              </a:prstGeom>
+              <a:noFill/>
+              <a:ln>
+                <a:solidFill>
+                  <a:schemeClr val="bg1">
+                    <a:lumMod val="75000"/>
+                  </a:schemeClr>
+                </a:solidFill>
+              </a:ln>
+            </p:spPr>
+            <p:style>
+              <a:lnRef idx="2">
+                <a:schemeClr val="accent1">
+                  <a:shade val="50000"/>
+                </a:schemeClr>
+              </a:lnRef>
+              <a:fillRef idx="1">
+                <a:schemeClr val="accent1"/>
+              </a:fillRef>
+              <a:effectRef idx="0">
+                <a:schemeClr val="accent1"/>
+              </a:effectRef>
+              <a:fontRef idx="minor">
+                <a:schemeClr val="lt1"/>
+              </a:fontRef>
+            </p:style>
+            <p:txBody>
+              <a:bodyPr rtlCol="0" anchor="ctr"/>
+              <a:lstStyle/>
+              <a:p>
+                <a:pPr algn="ctr"/>
+                <a:r>
+                  <a:rPr lang="en-US" sz="1200" dirty="0">
+                    <a:solidFill>
+                      <a:schemeClr val="bg1">
+                        <a:lumMod val="85000"/>
+                      </a:schemeClr>
+                    </a:solidFill>
+                    <a:latin typeface="Open Sans" panose="020B0606030504020204" pitchFamily="34" charset="0"/>
+                    <a:ea typeface="Open Sans" panose="020B0606030504020204" pitchFamily="34" charset="0"/>
+                    <a:cs typeface="Open Sans" panose="020B0606030504020204" pitchFamily="34" charset="0"/>
+                  </a:rPr>
+                  <a:t>Stop</a:t>
+                </a:r>
+              </a:p>
+            </p:txBody>
+          </p:sp>
+          <p:sp>
+            <p:nvSpPr>
+              <p:cNvPr id="67" name="Flowchart: Decision 66">
+                <a:extLst>
+                  <a:ext uri="{FF2B5EF4-FFF2-40B4-BE49-F238E27FC236}">
+                    <a16:creationId xmlns:a16="http://schemas.microsoft.com/office/drawing/2014/main" id="{A3DDEFFD-6E92-1CB4-EE4D-6CD3E04860A6}"/>
+                  </a:ext>
+                </a:extLst>
+              </p:cNvPr>
+              <p:cNvSpPr/>
+              <p:nvPr/>
+            </p:nvSpPr>
+            <p:spPr>
+              <a:xfrm>
+                <a:off x="2961773" y="3275368"/>
+                <a:ext cx="1844844" cy="946484"/>
+              </a:xfrm>
+              <a:prstGeom prst="flowChartDecision">
+                <a:avLst/>
+              </a:prstGeom>
+              <a:noFill/>
+              <a:ln>
+                <a:solidFill>
+                  <a:srgbClr val="FF7C80"/>
+                </a:solidFill>
+              </a:ln>
+            </p:spPr>
+            <p:style>
+              <a:lnRef idx="2">
+                <a:schemeClr val="accent1">
+                  <a:shade val="50000"/>
+                </a:schemeClr>
+              </a:lnRef>
+              <a:fillRef idx="1">
+                <a:schemeClr val="accent1"/>
+              </a:fillRef>
+              <a:effectRef idx="0">
+                <a:schemeClr val="accent1"/>
+              </a:effectRef>
+              <a:fontRef idx="minor">
+                <a:schemeClr val="lt1"/>
+              </a:fontRef>
+            </p:style>
+            <p:txBody>
+              <a:bodyPr rtlCol="0" anchor="ctr"/>
+              <a:lstStyle/>
+              <a:p>
+                <a:pPr algn="ctr"/>
+                <a:r>
+                  <a:rPr lang="en-US" sz="1200" dirty="0">
+                    <a:solidFill>
+                      <a:schemeClr val="bg1">
+                        <a:lumMod val="85000"/>
+                      </a:schemeClr>
+                    </a:solidFill>
+                    <a:latin typeface="Open Sans" panose="020B0606030504020204" pitchFamily="34" charset="0"/>
+                    <a:ea typeface="Open Sans" panose="020B0606030504020204" pitchFamily="34" charset="0"/>
+                    <a:cs typeface="Open Sans" panose="020B0606030504020204" pitchFamily="34" charset="0"/>
+                  </a:rPr>
+                  <a:t>hour &lt; 24</a:t>
+                </a:r>
+              </a:p>
+            </p:txBody>
+          </p:sp>
+          <p:sp>
+            <p:nvSpPr>
+              <p:cNvPr id="75" name="Flowchart: Data 74">
+                <a:extLst>
+                  <a:ext uri="{FF2B5EF4-FFF2-40B4-BE49-F238E27FC236}">
+                    <a16:creationId xmlns:a16="http://schemas.microsoft.com/office/drawing/2014/main" id="{684F63EE-4E36-A045-0D95-769D7FC961BB}"/>
+                  </a:ext>
+                </a:extLst>
+              </p:cNvPr>
+              <p:cNvSpPr/>
+              <p:nvPr/>
+            </p:nvSpPr>
+            <p:spPr>
+              <a:xfrm>
+                <a:off x="5173573" y="2488386"/>
+                <a:ext cx="1844844" cy="489284"/>
+              </a:xfrm>
+              <a:prstGeom prst="flowChartInputOutput">
+                <a:avLst/>
+              </a:prstGeom>
+              <a:noFill/>
+              <a:ln>
+                <a:solidFill>
+                  <a:srgbClr val="CC99FF"/>
+                </a:solidFill>
+              </a:ln>
+            </p:spPr>
+            <p:style>
+              <a:lnRef idx="2">
+                <a:schemeClr val="accent1">
+                  <a:shade val="50000"/>
+                </a:schemeClr>
+              </a:lnRef>
+              <a:fillRef idx="1">
+                <a:schemeClr val="accent1"/>
+              </a:fillRef>
+              <a:effectRef idx="0">
+                <a:schemeClr val="accent1"/>
+              </a:effectRef>
+              <a:fontRef idx="minor">
+                <a:schemeClr val="lt1"/>
+              </a:fontRef>
+            </p:style>
+            <p:txBody>
+              <a:bodyPr rtlCol="0" anchor="ctr"/>
+              <a:lstStyle/>
+              <a:p>
+                <a:pPr algn="ctr"/>
+                <a:r>
+                  <a:rPr lang="en-US" sz="1200" dirty="0">
+                    <a:solidFill>
+                      <a:schemeClr val="bg1">
+                        <a:lumMod val="85000"/>
+                      </a:schemeClr>
+                    </a:solidFill>
+                    <a:latin typeface="Open Sans" panose="020B0606030504020204" pitchFamily="34" charset="0"/>
+                    <a:ea typeface="Open Sans" panose="020B0606030504020204" pitchFamily="34" charset="0"/>
+                    <a:cs typeface="Open Sans" panose="020B0606030504020204" pitchFamily="34" charset="0"/>
+                  </a:rPr>
+                  <a:t>Print </a:t>
+                </a:r>
+                <a:r>
+                  <a:rPr lang="en-US" sz="1200" dirty="0" err="1">
+                    <a:solidFill>
+                      <a:schemeClr val="bg1">
+                        <a:lumMod val="85000"/>
+                      </a:schemeClr>
+                    </a:solidFill>
+                    <a:latin typeface="Open Sans" panose="020B0606030504020204" pitchFamily="34" charset="0"/>
+                    <a:ea typeface="Open Sans" panose="020B0606030504020204" pitchFamily="34" charset="0"/>
+                    <a:cs typeface="Open Sans" panose="020B0606030504020204" pitchFamily="34" charset="0"/>
+                  </a:rPr>
+                  <a:t>tq</a:t>
+                </a:r>
+                <a:endParaRPr lang="en-US" sz="1200" dirty="0">
+                  <a:solidFill>
+                    <a:schemeClr val="bg1">
+                      <a:lumMod val="85000"/>
+                    </a:schemeClr>
+                  </a:solidFill>
+                  <a:latin typeface="Open Sans" panose="020B0606030504020204" pitchFamily="34" charset="0"/>
+                  <a:ea typeface="Open Sans" panose="020B0606030504020204" pitchFamily="34" charset="0"/>
+                  <a:cs typeface="Open Sans" panose="020B0606030504020204" pitchFamily="34" charset="0"/>
+                </a:endParaRPr>
+              </a:p>
+            </p:txBody>
+          </p:sp>
+          <p:sp>
+            <p:nvSpPr>
+              <p:cNvPr id="45" name="TextBox 44">
+                <a:extLst>
+                  <a:ext uri="{FF2B5EF4-FFF2-40B4-BE49-F238E27FC236}">
+                    <a16:creationId xmlns:a16="http://schemas.microsoft.com/office/drawing/2014/main" id="{C5E31F02-B0DE-D9F5-5293-325560FD0976}"/>
+                  </a:ext>
+                </a:extLst>
+              </p:cNvPr>
+              <p:cNvSpPr txBox="1"/>
+              <p:nvPr/>
+            </p:nvSpPr>
+            <p:spPr>
+              <a:xfrm>
+                <a:off x="4806601" y="3470272"/>
+                <a:ext cx="269626" cy="276999"/>
+              </a:xfrm>
+              <a:prstGeom prst="rect">
+                <a:avLst/>
+              </a:prstGeom>
+              <a:noFill/>
+            </p:spPr>
+            <p:txBody>
+              <a:bodyPr wrap="none" rtlCol="0">
+                <a:spAutoFit/>
+              </a:bodyPr>
+              <a:lstStyle/>
+              <a:p>
+                <a:r>
+                  <a:rPr lang="en-US" sz="1200" dirty="0">
+                    <a:solidFill>
+                      <a:srgbClr val="FF7C80"/>
+                    </a:solidFill>
+                    <a:latin typeface="Open Sans" panose="020B0606030504020204" pitchFamily="34" charset="0"/>
+                    <a:ea typeface="Open Sans" panose="020B0606030504020204" pitchFamily="34" charset="0"/>
+                    <a:cs typeface="Open Sans" panose="020B0606030504020204" pitchFamily="34" charset="0"/>
+                  </a:rPr>
+                  <a:t>T</a:t>
+                </a:r>
+              </a:p>
+            </p:txBody>
+          </p:sp>
+          <p:cxnSp>
+            <p:nvCxnSpPr>
+              <p:cNvPr id="36" name="Straight Arrow Connector 35">
+                <a:extLst>
+                  <a:ext uri="{FF2B5EF4-FFF2-40B4-BE49-F238E27FC236}">
+                    <a16:creationId xmlns:a16="http://schemas.microsoft.com/office/drawing/2014/main" id="{568BF687-F5BA-932E-B18D-0F79DFC9DCA1}"/>
+                  </a:ext>
+                </a:extLst>
+              </p:cNvPr>
+              <p:cNvCxnSpPr>
+                <a:cxnSpLocks/>
+                <a:stCxn id="59" idx="2"/>
+                <a:endCxn id="37" idx="1"/>
+              </p:cNvCxnSpPr>
+              <p:nvPr/>
+            </p:nvCxnSpPr>
+            <p:spPr>
+              <a:xfrm>
+                <a:off x="3884194" y="2192323"/>
+                <a:ext cx="1" cy="297698"/>
+              </a:xfrm>
+              <a:prstGeom prst="straightConnector1">
+                <a:avLst/>
+              </a:prstGeom>
+              <a:ln w="12700">
+                <a:solidFill>
+                  <a:schemeClr val="bg1">
+                    <a:lumMod val="75000"/>
+                  </a:schemeClr>
+                </a:solidFill>
+                <a:tailEnd type="triangle"/>
+              </a:ln>
+            </p:spPr>
+            <p:style>
+              <a:lnRef idx="1">
+                <a:schemeClr val="accent1"/>
+              </a:lnRef>
+              <a:fillRef idx="0">
+                <a:schemeClr val="accent1"/>
+              </a:fillRef>
+              <a:effectRef idx="0">
+                <a:schemeClr val="accent1"/>
+              </a:effectRef>
+              <a:fontRef idx="minor">
+                <a:schemeClr val="tx1"/>
+              </a:fontRef>
+            </p:style>
+          </p:cxnSp>
+          <p:sp>
+            <p:nvSpPr>
+              <p:cNvPr id="37" name="Flowchart: Data 36">
+                <a:extLst>
+                  <a:ext uri="{FF2B5EF4-FFF2-40B4-BE49-F238E27FC236}">
+                    <a16:creationId xmlns:a16="http://schemas.microsoft.com/office/drawing/2014/main" id="{3495D873-3AD6-01B1-727C-443D9829022E}"/>
+                  </a:ext>
+                </a:extLst>
+              </p:cNvPr>
+              <p:cNvSpPr/>
+              <p:nvPr/>
+            </p:nvSpPr>
+            <p:spPr>
+              <a:xfrm>
+                <a:off x="2961773" y="2490021"/>
+                <a:ext cx="1844844" cy="489284"/>
+              </a:xfrm>
+              <a:prstGeom prst="flowChartInputOutput">
+                <a:avLst/>
+              </a:prstGeom>
+              <a:noFill/>
+              <a:ln>
+                <a:solidFill>
+                  <a:schemeClr val="accent1">
+                    <a:lumMod val="60000"/>
+                    <a:lumOff val="40000"/>
+                  </a:schemeClr>
+                </a:solidFill>
+              </a:ln>
+            </p:spPr>
+            <p:style>
+              <a:lnRef idx="2">
+                <a:schemeClr val="accent1">
+                  <a:shade val="50000"/>
+                </a:schemeClr>
+              </a:lnRef>
+              <a:fillRef idx="1">
+                <a:schemeClr val="accent1"/>
+              </a:fillRef>
+              <a:effectRef idx="0">
+                <a:schemeClr val="accent1"/>
+              </a:effectRef>
+              <a:fontRef idx="minor">
+                <a:schemeClr val="lt1"/>
+              </a:fontRef>
+            </p:style>
+            <p:txBody>
+              <a:bodyPr rtlCol="0" anchor="ctr"/>
+              <a:lstStyle/>
+              <a:p>
+                <a:pPr algn="ctr"/>
+                <a:r>
+                  <a:rPr lang="en-US" sz="1200" dirty="0">
+                    <a:solidFill>
+                      <a:schemeClr val="bg1">
+                        <a:lumMod val="85000"/>
+                      </a:schemeClr>
+                    </a:solidFill>
+                    <a:latin typeface="Open Sans" panose="020B0606030504020204" pitchFamily="34" charset="0"/>
+                    <a:ea typeface="Open Sans" panose="020B0606030504020204" pitchFamily="34" charset="0"/>
+                    <a:cs typeface="Open Sans" panose="020B0606030504020204" pitchFamily="34" charset="0"/>
+                  </a:rPr>
+                  <a:t>Read hour</a:t>
+                </a:r>
+              </a:p>
+            </p:txBody>
+          </p:sp>
+          <p:cxnSp>
+            <p:nvCxnSpPr>
+              <p:cNvPr id="38" name="Straight Arrow Connector 37">
+                <a:extLst>
+                  <a:ext uri="{FF2B5EF4-FFF2-40B4-BE49-F238E27FC236}">
+                    <a16:creationId xmlns:a16="http://schemas.microsoft.com/office/drawing/2014/main" id="{F1D4DEB8-0E8C-D781-1911-28932EE3D2E3}"/>
+                  </a:ext>
+                </a:extLst>
+              </p:cNvPr>
+              <p:cNvCxnSpPr>
+                <a:cxnSpLocks/>
+                <a:stCxn id="37" idx="4"/>
+                <a:endCxn id="67" idx="0"/>
+              </p:cNvCxnSpPr>
+              <p:nvPr/>
+            </p:nvCxnSpPr>
+            <p:spPr>
+              <a:xfrm>
+                <a:off x="3884195" y="2979305"/>
+                <a:ext cx="0" cy="296063"/>
+              </a:xfrm>
+              <a:prstGeom prst="straightConnector1">
+                <a:avLst/>
+              </a:prstGeom>
+              <a:ln w="12700">
+                <a:solidFill>
+                  <a:schemeClr val="accent1">
+                    <a:lumMod val="60000"/>
+                    <a:lumOff val="40000"/>
+                  </a:schemeClr>
+                </a:solidFill>
+                <a:tailEnd type="triangle"/>
+              </a:ln>
+            </p:spPr>
+            <p:style>
+              <a:lnRef idx="1">
+                <a:schemeClr val="accent1"/>
+              </a:lnRef>
+              <a:fillRef idx="0">
+                <a:schemeClr val="accent1"/>
+              </a:fillRef>
+              <a:effectRef idx="0">
+                <a:schemeClr val="accent1"/>
+              </a:effectRef>
+              <a:fontRef idx="minor">
+                <a:schemeClr val="tx1"/>
+              </a:fontRef>
+            </p:style>
+          </p:cxnSp>
+          <p:sp>
+            <p:nvSpPr>
+              <p:cNvPr id="52" name="Flowchart: Data 51">
+                <a:extLst>
+                  <a:ext uri="{FF2B5EF4-FFF2-40B4-BE49-F238E27FC236}">
+                    <a16:creationId xmlns:a16="http://schemas.microsoft.com/office/drawing/2014/main" id="{835BAFCA-5FC2-47A2-AF17-AADD33D441E6}"/>
+                  </a:ext>
+                </a:extLst>
+              </p:cNvPr>
+              <p:cNvSpPr/>
+              <p:nvPr/>
+            </p:nvSpPr>
+            <p:spPr>
+              <a:xfrm>
+                <a:off x="7385381" y="2488386"/>
+                <a:ext cx="1844844" cy="489284"/>
+              </a:xfrm>
+              <a:prstGeom prst="flowChartInputOutput">
+                <a:avLst/>
+              </a:prstGeom>
+              <a:noFill/>
+              <a:ln>
+                <a:solidFill>
+                  <a:srgbClr val="CC99FF"/>
+                </a:solidFill>
+              </a:ln>
+            </p:spPr>
+            <p:style>
+              <a:lnRef idx="2">
+                <a:schemeClr val="accent1">
+                  <a:shade val="50000"/>
+                </a:schemeClr>
+              </a:lnRef>
+              <a:fillRef idx="1">
+                <a:schemeClr val="accent1"/>
+              </a:fillRef>
+              <a:effectRef idx="0">
+                <a:schemeClr val="accent1"/>
+              </a:effectRef>
+              <a:fontRef idx="minor">
+                <a:schemeClr val="lt1"/>
+              </a:fontRef>
+            </p:style>
+            <p:txBody>
+              <a:bodyPr rtlCol="0" anchor="ctr"/>
+              <a:lstStyle/>
+              <a:p>
+                <a:pPr algn="ctr"/>
+                <a:r>
+                  <a:rPr lang="en-US" sz="1200" dirty="0">
+                    <a:solidFill>
+                      <a:schemeClr val="bg1">
+                        <a:lumMod val="85000"/>
+                      </a:schemeClr>
+                    </a:solidFill>
+                    <a:latin typeface="Open Sans" panose="020B0606030504020204" pitchFamily="34" charset="0"/>
+                    <a:ea typeface="Open Sans" panose="020B0606030504020204" pitchFamily="34" charset="0"/>
+                    <a:cs typeface="Open Sans" panose="020B0606030504020204" pitchFamily="34" charset="0"/>
+                  </a:rPr>
+                  <a:t>Print fine</a:t>
+                </a:r>
+              </a:p>
+            </p:txBody>
+          </p:sp>
+          <p:cxnSp>
+            <p:nvCxnSpPr>
+              <p:cNvPr id="56" name="Straight Arrow Connector 55">
+                <a:extLst>
+                  <a:ext uri="{FF2B5EF4-FFF2-40B4-BE49-F238E27FC236}">
+                    <a16:creationId xmlns:a16="http://schemas.microsoft.com/office/drawing/2014/main" id="{C1A5E18D-EF07-20FF-30C3-637E64F33600}"/>
+                  </a:ext>
+                </a:extLst>
+              </p:cNvPr>
+              <p:cNvCxnSpPr>
+                <a:stCxn id="52" idx="1"/>
+                <a:endCxn id="60" idx="2"/>
+              </p:cNvCxnSpPr>
+              <p:nvPr/>
+            </p:nvCxnSpPr>
+            <p:spPr>
+              <a:xfrm flipV="1">
+                <a:off x="8307803" y="2192323"/>
+                <a:ext cx="0" cy="296063"/>
+              </a:xfrm>
+              <a:prstGeom prst="straightConnector1">
+                <a:avLst/>
+              </a:prstGeom>
+              <a:ln w="12700">
+                <a:solidFill>
+                  <a:srgbClr val="CC99FF"/>
+                </a:solidFill>
+                <a:tailEnd type="triangle"/>
+              </a:ln>
+            </p:spPr>
+            <p:style>
+              <a:lnRef idx="1">
+                <a:schemeClr val="accent1"/>
+              </a:lnRef>
+              <a:fillRef idx="0">
+                <a:schemeClr val="accent1"/>
+              </a:fillRef>
+              <a:effectRef idx="0">
+                <a:schemeClr val="accent1"/>
+              </a:effectRef>
+              <a:fontRef idx="minor">
+                <a:schemeClr val="tx1"/>
+              </a:fontRef>
+            </p:style>
+          </p:cxnSp>
+          <p:sp>
+            <p:nvSpPr>
+              <p:cNvPr id="70" name="TextBox 69">
+                <a:extLst>
+                  <a:ext uri="{FF2B5EF4-FFF2-40B4-BE49-F238E27FC236}">
+                    <a16:creationId xmlns:a16="http://schemas.microsoft.com/office/drawing/2014/main" id="{EB1B8C6F-315E-E8C9-2635-8E68D5F0AB2C}"/>
+                  </a:ext>
+                </a:extLst>
+              </p:cNvPr>
+              <p:cNvSpPr txBox="1"/>
+              <p:nvPr/>
+            </p:nvSpPr>
+            <p:spPr>
+              <a:xfrm>
+                <a:off x="3614568" y="4219172"/>
+                <a:ext cx="269626" cy="276999"/>
+              </a:xfrm>
+              <a:prstGeom prst="rect">
+                <a:avLst/>
+              </a:prstGeom>
+              <a:noFill/>
+            </p:spPr>
+            <p:txBody>
+              <a:bodyPr wrap="none" rtlCol="0">
+                <a:spAutoFit/>
+              </a:bodyPr>
+              <a:lstStyle/>
+              <a:p>
+                <a:r>
+                  <a:rPr lang="en-US" sz="1200" dirty="0">
+                    <a:solidFill>
+                      <a:srgbClr val="FF7C80"/>
+                    </a:solidFill>
+                    <a:latin typeface="Open Sans" panose="020B0606030504020204" pitchFamily="34" charset="0"/>
+                    <a:ea typeface="Open Sans" panose="020B0606030504020204" pitchFamily="34" charset="0"/>
+                    <a:cs typeface="Open Sans" panose="020B0606030504020204" pitchFamily="34" charset="0"/>
+                  </a:rPr>
+                  <a:t>F</a:t>
+                </a:r>
+              </a:p>
+            </p:txBody>
+          </p:sp>
+          <p:sp>
+            <p:nvSpPr>
+              <p:cNvPr id="30" name="Rectangle 29">
+                <a:extLst>
+                  <a:ext uri="{FF2B5EF4-FFF2-40B4-BE49-F238E27FC236}">
+                    <a16:creationId xmlns:a16="http://schemas.microsoft.com/office/drawing/2014/main" id="{FE53AF3E-5FA7-1C3D-4DCB-20B86E7D7FF6}"/>
+                  </a:ext>
+                </a:extLst>
+              </p:cNvPr>
+              <p:cNvSpPr/>
+              <p:nvPr/>
+            </p:nvSpPr>
+            <p:spPr>
+              <a:xfrm>
+                <a:off x="5173573" y="3474290"/>
+                <a:ext cx="1844844" cy="548640"/>
+              </a:xfrm>
+              <a:prstGeom prst="rect">
+                <a:avLst/>
+              </a:prstGeom>
+              <a:noFill/>
+              <a:ln>
+                <a:solidFill>
+                  <a:schemeClr val="accent6">
+                    <a:lumMod val="60000"/>
+                    <a:lumOff val="40000"/>
+                  </a:schemeClr>
+                </a:solidFill>
+              </a:ln>
+            </p:spPr>
+            <p:style>
+              <a:lnRef idx="2">
+                <a:schemeClr val="accent1">
+                  <a:shade val="50000"/>
+                </a:schemeClr>
+              </a:lnRef>
+              <a:fillRef idx="1">
+                <a:schemeClr val="accent1"/>
+              </a:fillRef>
+              <a:effectRef idx="0">
+                <a:schemeClr val="accent1"/>
+              </a:effectRef>
+              <a:fontRef idx="minor">
+                <a:schemeClr val="lt1"/>
+              </a:fontRef>
+            </p:style>
+            <p:txBody>
+              <a:bodyPr rtlCol="0" anchor="ctr"/>
+              <a:lstStyle/>
+              <a:p>
+                <a:pPr algn="ctr"/>
+                <a:r>
+                  <a:rPr lang="en-US" sz="1200" kern="1200" dirty="0" err="1">
+                    <a:solidFill>
+                      <a:srgbClr val="D9D9D9"/>
+                    </a:solidFill>
+                    <a:effectLst/>
+                    <a:latin typeface="Open Sans" panose="020B0606030504020204" pitchFamily="34" charset="0"/>
+                    <a:ea typeface="Open Sans" panose="020B0606030504020204" pitchFamily="34" charset="0"/>
+                    <a:cs typeface="Open Sans" panose="020B0606030504020204" pitchFamily="34" charset="0"/>
+                  </a:rPr>
+                  <a:t>tq</a:t>
+                </a:r>
+                <a:r>
+                  <a:rPr lang="en-US" sz="1200" kern="1200" dirty="0">
+                    <a:solidFill>
+                      <a:srgbClr val="D9D9D9"/>
+                    </a:solidFill>
+                    <a:effectLst/>
+                    <a:latin typeface="Open Sans" panose="020B0606030504020204" pitchFamily="34" charset="0"/>
+                    <a:ea typeface="Open Sans" panose="020B0606030504020204" pitchFamily="34" charset="0"/>
+                    <a:cs typeface="Open Sans" panose="020B0606030504020204" pitchFamily="34" charset="0"/>
+                  </a:rPr>
+                  <a:t> = “Thank you </a:t>
+                </a:r>
+              </a:p>
+              <a:p>
+                <a:pPr algn="ctr"/>
+                <a:r>
+                  <a:rPr lang="en-US" sz="1200" kern="1200" dirty="0">
+                    <a:solidFill>
+                      <a:srgbClr val="D9D9D9"/>
+                    </a:solidFill>
+                    <a:effectLst/>
+                    <a:latin typeface="Open Sans" panose="020B0606030504020204" pitchFamily="34" charset="0"/>
+                    <a:ea typeface="Open Sans" panose="020B0606030504020204" pitchFamily="34" charset="0"/>
+                    <a:cs typeface="Open Sans" panose="020B0606030504020204" pitchFamily="34" charset="0"/>
+                  </a:rPr>
+                  <a:t>for early return”</a:t>
+                </a:r>
+                <a:endParaRPr lang="en-US" sz="1000" dirty="0">
+                  <a:solidFill>
+                    <a:schemeClr val="bg1">
+                      <a:lumMod val="85000"/>
+                    </a:schemeClr>
+                  </a:solidFill>
+                  <a:latin typeface="Open Sans" panose="020B0606030504020204" pitchFamily="34" charset="0"/>
+                  <a:ea typeface="Open Sans" panose="020B0606030504020204" pitchFamily="34" charset="0"/>
+                  <a:cs typeface="Open Sans" panose="020B0606030504020204" pitchFamily="34" charset="0"/>
+                </a:endParaRPr>
+              </a:p>
+            </p:txBody>
+          </p:sp>
+          <p:sp>
+            <p:nvSpPr>
+              <p:cNvPr id="31" name="Rectangle 30">
+                <a:extLst>
+                  <a:ext uri="{FF2B5EF4-FFF2-40B4-BE49-F238E27FC236}">
+                    <a16:creationId xmlns:a16="http://schemas.microsoft.com/office/drawing/2014/main" id="{4C9456BD-CAC6-B088-84F2-EFBC04337A17}"/>
+                  </a:ext>
+                </a:extLst>
+              </p:cNvPr>
+              <p:cNvSpPr/>
+              <p:nvPr/>
+            </p:nvSpPr>
+            <p:spPr>
+              <a:xfrm>
+                <a:off x="7385373" y="3474290"/>
+                <a:ext cx="1844844" cy="548640"/>
+              </a:xfrm>
+              <a:prstGeom prst="rect">
+                <a:avLst/>
+              </a:prstGeom>
+              <a:noFill/>
+              <a:ln>
+                <a:solidFill>
+                  <a:schemeClr val="accent6">
+                    <a:lumMod val="60000"/>
+                    <a:lumOff val="40000"/>
+                  </a:schemeClr>
+                </a:solidFill>
+              </a:ln>
+            </p:spPr>
+            <p:style>
+              <a:lnRef idx="2">
+                <a:schemeClr val="accent1">
+                  <a:shade val="50000"/>
+                </a:schemeClr>
+              </a:lnRef>
+              <a:fillRef idx="1">
+                <a:schemeClr val="accent1"/>
+              </a:fillRef>
+              <a:effectRef idx="0">
+                <a:schemeClr val="accent1"/>
+              </a:effectRef>
+              <a:fontRef idx="minor">
+                <a:schemeClr val="lt1"/>
+              </a:fontRef>
+            </p:style>
+            <p:txBody>
+              <a:bodyPr rtlCol="0" anchor="ctr"/>
+              <a:lstStyle/>
+              <a:p>
+                <a:pPr algn="ctr"/>
+                <a:r>
+                  <a:rPr lang="en-US" sz="1200" kern="1200" dirty="0">
+                    <a:solidFill>
+                      <a:srgbClr val="D9D9D9"/>
+                    </a:solidFill>
+                    <a:effectLst/>
+                    <a:latin typeface="Open Sans" panose="020B0606030504020204" pitchFamily="34" charset="0"/>
+                    <a:ea typeface="Open Sans" panose="020B0606030504020204" pitchFamily="34" charset="0"/>
+                    <a:cs typeface="Open Sans" panose="020B0606030504020204" pitchFamily="34" charset="0"/>
+                  </a:rPr>
+                  <a:t>fine = (hour - 24) * 30</a:t>
+                </a:r>
+                <a:endParaRPr lang="en-US" sz="1000" dirty="0">
+                  <a:solidFill>
+                    <a:schemeClr val="bg1">
+                      <a:lumMod val="85000"/>
+                    </a:schemeClr>
+                  </a:solidFill>
+                  <a:latin typeface="Open Sans" panose="020B0606030504020204" pitchFamily="34" charset="0"/>
+                  <a:ea typeface="Open Sans" panose="020B0606030504020204" pitchFamily="34" charset="0"/>
+                  <a:cs typeface="Open Sans" panose="020B0606030504020204" pitchFamily="34" charset="0"/>
+                </a:endParaRPr>
+              </a:p>
+            </p:txBody>
+          </p:sp>
+          <p:cxnSp>
+            <p:nvCxnSpPr>
+              <p:cNvPr id="7" name="Straight Arrow Connector 6">
+                <a:extLst>
+                  <a:ext uri="{FF2B5EF4-FFF2-40B4-BE49-F238E27FC236}">
+                    <a16:creationId xmlns:a16="http://schemas.microsoft.com/office/drawing/2014/main" id="{98978A94-3C0E-BF52-FA62-6DAAD686FD61}"/>
+                  </a:ext>
+                </a:extLst>
+              </p:cNvPr>
+              <p:cNvCxnSpPr>
+                <a:stCxn id="67" idx="3"/>
+                <a:endCxn id="30" idx="1"/>
+              </p:cNvCxnSpPr>
+              <p:nvPr/>
+            </p:nvCxnSpPr>
+            <p:spPr>
+              <a:xfrm>
+                <a:off x="4806617" y="3748610"/>
+                <a:ext cx="366956" cy="0"/>
+              </a:xfrm>
+              <a:prstGeom prst="straightConnector1">
+                <a:avLst/>
+              </a:prstGeom>
+              <a:ln w="12700">
+                <a:solidFill>
+                  <a:srgbClr val="FF7C80"/>
+                </a:solidFill>
+                <a:tailEnd type="triangle"/>
+              </a:ln>
+            </p:spPr>
+            <p:style>
+              <a:lnRef idx="1">
+                <a:schemeClr val="accent1"/>
+              </a:lnRef>
+              <a:fillRef idx="0">
+                <a:schemeClr val="accent1"/>
+              </a:fillRef>
+              <a:effectRef idx="0">
+                <a:schemeClr val="accent1"/>
+              </a:effectRef>
+              <a:fontRef idx="minor">
+                <a:schemeClr val="tx1"/>
+              </a:fontRef>
+            </p:style>
+          </p:cxnSp>
+          <p:cxnSp>
+            <p:nvCxnSpPr>
+              <p:cNvPr id="9" name="Straight Arrow Connector 8">
+                <a:extLst>
+                  <a:ext uri="{FF2B5EF4-FFF2-40B4-BE49-F238E27FC236}">
+                    <a16:creationId xmlns:a16="http://schemas.microsoft.com/office/drawing/2014/main" id="{E6A9F8BC-728A-3B55-0C8A-E0C2B1D05360}"/>
+                  </a:ext>
+                </a:extLst>
+              </p:cNvPr>
+              <p:cNvCxnSpPr>
+                <a:stCxn id="30" idx="0"/>
+                <a:endCxn id="75" idx="4"/>
+              </p:cNvCxnSpPr>
+              <p:nvPr/>
+            </p:nvCxnSpPr>
+            <p:spPr>
+              <a:xfrm flipV="1">
+                <a:off x="6095995" y="2977670"/>
+                <a:ext cx="0" cy="496620"/>
+              </a:xfrm>
+              <a:prstGeom prst="straightConnector1">
+                <a:avLst/>
+              </a:prstGeom>
+              <a:ln w="12700">
+                <a:solidFill>
+                  <a:schemeClr val="bg1">
+                    <a:lumMod val="75000"/>
+                  </a:schemeClr>
+                </a:solidFill>
+                <a:tailEnd type="triangle"/>
+              </a:ln>
+            </p:spPr>
+            <p:style>
+              <a:lnRef idx="1">
+                <a:schemeClr val="accent1"/>
+              </a:lnRef>
+              <a:fillRef idx="0">
+                <a:schemeClr val="accent1"/>
+              </a:fillRef>
+              <a:effectRef idx="0">
+                <a:schemeClr val="accent1"/>
+              </a:effectRef>
+              <a:fontRef idx="minor">
+                <a:schemeClr val="tx1"/>
+              </a:fontRef>
+            </p:style>
+          </p:cxnSp>
+          <p:cxnSp>
+            <p:nvCxnSpPr>
+              <p:cNvPr id="12" name="Straight Arrow Connector 11">
+                <a:extLst>
+                  <a:ext uri="{FF2B5EF4-FFF2-40B4-BE49-F238E27FC236}">
+                    <a16:creationId xmlns:a16="http://schemas.microsoft.com/office/drawing/2014/main" id="{EAA75C66-4410-F32E-C554-153A283F9A9E}"/>
+                  </a:ext>
+                </a:extLst>
+              </p:cNvPr>
+              <p:cNvCxnSpPr>
+                <a:stCxn id="31" idx="0"/>
+                <a:endCxn id="52" idx="4"/>
+              </p:cNvCxnSpPr>
+              <p:nvPr/>
+            </p:nvCxnSpPr>
+            <p:spPr>
+              <a:xfrm flipV="1">
+                <a:off x="8307795" y="2977670"/>
+                <a:ext cx="8" cy="496620"/>
+              </a:xfrm>
+              <a:prstGeom prst="straightConnector1">
+                <a:avLst/>
+              </a:prstGeom>
+              <a:ln w="12700">
+                <a:solidFill>
+                  <a:schemeClr val="bg1">
+                    <a:lumMod val="75000"/>
+                  </a:schemeClr>
+                </a:solidFill>
+                <a:tailEnd type="triangle"/>
+              </a:ln>
+            </p:spPr>
+            <p:style>
+              <a:lnRef idx="1">
+                <a:schemeClr val="accent1"/>
+              </a:lnRef>
+              <a:fillRef idx="0">
+                <a:schemeClr val="accent1"/>
+              </a:fillRef>
+              <a:effectRef idx="0">
+                <a:schemeClr val="accent1"/>
+              </a:effectRef>
+              <a:fontRef idx="minor">
+                <a:schemeClr val="tx1"/>
+              </a:fontRef>
+            </p:style>
+          </p:cxnSp>
+          <p:cxnSp>
+            <p:nvCxnSpPr>
+              <p:cNvPr id="15" name="Connector: Elbow 14">
+                <a:extLst>
+                  <a:ext uri="{FF2B5EF4-FFF2-40B4-BE49-F238E27FC236}">
+                    <a16:creationId xmlns:a16="http://schemas.microsoft.com/office/drawing/2014/main" id="{8767F316-5B94-04FF-51EA-76D81F219575}"/>
+                  </a:ext>
+                </a:extLst>
+              </p:cNvPr>
+              <p:cNvCxnSpPr>
+                <a:stCxn id="67" idx="2"/>
+                <a:endCxn id="31" idx="2"/>
+              </p:cNvCxnSpPr>
+              <p:nvPr/>
+            </p:nvCxnSpPr>
+            <p:spPr>
+              <a:xfrm rot="5400000" flipH="1" flipV="1">
+                <a:off x="5996534" y="1910591"/>
+                <a:ext cx="198922" cy="4423600"/>
+              </a:xfrm>
+              <a:prstGeom prst="bentConnector3">
+                <a:avLst>
+                  <a:gd name="adj1" fmla="val -114919"/>
+                </a:avLst>
+              </a:prstGeom>
+              <a:ln w="12700">
+                <a:solidFill>
+                  <a:srgbClr val="FF7C80"/>
+                </a:solidFill>
+                <a:tailEnd type="triangle"/>
+              </a:ln>
+            </p:spPr>
+            <p:style>
+              <a:lnRef idx="1">
+                <a:schemeClr val="accent1"/>
+              </a:lnRef>
+              <a:fillRef idx="0">
+                <a:schemeClr val="accent1"/>
+              </a:fillRef>
+              <a:effectRef idx="0">
+                <a:schemeClr val="accent1"/>
+              </a:effectRef>
+              <a:fontRef idx="minor">
+                <a:schemeClr val="tx1"/>
+              </a:fontRef>
+            </p:style>
+          </p:cxnSp>
+          <p:cxnSp>
+            <p:nvCxnSpPr>
+              <p:cNvPr id="17" name="Connector: Elbow 16">
+                <a:extLst>
+                  <a:ext uri="{FF2B5EF4-FFF2-40B4-BE49-F238E27FC236}">
+                    <a16:creationId xmlns:a16="http://schemas.microsoft.com/office/drawing/2014/main" id="{408C9E16-E722-3B41-D6E4-B89BA69917AF}"/>
+                  </a:ext>
+                </a:extLst>
+              </p:cNvPr>
+              <p:cNvCxnSpPr>
+                <a:stCxn id="75" idx="1"/>
+                <a:endCxn id="60" idx="1"/>
+              </p:cNvCxnSpPr>
+              <p:nvPr/>
+            </p:nvCxnSpPr>
+            <p:spPr>
+              <a:xfrm rot="5400000" flipH="1" flipV="1">
+                <a:off x="6705755" y="1411718"/>
+                <a:ext cx="466908" cy="1686429"/>
+              </a:xfrm>
+              <a:prstGeom prst="bentConnector2">
+                <a:avLst/>
+              </a:prstGeom>
+              <a:ln w="12700">
+                <a:solidFill>
+                  <a:srgbClr val="CC99FF"/>
+                </a:solidFill>
+                <a:tailEnd type="triangle"/>
+              </a:ln>
+            </p:spPr>
+            <p:style>
+              <a:lnRef idx="1">
+                <a:schemeClr val="accent1"/>
+              </a:lnRef>
+              <a:fillRef idx="0">
+                <a:schemeClr val="accent1"/>
+              </a:fillRef>
+              <a:effectRef idx="0">
+                <a:schemeClr val="accent1"/>
+              </a:effectRef>
+              <a:fontRef idx="minor">
+                <a:schemeClr val="tx1"/>
+              </a:fontRef>
+            </p:style>
+          </p:cxnSp>
+        </p:grpSp>
+      </p:grpSp>
+    </p:spTree>
+    <p:extLst>
+      <p:ext uri="{BB962C8B-B14F-4D97-AF65-F5344CB8AC3E}">
+        <p14:creationId xmlns:p14="http://schemas.microsoft.com/office/powerpoint/2010/main" val="4142710758"/>
       </p:ext>
     </p:extLst>
   </p:cSld>

</xml_diff>

<commit_message>
Added Flowchart for Q2 of PrePSPM2122_KMK
</commit_message>
<xml_diff>
--- a/Past Year Theory Questions/Resources/resources.pptx
+++ b/Past Year Theory Questions/Resources/resources.pptx
@@ -17,6 +17,7 @@
     <p:sldId id="266" r:id="rId11"/>
     <p:sldId id="267" r:id="rId12"/>
     <p:sldId id="268" r:id="rId13"/>
+    <p:sldId id="269" r:id="rId14"/>
   </p:sldIdLst>
   <p:sldSz cx="12192000" cy="6858000"/>
   <p:notesSz cx="6858000" cy="9144000"/>
@@ -8395,6 +8396,1567 @@
 </p:sld>
 </file>
 
+<file path=ppt/slides/slide13.xml><?xml version="1.0" encoding="utf-8"?>
+<p:sld xmlns:a="http://schemas.openxmlformats.org/drawingml/2006/main" xmlns:r="http://schemas.openxmlformats.org/officeDocument/2006/relationships" xmlns:p="http://schemas.openxmlformats.org/presentationml/2006/main">
+  <p:cSld>
+    <p:spTree>
+      <p:nvGrpSpPr>
+        <p:cNvPr id="1" name=""/>
+        <p:cNvGrpSpPr/>
+        <p:nvPr/>
+      </p:nvGrpSpPr>
+      <p:grpSpPr>
+        <a:xfrm>
+          <a:off x="0" y="0"/>
+          <a:ext cx="0" cy="0"/>
+          <a:chOff x="0" y="0"/>
+          <a:chExt cx="0" cy="0"/>
+        </a:xfrm>
+      </p:grpSpPr>
+      <p:grpSp>
+        <p:nvGrpSpPr>
+          <p:cNvPr id="43" name="Group 42">
+            <a:extLst>
+              <a:ext uri="{FF2B5EF4-FFF2-40B4-BE49-F238E27FC236}">
+                <a16:creationId xmlns:a16="http://schemas.microsoft.com/office/drawing/2014/main" id="{F631EFDE-D69A-EFA7-8D13-E9FF03125D2D}"/>
+              </a:ext>
+            </a:extLst>
+          </p:cNvPr>
+          <p:cNvGrpSpPr/>
+          <p:nvPr/>
+        </p:nvGrpSpPr>
+        <p:grpSpPr>
+          <a:xfrm>
+            <a:off x="2939007" y="885309"/>
+            <a:ext cx="6313986" cy="5087382"/>
+            <a:chOff x="1534614" y="268089"/>
+            <a:chExt cx="6313986" cy="5087382"/>
+          </a:xfrm>
+        </p:grpSpPr>
+        <p:sp>
+          <p:nvSpPr>
+            <p:cNvPr id="108" name="Rectangle 107">
+              <a:extLst>
+                <a:ext uri="{FF2B5EF4-FFF2-40B4-BE49-F238E27FC236}">
+                  <a16:creationId xmlns:a16="http://schemas.microsoft.com/office/drawing/2014/main" id="{F5A5FD62-A99C-04B6-706B-DEE9B81AF541}"/>
+                </a:ext>
+              </a:extLst>
+            </p:cNvPr>
+            <p:cNvSpPr/>
+            <p:nvPr/>
+          </p:nvSpPr>
+          <p:spPr>
+            <a:xfrm>
+              <a:off x="1534614" y="268089"/>
+              <a:ext cx="6313986" cy="5087382"/>
+            </a:xfrm>
+            <a:prstGeom prst="rect">
+              <a:avLst/>
+            </a:prstGeom>
+            <a:solidFill>
+              <a:srgbClr val="0F1017"/>
+            </a:solidFill>
+            <a:ln w="12700">
+              <a:solidFill>
+                <a:schemeClr val="bg1">
+                  <a:lumMod val="75000"/>
+                </a:schemeClr>
+              </a:solidFill>
+            </a:ln>
+          </p:spPr>
+          <p:style>
+            <a:lnRef idx="2">
+              <a:schemeClr val="accent1">
+                <a:shade val="50000"/>
+              </a:schemeClr>
+            </a:lnRef>
+            <a:fillRef idx="1">
+              <a:schemeClr val="accent1"/>
+            </a:fillRef>
+            <a:effectRef idx="0">
+              <a:schemeClr val="accent1"/>
+            </a:effectRef>
+            <a:fontRef idx="minor">
+              <a:schemeClr val="lt1"/>
+            </a:fontRef>
+          </p:style>
+          <p:txBody>
+            <a:bodyPr rtlCol="0" anchor="ctr"/>
+            <a:lstStyle/>
+            <a:p>
+              <a:pPr algn="ctr"/>
+              <a:endParaRPr lang="en-US" sz="1800" dirty="0">
+                <a:solidFill>
+                  <a:schemeClr val="bg1">
+                    <a:lumMod val="85000"/>
+                  </a:schemeClr>
+                </a:solidFill>
+                <a:latin typeface="Open Sans" panose="020B0606030504020204" pitchFamily="34" charset="0"/>
+                <a:ea typeface="Open Sans" panose="020B0606030504020204" pitchFamily="34" charset="0"/>
+                <a:cs typeface="Open Sans" panose="020B0606030504020204" pitchFamily="34" charset="0"/>
+              </a:endParaRPr>
+            </a:p>
+          </p:txBody>
+        </p:sp>
+        <p:grpSp>
+          <p:nvGrpSpPr>
+            <p:cNvPr id="41" name="Group 40">
+              <a:extLst>
+                <a:ext uri="{FF2B5EF4-FFF2-40B4-BE49-F238E27FC236}">
+                  <a16:creationId xmlns:a16="http://schemas.microsoft.com/office/drawing/2014/main" id="{C880A31E-20CC-17DE-A86B-724FAFBB33C5}"/>
+                </a:ext>
+              </a:extLst>
+            </p:cNvPr>
+            <p:cNvGrpSpPr/>
+            <p:nvPr/>
+          </p:nvGrpSpPr>
+          <p:grpSpPr>
+            <a:xfrm>
+              <a:off x="2022926" y="766154"/>
+              <a:ext cx="5337361" cy="4091252"/>
+              <a:chOff x="5640485" y="1141654"/>
+              <a:chExt cx="5337361" cy="4091252"/>
+            </a:xfrm>
+          </p:grpSpPr>
+          <p:sp>
+            <p:nvSpPr>
+              <p:cNvPr id="59" name="Flowchart: Terminator 58">
+                <a:extLst>
+                  <a:ext uri="{FF2B5EF4-FFF2-40B4-BE49-F238E27FC236}">
+                    <a16:creationId xmlns:a16="http://schemas.microsoft.com/office/drawing/2014/main" id="{D7554AAC-5F81-46CA-BA4E-6CDF6B8CC5AD}"/>
+                  </a:ext>
+                </a:extLst>
+              </p:cNvPr>
+              <p:cNvSpPr/>
+              <p:nvPr/>
+            </p:nvSpPr>
+            <p:spPr>
+              <a:xfrm>
+                <a:off x="6042166" y="1141654"/>
+                <a:ext cx="1050758" cy="341690"/>
+              </a:xfrm>
+              <a:prstGeom prst="flowChartTerminator">
+                <a:avLst/>
+              </a:prstGeom>
+              <a:noFill/>
+              <a:ln>
+                <a:solidFill>
+                  <a:schemeClr val="bg1">
+                    <a:lumMod val="75000"/>
+                  </a:schemeClr>
+                </a:solidFill>
+              </a:ln>
+            </p:spPr>
+            <p:style>
+              <a:lnRef idx="2">
+                <a:schemeClr val="accent1">
+                  <a:shade val="50000"/>
+                </a:schemeClr>
+              </a:lnRef>
+              <a:fillRef idx="1">
+                <a:schemeClr val="accent1"/>
+              </a:fillRef>
+              <a:effectRef idx="0">
+                <a:schemeClr val="accent1"/>
+              </a:effectRef>
+              <a:fontRef idx="minor">
+                <a:schemeClr val="lt1"/>
+              </a:fontRef>
+            </p:style>
+            <p:txBody>
+              <a:bodyPr rtlCol="0" anchor="ctr"/>
+              <a:lstStyle/>
+              <a:p>
+                <a:pPr algn="ctr"/>
+                <a:r>
+                  <a:rPr lang="en-US" sz="1200" dirty="0">
+                    <a:solidFill>
+                      <a:schemeClr val="bg1">
+                        <a:lumMod val="85000"/>
+                      </a:schemeClr>
+                    </a:solidFill>
+                    <a:latin typeface="Open Sans" panose="020B0606030504020204" pitchFamily="34" charset="0"/>
+                    <a:ea typeface="Open Sans" panose="020B0606030504020204" pitchFamily="34" charset="0"/>
+                    <a:cs typeface="Open Sans" panose="020B0606030504020204" pitchFamily="34" charset="0"/>
+                  </a:rPr>
+                  <a:t>Start</a:t>
+                </a:r>
+              </a:p>
+            </p:txBody>
+          </p:sp>
+          <p:sp>
+            <p:nvSpPr>
+              <p:cNvPr id="60" name="Flowchart: Terminator 59">
+                <a:extLst>
+                  <a:ext uri="{FF2B5EF4-FFF2-40B4-BE49-F238E27FC236}">
+                    <a16:creationId xmlns:a16="http://schemas.microsoft.com/office/drawing/2014/main" id="{103191FC-37A5-724C-C214-882B4B9F6C89}"/>
+                  </a:ext>
+                </a:extLst>
+              </p:cNvPr>
+              <p:cNvSpPr/>
+              <p:nvPr/>
+            </p:nvSpPr>
+            <p:spPr>
+              <a:xfrm>
+                <a:off x="9530044" y="1141654"/>
+                <a:ext cx="1050758" cy="341690"/>
+              </a:xfrm>
+              <a:prstGeom prst="flowChartTerminator">
+                <a:avLst/>
+              </a:prstGeom>
+              <a:noFill/>
+              <a:ln>
+                <a:solidFill>
+                  <a:schemeClr val="bg1">
+                    <a:lumMod val="75000"/>
+                  </a:schemeClr>
+                </a:solidFill>
+              </a:ln>
+            </p:spPr>
+            <p:style>
+              <a:lnRef idx="2">
+                <a:schemeClr val="accent1">
+                  <a:shade val="50000"/>
+                </a:schemeClr>
+              </a:lnRef>
+              <a:fillRef idx="1">
+                <a:schemeClr val="accent1"/>
+              </a:fillRef>
+              <a:effectRef idx="0">
+                <a:schemeClr val="accent1"/>
+              </a:effectRef>
+              <a:fontRef idx="minor">
+                <a:schemeClr val="lt1"/>
+              </a:fontRef>
+            </p:style>
+            <p:txBody>
+              <a:bodyPr rtlCol="0" anchor="ctr"/>
+              <a:lstStyle/>
+              <a:p>
+                <a:pPr algn="ctr"/>
+                <a:r>
+                  <a:rPr lang="en-US" sz="1200" dirty="0">
+                    <a:solidFill>
+                      <a:schemeClr val="bg1">
+                        <a:lumMod val="85000"/>
+                      </a:schemeClr>
+                    </a:solidFill>
+                    <a:latin typeface="Open Sans" panose="020B0606030504020204" pitchFamily="34" charset="0"/>
+                    <a:ea typeface="Open Sans" panose="020B0606030504020204" pitchFamily="34" charset="0"/>
+                    <a:cs typeface="Open Sans" panose="020B0606030504020204" pitchFamily="34" charset="0"/>
+                  </a:rPr>
+                  <a:t>Stop</a:t>
+                </a:r>
+              </a:p>
+            </p:txBody>
+          </p:sp>
+          <p:cxnSp>
+            <p:nvCxnSpPr>
+              <p:cNvPr id="61" name="Straight Arrow Connector 60">
+                <a:extLst>
+                  <a:ext uri="{FF2B5EF4-FFF2-40B4-BE49-F238E27FC236}">
+                    <a16:creationId xmlns:a16="http://schemas.microsoft.com/office/drawing/2014/main" id="{A1BBCFB3-141A-F3B8-67BE-C05995E64053}"/>
+                  </a:ext>
+                </a:extLst>
+              </p:cNvPr>
+              <p:cNvCxnSpPr>
+                <a:cxnSpLocks/>
+                <a:stCxn id="59" idx="2"/>
+              </p:cNvCxnSpPr>
+              <p:nvPr/>
+            </p:nvCxnSpPr>
+            <p:spPr>
+              <a:xfrm>
+                <a:off x="6567545" y="1483344"/>
+                <a:ext cx="0" cy="296780"/>
+              </a:xfrm>
+              <a:prstGeom prst="straightConnector1">
+                <a:avLst/>
+              </a:prstGeom>
+              <a:ln w="12700">
+                <a:solidFill>
+                  <a:schemeClr val="bg1">
+                    <a:lumMod val="75000"/>
+                  </a:schemeClr>
+                </a:solidFill>
+                <a:tailEnd type="triangle"/>
+              </a:ln>
+            </p:spPr>
+            <p:style>
+              <a:lnRef idx="1">
+                <a:schemeClr val="accent1"/>
+              </a:lnRef>
+              <a:fillRef idx="0">
+                <a:schemeClr val="accent1"/>
+              </a:fillRef>
+              <a:effectRef idx="0">
+                <a:schemeClr val="accent1"/>
+              </a:effectRef>
+              <a:fontRef idx="minor">
+                <a:schemeClr val="tx1"/>
+              </a:fontRef>
+            </p:style>
+          </p:cxnSp>
+          <p:sp>
+            <p:nvSpPr>
+              <p:cNvPr id="75" name="Flowchart: Data 74">
+                <a:extLst>
+                  <a:ext uri="{FF2B5EF4-FFF2-40B4-BE49-F238E27FC236}">
+                    <a16:creationId xmlns:a16="http://schemas.microsoft.com/office/drawing/2014/main" id="{684F63EE-4E36-A045-0D95-769D7FC961BB}"/>
+                  </a:ext>
+                </a:extLst>
+              </p:cNvPr>
+              <p:cNvSpPr/>
+              <p:nvPr/>
+            </p:nvSpPr>
+            <p:spPr>
+              <a:xfrm>
+                <a:off x="9133002" y="1780124"/>
+                <a:ext cx="1844844" cy="489284"/>
+              </a:xfrm>
+              <a:prstGeom prst="flowChartInputOutput">
+                <a:avLst/>
+              </a:prstGeom>
+              <a:noFill/>
+              <a:ln>
+                <a:solidFill>
+                  <a:srgbClr val="CC99FF"/>
+                </a:solidFill>
+              </a:ln>
+            </p:spPr>
+            <p:style>
+              <a:lnRef idx="2">
+                <a:schemeClr val="accent1">
+                  <a:shade val="50000"/>
+                </a:schemeClr>
+              </a:lnRef>
+              <a:fillRef idx="1">
+                <a:schemeClr val="accent1"/>
+              </a:fillRef>
+              <a:effectRef idx="0">
+                <a:schemeClr val="accent1"/>
+              </a:effectRef>
+              <a:fontRef idx="minor">
+                <a:schemeClr val="lt1"/>
+              </a:fontRef>
+            </p:style>
+            <p:txBody>
+              <a:bodyPr rtlCol="0" anchor="ctr"/>
+              <a:lstStyle/>
+              <a:p>
+                <a:pPr algn="ctr"/>
+                <a:r>
+                  <a:rPr lang="en-US" sz="1200" dirty="0">
+                    <a:solidFill>
+                      <a:schemeClr val="bg1">
+                        <a:lumMod val="85000"/>
+                      </a:schemeClr>
+                    </a:solidFill>
+                    <a:latin typeface="Open Sans" panose="020B0606030504020204" pitchFamily="34" charset="0"/>
+                    <a:ea typeface="Open Sans" panose="020B0606030504020204" pitchFamily="34" charset="0"/>
+                    <a:cs typeface="Open Sans" panose="020B0606030504020204" pitchFamily="34" charset="0"/>
+                  </a:rPr>
+                  <a:t>Print result</a:t>
+                </a:r>
+              </a:p>
+            </p:txBody>
+          </p:sp>
+          <p:sp>
+            <p:nvSpPr>
+              <p:cNvPr id="26" name="Flowchart: Data 25">
+                <a:extLst>
+                  <a:ext uri="{FF2B5EF4-FFF2-40B4-BE49-F238E27FC236}">
+                    <a16:creationId xmlns:a16="http://schemas.microsoft.com/office/drawing/2014/main" id="{94D191EB-608A-2C67-B420-0EA65677B979}"/>
+                  </a:ext>
+                </a:extLst>
+              </p:cNvPr>
+              <p:cNvSpPr/>
+              <p:nvPr/>
+            </p:nvSpPr>
+            <p:spPr>
+              <a:xfrm>
+                <a:off x="5645123" y="1774693"/>
+                <a:ext cx="1844844" cy="489284"/>
+              </a:xfrm>
+              <a:prstGeom prst="flowChartInputOutput">
+                <a:avLst/>
+              </a:prstGeom>
+              <a:noFill/>
+              <a:ln>
+                <a:solidFill>
+                  <a:schemeClr val="accent1">
+                    <a:lumMod val="60000"/>
+                    <a:lumOff val="40000"/>
+                  </a:schemeClr>
+                </a:solidFill>
+              </a:ln>
+            </p:spPr>
+            <p:style>
+              <a:lnRef idx="2">
+                <a:schemeClr val="accent1">
+                  <a:shade val="50000"/>
+                </a:schemeClr>
+              </a:lnRef>
+              <a:fillRef idx="1">
+                <a:schemeClr val="accent1"/>
+              </a:fillRef>
+              <a:effectRef idx="0">
+                <a:schemeClr val="accent1"/>
+              </a:effectRef>
+              <a:fontRef idx="minor">
+                <a:schemeClr val="lt1"/>
+              </a:fontRef>
+            </p:style>
+            <p:txBody>
+              <a:bodyPr rtlCol="0" anchor="ctr"/>
+              <a:lstStyle/>
+              <a:p>
+                <a:pPr algn="ctr"/>
+                <a:r>
+                  <a:rPr lang="en-US" sz="1200" dirty="0">
+                    <a:solidFill>
+                      <a:schemeClr val="bg1">
+                        <a:lumMod val="85000"/>
+                      </a:schemeClr>
+                    </a:solidFill>
+                    <a:latin typeface="Open Sans" panose="020B0606030504020204" pitchFamily="34" charset="0"/>
+                    <a:ea typeface="Open Sans" panose="020B0606030504020204" pitchFamily="34" charset="0"/>
+                    <a:cs typeface="Open Sans" panose="020B0606030504020204" pitchFamily="34" charset="0"/>
+                  </a:rPr>
+                  <a:t>Read </a:t>
+                </a:r>
+                <a:r>
+                  <a:rPr lang="en-US" sz="1200" dirty="0" err="1">
+                    <a:solidFill>
+                      <a:schemeClr val="bg1">
+                        <a:lumMod val="85000"/>
+                      </a:schemeClr>
+                    </a:solidFill>
+                    <a:latin typeface="Open Sans" panose="020B0606030504020204" pitchFamily="34" charset="0"/>
+                    <a:ea typeface="Open Sans" panose="020B0606030504020204" pitchFamily="34" charset="0"/>
+                    <a:cs typeface="Open Sans" panose="020B0606030504020204" pitchFamily="34" charset="0"/>
+                  </a:rPr>
+                  <a:t>buyPrice</a:t>
+                </a:r>
+                <a:endParaRPr lang="en-US" sz="1200" dirty="0">
+                  <a:solidFill>
+                    <a:schemeClr val="bg1">
+                      <a:lumMod val="85000"/>
+                    </a:schemeClr>
+                  </a:solidFill>
+                  <a:latin typeface="Open Sans" panose="020B0606030504020204" pitchFamily="34" charset="0"/>
+                  <a:ea typeface="Open Sans" panose="020B0606030504020204" pitchFamily="34" charset="0"/>
+                  <a:cs typeface="Open Sans" panose="020B0606030504020204" pitchFamily="34" charset="0"/>
+                </a:endParaRPr>
+              </a:p>
+            </p:txBody>
+          </p:sp>
+          <p:cxnSp>
+            <p:nvCxnSpPr>
+              <p:cNvPr id="27" name="Straight Arrow Connector 26">
+                <a:extLst>
+                  <a:ext uri="{FF2B5EF4-FFF2-40B4-BE49-F238E27FC236}">
+                    <a16:creationId xmlns:a16="http://schemas.microsoft.com/office/drawing/2014/main" id="{E6C1CD8F-BB27-923B-995E-D457BDF8CD6D}"/>
+                  </a:ext>
+                </a:extLst>
+              </p:cNvPr>
+              <p:cNvCxnSpPr>
+                <a:cxnSpLocks/>
+                <a:stCxn id="26" idx="4"/>
+                <a:endCxn id="58" idx="1"/>
+              </p:cNvCxnSpPr>
+              <p:nvPr/>
+            </p:nvCxnSpPr>
+            <p:spPr>
+              <a:xfrm flipH="1">
+                <a:off x="6562909" y="2263977"/>
+                <a:ext cx="4636" cy="281895"/>
+              </a:xfrm>
+              <a:prstGeom prst="straightConnector1">
+                <a:avLst/>
+              </a:prstGeom>
+              <a:ln w="12700">
+                <a:solidFill>
+                  <a:schemeClr val="accent1">
+                    <a:lumMod val="60000"/>
+                    <a:lumOff val="40000"/>
+                  </a:schemeClr>
+                </a:solidFill>
+                <a:tailEnd type="triangle"/>
+              </a:ln>
+            </p:spPr>
+            <p:style>
+              <a:lnRef idx="1">
+                <a:schemeClr val="accent1"/>
+              </a:lnRef>
+              <a:fillRef idx="0">
+                <a:schemeClr val="accent1"/>
+              </a:fillRef>
+              <a:effectRef idx="0">
+                <a:schemeClr val="accent1"/>
+              </a:effectRef>
+              <a:fontRef idx="minor">
+                <a:schemeClr val="tx1"/>
+              </a:fontRef>
+            </p:style>
+          </p:cxnSp>
+          <p:cxnSp>
+            <p:nvCxnSpPr>
+              <p:cNvPr id="18" name="Straight Arrow Connector 17">
+                <a:extLst>
+                  <a:ext uri="{FF2B5EF4-FFF2-40B4-BE49-F238E27FC236}">
+                    <a16:creationId xmlns:a16="http://schemas.microsoft.com/office/drawing/2014/main" id="{28D76C1F-C45D-8EEF-E187-E9E48161CAB0}"/>
+                  </a:ext>
+                </a:extLst>
+              </p:cNvPr>
+              <p:cNvCxnSpPr>
+                <a:cxnSpLocks/>
+                <a:stCxn id="75" idx="1"/>
+                <a:endCxn id="60" idx="2"/>
+              </p:cNvCxnSpPr>
+              <p:nvPr/>
+            </p:nvCxnSpPr>
+            <p:spPr>
+              <a:xfrm flipH="1" flipV="1">
+                <a:off x="10055423" y="1483344"/>
+                <a:ext cx="1" cy="296780"/>
+              </a:xfrm>
+              <a:prstGeom prst="straightConnector1">
+                <a:avLst/>
+              </a:prstGeom>
+              <a:ln w="12700">
+                <a:solidFill>
+                  <a:srgbClr val="CC99FF"/>
+                </a:solidFill>
+                <a:tailEnd type="triangle"/>
+              </a:ln>
+            </p:spPr>
+            <p:style>
+              <a:lnRef idx="1">
+                <a:schemeClr val="accent1"/>
+              </a:lnRef>
+              <a:fillRef idx="0">
+                <a:schemeClr val="accent1"/>
+              </a:fillRef>
+              <a:effectRef idx="0">
+                <a:schemeClr val="accent1"/>
+              </a:effectRef>
+              <a:fontRef idx="minor">
+                <a:schemeClr val="tx1"/>
+              </a:fontRef>
+            </p:style>
+          </p:cxnSp>
+          <p:sp>
+            <p:nvSpPr>
+              <p:cNvPr id="20" name="Flowchart: Decision 19">
+                <a:extLst>
+                  <a:ext uri="{FF2B5EF4-FFF2-40B4-BE49-F238E27FC236}">
+                    <a16:creationId xmlns:a16="http://schemas.microsoft.com/office/drawing/2014/main" id="{30BAFB15-77D0-E596-8420-DCFF2E8C83B2}"/>
+                  </a:ext>
+                </a:extLst>
+              </p:cNvPr>
+              <p:cNvSpPr/>
+              <p:nvPr/>
+            </p:nvSpPr>
+            <p:spPr>
+              <a:xfrm>
+                <a:off x="5640485" y="3304268"/>
+                <a:ext cx="1844844" cy="946484"/>
+              </a:xfrm>
+              <a:prstGeom prst="flowChartDecision">
+                <a:avLst/>
+              </a:prstGeom>
+              <a:noFill/>
+              <a:ln>
+                <a:solidFill>
+                  <a:srgbClr val="FF7C80"/>
+                </a:solidFill>
+              </a:ln>
+            </p:spPr>
+            <p:style>
+              <a:lnRef idx="2">
+                <a:schemeClr val="accent1">
+                  <a:shade val="50000"/>
+                </a:schemeClr>
+              </a:lnRef>
+              <a:fillRef idx="1">
+                <a:schemeClr val="accent1"/>
+              </a:fillRef>
+              <a:effectRef idx="0">
+                <a:schemeClr val="accent1"/>
+              </a:effectRef>
+              <a:fontRef idx="minor">
+                <a:schemeClr val="lt1"/>
+              </a:fontRef>
+            </p:style>
+            <p:txBody>
+              <a:bodyPr rtlCol="0" anchor="ctr"/>
+              <a:lstStyle/>
+              <a:p>
+                <a:pPr algn="ctr"/>
+                <a:r>
+                  <a:rPr lang="en-US" sz="1200" dirty="0" err="1">
+                    <a:solidFill>
+                      <a:schemeClr val="bg1">
+                        <a:lumMod val="85000"/>
+                      </a:schemeClr>
+                    </a:solidFill>
+                    <a:latin typeface="Open Sans" panose="020B0606030504020204" pitchFamily="34" charset="0"/>
+                    <a:ea typeface="Open Sans" panose="020B0606030504020204" pitchFamily="34" charset="0"/>
+                    <a:cs typeface="Open Sans" panose="020B0606030504020204" pitchFamily="34" charset="0"/>
+                  </a:rPr>
+                  <a:t>buyPrice</a:t>
+                </a:r>
+                <a:r>
+                  <a:rPr lang="en-US" sz="1200" dirty="0">
+                    <a:solidFill>
+                      <a:schemeClr val="bg1">
+                        <a:lumMod val="85000"/>
+                      </a:schemeClr>
+                    </a:solidFill>
+                    <a:latin typeface="Open Sans" panose="020B0606030504020204" pitchFamily="34" charset="0"/>
+                    <a:ea typeface="Open Sans" panose="020B0606030504020204" pitchFamily="34" charset="0"/>
+                    <a:cs typeface="Open Sans" panose="020B0606030504020204" pitchFamily="34" charset="0"/>
+                  </a:rPr>
+                  <a:t> &gt; </a:t>
+                </a:r>
+                <a:r>
+                  <a:rPr lang="en-US" sz="1200" dirty="0" err="1">
+                    <a:solidFill>
+                      <a:schemeClr val="bg1">
+                        <a:lumMod val="85000"/>
+                      </a:schemeClr>
+                    </a:solidFill>
+                    <a:latin typeface="Open Sans" panose="020B0606030504020204" pitchFamily="34" charset="0"/>
+                    <a:ea typeface="Open Sans" panose="020B0606030504020204" pitchFamily="34" charset="0"/>
+                    <a:cs typeface="Open Sans" panose="020B0606030504020204" pitchFamily="34" charset="0"/>
+                  </a:rPr>
+                  <a:t>sellPrice</a:t>
+                </a:r>
+                <a:endParaRPr lang="en-US" sz="1200" dirty="0">
+                  <a:solidFill>
+                    <a:schemeClr val="bg1">
+                      <a:lumMod val="85000"/>
+                    </a:schemeClr>
+                  </a:solidFill>
+                  <a:latin typeface="Open Sans" panose="020B0606030504020204" pitchFamily="34" charset="0"/>
+                  <a:ea typeface="Open Sans" panose="020B0606030504020204" pitchFamily="34" charset="0"/>
+                  <a:cs typeface="Open Sans" panose="020B0606030504020204" pitchFamily="34" charset="0"/>
+                </a:endParaRPr>
+              </a:p>
+            </p:txBody>
+          </p:sp>
+          <p:sp>
+            <p:nvSpPr>
+              <p:cNvPr id="22" name="Flowchart: Decision 21">
+                <a:extLst>
+                  <a:ext uri="{FF2B5EF4-FFF2-40B4-BE49-F238E27FC236}">
+                    <a16:creationId xmlns:a16="http://schemas.microsoft.com/office/drawing/2014/main" id="{9E8E48AB-E3E0-A94C-C315-FD051F779113}"/>
+                  </a:ext>
+                </a:extLst>
+              </p:cNvPr>
+              <p:cNvSpPr/>
+              <p:nvPr/>
+            </p:nvSpPr>
+            <p:spPr>
+              <a:xfrm>
+                <a:off x="7856926" y="3304268"/>
+                <a:ext cx="1844844" cy="946484"/>
+              </a:xfrm>
+              <a:prstGeom prst="flowChartDecision">
+                <a:avLst/>
+              </a:prstGeom>
+              <a:noFill/>
+              <a:ln>
+                <a:solidFill>
+                  <a:srgbClr val="FF7C80"/>
+                </a:solidFill>
+              </a:ln>
+            </p:spPr>
+            <p:style>
+              <a:lnRef idx="2">
+                <a:schemeClr val="accent1">
+                  <a:shade val="50000"/>
+                </a:schemeClr>
+              </a:lnRef>
+              <a:fillRef idx="1">
+                <a:schemeClr val="accent1"/>
+              </a:fillRef>
+              <a:effectRef idx="0">
+                <a:schemeClr val="accent1"/>
+              </a:effectRef>
+              <a:fontRef idx="minor">
+                <a:schemeClr val="lt1"/>
+              </a:fontRef>
+            </p:style>
+            <p:txBody>
+              <a:bodyPr rtlCol="0" anchor="ctr"/>
+              <a:lstStyle/>
+              <a:p>
+                <a:pPr algn="ctr"/>
+                <a:r>
+                  <a:rPr lang="en-US" sz="1200" dirty="0">
+                    <a:solidFill>
+                      <a:schemeClr val="bg1">
+                        <a:lumMod val="85000"/>
+                      </a:schemeClr>
+                    </a:solidFill>
+                    <a:latin typeface="Open Sans" panose="020B0606030504020204" pitchFamily="34" charset="0"/>
+                    <a:ea typeface="Open Sans" panose="020B0606030504020204" pitchFamily="34" charset="0"/>
+                    <a:cs typeface="Open Sans" panose="020B0606030504020204" pitchFamily="34" charset="0"/>
+                  </a:rPr>
+                  <a:t>mark &gt;= 65</a:t>
+                </a:r>
+              </a:p>
+            </p:txBody>
+          </p:sp>
+          <p:sp>
+            <p:nvSpPr>
+              <p:cNvPr id="45" name="Rectangle 44">
+                <a:extLst>
+                  <a:ext uri="{FF2B5EF4-FFF2-40B4-BE49-F238E27FC236}">
+                    <a16:creationId xmlns:a16="http://schemas.microsoft.com/office/drawing/2014/main" id="{E55B8FAD-359E-053A-9AE9-04CBA7A87417}"/>
+                  </a:ext>
+                </a:extLst>
+              </p:cNvPr>
+              <p:cNvSpPr/>
+              <p:nvPr/>
+            </p:nvSpPr>
+            <p:spPr>
+              <a:xfrm>
+                <a:off x="5640487" y="4537691"/>
+                <a:ext cx="1844844" cy="393032"/>
+              </a:xfrm>
+              <a:prstGeom prst="rect">
+                <a:avLst/>
+              </a:prstGeom>
+              <a:noFill/>
+              <a:ln>
+                <a:solidFill>
+                  <a:schemeClr val="accent6">
+                    <a:lumMod val="60000"/>
+                    <a:lumOff val="40000"/>
+                  </a:schemeClr>
+                </a:solidFill>
+              </a:ln>
+            </p:spPr>
+            <p:style>
+              <a:lnRef idx="2">
+                <a:schemeClr val="accent1">
+                  <a:shade val="50000"/>
+                </a:schemeClr>
+              </a:lnRef>
+              <a:fillRef idx="1">
+                <a:schemeClr val="accent1"/>
+              </a:fillRef>
+              <a:effectRef idx="0">
+                <a:schemeClr val="accent1"/>
+              </a:effectRef>
+              <a:fontRef idx="minor">
+                <a:schemeClr val="lt1"/>
+              </a:fontRef>
+            </p:style>
+            <p:txBody>
+              <a:bodyPr rtlCol="0" anchor="ctr"/>
+              <a:lstStyle/>
+              <a:p>
+                <a:pPr algn="ctr"/>
+                <a:r>
+                  <a:rPr lang="en-US" sz="1200" dirty="0">
+                    <a:solidFill>
+                      <a:schemeClr val="bg1">
+                        <a:lumMod val="85000"/>
+                      </a:schemeClr>
+                    </a:solidFill>
+                    <a:latin typeface="Open Sans" panose="020B0606030504020204" pitchFamily="34" charset="0"/>
+                    <a:ea typeface="Open Sans" panose="020B0606030504020204" pitchFamily="34" charset="0"/>
+                    <a:cs typeface="Open Sans" panose="020B0606030504020204" pitchFamily="34" charset="0"/>
+                  </a:rPr>
+                  <a:t>result = “profit”</a:t>
+                </a:r>
+              </a:p>
+            </p:txBody>
+          </p:sp>
+          <p:sp>
+            <p:nvSpPr>
+              <p:cNvPr id="46" name="Rectangle 45">
+                <a:extLst>
+                  <a:ext uri="{FF2B5EF4-FFF2-40B4-BE49-F238E27FC236}">
+                    <a16:creationId xmlns:a16="http://schemas.microsoft.com/office/drawing/2014/main" id="{E58D2640-1D49-96D0-AE5C-1485860C5605}"/>
+                  </a:ext>
+                </a:extLst>
+              </p:cNvPr>
+              <p:cNvSpPr/>
+              <p:nvPr/>
+            </p:nvSpPr>
+            <p:spPr>
+              <a:xfrm>
+                <a:off x="7856925" y="4537691"/>
+                <a:ext cx="1844844" cy="393032"/>
+              </a:xfrm>
+              <a:prstGeom prst="rect">
+                <a:avLst/>
+              </a:prstGeom>
+              <a:noFill/>
+              <a:ln>
+                <a:solidFill>
+                  <a:schemeClr val="accent6">
+                    <a:lumMod val="60000"/>
+                    <a:lumOff val="40000"/>
+                  </a:schemeClr>
+                </a:solidFill>
+              </a:ln>
+            </p:spPr>
+            <p:style>
+              <a:lnRef idx="2">
+                <a:schemeClr val="accent1">
+                  <a:shade val="50000"/>
+                </a:schemeClr>
+              </a:lnRef>
+              <a:fillRef idx="1">
+                <a:schemeClr val="accent1"/>
+              </a:fillRef>
+              <a:effectRef idx="0">
+                <a:schemeClr val="accent1"/>
+              </a:effectRef>
+              <a:fontRef idx="minor">
+                <a:schemeClr val="lt1"/>
+              </a:fontRef>
+            </p:style>
+            <p:txBody>
+              <a:bodyPr rtlCol="0" anchor="ctr"/>
+              <a:lstStyle/>
+              <a:p>
+                <a:pPr algn="ctr"/>
+                <a:r>
+                  <a:rPr lang="en-US" sz="1200" dirty="0">
+                    <a:solidFill>
+                      <a:schemeClr val="bg1">
+                        <a:lumMod val="85000"/>
+                      </a:schemeClr>
+                    </a:solidFill>
+                    <a:latin typeface="Open Sans" panose="020B0606030504020204" pitchFamily="34" charset="0"/>
+                    <a:ea typeface="Open Sans" panose="020B0606030504020204" pitchFamily="34" charset="0"/>
+                    <a:cs typeface="Open Sans" panose="020B0606030504020204" pitchFamily="34" charset="0"/>
+                  </a:rPr>
+                  <a:t>result = “loss”</a:t>
+                </a:r>
+              </a:p>
+            </p:txBody>
+          </p:sp>
+          <p:sp>
+            <p:nvSpPr>
+              <p:cNvPr id="55" name="Rectangle 54">
+                <a:extLst>
+                  <a:ext uri="{FF2B5EF4-FFF2-40B4-BE49-F238E27FC236}">
+                    <a16:creationId xmlns:a16="http://schemas.microsoft.com/office/drawing/2014/main" id="{7BAA7A72-F91A-2270-293F-899656069CBC}"/>
+                  </a:ext>
+                </a:extLst>
+              </p:cNvPr>
+              <p:cNvSpPr/>
+              <p:nvPr/>
+            </p:nvSpPr>
+            <p:spPr>
+              <a:xfrm>
+                <a:off x="7856926" y="2589985"/>
+                <a:ext cx="1844844" cy="393032"/>
+              </a:xfrm>
+              <a:prstGeom prst="rect">
+                <a:avLst/>
+              </a:prstGeom>
+              <a:noFill/>
+              <a:ln>
+                <a:solidFill>
+                  <a:schemeClr val="accent6">
+                    <a:lumMod val="60000"/>
+                    <a:lumOff val="40000"/>
+                  </a:schemeClr>
+                </a:solidFill>
+              </a:ln>
+            </p:spPr>
+            <p:style>
+              <a:lnRef idx="2">
+                <a:schemeClr val="accent1">
+                  <a:shade val="50000"/>
+                </a:schemeClr>
+              </a:lnRef>
+              <a:fillRef idx="1">
+                <a:schemeClr val="accent1"/>
+              </a:fillRef>
+              <a:effectRef idx="0">
+                <a:schemeClr val="accent1"/>
+              </a:effectRef>
+              <a:fontRef idx="minor">
+                <a:schemeClr val="lt1"/>
+              </a:fontRef>
+            </p:style>
+            <p:txBody>
+              <a:bodyPr rtlCol="0" anchor="ctr"/>
+              <a:lstStyle/>
+              <a:p>
+                <a:pPr algn="ctr"/>
+                <a:r>
+                  <a:rPr lang="en-US" sz="1200" dirty="0">
+                    <a:solidFill>
+                      <a:schemeClr val="bg1">
+                        <a:lumMod val="85000"/>
+                      </a:schemeClr>
+                    </a:solidFill>
+                    <a:latin typeface="Open Sans" panose="020B0606030504020204" pitchFamily="34" charset="0"/>
+                    <a:ea typeface="Open Sans" panose="020B0606030504020204" pitchFamily="34" charset="0"/>
+                    <a:cs typeface="Open Sans" panose="020B0606030504020204" pitchFamily="34" charset="0"/>
+                  </a:rPr>
+                  <a:t>result = “break even”</a:t>
+                </a:r>
+              </a:p>
+            </p:txBody>
+          </p:sp>
+          <p:cxnSp>
+            <p:nvCxnSpPr>
+              <p:cNvPr id="40" name="Straight Arrow Connector 39">
+                <a:extLst>
+                  <a:ext uri="{FF2B5EF4-FFF2-40B4-BE49-F238E27FC236}">
+                    <a16:creationId xmlns:a16="http://schemas.microsoft.com/office/drawing/2014/main" id="{730E9198-70EC-A277-6FA3-D8C3C4080431}"/>
+                  </a:ext>
+                </a:extLst>
+              </p:cNvPr>
+              <p:cNvCxnSpPr>
+                <a:cxnSpLocks/>
+                <a:stCxn id="20" idx="3"/>
+                <a:endCxn id="22" idx="1"/>
+              </p:cNvCxnSpPr>
+              <p:nvPr/>
+            </p:nvCxnSpPr>
+            <p:spPr>
+              <a:xfrm>
+                <a:off x="7485329" y="3777510"/>
+                <a:ext cx="371597" cy="0"/>
+              </a:xfrm>
+              <a:prstGeom prst="straightConnector1">
+                <a:avLst/>
+              </a:prstGeom>
+              <a:ln w="12700">
+                <a:solidFill>
+                  <a:srgbClr val="FF7C80"/>
+                </a:solidFill>
+                <a:tailEnd type="triangle"/>
+              </a:ln>
+            </p:spPr>
+            <p:style>
+              <a:lnRef idx="1">
+                <a:schemeClr val="accent1"/>
+              </a:lnRef>
+              <a:fillRef idx="0">
+                <a:schemeClr val="accent1"/>
+              </a:fillRef>
+              <a:effectRef idx="0">
+                <a:schemeClr val="accent1"/>
+              </a:effectRef>
+              <a:fontRef idx="minor">
+                <a:schemeClr val="tx1"/>
+              </a:fontRef>
+            </p:style>
+          </p:cxnSp>
+          <p:cxnSp>
+            <p:nvCxnSpPr>
+              <p:cNvPr id="64" name="Straight Arrow Connector 63">
+                <a:extLst>
+                  <a:ext uri="{FF2B5EF4-FFF2-40B4-BE49-F238E27FC236}">
+                    <a16:creationId xmlns:a16="http://schemas.microsoft.com/office/drawing/2014/main" id="{F532C1C0-6B21-2607-77C8-133D3361B5AE}"/>
+                  </a:ext>
+                </a:extLst>
+              </p:cNvPr>
+              <p:cNvCxnSpPr>
+                <a:cxnSpLocks/>
+                <a:stCxn id="20" idx="2"/>
+                <a:endCxn id="45" idx="0"/>
+              </p:cNvCxnSpPr>
+              <p:nvPr/>
+            </p:nvCxnSpPr>
+            <p:spPr>
+              <a:xfrm>
+                <a:off x="6562907" y="4250752"/>
+                <a:ext cx="2" cy="286939"/>
+              </a:xfrm>
+              <a:prstGeom prst="straightConnector1">
+                <a:avLst/>
+              </a:prstGeom>
+              <a:ln w="12700">
+                <a:solidFill>
+                  <a:srgbClr val="FF7C80"/>
+                </a:solidFill>
+                <a:tailEnd type="triangle"/>
+              </a:ln>
+            </p:spPr>
+            <p:style>
+              <a:lnRef idx="1">
+                <a:schemeClr val="accent1"/>
+              </a:lnRef>
+              <a:fillRef idx="0">
+                <a:schemeClr val="accent1"/>
+              </a:fillRef>
+              <a:effectRef idx="0">
+                <a:schemeClr val="accent1"/>
+              </a:effectRef>
+              <a:fontRef idx="minor">
+                <a:schemeClr val="tx1"/>
+              </a:fontRef>
+            </p:style>
+          </p:cxnSp>
+          <p:cxnSp>
+            <p:nvCxnSpPr>
+              <p:cNvPr id="66" name="Straight Arrow Connector 65">
+                <a:extLst>
+                  <a:ext uri="{FF2B5EF4-FFF2-40B4-BE49-F238E27FC236}">
+                    <a16:creationId xmlns:a16="http://schemas.microsoft.com/office/drawing/2014/main" id="{F0D80A01-AAB7-3216-56B0-A5CE06CC571C}"/>
+                  </a:ext>
+                </a:extLst>
+              </p:cNvPr>
+              <p:cNvCxnSpPr>
+                <a:cxnSpLocks/>
+                <a:stCxn id="22" idx="2"/>
+                <a:endCxn id="46" idx="0"/>
+              </p:cNvCxnSpPr>
+              <p:nvPr/>
+            </p:nvCxnSpPr>
+            <p:spPr>
+              <a:xfrm flipH="1">
+                <a:off x="8779347" y="4250752"/>
+                <a:ext cx="1" cy="286939"/>
+              </a:xfrm>
+              <a:prstGeom prst="straightConnector1">
+                <a:avLst/>
+              </a:prstGeom>
+              <a:ln w="12700">
+                <a:solidFill>
+                  <a:srgbClr val="FF7C80"/>
+                </a:solidFill>
+                <a:tailEnd type="triangle"/>
+              </a:ln>
+            </p:spPr>
+            <p:style>
+              <a:lnRef idx="1">
+                <a:schemeClr val="accent1"/>
+              </a:lnRef>
+              <a:fillRef idx="0">
+                <a:schemeClr val="accent1"/>
+              </a:fillRef>
+              <a:effectRef idx="0">
+                <a:schemeClr val="accent1"/>
+              </a:effectRef>
+              <a:fontRef idx="minor">
+                <a:schemeClr val="tx1"/>
+              </a:fontRef>
+            </p:style>
+          </p:cxnSp>
+          <p:sp>
+            <p:nvSpPr>
+              <p:cNvPr id="74" name="TextBox 73">
+                <a:extLst>
+                  <a:ext uri="{FF2B5EF4-FFF2-40B4-BE49-F238E27FC236}">
+                    <a16:creationId xmlns:a16="http://schemas.microsoft.com/office/drawing/2014/main" id="{D1EF71AA-0AAE-0DD8-6FC5-3FB7CD854737}"/>
+                  </a:ext>
+                </a:extLst>
+              </p:cNvPr>
+              <p:cNvSpPr txBox="1"/>
+              <p:nvPr/>
+            </p:nvSpPr>
+            <p:spPr>
+              <a:xfrm>
+                <a:off x="7489966" y="3500511"/>
+                <a:ext cx="269626" cy="276999"/>
+              </a:xfrm>
+              <a:prstGeom prst="rect">
+                <a:avLst/>
+              </a:prstGeom>
+              <a:noFill/>
+            </p:spPr>
+            <p:txBody>
+              <a:bodyPr wrap="none" rtlCol="0">
+                <a:spAutoFit/>
+              </a:bodyPr>
+              <a:lstStyle/>
+              <a:p>
+                <a:r>
+                  <a:rPr lang="en-US" sz="1200" dirty="0">
+                    <a:solidFill>
+                      <a:srgbClr val="FF7C80"/>
+                    </a:solidFill>
+                    <a:latin typeface="Open Sans" panose="020B0606030504020204" pitchFamily="34" charset="0"/>
+                    <a:ea typeface="Open Sans" panose="020B0606030504020204" pitchFamily="34" charset="0"/>
+                    <a:cs typeface="Open Sans" panose="020B0606030504020204" pitchFamily="34" charset="0"/>
+                  </a:rPr>
+                  <a:t>F</a:t>
+                </a:r>
+              </a:p>
+            </p:txBody>
+          </p:sp>
+          <p:sp>
+            <p:nvSpPr>
+              <p:cNvPr id="76" name="TextBox 75">
+                <a:extLst>
+                  <a:ext uri="{FF2B5EF4-FFF2-40B4-BE49-F238E27FC236}">
+                    <a16:creationId xmlns:a16="http://schemas.microsoft.com/office/drawing/2014/main" id="{F6624D32-307F-BEE8-5DCC-79846F034670}"/>
+                  </a:ext>
+                </a:extLst>
+              </p:cNvPr>
+              <p:cNvSpPr txBox="1"/>
+              <p:nvPr/>
+            </p:nvSpPr>
+            <p:spPr>
+              <a:xfrm>
+                <a:off x="6293283" y="4255721"/>
+                <a:ext cx="269626" cy="276999"/>
+              </a:xfrm>
+              <a:prstGeom prst="rect">
+                <a:avLst/>
+              </a:prstGeom>
+              <a:noFill/>
+            </p:spPr>
+            <p:txBody>
+              <a:bodyPr wrap="none" rtlCol="0">
+                <a:spAutoFit/>
+              </a:bodyPr>
+              <a:lstStyle/>
+              <a:p>
+                <a:r>
+                  <a:rPr lang="en-US" sz="1200" dirty="0">
+                    <a:solidFill>
+                      <a:srgbClr val="FF7C80"/>
+                    </a:solidFill>
+                    <a:latin typeface="Open Sans" panose="020B0606030504020204" pitchFamily="34" charset="0"/>
+                    <a:ea typeface="Open Sans" panose="020B0606030504020204" pitchFamily="34" charset="0"/>
+                    <a:cs typeface="Open Sans" panose="020B0606030504020204" pitchFamily="34" charset="0"/>
+                  </a:rPr>
+                  <a:t>T</a:t>
+                </a:r>
+              </a:p>
+            </p:txBody>
+          </p:sp>
+          <p:sp>
+            <p:nvSpPr>
+              <p:cNvPr id="78" name="TextBox 77">
+                <a:extLst>
+                  <a:ext uri="{FF2B5EF4-FFF2-40B4-BE49-F238E27FC236}">
+                    <a16:creationId xmlns:a16="http://schemas.microsoft.com/office/drawing/2014/main" id="{E29F5D91-4B83-F5CA-3F1C-010A1ADF72D4}"/>
+                  </a:ext>
+                </a:extLst>
+              </p:cNvPr>
+              <p:cNvSpPr txBox="1"/>
+              <p:nvPr/>
+            </p:nvSpPr>
+            <p:spPr>
+              <a:xfrm>
+                <a:off x="8513956" y="4255721"/>
+                <a:ext cx="269626" cy="276999"/>
+              </a:xfrm>
+              <a:prstGeom prst="rect">
+                <a:avLst/>
+              </a:prstGeom>
+              <a:noFill/>
+            </p:spPr>
+            <p:txBody>
+              <a:bodyPr wrap="none" rtlCol="0">
+                <a:spAutoFit/>
+              </a:bodyPr>
+              <a:lstStyle/>
+              <a:p>
+                <a:r>
+                  <a:rPr lang="en-US" sz="1200" dirty="0">
+                    <a:solidFill>
+                      <a:srgbClr val="FF7C80"/>
+                    </a:solidFill>
+                    <a:latin typeface="Open Sans" panose="020B0606030504020204" pitchFamily="34" charset="0"/>
+                    <a:ea typeface="Open Sans" panose="020B0606030504020204" pitchFamily="34" charset="0"/>
+                    <a:cs typeface="Open Sans" panose="020B0606030504020204" pitchFamily="34" charset="0"/>
+                  </a:rPr>
+                  <a:t>T</a:t>
+                </a:r>
+              </a:p>
+            </p:txBody>
+          </p:sp>
+          <p:cxnSp>
+            <p:nvCxnSpPr>
+              <p:cNvPr id="95" name="Connector: Elbow 94">
+                <a:extLst>
+                  <a:ext uri="{FF2B5EF4-FFF2-40B4-BE49-F238E27FC236}">
+                    <a16:creationId xmlns:a16="http://schemas.microsoft.com/office/drawing/2014/main" id="{E845F079-712B-1359-4778-998BE36C5C86}"/>
+                  </a:ext>
+                </a:extLst>
+              </p:cNvPr>
+              <p:cNvCxnSpPr>
+                <a:stCxn id="45" idx="2"/>
+                <a:endCxn id="75" idx="4"/>
+              </p:cNvCxnSpPr>
+              <p:nvPr/>
+            </p:nvCxnSpPr>
+            <p:spPr>
+              <a:xfrm rot="5400000" flipH="1" flipV="1">
+                <a:off x="6978508" y="1853808"/>
+                <a:ext cx="2661315" cy="3492515"/>
+              </a:xfrm>
+              <a:prstGeom prst="bentConnector3">
+                <a:avLst>
+                  <a:gd name="adj1" fmla="val -11453"/>
+                </a:avLst>
+              </a:prstGeom>
+              <a:ln w="12700">
+                <a:solidFill>
+                  <a:schemeClr val="bg1">
+                    <a:lumMod val="75000"/>
+                  </a:schemeClr>
+                </a:solidFill>
+                <a:tailEnd type="triangle"/>
+              </a:ln>
+            </p:spPr>
+            <p:style>
+              <a:lnRef idx="1">
+                <a:schemeClr val="accent1"/>
+              </a:lnRef>
+              <a:fillRef idx="0">
+                <a:schemeClr val="accent1"/>
+              </a:fillRef>
+              <a:effectRef idx="0">
+                <a:schemeClr val="accent1"/>
+              </a:effectRef>
+              <a:fontRef idx="minor">
+                <a:schemeClr val="tx1"/>
+              </a:fontRef>
+            </p:style>
+          </p:cxnSp>
+          <p:cxnSp>
+            <p:nvCxnSpPr>
+              <p:cNvPr id="98" name="Connector: Elbow 97">
+                <a:extLst>
+                  <a:ext uri="{FF2B5EF4-FFF2-40B4-BE49-F238E27FC236}">
+                    <a16:creationId xmlns:a16="http://schemas.microsoft.com/office/drawing/2014/main" id="{8DA868EF-5E00-6EF7-40AC-D4065B4E781F}"/>
+                  </a:ext>
+                </a:extLst>
+              </p:cNvPr>
+              <p:cNvCxnSpPr>
+                <a:stCxn id="55" idx="0"/>
+                <a:endCxn id="75" idx="2"/>
+              </p:cNvCxnSpPr>
+              <p:nvPr/>
+            </p:nvCxnSpPr>
+            <p:spPr>
+              <a:xfrm rot="5400000" flipH="1" flipV="1">
+                <a:off x="8765808" y="2038307"/>
+                <a:ext cx="565219" cy="538138"/>
+              </a:xfrm>
+              <a:prstGeom prst="bentConnector2">
+                <a:avLst/>
+              </a:prstGeom>
+              <a:ln w="12700">
+                <a:solidFill>
+                  <a:schemeClr val="bg1">
+                    <a:lumMod val="75000"/>
+                  </a:schemeClr>
+                </a:solidFill>
+                <a:tailEnd type="triangle"/>
+              </a:ln>
+            </p:spPr>
+            <p:style>
+              <a:lnRef idx="1">
+                <a:schemeClr val="accent1"/>
+              </a:lnRef>
+              <a:fillRef idx="0">
+                <a:schemeClr val="accent1"/>
+              </a:fillRef>
+              <a:effectRef idx="0">
+                <a:schemeClr val="accent1"/>
+              </a:effectRef>
+              <a:fontRef idx="minor">
+                <a:schemeClr val="tx1"/>
+              </a:fontRef>
+            </p:style>
+          </p:cxnSp>
+          <p:cxnSp>
+            <p:nvCxnSpPr>
+              <p:cNvPr id="100" name="Straight Connector 99">
+                <a:extLst>
+                  <a:ext uri="{FF2B5EF4-FFF2-40B4-BE49-F238E27FC236}">
+                    <a16:creationId xmlns:a16="http://schemas.microsoft.com/office/drawing/2014/main" id="{5BE41543-7919-2F46-EB2A-1610BEDCFFB6}"/>
+                  </a:ext>
+                </a:extLst>
+              </p:cNvPr>
+              <p:cNvCxnSpPr>
+                <a:cxnSpLocks/>
+                <a:stCxn id="46" idx="2"/>
+              </p:cNvCxnSpPr>
+              <p:nvPr/>
+            </p:nvCxnSpPr>
+            <p:spPr>
+              <a:xfrm>
+                <a:off x="8779347" y="4930723"/>
+                <a:ext cx="0" cy="302183"/>
+              </a:xfrm>
+              <a:prstGeom prst="line">
+                <a:avLst/>
+              </a:prstGeom>
+              <a:ln w="12700">
+                <a:solidFill>
+                  <a:schemeClr val="bg1">
+                    <a:lumMod val="75000"/>
+                  </a:schemeClr>
+                </a:solidFill>
+              </a:ln>
+            </p:spPr>
+            <p:style>
+              <a:lnRef idx="1">
+                <a:schemeClr val="accent1"/>
+              </a:lnRef>
+              <a:fillRef idx="0">
+                <a:schemeClr val="accent1"/>
+              </a:fillRef>
+              <a:effectRef idx="0">
+                <a:schemeClr val="accent1"/>
+              </a:effectRef>
+              <a:fontRef idx="minor">
+                <a:schemeClr val="tx1"/>
+              </a:fontRef>
+            </p:style>
+          </p:cxnSp>
+          <p:sp>
+            <p:nvSpPr>
+              <p:cNvPr id="58" name="Flowchart: Data 57">
+                <a:extLst>
+                  <a:ext uri="{FF2B5EF4-FFF2-40B4-BE49-F238E27FC236}">
+                    <a16:creationId xmlns:a16="http://schemas.microsoft.com/office/drawing/2014/main" id="{22C75C27-346E-E517-0FA7-D1C9E1ED48A9}"/>
+                  </a:ext>
+                </a:extLst>
+              </p:cNvPr>
+              <p:cNvSpPr/>
+              <p:nvPr/>
+            </p:nvSpPr>
+            <p:spPr>
+              <a:xfrm>
+                <a:off x="5640487" y="2545872"/>
+                <a:ext cx="1844844" cy="489284"/>
+              </a:xfrm>
+              <a:prstGeom prst="flowChartInputOutput">
+                <a:avLst/>
+              </a:prstGeom>
+              <a:noFill/>
+              <a:ln>
+                <a:solidFill>
+                  <a:schemeClr val="accent1">
+                    <a:lumMod val="60000"/>
+                    <a:lumOff val="40000"/>
+                  </a:schemeClr>
+                </a:solidFill>
+              </a:ln>
+            </p:spPr>
+            <p:style>
+              <a:lnRef idx="2">
+                <a:schemeClr val="accent1">
+                  <a:shade val="50000"/>
+                </a:schemeClr>
+              </a:lnRef>
+              <a:fillRef idx="1">
+                <a:schemeClr val="accent1"/>
+              </a:fillRef>
+              <a:effectRef idx="0">
+                <a:schemeClr val="accent1"/>
+              </a:effectRef>
+              <a:fontRef idx="minor">
+                <a:schemeClr val="lt1"/>
+              </a:fontRef>
+            </p:style>
+            <p:txBody>
+              <a:bodyPr rtlCol="0" anchor="ctr"/>
+              <a:lstStyle/>
+              <a:p>
+                <a:pPr algn="ctr"/>
+                <a:r>
+                  <a:rPr lang="en-US" sz="1200" dirty="0">
+                    <a:solidFill>
+                      <a:schemeClr val="bg1">
+                        <a:lumMod val="85000"/>
+                      </a:schemeClr>
+                    </a:solidFill>
+                    <a:latin typeface="Open Sans" panose="020B0606030504020204" pitchFamily="34" charset="0"/>
+                    <a:ea typeface="Open Sans" panose="020B0606030504020204" pitchFamily="34" charset="0"/>
+                    <a:cs typeface="Open Sans" panose="020B0606030504020204" pitchFamily="34" charset="0"/>
+                  </a:rPr>
+                  <a:t>Read </a:t>
+                </a:r>
+                <a:r>
+                  <a:rPr lang="en-US" sz="1200" dirty="0" err="1">
+                    <a:solidFill>
+                      <a:schemeClr val="bg1">
+                        <a:lumMod val="85000"/>
+                      </a:schemeClr>
+                    </a:solidFill>
+                    <a:latin typeface="Open Sans" panose="020B0606030504020204" pitchFamily="34" charset="0"/>
+                    <a:ea typeface="Open Sans" panose="020B0606030504020204" pitchFamily="34" charset="0"/>
+                    <a:cs typeface="Open Sans" panose="020B0606030504020204" pitchFamily="34" charset="0"/>
+                  </a:rPr>
+                  <a:t>sellPrice</a:t>
+                </a:r>
+                <a:endParaRPr lang="en-US" sz="1200" dirty="0">
+                  <a:solidFill>
+                    <a:schemeClr val="bg1">
+                      <a:lumMod val="85000"/>
+                    </a:schemeClr>
+                  </a:solidFill>
+                  <a:latin typeface="Open Sans" panose="020B0606030504020204" pitchFamily="34" charset="0"/>
+                  <a:ea typeface="Open Sans" panose="020B0606030504020204" pitchFamily="34" charset="0"/>
+                  <a:cs typeface="Open Sans" panose="020B0606030504020204" pitchFamily="34" charset="0"/>
+                </a:endParaRPr>
+              </a:p>
+            </p:txBody>
+          </p:sp>
+          <p:cxnSp>
+            <p:nvCxnSpPr>
+              <p:cNvPr id="17" name="Straight Arrow Connector 16">
+                <a:extLst>
+                  <a:ext uri="{FF2B5EF4-FFF2-40B4-BE49-F238E27FC236}">
+                    <a16:creationId xmlns:a16="http://schemas.microsoft.com/office/drawing/2014/main" id="{E632D335-992B-6952-A11D-ED57E9A1BCFF}"/>
+                  </a:ext>
+                </a:extLst>
+              </p:cNvPr>
+              <p:cNvCxnSpPr>
+                <a:stCxn id="58" idx="4"/>
+                <a:endCxn id="20" idx="0"/>
+              </p:cNvCxnSpPr>
+              <p:nvPr/>
+            </p:nvCxnSpPr>
+            <p:spPr>
+              <a:xfrm flipH="1">
+                <a:off x="6562907" y="3035156"/>
+                <a:ext cx="2" cy="269112"/>
+              </a:xfrm>
+              <a:prstGeom prst="straightConnector1">
+                <a:avLst/>
+              </a:prstGeom>
+              <a:ln w="12700">
+                <a:solidFill>
+                  <a:schemeClr val="accent1">
+                    <a:lumMod val="60000"/>
+                    <a:lumOff val="40000"/>
+                  </a:schemeClr>
+                </a:solidFill>
+                <a:tailEnd type="triangle"/>
+              </a:ln>
+            </p:spPr>
+            <p:style>
+              <a:lnRef idx="1">
+                <a:schemeClr val="accent1"/>
+              </a:lnRef>
+              <a:fillRef idx="0">
+                <a:schemeClr val="accent1"/>
+              </a:fillRef>
+              <a:effectRef idx="0">
+                <a:schemeClr val="accent1"/>
+              </a:effectRef>
+              <a:fontRef idx="minor">
+                <a:schemeClr val="tx1"/>
+              </a:fontRef>
+            </p:style>
+          </p:cxnSp>
+          <p:cxnSp>
+            <p:nvCxnSpPr>
+              <p:cNvPr id="39" name="Straight Arrow Connector 38">
+                <a:extLst>
+                  <a:ext uri="{FF2B5EF4-FFF2-40B4-BE49-F238E27FC236}">
+                    <a16:creationId xmlns:a16="http://schemas.microsoft.com/office/drawing/2014/main" id="{ACBB4EED-74AC-5192-6AB5-637C570AA114}"/>
+                  </a:ext>
+                </a:extLst>
+              </p:cNvPr>
+              <p:cNvCxnSpPr>
+                <a:stCxn id="22" idx="0"/>
+                <a:endCxn id="55" idx="2"/>
+              </p:cNvCxnSpPr>
+              <p:nvPr/>
+            </p:nvCxnSpPr>
+            <p:spPr>
+              <a:xfrm flipV="1">
+                <a:off x="8779348" y="2983017"/>
+                <a:ext cx="0" cy="321251"/>
+              </a:xfrm>
+              <a:prstGeom prst="straightConnector1">
+                <a:avLst/>
+              </a:prstGeom>
+              <a:ln w="12700">
+                <a:solidFill>
+                  <a:srgbClr val="FF7C80"/>
+                </a:solidFill>
+                <a:tailEnd type="triangle"/>
+              </a:ln>
+            </p:spPr>
+            <p:style>
+              <a:lnRef idx="1">
+                <a:schemeClr val="accent1"/>
+              </a:lnRef>
+              <a:fillRef idx="0">
+                <a:schemeClr val="accent1"/>
+              </a:fillRef>
+              <a:effectRef idx="0">
+                <a:schemeClr val="accent1"/>
+              </a:effectRef>
+              <a:fontRef idx="minor">
+                <a:schemeClr val="tx1"/>
+              </a:fontRef>
+            </p:style>
+          </p:cxnSp>
+          <p:sp>
+            <p:nvSpPr>
+              <p:cNvPr id="80" name="TextBox 79">
+                <a:extLst>
+                  <a:ext uri="{FF2B5EF4-FFF2-40B4-BE49-F238E27FC236}">
+                    <a16:creationId xmlns:a16="http://schemas.microsoft.com/office/drawing/2014/main" id="{B95A8806-1F05-1F57-6842-48649E35A22F}"/>
+                  </a:ext>
+                </a:extLst>
+              </p:cNvPr>
+              <p:cNvSpPr txBox="1"/>
+              <p:nvPr/>
+            </p:nvSpPr>
+            <p:spPr>
+              <a:xfrm>
+                <a:off x="8513956" y="3025660"/>
+                <a:ext cx="269626" cy="276999"/>
+              </a:xfrm>
+              <a:prstGeom prst="rect">
+                <a:avLst/>
+              </a:prstGeom>
+              <a:noFill/>
+            </p:spPr>
+            <p:txBody>
+              <a:bodyPr wrap="none" rtlCol="0">
+                <a:spAutoFit/>
+              </a:bodyPr>
+              <a:lstStyle/>
+              <a:p>
+                <a:r>
+                  <a:rPr lang="en-US" sz="1200" dirty="0">
+                    <a:solidFill>
+                      <a:srgbClr val="FF7C80"/>
+                    </a:solidFill>
+                    <a:latin typeface="Open Sans" panose="020B0606030504020204" pitchFamily="34" charset="0"/>
+                    <a:ea typeface="Open Sans" panose="020B0606030504020204" pitchFamily="34" charset="0"/>
+                    <a:cs typeface="Open Sans" panose="020B0606030504020204" pitchFamily="34" charset="0"/>
+                  </a:rPr>
+                  <a:t>F</a:t>
+                </a:r>
+              </a:p>
+            </p:txBody>
+          </p:sp>
+        </p:grpSp>
+      </p:grpSp>
+    </p:spTree>
+    <p:extLst>
+      <p:ext uri="{BB962C8B-B14F-4D97-AF65-F5344CB8AC3E}">
+        <p14:creationId xmlns:p14="http://schemas.microsoft.com/office/powerpoint/2010/main" val="2802417722"/>
+      </p:ext>
+    </p:extLst>
+  </p:cSld>
+  <p:clrMapOvr>
+    <a:masterClrMapping/>
+  </p:clrMapOvr>
+</p:sld>
+</file>
+
 <file path=ppt/slides/slide2.xml><?xml version="1.0" encoding="utf-8"?>
 <p:sld xmlns:a="http://schemas.openxmlformats.org/drawingml/2006/main" xmlns:r="http://schemas.openxmlformats.org/officeDocument/2006/relationships" xmlns:p="http://schemas.openxmlformats.org/presentationml/2006/main">
   <p:cSld>

</xml_diff>

<commit_message>
Added Flowchart for Q2 of PrePSPM2122_KML.md
</commit_message>
<xml_diff>
--- a/Past Year Theory Questions/Resources/resources.pptx
+++ b/Past Year Theory Questions/Resources/resources.pptx
@@ -18,6 +18,7 @@
     <p:sldId id="267" r:id="rId12"/>
     <p:sldId id="268" r:id="rId13"/>
     <p:sldId id="269" r:id="rId14"/>
+    <p:sldId id="270" r:id="rId15"/>
   </p:sldIdLst>
   <p:sldSz cx="12192000" cy="6858000"/>
   <p:notesSz cx="6858000" cy="9144000"/>
@@ -9993,6 +9994,1114 @@
 </p:sld>
 </file>
 
+<file path=ppt/slides/slide14.xml><?xml version="1.0" encoding="utf-8"?>
+<p:sld xmlns:a="http://schemas.openxmlformats.org/drawingml/2006/main" xmlns:r="http://schemas.openxmlformats.org/officeDocument/2006/relationships" xmlns:p="http://schemas.openxmlformats.org/presentationml/2006/main">
+  <p:cSld>
+    <p:spTree>
+      <p:nvGrpSpPr>
+        <p:cNvPr id="1" name=""/>
+        <p:cNvGrpSpPr/>
+        <p:nvPr/>
+      </p:nvGrpSpPr>
+      <p:grpSpPr>
+        <a:xfrm>
+          <a:off x="0" y="0"/>
+          <a:ext cx="0" cy="0"/>
+          <a:chOff x="0" y="0"/>
+          <a:chExt cx="0" cy="0"/>
+        </a:xfrm>
+      </p:grpSpPr>
+      <p:grpSp>
+        <p:nvGrpSpPr>
+          <p:cNvPr id="73" name="Group 72">
+            <a:extLst>
+              <a:ext uri="{FF2B5EF4-FFF2-40B4-BE49-F238E27FC236}">
+                <a16:creationId xmlns:a16="http://schemas.microsoft.com/office/drawing/2014/main" id="{D502247B-9705-DB7A-781B-7082A6A27DA0}"/>
+              </a:ext>
+            </a:extLst>
+          </p:cNvPr>
+          <p:cNvGrpSpPr/>
+          <p:nvPr/>
+        </p:nvGrpSpPr>
+        <p:grpSpPr>
+          <a:xfrm>
+            <a:off x="2488066" y="1395512"/>
+            <a:ext cx="7215868" cy="4066976"/>
+            <a:chOff x="2488066" y="793783"/>
+            <a:chExt cx="7215868" cy="4066976"/>
+          </a:xfrm>
+        </p:grpSpPr>
+        <p:sp>
+          <p:nvSpPr>
+            <p:cNvPr id="108" name="Rectangle 107">
+              <a:extLst>
+                <a:ext uri="{FF2B5EF4-FFF2-40B4-BE49-F238E27FC236}">
+                  <a16:creationId xmlns:a16="http://schemas.microsoft.com/office/drawing/2014/main" id="{F5A5FD62-A99C-04B6-706B-DEE9B81AF541}"/>
+                </a:ext>
+              </a:extLst>
+            </p:cNvPr>
+            <p:cNvSpPr/>
+            <p:nvPr/>
+          </p:nvSpPr>
+          <p:spPr>
+            <a:xfrm>
+              <a:off x="2488066" y="793783"/>
+              <a:ext cx="7215868" cy="4066976"/>
+            </a:xfrm>
+            <a:prstGeom prst="rect">
+              <a:avLst/>
+            </a:prstGeom>
+            <a:solidFill>
+              <a:srgbClr val="0F1017"/>
+            </a:solidFill>
+            <a:ln w="12700">
+              <a:solidFill>
+                <a:schemeClr val="bg1">
+                  <a:lumMod val="75000"/>
+                </a:schemeClr>
+              </a:solidFill>
+            </a:ln>
+          </p:spPr>
+          <p:style>
+            <a:lnRef idx="2">
+              <a:schemeClr val="accent1">
+                <a:shade val="50000"/>
+              </a:schemeClr>
+            </a:lnRef>
+            <a:fillRef idx="1">
+              <a:schemeClr val="accent1"/>
+            </a:fillRef>
+            <a:effectRef idx="0">
+              <a:schemeClr val="accent1"/>
+            </a:effectRef>
+            <a:fontRef idx="minor">
+              <a:schemeClr val="lt1"/>
+            </a:fontRef>
+          </p:style>
+          <p:txBody>
+            <a:bodyPr rtlCol="0" anchor="ctr"/>
+            <a:lstStyle/>
+            <a:p>
+              <a:pPr algn="ctr"/>
+              <a:endParaRPr lang="en-US" sz="1800" dirty="0">
+                <a:solidFill>
+                  <a:schemeClr val="bg1">
+                    <a:lumMod val="85000"/>
+                  </a:schemeClr>
+                </a:solidFill>
+                <a:latin typeface="Open Sans" panose="020B0606030504020204" pitchFamily="34" charset="0"/>
+                <a:ea typeface="Open Sans" panose="020B0606030504020204" pitchFamily="34" charset="0"/>
+                <a:cs typeface="Open Sans" panose="020B0606030504020204" pitchFamily="34" charset="0"/>
+              </a:endParaRPr>
+            </a:p>
+          </p:txBody>
+        </p:sp>
+        <p:grpSp>
+          <p:nvGrpSpPr>
+            <p:cNvPr id="72" name="Group 71">
+              <a:extLst>
+                <a:ext uri="{FF2B5EF4-FFF2-40B4-BE49-F238E27FC236}">
+                  <a16:creationId xmlns:a16="http://schemas.microsoft.com/office/drawing/2014/main" id="{5F7E6F16-15EA-8C46-44F2-4734421AC2A0}"/>
+                </a:ext>
+              </a:extLst>
+            </p:cNvPr>
+            <p:cNvGrpSpPr/>
+            <p:nvPr/>
+          </p:nvGrpSpPr>
+          <p:grpSpPr>
+            <a:xfrm>
+              <a:off x="2964746" y="1316841"/>
+              <a:ext cx="6262509" cy="2828355"/>
+              <a:chOff x="2974770" y="1174016"/>
+              <a:chExt cx="6262509" cy="2828355"/>
+            </a:xfrm>
+          </p:grpSpPr>
+          <p:cxnSp>
+            <p:nvCxnSpPr>
+              <p:cNvPr id="61" name="Straight Arrow Connector 60">
+                <a:extLst>
+                  <a:ext uri="{FF2B5EF4-FFF2-40B4-BE49-F238E27FC236}">
+                    <a16:creationId xmlns:a16="http://schemas.microsoft.com/office/drawing/2014/main" id="{A1BBCFB3-141A-F3B8-67BE-C05995E64053}"/>
+                  </a:ext>
+                </a:extLst>
+              </p:cNvPr>
+              <p:cNvCxnSpPr>
+                <a:cxnSpLocks/>
+                <a:stCxn id="3" idx="4"/>
+                <a:endCxn id="28" idx="0"/>
+              </p:cNvCxnSpPr>
+              <p:nvPr/>
+            </p:nvCxnSpPr>
+            <p:spPr>
+              <a:xfrm>
+                <a:off x="3897192" y="1528224"/>
+                <a:ext cx="0" cy="560667"/>
+              </a:xfrm>
+              <a:prstGeom prst="straightConnector1">
+                <a:avLst/>
+              </a:prstGeom>
+              <a:ln w="12700">
+                <a:solidFill>
+                  <a:schemeClr val="bg1">
+                    <a:lumMod val="75000"/>
+                  </a:schemeClr>
+                </a:solidFill>
+                <a:tailEnd type="triangle"/>
+              </a:ln>
+            </p:spPr>
+            <p:style>
+              <a:lnRef idx="1">
+                <a:schemeClr val="accent1"/>
+              </a:lnRef>
+              <a:fillRef idx="0">
+                <a:schemeClr val="accent1"/>
+              </a:fillRef>
+              <a:effectRef idx="0">
+                <a:schemeClr val="accent1"/>
+              </a:effectRef>
+              <a:fontRef idx="minor">
+                <a:schemeClr val="tx1"/>
+              </a:fontRef>
+            </p:style>
+          </p:cxnSp>
+          <p:sp>
+            <p:nvSpPr>
+              <p:cNvPr id="40" name="TextBox 39">
+                <a:extLst>
+                  <a:ext uri="{FF2B5EF4-FFF2-40B4-BE49-F238E27FC236}">
+                    <a16:creationId xmlns:a16="http://schemas.microsoft.com/office/drawing/2014/main" id="{76AE0D0B-8177-07D5-789B-EED3B5BB964A}"/>
+                  </a:ext>
+                </a:extLst>
+              </p:cNvPr>
+              <p:cNvSpPr txBox="1"/>
+              <p:nvPr/>
+            </p:nvSpPr>
+            <p:spPr>
+              <a:xfrm>
+                <a:off x="7024920" y="3257301"/>
+                <a:ext cx="269626" cy="276999"/>
+              </a:xfrm>
+              <a:prstGeom prst="rect">
+                <a:avLst/>
+              </a:prstGeom>
+              <a:noFill/>
+            </p:spPr>
+            <p:txBody>
+              <a:bodyPr wrap="none" rtlCol="0">
+                <a:spAutoFit/>
+              </a:bodyPr>
+              <a:lstStyle/>
+              <a:p>
+                <a:r>
+                  <a:rPr lang="en-US" sz="1200" dirty="0">
+                    <a:solidFill>
+                      <a:srgbClr val="FF7C80"/>
+                    </a:solidFill>
+                    <a:latin typeface="Open Sans" panose="020B0606030504020204" pitchFamily="34" charset="0"/>
+                    <a:ea typeface="Open Sans" panose="020B0606030504020204" pitchFamily="34" charset="0"/>
+                    <a:cs typeface="Open Sans" panose="020B0606030504020204" pitchFamily="34" charset="0"/>
+                  </a:rPr>
+                  <a:t>F</a:t>
+                </a:r>
+              </a:p>
+            </p:txBody>
+          </p:sp>
+          <p:sp>
+            <p:nvSpPr>
+              <p:cNvPr id="41" name="Flowchart: Data 40">
+                <a:extLst>
+                  <a:ext uri="{FF2B5EF4-FFF2-40B4-BE49-F238E27FC236}">
+                    <a16:creationId xmlns:a16="http://schemas.microsoft.com/office/drawing/2014/main" id="{05EA567D-BF83-DA3D-9ED7-2BA3CE5720F6}"/>
+                  </a:ext>
+                </a:extLst>
+              </p:cNvPr>
+              <p:cNvSpPr/>
+              <p:nvPr/>
+            </p:nvSpPr>
+            <p:spPr>
+              <a:xfrm>
+                <a:off x="2974770" y="3284487"/>
+                <a:ext cx="1844844" cy="489284"/>
+              </a:xfrm>
+              <a:prstGeom prst="flowChartInputOutput">
+                <a:avLst/>
+              </a:prstGeom>
+              <a:noFill/>
+              <a:ln>
+                <a:solidFill>
+                  <a:srgbClr val="CC99FF"/>
+                </a:solidFill>
+              </a:ln>
+            </p:spPr>
+            <p:style>
+              <a:lnRef idx="2">
+                <a:schemeClr val="accent1">
+                  <a:shade val="50000"/>
+                </a:schemeClr>
+              </a:lnRef>
+              <a:fillRef idx="1">
+                <a:schemeClr val="accent1"/>
+              </a:fillRef>
+              <a:effectRef idx="0">
+                <a:schemeClr val="accent1"/>
+              </a:effectRef>
+              <a:fontRef idx="minor">
+                <a:schemeClr val="lt1"/>
+              </a:fontRef>
+            </p:style>
+            <p:txBody>
+              <a:bodyPr rtlCol="0" anchor="ctr"/>
+              <a:lstStyle/>
+              <a:p>
+                <a:pPr algn="ctr"/>
+                <a:r>
+                  <a:rPr lang="en-US" sz="1200" dirty="0">
+                    <a:solidFill>
+                      <a:schemeClr val="bg1">
+                        <a:lumMod val="85000"/>
+                      </a:schemeClr>
+                    </a:solidFill>
+                    <a:latin typeface="Open Sans" panose="020B0606030504020204" pitchFamily="34" charset="0"/>
+                    <a:ea typeface="Open Sans" panose="020B0606030504020204" pitchFamily="34" charset="0"/>
+                    <a:cs typeface="Open Sans" panose="020B0606030504020204" pitchFamily="34" charset="0"/>
+                  </a:rPr>
+                  <a:t>Print n</a:t>
+                </a:r>
+              </a:p>
+            </p:txBody>
+          </p:sp>
+          <p:sp>
+            <p:nvSpPr>
+              <p:cNvPr id="28" name="Rectangle 27">
+                <a:extLst>
+                  <a:ext uri="{FF2B5EF4-FFF2-40B4-BE49-F238E27FC236}">
+                    <a16:creationId xmlns:a16="http://schemas.microsoft.com/office/drawing/2014/main" id="{018B11D5-D5CD-62E5-1F22-F0CADAC0BDEF}"/>
+                  </a:ext>
+                </a:extLst>
+              </p:cNvPr>
+              <p:cNvSpPr/>
+              <p:nvPr/>
+            </p:nvSpPr>
+            <p:spPr>
+              <a:xfrm>
+                <a:off x="2974770" y="2088891"/>
+                <a:ext cx="1844844" cy="393032"/>
+              </a:xfrm>
+              <a:prstGeom prst="rect">
+                <a:avLst/>
+              </a:prstGeom>
+              <a:noFill/>
+              <a:ln>
+                <a:solidFill>
+                  <a:schemeClr val="accent6">
+                    <a:lumMod val="60000"/>
+                    <a:lumOff val="40000"/>
+                  </a:schemeClr>
+                </a:solidFill>
+              </a:ln>
+            </p:spPr>
+            <p:style>
+              <a:lnRef idx="2">
+                <a:schemeClr val="accent1">
+                  <a:shade val="50000"/>
+                </a:schemeClr>
+              </a:lnRef>
+              <a:fillRef idx="1">
+                <a:schemeClr val="accent1"/>
+              </a:fillRef>
+              <a:effectRef idx="0">
+                <a:schemeClr val="accent1"/>
+              </a:effectRef>
+              <a:fontRef idx="minor">
+                <a:schemeClr val="lt1"/>
+              </a:fontRef>
+            </p:style>
+            <p:txBody>
+              <a:bodyPr rtlCol="0" anchor="ctr"/>
+              <a:lstStyle/>
+              <a:p>
+                <a:pPr algn="ctr"/>
+                <a:r>
+                  <a:rPr lang="en-US" sz="1200" dirty="0">
+                    <a:solidFill>
+                      <a:schemeClr val="bg1">
+                        <a:lumMod val="85000"/>
+                      </a:schemeClr>
+                    </a:solidFill>
+                    <a:latin typeface="Open Sans" panose="020B0606030504020204" pitchFamily="34" charset="0"/>
+                    <a:ea typeface="Open Sans" panose="020B0606030504020204" pitchFamily="34" charset="0"/>
+                    <a:cs typeface="Open Sans" panose="020B0606030504020204" pitchFamily="34" charset="0"/>
+                  </a:rPr>
+                  <a:t>n = 20</a:t>
+                </a:r>
+              </a:p>
+            </p:txBody>
+          </p:sp>
+          <p:sp>
+            <p:nvSpPr>
+              <p:cNvPr id="3" name="Oval 2">
+                <a:extLst>
+                  <a:ext uri="{FF2B5EF4-FFF2-40B4-BE49-F238E27FC236}">
+                    <a16:creationId xmlns:a16="http://schemas.microsoft.com/office/drawing/2014/main" id="{41C92185-8D91-9955-23F7-4DC350FE624D}"/>
+                  </a:ext>
+                </a:extLst>
+              </p:cNvPr>
+              <p:cNvSpPr/>
+              <p:nvPr/>
+            </p:nvSpPr>
+            <p:spPr>
+              <a:xfrm>
+                <a:off x="3720088" y="1174016"/>
+                <a:ext cx="354208" cy="354208"/>
+              </a:xfrm>
+              <a:prstGeom prst="ellipse">
+                <a:avLst/>
+              </a:prstGeom>
+              <a:noFill/>
+              <a:ln w="12700">
+                <a:solidFill>
+                  <a:schemeClr val="bg1">
+                    <a:lumMod val="75000"/>
+                  </a:schemeClr>
+                </a:solidFill>
+              </a:ln>
+            </p:spPr>
+            <p:style>
+              <a:lnRef idx="2">
+                <a:schemeClr val="accent1">
+                  <a:shade val="50000"/>
+                </a:schemeClr>
+              </a:lnRef>
+              <a:fillRef idx="1">
+                <a:schemeClr val="accent1"/>
+              </a:fillRef>
+              <a:effectRef idx="0">
+                <a:schemeClr val="accent1"/>
+              </a:effectRef>
+              <a:fontRef idx="minor">
+                <a:schemeClr val="lt1"/>
+              </a:fontRef>
+            </p:style>
+            <p:txBody>
+              <a:bodyPr rtlCol="0" anchor="ctr"/>
+              <a:lstStyle/>
+              <a:p>
+                <a:pPr algn="ctr"/>
+                <a:endParaRPr lang="en-US"/>
+              </a:p>
+            </p:txBody>
+          </p:sp>
+          <p:sp>
+            <p:nvSpPr>
+              <p:cNvPr id="33" name="Oval 32">
+                <a:extLst>
+                  <a:ext uri="{FF2B5EF4-FFF2-40B4-BE49-F238E27FC236}">
+                    <a16:creationId xmlns:a16="http://schemas.microsoft.com/office/drawing/2014/main" id="{190EA5F7-9ADF-A1EB-7C60-F2FA332556AB}"/>
+                  </a:ext>
+                </a:extLst>
+              </p:cNvPr>
+              <p:cNvSpPr/>
+              <p:nvPr/>
+            </p:nvSpPr>
+            <p:spPr>
+              <a:xfrm>
+                <a:off x="8137753" y="1174016"/>
+                <a:ext cx="354208" cy="354208"/>
+              </a:xfrm>
+              <a:prstGeom prst="ellipse">
+                <a:avLst/>
+              </a:prstGeom>
+              <a:noFill/>
+              <a:ln w="12700">
+                <a:solidFill>
+                  <a:schemeClr val="bg1">
+                    <a:lumMod val="75000"/>
+                  </a:schemeClr>
+                </a:solidFill>
+              </a:ln>
+            </p:spPr>
+            <p:style>
+              <a:lnRef idx="2">
+                <a:schemeClr val="accent1">
+                  <a:shade val="50000"/>
+                </a:schemeClr>
+              </a:lnRef>
+              <a:fillRef idx="1">
+                <a:schemeClr val="accent1"/>
+              </a:fillRef>
+              <a:effectRef idx="0">
+                <a:schemeClr val="accent1"/>
+              </a:effectRef>
+              <a:fontRef idx="minor">
+                <a:schemeClr val="lt1"/>
+              </a:fontRef>
+            </p:style>
+            <p:txBody>
+              <a:bodyPr rtlCol="0" anchor="ctr"/>
+              <a:lstStyle/>
+              <a:p>
+                <a:pPr algn="ctr"/>
+                <a:endParaRPr lang="en-US"/>
+              </a:p>
+            </p:txBody>
+          </p:sp>
+          <p:sp>
+            <p:nvSpPr>
+              <p:cNvPr id="49" name="Flowchart: Decision 48">
+                <a:extLst>
+                  <a:ext uri="{FF2B5EF4-FFF2-40B4-BE49-F238E27FC236}">
+                    <a16:creationId xmlns:a16="http://schemas.microsoft.com/office/drawing/2014/main" id="{AD2E3CDE-9713-3C4A-D3E9-F4FD6875AEF3}"/>
+                  </a:ext>
+                </a:extLst>
+              </p:cNvPr>
+              <p:cNvSpPr/>
+              <p:nvPr/>
+            </p:nvSpPr>
+            <p:spPr>
+              <a:xfrm>
+                <a:off x="5180076" y="3055887"/>
+                <a:ext cx="1844844" cy="946484"/>
+              </a:xfrm>
+              <a:prstGeom prst="flowChartDecision">
+                <a:avLst/>
+              </a:prstGeom>
+              <a:noFill/>
+              <a:ln>
+                <a:solidFill>
+                  <a:srgbClr val="FF7C80"/>
+                </a:solidFill>
+              </a:ln>
+            </p:spPr>
+            <p:style>
+              <a:lnRef idx="2">
+                <a:schemeClr val="accent1">
+                  <a:shade val="50000"/>
+                </a:schemeClr>
+              </a:lnRef>
+              <a:fillRef idx="1">
+                <a:schemeClr val="accent1"/>
+              </a:fillRef>
+              <a:effectRef idx="0">
+                <a:schemeClr val="accent1"/>
+              </a:effectRef>
+              <a:fontRef idx="minor">
+                <a:schemeClr val="lt1"/>
+              </a:fontRef>
+            </p:style>
+            <p:txBody>
+              <a:bodyPr rtlCol="0" anchor="ctr"/>
+              <a:lstStyle/>
+              <a:p>
+                <a:pPr algn="ctr"/>
+                <a:r>
+                  <a:rPr lang="en-US" sz="1200" dirty="0">
+                    <a:solidFill>
+                      <a:schemeClr val="bg1">
+                        <a:lumMod val="85000"/>
+                      </a:schemeClr>
+                    </a:solidFill>
+                    <a:latin typeface="Open Sans" panose="020B0606030504020204" pitchFamily="34" charset="0"/>
+                    <a:ea typeface="Open Sans" panose="020B0606030504020204" pitchFamily="34" charset="0"/>
+                    <a:cs typeface="Open Sans" panose="020B0606030504020204" pitchFamily="34" charset="0"/>
+                  </a:rPr>
+                  <a:t>n % 4 == 0</a:t>
+                </a:r>
+              </a:p>
+            </p:txBody>
+          </p:sp>
+          <p:sp>
+            <p:nvSpPr>
+              <p:cNvPr id="50" name="Flowchart: Decision 49">
+                <a:extLst>
+                  <a:ext uri="{FF2B5EF4-FFF2-40B4-BE49-F238E27FC236}">
+                    <a16:creationId xmlns:a16="http://schemas.microsoft.com/office/drawing/2014/main" id="{9EB244EF-F2D1-5FB9-4970-EAA783147D87}"/>
+                  </a:ext>
+                </a:extLst>
+              </p:cNvPr>
+              <p:cNvSpPr/>
+              <p:nvPr/>
+            </p:nvSpPr>
+            <p:spPr>
+              <a:xfrm>
+                <a:off x="5180076" y="1812165"/>
+                <a:ext cx="1844844" cy="946484"/>
+              </a:xfrm>
+              <a:prstGeom prst="flowChartDecision">
+                <a:avLst/>
+              </a:prstGeom>
+              <a:noFill/>
+              <a:ln>
+                <a:solidFill>
+                  <a:srgbClr val="FF7C80"/>
+                </a:solidFill>
+              </a:ln>
+            </p:spPr>
+            <p:style>
+              <a:lnRef idx="2">
+                <a:schemeClr val="accent1">
+                  <a:shade val="50000"/>
+                </a:schemeClr>
+              </a:lnRef>
+              <a:fillRef idx="1">
+                <a:schemeClr val="accent1"/>
+              </a:fillRef>
+              <a:effectRef idx="0">
+                <a:schemeClr val="accent1"/>
+              </a:effectRef>
+              <a:fontRef idx="minor">
+                <a:schemeClr val="lt1"/>
+              </a:fontRef>
+            </p:style>
+            <p:txBody>
+              <a:bodyPr rtlCol="0" anchor="ctr"/>
+              <a:lstStyle/>
+              <a:p>
+                <a:pPr algn="ctr"/>
+                <a:r>
+                  <a:rPr lang="en-US" sz="1200" dirty="0">
+                    <a:solidFill>
+                      <a:schemeClr val="bg1">
+                        <a:lumMod val="85000"/>
+                      </a:schemeClr>
+                    </a:solidFill>
+                    <a:latin typeface="Open Sans" panose="020B0606030504020204" pitchFamily="34" charset="0"/>
+                    <a:ea typeface="Open Sans" panose="020B0606030504020204" pitchFamily="34" charset="0"/>
+                    <a:cs typeface="Open Sans" panose="020B0606030504020204" pitchFamily="34" charset="0"/>
+                  </a:rPr>
+                  <a:t>n &gt;= 1</a:t>
+                </a:r>
+              </a:p>
+            </p:txBody>
+          </p:sp>
+          <p:sp>
+            <p:nvSpPr>
+              <p:cNvPr id="51" name="Rectangle 50">
+                <a:extLst>
+                  <a:ext uri="{FF2B5EF4-FFF2-40B4-BE49-F238E27FC236}">
+                    <a16:creationId xmlns:a16="http://schemas.microsoft.com/office/drawing/2014/main" id="{0C6B188C-3BF5-B1F9-6CFE-4CA4FD5B57A0}"/>
+                  </a:ext>
+                </a:extLst>
+              </p:cNvPr>
+              <p:cNvSpPr/>
+              <p:nvPr/>
+            </p:nvSpPr>
+            <p:spPr>
+              <a:xfrm>
+                <a:off x="7392435" y="3337785"/>
+                <a:ext cx="1844844" cy="393032"/>
+              </a:xfrm>
+              <a:prstGeom prst="rect">
+                <a:avLst/>
+              </a:prstGeom>
+              <a:noFill/>
+              <a:ln>
+                <a:solidFill>
+                  <a:schemeClr val="accent6">
+                    <a:lumMod val="60000"/>
+                    <a:lumOff val="40000"/>
+                  </a:schemeClr>
+                </a:solidFill>
+              </a:ln>
+            </p:spPr>
+            <p:style>
+              <a:lnRef idx="2">
+                <a:schemeClr val="accent1">
+                  <a:shade val="50000"/>
+                </a:schemeClr>
+              </a:lnRef>
+              <a:fillRef idx="1">
+                <a:schemeClr val="accent1"/>
+              </a:fillRef>
+              <a:effectRef idx="0">
+                <a:schemeClr val="accent1"/>
+              </a:effectRef>
+              <a:fontRef idx="minor">
+                <a:schemeClr val="lt1"/>
+              </a:fontRef>
+            </p:style>
+            <p:txBody>
+              <a:bodyPr rtlCol="0" anchor="ctr"/>
+              <a:lstStyle/>
+              <a:p>
+                <a:pPr algn="ctr"/>
+                <a:r>
+                  <a:rPr lang="en-US" sz="1200" dirty="0">
+                    <a:solidFill>
+                      <a:schemeClr val="bg1">
+                        <a:lumMod val="85000"/>
+                      </a:schemeClr>
+                    </a:solidFill>
+                    <a:latin typeface="Open Sans" panose="020B0606030504020204" pitchFamily="34" charset="0"/>
+                    <a:ea typeface="Open Sans" panose="020B0606030504020204" pitchFamily="34" charset="0"/>
+                    <a:cs typeface="Open Sans" panose="020B0606030504020204" pitchFamily="34" charset="0"/>
+                  </a:rPr>
+                  <a:t>n = n – 1</a:t>
+                </a:r>
+              </a:p>
+            </p:txBody>
+          </p:sp>
+          <p:cxnSp>
+            <p:nvCxnSpPr>
+              <p:cNvPr id="43" name="Straight Arrow Connector 42">
+                <a:extLst>
+                  <a:ext uri="{FF2B5EF4-FFF2-40B4-BE49-F238E27FC236}">
+                    <a16:creationId xmlns:a16="http://schemas.microsoft.com/office/drawing/2014/main" id="{29FE56DF-2974-FA58-AFF3-4366DACEDD16}"/>
+                  </a:ext>
+                </a:extLst>
+              </p:cNvPr>
+              <p:cNvCxnSpPr>
+                <a:stCxn id="28" idx="3"/>
+                <a:endCxn id="50" idx="1"/>
+              </p:cNvCxnSpPr>
+              <p:nvPr/>
+            </p:nvCxnSpPr>
+            <p:spPr>
+              <a:xfrm>
+                <a:off x="4819614" y="2285407"/>
+                <a:ext cx="360462" cy="0"/>
+              </a:xfrm>
+              <a:prstGeom prst="straightConnector1">
+                <a:avLst/>
+              </a:prstGeom>
+              <a:ln w="12700">
+                <a:solidFill>
+                  <a:schemeClr val="bg1">
+                    <a:lumMod val="75000"/>
+                  </a:schemeClr>
+                </a:solidFill>
+                <a:tailEnd type="triangle"/>
+              </a:ln>
+            </p:spPr>
+            <p:style>
+              <a:lnRef idx="1">
+                <a:schemeClr val="accent1"/>
+              </a:lnRef>
+              <a:fillRef idx="0">
+                <a:schemeClr val="accent1"/>
+              </a:fillRef>
+              <a:effectRef idx="0">
+                <a:schemeClr val="accent1"/>
+              </a:effectRef>
+              <a:fontRef idx="minor">
+                <a:schemeClr val="tx1"/>
+              </a:fontRef>
+            </p:style>
+          </p:cxnSp>
+          <p:cxnSp>
+            <p:nvCxnSpPr>
+              <p:cNvPr id="46" name="Straight Arrow Connector 45">
+                <a:extLst>
+                  <a:ext uri="{FF2B5EF4-FFF2-40B4-BE49-F238E27FC236}">
+                    <a16:creationId xmlns:a16="http://schemas.microsoft.com/office/drawing/2014/main" id="{28B9D640-5646-93D7-6DC0-B42BF6A561C8}"/>
+                  </a:ext>
+                </a:extLst>
+              </p:cNvPr>
+              <p:cNvCxnSpPr>
+                <a:stCxn id="50" idx="2"/>
+                <a:endCxn id="49" idx="0"/>
+              </p:cNvCxnSpPr>
+              <p:nvPr/>
+            </p:nvCxnSpPr>
+            <p:spPr>
+              <a:xfrm>
+                <a:off x="6102498" y="2758649"/>
+                <a:ext cx="0" cy="297238"/>
+              </a:xfrm>
+              <a:prstGeom prst="straightConnector1">
+                <a:avLst/>
+              </a:prstGeom>
+              <a:ln w="12700">
+                <a:solidFill>
+                  <a:srgbClr val="FF7C80"/>
+                </a:solidFill>
+                <a:tailEnd type="triangle"/>
+              </a:ln>
+            </p:spPr>
+            <p:style>
+              <a:lnRef idx="1">
+                <a:schemeClr val="accent1"/>
+              </a:lnRef>
+              <a:fillRef idx="0">
+                <a:schemeClr val="accent1"/>
+              </a:fillRef>
+              <a:effectRef idx="0">
+                <a:schemeClr val="accent1"/>
+              </a:effectRef>
+              <a:fontRef idx="minor">
+                <a:schemeClr val="tx1"/>
+              </a:fontRef>
+            </p:style>
+          </p:cxnSp>
+          <p:cxnSp>
+            <p:nvCxnSpPr>
+              <p:cNvPr id="53" name="Straight Arrow Connector 52">
+                <a:extLst>
+                  <a:ext uri="{FF2B5EF4-FFF2-40B4-BE49-F238E27FC236}">
+                    <a16:creationId xmlns:a16="http://schemas.microsoft.com/office/drawing/2014/main" id="{53FB0AB4-E865-2B0A-18F4-45919452F4C9}"/>
+                  </a:ext>
+                </a:extLst>
+              </p:cNvPr>
+              <p:cNvCxnSpPr>
+                <a:stCxn id="49" idx="1"/>
+                <a:endCxn id="41" idx="5"/>
+              </p:cNvCxnSpPr>
+              <p:nvPr/>
+            </p:nvCxnSpPr>
+            <p:spPr>
+              <a:xfrm flipH="1">
+                <a:off x="4635130" y="3529129"/>
+                <a:ext cx="544946" cy="0"/>
+              </a:xfrm>
+              <a:prstGeom prst="straightConnector1">
+                <a:avLst/>
+              </a:prstGeom>
+              <a:ln w="12700">
+                <a:solidFill>
+                  <a:srgbClr val="FF7C80"/>
+                </a:solidFill>
+                <a:tailEnd type="triangle"/>
+              </a:ln>
+            </p:spPr>
+            <p:style>
+              <a:lnRef idx="1">
+                <a:schemeClr val="accent1"/>
+              </a:lnRef>
+              <a:fillRef idx="0">
+                <a:schemeClr val="accent1"/>
+              </a:fillRef>
+              <a:effectRef idx="0">
+                <a:schemeClr val="accent1"/>
+              </a:effectRef>
+              <a:fontRef idx="minor">
+                <a:schemeClr val="tx1"/>
+              </a:fontRef>
+            </p:style>
+          </p:cxnSp>
+          <p:cxnSp>
+            <p:nvCxnSpPr>
+              <p:cNvPr id="55" name="Straight Arrow Connector 54">
+                <a:extLst>
+                  <a:ext uri="{FF2B5EF4-FFF2-40B4-BE49-F238E27FC236}">
+                    <a16:creationId xmlns:a16="http://schemas.microsoft.com/office/drawing/2014/main" id="{6943E5FD-58B2-49E8-8B43-4E210A8A54EF}"/>
+                  </a:ext>
+                </a:extLst>
+              </p:cNvPr>
+              <p:cNvCxnSpPr>
+                <a:stCxn id="49" idx="3"/>
+                <a:endCxn id="51" idx="1"/>
+              </p:cNvCxnSpPr>
+              <p:nvPr/>
+            </p:nvCxnSpPr>
+            <p:spPr>
+              <a:xfrm>
+                <a:off x="7024920" y="3529129"/>
+                <a:ext cx="367515" cy="5172"/>
+              </a:xfrm>
+              <a:prstGeom prst="straightConnector1">
+                <a:avLst/>
+              </a:prstGeom>
+              <a:ln w="12700">
+                <a:solidFill>
+                  <a:srgbClr val="FF7C80"/>
+                </a:solidFill>
+                <a:tailEnd type="triangle"/>
+              </a:ln>
+            </p:spPr>
+            <p:style>
+              <a:lnRef idx="1">
+                <a:schemeClr val="accent1"/>
+              </a:lnRef>
+              <a:fillRef idx="0">
+                <a:schemeClr val="accent1"/>
+              </a:fillRef>
+              <a:effectRef idx="0">
+                <a:schemeClr val="accent1"/>
+              </a:effectRef>
+              <a:fontRef idx="minor">
+                <a:schemeClr val="tx1"/>
+              </a:fontRef>
+            </p:style>
+          </p:cxnSp>
+          <p:cxnSp>
+            <p:nvCxnSpPr>
+              <p:cNvPr id="57" name="Connector: Elbow 56">
+                <a:extLst>
+                  <a:ext uri="{FF2B5EF4-FFF2-40B4-BE49-F238E27FC236}">
+                    <a16:creationId xmlns:a16="http://schemas.microsoft.com/office/drawing/2014/main" id="{74B215B6-6FAA-7578-5651-0CD1D2A587EC}"/>
+                  </a:ext>
+                </a:extLst>
+              </p:cNvPr>
+              <p:cNvCxnSpPr>
+                <a:stCxn id="41" idx="4"/>
+                <a:endCxn id="51" idx="2"/>
+              </p:cNvCxnSpPr>
+              <p:nvPr/>
+            </p:nvCxnSpPr>
+            <p:spPr>
+              <a:xfrm rot="5400000" flipH="1" flipV="1">
+                <a:off x="6084547" y="1543461"/>
+                <a:ext cx="42954" cy="4417665"/>
+              </a:xfrm>
+              <a:prstGeom prst="bentConnector3">
+                <a:avLst>
+                  <a:gd name="adj1" fmla="val -1148436"/>
+                </a:avLst>
+              </a:prstGeom>
+              <a:ln w="12700">
+                <a:solidFill>
+                  <a:srgbClr val="CC99FF"/>
+                </a:solidFill>
+                <a:tailEnd type="triangle"/>
+              </a:ln>
+            </p:spPr>
+            <p:style>
+              <a:lnRef idx="1">
+                <a:schemeClr val="accent1"/>
+              </a:lnRef>
+              <a:fillRef idx="0">
+                <a:schemeClr val="accent1"/>
+              </a:fillRef>
+              <a:effectRef idx="0">
+                <a:schemeClr val="accent1"/>
+              </a:effectRef>
+              <a:fontRef idx="minor">
+                <a:schemeClr val="tx1"/>
+              </a:fontRef>
+            </p:style>
+          </p:cxnSp>
+          <p:cxnSp>
+            <p:nvCxnSpPr>
+              <p:cNvPr id="63" name="Connector: Elbow 62">
+                <a:extLst>
+                  <a:ext uri="{FF2B5EF4-FFF2-40B4-BE49-F238E27FC236}">
+                    <a16:creationId xmlns:a16="http://schemas.microsoft.com/office/drawing/2014/main" id="{A3BA7260-BCA2-DF71-3454-2D5292D0A4FD}"/>
+                  </a:ext>
+                </a:extLst>
+              </p:cNvPr>
+              <p:cNvCxnSpPr>
+                <a:stCxn id="51" idx="0"/>
+                <a:endCxn id="50" idx="3"/>
+              </p:cNvCxnSpPr>
+              <p:nvPr/>
+            </p:nvCxnSpPr>
+            <p:spPr>
+              <a:xfrm rot="16200000" flipV="1">
+                <a:off x="7143700" y="2166627"/>
+                <a:ext cx="1052378" cy="1289937"/>
+              </a:xfrm>
+              <a:prstGeom prst="bentConnector2">
+                <a:avLst/>
+              </a:prstGeom>
+              <a:ln w="12700">
+                <a:solidFill>
+                  <a:schemeClr val="bg1">
+                    <a:lumMod val="75000"/>
+                  </a:schemeClr>
+                </a:solidFill>
+                <a:tailEnd type="triangle"/>
+              </a:ln>
+            </p:spPr>
+            <p:style>
+              <a:lnRef idx="1">
+                <a:schemeClr val="accent1"/>
+              </a:lnRef>
+              <a:fillRef idx="0">
+                <a:schemeClr val="accent1"/>
+              </a:fillRef>
+              <a:effectRef idx="0">
+                <a:schemeClr val="accent1"/>
+              </a:effectRef>
+              <a:fontRef idx="minor">
+                <a:schemeClr val="tx1"/>
+              </a:fontRef>
+            </p:style>
+          </p:cxnSp>
+          <p:cxnSp>
+            <p:nvCxnSpPr>
+              <p:cNvPr id="65" name="Connector: Elbow 64">
+                <a:extLst>
+                  <a:ext uri="{FF2B5EF4-FFF2-40B4-BE49-F238E27FC236}">
+                    <a16:creationId xmlns:a16="http://schemas.microsoft.com/office/drawing/2014/main" id="{C1006027-5B2A-F133-62A1-6952D4288E4C}"/>
+                  </a:ext>
+                </a:extLst>
+              </p:cNvPr>
+              <p:cNvCxnSpPr>
+                <a:stCxn id="50" idx="0"/>
+                <a:endCxn id="33" idx="2"/>
+              </p:cNvCxnSpPr>
+              <p:nvPr/>
+            </p:nvCxnSpPr>
+            <p:spPr>
+              <a:xfrm rot="5400000" flipH="1" flipV="1">
+                <a:off x="6889603" y="564016"/>
+                <a:ext cx="461045" cy="2035255"/>
+              </a:xfrm>
+              <a:prstGeom prst="bentConnector2">
+                <a:avLst/>
+              </a:prstGeom>
+              <a:ln w="12700">
+                <a:solidFill>
+                  <a:srgbClr val="FF7C80"/>
+                </a:solidFill>
+                <a:tailEnd type="triangle"/>
+              </a:ln>
+            </p:spPr>
+            <p:style>
+              <a:lnRef idx="1">
+                <a:schemeClr val="accent1"/>
+              </a:lnRef>
+              <a:fillRef idx="0">
+                <a:schemeClr val="accent1"/>
+              </a:fillRef>
+              <a:effectRef idx="0">
+                <a:schemeClr val="accent1"/>
+              </a:effectRef>
+              <a:fontRef idx="minor">
+                <a:schemeClr val="tx1"/>
+              </a:fontRef>
+            </p:style>
+          </p:cxnSp>
+          <p:sp>
+            <p:nvSpPr>
+              <p:cNvPr id="67" name="TextBox 66">
+                <a:extLst>
+                  <a:ext uri="{FF2B5EF4-FFF2-40B4-BE49-F238E27FC236}">
+                    <a16:creationId xmlns:a16="http://schemas.microsoft.com/office/drawing/2014/main" id="{9FDC32C3-9D42-2D50-1777-288F828A1E1E}"/>
+                  </a:ext>
+                </a:extLst>
+              </p:cNvPr>
+              <p:cNvSpPr txBox="1"/>
+              <p:nvPr/>
+            </p:nvSpPr>
+            <p:spPr>
+              <a:xfrm>
+                <a:off x="5819877" y="1525047"/>
+                <a:ext cx="269626" cy="276999"/>
+              </a:xfrm>
+              <a:prstGeom prst="rect">
+                <a:avLst/>
+              </a:prstGeom>
+              <a:noFill/>
+            </p:spPr>
+            <p:txBody>
+              <a:bodyPr wrap="none" rtlCol="0">
+                <a:spAutoFit/>
+              </a:bodyPr>
+              <a:lstStyle/>
+              <a:p>
+                <a:r>
+                  <a:rPr lang="en-US" sz="1200" dirty="0">
+                    <a:solidFill>
+                      <a:srgbClr val="FF7C80"/>
+                    </a:solidFill>
+                    <a:latin typeface="Open Sans" panose="020B0606030504020204" pitchFamily="34" charset="0"/>
+                    <a:ea typeface="Open Sans" panose="020B0606030504020204" pitchFamily="34" charset="0"/>
+                    <a:cs typeface="Open Sans" panose="020B0606030504020204" pitchFamily="34" charset="0"/>
+                  </a:rPr>
+                  <a:t>F</a:t>
+                </a:r>
+              </a:p>
+            </p:txBody>
+          </p:sp>
+          <p:sp>
+            <p:nvSpPr>
+              <p:cNvPr id="68" name="TextBox 67">
+                <a:extLst>
+                  <a:ext uri="{FF2B5EF4-FFF2-40B4-BE49-F238E27FC236}">
+                    <a16:creationId xmlns:a16="http://schemas.microsoft.com/office/drawing/2014/main" id="{9D6F39C6-AF6A-62BB-BC9B-6C50D17F8886}"/>
+                  </a:ext>
+                </a:extLst>
+              </p:cNvPr>
+              <p:cNvSpPr txBox="1"/>
+              <p:nvPr/>
+            </p:nvSpPr>
+            <p:spPr>
+              <a:xfrm>
+                <a:off x="5819877" y="2758649"/>
+                <a:ext cx="269626" cy="276999"/>
+              </a:xfrm>
+              <a:prstGeom prst="rect">
+                <a:avLst/>
+              </a:prstGeom>
+              <a:noFill/>
+            </p:spPr>
+            <p:txBody>
+              <a:bodyPr wrap="none" rtlCol="0">
+                <a:spAutoFit/>
+              </a:bodyPr>
+              <a:lstStyle/>
+              <a:p>
+                <a:r>
+                  <a:rPr lang="en-US" sz="1200" dirty="0">
+                    <a:solidFill>
+                      <a:srgbClr val="FF7C80"/>
+                    </a:solidFill>
+                    <a:latin typeface="Open Sans" panose="020B0606030504020204" pitchFamily="34" charset="0"/>
+                    <a:ea typeface="Open Sans" panose="020B0606030504020204" pitchFamily="34" charset="0"/>
+                    <a:cs typeface="Open Sans" panose="020B0606030504020204" pitchFamily="34" charset="0"/>
+                  </a:rPr>
+                  <a:t>T</a:t>
+                </a:r>
+              </a:p>
+            </p:txBody>
+          </p:sp>
+          <p:sp>
+            <p:nvSpPr>
+              <p:cNvPr id="71" name="TextBox 70">
+                <a:extLst>
+                  <a:ext uri="{FF2B5EF4-FFF2-40B4-BE49-F238E27FC236}">
+                    <a16:creationId xmlns:a16="http://schemas.microsoft.com/office/drawing/2014/main" id="{F329CAD5-B1F3-A296-6857-A07E069B223F}"/>
+                  </a:ext>
+                </a:extLst>
+              </p:cNvPr>
+              <p:cNvSpPr txBox="1"/>
+              <p:nvPr/>
+            </p:nvSpPr>
+            <p:spPr>
+              <a:xfrm>
+                <a:off x="4913691" y="3263199"/>
+                <a:ext cx="269626" cy="276999"/>
+              </a:xfrm>
+              <a:prstGeom prst="rect">
+                <a:avLst/>
+              </a:prstGeom>
+              <a:noFill/>
+            </p:spPr>
+            <p:txBody>
+              <a:bodyPr wrap="none" rtlCol="0">
+                <a:spAutoFit/>
+              </a:bodyPr>
+              <a:lstStyle/>
+              <a:p>
+                <a:r>
+                  <a:rPr lang="en-US" sz="1200" dirty="0">
+                    <a:solidFill>
+                      <a:srgbClr val="FF7C80"/>
+                    </a:solidFill>
+                    <a:latin typeface="Open Sans" panose="020B0606030504020204" pitchFamily="34" charset="0"/>
+                    <a:ea typeface="Open Sans" panose="020B0606030504020204" pitchFamily="34" charset="0"/>
+                    <a:cs typeface="Open Sans" panose="020B0606030504020204" pitchFamily="34" charset="0"/>
+                  </a:rPr>
+                  <a:t>T</a:t>
+                </a:r>
+              </a:p>
+            </p:txBody>
+          </p:sp>
+        </p:grpSp>
+      </p:grpSp>
+    </p:spTree>
+    <p:extLst>
+      <p:ext uri="{BB962C8B-B14F-4D97-AF65-F5344CB8AC3E}">
+        <p14:creationId xmlns:p14="http://schemas.microsoft.com/office/powerpoint/2010/main" val="2086539487"/>
+      </p:ext>
+    </p:extLst>
+  </p:cSld>
+  <p:clrMapOvr>
+    <a:masterClrMapping/>
+  </p:clrMapOvr>
+</p:sld>
+</file>
+
 <file path=ppt/slides/slide2.xml><?xml version="1.0" encoding="utf-8"?>
 <p:sld xmlns:a="http://schemas.openxmlformats.org/drawingml/2006/main" xmlns:r="http://schemas.openxmlformats.org/officeDocument/2006/relationships" xmlns:p="http://schemas.openxmlformats.org/presentationml/2006/main">
   <p:cSld>

</xml_diff>

<commit_message>
Added Flowchart for Q2 of PrePSPM2122_KMM.md
</commit_message>
<xml_diff>
--- a/Past Year Theory Questions/Resources/resources.pptx
+++ b/Past Year Theory Questions/Resources/resources.pptx
@@ -19,6 +19,7 @@
     <p:sldId id="268" r:id="rId13"/>
     <p:sldId id="269" r:id="rId14"/>
     <p:sldId id="270" r:id="rId15"/>
+    <p:sldId id="271" r:id="rId16"/>
   </p:sldIdLst>
   <p:sldSz cx="12192000" cy="6858000"/>
   <p:notesSz cx="6858000" cy="9144000"/>
@@ -272,7 +273,7 @@
           <a:p>
             <a:fld id="{34BBF2E1-1C0D-4B66-AD27-CA9E57E33A5F}" type="datetimeFigureOut">
               <a:rPr lang="en-US" smtClean="0"/>
-              <a:t>16-May-22</a:t>
+              <a:t>17-May-22</a:t>
             </a:fld>
             <a:endParaRPr lang="en-US"/>
           </a:p>
@@ -470,7 +471,7 @@
           <a:p>
             <a:fld id="{34BBF2E1-1C0D-4B66-AD27-CA9E57E33A5F}" type="datetimeFigureOut">
               <a:rPr lang="en-US" smtClean="0"/>
-              <a:t>16-May-22</a:t>
+              <a:t>17-May-22</a:t>
             </a:fld>
             <a:endParaRPr lang="en-US"/>
           </a:p>
@@ -678,7 +679,7 @@
           <a:p>
             <a:fld id="{34BBF2E1-1C0D-4B66-AD27-CA9E57E33A5F}" type="datetimeFigureOut">
               <a:rPr lang="en-US" smtClean="0"/>
-              <a:t>16-May-22</a:t>
+              <a:t>17-May-22</a:t>
             </a:fld>
             <a:endParaRPr lang="en-US"/>
           </a:p>
@@ -876,7 +877,7 @@
           <a:p>
             <a:fld id="{34BBF2E1-1C0D-4B66-AD27-CA9E57E33A5F}" type="datetimeFigureOut">
               <a:rPr lang="en-US" smtClean="0"/>
-              <a:t>16-May-22</a:t>
+              <a:t>17-May-22</a:t>
             </a:fld>
             <a:endParaRPr lang="en-US"/>
           </a:p>
@@ -1151,7 +1152,7 @@
           <a:p>
             <a:fld id="{34BBF2E1-1C0D-4B66-AD27-CA9E57E33A5F}" type="datetimeFigureOut">
               <a:rPr lang="en-US" smtClean="0"/>
-              <a:t>16-May-22</a:t>
+              <a:t>17-May-22</a:t>
             </a:fld>
             <a:endParaRPr lang="en-US"/>
           </a:p>
@@ -1416,7 +1417,7 @@
           <a:p>
             <a:fld id="{34BBF2E1-1C0D-4B66-AD27-CA9E57E33A5F}" type="datetimeFigureOut">
               <a:rPr lang="en-US" smtClean="0"/>
-              <a:t>16-May-22</a:t>
+              <a:t>17-May-22</a:t>
             </a:fld>
             <a:endParaRPr lang="en-US"/>
           </a:p>
@@ -1828,7 +1829,7 @@
           <a:p>
             <a:fld id="{34BBF2E1-1C0D-4B66-AD27-CA9E57E33A5F}" type="datetimeFigureOut">
               <a:rPr lang="en-US" smtClean="0"/>
-              <a:t>16-May-22</a:t>
+              <a:t>17-May-22</a:t>
             </a:fld>
             <a:endParaRPr lang="en-US"/>
           </a:p>
@@ -1969,7 +1970,7 @@
           <a:p>
             <a:fld id="{34BBF2E1-1C0D-4B66-AD27-CA9E57E33A5F}" type="datetimeFigureOut">
               <a:rPr lang="en-US" smtClean="0"/>
-              <a:t>16-May-22</a:t>
+              <a:t>17-May-22</a:t>
             </a:fld>
             <a:endParaRPr lang="en-US"/>
           </a:p>
@@ -2082,7 +2083,7 @@
           <a:p>
             <a:fld id="{34BBF2E1-1C0D-4B66-AD27-CA9E57E33A5F}" type="datetimeFigureOut">
               <a:rPr lang="en-US" smtClean="0"/>
-              <a:t>16-May-22</a:t>
+              <a:t>17-May-22</a:t>
             </a:fld>
             <a:endParaRPr lang="en-US"/>
           </a:p>
@@ -2393,7 +2394,7 @@
           <a:p>
             <a:fld id="{34BBF2E1-1C0D-4B66-AD27-CA9E57E33A5F}" type="datetimeFigureOut">
               <a:rPr lang="en-US" smtClean="0"/>
-              <a:t>16-May-22</a:t>
+              <a:t>17-May-22</a:t>
             </a:fld>
             <a:endParaRPr lang="en-US"/>
           </a:p>
@@ -2681,7 +2682,7 @@
           <a:p>
             <a:fld id="{34BBF2E1-1C0D-4B66-AD27-CA9E57E33A5F}" type="datetimeFigureOut">
               <a:rPr lang="en-US" smtClean="0"/>
-              <a:t>16-May-22</a:t>
+              <a:t>17-May-22</a:t>
             </a:fld>
             <a:endParaRPr lang="en-US"/>
           </a:p>
@@ -2922,7 +2923,7 @@
           <a:p>
             <a:fld id="{34BBF2E1-1C0D-4B66-AD27-CA9E57E33A5F}" type="datetimeFigureOut">
               <a:rPr lang="en-US" smtClean="0"/>
-              <a:t>16-May-22</a:t>
+              <a:t>17-May-22</a:t>
             </a:fld>
             <a:endParaRPr lang="en-US"/>
           </a:p>
@@ -11102,6 +11103,1264 @@
 </p:sld>
 </file>
 
+<file path=ppt/slides/slide15.xml><?xml version="1.0" encoding="utf-8"?>
+<p:sld xmlns:a="http://schemas.openxmlformats.org/drawingml/2006/main" xmlns:r="http://schemas.openxmlformats.org/officeDocument/2006/relationships" xmlns:p="http://schemas.openxmlformats.org/presentationml/2006/main">
+  <p:cSld>
+    <p:spTree>
+      <p:nvGrpSpPr>
+        <p:cNvPr id="1" name=""/>
+        <p:cNvGrpSpPr/>
+        <p:nvPr/>
+      </p:nvGrpSpPr>
+      <p:grpSpPr>
+        <a:xfrm>
+          <a:off x="0" y="0"/>
+          <a:ext cx="0" cy="0"/>
+          <a:chOff x="0" y="0"/>
+          <a:chExt cx="0" cy="0"/>
+        </a:xfrm>
+      </p:grpSpPr>
+      <p:grpSp>
+        <p:nvGrpSpPr>
+          <p:cNvPr id="52" name="Group 51">
+            <a:extLst>
+              <a:ext uri="{FF2B5EF4-FFF2-40B4-BE49-F238E27FC236}">
+                <a16:creationId xmlns:a16="http://schemas.microsoft.com/office/drawing/2014/main" id="{24F82963-0F4E-E7D7-F19E-232A4D0AA00A}"/>
+              </a:ext>
+            </a:extLst>
+          </p:cNvPr>
+          <p:cNvGrpSpPr/>
+          <p:nvPr/>
+        </p:nvGrpSpPr>
+        <p:grpSpPr>
+          <a:xfrm>
+            <a:off x="2432029" y="1315453"/>
+            <a:ext cx="7327942" cy="4227094"/>
+            <a:chOff x="3901532" y="1315453"/>
+            <a:chExt cx="7327942" cy="4227094"/>
+          </a:xfrm>
+        </p:grpSpPr>
+        <p:sp>
+          <p:nvSpPr>
+            <p:cNvPr id="108" name="Rectangle 107">
+              <a:extLst>
+                <a:ext uri="{FF2B5EF4-FFF2-40B4-BE49-F238E27FC236}">
+                  <a16:creationId xmlns:a16="http://schemas.microsoft.com/office/drawing/2014/main" id="{F5A5FD62-A99C-04B6-706B-DEE9B81AF541}"/>
+                </a:ext>
+              </a:extLst>
+            </p:cNvPr>
+            <p:cNvSpPr/>
+            <p:nvPr/>
+          </p:nvSpPr>
+          <p:spPr>
+            <a:xfrm>
+              <a:off x="3901532" y="1315453"/>
+              <a:ext cx="7327942" cy="4227094"/>
+            </a:xfrm>
+            <a:prstGeom prst="rect">
+              <a:avLst/>
+            </a:prstGeom>
+            <a:solidFill>
+              <a:srgbClr val="0F1017"/>
+            </a:solidFill>
+            <a:ln w="12700">
+              <a:solidFill>
+                <a:schemeClr val="bg1">
+                  <a:lumMod val="75000"/>
+                </a:schemeClr>
+              </a:solidFill>
+            </a:ln>
+          </p:spPr>
+          <p:style>
+            <a:lnRef idx="2">
+              <a:schemeClr val="accent1">
+                <a:shade val="50000"/>
+              </a:schemeClr>
+            </a:lnRef>
+            <a:fillRef idx="1">
+              <a:schemeClr val="accent1"/>
+            </a:fillRef>
+            <a:effectRef idx="0">
+              <a:schemeClr val="accent1"/>
+            </a:effectRef>
+            <a:fontRef idx="minor">
+              <a:schemeClr val="lt1"/>
+            </a:fontRef>
+          </p:style>
+          <p:txBody>
+            <a:bodyPr rtlCol="0" anchor="ctr"/>
+            <a:lstStyle/>
+            <a:p>
+              <a:pPr algn="ctr"/>
+              <a:endParaRPr lang="en-US" sz="1800" dirty="0">
+                <a:solidFill>
+                  <a:schemeClr val="bg1">
+                    <a:lumMod val="85000"/>
+                  </a:schemeClr>
+                </a:solidFill>
+                <a:latin typeface="Open Sans" panose="020B0606030504020204" pitchFamily="34" charset="0"/>
+                <a:ea typeface="Open Sans" panose="020B0606030504020204" pitchFamily="34" charset="0"/>
+                <a:cs typeface="Open Sans" panose="020B0606030504020204" pitchFamily="34" charset="0"/>
+              </a:endParaRPr>
+            </a:p>
+          </p:txBody>
+        </p:sp>
+        <p:grpSp>
+          <p:nvGrpSpPr>
+            <p:cNvPr id="51" name="Group 50">
+              <a:extLst>
+                <a:ext uri="{FF2B5EF4-FFF2-40B4-BE49-F238E27FC236}">
+                  <a16:creationId xmlns:a16="http://schemas.microsoft.com/office/drawing/2014/main" id="{2067AF7C-98A9-B048-8B4C-60B6F61EBD13}"/>
+                </a:ext>
+              </a:extLst>
+            </p:cNvPr>
+            <p:cNvGrpSpPr/>
+            <p:nvPr/>
+          </p:nvGrpSpPr>
+          <p:grpSpPr>
+            <a:xfrm>
+              <a:off x="4426639" y="1739895"/>
+              <a:ext cx="6277726" cy="3378210"/>
+              <a:chOff x="3427319" y="1383374"/>
+              <a:chExt cx="6277726" cy="3378210"/>
+            </a:xfrm>
+          </p:grpSpPr>
+          <p:sp>
+            <p:nvSpPr>
+              <p:cNvPr id="59" name="Flowchart: Terminator 58">
+                <a:extLst>
+                  <a:ext uri="{FF2B5EF4-FFF2-40B4-BE49-F238E27FC236}">
+                    <a16:creationId xmlns:a16="http://schemas.microsoft.com/office/drawing/2014/main" id="{D7554AAC-5F81-46CA-BA4E-6CDF6B8CC5AD}"/>
+                  </a:ext>
+                </a:extLst>
+              </p:cNvPr>
+              <p:cNvSpPr/>
+              <p:nvPr/>
+            </p:nvSpPr>
+            <p:spPr>
+              <a:xfrm>
+                <a:off x="3829000" y="1383374"/>
+                <a:ext cx="1050758" cy="341690"/>
+              </a:xfrm>
+              <a:prstGeom prst="flowChartTerminator">
+                <a:avLst/>
+              </a:prstGeom>
+              <a:noFill/>
+              <a:ln>
+                <a:solidFill>
+                  <a:schemeClr val="bg1">
+                    <a:lumMod val="75000"/>
+                  </a:schemeClr>
+                </a:solidFill>
+              </a:ln>
+            </p:spPr>
+            <p:style>
+              <a:lnRef idx="2">
+                <a:schemeClr val="accent1">
+                  <a:shade val="50000"/>
+                </a:schemeClr>
+              </a:lnRef>
+              <a:fillRef idx="1">
+                <a:schemeClr val="accent1"/>
+              </a:fillRef>
+              <a:effectRef idx="0">
+                <a:schemeClr val="accent1"/>
+              </a:effectRef>
+              <a:fontRef idx="minor">
+                <a:schemeClr val="lt1"/>
+              </a:fontRef>
+            </p:style>
+            <p:txBody>
+              <a:bodyPr rtlCol="0" anchor="ctr"/>
+              <a:lstStyle/>
+              <a:p>
+                <a:pPr algn="ctr"/>
+                <a:r>
+                  <a:rPr lang="en-US" sz="1200" dirty="0">
+                    <a:solidFill>
+                      <a:schemeClr val="bg1">
+                        <a:lumMod val="85000"/>
+                      </a:schemeClr>
+                    </a:solidFill>
+                    <a:latin typeface="Open Sans" panose="020B0606030504020204" pitchFamily="34" charset="0"/>
+                    <a:ea typeface="Open Sans" panose="020B0606030504020204" pitchFamily="34" charset="0"/>
+                    <a:cs typeface="Open Sans" panose="020B0606030504020204" pitchFamily="34" charset="0"/>
+                  </a:rPr>
+                  <a:t>Start</a:t>
+                </a:r>
+              </a:p>
+            </p:txBody>
+          </p:sp>
+          <p:sp>
+            <p:nvSpPr>
+              <p:cNvPr id="60" name="Flowchart: Terminator 59">
+                <a:extLst>
+                  <a:ext uri="{FF2B5EF4-FFF2-40B4-BE49-F238E27FC236}">
+                    <a16:creationId xmlns:a16="http://schemas.microsoft.com/office/drawing/2014/main" id="{103191FC-37A5-724C-C214-882B4B9F6C89}"/>
+                  </a:ext>
+                </a:extLst>
+              </p:cNvPr>
+              <p:cNvSpPr/>
+              <p:nvPr/>
+            </p:nvSpPr>
+            <p:spPr>
+              <a:xfrm>
+                <a:off x="8257244" y="1383374"/>
+                <a:ext cx="1050758" cy="341690"/>
+              </a:xfrm>
+              <a:prstGeom prst="flowChartTerminator">
+                <a:avLst/>
+              </a:prstGeom>
+              <a:noFill/>
+              <a:ln>
+                <a:solidFill>
+                  <a:schemeClr val="bg1">
+                    <a:lumMod val="75000"/>
+                  </a:schemeClr>
+                </a:solidFill>
+              </a:ln>
+            </p:spPr>
+            <p:style>
+              <a:lnRef idx="2">
+                <a:schemeClr val="accent1">
+                  <a:shade val="50000"/>
+                </a:schemeClr>
+              </a:lnRef>
+              <a:fillRef idx="1">
+                <a:schemeClr val="accent1"/>
+              </a:fillRef>
+              <a:effectRef idx="0">
+                <a:schemeClr val="accent1"/>
+              </a:effectRef>
+              <a:fontRef idx="minor">
+                <a:schemeClr val="lt1"/>
+              </a:fontRef>
+            </p:style>
+            <p:txBody>
+              <a:bodyPr rtlCol="0" anchor="ctr"/>
+              <a:lstStyle/>
+              <a:p>
+                <a:pPr algn="ctr"/>
+                <a:r>
+                  <a:rPr lang="en-US" sz="1200" dirty="0">
+                    <a:solidFill>
+                      <a:schemeClr val="bg1">
+                        <a:lumMod val="85000"/>
+                      </a:schemeClr>
+                    </a:solidFill>
+                    <a:latin typeface="Open Sans" panose="020B0606030504020204" pitchFamily="34" charset="0"/>
+                    <a:ea typeface="Open Sans" panose="020B0606030504020204" pitchFamily="34" charset="0"/>
+                    <a:cs typeface="Open Sans" panose="020B0606030504020204" pitchFamily="34" charset="0"/>
+                  </a:rPr>
+                  <a:t>Stop</a:t>
+                </a:r>
+              </a:p>
+            </p:txBody>
+          </p:sp>
+          <p:cxnSp>
+            <p:nvCxnSpPr>
+              <p:cNvPr id="61" name="Straight Arrow Connector 60">
+                <a:extLst>
+                  <a:ext uri="{FF2B5EF4-FFF2-40B4-BE49-F238E27FC236}">
+                    <a16:creationId xmlns:a16="http://schemas.microsoft.com/office/drawing/2014/main" id="{A1BBCFB3-141A-F3B8-67BE-C05995E64053}"/>
+                  </a:ext>
+                </a:extLst>
+              </p:cNvPr>
+              <p:cNvCxnSpPr>
+                <a:cxnSpLocks/>
+                <a:stCxn id="59" idx="2"/>
+                <a:endCxn id="32" idx="0"/>
+              </p:cNvCxnSpPr>
+              <p:nvPr/>
+            </p:nvCxnSpPr>
+            <p:spPr>
+              <a:xfrm flipH="1">
+                <a:off x="4349741" y="1725064"/>
+                <a:ext cx="4638" cy="346713"/>
+              </a:xfrm>
+              <a:prstGeom prst="straightConnector1">
+                <a:avLst/>
+              </a:prstGeom>
+              <a:ln w="12700">
+                <a:solidFill>
+                  <a:schemeClr val="bg1">
+                    <a:lumMod val="75000"/>
+                  </a:schemeClr>
+                </a:solidFill>
+                <a:tailEnd type="triangle"/>
+              </a:ln>
+            </p:spPr>
+            <p:style>
+              <a:lnRef idx="1">
+                <a:schemeClr val="accent1"/>
+              </a:lnRef>
+              <a:fillRef idx="0">
+                <a:schemeClr val="accent1"/>
+              </a:fillRef>
+              <a:effectRef idx="0">
+                <a:schemeClr val="accent1"/>
+              </a:effectRef>
+              <a:fontRef idx="minor">
+                <a:schemeClr val="tx1"/>
+              </a:fontRef>
+            </p:style>
+          </p:cxnSp>
+          <p:sp>
+            <p:nvSpPr>
+              <p:cNvPr id="75" name="Flowchart: Data 74">
+                <a:extLst>
+                  <a:ext uri="{FF2B5EF4-FFF2-40B4-BE49-F238E27FC236}">
+                    <a16:creationId xmlns:a16="http://schemas.microsoft.com/office/drawing/2014/main" id="{684F63EE-4E36-A045-0D95-769D7FC961BB}"/>
+                  </a:ext>
+                </a:extLst>
+              </p:cNvPr>
+              <p:cNvSpPr/>
+              <p:nvPr/>
+            </p:nvSpPr>
+            <p:spPr>
+              <a:xfrm>
+                <a:off x="7860201" y="2021844"/>
+                <a:ext cx="1844844" cy="489284"/>
+              </a:xfrm>
+              <a:prstGeom prst="flowChartInputOutput">
+                <a:avLst/>
+              </a:prstGeom>
+              <a:noFill/>
+              <a:ln>
+                <a:solidFill>
+                  <a:srgbClr val="CC99FF"/>
+                </a:solidFill>
+              </a:ln>
+            </p:spPr>
+            <p:style>
+              <a:lnRef idx="2">
+                <a:schemeClr val="accent1">
+                  <a:shade val="50000"/>
+                </a:schemeClr>
+              </a:lnRef>
+              <a:fillRef idx="1">
+                <a:schemeClr val="accent1"/>
+              </a:fillRef>
+              <a:effectRef idx="0">
+                <a:schemeClr val="accent1"/>
+              </a:effectRef>
+              <a:fontRef idx="minor">
+                <a:schemeClr val="lt1"/>
+              </a:fontRef>
+            </p:style>
+            <p:txBody>
+              <a:bodyPr rtlCol="0" anchor="ctr"/>
+              <a:lstStyle/>
+              <a:p>
+                <a:pPr algn="ctr"/>
+                <a:r>
+                  <a:rPr lang="en-US" sz="1200" dirty="0">
+                    <a:solidFill>
+                      <a:schemeClr val="bg1">
+                        <a:lumMod val="85000"/>
+                      </a:schemeClr>
+                    </a:solidFill>
+                    <a:latin typeface="Open Sans" panose="020B0606030504020204" pitchFamily="34" charset="0"/>
+                    <a:ea typeface="Open Sans" panose="020B0606030504020204" pitchFamily="34" charset="0"/>
+                    <a:cs typeface="Open Sans" panose="020B0606030504020204" pitchFamily="34" charset="0"/>
+                  </a:rPr>
+                  <a:t>Print avg</a:t>
+                </a:r>
+              </a:p>
+            </p:txBody>
+          </p:sp>
+          <p:cxnSp>
+            <p:nvCxnSpPr>
+              <p:cNvPr id="18" name="Straight Arrow Connector 17">
+                <a:extLst>
+                  <a:ext uri="{FF2B5EF4-FFF2-40B4-BE49-F238E27FC236}">
+                    <a16:creationId xmlns:a16="http://schemas.microsoft.com/office/drawing/2014/main" id="{28D76C1F-C45D-8EEF-E187-E9E48161CAB0}"/>
+                  </a:ext>
+                </a:extLst>
+              </p:cNvPr>
+              <p:cNvCxnSpPr>
+                <a:cxnSpLocks/>
+                <a:stCxn id="75" idx="1"/>
+                <a:endCxn id="60" idx="2"/>
+              </p:cNvCxnSpPr>
+              <p:nvPr/>
+            </p:nvCxnSpPr>
+            <p:spPr>
+              <a:xfrm flipV="1">
+                <a:off x="8782623" y="1725064"/>
+                <a:ext cx="0" cy="296780"/>
+              </a:xfrm>
+              <a:prstGeom prst="straightConnector1">
+                <a:avLst/>
+              </a:prstGeom>
+              <a:ln w="12700">
+                <a:solidFill>
+                  <a:srgbClr val="CC99FF"/>
+                </a:solidFill>
+                <a:tailEnd type="triangle"/>
+              </a:ln>
+            </p:spPr>
+            <p:style>
+              <a:lnRef idx="1">
+                <a:schemeClr val="accent1"/>
+              </a:lnRef>
+              <a:fillRef idx="0">
+                <a:schemeClr val="accent1"/>
+              </a:fillRef>
+              <a:effectRef idx="0">
+                <a:schemeClr val="accent1"/>
+              </a:effectRef>
+              <a:fontRef idx="minor">
+                <a:schemeClr val="tx1"/>
+              </a:fontRef>
+            </p:style>
+          </p:cxnSp>
+          <p:sp>
+            <p:nvSpPr>
+              <p:cNvPr id="20" name="Flowchart: Decision 19">
+                <a:extLst>
+                  <a:ext uri="{FF2B5EF4-FFF2-40B4-BE49-F238E27FC236}">
+                    <a16:creationId xmlns:a16="http://schemas.microsoft.com/office/drawing/2014/main" id="{30BAFB15-77D0-E596-8420-DCFF2E8C83B2}"/>
+                  </a:ext>
+                </a:extLst>
+              </p:cNvPr>
+              <p:cNvSpPr/>
+              <p:nvPr/>
+            </p:nvSpPr>
+            <p:spPr>
+              <a:xfrm>
+                <a:off x="3427319" y="3545988"/>
+                <a:ext cx="1844844" cy="946484"/>
+              </a:xfrm>
+              <a:prstGeom prst="flowChartDecision">
+                <a:avLst/>
+              </a:prstGeom>
+              <a:noFill/>
+              <a:ln>
+                <a:solidFill>
+                  <a:srgbClr val="FF7C80"/>
+                </a:solidFill>
+              </a:ln>
+            </p:spPr>
+            <p:style>
+              <a:lnRef idx="2">
+                <a:schemeClr val="accent1">
+                  <a:shade val="50000"/>
+                </a:schemeClr>
+              </a:lnRef>
+              <a:fillRef idx="1">
+                <a:schemeClr val="accent1"/>
+              </a:fillRef>
+              <a:effectRef idx="0">
+                <a:schemeClr val="accent1"/>
+              </a:effectRef>
+              <a:fontRef idx="minor">
+                <a:schemeClr val="lt1"/>
+              </a:fontRef>
+            </p:style>
+            <p:txBody>
+              <a:bodyPr rtlCol="0" anchor="ctr"/>
+              <a:lstStyle/>
+              <a:p>
+                <a:pPr algn="ctr"/>
+                <a:r>
+                  <a:rPr lang="en-US" sz="1200" dirty="0">
+                    <a:solidFill>
+                      <a:schemeClr val="bg1">
+                        <a:lumMod val="85000"/>
+                      </a:schemeClr>
+                    </a:solidFill>
+                    <a:latin typeface="Open Sans" panose="020B0606030504020204" pitchFamily="34" charset="0"/>
+                    <a:ea typeface="Open Sans" panose="020B0606030504020204" pitchFamily="34" charset="0"/>
+                    <a:cs typeface="Open Sans" panose="020B0606030504020204" pitchFamily="34" charset="0"/>
+                  </a:rPr>
+                  <a:t>length </a:t>
+                </a:r>
+              </a:p>
+              <a:p>
+                <a:pPr algn="ctr"/>
+                <a:r>
+                  <a:rPr lang="en-US" sz="1200" dirty="0">
+                    <a:solidFill>
+                      <a:schemeClr val="bg1">
+                        <a:lumMod val="85000"/>
+                      </a:schemeClr>
+                    </a:solidFill>
+                    <a:latin typeface="Open Sans" panose="020B0606030504020204" pitchFamily="34" charset="0"/>
+                    <a:ea typeface="Open Sans" panose="020B0606030504020204" pitchFamily="34" charset="0"/>
+                    <a:cs typeface="Open Sans" panose="020B0606030504020204" pitchFamily="34" charset="0"/>
+                  </a:rPr>
+                  <a:t>!= 0</a:t>
+                </a:r>
+              </a:p>
+            </p:txBody>
+          </p:sp>
+          <p:sp>
+            <p:nvSpPr>
+              <p:cNvPr id="45" name="Rectangle 44">
+                <a:extLst>
+                  <a:ext uri="{FF2B5EF4-FFF2-40B4-BE49-F238E27FC236}">
+                    <a16:creationId xmlns:a16="http://schemas.microsoft.com/office/drawing/2014/main" id="{E55B8FAD-359E-053A-9AE9-04CBA7A87417}"/>
+                  </a:ext>
+                </a:extLst>
+              </p:cNvPr>
+              <p:cNvSpPr/>
+              <p:nvPr/>
+            </p:nvSpPr>
+            <p:spPr>
+              <a:xfrm>
+                <a:off x="7860201" y="3822714"/>
+                <a:ext cx="1844844" cy="393032"/>
+              </a:xfrm>
+              <a:prstGeom prst="rect">
+                <a:avLst/>
+              </a:prstGeom>
+              <a:noFill/>
+              <a:ln>
+                <a:solidFill>
+                  <a:schemeClr val="accent6">
+                    <a:lumMod val="60000"/>
+                    <a:lumOff val="40000"/>
+                  </a:schemeClr>
+                </a:solidFill>
+              </a:ln>
+            </p:spPr>
+            <p:style>
+              <a:lnRef idx="2">
+                <a:schemeClr val="accent1">
+                  <a:shade val="50000"/>
+                </a:schemeClr>
+              </a:lnRef>
+              <a:fillRef idx="1">
+                <a:schemeClr val="accent1"/>
+              </a:fillRef>
+              <a:effectRef idx="0">
+                <a:schemeClr val="accent1"/>
+              </a:effectRef>
+              <a:fontRef idx="minor">
+                <a:schemeClr val="lt1"/>
+              </a:fontRef>
+            </p:style>
+            <p:txBody>
+              <a:bodyPr rtlCol="0" anchor="ctr"/>
+              <a:lstStyle/>
+              <a:p>
+                <a:pPr algn="ctr"/>
+                <a:r>
+                  <a:rPr lang="en-US" sz="1200" dirty="0">
+                    <a:solidFill>
+                      <a:schemeClr val="bg1">
+                        <a:lumMod val="85000"/>
+                      </a:schemeClr>
+                    </a:solidFill>
+                    <a:latin typeface="Open Sans" panose="020B0606030504020204" pitchFamily="34" charset="0"/>
+                    <a:ea typeface="Open Sans" panose="020B0606030504020204" pitchFamily="34" charset="0"/>
+                    <a:cs typeface="Open Sans" panose="020B0606030504020204" pitchFamily="34" charset="0"/>
+                  </a:rPr>
+                  <a:t>avg = sum / length</a:t>
+                </a:r>
+              </a:p>
+            </p:txBody>
+          </p:sp>
+          <p:sp>
+            <p:nvSpPr>
+              <p:cNvPr id="55" name="Rectangle 54">
+                <a:extLst>
+                  <a:ext uri="{FF2B5EF4-FFF2-40B4-BE49-F238E27FC236}">
+                    <a16:creationId xmlns:a16="http://schemas.microsoft.com/office/drawing/2014/main" id="{7BAA7A72-F91A-2270-293F-899656069CBC}"/>
+                  </a:ext>
+                </a:extLst>
+              </p:cNvPr>
+              <p:cNvSpPr/>
+              <p:nvPr/>
+            </p:nvSpPr>
+            <p:spPr>
+              <a:xfrm>
+                <a:off x="5643760" y="3822714"/>
+                <a:ext cx="1844844" cy="393032"/>
+              </a:xfrm>
+              <a:prstGeom prst="rect">
+                <a:avLst/>
+              </a:prstGeom>
+              <a:noFill/>
+              <a:ln>
+                <a:solidFill>
+                  <a:schemeClr val="accent6">
+                    <a:lumMod val="60000"/>
+                    <a:lumOff val="40000"/>
+                  </a:schemeClr>
+                </a:solidFill>
+              </a:ln>
+            </p:spPr>
+            <p:style>
+              <a:lnRef idx="2">
+                <a:schemeClr val="accent1">
+                  <a:shade val="50000"/>
+                </a:schemeClr>
+              </a:lnRef>
+              <a:fillRef idx="1">
+                <a:schemeClr val="accent1"/>
+              </a:fillRef>
+              <a:effectRef idx="0">
+                <a:schemeClr val="accent1"/>
+              </a:effectRef>
+              <a:fontRef idx="minor">
+                <a:schemeClr val="lt1"/>
+              </a:fontRef>
+            </p:style>
+            <p:txBody>
+              <a:bodyPr rtlCol="0" anchor="ctr"/>
+              <a:lstStyle/>
+              <a:p>
+                <a:pPr algn="ctr"/>
+                <a:r>
+                  <a:rPr lang="en-US" sz="1200" dirty="0">
+                    <a:solidFill>
+                      <a:schemeClr val="bg1">
+                        <a:lumMod val="85000"/>
+                      </a:schemeClr>
+                    </a:solidFill>
+                    <a:latin typeface="Open Sans" panose="020B0606030504020204" pitchFamily="34" charset="0"/>
+                    <a:ea typeface="Open Sans" panose="020B0606030504020204" pitchFamily="34" charset="0"/>
+                    <a:cs typeface="Open Sans" panose="020B0606030504020204" pitchFamily="34" charset="0"/>
+                  </a:rPr>
+                  <a:t>sum = sum + length</a:t>
+                </a:r>
+              </a:p>
+            </p:txBody>
+          </p:sp>
+          <p:cxnSp>
+            <p:nvCxnSpPr>
+              <p:cNvPr id="40" name="Straight Arrow Connector 39">
+                <a:extLst>
+                  <a:ext uri="{FF2B5EF4-FFF2-40B4-BE49-F238E27FC236}">
+                    <a16:creationId xmlns:a16="http://schemas.microsoft.com/office/drawing/2014/main" id="{730E9198-70EC-A277-6FA3-D8C3C4080431}"/>
+                  </a:ext>
+                </a:extLst>
+              </p:cNvPr>
+              <p:cNvCxnSpPr>
+                <a:cxnSpLocks/>
+                <a:stCxn id="20" idx="3"/>
+                <a:endCxn id="55" idx="1"/>
+              </p:cNvCxnSpPr>
+              <p:nvPr/>
+            </p:nvCxnSpPr>
+            <p:spPr>
+              <a:xfrm>
+                <a:off x="5272163" y="4019230"/>
+                <a:ext cx="371597" cy="0"/>
+              </a:xfrm>
+              <a:prstGeom prst="straightConnector1">
+                <a:avLst/>
+              </a:prstGeom>
+              <a:ln w="12700">
+                <a:solidFill>
+                  <a:srgbClr val="FF7C80"/>
+                </a:solidFill>
+                <a:tailEnd type="triangle"/>
+              </a:ln>
+            </p:spPr>
+            <p:style>
+              <a:lnRef idx="1">
+                <a:schemeClr val="accent1"/>
+              </a:lnRef>
+              <a:fillRef idx="0">
+                <a:schemeClr val="accent1"/>
+              </a:fillRef>
+              <a:effectRef idx="0">
+                <a:schemeClr val="accent1"/>
+              </a:effectRef>
+              <a:fontRef idx="minor">
+                <a:schemeClr val="tx1"/>
+              </a:fontRef>
+            </p:style>
+          </p:cxnSp>
+          <p:sp>
+            <p:nvSpPr>
+              <p:cNvPr id="74" name="TextBox 73">
+                <a:extLst>
+                  <a:ext uri="{FF2B5EF4-FFF2-40B4-BE49-F238E27FC236}">
+                    <a16:creationId xmlns:a16="http://schemas.microsoft.com/office/drawing/2014/main" id="{D1EF71AA-0AAE-0DD8-6FC5-3FB7CD854737}"/>
+                  </a:ext>
+                </a:extLst>
+              </p:cNvPr>
+              <p:cNvSpPr txBox="1"/>
+              <p:nvPr/>
+            </p:nvSpPr>
+            <p:spPr>
+              <a:xfrm>
+                <a:off x="4080115" y="4484585"/>
+                <a:ext cx="269626" cy="276999"/>
+              </a:xfrm>
+              <a:prstGeom prst="rect">
+                <a:avLst/>
+              </a:prstGeom>
+              <a:noFill/>
+            </p:spPr>
+            <p:txBody>
+              <a:bodyPr wrap="none" rtlCol="0">
+                <a:spAutoFit/>
+              </a:bodyPr>
+              <a:lstStyle/>
+              <a:p>
+                <a:r>
+                  <a:rPr lang="en-US" sz="1200" dirty="0">
+                    <a:solidFill>
+                      <a:srgbClr val="FF7C80"/>
+                    </a:solidFill>
+                    <a:latin typeface="Open Sans" panose="020B0606030504020204" pitchFamily="34" charset="0"/>
+                    <a:ea typeface="Open Sans" panose="020B0606030504020204" pitchFamily="34" charset="0"/>
+                    <a:cs typeface="Open Sans" panose="020B0606030504020204" pitchFamily="34" charset="0"/>
+                  </a:rPr>
+                  <a:t>F</a:t>
+                </a:r>
+              </a:p>
+            </p:txBody>
+          </p:sp>
+          <p:sp>
+            <p:nvSpPr>
+              <p:cNvPr id="76" name="TextBox 75">
+                <a:extLst>
+                  <a:ext uri="{FF2B5EF4-FFF2-40B4-BE49-F238E27FC236}">
+                    <a16:creationId xmlns:a16="http://schemas.microsoft.com/office/drawing/2014/main" id="{F6624D32-307F-BEE8-5DCC-79846F034670}"/>
+                  </a:ext>
+                </a:extLst>
+              </p:cNvPr>
+              <p:cNvSpPr txBox="1"/>
+              <p:nvPr/>
+            </p:nvSpPr>
+            <p:spPr>
+              <a:xfrm>
+                <a:off x="5272163" y="3742231"/>
+                <a:ext cx="269626" cy="276999"/>
+              </a:xfrm>
+              <a:prstGeom prst="rect">
+                <a:avLst/>
+              </a:prstGeom>
+              <a:noFill/>
+            </p:spPr>
+            <p:txBody>
+              <a:bodyPr wrap="none" rtlCol="0">
+                <a:spAutoFit/>
+              </a:bodyPr>
+              <a:lstStyle/>
+              <a:p>
+                <a:r>
+                  <a:rPr lang="en-US" sz="1200" dirty="0">
+                    <a:solidFill>
+                      <a:srgbClr val="FF7C80"/>
+                    </a:solidFill>
+                    <a:latin typeface="Open Sans" panose="020B0606030504020204" pitchFamily="34" charset="0"/>
+                    <a:ea typeface="Open Sans" panose="020B0606030504020204" pitchFamily="34" charset="0"/>
+                    <a:cs typeface="Open Sans" panose="020B0606030504020204" pitchFamily="34" charset="0"/>
+                  </a:rPr>
+                  <a:t>T</a:t>
+                </a:r>
+              </a:p>
+            </p:txBody>
+          </p:sp>
+          <p:sp>
+            <p:nvSpPr>
+              <p:cNvPr id="58" name="Flowchart: Data 57">
+                <a:extLst>
+                  <a:ext uri="{FF2B5EF4-FFF2-40B4-BE49-F238E27FC236}">
+                    <a16:creationId xmlns:a16="http://schemas.microsoft.com/office/drawing/2014/main" id="{22C75C27-346E-E517-0FA7-D1C9E1ED48A9}"/>
+                  </a:ext>
+                </a:extLst>
+              </p:cNvPr>
+              <p:cNvSpPr/>
+              <p:nvPr/>
+            </p:nvSpPr>
+            <p:spPr>
+              <a:xfrm>
+                <a:off x="3427321" y="2787592"/>
+                <a:ext cx="1844844" cy="489284"/>
+              </a:xfrm>
+              <a:prstGeom prst="flowChartInputOutput">
+                <a:avLst/>
+              </a:prstGeom>
+              <a:noFill/>
+              <a:ln>
+                <a:solidFill>
+                  <a:schemeClr val="accent1">
+                    <a:lumMod val="60000"/>
+                    <a:lumOff val="40000"/>
+                  </a:schemeClr>
+                </a:solidFill>
+              </a:ln>
+            </p:spPr>
+            <p:style>
+              <a:lnRef idx="2">
+                <a:schemeClr val="accent1">
+                  <a:shade val="50000"/>
+                </a:schemeClr>
+              </a:lnRef>
+              <a:fillRef idx="1">
+                <a:schemeClr val="accent1"/>
+              </a:fillRef>
+              <a:effectRef idx="0">
+                <a:schemeClr val="accent1"/>
+              </a:effectRef>
+              <a:fontRef idx="minor">
+                <a:schemeClr val="lt1"/>
+              </a:fontRef>
+            </p:style>
+            <p:txBody>
+              <a:bodyPr rtlCol="0" anchor="ctr"/>
+              <a:lstStyle/>
+              <a:p>
+                <a:pPr algn="ctr"/>
+                <a:r>
+                  <a:rPr lang="en-US" sz="1200" dirty="0">
+                    <a:solidFill>
+                      <a:schemeClr val="bg1">
+                        <a:lumMod val="85000"/>
+                      </a:schemeClr>
+                    </a:solidFill>
+                    <a:latin typeface="Open Sans" panose="020B0606030504020204" pitchFamily="34" charset="0"/>
+                    <a:ea typeface="Open Sans" panose="020B0606030504020204" pitchFamily="34" charset="0"/>
+                    <a:cs typeface="Open Sans" panose="020B0606030504020204" pitchFamily="34" charset="0"/>
+                  </a:rPr>
+                  <a:t>Read length</a:t>
+                </a:r>
+              </a:p>
+            </p:txBody>
+          </p:sp>
+          <p:cxnSp>
+            <p:nvCxnSpPr>
+              <p:cNvPr id="17" name="Straight Arrow Connector 16">
+                <a:extLst>
+                  <a:ext uri="{FF2B5EF4-FFF2-40B4-BE49-F238E27FC236}">
+                    <a16:creationId xmlns:a16="http://schemas.microsoft.com/office/drawing/2014/main" id="{E632D335-992B-6952-A11D-ED57E9A1BCFF}"/>
+                  </a:ext>
+                </a:extLst>
+              </p:cNvPr>
+              <p:cNvCxnSpPr>
+                <a:stCxn id="58" idx="4"/>
+                <a:endCxn id="20" idx="0"/>
+              </p:cNvCxnSpPr>
+              <p:nvPr/>
+            </p:nvCxnSpPr>
+            <p:spPr>
+              <a:xfrm flipH="1">
+                <a:off x="4349741" y="3276876"/>
+                <a:ext cx="2" cy="269112"/>
+              </a:xfrm>
+              <a:prstGeom prst="straightConnector1">
+                <a:avLst/>
+              </a:prstGeom>
+              <a:ln w="12700">
+                <a:solidFill>
+                  <a:schemeClr val="accent1">
+                    <a:lumMod val="60000"/>
+                    <a:lumOff val="40000"/>
+                  </a:schemeClr>
+                </a:solidFill>
+                <a:tailEnd type="triangle"/>
+              </a:ln>
+            </p:spPr>
+            <p:style>
+              <a:lnRef idx="1">
+                <a:schemeClr val="accent1"/>
+              </a:lnRef>
+              <a:fillRef idx="0">
+                <a:schemeClr val="accent1"/>
+              </a:fillRef>
+              <a:effectRef idx="0">
+                <a:schemeClr val="accent1"/>
+              </a:effectRef>
+              <a:fontRef idx="minor">
+                <a:schemeClr val="tx1"/>
+              </a:fontRef>
+            </p:style>
+          </p:cxnSp>
+          <p:sp>
+            <p:nvSpPr>
+              <p:cNvPr id="32" name="Rectangle 31">
+                <a:extLst>
+                  <a:ext uri="{FF2B5EF4-FFF2-40B4-BE49-F238E27FC236}">
+                    <a16:creationId xmlns:a16="http://schemas.microsoft.com/office/drawing/2014/main" id="{54EE8300-D7CA-076C-FFE7-1F98BE4C4C81}"/>
+                  </a:ext>
+                </a:extLst>
+              </p:cNvPr>
+              <p:cNvSpPr/>
+              <p:nvPr/>
+            </p:nvSpPr>
+            <p:spPr>
+              <a:xfrm>
+                <a:off x="3427319" y="2071777"/>
+                <a:ext cx="1844844" cy="393032"/>
+              </a:xfrm>
+              <a:prstGeom prst="rect">
+                <a:avLst/>
+              </a:prstGeom>
+              <a:noFill/>
+              <a:ln>
+                <a:solidFill>
+                  <a:schemeClr val="accent6">
+                    <a:lumMod val="60000"/>
+                    <a:lumOff val="40000"/>
+                  </a:schemeClr>
+                </a:solidFill>
+              </a:ln>
+            </p:spPr>
+            <p:style>
+              <a:lnRef idx="2">
+                <a:schemeClr val="accent1">
+                  <a:shade val="50000"/>
+                </a:schemeClr>
+              </a:lnRef>
+              <a:fillRef idx="1">
+                <a:schemeClr val="accent1"/>
+              </a:fillRef>
+              <a:effectRef idx="0">
+                <a:schemeClr val="accent1"/>
+              </a:effectRef>
+              <a:fontRef idx="minor">
+                <a:schemeClr val="lt1"/>
+              </a:fontRef>
+            </p:style>
+            <p:txBody>
+              <a:bodyPr rtlCol="0" anchor="ctr"/>
+              <a:lstStyle/>
+              <a:p>
+                <a:pPr algn="ctr"/>
+                <a:r>
+                  <a:rPr lang="en-US" sz="1200" dirty="0">
+                    <a:solidFill>
+                      <a:schemeClr val="bg1">
+                        <a:lumMod val="85000"/>
+                      </a:schemeClr>
+                    </a:solidFill>
+                    <a:latin typeface="Open Sans" panose="020B0606030504020204" pitchFamily="34" charset="0"/>
+                    <a:ea typeface="Open Sans" panose="020B0606030504020204" pitchFamily="34" charset="0"/>
+                    <a:cs typeface="Open Sans" panose="020B0606030504020204" pitchFamily="34" charset="0"/>
+                  </a:rPr>
+                  <a:t>set count = 0, sum = 0</a:t>
+                </a:r>
+              </a:p>
+            </p:txBody>
+          </p:sp>
+          <p:sp>
+            <p:nvSpPr>
+              <p:cNvPr id="44" name="Rectangle 43">
+                <a:extLst>
+                  <a:ext uri="{FF2B5EF4-FFF2-40B4-BE49-F238E27FC236}">
+                    <a16:creationId xmlns:a16="http://schemas.microsoft.com/office/drawing/2014/main" id="{FC7D7D85-0B9C-20D6-B232-94F7885F3965}"/>
+                  </a:ext>
+                </a:extLst>
+              </p:cNvPr>
+              <p:cNvSpPr/>
+              <p:nvPr/>
+            </p:nvSpPr>
+            <p:spPr>
+              <a:xfrm>
+                <a:off x="5643760" y="2835718"/>
+                <a:ext cx="1844844" cy="393032"/>
+              </a:xfrm>
+              <a:prstGeom prst="rect">
+                <a:avLst/>
+              </a:prstGeom>
+              <a:noFill/>
+              <a:ln>
+                <a:solidFill>
+                  <a:schemeClr val="accent6">
+                    <a:lumMod val="60000"/>
+                    <a:lumOff val="40000"/>
+                  </a:schemeClr>
+                </a:solidFill>
+              </a:ln>
+            </p:spPr>
+            <p:style>
+              <a:lnRef idx="2">
+                <a:schemeClr val="accent1">
+                  <a:shade val="50000"/>
+                </a:schemeClr>
+              </a:lnRef>
+              <a:fillRef idx="1">
+                <a:schemeClr val="accent1"/>
+              </a:fillRef>
+              <a:effectRef idx="0">
+                <a:schemeClr val="accent1"/>
+              </a:effectRef>
+              <a:fontRef idx="minor">
+                <a:schemeClr val="lt1"/>
+              </a:fontRef>
+            </p:style>
+            <p:txBody>
+              <a:bodyPr rtlCol="0" anchor="ctr"/>
+              <a:lstStyle/>
+              <a:p>
+                <a:pPr algn="ctr"/>
+                <a:r>
+                  <a:rPr lang="en-US" sz="1200" dirty="0">
+                    <a:solidFill>
+                      <a:schemeClr val="bg1">
+                        <a:lumMod val="85000"/>
+                      </a:schemeClr>
+                    </a:solidFill>
+                    <a:latin typeface="Open Sans" panose="020B0606030504020204" pitchFamily="34" charset="0"/>
+                    <a:ea typeface="Open Sans" panose="020B0606030504020204" pitchFamily="34" charset="0"/>
+                    <a:cs typeface="Open Sans" panose="020B0606030504020204" pitchFamily="34" charset="0"/>
+                  </a:rPr>
+                  <a:t>count = count + 1</a:t>
+                </a:r>
+              </a:p>
+            </p:txBody>
+          </p:sp>
+          <p:cxnSp>
+            <p:nvCxnSpPr>
+              <p:cNvPr id="23" name="Straight Arrow Connector 22">
+                <a:extLst>
+                  <a:ext uri="{FF2B5EF4-FFF2-40B4-BE49-F238E27FC236}">
+                    <a16:creationId xmlns:a16="http://schemas.microsoft.com/office/drawing/2014/main" id="{D715479B-E165-FA4B-0784-55BFEC483532}"/>
+                  </a:ext>
+                </a:extLst>
+              </p:cNvPr>
+              <p:cNvCxnSpPr>
+                <a:cxnSpLocks/>
+                <a:stCxn id="55" idx="0"/>
+                <a:endCxn id="44" idx="2"/>
+              </p:cNvCxnSpPr>
+              <p:nvPr/>
+            </p:nvCxnSpPr>
+            <p:spPr>
+              <a:xfrm flipV="1">
+                <a:off x="6566182" y="3228750"/>
+                <a:ext cx="0" cy="593964"/>
+              </a:xfrm>
+              <a:prstGeom prst="straightConnector1">
+                <a:avLst/>
+              </a:prstGeom>
+              <a:ln w="12700">
+                <a:solidFill>
+                  <a:schemeClr val="bg1">
+                    <a:lumMod val="75000"/>
+                  </a:schemeClr>
+                </a:solidFill>
+                <a:tailEnd type="triangle"/>
+              </a:ln>
+            </p:spPr>
+            <p:style>
+              <a:lnRef idx="1">
+                <a:schemeClr val="accent1"/>
+              </a:lnRef>
+              <a:fillRef idx="0">
+                <a:schemeClr val="accent1"/>
+              </a:fillRef>
+              <a:effectRef idx="0">
+                <a:schemeClr val="accent1"/>
+              </a:effectRef>
+              <a:fontRef idx="minor">
+                <a:schemeClr val="tx1"/>
+              </a:fontRef>
+            </p:style>
+          </p:cxnSp>
+          <p:cxnSp>
+            <p:nvCxnSpPr>
+              <p:cNvPr id="30" name="Straight Arrow Connector 29">
+                <a:extLst>
+                  <a:ext uri="{FF2B5EF4-FFF2-40B4-BE49-F238E27FC236}">
+                    <a16:creationId xmlns:a16="http://schemas.microsoft.com/office/drawing/2014/main" id="{CDB8CEDB-D17D-4A33-E78F-604CC11771E6}"/>
+                  </a:ext>
+                </a:extLst>
+              </p:cNvPr>
+              <p:cNvCxnSpPr>
+                <a:cxnSpLocks/>
+                <a:stCxn id="44" idx="1"/>
+                <a:endCxn id="58" idx="5"/>
+              </p:cNvCxnSpPr>
+              <p:nvPr/>
+            </p:nvCxnSpPr>
+            <p:spPr>
+              <a:xfrm flipH="1">
+                <a:off x="5087681" y="3032234"/>
+                <a:ext cx="556079" cy="0"/>
+              </a:xfrm>
+              <a:prstGeom prst="straightConnector1">
+                <a:avLst/>
+              </a:prstGeom>
+              <a:ln w="12700">
+                <a:solidFill>
+                  <a:schemeClr val="bg1">
+                    <a:lumMod val="75000"/>
+                  </a:schemeClr>
+                </a:solidFill>
+                <a:tailEnd type="triangle"/>
+              </a:ln>
+            </p:spPr>
+            <p:style>
+              <a:lnRef idx="1">
+                <a:schemeClr val="accent1"/>
+              </a:lnRef>
+              <a:fillRef idx="0">
+                <a:schemeClr val="accent1"/>
+              </a:fillRef>
+              <a:effectRef idx="0">
+                <a:schemeClr val="accent1"/>
+              </a:effectRef>
+              <a:fontRef idx="minor">
+                <a:schemeClr val="tx1"/>
+              </a:fontRef>
+            </p:style>
+          </p:cxnSp>
+          <p:cxnSp>
+            <p:nvCxnSpPr>
+              <p:cNvPr id="35" name="Straight Arrow Connector 34">
+                <a:extLst>
+                  <a:ext uri="{FF2B5EF4-FFF2-40B4-BE49-F238E27FC236}">
+                    <a16:creationId xmlns:a16="http://schemas.microsoft.com/office/drawing/2014/main" id="{4A509B8A-8E5B-975A-1BFD-3F2312F4742E}"/>
+                  </a:ext>
+                </a:extLst>
+              </p:cNvPr>
+              <p:cNvCxnSpPr>
+                <a:cxnSpLocks/>
+                <a:stCxn id="45" idx="0"/>
+                <a:endCxn id="75" idx="4"/>
+              </p:cNvCxnSpPr>
+              <p:nvPr/>
+            </p:nvCxnSpPr>
+            <p:spPr>
+              <a:xfrm flipV="1">
+                <a:off x="8782623" y="2511128"/>
+                <a:ext cx="0" cy="1311586"/>
+              </a:xfrm>
+              <a:prstGeom prst="straightConnector1">
+                <a:avLst/>
+              </a:prstGeom>
+              <a:ln w="12700">
+                <a:solidFill>
+                  <a:schemeClr val="bg1">
+                    <a:lumMod val="75000"/>
+                  </a:schemeClr>
+                </a:solidFill>
+                <a:tailEnd type="triangle"/>
+              </a:ln>
+            </p:spPr>
+            <p:style>
+              <a:lnRef idx="1">
+                <a:schemeClr val="accent1"/>
+              </a:lnRef>
+              <a:fillRef idx="0">
+                <a:schemeClr val="accent1"/>
+              </a:fillRef>
+              <a:effectRef idx="0">
+                <a:schemeClr val="accent1"/>
+              </a:effectRef>
+              <a:fontRef idx="minor">
+                <a:schemeClr val="tx1"/>
+              </a:fontRef>
+            </p:style>
+          </p:cxnSp>
+          <p:cxnSp>
+            <p:nvCxnSpPr>
+              <p:cNvPr id="48" name="Connector: Elbow 47">
+                <a:extLst>
+                  <a:ext uri="{FF2B5EF4-FFF2-40B4-BE49-F238E27FC236}">
+                    <a16:creationId xmlns:a16="http://schemas.microsoft.com/office/drawing/2014/main" id="{E5880902-AF93-07C1-070D-97658066D083}"/>
+                  </a:ext>
+                </a:extLst>
+              </p:cNvPr>
+              <p:cNvCxnSpPr>
+                <a:stCxn id="20" idx="2"/>
+                <a:endCxn id="45" idx="2"/>
+              </p:cNvCxnSpPr>
+              <p:nvPr/>
+            </p:nvCxnSpPr>
+            <p:spPr>
+              <a:xfrm rot="5400000" flipH="1" flipV="1">
+                <a:off x="6427819" y="2137668"/>
+                <a:ext cx="276726" cy="4432882"/>
+              </a:xfrm>
+              <a:prstGeom prst="bentConnector3">
+                <a:avLst>
+                  <a:gd name="adj1" fmla="val -82609"/>
+                </a:avLst>
+              </a:prstGeom>
+              <a:ln w="12700">
+                <a:solidFill>
+                  <a:srgbClr val="FF7C80"/>
+                </a:solidFill>
+                <a:tailEnd type="triangle"/>
+              </a:ln>
+            </p:spPr>
+            <p:style>
+              <a:lnRef idx="1">
+                <a:schemeClr val="accent1"/>
+              </a:lnRef>
+              <a:fillRef idx="0">
+                <a:schemeClr val="accent1"/>
+              </a:fillRef>
+              <a:effectRef idx="0">
+                <a:schemeClr val="accent1"/>
+              </a:effectRef>
+              <a:fontRef idx="minor">
+                <a:schemeClr val="tx1"/>
+              </a:fontRef>
+            </p:style>
+          </p:cxnSp>
+          <p:cxnSp>
+            <p:nvCxnSpPr>
+              <p:cNvPr id="50" name="Straight Arrow Connector 49">
+                <a:extLst>
+                  <a:ext uri="{FF2B5EF4-FFF2-40B4-BE49-F238E27FC236}">
+                    <a16:creationId xmlns:a16="http://schemas.microsoft.com/office/drawing/2014/main" id="{4AE9A6D0-3B9B-5EC0-6D6C-4B4A1A596DD5}"/>
+                  </a:ext>
+                </a:extLst>
+              </p:cNvPr>
+              <p:cNvCxnSpPr>
+                <a:stCxn id="32" idx="2"/>
+                <a:endCxn id="58" idx="1"/>
+              </p:cNvCxnSpPr>
+              <p:nvPr/>
+            </p:nvCxnSpPr>
+            <p:spPr>
+              <a:xfrm>
+                <a:off x="4349741" y="2464809"/>
+                <a:ext cx="2" cy="322783"/>
+              </a:xfrm>
+              <a:prstGeom prst="straightConnector1">
+                <a:avLst/>
+              </a:prstGeom>
+              <a:ln w="12700">
+                <a:solidFill>
+                  <a:schemeClr val="bg1">
+                    <a:lumMod val="75000"/>
+                  </a:schemeClr>
+                </a:solidFill>
+                <a:tailEnd type="triangle"/>
+              </a:ln>
+            </p:spPr>
+            <p:style>
+              <a:lnRef idx="1">
+                <a:schemeClr val="accent1"/>
+              </a:lnRef>
+              <a:fillRef idx="0">
+                <a:schemeClr val="accent1"/>
+              </a:fillRef>
+              <a:effectRef idx="0">
+                <a:schemeClr val="accent1"/>
+              </a:effectRef>
+              <a:fontRef idx="minor">
+                <a:schemeClr val="tx1"/>
+              </a:fontRef>
+            </p:style>
+          </p:cxnSp>
+        </p:grpSp>
+      </p:grpSp>
+    </p:spTree>
+    <p:extLst>
+      <p:ext uri="{BB962C8B-B14F-4D97-AF65-F5344CB8AC3E}">
+        <p14:creationId xmlns:p14="http://schemas.microsoft.com/office/powerpoint/2010/main" val="928627945"/>
+      </p:ext>
+    </p:extLst>
+  </p:cSld>
+  <p:clrMapOvr>
+    <a:masterClrMapping/>
+  </p:clrMapOvr>
+</p:sld>
+</file>
+
 <file path=ppt/slides/slide2.xml><?xml version="1.0" encoding="utf-8"?>
 <p:sld xmlns:a="http://schemas.openxmlformats.org/drawingml/2006/main" xmlns:r="http://schemas.openxmlformats.org/officeDocument/2006/relationships" xmlns:p="http://schemas.openxmlformats.org/presentationml/2006/main">
   <p:cSld>

</xml_diff>

<commit_message>
Added Flowchart for Q6 of PrePSPM2122_KMNS.md
</commit_message>
<xml_diff>
--- a/Past Year Theory Questions/Resources/resources.pptx
+++ b/Past Year Theory Questions/Resources/resources.pptx
@@ -20,6 +20,10 @@
     <p:sldId id="269" r:id="rId14"/>
     <p:sldId id="270" r:id="rId15"/>
     <p:sldId id="271" r:id="rId16"/>
+    <p:sldId id="272" r:id="rId17"/>
+    <p:sldId id="273" r:id="rId18"/>
+    <p:sldId id="274" r:id="rId19"/>
+    <p:sldId id="275" r:id="rId20"/>
   </p:sldIdLst>
   <p:sldSz cx="12192000" cy="6858000"/>
   <p:notesSz cx="6858000" cy="9144000"/>
@@ -2759,9 +2763,12 @@
 <p:sldMaster xmlns:a="http://schemas.openxmlformats.org/drawingml/2006/main" xmlns:r="http://schemas.openxmlformats.org/officeDocument/2006/relationships" xmlns:p="http://schemas.openxmlformats.org/presentationml/2006/main">
   <p:cSld>
     <p:bg>
-      <p:bgRef idx="1001">
-        <a:schemeClr val="bg1"/>
-      </p:bgRef>
+      <p:bgPr>
+        <a:solidFill>
+          <a:schemeClr val="tx1"/>
+        </a:solidFill>
+        <a:effectLst/>
+      </p:bgPr>
     </p:bg>
     <p:spTree>
       <p:nvGrpSpPr>
@@ -12361,6 +12368,4367 @@
 </p:sld>
 </file>
 
+<file path=ppt/slides/slide16.xml><?xml version="1.0" encoding="utf-8"?>
+<p:sld xmlns:a="http://schemas.openxmlformats.org/drawingml/2006/main" xmlns:r="http://schemas.openxmlformats.org/officeDocument/2006/relationships" xmlns:p="http://schemas.openxmlformats.org/presentationml/2006/main">
+  <p:cSld>
+    <p:spTree>
+      <p:nvGrpSpPr>
+        <p:cNvPr id="1" name=""/>
+        <p:cNvGrpSpPr/>
+        <p:nvPr/>
+      </p:nvGrpSpPr>
+      <p:grpSpPr>
+        <a:xfrm>
+          <a:off x="0" y="0"/>
+          <a:ext cx="0" cy="0"/>
+          <a:chOff x="0" y="0"/>
+          <a:chExt cx="0" cy="0"/>
+        </a:xfrm>
+      </p:grpSpPr>
+      <p:grpSp>
+        <p:nvGrpSpPr>
+          <p:cNvPr id="120" name="Group 119">
+            <a:extLst>
+              <a:ext uri="{FF2B5EF4-FFF2-40B4-BE49-F238E27FC236}">
+                <a16:creationId xmlns:a16="http://schemas.microsoft.com/office/drawing/2014/main" id="{FEF98D40-FA02-AAE9-E4C8-BE71406A2D20}"/>
+              </a:ext>
+            </a:extLst>
+          </p:cNvPr>
+          <p:cNvGrpSpPr/>
+          <p:nvPr/>
+        </p:nvGrpSpPr>
+        <p:grpSpPr>
+          <a:xfrm>
+            <a:off x="2432029" y="460874"/>
+            <a:ext cx="7327942" cy="5936252"/>
+            <a:chOff x="3643071" y="198681"/>
+            <a:chExt cx="7327942" cy="5936252"/>
+          </a:xfrm>
+        </p:grpSpPr>
+        <p:sp>
+          <p:nvSpPr>
+            <p:cNvPr id="108" name="Rectangle 107">
+              <a:extLst>
+                <a:ext uri="{FF2B5EF4-FFF2-40B4-BE49-F238E27FC236}">
+                  <a16:creationId xmlns:a16="http://schemas.microsoft.com/office/drawing/2014/main" id="{F5A5FD62-A99C-04B6-706B-DEE9B81AF541}"/>
+                </a:ext>
+              </a:extLst>
+            </p:cNvPr>
+            <p:cNvSpPr/>
+            <p:nvPr/>
+          </p:nvSpPr>
+          <p:spPr>
+            <a:xfrm>
+              <a:off x="3643071" y="198681"/>
+              <a:ext cx="7327942" cy="5936252"/>
+            </a:xfrm>
+            <a:prstGeom prst="rect">
+              <a:avLst/>
+            </a:prstGeom>
+            <a:solidFill>
+              <a:srgbClr val="0F1017"/>
+            </a:solidFill>
+            <a:ln w="12700">
+              <a:solidFill>
+                <a:schemeClr val="bg1">
+                  <a:lumMod val="75000"/>
+                </a:schemeClr>
+              </a:solidFill>
+            </a:ln>
+          </p:spPr>
+          <p:style>
+            <a:lnRef idx="2">
+              <a:schemeClr val="accent1">
+                <a:shade val="50000"/>
+              </a:schemeClr>
+            </a:lnRef>
+            <a:fillRef idx="1">
+              <a:schemeClr val="accent1"/>
+            </a:fillRef>
+            <a:effectRef idx="0">
+              <a:schemeClr val="accent1"/>
+            </a:effectRef>
+            <a:fontRef idx="minor">
+              <a:schemeClr val="lt1"/>
+            </a:fontRef>
+          </p:style>
+          <p:txBody>
+            <a:bodyPr rtlCol="0" anchor="ctr"/>
+            <a:lstStyle/>
+            <a:p>
+              <a:pPr algn="ctr"/>
+              <a:endParaRPr lang="en-US" sz="1800" dirty="0">
+                <a:solidFill>
+                  <a:schemeClr val="bg1">
+                    <a:lumMod val="85000"/>
+                  </a:schemeClr>
+                </a:solidFill>
+                <a:latin typeface="Open Sans" panose="020B0606030504020204" pitchFamily="34" charset="0"/>
+                <a:ea typeface="Open Sans" panose="020B0606030504020204" pitchFamily="34" charset="0"/>
+                <a:cs typeface="Open Sans" panose="020B0606030504020204" pitchFamily="34" charset="0"/>
+              </a:endParaRPr>
+            </a:p>
+          </p:txBody>
+        </p:sp>
+        <p:sp>
+          <p:nvSpPr>
+            <p:cNvPr id="59" name="Flowchart: Terminator 58">
+              <a:extLst>
+                <a:ext uri="{FF2B5EF4-FFF2-40B4-BE49-F238E27FC236}">
+                  <a16:creationId xmlns:a16="http://schemas.microsoft.com/office/drawing/2014/main" id="{D7554AAC-5F81-46CA-BA4E-6CDF6B8CC5AD}"/>
+                </a:ext>
+              </a:extLst>
+            </p:cNvPr>
+            <p:cNvSpPr/>
+            <p:nvPr/>
+          </p:nvSpPr>
+          <p:spPr>
+            <a:xfrm>
+              <a:off x="4572180" y="673095"/>
+              <a:ext cx="1050758" cy="341690"/>
+            </a:xfrm>
+            <a:prstGeom prst="flowChartTerminator">
+              <a:avLst/>
+            </a:prstGeom>
+            <a:noFill/>
+            <a:ln>
+              <a:solidFill>
+                <a:schemeClr val="bg1">
+                  <a:lumMod val="75000"/>
+                </a:schemeClr>
+              </a:solidFill>
+            </a:ln>
+          </p:spPr>
+          <p:style>
+            <a:lnRef idx="2">
+              <a:schemeClr val="accent1">
+                <a:shade val="50000"/>
+              </a:schemeClr>
+            </a:lnRef>
+            <a:fillRef idx="1">
+              <a:schemeClr val="accent1"/>
+            </a:fillRef>
+            <a:effectRef idx="0">
+              <a:schemeClr val="accent1"/>
+            </a:effectRef>
+            <a:fontRef idx="minor">
+              <a:schemeClr val="lt1"/>
+            </a:fontRef>
+          </p:style>
+          <p:txBody>
+            <a:bodyPr rtlCol="0" anchor="ctr"/>
+            <a:lstStyle/>
+            <a:p>
+              <a:pPr algn="ctr"/>
+              <a:r>
+                <a:rPr lang="en-US" sz="1200" dirty="0">
+                  <a:solidFill>
+                    <a:schemeClr val="bg1">
+                      <a:lumMod val="85000"/>
+                    </a:schemeClr>
+                  </a:solidFill>
+                  <a:latin typeface="Open Sans" panose="020B0606030504020204" pitchFamily="34" charset="0"/>
+                  <a:ea typeface="Open Sans" panose="020B0606030504020204" pitchFamily="34" charset="0"/>
+                  <a:cs typeface="Open Sans" panose="020B0606030504020204" pitchFamily="34" charset="0"/>
+                </a:rPr>
+                <a:t>Start</a:t>
+              </a:r>
+            </a:p>
+          </p:txBody>
+        </p:sp>
+        <p:sp>
+          <p:nvSpPr>
+            <p:cNvPr id="60" name="Flowchart: Terminator 59">
+              <a:extLst>
+                <a:ext uri="{FF2B5EF4-FFF2-40B4-BE49-F238E27FC236}">
+                  <a16:creationId xmlns:a16="http://schemas.microsoft.com/office/drawing/2014/main" id="{103191FC-37A5-724C-C214-882B4B9F6C89}"/>
+                </a:ext>
+              </a:extLst>
+            </p:cNvPr>
+            <p:cNvSpPr/>
+            <p:nvPr/>
+          </p:nvSpPr>
+          <p:spPr>
+            <a:xfrm>
+              <a:off x="9000424" y="673095"/>
+              <a:ext cx="1050758" cy="341690"/>
+            </a:xfrm>
+            <a:prstGeom prst="flowChartTerminator">
+              <a:avLst/>
+            </a:prstGeom>
+            <a:noFill/>
+            <a:ln>
+              <a:solidFill>
+                <a:schemeClr val="bg1">
+                  <a:lumMod val="75000"/>
+                </a:schemeClr>
+              </a:solidFill>
+            </a:ln>
+          </p:spPr>
+          <p:style>
+            <a:lnRef idx="2">
+              <a:schemeClr val="accent1">
+                <a:shade val="50000"/>
+              </a:schemeClr>
+            </a:lnRef>
+            <a:fillRef idx="1">
+              <a:schemeClr val="accent1"/>
+            </a:fillRef>
+            <a:effectRef idx="0">
+              <a:schemeClr val="accent1"/>
+            </a:effectRef>
+            <a:fontRef idx="minor">
+              <a:schemeClr val="lt1"/>
+            </a:fontRef>
+          </p:style>
+          <p:txBody>
+            <a:bodyPr rtlCol="0" anchor="ctr"/>
+            <a:lstStyle/>
+            <a:p>
+              <a:pPr algn="ctr"/>
+              <a:r>
+                <a:rPr lang="en-US" sz="1200" dirty="0">
+                  <a:solidFill>
+                    <a:schemeClr val="bg1">
+                      <a:lumMod val="85000"/>
+                    </a:schemeClr>
+                  </a:solidFill>
+                  <a:latin typeface="Open Sans" panose="020B0606030504020204" pitchFamily="34" charset="0"/>
+                  <a:ea typeface="Open Sans" panose="020B0606030504020204" pitchFamily="34" charset="0"/>
+                  <a:cs typeface="Open Sans" panose="020B0606030504020204" pitchFamily="34" charset="0"/>
+                </a:rPr>
+                <a:t>Stop</a:t>
+              </a:r>
+            </a:p>
+          </p:txBody>
+        </p:sp>
+        <p:cxnSp>
+          <p:nvCxnSpPr>
+            <p:cNvPr id="61" name="Straight Arrow Connector 60">
+              <a:extLst>
+                <a:ext uri="{FF2B5EF4-FFF2-40B4-BE49-F238E27FC236}">
+                  <a16:creationId xmlns:a16="http://schemas.microsoft.com/office/drawing/2014/main" id="{A1BBCFB3-141A-F3B8-67BE-C05995E64053}"/>
+                </a:ext>
+              </a:extLst>
+            </p:cNvPr>
+            <p:cNvCxnSpPr>
+              <a:cxnSpLocks/>
+              <a:stCxn id="59" idx="2"/>
+              <a:endCxn id="54" idx="0"/>
+            </p:cNvCxnSpPr>
+            <p:nvPr/>
+          </p:nvCxnSpPr>
+          <p:spPr>
+            <a:xfrm flipH="1">
+              <a:off x="5092921" y="1014785"/>
+              <a:ext cx="4638" cy="341690"/>
+            </a:xfrm>
+            <a:prstGeom prst="straightConnector1">
+              <a:avLst/>
+            </a:prstGeom>
+            <a:ln w="12700">
+              <a:solidFill>
+                <a:schemeClr val="bg1">
+                  <a:lumMod val="75000"/>
+                </a:schemeClr>
+              </a:solidFill>
+              <a:tailEnd type="triangle"/>
+            </a:ln>
+          </p:spPr>
+          <p:style>
+            <a:lnRef idx="1">
+              <a:schemeClr val="accent1"/>
+            </a:lnRef>
+            <a:fillRef idx="0">
+              <a:schemeClr val="accent1"/>
+            </a:fillRef>
+            <a:effectRef idx="0">
+              <a:schemeClr val="accent1"/>
+            </a:effectRef>
+            <a:fontRef idx="minor">
+              <a:schemeClr val="tx1"/>
+            </a:fontRef>
+          </p:style>
+        </p:cxnSp>
+        <p:sp>
+          <p:nvSpPr>
+            <p:cNvPr id="49" name="TextBox 48">
+              <a:extLst>
+                <a:ext uri="{FF2B5EF4-FFF2-40B4-BE49-F238E27FC236}">
+                  <a16:creationId xmlns:a16="http://schemas.microsoft.com/office/drawing/2014/main" id="{9782D64F-E1B4-7BBA-97F1-672AA7BB38F2}"/>
+                </a:ext>
+              </a:extLst>
+            </p:cNvPr>
+            <p:cNvSpPr txBox="1"/>
+            <p:nvPr/>
+          </p:nvSpPr>
+          <p:spPr>
+            <a:xfrm>
+              <a:off x="8332083" y="3133549"/>
+              <a:ext cx="269626" cy="276999"/>
+            </a:xfrm>
+            <a:prstGeom prst="rect">
+              <a:avLst/>
+            </a:prstGeom>
+            <a:noFill/>
+          </p:spPr>
+          <p:txBody>
+            <a:bodyPr wrap="none" rtlCol="0">
+              <a:spAutoFit/>
+            </a:bodyPr>
+            <a:lstStyle/>
+            <a:p>
+              <a:r>
+                <a:rPr lang="en-US" sz="1200" dirty="0">
+                  <a:solidFill>
+                    <a:srgbClr val="FF7C80"/>
+                  </a:solidFill>
+                  <a:latin typeface="Open Sans" panose="020B0606030504020204" pitchFamily="34" charset="0"/>
+                  <a:ea typeface="Open Sans" panose="020B0606030504020204" pitchFamily="34" charset="0"/>
+                  <a:cs typeface="Open Sans" panose="020B0606030504020204" pitchFamily="34" charset="0"/>
+                </a:rPr>
+                <a:t>T</a:t>
+              </a:r>
+            </a:p>
+          </p:txBody>
+        </p:sp>
+        <p:sp>
+          <p:nvSpPr>
+            <p:cNvPr id="53" name="TextBox 52">
+              <a:extLst>
+                <a:ext uri="{FF2B5EF4-FFF2-40B4-BE49-F238E27FC236}">
+                  <a16:creationId xmlns:a16="http://schemas.microsoft.com/office/drawing/2014/main" id="{7E6B2905-22B9-9F02-399A-510F7F8499F3}"/>
+                </a:ext>
+              </a:extLst>
+            </p:cNvPr>
+            <p:cNvSpPr txBox="1"/>
+            <p:nvPr/>
+          </p:nvSpPr>
+          <p:spPr>
+            <a:xfrm>
+              <a:off x="9525803" y="3883526"/>
+              <a:ext cx="269626" cy="276999"/>
+            </a:xfrm>
+            <a:prstGeom prst="rect">
+              <a:avLst/>
+            </a:prstGeom>
+            <a:noFill/>
+          </p:spPr>
+          <p:txBody>
+            <a:bodyPr wrap="none" rtlCol="0">
+              <a:spAutoFit/>
+            </a:bodyPr>
+            <a:lstStyle/>
+            <a:p>
+              <a:r>
+                <a:rPr lang="en-US" sz="1200" dirty="0">
+                  <a:solidFill>
+                    <a:srgbClr val="FF7C80"/>
+                  </a:solidFill>
+                  <a:latin typeface="Open Sans" panose="020B0606030504020204" pitchFamily="34" charset="0"/>
+                  <a:ea typeface="Open Sans" panose="020B0606030504020204" pitchFamily="34" charset="0"/>
+                  <a:cs typeface="Open Sans" panose="020B0606030504020204" pitchFamily="34" charset="0"/>
+                </a:rPr>
+                <a:t>F</a:t>
+              </a:r>
+            </a:p>
+          </p:txBody>
+        </p:sp>
+        <p:sp>
+          <p:nvSpPr>
+            <p:cNvPr id="54" name="Rectangle 53">
+              <a:extLst>
+                <a:ext uri="{FF2B5EF4-FFF2-40B4-BE49-F238E27FC236}">
+                  <a16:creationId xmlns:a16="http://schemas.microsoft.com/office/drawing/2014/main" id="{EF16B371-E288-2E6D-0A7A-AFE1A459BC3D}"/>
+                </a:ext>
+              </a:extLst>
+            </p:cNvPr>
+            <p:cNvSpPr/>
+            <p:nvPr/>
+          </p:nvSpPr>
+          <p:spPr>
+            <a:xfrm>
+              <a:off x="4170499" y="1356475"/>
+              <a:ext cx="1844844" cy="393032"/>
+            </a:xfrm>
+            <a:prstGeom prst="rect">
+              <a:avLst/>
+            </a:prstGeom>
+            <a:noFill/>
+            <a:ln>
+              <a:solidFill>
+                <a:schemeClr val="accent6">
+                  <a:lumMod val="60000"/>
+                  <a:lumOff val="40000"/>
+                </a:schemeClr>
+              </a:solidFill>
+            </a:ln>
+          </p:spPr>
+          <p:style>
+            <a:lnRef idx="2">
+              <a:schemeClr val="accent1">
+                <a:shade val="50000"/>
+              </a:schemeClr>
+            </a:lnRef>
+            <a:fillRef idx="1">
+              <a:schemeClr val="accent1"/>
+            </a:fillRef>
+            <a:effectRef idx="0">
+              <a:schemeClr val="accent1"/>
+            </a:effectRef>
+            <a:fontRef idx="minor">
+              <a:schemeClr val="lt1"/>
+            </a:fontRef>
+          </p:style>
+          <p:txBody>
+            <a:bodyPr rtlCol="0" anchor="ctr"/>
+            <a:lstStyle/>
+            <a:p>
+              <a:pPr algn="ctr"/>
+              <a:r>
+                <a:rPr lang="en-US" sz="1200" dirty="0">
+                  <a:solidFill>
+                    <a:schemeClr val="bg1">
+                      <a:lumMod val="85000"/>
+                    </a:schemeClr>
+                  </a:solidFill>
+                  <a:latin typeface="Open Sans" panose="020B0606030504020204" pitchFamily="34" charset="0"/>
+                  <a:ea typeface="Open Sans" panose="020B0606030504020204" pitchFamily="34" charset="0"/>
+                  <a:cs typeface="Open Sans" panose="020B0606030504020204" pitchFamily="34" charset="0"/>
+                </a:rPr>
+                <a:t>counter = 0</a:t>
+              </a:r>
+            </a:p>
+          </p:txBody>
+        </p:sp>
+        <p:sp>
+          <p:nvSpPr>
+            <p:cNvPr id="56" name="Flowchart: Decision 55">
+              <a:extLst>
+                <a:ext uri="{FF2B5EF4-FFF2-40B4-BE49-F238E27FC236}">
+                  <a16:creationId xmlns:a16="http://schemas.microsoft.com/office/drawing/2014/main" id="{E9F5237A-541C-A479-065A-D16ED98597EF}"/>
+                </a:ext>
+              </a:extLst>
+            </p:cNvPr>
+            <p:cNvSpPr/>
+            <p:nvPr/>
+          </p:nvSpPr>
+          <p:spPr>
+            <a:xfrm>
+              <a:off x="6384621" y="1082964"/>
+              <a:ext cx="1844844" cy="946484"/>
+            </a:xfrm>
+            <a:prstGeom prst="flowChartDecision">
+              <a:avLst/>
+            </a:prstGeom>
+            <a:noFill/>
+            <a:ln>
+              <a:solidFill>
+                <a:srgbClr val="FF7C80"/>
+              </a:solidFill>
+            </a:ln>
+          </p:spPr>
+          <p:style>
+            <a:lnRef idx="2">
+              <a:schemeClr val="accent1">
+                <a:shade val="50000"/>
+              </a:schemeClr>
+            </a:lnRef>
+            <a:fillRef idx="1">
+              <a:schemeClr val="accent1"/>
+            </a:fillRef>
+            <a:effectRef idx="0">
+              <a:schemeClr val="accent1"/>
+            </a:effectRef>
+            <a:fontRef idx="minor">
+              <a:schemeClr val="lt1"/>
+            </a:fontRef>
+          </p:style>
+          <p:txBody>
+            <a:bodyPr rtlCol="0" anchor="ctr"/>
+            <a:lstStyle/>
+            <a:p>
+              <a:pPr algn="ctr"/>
+              <a:r>
+                <a:rPr lang="en-US" sz="1200" dirty="0">
+                  <a:solidFill>
+                    <a:schemeClr val="bg1">
+                      <a:lumMod val="85000"/>
+                    </a:schemeClr>
+                  </a:solidFill>
+                  <a:latin typeface="Open Sans" panose="020B0606030504020204" pitchFamily="34" charset="0"/>
+                  <a:ea typeface="Open Sans" panose="020B0606030504020204" pitchFamily="34" charset="0"/>
+                  <a:cs typeface="Open Sans" panose="020B0606030504020204" pitchFamily="34" charset="0"/>
+                </a:rPr>
+                <a:t>counter </a:t>
+              </a:r>
+            </a:p>
+            <a:p>
+              <a:pPr algn="ctr"/>
+              <a:r>
+                <a:rPr lang="en-US" sz="1200" dirty="0">
+                  <a:solidFill>
+                    <a:schemeClr val="bg1">
+                      <a:lumMod val="85000"/>
+                    </a:schemeClr>
+                  </a:solidFill>
+                  <a:latin typeface="Open Sans" panose="020B0606030504020204" pitchFamily="34" charset="0"/>
+                  <a:ea typeface="Open Sans" panose="020B0606030504020204" pitchFamily="34" charset="0"/>
+                  <a:cs typeface="Open Sans" panose="020B0606030504020204" pitchFamily="34" charset="0"/>
+                </a:rPr>
+                <a:t>&lt; 15</a:t>
+              </a:r>
+            </a:p>
+          </p:txBody>
+        </p:sp>
+        <p:sp>
+          <p:nvSpPr>
+            <p:cNvPr id="71" name="Rectangle 70">
+              <a:extLst>
+                <a:ext uri="{FF2B5EF4-FFF2-40B4-BE49-F238E27FC236}">
+                  <a16:creationId xmlns:a16="http://schemas.microsoft.com/office/drawing/2014/main" id="{4BA00986-C412-6906-A8AA-2BC0BBB9BF59}"/>
+                </a:ext>
+              </a:extLst>
+            </p:cNvPr>
+            <p:cNvSpPr/>
+            <p:nvPr/>
+          </p:nvSpPr>
+          <p:spPr>
+            <a:xfrm>
+              <a:off x="8603381" y="2091197"/>
+              <a:ext cx="1844844" cy="548640"/>
+            </a:xfrm>
+            <a:prstGeom prst="rect">
+              <a:avLst/>
+            </a:prstGeom>
+            <a:noFill/>
+            <a:ln>
+              <a:solidFill>
+                <a:schemeClr val="accent6">
+                  <a:lumMod val="60000"/>
+                  <a:lumOff val="40000"/>
+                </a:schemeClr>
+              </a:solidFill>
+            </a:ln>
+          </p:spPr>
+          <p:style>
+            <a:lnRef idx="2">
+              <a:schemeClr val="accent1">
+                <a:shade val="50000"/>
+              </a:schemeClr>
+            </a:lnRef>
+            <a:fillRef idx="1">
+              <a:schemeClr val="accent1"/>
+            </a:fillRef>
+            <a:effectRef idx="0">
+              <a:schemeClr val="accent1"/>
+            </a:effectRef>
+            <a:fontRef idx="minor">
+              <a:schemeClr val="lt1"/>
+            </a:fontRef>
+          </p:style>
+          <p:txBody>
+            <a:bodyPr rtlCol="0" anchor="ctr"/>
+            <a:lstStyle/>
+            <a:p>
+              <a:pPr algn="ctr"/>
+              <a:r>
+                <a:rPr lang="en-US" sz="1200" dirty="0">
+                  <a:solidFill>
+                    <a:schemeClr val="bg1">
+                      <a:lumMod val="85000"/>
+                    </a:schemeClr>
+                  </a:solidFill>
+                  <a:latin typeface="Open Sans" panose="020B0606030504020204" pitchFamily="34" charset="0"/>
+                  <a:ea typeface="Open Sans" panose="020B0606030504020204" pitchFamily="34" charset="0"/>
+                  <a:cs typeface="Open Sans" panose="020B0606030504020204" pitchFamily="34" charset="0"/>
+                </a:rPr>
+                <a:t>a = (2 * 3.142 * r * h) </a:t>
+              </a:r>
+            </a:p>
+            <a:p>
+              <a:pPr algn="ctr"/>
+              <a:r>
+                <a:rPr lang="en-US" sz="1200" dirty="0">
+                  <a:solidFill>
+                    <a:schemeClr val="bg1">
+                      <a:lumMod val="85000"/>
+                    </a:schemeClr>
+                  </a:solidFill>
+                  <a:latin typeface="Open Sans" panose="020B0606030504020204" pitchFamily="34" charset="0"/>
+                  <a:ea typeface="Open Sans" panose="020B0606030504020204" pitchFamily="34" charset="0"/>
+                  <a:cs typeface="Open Sans" panose="020B0606030504020204" pitchFamily="34" charset="0"/>
+                </a:rPr>
+                <a:t>+ (2 * 3.142 * r * r) </a:t>
+              </a:r>
+            </a:p>
+          </p:txBody>
+        </p:sp>
+        <p:sp>
+          <p:nvSpPr>
+            <p:cNvPr id="72" name="Flowchart: Data 71">
+              <a:extLst>
+                <a:ext uri="{FF2B5EF4-FFF2-40B4-BE49-F238E27FC236}">
+                  <a16:creationId xmlns:a16="http://schemas.microsoft.com/office/drawing/2014/main" id="{B345DE56-D89C-AB77-F928-6AA0E3B472B3}"/>
+                </a:ext>
+              </a:extLst>
+            </p:cNvPr>
+            <p:cNvSpPr/>
+            <p:nvPr/>
+          </p:nvSpPr>
+          <p:spPr>
+            <a:xfrm>
+              <a:off x="8603381" y="1303543"/>
+              <a:ext cx="1844844" cy="489284"/>
+            </a:xfrm>
+            <a:prstGeom prst="flowChartInputOutput">
+              <a:avLst/>
+            </a:prstGeom>
+            <a:noFill/>
+            <a:ln>
+              <a:solidFill>
+                <a:schemeClr val="accent1">
+                  <a:lumMod val="60000"/>
+                  <a:lumOff val="40000"/>
+                </a:schemeClr>
+              </a:solidFill>
+            </a:ln>
+          </p:spPr>
+          <p:style>
+            <a:lnRef idx="2">
+              <a:schemeClr val="accent1">
+                <a:shade val="50000"/>
+              </a:schemeClr>
+            </a:lnRef>
+            <a:fillRef idx="1">
+              <a:schemeClr val="accent1"/>
+            </a:fillRef>
+            <a:effectRef idx="0">
+              <a:schemeClr val="accent1"/>
+            </a:effectRef>
+            <a:fontRef idx="minor">
+              <a:schemeClr val="lt1"/>
+            </a:fontRef>
+          </p:style>
+          <p:txBody>
+            <a:bodyPr rtlCol="0" anchor="ctr"/>
+            <a:lstStyle/>
+            <a:p>
+              <a:pPr algn="ctr"/>
+              <a:r>
+                <a:rPr lang="en-US" sz="1200" dirty="0">
+                  <a:solidFill>
+                    <a:schemeClr val="bg1">
+                      <a:lumMod val="85000"/>
+                    </a:schemeClr>
+                  </a:solidFill>
+                  <a:latin typeface="Open Sans" panose="020B0606030504020204" pitchFamily="34" charset="0"/>
+                  <a:ea typeface="Open Sans" panose="020B0606030504020204" pitchFamily="34" charset="0"/>
+                  <a:cs typeface="Open Sans" panose="020B0606030504020204" pitchFamily="34" charset="0"/>
+                </a:rPr>
+                <a:t>Read r, h</a:t>
+              </a:r>
+            </a:p>
+          </p:txBody>
+        </p:sp>
+        <p:sp>
+          <p:nvSpPr>
+            <p:cNvPr id="73" name="Flowchart: Decision 72">
+              <a:extLst>
+                <a:ext uri="{FF2B5EF4-FFF2-40B4-BE49-F238E27FC236}">
+                  <a16:creationId xmlns:a16="http://schemas.microsoft.com/office/drawing/2014/main" id="{900731B6-8E65-CF45-D19A-19C929D91151}"/>
+                </a:ext>
+              </a:extLst>
+            </p:cNvPr>
+            <p:cNvSpPr/>
+            <p:nvPr/>
+          </p:nvSpPr>
+          <p:spPr>
+            <a:xfrm>
+              <a:off x="8603381" y="2938207"/>
+              <a:ext cx="1844844" cy="946484"/>
+            </a:xfrm>
+            <a:prstGeom prst="flowChartDecision">
+              <a:avLst/>
+            </a:prstGeom>
+            <a:noFill/>
+            <a:ln>
+              <a:solidFill>
+                <a:srgbClr val="FF7C80"/>
+              </a:solidFill>
+            </a:ln>
+          </p:spPr>
+          <p:style>
+            <a:lnRef idx="2">
+              <a:schemeClr val="accent1">
+                <a:shade val="50000"/>
+              </a:schemeClr>
+            </a:lnRef>
+            <a:fillRef idx="1">
+              <a:schemeClr val="accent1"/>
+            </a:fillRef>
+            <a:effectRef idx="0">
+              <a:schemeClr val="accent1"/>
+            </a:effectRef>
+            <a:fontRef idx="minor">
+              <a:schemeClr val="lt1"/>
+            </a:fontRef>
+          </p:style>
+          <p:txBody>
+            <a:bodyPr rtlCol="0" anchor="ctr"/>
+            <a:lstStyle/>
+            <a:p>
+              <a:pPr algn="ctr"/>
+              <a:r>
+                <a:rPr lang="en-US" sz="1200">
+                  <a:solidFill>
+                    <a:schemeClr val="bg1">
+                      <a:lumMod val="85000"/>
+                    </a:schemeClr>
+                  </a:solidFill>
+                  <a:latin typeface="Open Sans" panose="020B0606030504020204" pitchFamily="34" charset="0"/>
+                  <a:ea typeface="Open Sans" panose="020B0606030504020204" pitchFamily="34" charset="0"/>
+                  <a:cs typeface="Open Sans" panose="020B0606030504020204" pitchFamily="34" charset="0"/>
+                </a:rPr>
+                <a:t>a &gt;= 1000</a:t>
+              </a:r>
+              <a:endParaRPr lang="en-US" sz="1200" dirty="0">
+                <a:solidFill>
+                  <a:schemeClr val="bg1">
+                    <a:lumMod val="85000"/>
+                  </a:schemeClr>
+                </a:solidFill>
+                <a:latin typeface="Open Sans" panose="020B0606030504020204" pitchFamily="34" charset="0"/>
+                <a:ea typeface="Open Sans" panose="020B0606030504020204" pitchFamily="34" charset="0"/>
+                <a:cs typeface="Open Sans" panose="020B0606030504020204" pitchFamily="34" charset="0"/>
+              </a:endParaRPr>
+            </a:p>
+          </p:txBody>
+        </p:sp>
+        <p:sp>
+          <p:nvSpPr>
+            <p:cNvPr id="77" name="Flowchart: Decision 76">
+              <a:extLst>
+                <a:ext uri="{FF2B5EF4-FFF2-40B4-BE49-F238E27FC236}">
+                  <a16:creationId xmlns:a16="http://schemas.microsoft.com/office/drawing/2014/main" id="{D9256475-412E-1A0D-34FF-1F381B20C797}"/>
+                </a:ext>
+              </a:extLst>
+            </p:cNvPr>
+            <p:cNvSpPr/>
+            <p:nvPr/>
+          </p:nvSpPr>
+          <p:spPr>
+            <a:xfrm>
+              <a:off x="8603381" y="4181193"/>
+              <a:ext cx="1844844" cy="946484"/>
+            </a:xfrm>
+            <a:prstGeom prst="flowChartDecision">
+              <a:avLst/>
+            </a:prstGeom>
+            <a:noFill/>
+            <a:ln>
+              <a:solidFill>
+                <a:srgbClr val="FF7C80"/>
+              </a:solidFill>
+            </a:ln>
+          </p:spPr>
+          <p:style>
+            <a:lnRef idx="2">
+              <a:schemeClr val="accent1">
+                <a:shade val="50000"/>
+              </a:schemeClr>
+            </a:lnRef>
+            <a:fillRef idx="1">
+              <a:schemeClr val="accent1"/>
+            </a:fillRef>
+            <a:effectRef idx="0">
+              <a:schemeClr val="accent1"/>
+            </a:effectRef>
+            <a:fontRef idx="minor">
+              <a:schemeClr val="lt1"/>
+            </a:fontRef>
+          </p:style>
+          <p:txBody>
+            <a:bodyPr rtlCol="0" anchor="ctr"/>
+            <a:lstStyle/>
+            <a:p>
+              <a:pPr marL="0" algn="ctr" rtl="0" eaLnBrk="1" latinLnBrk="0" hangingPunct="1">
+                <a:spcBef>
+                  <a:spcPts val="0"/>
+                </a:spcBef>
+                <a:spcAft>
+                  <a:spcPts val="0"/>
+                </a:spcAft>
+              </a:pPr>
+              <a:r>
+                <a:rPr lang="en-US" sz="1200" kern="1200" dirty="0">
+                  <a:solidFill>
+                    <a:srgbClr val="D9D9D9"/>
+                  </a:solidFill>
+                  <a:effectLst/>
+                  <a:latin typeface="Open Sans" panose="020B0606030504020204" pitchFamily="34" charset="0"/>
+                  <a:ea typeface="Open Sans" panose="020B0606030504020204" pitchFamily="34" charset="0"/>
+                  <a:cs typeface="Open Sans" panose="020B0606030504020204" pitchFamily="34" charset="0"/>
+                </a:rPr>
+                <a:t>a &lt; 5</a:t>
+              </a:r>
+              <a:endParaRPr lang="en-US" sz="1000" dirty="0">
+                <a:effectLst/>
+              </a:endParaRPr>
+            </a:p>
+          </p:txBody>
+        </p:sp>
+        <p:sp>
+          <p:nvSpPr>
+            <p:cNvPr id="78" name="Rectangle 77">
+              <a:extLst>
+                <a:ext uri="{FF2B5EF4-FFF2-40B4-BE49-F238E27FC236}">
+                  <a16:creationId xmlns:a16="http://schemas.microsoft.com/office/drawing/2014/main" id="{4BF28973-E108-FFD0-08D0-FC9D1B700EBA}"/>
+                </a:ext>
+              </a:extLst>
+            </p:cNvPr>
+            <p:cNvSpPr/>
+            <p:nvPr/>
+          </p:nvSpPr>
+          <p:spPr>
+            <a:xfrm>
+              <a:off x="6384621" y="3191993"/>
+              <a:ext cx="1844844" cy="438912"/>
+            </a:xfrm>
+            <a:prstGeom prst="rect">
+              <a:avLst/>
+            </a:prstGeom>
+            <a:noFill/>
+            <a:ln>
+              <a:solidFill>
+                <a:schemeClr val="accent6">
+                  <a:lumMod val="60000"/>
+                  <a:lumOff val="40000"/>
+                </a:schemeClr>
+              </a:solidFill>
+            </a:ln>
+          </p:spPr>
+          <p:style>
+            <a:lnRef idx="2">
+              <a:schemeClr val="accent1">
+                <a:shade val="50000"/>
+              </a:schemeClr>
+            </a:lnRef>
+            <a:fillRef idx="1">
+              <a:schemeClr val="accent1"/>
+            </a:fillRef>
+            <a:effectRef idx="0">
+              <a:schemeClr val="accent1"/>
+            </a:effectRef>
+            <a:fontRef idx="minor">
+              <a:schemeClr val="lt1"/>
+            </a:fontRef>
+          </p:style>
+          <p:txBody>
+            <a:bodyPr rtlCol="0" anchor="ctr"/>
+            <a:lstStyle/>
+            <a:p>
+              <a:pPr algn="ctr"/>
+              <a:r>
+                <a:rPr lang="en-US" sz="1200" dirty="0">
+                  <a:solidFill>
+                    <a:schemeClr val="bg1">
+                      <a:lumMod val="85000"/>
+                    </a:schemeClr>
+                  </a:solidFill>
+                  <a:latin typeface="Open Sans" panose="020B0606030504020204" pitchFamily="34" charset="0"/>
+                  <a:ea typeface="Open Sans" panose="020B0606030504020204" pitchFamily="34" charset="0"/>
+                  <a:cs typeface="Open Sans" panose="020B0606030504020204" pitchFamily="34" charset="0"/>
+                </a:rPr>
+                <a:t>m = “Wow... So huge”</a:t>
+              </a:r>
+            </a:p>
+          </p:txBody>
+        </p:sp>
+        <p:sp>
+          <p:nvSpPr>
+            <p:cNvPr id="79" name="Rectangle 78">
+              <a:extLst>
+                <a:ext uri="{FF2B5EF4-FFF2-40B4-BE49-F238E27FC236}">
+                  <a16:creationId xmlns:a16="http://schemas.microsoft.com/office/drawing/2014/main" id="{501EE041-23DA-6DF0-0005-2D820F9334C4}"/>
+                </a:ext>
+              </a:extLst>
+            </p:cNvPr>
+            <p:cNvSpPr/>
+            <p:nvPr/>
+          </p:nvSpPr>
+          <p:spPr>
+            <a:xfrm>
+              <a:off x="6384621" y="4434979"/>
+              <a:ext cx="1844844" cy="438912"/>
+            </a:xfrm>
+            <a:prstGeom prst="rect">
+              <a:avLst/>
+            </a:prstGeom>
+            <a:noFill/>
+            <a:ln>
+              <a:solidFill>
+                <a:schemeClr val="accent6">
+                  <a:lumMod val="60000"/>
+                  <a:lumOff val="40000"/>
+                </a:schemeClr>
+              </a:solidFill>
+            </a:ln>
+          </p:spPr>
+          <p:style>
+            <a:lnRef idx="2">
+              <a:schemeClr val="accent1">
+                <a:shade val="50000"/>
+              </a:schemeClr>
+            </a:lnRef>
+            <a:fillRef idx="1">
+              <a:schemeClr val="accent1"/>
+            </a:fillRef>
+            <a:effectRef idx="0">
+              <a:schemeClr val="accent1"/>
+            </a:effectRef>
+            <a:fontRef idx="minor">
+              <a:schemeClr val="lt1"/>
+            </a:fontRef>
+          </p:style>
+          <p:txBody>
+            <a:bodyPr rtlCol="0" anchor="ctr"/>
+            <a:lstStyle/>
+            <a:p>
+              <a:pPr algn="ctr"/>
+              <a:r>
+                <a:rPr lang="en-US" sz="1200" dirty="0">
+                  <a:solidFill>
+                    <a:schemeClr val="bg1">
+                      <a:lumMod val="85000"/>
+                    </a:schemeClr>
+                  </a:solidFill>
+                  <a:latin typeface="Open Sans" panose="020B0606030504020204" pitchFamily="34" charset="0"/>
+                  <a:ea typeface="Open Sans" panose="020B0606030504020204" pitchFamily="34" charset="0"/>
+                  <a:cs typeface="Open Sans" panose="020B0606030504020204" pitchFamily="34" charset="0"/>
+                </a:rPr>
+                <a:t>m = “Miniature”</a:t>
+              </a:r>
+            </a:p>
+          </p:txBody>
+        </p:sp>
+        <p:sp>
+          <p:nvSpPr>
+            <p:cNvPr id="80" name="Rectangle 79">
+              <a:extLst>
+                <a:ext uri="{FF2B5EF4-FFF2-40B4-BE49-F238E27FC236}">
+                  <a16:creationId xmlns:a16="http://schemas.microsoft.com/office/drawing/2014/main" id="{9B5D7148-7150-72EF-CF21-878FA38F293B}"/>
+                </a:ext>
+              </a:extLst>
+            </p:cNvPr>
+            <p:cNvSpPr/>
+            <p:nvPr/>
+          </p:nvSpPr>
+          <p:spPr>
+            <a:xfrm>
+              <a:off x="6384621" y="5309942"/>
+              <a:ext cx="1844844" cy="438912"/>
+            </a:xfrm>
+            <a:prstGeom prst="rect">
+              <a:avLst/>
+            </a:prstGeom>
+            <a:noFill/>
+            <a:ln>
+              <a:solidFill>
+                <a:schemeClr val="accent6">
+                  <a:lumMod val="60000"/>
+                  <a:lumOff val="40000"/>
+                </a:schemeClr>
+              </a:solidFill>
+            </a:ln>
+          </p:spPr>
+          <p:style>
+            <a:lnRef idx="2">
+              <a:schemeClr val="accent1">
+                <a:shade val="50000"/>
+              </a:schemeClr>
+            </a:lnRef>
+            <a:fillRef idx="1">
+              <a:schemeClr val="accent1"/>
+            </a:fillRef>
+            <a:effectRef idx="0">
+              <a:schemeClr val="accent1"/>
+            </a:effectRef>
+            <a:fontRef idx="minor">
+              <a:schemeClr val="lt1"/>
+            </a:fontRef>
+          </p:style>
+          <p:txBody>
+            <a:bodyPr rtlCol="0" anchor="ctr"/>
+            <a:lstStyle/>
+            <a:p>
+              <a:pPr algn="ctr"/>
+              <a:r>
+                <a:rPr lang="en-US" sz="1200" dirty="0">
+                  <a:solidFill>
+                    <a:schemeClr val="bg1">
+                      <a:lumMod val="85000"/>
+                    </a:schemeClr>
+                  </a:solidFill>
+                  <a:latin typeface="Open Sans" panose="020B0606030504020204" pitchFamily="34" charset="0"/>
+                  <a:ea typeface="Open Sans" panose="020B0606030504020204" pitchFamily="34" charset="0"/>
+                  <a:cs typeface="Open Sans" panose="020B0606030504020204" pitchFamily="34" charset="0"/>
+                </a:rPr>
+                <a:t>m = “Just nice”</a:t>
+              </a:r>
+            </a:p>
+          </p:txBody>
+        </p:sp>
+        <p:sp>
+          <p:nvSpPr>
+            <p:cNvPr id="81" name="Flowchart: Data 80">
+              <a:extLst>
+                <a:ext uri="{FF2B5EF4-FFF2-40B4-BE49-F238E27FC236}">
+                  <a16:creationId xmlns:a16="http://schemas.microsoft.com/office/drawing/2014/main" id="{B0A6FD6F-E46E-4BA5-507E-008C62A20C2D}"/>
+                </a:ext>
+              </a:extLst>
+            </p:cNvPr>
+            <p:cNvSpPr/>
+            <p:nvPr/>
+          </p:nvSpPr>
+          <p:spPr>
+            <a:xfrm>
+              <a:off x="4165861" y="3166807"/>
+              <a:ext cx="1844844" cy="489284"/>
+            </a:xfrm>
+            <a:prstGeom prst="flowChartInputOutput">
+              <a:avLst/>
+            </a:prstGeom>
+            <a:noFill/>
+            <a:ln>
+              <a:solidFill>
+                <a:srgbClr val="CC99FF"/>
+              </a:solidFill>
+            </a:ln>
+          </p:spPr>
+          <p:style>
+            <a:lnRef idx="2">
+              <a:schemeClr val="accent1">
+                <a:shade val="50000"/>
+              </a:schemeClr>
+            </a:lnRef>
+            <a:fillRef idx="1">
+              <a:schemeClr val="accent1"/>
+            </a:fillRef>
+            <a:effectRef idx="0">
+              <a:schemeClr val="accent1"/>
+            </a:effectRef>
+            <a:fontRef idx="minor">
+              <a:schemeClr val="lt1"/>
+            </a:fontRef>
+          </p:style>
+          <p:txBody>
+            <a:bodyPr rtlCol="0" anchor="ctr"/>
+            <a:lstStyle/>
+            <a:p>
+              <a:pPr algn="ctr"/>
+              <a:r>
+                <a:rPr lang="en-US" sz="1200" dirty="0">
+                  <a:solidFill>
+                    <a:schemeClr val="bg1">
+                      <a:lumMod val="85000"/>
+                    </a:schemeClr>
+                  </a:solidFill>
+                  <a:latin typeface="Open Sans" panose="020B0606030504020204" pitchFamily="34" charset="0"/>
+                  <a:ea typeface="Open Sans" panose="020B0606030504020204" pitchFamily="34" charset="0"/>
+                  <a:cs typeface="Open Sans" panose="020B0606030504020204" pitchFamily="34" charset="0"/>
+                </a:rPr>
+                <a:t>Print m</a:t>
+              </a:r>
+            </a:p>
+          </p:txBody>
+        </p:sp>
+        <p:sp>
+          <p:nvSpPr>
+            <p:cNvPr id="82" name="Rectangle 81">
+              <a:extLst>
+                <a:ext uri="{FF2B5EF4-FFF2-40B4-BE49-F238E27FC236}">
+                  <a16:creationId xmlns:a16="http://schemas.microsoft.com/office/drawing/2014/main" id="{B5748EDB-B46B-7A7B-C3E9-7A15C4ACB038}"/>
+                </a:ext>
+              </a:extLst>
+            </p:cNvPr>
+            <p:cNvSpPr/>
+            <p:nvPr/>
+          </p:nvSpPr>
+          <p:spPr>
+            <a:xfrm>
+              <a:off x="4170499" y="2169001"/>
+              <a:ext cx="1844844" cy="393032"/>
+            </a:xfrm>
+            <a:prstGeom prst="rect">
+              <a:avLst/>
+            </a:prstGeom>
+            <a:noFill/>
+            <a:ln>
+              <a:solidFill>
+                <a:schemeClr val="accent6">
+                  <a:lumMod val="60000"/>
+                  <a:lumOff val="40000"/>
+                </a:schemeClr>
+              </a:solidFill>
+            </a:ln>
+          </p:spPr>
+          <p:style>
+            <a:lnRef idx="2">
+              <a:schemeClr val="accent1">
+                <a:shade val="50000"/>
+              </a:schemeClr>
+            </a:lnRef>
+            <a:fillRef idx="1">
+              <a:schemeClr val="accent1"/>
+            </a:fillRef>
+            <a:effectRef idx="0">
+              <a:schemeClr val="accent1"/>
+            </a:effectRef>
+            <a:fontRef idx="minor">
+              <a:schemeClr val="lt1"/>
+            </a:fontRef>
+          </p:style>
+          <p:txBody>
+            <a:bodyPr rtlCol="0" anchor="ctr"/>
+            <a:lstStyle/>
+            <a:p>
+              <a:pPr algn="ctr"/>
+              <a:r>
+                <a:rPr lang="en-US" sz="1200" dirty="0">
+                  <a:solidFill>
+                    <a:schemeClr val="bg1">
+                      <a:lumMod val="85000"/>
+                    </a:schemeClr>
+                  </a:solidFill>
+                  <a:latin typeface="Open Sans" panose="020B0606030504020204" pitchFamily="34" charset="0"/>
+                  <a:ea typeface="Open Sans" panose="020B0606030504020204" pitchFamily="34" charset="0"/>
+                  <a:cs typeface="Open Sans" panose="020B0606030504020204" pitchFamily="34" charset="0"/>
+                </a:rPr>
+                <a:t>counter = counter + 1</a:t>
+              </a:r>
+            </a:p>
+          </p:txBody>
+        </p:sp>
+        <p:cxnSp>
+          <p:nvCxnSpPr>
+            <p:cNvPr id="28" name="Straight Arrow Connector 27">
+              <a:extLst>
+                <a:ext uri="{FF2B5EF4-FFF2-40B4-BE49-F238E27FC236}">
+                  <a16:creationId xmlns:a16="http://schemas.microsoft.com/office/drawing/2014/main" id="{4ACB90F0-6BC7-6733-3F6B-11EC9B401037}"/>
+                </a:ext>
+              </a:extLst>
+            </p:cNvPr>
+            <p:cNvCxnSpPr>
+              <a:cxnSpLocks/>
+              <a:stCxn id="54" idx="3"/>
+              <a:endCxn id="56" idx="1"/>
+            </p:cNvCxnSpPr>
+            <p:nvPr/>
+          </p:nvCxnSpPr>
+          <p:spPr>
+            <a:xfrm>
+              <a:off x="6015343" y="1552991"/>
+              <a:ext cx="369278" cy="3215"/>
+            </a:xfrm>
+            <a:prstGeom prst="straightConnector1">
+              <a:avLst/>
+            </a:prstGeom>
+            <a:ln w="12700">
+              <a:solidFill>
+                <a:schemeClr val="bg1">
+                  <a:lumMod val="75000"/>
+                </a:schemeClr>
+              </a:solidFill>
+              <a:tailEnd type="triangle"/>
+            </a:ln>
+          </p:spPr>
+          <p:style>
+            <a:lnRef idx="1">
+              <a:schemeClr val="accent1"/>
+            </a:lnRef>
+            <a:fillRef idx="0">
+              <a:schemeClr val="accent1"/>
+            </a:fillRef>
+            <a:effectRef idx="0">
+              <a:schemeClr val="accent1"/>
+            </a:effectRef>
+            <a:fontRef idx="minor">
+              <a:schemeClr val="tx1"/>
+            </a:fontRef>
+          </p:style>
+        </p:cxnSp>
+        <p:cxnSp>
+          <p:nvCxnSpPr>
+            <p:cNvPr id="83" name="Straight Arrow Connector 82">
+              <a:extLst>
+                <a:ext uri="{FF2B5EF4-FFF2-40B4-BE49-F238E27FC236}">
+                  <a16:creationId xmlns:a16="http://schemas.microsoft.com/office/drawing/2014/main" id="{FD72F9BF-69BF-B68D-B145-69CCD0DC850B}"/>
+                </a:ext>
+              </a:extLst>
+            </p:cNvPr>
+            <p:cNvCxnSpPr>
+              <a:cxnSpLocks/>
+              <a:endCxn id="72" idx="2"/>
+            </p:cNvCxnSpPr>
+            <p:nvPr/>
+          </p:nvCxnSpPr>
+          <p:spPr>
+            <a:xfrm>
+              <a:off x="8229465" y="1548185"/>
+              <a:ext cx="558400" cy="0"/>
+            </a:xfrm>
+            <a:prstGeom prst="straightConnector1">
+              <a:avLst/>
+            </a:prstGeom>
+            <a:ln w="12700">
+              <a:solidFill>
+                <a:srgbClr val="FF7C80"/>
+              </a:solidFill>
+              <a:tailEnd type="triangle"/>
+            </a:ln>
+          </p:spPr>
+          <p:style>
+            <a:lnRef idx="1">
+              <a:schemeClr val="accent1"/>
+            </a:lnRef>
+            <a:fillRef idx="0">
+              <a:schemeClr val="accent1"/>
+            </a:fillRef>
+            <a:effectRef idx="0">
+              <a:schemeClr val="accent1"/>
+            </a:effectRef>
+            <a:fontRef idx="minor">
+              <a:schemeClr val="tx1"/>
+            </a:fontRef>
+          </p:style>
+        </p:cxnSp>
+        <p:cxnSp>
+          <p:nvCxnSpPr>
+            <p:cNvPr id="85" name="Straight Arrow Connector 84">
+              <a:extLst>
+                <a:ext uri="{FF2B5EF4-FFF2-40B4-BE49-F238E27FC236}">
+                  <a16:creationId xmlns:a16="http://schemas.microsoft.com/office/drawing/2014/main" id="{92BB538A-EB96-2C3A-E662-9137EF69F2D8}"/>
+                </a:ext>
+              </a:extLst>
+            </p:cNvPr>
+            <p:cNvCxnSpPr>
+              <a:stCxn id="72" idx="4"/>
+              <a:endCxn id="71" idx="0"/>
+            </p:cNvCxnSpPr>
+            <p:nvPr/>
+          </p:nvCxnSpPr>
+          <p:spPr>
+            <a:xfrm>
+              <a:off x="9525803" y="1792827"/>
+              <a:ext cx="0" cy="298370"/>
+            </a:xfrm>
+            <a:prstGeom prst="straightConnector1">
+              <a:avLst/>
+            </a:prstGeom>
+            <a:ln w="12700">
+              <a:solidFill>
+                <a:schemeClr val="accent1">
+                  <a:lumMod val="60000"/>
+                  <a:lumOff val="40000"/>
+                </a:schemeClr>
+              </a:solidFill>
+              <a:tailEnd type="triangle"/>
+            </a:ln>
+          </p:spPr>
+          <p:style>
+            <a:lnRef idx="1">
+              <a:schemeClr val="accent1"/>
+            </a:lnRef>
+            <a:fillRef idx="0">
+              <a:schemeClr val="accent1"/>
+            </a:fillRef>
+            <a:effectRef idx="0">
+              <a:schemeClr val="accent1"/>
+            </a:effectRef>
+            <a:fontRef idx="minor">
+              <a:schemeClr val="tx1"/>
+            </a:fontRef>
+          </p:style>
+        </p:cxnSp>
+        <p:cxnSp>
+          <p:nvCxnSpPr>
+            <p:cNvPr id="87" name="Straight Arrow Connector 86">
+              <a:extLst>
+                <a:ext uri="{FF2B5EF4-FFF2-40B4-BE49-F238E27FC236}">
+                  <a16:creationId xmlns:a16="http://schemas.microsoft.com/office/drawing/2014/main" id="{15C31B66-089F-D195-B5E2-C7E1397A1F93}"/>
+                </a:ext>
+              </a:extLst>
+            </p:cNvPr>
+            <p:cNvCxnSpPr>
+              <a:stCxn id="71" idx="2"/>
+              <a:endCxn id="73" idx="0"/>
+            </p:cNvCxnSpPr>
+            <p:nvPr/>
+          </p:nvCxnSpPr>
+          <p:spPr>
+            <a:xfrm>
+              <a:off x="9525803" y="2639837"/>
+              <a:ext cx="0" cy="298370"/>
+            </a:xfrm>
+            <a:prstGeom prst="straightConnector1">
+              <a:avLst/>
+            </a:prstGeom>
+            <a:ln w="12700">
+              <a:solidFill>
+                <a:schemeClr val="bg1">
+                  <a:lumMod val="75000"/>
+                </a:schemeClr>
+              </a:solidFill>
+              <a:tailEnd type="triangle"/>
+            </a:ln>
+          </p:spPr>
+          <p:style>
+            <a:lnRef idx="1">
+              <a:schemeClr val="accent1"/>
+            </a:lnRef>
+            <a:fillRef idx="0">
+              <a:schemeClr val="accent1"/>
+            </a:fillRef>
+            <a:effectRef idx="0">
+              <a:schemeClr val="accent1"/>
+            </a:effectRef>
+            <a:fontRef idx="minor">
+              <a:schemeClr val="tx1"/>
+            </a:fontRef>
+          </p:style>
+        </p:cxnSp>
+        <p:cxnSp>
+          <p:nvCxnSpPr>
+            <p:cNvPr id="89" name="Straight Arrow Connector 88">
+              <a:extLst>
+                <a:ext uri="{FF2B5EF4-FFF2-40B4-BE49-F238E27FC236}">
+                  <a16:creationId xmlns:a16="http://schemas.microsoft.com/office/drawing/2014/main" id="{3B5F4497-95E5-FC4A-1A1A-FDDA4BBF5788}"/>
+                </a:ext>
+              </a:extLst>
+            </p:cNvPr>
+            <p:cNvCxnSpPr>
+              <a:stCxn id="73" idx="2"/>
+              <a:endCxn id="77" idx="0"/>
+            </p:cNvCxnSpPr>
+            <p:nvPr/>
+          </p:nvCxnSpPr>
+          <p:spPr>
+            <a:xfrm>
+              <a:off x="9525803" y="3884691"/>
+              <a:ext cx="0" cy="296502"/>
+            </a:xfrm>
+            <a:prstGeom prst="straightConnector1">
+              <a:avLst/>
+            </a:prstGeom>
+            <a:ln w="12700">
+              <a:solidFill>
+                <a:srgbClr val="FF7C80"/>
+              </a:solidFill>
+              <a:tailEnd type="triangle"/>
+            </a:ln>
+          </p:spPr>
+          <p:style>
+            <a:lnRef idx="1">
+              <a:schemeClr val="accent1"/>
+            </a:lnRef>
+            <a:fillRef idx="0">
+              <a:schemeClr val="accent1"/>
+            </a:fillRef>
+            <a:effectRef idx="0">
+              <a:schemeClr val="accent1"/>
+            </a:effectRef>
+            <a:fontRef idx="minor">
+              <a:schemeClr val="tx1"/>
+            </a:fontRef>
+          </p:style>
+        </p:cxnSp>
+        <p:cxnSp>
+          <p:nvCxnSpPr>
+            <p:cNvPr id="91" name="Straight Arrow Connector 90">
+              <a:extLst>
+                <a:ext uri="{FF2B5EF4-FFF2-40B4-BE49-F238E27FC236}">
+                  <a16:creationId xmlns:a16="http://schemas.microsoft.com/office/drawing/2014/main" id="{2C4EC1B2-C70C-D100-70F3-91ECC18A5DA9}"/>
+                </a:ext>
+              </a:extLst>
+            </p:cNvPr>
+            <p:cNvCxnSpPr>
+              <a:stCxn id="78" idx="1"/>
+              <a:endCxn id="81" idx="5"/>
+            </p:cNvCxnSpPr>
+            <p:nvPr/>
+          </p:nvCxnSpPr>
+          <p:spPr>
+            <a:xfrm flipH="1">
+              <a:off x="5826221" y="3411449"/>
+              <a:ext cx="558400" cy="0"/>
+            </a:xfrm>
+            <a:prstGeom prst="straightConnector1">
+              <a:avLst/>
+            </a:prstGeom>
+            <a:ln w="12700">
+              <a:solidFill>
+                <a:schemeClr val="bg1">
+                  <a:lumMod val="75000"/>
+                </a:schemeClr>
+              </a:solidFill>
+              <a:tailEnd type="triangle"/>
+            </a:ln>
+          </p:spPr>
+          <p:style>
+            <a:lnRef idx="1">
+              <a:schemeClr val="accent1"/>
+            </a:lnRef>
+            <a:fillRef idx="0">
+              <a:schemeClr val="accent1"/>
+            </a:fillRef>
+            <a:effectRef idx="0">
+              <a:schemeClr val="accent1"/>
+            </a:effectRef>
+            <a:fontRef idx="minor">
+              <a:schemeClr val="tx1"/>
+            </a:fontRef>
+          </p:style>
+        </p:cxnSp>
+        <p:cxnSp>
+          <p:nvCxnSpPr>
+            <p:cNvPr id="93" name="Straight Arrow Connector 92">
+              <a:extLst>
+                <a:ext uri="{FF2B5EF4-FFF2-40B4-BE49-F238E27FC236}">
+                  <a16:creationId xmlns:a16="http://schemas.microsoft.com/office/drawing/2014/main" id="{2425586E-ED4C-0E53-918E-8DCD12D80FAD}"/>
+                </a:ext>
+              </a:extLst>
+            </p:cNvPr>
+            <p:cNvCxnSpPr>
+              <a:stCxn id="81" idx="1"/>
+              <a:endCxn id="82" idx="2"/>
+            </p:cNvCxnSpPr>
+            <p:nvPr/>
+          </p:nvCxnSpPr>
+          <p:spPr>
+            <a:xfrm flipV="1">
+              <a:off x="5088283" y="2562033"/>
+              <a:ext cx="4638" cy="604774"/>
+            </a:xfrm>
+            <a:prstGeom prst="straightConnector1">
+              <a:avLst/>
+            </a:prstGeom>
+            <a:ln w="12700">
+              <a:solidFill>
+                <a:srgbClr val="CC99FF"/>
+              </a:solidFill>
+              <a:tailEnd type="triangle"/>
+            </a:ln>
+          </p:spPr>
+          <p:style>
+            <a:lnRef idx="1">
+              <a:schemeClr val="accent1"/>
+            </a:lnRef>
+            <a:fillRef idx="0">
+              <a:schemeClr val="accent1"/>
+            </a:fillRef>
+            <a:effectRef idx="0">
+              <a:schemeClr val="accent1"/>
+            </a:effectRef>
+            <a:fontRef idx="minor">
+              <a:schemeClr val="tx1"/>
+            </a:fontRef>
+          </p:style>
+        </p:cxnSp>
+        <p:cxnSp>
+          <p:nvCxnSpPr>
+            <p:cNvPr id="95" name="Straight Arrow Connector 94">
+              <a:extLst>
+                <a:ext uri="{FF2B5EF4-FFF2-40B4-BE49-F238E27FC236}">
+                  <a16:creationId xmlns:a16="http://schemas.microsoft.com/office/drawing/2014/main" id="{862735E6-CF5E-A885-F541-6235DB285FD9}"/>
+                </a:ext>
+              </a:extLst>
+            </p:cNvPr>
+            <p:cNvCxnSpPr>
+              <a:stCxn id="73" idx="1"/>
+              <a:endCxn id="78" idx="3"/>
+            </p:cNvCxnSpPr>
+            <p:nvPr/>
+          </p:nvCxnSpPr>
+          <p:spPr>
+            <a:xfrm flipH="1">
+              <a:off x="8229465" y="3411449"/>
+              <a:ext cx="373916" cy="0"/>
+            </a:xfrm>
+            <a:prstGeom prst="straightConnector1">
+              <a:avLst/>
+            </a:prstGeom>
+            <a:ln w="12700">
+              <a:solidFill>
+                <a:srgbClr val="FF7C80"/>
+              </a:solidFill>
+              <a:tailEnd type="triangle"/>
+            </a:ln>
+          </p:spPr>
+          <p:style>
+            <a:lnRef idx="1">
+              <a:schemeClr val="accent1"/>
+            </a:lnRef>
+            <a:fillRef idx="0">
+              <a:schemeClr val="accent1"/>
+            </a:fillRef>
+            <a:effectRef idx="0">
+              <a:schemeClr val="accent1"/>
+            </a:effectRef>
+            <a:fontRef idx="minor">
+              <a:schemeClr val="tx1"/>
+            </a:fontRef>
+          </p:style>
+        </p:cxnSp>
+        <p:cxnSp>
+          <p:nvCxnSpPr>
+            <p:cNvPr id="97" name="Straight Arrow Connector 96">
+              <a:extLst>
+                <a:ext uri="{FF2B5EF4-FFF2-40B4-BE49-F238E27FC236}">
+                  <a16:creationId xmlns:a16="http://schemas.microsoft.com/office/drawing/2014/main" id="{DD75EED2-CEB3-41D8-4719-918FD0F3B39D}"/>
+                </a:ext>
+              </a:extLst>
+            </p:cNvPr>
+            <p:cNvCxnSpPr>
+              <a:stCxn id="77" idx="1"/>
+              <a:endCxn id="79" idx="3"/>
+            </p:cNvCxnSpPr>
+            <p:nvPr/>
+          </p:nvCxnSpPr>
+          <p:spPr>
+            <a:xfrm flipH="1">
+              <a:off x="8229465" y="4654435"/>
+              <a:ext cx="373916" cy="0"/>
+            </a:xfrm>
+            <a:prstGeom prst="straightConnector1">
+              <a:avLst/>
+            </a:prstGeom>
+            <a:ln w="12700">
+              <a:solidFill>
+                <a:srgbClr val="FF7C80"/>
+              </a:solidFill>
+              <a:tailEnd type="triangle"/>
+            </a:ln>
+          </p:spPr>
+          <p:style>
+            <a:lnRef idx="1">
+              <a:schemeClr val="accent1"/>
+            </a:lnRef>
+            <a:fillRef idx="0">
+              <a:schemeClr val="accent1"/>
+            </a:fillRef>
+            <a:effectRef idx="0">
+              <a:schemeClr val="accent1"/>
+            </a:effectRef>
+            <a:fontRef idx="minor">
+              <a:schemeClr val="tx1"/>
+            </a:fontRef>
+          </p:style>
+        </p:cxnSp>
+        <p:cxnSp>
+          <p:nvCxnSpPr>
+            <p:cNvPr id="99" name="Connector: Elbow 98">
+              <a:extLst>
+                <a:ext uri="{FF2B5EF4-FFF2-40B4-BE49-F238E27FC236}">
+                  <a16:creationId xmlns:a16="http://schemas.microsoft.com/office/drawing/2014/main" id="{5B4F861A-9FBD-198A-FCBC-3651530F18AB}"/>
+                </a:ext>
+              </a:extLst>
+            </p:cNvPr>
+            <p:cNvCxnSpPr>
+              <a:stCxn id="80" idx="1"/>
+              <a:endCxn id="81" idx="4"/>
+            </p:cNvCxnSpPr>
+            <p:nvPr/>
+          </p:nvCxnSpPr>
+          <p:spPr>
+            <a:xfrm rot="10800000">
+              <a:off x="5088283" y="3656092"/>
+              <a:ext cx="1296338" cy="1873307"/>
+            </a:xfrm>
+            <a:prstGeom prst="bentConnector2">
+              <a:avLst/>
+            </a:prstGeom>
+            <a:ln w="12700">
+              <a:solidFill>
+                <a:schemeClr val="bg1">
+                  <a:lumMod val="75000"/>
+                </a:schemeClr>
+              </a:solidFill>
+              <a:tailEnd type="triangle"/>
+            </a:ln>
+          </p:spPr>
+          <p:style>
+            <a:lnRef idx="1">
+              <a:schemeClr val="accent1"/>
+            </a:lnRef>
+            <a:fillRef idx="0">
+              <a:schemeClr val="accent1"/>
+            </a:fillRef>
+            <a:effectRef idx="0">
+              <a:schemeClr val="accent1"/>
+            </a:effectRef>
+            <a:fontRef idx="minor">
+              <a:schemeClr val="tx1"/>
+            </a:fontRef>
+          </p:style>
+        </p:cxnSp>
+        <p:cxnSp>
+          <p:nvCxnSpPr>
+            <p:cNvPr id="101" name="Connector: Elbow 100">
+              <a:extLst>
+                <a:ext uri="{FF2B5EF4-FFF2-40B4-BE49-F238E27FC236}">
+                  <a16:creationId xmlns:a16="http://schemas.microsoft.com/office/drawing/2014/main" id="{2C4662FA-5774-9619-8971-EE1479B65781}"/>
+                </a:ext>
+              </a:extLst>
+            </p:cNvPr>
+            <p:cNvCxnSpPr>
+              <a:stCxn id="82" idx="3"/>
+              <a:endCxn id="56" idx="2"/>
+            </p:cNvCxnSpPr>
+            <p:nvPr/>
+          </p:nvCxnSpPr>
+          <p:spPr>
+            <a:xfrm flipV="1">
+              <a:off x="6015343" y="2029448"/>
+              <a:ext cx="1291700" cy="336069"/>
+            </a:xfrm>
+            <a:prstGeom prst="bentConnector2">
+              <a:avLst/>
+            </a:prstGeom>
+            <a:ln w="12700">
+              <a:solidFill>
+                <a:schemeClr val="bg1">
+                  <a:lumMod val="75000"/>
+                </a:schemeClr>
+              </a:solidFill>
+              <a:tailEnd type="triangle"/>
+            </a:ln>
+          </p:spPr>
+          <p:style>
+            <a:lnRef idx="1">
+              <a:schemeClr val="accent1"/>
+            </a:lnRef>
+            <a:fillRef idx="0">
+              <a:schemeClr val="accent1"/>
+            </a:fillRef>
+            <a:effectRef idx="0">
+              <a:schemeClr val="accent1"/>
+            </a:effectRef>
+            <a:fontRef idx="minor">
+              <a:schemeClr val="tx1"/>
+            </a:fontRef>
+          </p:style>
+        </p:cxnSp>
+        <p:cxnSp>
+          <p:nvCxnSpPr>
+            <p:cNvPr id="103" name="Connector: Elbow 102">
+              <a:extLst>
+                <a:ext uri="{FF2B5EF4-FFF2-40B4-BE49-F238E27FC236}">
+                  <a16:creationId xmlns:a16="http://schemas.microsoft.com/office/drawing/2014/main" id="{C71AC86E-B058-D35E-E956-C8A08BFF485F}"/>
+                </a:ext>
+              </a:extLst>
+            </p:cNvPr>
+            <p:cNvCxnSpPr>
+              <a:cxnSpLocks/>
+              <a:stCxn id="56" idx="0"/>
+              <a:endCxn id="60" idx="1"/>
+            </p:cNvCxnSpPr>
+            <p:nvPr/>
+          </p:nvCxnSpPr>
+          <p:spPr>
+            <a:xfrm rot="5400000" flipH="1" flipV="1">
+              <a:off x="8034221" y="116762"/>
+              <a:ext cx="239024" cy="1693381"/>
+            </a:xfrm>
+            <a:prstGeom prst="bentConnector2">
+              <a:avLst/>
+            </a:prstGeom>
+            <a:ln w="12700">
+              <a:solidFill>
+                <a:srgbClr val="FF7C80"/>
+              </a:solidFill>
+              <a:tailEnd type="triangle"/>
+            </a:ln>
+          </p:spPr>
+          <p:style>
+            <a:lnRef idx="1">
+              <a:schemeClr val="accent1"/>
+            </a:lnRef>
+            <a:fillRef idx="0">
+              <a:schemeClr val="accent1"/>
+            </a:fillRef>
+            <a:effectRef idx="0">
+              <a:schemeClr val="accent1"/>
+            </a:effectRef>
+            <a:fontRef idx="minor">
+              <a:schemeClr val="tx1"/>
+            </a:fontRef>
+          </p:style>
+        </p:cxnSp>
+        <p:cxnSp>
+          <p:nvCxnSpPr>
+            <p:cNvPr id="109" name="Connector: Elbow 108">
+              <a:extLst>
+                <a:ext uri="{FF2B5EF4-FFF2-40B4-BE49-F238E27FC236}">
+                  <a16:creationId xmlns:a16="http://schemas.microsoft.com/office/drawing/2014/main" id="{1F284A35-61E0-170C-2D13-7605EB77A28A}"/>
+                </a:ext>
+              </a:extLst>
+            </p:cNvPr>
+            <p:cNvCxnSpPr>
+              <a:stCxn id="77" idx="2"/>
+              <a:endCxn id="80" idx="3"/>
+            </p:cNvCxnSpPr>
+            <p:nvPr/>
+          </p:nvCxnSpPr>
+          <p:spPr>
+            <a:xfrm rot="5400000">
+              <a:off x="8676774" y="4680368"/>
+              <a:ext cx="401721" cy="1296338"/>
+            </a:xfrm>
+            <a:prstGeom prst="bentConnector2">
+              <a:avLst/>
+            </a:prstGeom>
+            <a:ln w="12700">
+              <a:solidFill>
+                <a:srgbClr val="FF7C80"/>
+              </a:solidFill>
+              <a:tailEnd type="triangle"/>
+            </a:ln>
+          </p:spPr>
+          <p:style>
+            <a:lnRef idx="1">
+              <a:schemeClr val="accent1"/>
+            </a:lnRef>
+            <a:fillRef idx="0">
+              <a:schemeClr val="accent1"/>
+            </a:fillRef>
+            <a:effectRef idx="0">
+              <a:schemeClr val="accent1"/>
+            </a:effectRef>
+            <a:fontRef idx="minor">
+              <a:schemeClr val="tx1"/>
+            </a:fontRef>
+          </p:style>
+        </p:cxnSp>
+        <p:cxnSp>
+          <p:nvCxnSpPr>
+            <p:cNvPr id="112" name="Straight Connector 111">
+              <a:extLst>
+                <a:ext uri="{FF2B5EF4-FFF2-40B4-BE49-F238E27FC236}">
+                  <a16:creationId xmlns:a16="http://schemas.microsoft.com/office/drawing/2014/main" id="{E8E11C6D-BBBA-7285-C64A-430F8D2C429A}"/>
+                </a:ext>
+              </a:extLst>
+            </p:cNvPr>
+            <p:cNvCxnSpPr>
+              <a:cxnSpLocks/>
+              <a:stCxn id="79" idx="1"/>
+            </p:cNvCxnSpPr>
+            <p:nvPr/>
+          </p:nvCxnSpPr>
+          <p:spPr>
+            <a:xfrm flipH="1">
+              <a:off x="5088282" y="4654435"/>
+              <a:ext cx="1296339" cy="0"/>
+            </a:xfrm>
+            <a:prstGeom prst="line">
+              <a:avLst/>
+            </a:prstGeom>
+            <a:ln w="12700">
+              <a:solidFill>
+                <a:schemeClr val="bg1">
+                  <a:lumMod val="75000"/>
+                </a:schemeClr>
+              </a:solidFill>
+            </a:ln>
+          </p:spPr>
+          <p:style>
+            <a:lnRef idx="1">
+              <a:schemeClr val="accent1"/>
+            </a:lnRef>
+            <a:fillRef idx="0">
+              <a:schemeClr val="accent1"/>
+            </a:fillRef>
+            <a:effectRef idx="0">
+              <a:schemeClr val="accent1"/>
+            </a:effectRef>
+            <a:fontRef idx="minor">
+              <a:schemeClr val="tx1"/>
+            </a:fontRef>
+          </p:style>
+        </p:cxnSp>
+        <p:sp>
+          <p:nvSpPr>
+            <p:cNvPr id="116" name="TextBox 115">
+              <a:extLst>
+                <a:ext uri="{FF2B5EF4-FFF2-40B4-BE49-F238E27FC236}">
+                  <a16:creationId xmlns:a16="http://schemas.microsoft.com/office/drawing/2014/main" id="{DC90CD87-17A0-A9A0-5D29-7880B6E5C36B}"/>
+                </a:ext>
+              </a:extLst>
+            </p:cNvPr>
+            <p:cNvSpPr txBox="1"/>
+            <p:nvPr/>
+          </p:nvSpPr>
+          <p:spPr>
+            <a:xfrm>
+              <a:off x="8332083" y="4375661"/>
+              <a:ext cx="269626" cy="276999"/>
+            </a:xfrm>
+            <a:prstGeom prst="rect">
+              <a:avLst/>
+            </a:prstGeom>
+            <a:noFill/>
+          </p:spPr>
+          <p:txBody>
+            <a:bodyPr wrap="none" rtlCol="0">
+              <a:spAutoFit/>
+            </a:bodyPr>
+            <a:lstStyle/>
+            <a:p>
+              <a:r>
+                <a:rPr lang="en-US" sz="1200" dirty="0">
+                  <a:solidFill>
+                    <a:srgbClr val="FF7C80"/>
+                  </a:solidFill>
+                  <a:latin typeface="Open Sans" panose="020B0606030504020204" pitchFamily="34" charset="0"/>
+                  <a:ea typeface="Open Sans" panose="020B0606030504020204" pitchFamily="34" charset="0"/>
+                  <a:cs typeface="Open Sans" panose="020B0606030504020204" pitchFamily="34" charset="0"/>
+                </a:rPr>
+                <a:t>T</a:t>
+              </a:r>
+            </a:p>
+          </p:txBody>
+        </p:sp>
+        <p:sp>
+          <p:nvSpPr>
+            <p:cNvPr id="117" name="TextBox 116">
+              <a:extLst>
+                <a:ext uri="{FF2B5EF4-FFF2-40B4-BE49-F238E27FC236}">
+                  <a16:creationId xmlns:a16="http://schemas.microsoft.com/office/drawing/2014/main" id="{99F088FA-986D-2E4A-A485-E15349FAE302}"/>
+                </a:ext>
+              </a:extLst>
+            </p:cNvPr>
+            <p:cNvSpPr txBox="1"/>
+            <p:nvPr/>
+          </p:nvSpPr>
+          <p:spPr>
+            <a:xfrm>
+              <a:off x="9525803" y="5125638"/>
+              <a:ext cx="269626" cy="276999"/>
+            </a:xfrm>
+            <a:prstGeom prst="rect">
+              <a:avLst/>
+            </a:prstGeom>
+            <a:noFill/>
+          </p:spPr>
+          <p:txBody>
+            <a:bodyPr wrap="none" rtlCol="0">
+              <a:spAutoFit/>
+            </a:bodyPr>
+            <a:lstStyle/>
+            <a:p>
+              <a:r>
+                <a:rPr lang="en-US" sz="1200" dirty="0">
+                  <a:solidFill>
+                    <a:srgbClr val="FF7C80"/>
+                  </a:solidFill>
+                  <a:latin typeface="Open Sans" panose="020B0606030504020204" pitchFamily="34" charset="0"/>
+                  <a:ea typeface="Open Sans" panose="020B0606030504020204" pitchFamily="34" charset="0"/>
+                  <a:cs typeface="Open Sans" panose="020B0606030504020204" pitchFamily="34" charset="0"/>
+                </a:rPr>
+                <a:t>F</a:t>
+              </a:r>
+            </a:p>
+          </p:txBody>
+        </p:sp>
+        <p:sp>
+          <p:nvSpPr>
+            <p:cNvPr id="118" name="TextBox 117">
+              <a:extLst>
+                <a:ext uri="{FF2B5EF4-FFF2-40B4-BE49-F238E27FC236}">
+                  <a16:creationId xmlns:a16="http://schemas.microsoft.com/office/drawing/2014/main" id="{874E72FF-3068-BC6B-AA69-425FD3F25D05}"/>
+                </a:ext>
+              </a:extLst>
+            </p:cNvPr>
+            <p:cNvSpPr txBox="1"/>
+            <p:nvPr/>
+          </p:nvSpPr>
+          <p:spPr>
+            <a:xfrm>
+              <a:off x="8229465" y="1273041"/>
+              <a:ext cx="269626" cy="276999"/>
+            </a:xfrm>
+            <a:prstGeom prst="rect">
+              <a:avLst/>
+            </a:prstGeom>
+            <a:noFill/>
+          </p:spPr>
+          <p:txBody>
+            <a:bodyPr wrap="none" rtlCol="0">
+              <a:spAutoFit/>
+            </a:bodyPr>
+            <a:lstStyle/>
+            <a:p>
+              <a:r>
+                <a:rPr lang="en-US" sz="1200" dirty="0">
+                  <a:solidFill>
+                    <a:srgbClr val="FF7C80"/>
+                  </a:solidFill>
+                  <a:latin typeface="Open Sans" panose="020B0606030504020204" pitchFamily="34" charset="0"/>
+                  <a:ea typeface="Open Sans" panose="020B0606030504020204" pitchFamily="34" charset="0"/>
+                  <a:cs typeface="Open Sans" panose="020B0606030504020204" pitchFamily="34" charset="0"/>
+                </a:rPr>
+                <a:t>T</a:t>
+              </a:r>
+            </a:p>
+          </p:txBody>
+        </p:sp>
+        <p:sp>
+          <p:nvSpPr>
+            <p:cNvPr id="119" name="TextBox 118">
+              <a:extLst>
+                <a:ext uri="{FF2B5EF4-FFF2-40B4-BE49-F238E27FC236}">
+                  <a16:creationId xmlns:a16="http://schemas.microsoft.com/office/drawing/2014/main" id="{9E6BF796-3875-4BB5-0505-34F2CB37E105}"/>
+                </a:ext>
+              </a:extLst>
+            </p:cNvPr>
+            <p:cNvSpPr txBox="1"/>
+            <p:nvPr/>
+          </p:nvSpPr>
+          <p:spPr>
+            <a:xfrm>
+              <a:off x="7037416" y="804494"/>
+              <a:ext cx="269626" cy="276999"/>
+            </a:xfrm>
+            <a:prstGeom prst="rect">
+              <a:avLst/>
+            </a:prstGeom>
+            <a:noFill/>
+          </p:spPr>
+          <p:txBody>
+            <a:bodyPr wrap="none" rtlCol="0">
+              <a:spAutoFit/>
+            </a:bodyPr>
+            <a:lstStyle/>
+            <a:p>
+              <a:r>
+                <a:rPr lang="en-US" sz="1200" dirty="0">
+                  <a:solidFill>
+                    <a:srgbClr val="FF7C80"/>
+                  </a:solidFill>
+                  <a:latin typeface="Open Sans" panose="020B0606030504020204" pitchFamily="34" charset="0"/>
+                  <a:ea typeface="Open Sans" panose="020B0606030504020204" pitchFamily="34" charset="0"/>
+                  <a:cs typeface="Open Sans" panose="020B0606030504020204" pitchFamily="34" charset="0"/>
+                </a:rPr>
+                <a:t>F</a:t>
+              </a:r>
+            </a:p>
+          </p:txBody>
+        </p:sp>
+      </p:grpSp>
+    </p:spTree>
+    <p:extLst>
+      <p:ext uri="{BB962C8B-B14F-4D97-AF65-F5344CB8AC3E}">
+        <p14:creationId xmlns:p14="http://schemas.microsoft.com/office/powerpoint/2010/main" val="1134061166"/>
+      </p:ext>
+    </p:extLst>
+  </p:cSld>
+  <p:clrMapOvr>
+    <a:masterClrMapping/>
+  </p:clrMapOvr>
+</p:sld>
+</file>
+
+<file path=ppt/slides/slide17.xml><?xml version="1.0" encoding="utf-8"?>
+<p:sld xmlns:a="http://schemas.openxmlformats.org/drawingml/2006/main" xmlns:r="http://schemas.openxmlformats.org/officeDocument/2006/relationships" xmlns:p="http://schemas.openxmlformats.org/presentationml/2006/main">
+  <p:cSld>
+    <p:spTree>
+      <p:nvGrpSpPr>
+        <p:cNvPr id="1" name=""/>
+        <p:cNvGrpSpPr/>
+        <p:nvPr/>
+      </p:nvGrpSpPr>
+      <p:grpSpPr>
+        <a:xfrm>
+          <a:off x="0" y="0"/>
+          <a:ext cx="0" cy="0"/>
+          <a:chOff x="0" y="0"/>
+          <a:chExt cx="0" cy="0"/>
+        </a:xfrm>
+      </p:grpSpPr>
+      <p:sp>
+        <p:nvSpPr>
+          <p:cNvPr id="108" name="Rectangle 107">
+            <a:extLst>
+              <a:ext uri="{FF2B5EF4-FFF2-40B4-BE49-F238E27FC236}">
+                <a16:creationId xmlns:a16="http://schemas.microsoft.com/office/drawing/2014/main" id="{F5A5FD62-A99C-04B6-706B-DEE9B81AF541}"/>
+              </a:ext>
+            </a:extLst>
+          </p:cNvPr>
+          <p:cNvSpPr/>
+          <p:nvPr/>
+        </p:nvSpPr>
+        <p:spPr>
+          <a:xfrm>
+            <a:off x="3645392" y="1315453"/>
+            <a:ext cx="7327942" cy="4227094"/>
+          </a:xfrm>
+          <a:prstGeom prst="rect">
+            <a:avLst/>
+          </a:prstGeom>
+          <a:solidFill>
+            <a:srgbClr val="0F1017"/>
+          </a:solidFill>
+          <a:ln w="12700">
+            <a:solidFill>
+              <a:schemeClr val="bg1">
+                <a:lumMod val="75000"/>
+              </a:schemeClr>
+            </a:solidFill>
+          </a:ln>
+        </p:spPr>
+        <p:style>
+          <a:lnRef idx="2">
+            <a:schemeClr val="accent1">
+              <a:shade val="50000"/>
+            </a:schemeClr>
+          </a:lnRef>
+          <a:fillRef idx="1">
+            <a:schemeClr val="accent1"/>
+          </a:fillRef>
+          <a:effectRef idx="0">
+            <a:schemeClr val="accent1"/>
+          </a:effectRef>
+          <a:fontRef idx="minor">
+            <a:schemeClr val="lt1"/>
+          </a:fontRef>
+        </p:style>
+        <p:txBody>
+          <a:bodyPr rtlCol="0" anchor="ctr"/>
+          <a:lstStyle/>
+          <a:p>
+            <a:pPr algn="ctr"/>
+            <a:endParaRPr lang="en-US" sz="1800" dirty="0">
+              <a:solidFill>
+                <a:schemeClr val="bg1">
+                  <a:lumMod val="85000"/>
+                </a:schemeClr>
+              </a:solidFill>
+              <a:latin typeface="Open Sans" panose="020B0606030504020204" pitchFamily="34" charset="0"/>
+              <a:ea typeface="Open Sans" panose="020B0606030504020204" pitchFamily="34" charset="0"/>
+              <a:cs typeface="Open Sans" panose="020B0606030504020204" pitchFamily="34" charset="0"/>
+            </a:endParaRPr>
+          </a:p>
+        </p:txBody>
+      </p:sp>
+      <p:sp>
+        <p:nvSpPr>
+          <p:cNvPr id="59" name="Flowchart: Terminator 58">
+            <a:extLst>
+              <a:ext uri="{FF2B5EF4-FFF2-40B4-BE49-F238E27FC236}">
+                <a16:creationId xmlns:a16="http://schemas.microsoft.com/office/drawing/2014/main" id="{D7554AAC-5F81-46CA-BA4E-6CDF6B8CC5AD}"/>
+              </a:ext>
+            </a:extLst>
+          </p:cNvPr>
+          <p:cNvSpPr/>
+          <p:nvPr/>
+        </p:nvSpPr>
+        <p:spPr>
+          <a:xfrm>
+            <a:off x="4572180" y="1739895"/>
+            <a:ext cx="1050758" cy="341690"/>
+          </a:xfrm>
+          <a:prstGeom prst="flowChartTerminator">
+            <a:avLst/>
+          </a:prstGeom>
+          <a:noFill/>
+          <a:ln>
+            <a:solidFill>
+              <a:schemeClr val="bg1">
+                <a:lumMod val="75000"/>
+              </a:schemeClr>
+            </a:solidFill>
+          </a:ln>
+        </p:spPr>
+        <p:style>
+          <a:lnRef idx="2">
+            <a:schemeClr val="accent1">
+              <a:shade val="50000"/>
+            </a:schemeClr>
+          </a:lnRef>
+          <a:fillRef idx="1">
+            <a:schemeClr val="accent1"/>
+          </a:fillRef>
+          <a:effectRef idx="0">
+            <a:schemeClr val="accent1"/>
+          </a:effectRef>
+          <a:fontRef idx="minor">
+            <a:schemeClr val="lt1"/>
+          </a:fontRef>
+        </p:style>
+        <p:txBody>
+          <a:bodyPr rtlCol="0" anchor="ctr"/>
+          <a:lstStyle/>
+          <a:p>
+            <a:pPr algn="ctr"/>
+            <a:r>
+              <a:rPr lang="en-US" sz="1200" dirty="0">
+                <a:solidFill>
+                  <a:schemeClr val="bg1">
+                    <a:lumMod val="85000"/>
+                  </a:schemeClr>
+                </a:solidFill>
+                <a:latin typeface="Open Sans" panose="020B0606030504020204" pitchFamily="34" charset="0"/>
+                <a:ea typeface="Open Sans" panose="020B0606030504020204" pitchFamily="34" charset="0"/>
+                <a:cs typeface="Open Sans" panose="020B0606030504020204" pitchFamily="34" charset="0"/>
+              </a:rPr>
+              <a:t>Start</a:t>
+            </a:r>
+          </a:p>
+        </p:txBody>
+      </p:sp>
+      <p:sp>
+        <p:nvSpPr>
+          <p:cNvPr id="60" name="Flowchart: Terminator 59">
+            <a:extLst>
+              <a:ext uri="{FF2B5EF4-FFF2-40B4-BE49-F238E27FC236}">
+                <a16:creationId xmlns:a16="http://schemas.microsoft.com/office/drawing/2014/main" id="{103191FC-37A5-724C-C214-882B4B9F6C89}"/>
+              </a:ext>
+            </a:extLst>
+          </p:cNvPr>
+          <p:cNvSpPr/>
+          <p:nvPr/>
+        </p:nvSpPr>
+        <p:spPr>
+          <a:xfrm>
+            <a:off x="9000424" y="1739895"/>
+            <a:ext cx="1050758" cy="341690"/>
+          </a:xfrm>
+          <a:prstGeom prst="flowChartTerminator">
+            <a:avLst/>
+          </a:prstGeom>
+          <a:noFill/>
+          <a:ln>
+            <a:solidFill>
+              <a:schemeClr val="bg1">
+                <a:lumMod val="75000"/>
+              </a:schemeClr>
+            </a:solidFill>
+          </a:ln>
+        </p:spPr>
+        <p:style>
+          <a:lnRef idx="2">
+            <a:schemeClr val="accent1">
+              <a:shade val="50000"/>
+            </a:schemeClr>
+          </a:lnRef>
+          <a:fillRef idx="1">
+            <a:schemeClr val="accent1"/>
+          </a:fillRef>
+          <a:effectRef idx="0">
+            <a:schemeClr val="accent1"/>
+          </a:effectRef>
+          <a:fontRef idx="minor">
+            <a:schemeClr val="lt1"/>
+          </a:fontRef>
+        </p:style>
+        <p:txBody>
+          <a:bodyPr rtlCol="0" anchor="ctr"/>
+          <a:lstStyle/>
+          <a:p>
+            <a:pPr algn="ctr"/>
+            <a:r>
+              <a:rPr lang="en-US" sz="1200" dirty="0">
+                <a:solidFill>
+                  <a:schemeClr val="bg1">
+                    <a:lumMod val="85000"/>
+                  </a:schemeClr>
+                </a:solidFill>
+                <a:latin typeface="Open Sans" panose="020B0606030504020204" pitchFamily="34" charset="0"/>
+                <a:ea typeface="Open Sans" panose="020B0606030504020204" pitchFamily="34" charset="0"/>
+                <a:cs typeface="Open Sans" panose="020B0606030504020204" pitchFamily="34" charset="0"/>
+              </a:rPr>
+              <a:t>Stop</a:t>
+            </a:r>
+          </a:p>
+        </p:txBody>
+      </p:sp>
+      <p:cxnSp>
+        <p:nvCxnSpPr>
+          <p:cNvPr id="61" name="Straight Arrow Connector 60">
+            <a:extLst>
+              <a:ext uri="{FF2B5EF4-FFF2-40B4-BE49-F238E27FC236}">
+                <a16:creationId xmlns:a16="http://schemas.microsoft.com/office/drawing/2014/main" id="{A1BBCFB3-141A-F3B8-67BE-C05995E64053}"/>
+              </a:ext>
+            </a:extLst>
+          </p:cNvPr>
+          <p:cNvCxnSpPr>
+            <a:cxnSpLocks/>
+            <a:stCxn id="59" idx="2"/>
+          </p:cNvCxnSpPr>
+          <p:nvPr/>
+        </p:nvCxnSpPr>
+        <p:spPr>
+          <a:xfrm flipH="1">
+            <a:off x="5092921" y="2081585"/>
+            <a:ext cx="4638" cy="341690"/>
+          </a:xfrm>
+          <a:prstGeom prst="straightConnector1">
+            <a:avLst/>
+          </a:prstGeom>
+          <a:ln w="12700">
+            <a:solidFill>
+              <a:schemeClr val="bg1">
+                <a:lumMod val="75000"/>
+              </a:schemeClr>
+            </a:solidFill>
+            <a:tailEnd type="triangle"/>
+          </a:ln>
+        </p:spPr>
+        <p:style>
+          <a:lnRef idx="1">
+            <a:schemeClr val="accent1"/>
+          </a:lnRef>
+          <a:fillRef idx="0">
+            <a:schemeClr val="accent1"/>
+          </a:fillRef>
+          <a:effectRef idx="0">
+            <a:schemeClr val="accent1"/>
+          </a:effectRef>
+          <a:fontRef idx="minor">
+            <a:schemeClr val="tx1"/>
+          </a:fontRef>
+        </p:style>
+      </p:cxnSp>
+      <p:cxnSp>
+        <p:nvCxnSpPr>
+          <p:cNvPr id="18" name="Straight Arrow Connector 17">
+            <a:extLst>
+              <a:ext uri="{FF2B5EF4-FFF2-40B4-BE49-F238E27FC236}">
+                <a16:creationId xmlns:a16="http://schemas.microsoft.com/office/drawing/2014/main" id="{28D76C1F-C45D-8EEF-E187-E9E48161CAB0}"/>
+              </a:ext>
+            </a:extLst>
+          </p:cNvPr>
+          <p:cNvCxnSpPr>
+            <a:cxnSpLocks/>
+            <a:endCxn id="60" idx="2"/>
+          </p:cNvCxnSpPr>
+          <p:nvPr/>
+        </p:nvCxnSpPr>
+        <p:spPr>
+          <a:xfrm flipV="1">
+            <a:off x="9525803" y="2081585"/>
+            <a:ext cx="0" cy="296780"/>
+          </a:xfrm>
+          <a:prstGeom prst="straightConnector1">
+            <a:avLst/>
+          </a:prstGeom>
+          <a:ln w="12700">
+            <a:solidFill>
+              <a:srgbClr val="CC99FF"/>
+            </a:solidFill>
+            <a:tailEnd type="triangle"/>
+          </a:ln>
+        </p:spPr>
+        <p:style>
+          <a:lnRef idx="1">
+            <a:schemeClr val="accent1"/>
+          </a:lnRef>
+          <a:fillRef idx="0">
+            <a:schemeClr val="accent1"/>
+          </a:fillRef>
+          <a:effectRef idx="0">
+            <a:schemeClr val="accent1"/>
+          </a:effectRef>
+          <a:fontRef idx="minor">
+            <a:schemeClr val="tx1"/>
+          </a:fontRef>
+        </p:style>
+      </p:cxnSp>
+      <p:sp>
+        <p:nvSpPr>
+          <p:cNvPr id="29" name="Flowchart: Terminator 28">
+            <a:extLst>
+              <a:ext uri="{FF2B5EF4-FFF2-40B4-BE49-F238E27FC236}">
+                <a16:creationId xmlns:a16="http://schemas.microsoft.com/office/drawing/2014/main" id="{97EBF7DD-2035-166F-CFA5-6B352DAE8ECC}"/>
+              </a:ext>
+            </a:extLst>
+          </p:cNvPr>
+          <p:cNvSpPr/>
+          <p:nvPr/>
+        </p:nvSpPr>
+        <p:spPr>
+          <a:xfrm>
+            <a:off x="1218666" y="649032"/>
+            <a:ext cx="1050758" cy="341690"/>
+          </a:xfrm>
+          <a:prstGeom prst="flowChartTerminator">
+            <a:avLst/>
+          </a:prstGeom>
+          <a:noFill/>
+          <a:ln>
+            <a:solidFill>
+              <a:schemeClr val="bg1">
+                <a:lumMod val="75000"/>
+              </a:schemeClr>
+            </a:solidFill>
+          </a:ln>
+        </p:spPr>
+        <p:style>
+          <a:lnRef idx="2">
+            <a:schemeClr val="accent1">
+              <a:shade val="50000"/>
+            </a:schemeClr>
+          </a:lnRef>
+          <a:fillRef idx="1">
+            <a:schemeClr val="accent1"/>
+          </a:fillRef>
+          <a:effectRef idx="0">
+            <a:schemeClr val="accent1"/>
+          </a:effectRef>
+          <a:fontRef idx="minor">
+            <a:schemeClr val="lt1"/>
+          </a:fontRef>
+        </p:style>
+        <p:txBody>
+          <a:bodyPr rtlCol="0" anchor="ctr"/>
+          <a:lstStyle/>
+          <a:p>
+            <a:pPr algn="ctr"/>
+            <a:r>
+              <a:rPr lang="en-US" sz="1200" dirty="0">
+                <a:solidFill>
+                  <a:schemeClr val="bg1">
+                    <a:lumMod val="85000"/>
+                  </a:schemeClr>
+                </a:solidFill>
+                <a:latin typeface="Open Sans" panose="020B0606030504020204" pitchFamily="34" charset="0"/>
+                <a:ea typeface="Open Sans" panose="020B0606030504020204" pitchFamily="34" charset="0"/>
+                <a:cs typeface="Open Sans" panose="020B0606030504020204" pitchFamily="34" charset="0"/>
+              </a:rPr>
+              <a:t>Start</a:t>
+            </a:r>
+          </a:p>
+        </p:txBody>
+      </p:sp>
+      <p:sp>
+        <p:nvSpPr>
+          <p:cNvPr id="31" name="Flowchart: Terminator 30">
+            <a:extLst>
+              <a:ext uri="{FF2B5EF4-FFF2-40B4-BE49-F238E27FC236}">
+                <a16:creationId xmlns:a16="http://schemas.microsoft.com/office/drawing/2014/main" id="{B46FF1EB-056C-88CD-27DB-132AB41F0506}"/>
+              </a:ext>
+            </a:extLst>
+          </p:cNvPr>
+          <p:cNvSpPr/>
+          <p:nvPr/>
+        </p:nvSpPr>
+        <p:spPr>
+          <a:xfrm>
+            <a:off x="1218666" y="1262521"/>
+            <a:ext cx="1050758" cy="341690"/>
+          </a:xfrm>
+          <a:prstGeom prst="flowChartTerminator">
+            <a:avLst/>
+          </a:prstGeom>
+          <a:noFill/>
+          <a:ln>
+            <a:solidFill>
+              <a:schemeClr val="bg1">
+                <a:lumMod val="75000"/>
+              </a:schemeClr>
+            </a:solidFill>
+          </a:ln>
+        </p:spPr>
+        <p:style>
+          <a:lnRef idx="2">
+            <a:schemeClr val="accent1">
+              <a:shade val="50000"/>
+            </a:schemeClr>
+          </a:lnRef>
+          <a:fillRef idx="1">
+            <a:schemeClr val="accent1"/>
+          </a:fillRef>
+          <a:effectRef idx="0">
+            <a:schemeClr val="accent1"/>
+          </a:effectRef>
+          <a:fontRef idx="minor">
+            <a:schemeClr val="lt1"/>
+          </a:fontRef>
+        </p:style>
+        <p:txBody>
+          <a:bodyPr rtlCol="0" anchor="ctr"/>
+          <a:lstStyle/>
+          <a:p>
+            <a:pPr algn="ctr"/>
+            <a:r>
+              <a:rPr lang="en-US" sz="1200" dirty="0">
+                <a:solidFill>
+                  <a:schemeClr val="bg1">
+                    <a:lumMod val="85000"/>
+                  </a:schemeClr>
+                </a:solidFill>
+                <a:latin typeface="Open Sans" panose="020B0606030504020204" pitchFamily="34" charset="0"/>
+                <a:ea typeface="Open Sans" panose="020B0606030504020204" pitchFamily="34" charset="0"/>
+                <a:cs typeface="Open Sans" panose="020B0606030504020204" pitchFamily="34" charset="0"/>
+              </a:rPr>
+              <a:t>Stop</a:t>
+            </a:r>
+          </a:p>
+        </p:txBody>
+      </p:sp>
+      <p:sp>
+        <p:nvSpPr>
+          <p:cNvPr id="34" name="Rectangle 33">
+            <a:extLst>
+              <a:ext uri="{FF2B5EF4-FFF2-40B4-BE49-F238E27FC236}">
+                <a16:creationId xmlns:a16="http://schemas.microsoft.com/office/drawing/2014/main" id="{A8D64967-4F28-2958-EE17-93FB9B3EDEEA}"/>
+              </a:ext>
+            </a:extLst>
+          </p:cNvPr>
+          <p:cNvSpPr/>
+          <p:nvPr/>
+        </p:nvSpPr>
+        <p:spPr>
+          <a:xfrm>
+            <a:off x="821623" y="3132324"/>
+            <a:ext cx="1844844" cy="393032"/>
+          </a:xfrm>
+          <a:prstGeom prst="rect">
+            <a:avLst/>
+          </a:prstGeom>
+          <a:noFill/>
+          <a:ln>
+            <a:solidFill>
+              <a:schemeClr val="accent6">
+                <a:lumMod val="60000"/>
+                <a:lumOff val="40000"/>
+              </a:schemeClr>
+            </a:solidFill>
+          </a:ln>
+        </p:spPr>
+        <p:style>
+          <a:lnRef idx="2">
+            <a:schemeClr val="accent1">
+              <a:shade val="50000"/>
+            </a:schemeClr>
+          </a:lnRef>
+          <a:fillRef idx="1">
+            <a:schemeClr val="accent1"/>
+          </a:fillRef>
+          <a:effectRef idx="0">
+            <a:schemeClr val="accent1"/>
+          </a:effectRef>
+          <a:fontRef idx="minor">
+            <a:schemeClr val="lt1"/>
+          </a:fontRef>
+        </p:style>
+        <p:txBody>
+          <a:bodyPr rtlCol="0" anchor="ctr"/>
+          <a:lstStyle/>
+          <a:p>
+            <a:pPr algn="ctr"/>
+            <a:r>
+              <a:rPr lang="en-US" sz="1200" dirty="0">
+                <a:solidFill>
+                  <a:schemeClr val="bg1">
+                    <a:lumMod val="85000"/>
+                  </a:schemeClr>
+                </a:solidFill>
+                <a:latin typeface="Open Sans" panose="020B0606030504020204" pitchFamily="34" charset="0"/>
+                <a:ea typeface="Open Sans" panose="020B0606030504020204" pitchFamily="34" charset="0"/>
+                <a:cs typeface="Open Sans" panose="020B0606030504020204" pitchFamily="34" charset="0"/>
+              </a:rPr>
+              <a:t>action / process</a:t>
+            </a:r>
+          </a:p>
+        </p:txBody>
+      </p:sp>
+      <p:sp>
+        <p:nvSpPr>
+          <p:cNvPr id="39" name="Flowchart: Data 38">
+            <a:extLst>
+              <a:ext uri="{FF2B5EF4-FFF2-40B4-BE49-F238E27FC236}">
+                <a16:creationId xmlns:a16="http://schemas.microsoft.com/office/drawing/2014/main" id="{84DF5FB3-6B18-6E52-CED0-52B59C223732}"/>
+              </a:ext>
+            </a:extLst>
+          </p:cNvPr>
+          <p:cNvSpPr/>
+          <p:nvPr/>
+        </p:nvSpPr>
+        <p:spPr>
+          <a:xfrm>
+            <a:off x="821623" y="2125701"/>
+            <a:ext cx="1844844" cy="489284"/>
+          </a:xfrm>
+          <a:prstGeom prst="flowChartInputOutput">
+            <a:avLst/>
+          </a:prstGeom>
+          <a:noFill/>
+          <a:ln>
+            <a:solidFill>
+              <a:schemeClr val="accent1">
+                <a:lumMod val="60000"/>
+                <a:lumOff val="40000"/>
+              </a:schemeClr>
+            </a:solidFill>
+          </a:ln>
+        </p:spPr>
+        <p:style>
+          <a:lnRef idx="2">
+            <a:schemeClr val="accent1">
+              <a:shade val="50000"/>
+            </a:schemeClr>
+          </a:lnRef>
+          <a:fillRef idx="1">
+            <a:schemeClr val="accent1"/>
+          </a:fillRef>
+          <a:effectRef idx="0">
+            <a:schemeClr val="accent1"/>
+          </a:effectRef>
+          <a:fontRef idx="minor">
+            <a:schemeClr val="lt1"/>
+          </a:fontRef>
+        </p:style>
+        <p:txBody>
+          <a:bodyPr rtlCol="0" anchor="ctr"/>
+          <a:lstStyle/>
+          <a:p>
+            <a:pPr algn="ctr"/>
+            <a:r>
+              <a:rPr lang="en-US" sz="1200" dirty="0">
+                <a:solidFill>
+                  <a:schemeClr val="bg1">
+                    <a:lumMod val="85000"/>
+                  </a:schemeClr>
+                </a:solidFill>
+                <a:latin typeface="Open Sans" panose="020B0606030504020204" pitchFamily="34" charset="0"/>
+                <a:ea typeface="Open Sans" panose="020B0606030504020204" pitchFamily="34" charset="0"/>
+                <a:cs typeface="Open Sans" panose="020B0606030504020204" pitchFamily="34" charset="0"/>
+              </a:rPr>
+              <a:t>input</a:t>
+            </a:r>
+          </a:p>
+        </p:txBody>
+      </p:sp>
+      <p:sp>
+        <p:nvSpPr>
+          <p:cNvPr id="46" name="Flowchart: Decision 45">
+            <a:extLst>
+              <a:ext uri="{FF2B5EF4-FFF2-40B4-BE49-F238E27FC236}">
+                <a16:creationId xmlns:a16="http://schemas.microsoft.com/office/drawing/2014/main" id="{265FEB22-D05F-9423-661B-B86264CDC339}"/>
+              </a:ext>
+            </a:extLst>
+          </p:cNvPr>
+          <p:cNvSpPr/>
+          <p:nvPr/>
+        </p:nvSpPr>
+        <p:spPr>
+          <a:xfrm>
+            <a:off x="821623" y="4052904"/>
+            <a:ext cx="1844844" cy="946484"/>
+          </a:xfrm>
+          <a:prstGeom prst="flowChartDecision">
+            <a:avLst/>
+          </a:prstGeom>
+          <a:noFill/>
+          <a:ln>
+            <a:solidFill>
+              <a:srgbClr val="FF7C80"/>
+            </a:solidFill>
+          </a:ln>
+        </p:spPr>
+        <p:style>
+          <a:lnRef idx="2">
+            <a:schemeClr val="accent1">
+              <a:shade val="50000"/>
+            </a:schemeClr>
+          </a:lnRef>
+          <a:fillRef idx="1">
+            <a:schemeClr val="accent1"/>
+          </a:fillRef>
+          <a:effectRef idx="0">
+            <a:schemeClr val="accent1"/>
+          </a:effectRef>
+          <a:fontRef idx="minor">
+            <a:schemeClr val="lt1"/>
+          </a:fontRef>
+        </p:style>
+        <p:txBody>
+          <a:bodyPr rtlCol="0" anchor="ctr"/>
+          <a:lstStyle/>
+          <a:p>
+            <a:pPr algn="ctr"/>
+            <a:r>
+              <a:rPr lang="en-US" sz="1200" dirty="0">
+                <a:solidFill>
+                  <a:schemeClr val="bg1">
+                    <a:lumMod val="85000"/>
+                  </a:schemeClr>
+                </a:solidFill>
+                <a:latin typeface="Open Sans" panose="020B0606030504020204" pitchFamily="34" charset="0"/>
+                <a:ea typeface="Open Sans" panose="020B0606030504020204" pitchFamily="34" charset="0"/>
+                <a:cs typeface="Open Sans" panose="020B0606030504020204" pitchFamily="34" charset="0"/>
+              </a:rPr>
+              <a:t>decision</a:t>
+            </a:r>
+          </a:p>
+        </p:txBody>
+      </p:sp>
+      <p:sp>
+        <p:nvSpPr>
+          <p:cNvPr id="47" name="Flowchart: Data 46">
+            <a:extLst>
+              <a:ext uri="{FF2B5EF4-FFF2-40B4-BE49-F238E27FC236}">
+                <a16:creationId xmlns:a16="http://schemas.microsoft.com/office/drawing/2014/main" id="{E79F7B5C-9F7D-5907-4BED-1DDC3947E632}"/>
+              </a:ext>
+            </a:extLst>
+          </p:cNvPr>
+          <p:cNvSpPr/>
+          <p:nvPr/>
+        </p:nvSpPr>
+        <p:spPr>
+          <a:xfrm>
+            <a:off x="821623" y="5526936"/>
+            <a:ext cx="1844844" cy="489284"/>
+          </a:xfrm>
+          <a:prstGeom prst="flowChartInputOutput">
+            <a:avLst/>
+          </a:prstGeom>
+          <a:noFill/>
+          <a:ln>
+            <a:solidFill>
+              <a:srgbClr val="CC99FF"/>
+            </a:solidFill>
+          </a:ln>
+        </p:spPr>
+        <p:style>
+          <a:lnRef idx="2">
+            <a:schemeClr val="accent1">
+              <a:shade val="50000"/>
+            </a:schemeClr>
+          </a:lnRef>
+          <a:fillRef idx="1">
+            <a:schemeClr val="accent1"/>
+          </a:fillRef>
+          <a:effectRef idx="0">
+            <a:schemeClr val="accent1"/>
+          </a:effectRef>
+          <a:fontRef idx="minor">
+            <a:schemeClr val="lt1"/>
+          </a:fontRef>
+        </p:style>
+        <p:txBody>
+          <a:bodyPr rtlCol="0" anchor="ctr"/>
+          <a:lstStyle/>
+          <a:p>
+            <a:pPr algn="ctr"/>
+            <a:r>
+              <a:rPr lang="en-US" sz="1200" dirty="0">
+                <a:solidFill>
+                  <a:schemeClr val="bg1">
+                    <a:lumMod val="85000"/>
+                  </a:schemeClr>
+                </a:solidFill>
+                <a:latin typeface="Open Sans" panose="020B0606030504020204" pitchFamily="34" charset="0"/>
+                <a:ea typeface="Open Sans" panose="020B0606030504020204" pitchFamily="34" charset="0"/>
+                <a:cs typeface="Open Sans" panose="020B0606030504020204" pitchFamily="34" charset="0"/>
+              </a:rPr>
+              <a:t>output</a:t>
+            </a:r>
+          </a:p>
+        </p:txBody>
+      </p:sp>
+      <p:sp>
+        <p:nvSpPr>
+          <p:cNvPr id="49" name="TextBox 48">
+            <a:extLst>
+              <a:ext uri="{FF2B5EF4-FFF2-40B4-BE49-F238E27FC236}">
+                <a16:creationId xmlns:a16="http://schemas.microsoft.com/office/drawing/2014/main" id="{9782D64F-E1B4-7BBA-97F1-672AA7BB38F2}"/>
+              </a:ext>
+            </a:extLst>
+          </p:cNvPr>
+          <p:cNvSpPr txBox="1"/>
+          <p:nvPr/>
+        </p:nvSpPr>
+        <p:spPr>
+          <a:xfrm>
+            <a:off x="2396841" y="4042695"/>
+            <a:ext cx="269626" cy="276999"/>
+          </a:xfrm>
+          <a:prstGeom prst="rect">
+            <a:avLst/>
+          </a:prstGeom>
+          <a:noFill/>
+        </p:spPr>
+        <p:txBody>
+          <a:bodyPr wrap="none" rtlCol="0">
+            <a:spAutoFit/>
+          </a:bodyPr>
+          <a:lstStyle/>
+          <a:p>
+            <a:r>
+              <a:rPr lang="en-US" sz="1200" dirty="0">
+                <a:solidFill>
+                  <a:srgbClr val="FF7C80"/>
+                </a:solidFill>
+                <a:latin typeface="Open Sans" panose="020B0606030504020204" pitchFamily="34" charset="0"/>
+                <a:ea typeface="Open Sans" panose="020B0606030504020204" pitchFamily="34" charset="0"/>
+                <a:cs typeface="Open Sans" panose="020B0606030504020204" pitchFamily="34" charset="0"/>
+              </a:rPr>
+              <a:t>T</a:t>
+            </a:r>
+          </a:p>
+        </p:txBody>
+      </p:sp>
+      <p:sp>
+        <p:nvSpPr>
+          <p:cNvPr id="53" name="TextBox 52">
+            <a:extLst>
+              <a:ext uri="{FF2B5EF4-FFF2-40B4-BE49-F238E27FC236}">
+                <a16:creationId xmlns:a16="http://schemas.microsoft.com/office/drawing/2014/main" id="{7E6B2905-22B9-9F02-399A-510F7F8499F3}"/>
+              </a:ext>
+            </a:extLst>
+          </p:cNvPr>
+          <p:cNvSpPr txBox="1"/>
+          <p:nvPr/>
+        </p:nvSpPr>
+        <p:spPr>
+          <a:xfrm>
+            <a:off x="821623" y="4042694"/>
+            <a:ext cx="269626" cy="276999"/>
+          </a:xfrm>
+          <a:prstGeom prst="rect">
+            <a:avLst/>
+          </a:prstGeom>
+          <a:noFill/>
+        </p:spPr>
+        <p:txBody>
+          <a:bodyPr wrap="none" rtlCol="0">
+            <a:spAutoFit/>
+          </a:bodyPr>
+          <a:lstStyle/>
+          <a:p>
+            <a:r>
+              <a:rPr lang="en-US" sz="1200" dirty="0">
+                <a:solidFill>
+                  <a:srgbClr val="FF7C80"/>
+                </a:solidFill>
+                <a:latin typeface="Open Sans" panose="020B0606030504020204" pitchFamily="34" charset="0"/>
+                <a:ea typeface="Open Sans" panose="020B0606030504020204" pitchFamily="34" charset="0"/>
+                <a:cs typeface="Open Sans" panose="020B0606030504020204" pitchFamily="34" charset="0"/>
+              </a:rPr>
+              <a:t>F</a:t>
+            </a:r>
+          </a:p>
+        </p:txBody>
+      </p:sp>
+    </p:spTree>
+    <p:extLst>
+      <p:ext uri="{BB962C8B-B14F-4D97-AF65-F5344CB8AC3E}">
+        <p14:creationId xmlns:p14="http://schemas.microsoft.com/office/powerpoint/2010/main" val="3292056083"/>
+      </p:ext>
+    </p:extLst>
+  </p:cSld>
+  <p:clrMapOvr>
+    <a:masterClrMapping/>
+  </p:clrMapOvr>
+</p:sld>
+</file>
+
+<file path=ppt/slides/slide18.xml><?xml version="1.0" encoding="utf-8"?>
+<p:sld xmlns:a="http://schemas.openxmlformats.org/drawingml/2006/main" xmlns:r="http://schemas.openxmlformats.org/officeDocument/2006/relationships" xmlns:p="http://schemas.openxmlformats.org/presentationml/2006/main">
+  <p:cSld>
+    <p:spTree>
+      <p:nvGrpSpPr>
+        <p:cNvPr id="1" name=""/>
+        <p:cNvGrpSpPr/>
+        <p:nvPr/>
+      </p:nvGrpSpPr>
+      <p:grpSpPr>
+        <a:xfrm>
+          <a:off x="0" y="0"/>
+          <a:ext cx="0" cy="0"/>
+          <a:chOff x="0" y="0"/>
+          <a:chExt cx="0" cy="0"/>
+        </a:xfrm>
+      </p:grpSpPr>
+      <p:sp>
+        <p:nvSpPr>
+          <p:cNvPr id="108" name="Rectangle 107">
+            <a:extLst>
+              <a:ext uri="{FF2B5EF4-FFF2-40B4-BE49-F238E27FC236}">
+                <a16:creationId xmlns:a16="http://schemas.microsoft.com/office/drawing/2014/main" id="{F5A5FD62-A99C-04B6-706B-DEE9B81AF541}"/>
+              </a:ext>
+            </a:extLst>
+          </p:cNvPr>
+          <p:cNvSpPr/>
+          <p:nvPr/>
+        </p:nvSpPr>
+        <p:spPr>
+          <a:xfrm>
+            <a:off x="3645392" y="1315453"/>
+            <a:ext cx="7327942" cy="4227094"/>
+          </a:xfrm>
+          <a:prstGeom prst="rect">
+            <a:avLst/>
+          </a:prstGeom>
+          <a:solidFill>
+            <a:srgbClr val="0F1017"/>
+          </a:solidFill>
+          <a:ln w="12700">
+            <a:solidFill>
+              <a:schemeClr val="bg1">
+                <a:lumMod val="75000"/>
+              </a:schemeClr>
+            </a:solidFill>
+          </a:ln>
+        </p:spPr>
+        <p:style>
+          <a:lnRef idx="2">
+            <a:schemeClr val="accent1">
+              <a:shade val="50000"/>
+            </a:schemeClr>
+          </a:lnRef>
+          <a:fillRef idx="1">
+            <a:schemeClr val="accent1"/>
+          </a:fillRef>
+          <a:effectRef idx="0">
+            <a:schemeClr val="accent1"/>
+          </a:effectRef>
+          <a:fontRef idx="minor">
+            <a:schemeClr val="lt1"/>
+          </a:fontRef>
+        </p:style>
+        <p:txBody>
+          <a:bodyPr rtlCol="0" anchor="ctr"/>
+          <a:lstStyle/>
+          <a:p>
+            <a:pPr algn="ctr"/>
+            <a:endParaRPr lang="en-US" sz="1800" dirty="0">
+              <a:solidFill>
+                <a:schemeClr val="bg1">
+                  <a:lumMod val="85000"/>
+                </a:schemeClr>
+              </a:solidFill>
+              <a:latin typeface="Open Sans" panose="020B0606030504020204" pitchFamily="34" charset="0"/>
+              <a:ea typeface="Open Sans" panose="020B0606030504020204" pitchFamily="34" charset="0"/>
+              <a:cs typeface="Open Sans" panose="020B0606030504020204" pitchFamily="34" charset="0"/>
+            </a:endParaRPr>
+          </a:p>
+        </p:txBody>
+      </p:sp>
+      <p:sp>
+        <p:nvSpPr>
+          <p:cNvPr id="59" name="Flowchart: Terminator 58">
+            <a:extLst>
+              <a:ext uri="{FF2B5EF4-FFF2-40B4-BE49-F238E27FC236}">
+                <a16:creationId xmlns:a16="http://schemas.microsoft.com/office/drawing/2014/main" id="{D7554AAC-5F81-46CA-BA4E-6CDF6B8CC5AD}"/>
+              </a:ext>
+            </a:extLst>
+          </p:cNvPr>
+          <p:cNvSpPr/>
+          <p:nvPr/>
+        </p:nvSpPr>
+        <p:spPr>
+          <a:xfrm>
+            <a:off x="4572180" y="1739895"/>
+            <a:ext cx="1050758" cy="341690"/>
+          </a:xfrm>
+          <a:prstGeom prst="flowChartTerminator">
+            <a:avLst/>
+          </a:prstGeom>
+          <a:noFill/>
+          <a:ln>
+            <a:solidFill>
+              <a:schemeClr val="bg1">
+                <a:lumMod val="75000"/>
+              </a:schemeClr>
+            </a:solidFill>
+          </a:ln>
+        </p:spPr>
+        <p:style>
+          <a:lnRef idx="2">
+            <a:schemeClr val="accent1">
+              <a:shade val="50000"/>
+            </a:schemeClr>
+          </a:lnRef>
+          <a:fillRef idx="1">
+            <a:schemeClr val="accent1"/>
+          </a:fillRef>
+          <a:effectRef idx="0">
+            <a:schemeClr val="accent1"/>
+          </a:effectRef>
+          <a:fontRef idx="minor">
+            <a:schemeClr val="lt1"/>
+          </a:fontRef>
+        </p:style>
+        <p:txBody>
+          <a:bodyPr rtlCol="0" anchor="ctr"/>
+          <a:lstStyle/>
+          <a:p>
+            <a:pPr algn="ctr"/>
+            <a:r>
+              <a:rPr lang="en-US" sz="1200" dirty="0">
+                <a:solidFill>
+                  <a:schemeClr val="bg1">
+                    <a:lumMod val="85000"/>
+                  </a:schemeClr>
+                </a:solidFill>
+                <a:latin typeface="Open Sans" panose="020B0606030504020204" pitchFamily="34" charset="0"/>
+                <a:ea typeface="Open Sans" panose="020B0606030504020204" pitchFamily="34" charset="0"/>
+                <a:cs typeface="Open Sans" panose="020B0606030504020204" pitchFamily="34" charset="0"/>
+              </a:rPr>
+              <a:t>Start</a:t>
+            </a:r>
+          </a:p>
+        </p:txBody>
+      </p:sp>
+      <p:sp>
+        <p:nvSpPr>
+          <p:cNvPr id="60" name="Flowchart: Terminator 59">
+            <a:extLst>
+              <a:ext uri="{FF2B5EF4-FFF2-40B4-BE49-F238E27FC236}">
+                <a16:creationId xmlns:a16="http://schemas.microsoft.com/office/drawing/2014/main" id="{103191FC-37A5-724C-C214-882B4B9F6C89}"/>
+              </a:ext>
+            </a:extLst>
+          </p:cNvPr>
+          <p:cNvSpPr/>
+          <p:nvPr/>
+        </p:nvSpPr>
+        <p:spPr>
+          <a:xfrm>
+            <a:off x="9000424" y="1739895"/>
+            <a:ext cx="1050758" cy="341690"/>
+          </a:xfrm>
+          <a:prstGeom prst="flowChartTerminator">
+            <a:avLst/>
+          </a:prstGeom>
+          <a:noFill/>
+          <a:ln>
+            <a:solidFill>
+              <a:schemeClr val="bg1">
+                <a:lumMod val="75000"/>
+              </a:schemeClr>
+            </a:solidFill>
+          </a:ln>
+        </p:spPr>
+        <p:style>
+          <a:lnRef idx="2">
+            <a:schemeClr val="accent1">
+              <a:shade val="50000"/>
+            </a:schemeClr>
+          </a:lnRef>
+          <a:fillRef idx="1">
+            <a:schemeClr val="accent1"/>
+          </a:fillRef>
+          <a:effectRef idx="0">
+            <a:schemeClr val="accent1"/>
+          </a:effectRef>
+          <a:fontRef idx="minor">
+            <a:schemeClr val="lt1"/>
+          </a:fontRef>
+        </p:style>
+        <p:txBody>
+          <a:bodyPr rtlCol="0" anchor="ctr"/>
+          <a:lstStyle/>
+          <a:p>
+            <a:pPr algn="ctr"/>
+            <a:r>
+              <a:rPr lang="en-US" sz="1200" dirty="0">
+                <a:solidFill>
+                  <a:schemeClr val="bg1">
+                    <a:lumMod val="85000"/>
+                  </a:schemeClr>
+                </a:solidFill>
+                <a:latin typeface="Open Sans" panose="020B0606030504020204" pitchFamily="34" charset="0"/>
+                <a:ea typeface="Open Sans" panose="020B0606030504020204" pitchFamily="34" charset="0"/>
+                <a:cs typeface="Open Sans" panose="020B0606030504020204" pitchFamily="34" charset="0"/>
+              </a:rPr>
+              <a:t>Stop</a:t>
+            </a:r>
+          </a:p>
+        </p:txBody>
+      </p:sp>
+      <p:cxnSp>
+        <p:nvCxnSpPr>
+          <p:cNvPr id="61" name="Straight Arrow Connector 60">
+            <a:extLst>
+              <a:ext uri="{FF2B5EF4-FFF2-40B4-BE49-F238E27FC236}">
+                <a16:creationId xmlns:a16="http://schemas.microsoft.com/office/drawing/2014/main" id="{A1BBCFB3-141A-F3B8-67BE-C05995E64053}"/>
+              </a:ext>
+            </a:extLst>
+          </p:cNvPr>
+          <p:cNvCxnSpPr>
+            <a:cxnSpLocks/>
+            <a:stCxn id="59" idx="2"/>
+          </p:cNvCxnSpPr>
+          <p:nvPr/>
+        </p:nvCxnSpPr>
+        <p:spPr>
+          <a:xfrm flipH="1">
+            <a:off x="5092921" y="2081585"/>
+            <a:ext cx="4638" cy="341690"/>
+          </a:xfrm>
+          <a:prstGeom prst="straightConnector1">
+            <a:avLst/>
+          </a:prstGeom>
+          <a:ln w="12700">
+            <a:solidFill>
+              <a:schemeClr val="bg1">
+                <a:lumMod val="75000"/>
+              </a:schemeClr>
+            </a:solidFill>
+            <a:tailEnd type="triangle"/>
+          </a:ln>
+        </p:spPr>
+        <p:style>
+          <a:lnRef idx="1">
+            <a:schemeClr val="accent1"/>
+          </a:lnRef>
+          <a:fillRef idx="0">
+            <a:schemeClr val="accent1"/>
+          </a:fillRef>
+          <a:effectRef idx="0">
+            <a:schemeClr val="accent1"/>
+          </a:effectRef>
+          <a:fontRef idx="minor">
+            <a:schemeClr val="tx1"/>
+          </a:fontRef>
+        </p:style>
+      </p:cxnSp>
+      <p:cxnSp>
+        <p:nvCxnSpPr>
+          <p:cNvPr id="18" name="Straight Arrow Connector 17">
+            <a:extLst>
+              <a:ext uri="{FF2B5EF4-FFF2-40B4-BE49-F238E27FC236}">
+                <a16:creationId xmlns:a16="http://schemas.microsoft.com/office/drawing/2014/main" id="{28D76C1F-C45D-8EEF-E187-E9E48161CAB0}"/>
+              </a:ext>
+            </a:extLst>
+          </p:cNvPr>
+          <p:cNvCxnSpPr>
+            <a:cxnSpLocks/>
+            <a:endCxn id="60" idx="2"/>
+          </p:cNvCxnSpPr>
+          <p:nvPr/>
+        </p:nvCxnSpPr>
+        <p:spPr>
+          <a:xfrm flipV="1">
+            <a:off x="9525803" y="2081585"/>
+            <a:ext cx="0" cy="296780"/>
+          </a:xfrm>
+          <a:prstGeom prst="straightConnector1">
+            <a:avLst/>
+          </a:prstGeom>
+          <a:ln w="12700">
+            <a:solidFill>
+              <a:srgbClr val="CC99FF"/>
+            </a:solidFill>
+            <a:tailEnd type="triangle"/>
+          </a:ln>
+        </p:spPr>
+        <p:style>
+          <a:lnRef idx="1">
+            <a:schemeClr val="accent1"/>
+          </a:lnRef>
+          <a:fillRef idx="0">
+            <a:schemeClr val="accent1"/>
+          </a:fillRef>
+          <a:effectRef idx="0">
+            <a:schemeClr val="accent1"/>
+          </a:effectRef>
+          <a:fontRef idx="minor">
+            <a:schemeClr val="tx1"/>
+          </a:fontRef>
+        </p:style>
+      </p:cxnSp>
+      <p:sp>
+        <p:nvSpPr>
+          <p:cNvPr id="29" name="Flowchart: Terminator 28">
+            <a:extLst>
+              <a:ext uri="{FF2B5EF4-FFF2-40B4-BE49-F238E27FC236}">
+                <a16:creationId xmlns:a16="http://schemas.microsoft.com/office/drawing/2014/main" id="{97EBF7DD-2035-166F-CFA5-6B352DAE8ECC}"/>
+              </a:ext>
+            </a:extLst>
+          </p:cNvPr>
+          <p:cNvSpPr/>
+          <p:nvPr/>
+        </p:nvSpPr>
+        <p:spPr>
+          <a:xfrm>
+            <a:off x="1218666" y="649032"/>
+            <a:ext cx="1050758" cy="341690"/>
+          </a:xfrm>
+          <a:prstGeom prst="flowChartTerminator">
+            <a:avLst/>
+          </a:prstGeom>
+          <a:noFill/>
+          <a:ln>
+            <a:solidFill>
+              <a:schemeClr val="bg1">
+                <a:lumMod val="75000"/>
+              </a:schemeClr>
+            </a:solidFill>
+          </a:ln>
+        </p:spPr>
+        <p:style>
+          <a:lnRef idx="2">
+            <a:schemeClr val="accent1">
+              <a:shade val="50000"/>
+            </a:schemeClr>
+          </a:lnRef>
+          <a:fillRef idx="1">
+            <a:schemeClr val="accent1"/>
+          </a:fillRef>
+          <a:effectRef idx="0">
+            <a:schemeClr val="accent1"/>
+          </a:effectRef>
+          <a:fontRef idx="minor">
+            <a:schemeClr val="lt1"/>
+          </a:fontRef>
+        </p:style>
+        <p:txBody>
+          <a:bodyPr rtlCol="0" anchor="ctr"/>
+          <a:lstStyle/>
+          <a:p>
+            <a:pPr algn="ctr"/>
+            <a:r>
+              <a:rPr lang="en-US" sz="1200" dirty="0">
+                <a:solidFill>
+                  <a:schemeClr val="bg1">
+                    <a:lumMod val="85000"/>
+                  </a:schemeClr>
+                </a:solidFill>
+                <a:latin typeface="Open Sans" panose="020B0606030504020204" pitchFamily="34" charset="0"/>
+                <a:ea typeface="Open Sans" panose="020B0606030504020204" pitchFamily="34" charset="0"/>
+                <a:cs typeface="Open Sans" panose="020B0606030504020204" pitchFamily="34" charset="0"/>
+              </a:rPr>
+              <a:t>Start</a:t>
+            </a:r>
+          </a:p>
+        </p:txBody>
+      </p:sp>
+      <p:sp>
+        <p:nvSpPr>
+          <p:cNvPr id="31" name="Flowchart: Terminator 30">
+            <a:extLst>
+              <a:ext uri="{FF2B5EF4-FFF2-40B4-BE49-F238E27FC236}">
+                <a16:creationId xmlns:a16="http://schemas.microsoft.com/office/drawing/2014/main" id="{B46FF1EB-056C-88CD-27DB-132AB41F0506}"/>
+              </a:ext>
+            </a:extLst>
+          </p:cNvPr>
+          <p:cNvSpPr/>
+          <p:nvPr/>
+        </p:nvSpPr>
+        <p:spPr>
+          <a:xfrm>
+            <a:off x="1218666" y="1262521"/>
+            <a:ext cx="1050758" cy="341690"/>
+          </a:xfrm>
+          <a:prstGeom prst="flowChartTerminator">
+            <a:avLst/>
+          </a:prstGeom>
+          <a:noFill/>
+          <a:ln>
+            <a:solidFill>
+              <a:schemeClr val="bg1">
+                <a:lumMod val="75000"/>
+              </a:schemeClr>
+            </a:solidFill>
+          </a:ln>
+        </p:spPr>
+        <p:style>
+          <a:lnRef idx="2">
+            <a:schemeClr val="accent1">
+              <a:shade val="50000"/>
+            </a:schemeClr>
+          </a:lnRef>
+          <a:fillRef idx="1">
+            <a:schemeClr val="accent1"/>
+          </a:fillRef>
+          <a:effectRef idx="0">
+            <a:schemeClr val="accent1"/>
+          </a:effectRef>
+          <a:fontRef idx="minor">
+            <a:schemeClr val="lt1"/>
+          </a:fontRef>
+        </p:style>
+        <p:txBody>
+          <a:bodyPr rtlCol="0" anchor="ctr"/>
+          <a:lstStyle/>
+          <a:p>
+            <a:pPr algn="ctr"/>
+            <a:r>
+              <a:rPr lang="en-US" sz="1200" dirty="0">
+                <a:solidFill>
+                  <a:schemeClr val="bg1">
+                    <a:lumMod val="85000"/>
+                  </a:schemeClr>
+                </a:solidFill>
+                <a:latin typeface="Open Sans" panose="020B0606030504020204" pitchFamily="34" charset="0"/>
+                <a:ea typeface="Open Sans" panose="020B0606030504020204" pitchFamily="34" charset="0"/>
+                <a:cs typeface="Open Sans" panose="020B0606030504020204" pitchFamily="34" charset="0"/>
+              </a:rPr>
+              <a:t>Stop</a:t>
+            </a:r>
+          </a:p>
+        </p:txBody>
+      </p:sp>
+      <p:sp>
+        <p:nvSpPr>
+          <p:cNvPr id="34" name="Rectangle 33">
+            <a:extLst>
+              <a:ext uri="{FF2B5EF4-FFF2-40B4-BE49-F238E27FC236}">
+                <a16:creationId xmlns:a16="http://schemas.microsoft.com/office/drawing/2014/main" id="{A8D64967-4F28-2958-EE17-93FB9B3EDEEA}"/>
+              </a:ext>
+            </a:extLst>
+          </p:cNvPr>
+          <p:cNvSpPr/>
+          <p:nvPr/>
+        </p:nvSpPr>
+        <p:spPr>
+          <a:xfrm>
+            <a:off x="821623" y="3132324"/>
+            <a:ext cx="1844844" cy="393032"/>
+          </a:xfrm>
+          <a:prstGeom prst="rect">
+            <a:avLst/>
+          </a:prstGeom>
+          <a:noFill/>
+          <a:ln>
+            <a:solidFill>
+              <a:schemeClr val="accent6">
+                <a:lumMod val="60000"/>
+                <a:lumOff val="40000"/>
+              </a:schemeClr>
+            </a:solidFill>
+          </a:ln>
+        </p:spPr>
+        <p:style>
+          <a:lnRef idx="2">
+            <a:schemeClr val="accent1">
+              <a:shade val="50000"/>
+            </a:schemeClr>
+          </a:lnRef>
+          <a:fillRef idx="1">
+            <a:schemeClr val="accent1"/>
+          </a:fillRef>
+          <a:effectRef idx="0">
+            <a:schemeClr val="accent1"/>
+          </a:effectRef>
+          <a:fontRef idx="minor">
+            <a:schemeClr val="lt1"/>
+          </a:fontRef>
+        </p:style>
+        <p:txBody>
+          <a:bodyPr rtlCol="0" anchor="ctr"/>
+          <a:lstStyle/>
+          <a:p>
+            <a:pPr algn="ctr"/>
+            <a:r>
+              <a:rPr lang="en-US" sz="1200" dirty="0">
+                <a:solidFill>
+                  <a:schemeClr val="bg1">
+                    <a:lumMod val="85000"/>
+                  </a:schemeClr>
+                </a:solidFill>
+                <a:latin typeface="Open Sans" panose="020B0606030504020204" pitchFamily="34" charset="0"/>
+                <a:ea typeface="Open Sans" panose="020B0606030504020204" pitchFamily="34" charset="0"/>
+                <a:cs typeface="Open Sans" panose="020B0606030504020204" pitchFamily="34" charset="0"/>
+              </a:rPr>
+              <a:t>action / process</a:t>
+            </a:r>
+          </a:p>
+        </p:txBody>
+      </p:sp>
+      <p:sp>
+        <p:nvSpPr>
+          <p:cNvPr id="39" name="Flowchart: Data 38">
+            <a:extLst>
+              <a:ext uri="{FF2B5EF4-FFF2-40B4-BE49-F238E27FC236}">
+                <a16:creationId xmlns:a16="http://schemas.microsoft.com/office/drawing/2014/main" id="{84DF5FB3-6B18-6E52-CED0-52B59C223732}"/>
+              </a:ext>
+            </a:extLst>
+          </p:cNvPr>
+          <p:cNvSpPr/>
+          <p:nvPr/>
+        </p:nvSpPr>
+        <p:spPr>
+          <a:xfrm>
+            <a:off x="821623" y="2125701"/>
+            <a:ext cx="1844844" cy="489284"/>
+          </a:xfrm>
+          <a:prstGeom prst="flowChartInputOutput">
+            <a:avLst/>
+          </a:prstGeom>
+          <a:noFill/>
+          <a:ln>
+            <a:solidFill>
+              <a:schemeClr val="accent1">
+                <a:lumMod val="60000"/>
+                <a:lumOff val="40000"/>
+              </a:schemeClr>
+            </a:solidFill>
+          </a:ln>
+        </p:spPr>
+        <p:style>
+          <a:lnRef idx="2">
+            <a:schemeClr val="accent1">
+              <a:shade val="50000"/>
+            </a:schemeClr>
+          </a:lnRef>
+          <a:fillRef idx="1">
+            <a:schemeClr val="accent1"/>
+          </a:fillRef>
+          <a:effectRef idx="0">
+            <a:schemeClr val="accent1"/>
+          </a:effectRef>
+          <a:fontRef idx="minor">
+            <a:schemeClr val="lt1"/>
+          </a:fontRef>
+        </p:style>
+        <p:txBody>
+          <a:bodyPr rtlCol="0" anchor="ctr"/>
+          <a:lstStyle/>
+          <a:p>
+            <a:pPr algn="ctr"/>
+            <a:r>
+              <a:rPr lang="en-US" sz="1200" dirty="0">
+                <a:solidFill>
+                  <a:schemeClr val="bg1">
+                    <a:lumMod val="85000"/>
+                  </a:schemeClr>
+                </a:solidFill>
+                <a:latin typeface="Open Sans" panose="020B0606030504020204" pitchFamily="34" charset="0"/>
+                <a:ea typeface="Open Sans" panose="020B0606030504020204" pitchFamily="34" charset="0"/>
+                <a:cs typeface="Open Sans" panose="020B0606030504020204" pitchFamily="34" charset="0"/>
+              </a:rPr>
+              <a:t>input</a:t>
+            </a:r>
+          </a:p>
+        </p:txBody>
+      </p:sp>
+      <p:sp>
+        <p:nvSpPr>
+          <p:cNvPr id="46" name="Flowchart: Decision 45">
+            <a:extLst>
+              <a:ext uri="{FF2B5EF4-FFF2-40B4-BE49-F238E27FC236}">
+                <a16:creationId xmlns:a16="http://schemas.microsoft.com/office/drawing/2014/main" id="{265FEB22-D05F-9423-661B-B86264CDC339}"/>
+              </a:ext>
+            </a:extLst>
+          </p:cNvPr>
+          <p:cNvSpPr/>
+          <p:nvPr/>
+        </p:nvSpPr>
+        <p:spPr>
+          <a:xfrm>
+            <a:off x="821623" y="4052904"/>
+            <a:ext cx="1844844" cy="946484"/>
+          </a:xfrm>
+          <a:prstGeom prst="flowChartDecision">
+            <a:avLst/>
+          </a:prstGeom>
+          <a:noFill/>
+          <a:ln>
+            <a:solidFill>
+              <a:srgbClr val="FF7C80"/>
+            </a:solidFill>
+          </a:ln>
+        </p:spPr>
+        <p:style>
+          <a:lnRef idx="2">
+            <a:schemeClr val="accent1">
+              <a:shade val="50000"/>
+            </a:schemeClr>
+          </a:lnRef>
+          <a:fillRef idx="1">
+            <a:schemeClr val="accent1"/>
+          </a:fillRef>
+          <a:effectRef idx="0">
+            <a:schemeClr val="accent1"/>
+          </a:effectRef>
+          <a:fontRef idx="minor">
+            <a:schemeClr val="lt1"/>
+          </a:fontRef>
+        </p:style>
+        <p:txBody>
+          <a:bodyPr rtlCol="0" anchor="ctr"/>
+          <a:lstStyle/>
+          <a:p>
+            <a:pPr algn="ctr"/>
+            <a:r>
+              <a:rPr lang="en-US" sz="1200" dirty="0">
+                <a:solidFill>
+                  <a:schemeClr val="bg1">
+                    <a:lumMod val="85000"/>
+                  </a:schemeClr>
+                </a:solidFill>
+                <a:latin typeface="Open Sans" panose="020B0606030504020204" pitchFamily="34" charset="0"/>
+                <a:ea typeface="Open Sans" panose="020B0606030504020204" pitchFamily="34" charset="0"/>
+                <a:cs typeface="Open Sans" panose="020B0606030504020204" pitchFamily="34" charset="0"/>
+              </a:rPr>
+              <a:t>decision</a:t>
+            </a:r>
+          </a:p>
+        </p:txBody>
+      </p:sp>
+      <p:sp>
+        <p:nvSpPr>
+          <p:cNvPr id="47" name="Flowchart: Data 46">
+            <a:extLst>
+              <a:ext uri="{FF2B5EF4-FFF2-40B4-BE49-F238E27FC236}">
+                <a16:creationId xmlns:a16="http://schemas.microsoft.com/office/drawing/2014/main" id="{E79F7B5C-9F7D-5907-4BED-1DDC3947E632}"/>
+              </a:ext>
+            </a:extLst>
+          </p:cNvPr>
+          <p:cNvSpPr/>
+          <p:nvPr/>
+        </p:nvSpPr>
+        <p:spPr>
+          <a:xfrm>
+            <a:off x="821623" y="5526936"/>
+            <a:ext cx="1844844" cy="489284"/>
+          </a:xfrm>
+          <a:prstGeom prst="flowChartInputOutput">
+            <a:avLst/>
+          </a:prstGeom>
+          <a:noFill/>
+          <a:ln>
+            <a:solidFill>
+              <a:srgbClr val="CC99FF"/>
+            </a:solidFill>
+          </a:ln>
+        </p:spPr>
+        <p:style>
+          <a:lnRef idx="2">
+            <a:schemeClr val="accent1">
+              <a:shade val="50000"/>
+            </a:schemeClr>
+          </a:lnRef>
+          <a:fillRef idx="1">
+            <a:schemeClr val="accent1"/>
+          </a:fillRef>
+          <a:effectRef idx="0">
+            <a:schemeClr val="accent1"/>
+          </a:effectRef>
+          <a:fontRef idx="minor">
+            <a:schemeClr val="lt1"/>
+          </a:fontRef>
+        </p:style>
+        <p:txBody>
+          <a:bodyPr rtlCol="0" anchor="ctr"/>
+          <a:lstStyle/>
+          <a:p>
+            <a:pPr algn="ctr"/>
+            <a:r>
+              <a:rPr lang="en-US" sz="1200" dirty="0">
+                <a:solidFill>
+                  <a:schemeClr val="bg1">
+                    <a:lumMod val="85000"/>
+                  </a:schemeClr>
+                </a:solidFill>
+                <a:latin typeface="Open Sans" panose="020B0606030504020204" pitchFamily="34" charset="0"/>
+                <a:ea typeface="Open Sans" panose="020B0606030504020204" pitchFamily="34" charset="0"/>
+                <a:cs typeface="Open Sans" panose="020B0606030504020204" pitchFamily="34" charset="0"/>
+              </a:rPr>
+              <a:t>output</a:t>
+            </a:r>
+          </a:p>
+        </p:txBody>
+      </p:sp>
+      <p:sp>
+        <p:nvSpPr>
+          <p:cNvPr id="49" name="TextBox 48">
+            <a:extLst>
+              <a:ext uri="{FF2B5EF4-FFF2-40B4-BE49-F238E27FC236}">
+                <a16:creationId xmlns:a16="http://schemas.microsoft.com/office/drawing/2014/main" id="{9782D64F-E1B4-7BBA-97F1-672AA7BB38F2}"/>
+              </a:ext>
+            </a:extLst>
+          </p:cNvPr>
+          <p:cNvSpPr txBox="1"/>
+          <p:nvPr/>
+        </p:nvSpPr>
+        <p:spPr>
+          <a:xfrm>
+            <a:off x="2396841" y="4042695"/>
+            <a:ext cx="269626" cy="276999"/>
+          </a:xfrm>
+          <a:prstGeom prst="rect">
+            <a:avLst/>
+          </a:prstGeom>
+          <a:noFill/>
+        </p:spPr>
+        <p:txBody>
+          <a:bodyPr wrap="none" rtlCol="0">
+            <a:spAutoFit/>
+          </a:bodyPr>
+          <a:lstStyle/>
+          <a:p>
+            <a:r>
+              <a:rPr lang="en-US" sz="1200" dirty="0">
+                <a:solidFill>
+                  <a:srgbClr val="FF7C80"/>
+                </a:solidFill>
+                <a:latin typeface="Open Sans" panose="020B0606030504020204" pitchFamily="34" charset="0"/>
+                <a:ea typeface="Open Sans" panose="020B0606030504020204" pitchFamily="34" charset="0"/>
+                <a:cs typeface="Open Sans" panose="020B0606030504020204" pitchFamily="34" charset="0"/>
+              </a:rPr>
+              <a:t>T</a:t>
+            </a:r>
+          </a:p>
+        </p:txBody>
+      </p:sp>
+      <p:sp>
+        <p:nvSpPr>
+          <p:cNvPr id="53" name="TextBox 52">
+            <a:extLst>
+              <a:ext uri="{FF2B5EF4-FFF2-40B4-BE49-F238E27FC236}">
+                <a16:creationId xmlns:a16="http://schemas.microsoft.com/office/drawing/2014/main" id="{7E6B2905-22B9-9F02-399A-510F7F8499F3}"/>
+              </a:ext>
+            </a:extLst>
+          </p:cNvPr>
+          <p:cNvSpPr txBox="1"/>
+          <p:nvPr/>
+        </p:nvSpPr>
+        <p:spPr>
+          <a:xfrm>
+            <a:off x="821623" y="4042694"/>
+            <a:ext cx="269626" cy="276999"/>
+          </a:xfrm>
+          <a:prstGeom prst="rect">
+            <a:avLst/>
+          </a:prstGeom>
+          <a:noFill/>
+        </p:spPr>
+        <p:txBody>
+          <a:bodyPr wrap="none" rtlCol="0">
+            <a:spAutoFit/>
+          </a:bodyPr>
+          <a:lstStyle/>
+          <a:p>
+            <a:r>
+              <a:rPr lang="en-US" sz="1200" dirty="0">
+                <a:solidFill>
+                  <a:srgbClr val="FF7C80"/>
+                </a:solidFill>
+                <a:latin typeface="Open Sans" panose="020B0606030504020204" pitchFamily="34" charset="0"/>
+                <a:ea typeface="Open Sans" panose="020B0606030504020204" pitchFamily="34" charset="0"/>
+                <a:cs typeface="Open Sans" panose="020B0606030504020204" pitchFamily="34" charset="0"/>
+              </a:rPr>
+              <a:t>F</a:t>
+            </a:r>
+          </a:p>
+        </p:txBody>
+      </p:sp>
+    </p:spTree>
+    <p:extLst>
+      <p:ext uri="{BB962C8B-B14F-4D97-AF65-F5344CB8AC3E}">
+        <p14:creationId xmlns:p14="http://schemas.microsoft.com/office/powerpoint/2010/main" val="3845112064"/>
+      </p:ext>
+    </p:extLst>
+  </p:cSld>
+  <p:clrMapOvr>
+    <a:masterClrMapping/>
+  </p:clrMapOvr>
+</p:sld>
+</file>
+
+<file path=ppt/slides/slide19.xml><?xml version="1.0" encoding="utf-8"?>
+<p:sld xmlns:a="http://schemas.openxmlformats.org/drawingml/2006/main" xmlns:r="http://schemas.openxmlformats.org/officeDocument/2006/relationships" xmlns:p="http://schemas.openxmlformats.org/presentationml/2006/main">
+  <p:cSld>
+    <p:spTree>
+      <p:nvGrpSpPr>
+        <p:cNvPr id="1" name=""/>
+        <p:cNvGrpSpPr/>
+        <p:nvPr/>
+      </p:nvGrpSpPr>
+      <p:grpSpPr>
+        <a:xfrm>
+          <a:off x="0" y="0"/>
+          <a:ext cx="0" cy="0"/>
+          <a:chOff x="0" y="0"/>
+          <a:chExt cx="0" cy="0"/>
+        </a:xfrm>
+      </p:grpSpPr>
+      <p:sp>
+        <p:nvSpPr>
+          <p:cNvPr id="108" name="Rectangle 107">
+            <a:extLst>
+              <a:ext uri="{FF2B5EF4-FFF2-40B4-BE49-F238E27FC236}">
+                <a16:creationId xmlns:a16="http://schemas.microsoft.com/office/drawing/2014/main" id="{F5A5FD62-A99C-04B6-706B-DEE9B81AF541}"/>
+              </a:ext>
+            </a:extLst>
+          </p:cNvPr>
+          <p:cNvSpPr/>
+          <p:nvPr/>
+        </p:nvSpPr>
+        <p:spPr>
+          <a:xfrm>
+            <a:off x="3645392" y="1315453"/>
+            <a:ext cx="7327942" cy="4227094"/>
+          </a:xfrm>
+          <a:prstGeom prst="rect">
+            <a:avLst/>
+          </a:prstGeom>
+          <a:solidFill>
+            <a:srgbClr val="0F1017"/>
+          </a:solidFill>
+          <a:ln w="12700">
+            <a:solidFill>
+              <a:schemeClr val="bg1">
+                <a:lumMod val="75000"/>
+              </a:schemeClr>
+            </a:solidFill>
+          </a:ln>
+        </p:spPr>
+        <p:style>
+          <a:lnRef idx="2">
+            <a:schemeClr val="accent1">
+              <a:shade val="50000"/>
+            </a:schemeClr>
+          </a:lnRef>
+          <a:fillRef idx="1">
+            <a:schemeClr val="accent1"/>
+          </a:fillRef>
+          <a:effectRef idx="0">
+            <a:schemeClr val="accent1"/>
+          </a:effectRef>
+          <a:fontRef idx="minor">
+            <a:schemeClr val="lt1"/>
+          </a:fontRef>
+        </p:style>
+        <p:txBody>
+          <a:bodyPr rtlCol="0" anchor="ctr"/>
+          <a:lstStyle/>
+          <a:p>
+            <a:pPr algn="ctr"/>
+            <a:endParaRPr lang="en-US" sz="1800" dirty="0">
+              <a:solidFill>
+                <a:schemeClr val="bg1">
+                  <a:lumMod val="85000"/>
+                </a:schemeClr>
+              </a:solidFill>
+              <a:latin typeface="Open Sans" panose="020B0606030504020204" pitchFamily="34" charset="0"/>
+              <a:ea typeface="Open Sans" panose="020B0606030504020204" pitchFamily="34" charset="0"/>
+              <a:cs typeface="Open Sans" panose="020B0606030504020204" pitchFamily="34" charset="0"/>
+            </a:endParaRPr>
+          </a:p>
+        </p:txBody>
+      </p:sp>
+      <p:sp>
+        <p:nvSpPr>
+          <p:cNvPr id="59" name="Flowchart: Terminator 58">
+            <a:extLst>
+              <a:ext uri="{FF2B5EF4-FFF2-40B4-BE49-F238E27FC236}">
+                <a16:creationId xmlns:a16="http://schemas.microsoft.com/office/drawing/2014/main" id="{D7554AAC-5F81-46CA-BA4E-6CDF6B8CC5AD}"/>
+              </a:ext>
+            </a:extLst>
+          </p:cNvPr>
+          <p:cNvSpPr/>
+          <p:nvPr/>
+        </p:nvSpPr>
+        <p:spPr>
+          <a:xfrm>
+            <a:off x="4572180" y="1739895"/>
+            <a:ext cx="1050758" cy="341690"/>
+          </a:xfrm>
+          <a:prstGeom prst="flowChartTerminator">
+            <a:avLst/>
+          </a:prstGeom>
+          <a:noFill/>
+          <a:ln>
+            <a:solidFill>
+              <a:schemeClr val="bg1">
+                <a:lumMod val="75000"/>
+              </a:schemeClr>
+            </a:solidFill>
+          </a:ln>
+        </p:spPr>
+        <p:style>
+          <a:lnRef idx="2">
+            <a:schemeClr val="accent1">
+              <a:shade val="50000"/>
+            </a:schemeClr>
+          </a:lnRef>
+          <a:fillRef idx="1">
+            <a:schemeClr val="accent1"/>
+          </a:fillRef>
+          <a:effectRef idx="0">
+            <a:schemeClr val="accent1"/>
+          </a:effectRef>
+          <a:fontRef idx="minor">
+            <a:schemeClr val="lt1"/>
+          </a:fontRef>
+        </p:style>
+        <p:txBody>
+          <a:bodyPr rtlCol="0" anchor="ctr"/>
+          <a:lstStyle/>
+          <a:p>
+            <a:pPr algn="ctr"/>
+            <a:r>
+              <a:rPr lang="en-US" sz="1200" dirty="0">
+                <a:solidFill>
+                  <a:schemeClr val="bg1">
+                    <a:lumMod val="85000"/>
+                  </a:schemeClr>
+                </a:solidFill>
+                <a:latin typeface="Open Sans" panose="020B0606030504020204" pitchFamily="34" charset="0"/>
+                <a:ea typeface="Open Sans" panose="020B0606030504020204" pitchFamily="34" charset="0"/>
+                <a:cs typeface="Open Sans" panose="020B0606030504020204" pitchFamily="34" charset="0"/>
+              </a:rPr>
+              <a:t>Start</a:t>
+            </a:r>
+          </a:p>
+        </p:txBody>
+      </p:sp>
+      <p:sp>
+        <p:nvSpPr>
+          <p:cNvPr id="60" name="Flowchart: Terminator 59">
+            <a:extLst>
+              <a:ext uri="{FF2B5EF4-FFF2-40B4-BE49-F238E27FC236}">
+                <a16:creationId xmlns:a16="http://schemas.microsoft.com/office/drawing/2014/main" id="{103191FC-37A5-724C-C214-882B4B9F6C89}"/>
+              </a:ext>
+            </a:extLst>
+          </p:cNvPr>
+          <p:cNvSpPr/>
+          <p:nvPr/>
+        </p:nvSpPr>
+        <p:spPr>
+          <a:xfrm>
+            <a:off x="9000424" y="1739895"/>
+            <a:ext cx="1050758" cy="341690"/>
+          </a:xfrm>
+          <a:prstGeom prst="flowChartTerminator">
+            <a:avLst/>
+          </a:prstGeom>
+          <a:noFill/>
+          <a:ln>
+            <a:solidFill>
+              <a:schemeClr val="bg1">
+                <a:lumMod val="75000"/>
+              </a:schemeClr>
+            </a:solidFill>
+          </a:ln>
+        </p:spPr>
+        <p:style>
+          <a:lnRef idx="2">
+            <a:schemeClr val="accent1">
+              <a:shade val="50000"/>
+            </a:schemeClr>
+          </a:lnRef>
+          <a:fillRef idx="1">
+            <a:schemeClr val="accent1"/>
+          </a:fillRef>
+          <a:effectRef idx="0">
+            <a:schemeClr val="accent1"/>
+          </a:effectRef>
+          <a:fontRef idx="minor">
+            <a:schemeClr val="lt1"/>
+          </a:fontRef>
+        </p:style>
+        <p:txBody>
+          <a:bodyPr rtlCol="0" anchor="ctr"/>
+          <a:lstStyle/>
+          <a:p>
+            <a:pPr algn="ctr"/>
+            <a:r>
+              <a:rPr lang="en-US" sz="1200" dirty="0">
+                <a:solidFill>
+                  <a:schemeClr val="bg1">
+                    <a:lumMod val="85000"/>
+                  </a:schemeClr>
+                </a:solidFill>
+                <a:latin typeface="Open Sans" panose="020B0606030504020204" pitchFamily="34" charset="0"/>
+                <a:ea typeface="Open Sans" panose="020B0606030504020204" pitchFamily="34" charset="0"/>
+                <a:cs typeface="Open Sans" panose="020B0606030504020204" pitchFamily="34" charset="0"/>
+              </a:rPr>
+              <a:t>Stop</a:t>
+            </a:r>
+          </a:p>
+        </p:txBody>
+      </p:sp>
+      <p:cxnSp>
+        <p:nvCxnSpPr>
+          <p:cNvPr id="61" name="Straight Arrow Connector 60">
+            <a:extLst>
+              <a:ext uri="{FF2B5EF4-FFF2-40B4-BE49-F238E27FC236}">
+                <a16:creationId xmlns:a16="http://schemas.microsoft.com/office/drawing/2014/main" id="{A1BBCFB3-141A-F3B8-67BE-C05995E64053}"/>
+              </a:ext>
+            </a:extLst>
+          </p:cNvPr>
+          <p:cNvCxnSpPr>
+            <a:cxnSpLocks/>
+            <a:stCxn id="59" idx="2"/>
+          </p:cNvCxnSpPr>
+          <p:nvPr/>
+        </p:nvCxnSpPr>
+        <p:spPr>
+          <a:xfrm flipH="1">
+            <a:off x="5092921" y="2081585"/>
+            <a:ext cx="4638" cy="341690"/>
+          </a:xfrm>
+          <a:prstGeom prst="straightConnector1">
+            <a:avLst/>
+          </a:prstGeom>
+          <a:ln w="12700">
+            <a:solidFill>
+              <a:schemeClr val="bg1">
+                <a:lumMod val="75000"/>
+              </a:schemeClr>
+            </a:solidFill>
+            <a:tailEnd type="triangle"/>
+          </a:ln>
+        </p:spPr>
+        <p:style>
+          <a:lnRef idx="1">
+            <a:schemeClr val="accent1"/>
+          </a:lnRef>
+          <a:fillRef idx="0">
+            <a:schemeClr val="accent1"/>
+          </a:fillRef>
+          <a:effectRef idx="0">
+            <a:schemeClr val="accent1"/>
+          </a:effectRef>
+          <a:fontRef idx="minor">
+            <a:schemeClr val="tx1"/>
+          </a:fontRef>
+        </p:style>
+      </p:cxnSp>
+      <p:cxnSp>
+        <p:nvCxnSpPr>
+          <p:cNvPr id="18" name="Straight Arrow Connector 17">
+            <a:extLst>
+              <a:ext uri="{FF2B5EF4-FFF2-40B4-BE49-F238E27FC236}">
+                <a16:creationId xmlns:a16="http://schemas.microsoft.com/office/drawing/2014/main" id="{28D76C1F-C45D-8EEF-E187-E9E48161CAB0}"/>
+              </a:ext>
+            </a:extLst>
+          </p:cNvPr>
+          <p:cNvCxnSpPr>
+            <a:cxnSpLocks/>
+            <a:endCxn id="60" idx="2"/>
+          </p:cNvCxnSpPr>
+          <p:nvPr/>
+        </p:nvCxnSpPr>
+        <p:spPr>
+          <a:xfrm flipV="1">
+            <a:off x="9525803" y="2081585"/>
+            <a:ext cx="0" cy="296780"/>
+          </a:xfrm>
+          <a:prstGeom prst="straightConnector1">
+            <a:avLst/>
+          </a:prstGeom>
+          <a:ln w="12700">
+            <a:solidFill>
+              <a:srgbClr val="CC99FF"/>
+            </a:solidFill>
+            <a:tailEnd type="triangle"/>
+          </a:ln>
+        </p:spPr>
+        <p:style>
+          <a:lnRef idx="1">
+            <a:schemeClr val="accent1"/>
+          </a:lnRef>
+          <a:fillRef idx="0">
+            <a:schemeClr val="accent1"/>
+          </a:fillRef>
+          <a:effectRef idx="0">
+            <a:schemeClr val="accent1"/>
+          </a:effectRef>
+          <a:fontRef idx="minor">
+            <a:schemeClr val="tx1"/>
+          </a:fontRef>
+        </p:style>
+      </p:cxnSp>
+      <p:sp>
+        <p:nvSpPr>
+          <p:cNvPr id="29" name="Flowchart: Terminator 28">
+            <a:extLst>
+              <a:ext uri="{FF2B5EF4-FFF2-40B4-BE49-F238E27FC236}">
+                <a16:creationId xmlns:a16="http://schemas.microsoft.com/office/drawing/2014/main" id="{97EBF7DD-2035-166F-CFA5-6B352DAE8ECC}"/>
+              </a:ext>
+            </a:extLst>
+          </p:cNvPr>
+          <p:cNvSpPr/>
+          <p:nvPr/>
+        </p:nvSpPr>
+        <p:spPr>
+          <a:xfrm>
+            <a:off x="1218666" y="649032"/>
+            <a:ext cx="1050758" cy="341690"/>
+          </a:xfrm>
+          <a:prstGeom prst="flowChartTerminator">
+            <a:avLst/>
+          </a:prstGeom>
+          <a:noFill/>
+          <a:ln>
+            <a:solidFill>
+              <a:schemeClr val="bg1">
+                <a:lumMod val="75000"/>
+              </a:schemeClr>
+            </a:solidFill>
+          </a:ln>
+        </p:spPr>
+        <p:style>
+          <a:lnRef idx="2">
+            <a:schemeClr val="accent1">
+              <a:shade val="50000"/>
+            </a:schemeClr>
+          </a:lnRef>
+          <a:fillRef idx="1">
+            <a:schemeClr val="accent1"/>
+          </a:fillRef>
+          <a:effectRef idx="0">
+            <a:schemeClr val="accent1"/>
+          </a:effectRef>
+          <a:fontRef idx="minor">
+            <a:schemeClr val="lt1"/>
+          </a:fontRef>
+        </p:style>
+        <p:txBody>
+          <a:bodyPr rtlCol="0" anchor="ctr"/>
+          <a:lstStyle/>
+          <a:p>
+            <a:pPr algn="ctr"/>
+            <a:r>
+              <a:rPr lang="en-US" sz="1200" dirty="0">
+                <a:solidFill>
+                  <a:schemeClr val="bg1">
+                    <a:lumMod val="85000"/>
+                  </a:schemeClr>
+                </a:solidFill>
+                <a:latin typeface="Open Sans" panose="020B0606030504020204" pitchFamily="34" charset="0"/>
+                <a:ea typeface="Open Sans" panose="020B0606030504020204" pitchFamily="34" charset="0"/>
+                <a:cs typeface="Open Sans" panose="020B0606030504020204" pitchFamily="34" charset="0"/>
+              </a:rPr>
+              <a:t>Start</a:t>
+            </a:r>
+          </a:p>
+        </p:txBody>
+      </p:sp>
+      <p:sp>
+        <p:nvSpPr>
+          <p:cNvPr id="31" name="Flowchart: Terminator 30">
+            <a:extLst>
+              <a:ext uri="{FF2B5EF4-FFF2-40B4-BE49-F238E27FC236}">
+                <a16:creationId xmlns:a16="http://schemas.microsoft.com/office/drawing/2014/main" id="{B46FF1EB-056C-88CD-27DB-132AB41F0506}"/>
+              </a:ext>
+            </a:extLst>
+          </p:cNvPr>
+          <p:cNvSpPr/>
+          <p:nvPr/>
+        </p:nvSpPr>
+        <p:spPr>
+          <a:xfrm>
+            <a:off x="1218666" y="1262521"/>
+            <a:ext cx="1050758" cy="341690"/>
+          </a:xfrm>
+          <a:prstGeom prst="flowChartTerminator">
+            <a:avLst/>
+          </a:prstGeom>
+          <a:noFill/>
+          <a:ln>
+            <a:solidFill>
+              <a:schemeClr val="bg1">
+                <a:lumMod val="75000"/>
+              </a:schemeClr>
+            </a:solidFill>
+          </a:ln>
+        </p:spPr>
+        <p:style>
+          <a:lnRef idx="2">
+            <a:schemeClr val="accent1">
+              <a:shade val="50000"/>
+            </a:schemeClr>
+          </a:lnRef>
+          <a:fillRef idx="1">
+            <a:schemeClr val="accent1"/>
+          </a:fillRef>
+          <a:effectRef idx="0">
+            <a:schemeClr val="accent1"/>
+          </a:effectRef>
+          <a:fontRef idx="minor">
+            <a:schemeClr val="lt1"/>
+          </a:fontRef>
+        </p:style>
+        <p:txBody>
+          <a:bodyPr rtlCol="0" anchor="ctr"/>
+          <a:lstStyle/>
+          <a:p>
+            <a:pPr algn="ctr"/>
+            <a:r>
+              <a:rPr lang="en-US" sz="1200" dirty="0">
+                <a:solidFill>
+                  <a:schemeClr val="bg1">
+                    <a:lumMod val="85000"/>
+                  </a:schemeClr>
+                </a:solidFill>
+                <a:latin typeface="Open Sans" panose="020B0606030504020204" pitchFamily="34" charset="0"/>
+                <a:ea typeface="Open Sans" panose="020B0606030504020204" pitchFamily="34" charset="0"/>
+                <a:cs typeface="Open Sans" panose="020B0606030504020204" pitchFamily="34" charset="0"/>
+              </a:rPr>
+              <a:t>Stop</a:t>
+            </a:r>
+          </a:p>
+        </p:txBody>
+      </p:sp>
+      <p:sp>
+        <p:nvSpPr>
+          <p:cNvPr id="34" name="Rectangle 33">
+            <a:extLst>
+              <a:ext uri="{FF2B5EF4-FFF2-40B4-BE49-F238E27FC236}">
+                <a16:creationId xmlns:a16="http://schemas.microsoft.com/office/drawing/2014/main" id="{A8D64967-4F28-2958-EE17-93FB9B3EDEEA}"/>
+              </a:ext>
+            </a:extLst>
+          </p:cNvPr>
+          <p:cNvSpPr/>
+          <p:nvPr/>
+        </p:nvSpPr>
+        <p:spPr>
+          <a:xfrm>
+            <a:off x="821623" y="3132324"/>
+            <a:ext cx="1844844" cy="393032"/>
+          </a:xfrm>
+          <a:prstGeom prst="rect">
+            <a:avLst/>
+          </a:prstGeom>
+          <a:noFill/>
+          <a:ln>
+            <a:solidFill>
+              <a:schemeClr val="accent6">
+                <a:lumMod val="60000"/>
+                <a:lumOff val="40000"/>
+              </a:schemeClr>
+            </a:solidFill>
+          </a:ln>
+        </p:spPr>
+        <p:style>
+          <a:lnRef idx="2">
+            <a:schemeClr val="accent1">
+              <a:shade val="50000"/>
+            </a:schemeClr>
+          </a:lnRef>
+          <a:fillRef idx="1">
+            <a:schemeClr val="accent1"/>
+          </a:fillRef>
+          <a:effectRef idx="0">
+            <a:schemeClr val="accent1"/>
+          </a:effectRef>
+          <a:fontRef idx="minor">
+            <a:schemeClr val="lt1"/>
+          </a:fontRef>
+        </p:style>
+        <p:txBody>
+          <a:bodyPr rtlCol="0" anchor="ctr"/>
+          <a:lstStyle/>
+          <a:p>
+            <a:pPr algn="ctr"/>
+            <a:r>
+              <a:rPr lang="en-US" sz="1200" dirty="0">
+                <a:solidFill>
+                  <a:schemeClr val="bg1">
+                    <a:lumMod val="85000"/>
+                  </a:schemeClr>
+                </a:solidFill>
+                <a:latin typeface="Open Sans" panose="020B0606030504020204" pitchFamily="34" charset="0"/>
+                <a:ea typeface="Open Sans" panose="020B0606030504020204" pitchFamily="34" charset="0"/>
+                <a:cs typeface="Open Sans" panose="020B0606030504020204" pitchFamily="34" charset="0"/>
+              </a:rPr>
+              <a:t>action / process</a:t>
+            </a:r>
+          </a:p>
+        </p:txBody>
+      </p:sp>
+      <p:sp>
+        <p:nvSpPr>
+          <p:cNvPr id="39" name="Flowchart: Data 38">
+            <a:extLst>
+              <a:ext uri="{FF2B5EF4-FFF2-40B4-BE49-F238E27FC236}">
+                <a16:creationId xmlns:a16="http://schemas.microsoft.com/office/drawing/2014/main" id="{84DF5FB3-6B18-6E52-CED0-52B59C223732}"/>
+              </a:ext>
+            </a:extLst>
+          </p:cNvPr>
+          <p:cNvSpPr/>
+          <p:nvPr/>
+        </p:nvSpPr>
+        <p:spPr>
+          <a:xfrm>
+            <a:off x="821623" y="2125701"/>
+            <a:ext cx="1844844" cy="489284"/>
+          </a:xfrm>
+          <a:prstGeom prst="flowChartInputOutput">
+            <a:avLst/>
+          </a:prstGeom>
+          <a:noFill/>
+          <a:ln>
+            <a:solidFill>
+              <a:schemeClr val="accent1">
+                <a:lumMod val="60000"/>
+                <a:lumOff val="40000"/>
+              </a:schemeClr>
+            </a:solidFill>
+          </a:ln>
+        </p:spPr>
+        <p:style>
+          <a:lnRef idx="2">
+            <a:schemeClr val="accent1">
+              <a:shade val="50000"/>
+            </a:schemeClr>
+          </a:lnRef>
+          <a:fillRef idx="1">
+            <a:schemeClr val="accent1"/>
+          </a:fillRef>
+          <a:effectRef idx="0">
+            <a:schemeClr val="accent1"/>
+          </a:effectRef>
+          <a:fontRef idx="minor">
+            <a:schemeClr val="lt1"/>
+          </a:fontRef>
+        </p:style>
+        <p:txBody>
+          <a:bodyPr rtlCol="0" anchor="ctr"/>
+          <a:lstStyle/>
+          <a:p>
+            <a:pPr algn="ctr"/>
+            <a:r>
+              <a:rPr lang="en-US" sz="1200" dirty="0">
+                <a:solidFill>
+                  <a:schemeClr val="bg1">
+                    <a:lumMod val="85000"/>
+                  </a:schemeClr>
+                </a:solidFill>
+                <a:latin typeface="Open Sans" panose="020B0606030504020204" pitchFamily="34" charset="0"/>
+                <a:ea typeface="Open Sans" panose="020B0606030504020204" pitchFamily="34" charset="0"/>
+                <a:cs typeface="Open Sans" panose="020B0606030504020204" pitchFamily="34" charset="0"/>
+              </a:rPr>
+              <a:t>input</a:t>
+            </a:r>
+          </a:p>
+        </p:txBody>
+      </p:sp>
+      <p:sp>
+        <p:nvSpPr>
+          <p:cNvPr id="46" name="Flowchart: Decision 45">
+            <a:extLst>
+              <a:ext uri="{FF2B5EF4-FFF2-40B4-BE49-F238E27FC236}">
+                <a16:creationId xmlns:a16="http://schemas.microsoft.com/office/drawing/2014/main" id="{265FEB22-D05F-9423-661B-B86264CDC339}"/>
+              </a:ext>
+            </a:extLst>
+          </p:cNvPr>
+          <p:cNvSpPr/>
+          <p:nvPr/>
+        </p:nvSpPr>
+        <p:spPr>
+          <a:xfrm>
+            <a:off x="821623" y="4052904"/>
+            <a:ext cx="1844844" cy="946484"/>
+          </a:xfrm>
+          <a:prstGeom prst="flowChartDecision">
+            <a:avLst/>
+          </a:prstGeom>
+          <a:noFill/>
+          <a:ln>
+            <a:solidFill>
+              <a:srgbClr val="FF7C80"/>
+            </a:solidFill>
+          </a:ln>
+        </p:spPr>
+        <p:style>
+          <a:lnRef idx="2">
+            <a:schemeClr val="accent1">
+              <a:shade val="50000"/>
+            </a:schemeClr>
+          </a:lnRef>
+          <a:fillRef idx="1">
+            <a:schemeClr val="accent1"/>
+          </a:fillRef>
+          <a:effectRef idx="0">
+            <a:schemeClr val="accent1"/>
+          </a:effectRef>
+          <a:fontRef idx="minor">
+            <a:schemeClr val="lt1"/>
+          </a:fontRef>
+        </p:style>
+        <p:txBody>
+          <a:bodyPr rtlCol="0" anchor="ctr"/>
+          <a:lstStyle/>
+          <a:p>
+            <a:pPr algn="ctr"/>
+            <a:r>
+              <a:rPr lang="en-US" sz="1200" dirty="0">
+                <a:solidFill>
+                  <a:schemeClr val="bg1">
+                    <a:lumMod val="85000"/>
+                  </a:schemeClr>
+                </a:solidFill>
+                <a:latin typeface="Open Sans" panose="020B0606030504020204" pitchFamily="34" charset="0"/>
+                <a:ea typeface="Open Sans" panose="020B0606030504020204" pitchFamily="34" charset="0"/>
+                <a:cs typeface="Open Sans" panose="020B0606030504020204" pitchFamily="34" charset="0"/>
+              </a:rPr>
+              <a:t>decision</a:t>
+            </a:r>
+          </a:p>
+        </p:txBody>
+      </p:sp>
+      <p:sp>
+        <p:nvSpPr>
+          <p:cNvPr id="47" name="Flowchart: Data 46">
+            <a:extLst>
+              <a:ext uri="{FF2B5EF4-FFF2-40B4-BE49-F238E27FC236}">
+                <a16:creationId xmlns:a16="http://schemas.microsoft.com/office/drawing/2014/main" id="{E79F7B5C-9F7D-5907-4BED-1DDC3947E632}"/>
+              </a:ext>
+            </a:extLst>
+          </p:cNvPr>
+          <p:cNvSpPr/>
+          <p:nvPr/>
+        </p:nvSpPr>
+        <p:spPr>
+          <a:xfrm>
+            <a:off x="821623" y="5526936"/>
+            <a:ext cx="1844844" cy="489284"/>
+          </a:xfrm>
+          <a:prstGeom prst="flowChartInputOutput">
+            <a:avLst/>
+          </a:prstGeom>
+          <a:noFill/>
+          <a:ln>
+            <a:solidFill>
+              <a:srgbClr val="CC99FF"/>
+            </a:solidFill>
+          </a:ln>
+        </p:spPr>
+        <p:style>
+          <a:lnRef idx="2">
+            <a:schemeClr val="accent1">
+              <a:shade val="50000"/>
+            </a:schemeClr>
+          </a:lnRef>
+          <a:fillRef idx="1">
+            <a:schemeClr val="accent1"/>
+          </a:fillRef>
+          <a:effectRef idx="0">
+            <a:schemeClr val="accent1"/>
+          </a:effectRef>
+          <a:fontRef idx="minor">
+            <a:schemeClr val="lt1"/>
+          </a:fontRef>
+        </p:style>
+        <p:txBody>
+          <a:bodyPr rtlCol="0" anchor="ctr"/>
+          <a:lstStyle/>
+          <a:p>
+            <a:pPr algn="ctr"/>
+            <a:r>
+              <a:rPr lang="en-US" sz="1200" dirty="0">
+                <a:solidFill>
+                  <a:schemeClr val="bg1">
+                    <a:lumMod val="85000"/>
+                  </a:schemeClr>
+                </a:solidFill>
+                <a:latin typeface="Open Sans" panose="020B0606030504020204" pitchFamily="34" charset="0"/>
+                <a:ea typeface="Open Sans" panose="020B0606030504020204" pitchFamily="34" charset="0"/>
+                <a:cs typeface="Open Sans" panose="020B0606030504020204" pitchFamily="34" charset="0"/>
+              </a:rPr>
+              <a:t>output</a:t>
+            </a:r>
+          </a:p>
+        </p:txBody>
+      </p:sp>
+      <p:sp>
+        <p:nvSpPr>
+          <p:cNvPr id="49" name="TextBox 48">
+            <a:extLst>
+              <a:ext uri="{FF2B5EF4-FFF2-40B4-BE49-F238E27FC236}">
+                <a16:creationId xmlns:a16="http://schemas.microsoft.com/office/drawing/2014/main" id="{9782D64F-E1B4-7BBA-97F1-672AA7BB38F2}"/>
+              </a:ext>
+            </a:extLst>
+          </p:cNvPr>
+          <p:cNvSpPr txBox="1"/>
+          <p:nvPr/>
+        </p:nvSpPr>
+        <p:spPr>
+          <a:xfrm>
+            <a:off x="2396841" y="4042695"/>
+            <a:ext cx="269626" cy="276999"/>
+          </a:xfrm>
+          <a:prstGeom prst="rect">
+            <a:avLst/>
+          </a:prstGeom>
+          <a:noFill/>
+        </p:spPr>
+        <p:txBody>
+          <a:bodyPr wrap="none" rtlCol="0">
+            <a:spAutoFit/>
+          </a:bodyPr>
+          <a:lstStyle/>
+          <a:p>
+            <a:r>
+              <a:rPr lang="en-US" sz="1200" dirty="0">
+                <a:solidFill>
+                  <a:srgbClr val="FF7C80"/>
+                </a:solidFill>
+                <a:latin typeface="Open Sans" panose="020B0606030504020204" pitchFamily="34" charset="0"/>
+                <a:ea typeface="Open Sans" panose="020B0606030504020204" pitchFamily="34" charset="0"/>
+                <a:cs typeface="Open Sans" panose="020B0606030504020204" pitchFamily="34" charset="0"/>
+              </a:rPr>
+              <a:t>T</a:t>
+            </a:r>
+          </a:p>
+        </p:txBody>
+      </p:sp>
+      <p:sp>
+        <p:nvSpPr>
+          <p:cNvPr id="53" name="TextBox 52">
+            <a:extLst>
+              <a:ext uri="{FF2B5EF4-FFF2-40B4-BE49-F238E27FC236}">
+                <a16:creationId xmlns:a16="http://schemas.microsoft.com/office/drawing/2014/main" id="{7E6B2905-22B9-9F02-399A-510F7F8499F3}"/>
+              </a:ext>
+            </a:extLst>
+          </p:cNvPr>
+          <p:cNvSpPr txBox="1"/>
+          <p:nvPr/>
+        </p:nvSpPr>
+        <p:spPr>
+          <a:xfrm>
+            <a:off x="821623" y="4042694"/>
+            <a:ext cx="269626" cy="276999"/>
+          </a:xfrm>
+          <a:prstGeom prst="rect">
+            <a:avLst/>
+          </a:prstGeom>
+          <a:noFill/>
+        </p:spPr>
+        <p:txBody>
+          <a:bodyPr wrap="none" rtlCol="0">
+            <a:spAutoFit/>
+          </a:bodyPr>
+          <a:lstStyle/>
+          <a:p>
+            <a:r>
+              <a:rPr lang="en-US" sz="1200" dirty="0">
+                <a:solidFill>
+                  <a:srgbClr val="FF7C80"/>
+                </a:solidFill>
+                <a:latin typeface="Open Sans" panose="020B0606030504020204" pitchFamily="34" charset="0"/>
+                <a:ea typeface="Open Sans" panose="020B0606030504020204" pitchFamily="34" charset="0"/>
+                <a:cs typeface="Open Sans" panose="020B0606030504020204" pitchFamily="34" charset="0"/>
+              </a:rPr>
+              <a:t>F</a:t>
+            </a:r>
+          </a:p>
+        </p:txBody>
+      </p:sp>
+    </p:spTree>
+    <p:extLst>
+      <p:ext uri="{BB962C8B-B14F-4D97-AF65-F5344CB8AC3E}">
+        <p14:creationId xmlns:p14="http://schemas.microsoft.com/office/powerpoint/2010/main" val="2807625748"/>
+      </p:ext>
+    </p:extLst>
+  </p:cSld>
+  <p:clrMapOvr>
+    <a:masterClrMapping/>
+  </p:clrMapOvr>
+</p:sld>
+</file>
+
 <file path=ppt/slides/slide2.xml><?xml version="1.0" encoding="utf-8"?>
 <p:sld xmlns:a="http://schemas.openxmlformats.org/drawingml/2006/main" xmlns:r="http://schemas.openxmlformats.org/officeDocument/2006/relationships" xmlns:p="http://schemas.openxmlformats.org/presentationml/2006/main">
   <p:cSld>

</xml_diff>

<commit_message>
Added Flowchart for Q2 of PrePSPM2122_KMPh.md
</commit_message>
<xml_diff>
--- a/Past Year Theory Questions/Resources/resources.pptx
+++ b/Past Year Theory Questions/Resources/resources.pptx
@@ -277,7 +277,7 @@
           <a:p>
             <a:fld id="{34BBF2E1-1C0D-4B66-AD27-CA9E57E33A5F}" type="datetimeFigureOut">
               <a:rPr lang="en-US" smtClean="0"/>
-              <a:t>17-May-22</a:t>
+              <a:t>18-May-22</a:t>
             </a:fld>
             <a:endParaRPr lang="en-US"/>
           </a:p>
@@ -475,7 +475,7 @@
           <a:p>
             <a:fld id="{34BBF2E1-1C0D-4B66-AD27-CA9E57E33A5F}" type="datetimeFigureOut">
               <a:rPr lang="en-US" smtClean="0"/>
-              <a:t>17-May-22</a:t>
+              <a:t>18-May-22</a:t>
             </a:fld>
             <a:endParaRPr lang="en-US"/>
           </a:p>
@@ -683,7 +683,7 @@
           <a:p>
             <a:fld id="{34BBF2E1-1C0D-4B66-AD27-CA9E57E33A5F}" type="datetimeFigureOut">
               <a:rPr lang="en-US" smtClean="0"/>
-              <a:t>17-May-22</a:t>
+              <a:t>18-May-22</a:t>
             </a:fld>
             <a:endParaRPr lang="en-US"/>
           </a:p>
@@ -881,7 +881,7 @@
           <a:p>
             <a:fld id="{34BBF2E1-1C0D-4B66-AD27-CA9E57E33A5F}" type="datetimeFigureOut">
               <a:rPr lang="en-US" smtClean="0"/>
-              <a:t>17-May-22</a:t>
+              <a:t>18-May-22</a:t>
             </a:fld>
             <a:endParaRPr lang="en-US"/>
           </a:p>
@@ -1156,7 +1156,7 @@
           <a:p>
             <a:fld id="{34BBF2E1-1C0D-4B66-AD27-CA9E57E33A5F}" type="datetimeFigureOut">
               <a:rPr lang="en-US" smtClean="0"/>
-              <a:t>17-May-22</a:t>
+              <a:t>18-May-22</a:t>
             </a:fld>
             <a:endParaRPr lang="en-US"/>
           </a:p>
@@ -1421,7 +1421,7 @@
           <a:p>
             <a:fld id="{34BBF2E1-1C0D-4B66-AD27-CA9E57E33A5F}" type="datetimeFigureOut">
               <a:rPr lang="en-US" smtClean="0"/>
-              <a:t>17-May-22</a:t>
+              <a:t>18-May-22</a:t>
             </a:fld>
             <a:endParaRPr lang="en-US"/>
           </a:p>
@@ -1833,7 +1833,7 @@
           <a:p>
             <a:fld id="{34BBF2E1-1C0D-4B66-AD27-CA9E57E33A5F}" type="datetimeFigureOut">
               <a:rPr lang="en-US" smtClean="0"/>
-              <a:t>17-May-22</a:t>
+              <a:t>18-May-22</a:t>
             </a:fld>
             <a:endParaRPr lang="en-US"/>
           </a:p>
@@ -1974,7 +1974,7 @@
           <a:p>
             <a:fld id="{34BBF2E1-1C0D-4B66-AD27-CA9E57E33A5F}" type="datetimeFigureOut">
               <a:rPr lang="en-US" smtClean="0"/>
-              <a:t>17-May-22</a:t>
+              <a:t>18-May-22</a:t>
             </a:fld>
             <a:endParaRPr lang="en-US"/>
           </a:p>
@@ -2087,7 +2087,7 @@
           <a:p>
             <a:fld id="{34BBF2E1-1C0D-4B66-AD27-CA9E57E33A5F}" type="datetimeFigureOut">
               <a:rPr lang="en-US" smtClean="0"/>
-              <a:t>17-May-22</a:t>
+              <a:t>18-May-22</a:t>
             </a:fld>
             <a:endParaRPr lang="en-US"/>
           </a:p>
@@ -2398,7 +2398,7 @@
           <a:p>
             <a:fld id="{34BBF2E1-1C0D-4B66-AD27-CA9E57E33A5F}" type="datetimeFigureOut">
               <a:rPr lang="en-US" smtClean="0"/>
-              <a:t>17-May-22</a:t>
+              <a:t>18-May-22</a:t>
             </a:fld>
             <a:endParaRPr lang="en-US"/>
           </a:p>
@@ -2686,7 +2686,7 @@
           <a:p>
             <a:fld id="{34BBF2E1-1C0D-4B66-AD27-CA9E57E33A5F}" type="datetimeFigureOut">
               <a:rPr lang="en-US" smtClean="0"/>
-              <a:t>17-May-22</a:t>
+              <a:t>18-May-22</a:t>
             </a:fld>
             <a:endParaRPr lang="en-US"/>
           </a:p>
@@ -2930,7 +2930,7 @@
           <a:p>
             <a:fld id="{34BBF2E1-1C0D-4B66-AD27-CA9E57E33A5F}" type="datetimeFigureOut">
               <a:rPr lang="en-US" smtClean="0"/>
-              <a:t>17-May-22</a:t>
+              <a:t>18-May-22</a:t>
             </a:fld>
             <a:endParaRPr lang="en-US"/>
           </a:p>
@@ -14355,123 +14355,79 @@
           <a:chExt cx="0" cy="0"/>
         </a:xfrm>
       </p:grpSpPr>
-      <p:sp>
-        <p:nvSpPr>
-          <p:cNvPr id="108" name="Rectangle 107">
+      <p:grpSp>
+        <p:nvGrpSpPr>
+          <p:cNvPr id="71" name="Group 70">
             <a:extLst>
               <a:ext uri="{FF2B5EF4-FFF2-40B4-BE49-F238E27FC236}">
-                <a16:creationId xmlns:a16="http://schemas.microsoft.com/office/drawing/2014/main" id="{F5A5FD62-A99C-04B6-706B-DEE9B81AF541}"/>
+                <a16:creationId xmlns:a16="http://schemas.microsoft.com/office/drawing/2014/main" id="{A004FB44-1C2E-8B1E-3409-4F5C2A8082FE}"/>
               </a:ext>
             </a:extLst>
           </p:cNvPr>
-          <p:cNvSpPr/>
+          <p:cNvGrpSpPr/>
           <p:nvPr/>
-        </p:nvSpPr>
-        <p:spPr>
+        </p:nvGrpSpPr>
+        <p:grpSpPr>
           <a:xfrm>
-            <a:off x="3645392" y="1315453"/>
-            <a:ext cx="7327942" cy="4227094"/>
+            <a:off x="1331227" y="1030490"/>
+            <a:ext cx="9529545" cy="4797020"/>
+            <a:chOff x="1443789" y="585537"/>
+            <a:chExt cx="9529545" cy="4797020"/>
           </a:xfrm>
-          <a:prstGeom prst="rect">
-            <a:avLst/>
-          </a:prstGeom>
-          <a:solidFill>
-            <a:srgbClr val="0F1017"/>
-          </a:solidFill>
-          <a:ln w="12700">
+        </p:grpSpPr>
+        <p:sp>
+          <p:nvSpPr>
+            <p:cNvPr id="108" name="Rectangle 107">
+              <a:extLst>
+                <a:ext uri="{FF2B5EF4-FFF2-40B4-BE49-F238E27FC236}">
+                  <a16:creationId xmlns:a16="http://schemas.microsoft.com/office/drawing/2014/main" id="{F5A5FD62-A99C-04B6-706B-DEE9B81AF541}"/>
+                </a:ext>
+              </a:extLst>
+            </p:cNvPr>
+            <p:cNvSpPr/>
+            <p:nvPr/>
+          </p:nvSpPr>
+          <p:spPr>
+            <a:xfrm>
+              <a:off x="1443789" y="585537"/>
+              <a:ext cx="9529545" cy="4797020"/>
+            </a:xfrm>
+            <a:prstGeom prst="rect">
+              <a:avLst/>
+            </a:prstGeom>
             <a:solidFill>
-              <a:schemeClr val="bg1">
-                <a:lumMod val="75000"/>
-              </a:schemeClr>
+              <a:srgbClr val="0F1017"/>
             </a:solidFill>
-          </a:ln>
-        </p:spPr>
-        <p:style>
-          <a:lnRef idx="2">
-            <a:schemeClr val="accent1">
-              <a:shade val="50000"/>
-            </a:schemeClr>
-          </a:lnRef>
-          <a:fillRef idx="1">
-            <a:schemeClr val="accent1"/>
-          </a:fillRef>
-          <a:effectRef idx="0">
-            <a:schemeClr val="accent1"/>
-          </a:effectRef>
-          <a:fontRef idx="minor">
-            <a:schemeClr val="lt1"/>
-          </a:fontRef>
-        </p:style>
-        <p:txBody>
-          <a:bodyPr rtlCol="0" anchor="ctr"/>
-          <a:lstStyle/>
-          <a:p>
-            <a:pPr algn="ctr"/>
-            <a:endParaRPr lang="en-US" sz="1800" dirty="0">
+            <a:ln w="12700">
               <a:solidFill>
                 <a:schemeClr val="bg1">
-                  <a:lumMod val="85000"/>
+                  <a:lumMod val="75000"/>
                 </a:schemeClr>
               </a:solidFill>
-              <a:latin typeface="Open Sans" panose="020B0606030504020204" pitchFamily="34" charset="0"/>
-              <a:ea typeface="Open Sans" panose="020B0606030504020204" pitchFamily="34" charset="0"/>
-              <a:cs typeface="Open Sans" panose="020B0606030504020204" pitchFamily="34" charset="0"/>
-            </a:endParaRPr>
-          </a:p>
-        </p:txBody>
-      </p:sp>
-      <p:sp>
-        <p:nvSpPr>
-          <p:cNvPr id="59" name="Flowchart: Terminator 58">
-            <a:extLst>
-              <a:ext uri="{FF2B5EF4-FFF2-40B4-BE49-F238E27FC236}">
-                <a16:creationId xmlns:a16="http://schemas.microsoft.com/office/drawing/2014/main" id="{D7554AAC-5F81-46CA-BA4E-6CDF6B8CC5AD}"/>
-              </a:ext>
-            </a:extLst>
-          </p:cNvPr>
-          <p:cNvSpPr/>
-          <p:nvPr/>
-        </p:nvSpPr>
-        <p:spPr>
-          <a:xfrm>
-            <a:off x="4572180" y="1739895"/>
-            <a:ext cx="1050758" cy="341690"/>
-          </a:xfrm>
-          <a:prstGeom prst="flowChartTerminator">
-            <a:avLst/>
-          </a:prstGeom>
-          <a:noFill/>
-          <a:ln>
-            <a:solidFill>
-              <a:schemeClr val="bg1">
-                <a:lumMod val="75000"/>
+            </a:ln>
+          </p:spPr>
+          <p:style>
+            <a:lnRef idx="2">
+              <a:schemeClr val="accent1">
+                <a:shade val="50000"/>
               </a:schemeClr>
-            </a:solidFill>
-          </a:ln>
-        </p:spPr>
-        <p:style>
-          <a:lnRef idx="2">
-            <a:schemeClr val="accent1">
-              <a:shade val="50000"/>
-            </a:schemeClr>
-          </a:lnRef>
-          <a:fillRef idx="1">
-            <a:schemeClr val="accent1"/>
-          </a:fillRef>
-          <a:effectRef idx="0">
-            <a:schemeClr val="accent1"/>
-          </a:effectRef>
-          <a:fontRef idx="minor">
-            <a:schemeClr val="lt1"/>
-          </a:fontRef>
-        </p:style>
-        <p:txBody>
-          <a:bodyPr rtlCol="0" anchor="ctr"/>
-          <a:lstStyle/>
-          <a:p>
-            <a:pPr algn="ctr"/>
-            <a:r>
-              <a:rPr lang="en-US" sz="1200" dirty="0">
+            </a:lnRef>
+            <a:fillRef idx="1">
+              <a:schemeClr val="accent1"/>
+            </a:fillRef>
+            <a:effectRef idx="0">
+              <a:schemeClr val="accent1"/>
+            </a:effectRef>
+            <a:fontRef idx="minor">
+              <a:schemeClr val="lt1"/>
+            </a:fontRef>
+          </p:style>
+          <p:txBody>
+            <a:bodyPr rtlCol="0" anchor="ctr"/>
+            <a:lstStyle/>
+            <a:p>
+              <a:pPr algn="ctr"/>
+              <a:endParaRPr lang="en-US" sz="1800" dirty="0">
                 <a:solidFill>
                   <a:schemeClr val="bg1">
                     <a:lumMod val="85000"/>
@@ -14480,648 +14436,1814 @@
                 <a:latin typeface="Open Sans" panose="020B0606030504020204" pitchFamily="34" charset="0"/>
                 <a:ea typeface="Open Sans" panose="020B0606030504020204" pitchFamily="34" charset="0"/>
                 <a:cs typeface="Open Sans" panose="020B0606030504020204" pitchFamily="34" charset="0"/>
-              </a:rPr>
-              <a:t>Start</a:t>
-            </a:r>
-          </a:p>
-        </p:txBody>
-      </p:sp>
-      <p:sp>
-        <p:nvSpPr>
-          <p:cNvPr id="60" name="Flowchart: Terminator 59">
-            <a:extLst>
-              <a:ext uri="{FF2B5EF4-FFF2-40B4-BE49-F238E27FC236}">
-                <a16:creationId xmlns:a16="http://schemas.microsoft.com/office/drawing/2014/main" id="{103191FC-37A5-724C-C214-882B4B9F6C89}"/>
-              </a:ext>
-            </a:extLst>
-          </p:cNvPr>
-          <p:cNvSpPr/>
-          <p:nvPr/>
-        </p:nvSpPr>
-        <p:spPr>
-          <a:xfrm>
-            <a:off x="9000424" y="1739895"/>
-            <a:ext cx="1050758" cy="341690"/>
-          </a:xfrm>
-          <a:prstGeom prst="flowChartTerminator">
-            <a:avLst/>
-          </a:prstGeom>
-          <a:noFill/>
-          <a:ln>
-            <a:solidFill>
-              <a:schemeClr val="bg1">
-                <a:lumMod val="75000"/>
-              </a:schemeClr>
-            </a:solidFill>
-          </a:ln>
-        </p:spPr>
-        <p:style>
-          <a:lnRef idx="2">
-            <a:schemeClr val="accent1">
-              <a:shade val="50000"/>
-            </a:schemeClr>
-          </a:lnRef>
-          <a:fillRef idx="1">
-            <a:schemeClr val="accent1"/>
-          </a:fillRef>
-          <a:effectRef idx="0">
-            <a:schemeClr val="accent1"/>
-          </a:effectRef>
-          <a:fontRef idx="minor">
-            <a:schemeClr val="lt1"/>
-          </a:fontRef>
-        </p:style>
-        <p:txBody>
-          <a:bodyPr rtlCol="0" anchor="ctr"/>
-          <a:lstStyle/>
-          <a:p>
-            <a:pPr algn="ctr"/>
-            <a:r>
-              <a:rPr lang="en-US" sz="1200" dirty="0">
+              </a:endParaRPr>
+            </a:p>
+          </p:txBody>
+        </p:sp>
+        <p:grpSp>
+          <p:nvGrpSpPr>
+            <p:cNvPr id="66" name="Group 65">
+              <a:extLst>
+                <a:ext uri="{FF2B5EF4-FFF2-40B4-BE49-F238E27FC236}">
+                  <a16:creationId xmlns:a16="http://schemas.microsoft.com/office/drawing/2014/main" id="{176C31F9-1045-9C03-620B-E3D1C072BF9D}"/>
+                </a:ext>
+              </a:extLst>
+            </p:cNvPr>
+            <p:cNvGrpSpPr/>
+            <p:nvPr/>
+          </p:nvGrpSpPr>
+          <p:grpSpPr>
+            <a:xfrm>
+              <a:off x="1961476" y="991443"/>
+              <a:ext cx="8494170" cy="3985208"/>
+              <a:chOff x="1954057" y="865600"/>
+              <a:chExt cx="8494170" cy="3985208"/>
+            </a:xfrm>
+          </p:grpSpPr>
+          <p:sp>
+            <p:nvSpPr>
+              <p:cNvPr id="59" name="Flowchart: Terminator 58">
+                <a:extLst>
+                  <a:ext uri="{FF2B5EF4-FFF2-40B4-BE49-F238E27FC236}">
+                    <a16:creationId xmlns:a16="http://schemas.microsoft.com/office/drawing/2014/main" id="{D7554AAC-5F81-46CA-BA4E-6CDF6B8CC5AD}"/>
+                  </a:ext>
+                </a:extLst>
+              </p:cNvPr>
+              <p:cNvSpPr/>
+              <p:nvPr/>
+            </p:nvSpPr>
+            <p:spPr>
+              <a:xfrm>
+                <a:off x="2351100" y="865600"/>
+                <a:ext cx="1050758" cy="341690"/>
+              </a:xfrm>
+              <a:prstGeom prst="flowChartTerminator">
+                <a:avLst/>
+              </a:prstGeom>
+              <a:noFill/>
+              <a:ln>
                 <a:solidFill>
                   <a:schemeClr val="bg1">
-                    <a:lumMod val="85000"/>
+                    <a:lumMod val="75000"/>
                   </a:schemeClr>
                 </a:solidFill>
-                <a:latin typeface="Open Sans" panose="020B0606030504020204" pitchFamily="34" charset="0"/>
-                <a:ea typeface="Open Sans" panose="020B0606030504020204" pitchFamily="34" charset="0"/>
-                <a:cs typeface="Open Sans" panose="020B0606030504020204" pitchFamily="34" charset="0"/>
-              </a:rPr>
-              <a:t>Stop</a:t>
-            </a:r>
-          </a:p>
-        </p:txBody>
-      </p:sp>
-      <p:cxnSp>
-        <p:nvCxnSpPr>
-          <p:cNvPr id="61" name="Straight Arrow Connector 60">
-            <a:extLst>
-              <a:ext uri="{FF2B5EF4-FFF2-40B4-BE49-F238E27FC236}">
-                <a16:creationId xmlns:a16="http://schemas.microsoft.com/office/drawing/2014/main" id="{A1BBCFB3-141A-F3B8-67BE-C05995E64053}"/>
-              </a:ext>
-            </a:extLst>
-          </p:cNvPr>
-          <p:cNvCxnSpPr>
-            <a:cxnSpLocks/>
-            <a:stCxn id="59" idx="2"/>
-          </p:cNvCxnSpPr>
-          <p:nvPr/>
-        </p:nvCxnSpPr>
-        <p:spPr>
-          <a:xfrm flipH="1">
-            <a:off x="5092921" y="2081585"/>
-            <a:ext cx="4638" cy="341690"/>
-          </a:xfrm>
-          <a:prstGeom prst="straightConnector1">
-            <a:avLst/>
-          </a:prstGeom>
-          <a:ln w="12700">
-            <a:solidFill>
-              <a:schemeClr val="bg1">
-                <a:lumMod val="75000"/>
-              </a:schemeClr>
-            </a:solidFill>
-            <a:tailEnd type="triangle"/>
-          </a:ln>
-        </p:spPr>
-        <p:style>
-          <a:lnRef idx="1">
-            <a:schemeClr val="accent1"/>
-          </a:lnRef>
-          <a:fillRef idx="0">
-            <a:schemeClr val="accent1"/>
-          </a:fillRef>
-          <a:effectRef idx="0">
-            <a:schemeClr val="accent1"/>
-          </a:effectRef>
-          <a:fontRef idx="minor">
-            <a:schemeClr val="tx1"/>
-          </a:fontRef>
-        </p:style>
-      </p:cxnSp>
-      <p:cxnSp>
-        <p:nvCxnSpPr>
-          <p:cNvPr id="18" name="Straight Arrow Connector 17">
-            <a:extLst>
-              <a:ext uri="{FF2B5EF4-FFF2-40B4-BE49-F238E27FC236}">
-                <a16:creationId xmlns:a16="http://schemas.microsoft.com/office/drawing/2014/main" id="{28D76C1F-C45D-8EEF-E187-E9E48161CAB0}"/>
-              </a:ext>
-            </a:extLst>
-          </p:cNvPr>
-          <p:cNvCxnSpPr>
-            <a:cxnSpLocks/>
-            <a:endCxn id="60" idx="2"/>
-          </p:cNvCxnSpPr>
-          <p:nvPr/>
-        </p:nvCxnSpPr>
-        <p:spPr>
-          <a:xfrm flipV="1">
-            <a:off x="9525803" y="2081585"/>
-            <a:ext cx="0" cy="296780"/>
-          </a:xfrm>
-          <a:prstGeom prst="straightConnector1">
-            <a:avLst/>
-          </a:prstGeom>
-          <a:ln w="12700">
-            <a:solidFill>
-              <a:srgbClr val="CC99FF"/>
-            </a:solidFill>
-            <a:tailEnd type="triangle"/>
-          </a:ln>
-        </p:spPr>
-        <p:style>
-          <a:lnRef idx="1">
-            <a:schemeClr val="accent1"/>
-          </a:lnRef>
-          <a:fillRef idx="0">
-            <a:schemeClr val="accent1"/>
-          </a:fillRef>
-          <a:effectRef idx="0">
-            <a:schemeClr val="accent1"/>
-          </a:effectRef>
-          <a:fontRef idx="minor">
-            <a:schemeClr val="tx1"/>
-          </a:fontRef>
-        </p:style>
-      </p:cxnSp>
-      <p:sp>
-        <p:nvSpPr>
-          <p:cNvPr id="29" name="Flowchart: Terminator 28">
-            <a:extLst>
-              <a:ext uri="{FF2B5EF4-FFF2-40B4-BE49-F238E27FC236}">
-                <a16:creationId xmlns:a16="http://schemas.microsoft.com/office/drawing/2014/main" id="{97EBF7DD-2035-166F-CFA5-6B352DAE8ECC}"/>
-              </a:ext>
-            </a:extLst>
-          </p:cNvPr>
-          <p:cNvSpPr/>
-          <p:nvPr/>
-        </p:nvSpPr>
-        <p:spPr>
-          <a:xfrm>
-            <a:off x="1218666" y="649032"/>
-            <a:ext cx="1050758" cy="341690"/>
-          </a:xfrm>
-          <a:prstGeom prst="flowChartTerminator">
-            <a:avLst/>
-          </a:prstGeom>
-          <a:noFill/>
-          <a:ln>
-            <a:solidFill>
-              <a:schemeClr val="bg1">
-                <a:lumMod val="75000"/>
-              </a:schemeClr>
-            </a:solidFill>
-          </a:ln>
-        </p:spPr>
-        <p:style>
-          <a:lnRef idx="2">
-            <a:schemeClr val="accent1">
-              <a:shade val="50000"/>
-            </a:schemeClr>
-          </a:lnRef>
-          <a:fillRef idx="1">
-            <a:schemeClr val="accent1"/>
-          </a:fillRef>
-          <a:effectRef idx="0">
-            <a:schemeClr val="accent1"/>
-          </a:effectRef>
-          <a:fontRef idx="minor">
-            <a:schemeClr val="lt1"/>
-          </a:fontRef>
-        </p:style>
-        <p:txBody>
-          <a:bodyPr rtlCol="0" anchor="ctr"/>
-          <a:lstStyle/>
-          <a:p>
-            <a:pPr algn="ctr"/>
-            <a:r>
-              <a:rPr lang="en-US" sz="1200" dirty="0">
+              </a:ln>
+            </p:spPr>
+            <p:style>
+              <a:lnRef idx="2">
+                <a:schemeClr val="accent1">
+                  <a:shade val="50000"/>
+                </a:schemeClr>
+              </a:lnRef>
+              <a:fillRef idx="1">
+                <a:schemeClr val="accent1"/>
+              </a:fillRef>
+              <a:effectRef idx="0">
+                <a:schemeClr val="accent1"/>
+              </a:effectRef>
+              <a:fontRef idx="minor">
+                <a:schemeClr val="lt1"/>
+              </a:fontRef>
+            </p:style>
+            <p:txBody>
+              <a:bodyPr rtlCol="0" anchor="ctr"/>
+              <a:lstStyle/>
+              <a:p>
+                <a:pPr algn="ctr"/>
+                <a:r>
+                  <a:rPr lang="en-US" sz="1200" dirty="0">
+                    <a:solidFill>
+                      <a:schemeClr val="bg1">
+                        <a:lumMod val="85000"/>
+                      </a:schemeClr>
+                    </a:solidFill>
+                    <a:latin typeface="Open Sans" panose="020B0606030504020204" pitchFamily="34" charset="0"/>
+                    <a:ea typeface="Open Sans" panose="020B0606030504020204" pitchFamily="34" charset="0"/>
+                    <a:cs typeface="Open Sans" panose="020B0606030504020204" pitchFamily="34" charset="0"/>
+                  </a:rPr>
+                  <a:t>Start</a:t>
+                </a:r>
+              </a:p>
+            </p:txBody>
+          </p:sp>
+          <p:sp>
+            <p:nvSpPr>
+              <p:cNvPr id="60" name="Flowchart: Terminator 59">
+                <a:extLst>
+                  <a:ext uri="{FF2B5EF4-FFF2-40B4-BE49-F238E27FC236}">
+                    <a16:creationId xmlns:a16="http://schemas.microsoft.com/office/drawing/2014/main" id="{103191FC-37A5-724C-C214-882B4B9F6C89}"/>
+                  </a:ext>
+                </a:extLst>
+              </p:cNvPr>
+              <p:cNvSpPr/>
+              <p:nvPr/>
+            </p:nvSpPr>
+            <p:spPr>
+              <a:xfrm>
+                <a:off x="9000424" y="865600"/>
+                <a:ext cx="1050758" cy="341690"/>
+              </a:xfrm>
+              <a:prstGeom prst="flowChartTerminator">
+                <a:avLst/>
+              </a:prstGeom>
+              <a:noFill/>
+              <a:ln>
                 <a:solidFill>
                   <a:schemeClr val="bg1">
-                    <a:lumMod val="85000"/>
+                    <a:lumMod val="75000"/>
                   </a:schemeClr>
                 </a:solidFill>
-                <a:latin typeface="Open Sans" panose="020B0606030504020204" pitchFamily="34" charset="0"/>
-                <a:ea typeface="Open Sans" panose="020B0606030504020204" pitchFamily="34" charset="0"/>
-                <a:cs typeface="Open Sans" panose="020B0606030504020204" pitchFamily="34" charset="0"/>
-              </a:rPr>
-              <a:t>Start</a:t>
-            </a:r>
-          </a:p>
-        </p:txBody>
-      </p:sp>
-      <p:sp>
-        <p:nvSpPr>
-          <p:cNvPr id="31" name="Flowchart: Terminator 30">
-            <a:extLst>
-              <a:ext uri="{FF2B5EF4-FFF2-40B4-BE49-F238E27FC236}">
-                <a16:creationId xmlns:a16="http://schemas.microsoft.com/office/drawing/2014/main" id="{B46FF1EB-056C-88CD-27DB-132AB41F0506}"/>
-              </a:ext>
-            </a:extLst>
-          </p:cNvPr>
-          <p:cNvSpPr/>
-          <p:nvPr/>
-        </p:nvSpPr>
-        <p:spPr>
-          <a:xfrm>
-            <a:off x="1218666" y="1262521"/>
-            <a:ext cx="1050758" cy="341690"/>
-          </a:xfrm>
-          <a:prstGeom prst="flowChartTerminator">
-            <a:avLst/>
-          </a:prstGeom>
-          <a:noFill/>
-          <a:ln>
-            <a:solidFill>
-              <a:schemeClr val="bg1">
-                <a:lumMod val="75000"/>
-              </a:schemeClr>
-            </a:solidFill>
-          </a:ln>
-        </p:spPr>
-        <p:style>
-          <a:lnRef idx="2">
-            <a:schemeClr val="accent1">
-              <a:shade val="50000"/>
-            </a:schemeClr>
-          </a:lnRef>
-          <a:fillRef idx="1">
-            <a:schemeClr val="accent1"/>
-          </a:fillRef>
-          <a:effectRef idx="0">
-            <a:schemeClr val="accent1"/>
-          </a:effectRef>
-          <a:fontRef idx="minor">
-            <a:schemeClr val="lt1"/>
-          </a:fontRef>
-        </p:style>
-        <p:txBody>
-          <a:bodyPr rtlCol="0" anchor="ctr"/>
-          <a:lstStyle/>
-          <a:p>
-            <a:pPr algn="ctr"/>
-            <a:r>
-              <a:rPr lang="en-US" sz="1200" dirty="0">
+              </a:ln>
+            </p:spPr>
+            <p:style>
+              <a:lnRef idx="2">
+                <a:schemeClr val="accent1">
+                  <a:shade val="50000"/>
+                </a:schemeClr>
+              </a:lnRef>
+              <a:fillRef idx="1">
+                <a:schemeClr val="accent1"/>
+              </a:fillRef>
+              <a:effectRef idx="0">
+                <a:schemeClr val="accent1"/>
+              </a:effectRef>
+              <a:fontRef idx="minor">
+                <a:schemeClr val="lt1"/>
+              </a:fontRef>
+            </p:style>
+            <p:txBody>
+              <a:bodyPr rtlCol="0" anchor="ctr"/>
+              <a:lstStyle/>
+              <a:p>
+                <a:pPr algn="ctr"/>
+                <a:r>
+                  <a:rPr lang="en-US" sz="1200" dirty="0">
+                    <a:solidFill>
+                      <a:schemeClr val="bg1">
+                        <a:lumMod val="85000"/>
+                      </a:schemeClr>
+                    </a:solidFill>
+                    <a:latin typeface="Open Sans" panose="020B0606030504020204" pitchFamily="34" charset="0"/>
+                    <a:ea typeface="Open Sans" panose="020B0606030504020204" pitchFamily="34" charset="0"/>
+                    <a:cs typeface="Open Sans" panose="020B0606030504020204" pitchFamily="34" charset="0"/>
+                  </a:rPr>
+                  <a:t>Stop</a:t>
+                </a:r>
+              </a:p>
+            </p:txBody>
+          </p:sp>
+          <p:cxnSp>
+            <p:nvCxnSpPr>
+              <p:cNvPr id="61" name="Straight Arrow Connector 60">
+                <a:extLst>
+                  <a:ext uri="{FF2B5EF4-FFF2-40B4-BE49-F238E27FC236}">
+                    <a16:creationId xmlns:a16="http://schemas.microsoft.com/office/drawing/2014/main" id="{A1BBCFB3-141A-F3B8-67BE-C05995E64053}"/>
+                  </a:ext>
+                </a:extLst>
+              </p:cNvPr>
+              <p:cNvCxnSpPr>
+                <a:cxnSpLocks/>
+                <a:stCxn id="59" idx="2"/>
+                <a:endCxn id="23" idx="1"/>
+              </p:cNvCxnSpPr>
+              <p:nvPr/>
+            </p:nvCxnSpPr>
+            <p:spPr>
+              <a:xfrm>
+                <a:off x="2876479" y="1207290"/>
+                <a:ext cx="0" cy="296780"/>
+              </a:xfrm>
+              <a:prstGeom prst="straightConnector1">
+                <a:avLst/>
+              </a:prstGeom>
+              <a:ln w="12700">
                 <a:solidFill>
                   <a:schemeClr val="bg1">
-                    <a:lumMod val="85000"/>
+                    <a:lumMod val="75000"/>
                   </a:schemeClr>
                 </a:solidFill>
-                <a:latin typeface="Open Sans" panose="020B0606030504020204" pitchFamily="34" charset="0"/>
-                <a:ea typeface="Open Sans" panose="020B0606030504020204" pitchFamily="34" charset="0"/>
-                <a:cs typeface="Open Sans" panose="020B0606030504020204" pitchFamily="34" charset="0"/>
-              </a:rPr>
-              <a:t>Stop</a:t>
-            </a:r>
-          </a:p>
-        </p:txBody>
-      </p:sp>
-      <p:sp>
-        <p:nvSpPr>
-          <p:cNvPr id="34" name="Rectangle 33">
-            <a:extLst>
-              <a:ext uri="{FF2B5EF4-FFF2-40B4-BE49-F238E27FC236}">
-                <a16:creationId xmlns:a16="http://schemas.microsoft.com/office/drawing/2014/main" id="{A8D64967-4F28-2958-EE17-93FB9B3EDEEA}"/>
-              </a:ext>
-            </a:extLst>
-          </p:cNvPr>
-          <p:cNvSpPr/>
-          <p:nvPr/>
-        </p:nvSpPr>
-        <p:spPr>
-          <a:xfrm>
-            <a:off x="821623" y="3132324"/>
-            <a:ext cx="1844844" cy="393032"/>
-          </a:xfrm>
-          <a:prstGeom prst="rect">
-            <a:avLst/>
-          </a:prstGeom>
-          <a:noFill/>
-          <a:ln>
-            <a:solidFill>
-              <a:schemeClr val="accent6">
-                <a:lumMod val="60000"/>
-                <a:lumOff val="40000"/>
-              </a:schemeClr>
-            </a:solidFill>
-          </a:ln>
-        </p:spPr>
-        <p:style>
-          <a:lnRef idx="2">
-            <a:schemeClr val="accent1">
-              <a:shade val="50000"/>
-            </a:schemeClr>
-          </a:lnRef>
-          <a:fillRef idx="1">
-            <a:schemeClr val="accent1"/>
-          </a:fillRef>
-          <a:effectRef idx="0">
-            <a:schemeClr val="accent1"/>
-          </a:effectRef>
-          <a:fontRef idx="minor">
-            <a:schemeClr val="lt1"/>
-          </a:fontRef>
-        </p:style>
-        <p:txBody>
-          <a:bodyPr rtlCol="0" anchor="ctr"/>
-          <a:lstStyle/>
-          <a:p>
-            <a:pPr algn="ctr"/>
-            <a:r>
-              <a:rPr lang="en-US" sz="1200" dirty="0">
+                <a:tailEnd type="triangle"/>
+              </a:ln>
+            </p:spPr>
+            <p:style>
+              <a:lnRef idx="1">
+                <a:schemeClr val="accent1"/>
+              </a:lnRef>
+              <a:fillRef idx="0">
+                <a:schemeClr val="accent1"/>
+              </a:fillRef>
+              <a:effectRef idx="0">
+                <a:schemeClr val="accent1"/>
+              </a:effectRef>
+              <a:fontRef idx="minor">
+                <a:schemeClr val="tx1"/>
+              </a:fontRef>
+            </p:style>
+          </p:cxnSp>
+          <p:cxnSp>
+            <p:nvCxnSpPr>
+              <p:cNvPr id="18" name="Straight Arrow Connector 17">
+                <a:extLst>
+                  <a:ext uri="{FF2B5EF4-FFF2-40B4-BE49-F238E27FC236}">
+                    <a16:creationId xmlns:a16="http://schemas.microsoft.com/office/drawing/2014/main" id="{28D76C1F-C45D-8EEF-E187-E9E48161CAB0}"/>
+                  </a:ext>
+                </a:extLst>
+              </p:cNvPr>
+              <p:cNvCxnSpPr>
+                <a:cxnSpLocks/>
+                <a:endCxn id="60" idx="2"/>
+              </p:cNvCxnSpPr>
+              <p:nvPr/>
+            </p:nvCxnSpPr>
+            <p:spPr>
+              <a:xfrm flipV="1">
+                <a:off x="9525803" y="1207290"/>
+                <a:ext cx="0" cy="296780"/>
+              </a:xfrm>
+              <a:prstGeom prst="straightConnector1">
+                <a:avLst/>
+              </a:prstGeom>
+              <a:ln w="12700">
                 <a:solidFill>
-                  <a:schemeClr val="bg1">
-                    <a:lumMod val="85000"/>
+                  <a:srgbClr val="CC99FF"/>
+                </a:solidFill>
+                <a:tailEnd type="triangle"/>
+              </a:ln>
+            </p:spPr>
+            <p:style>
+              <a:lnRef idx="1">
+                <a:schemeClr val="accent1"/>
+              </a:lnRef>
+              <a:fillRef idx="0">
+                <a:schemeClr val="accent1"/>
+              </a:fillRef>
+              <a:effectRef idx="0">
+                <a:schemeClr val="accent1"/>
+              </a:effectRef>
+              <a:fontRef idx="minor">
+                <a:schemeClr val="tx1"/>
+              </a:fontRef>
+            </p:style>
+          </p:cxnSp>
+          <p:sp>
+            <p:nvSpPr>
+              <p:cNvPr id="34" name="Rectangle 33">
+                <a:extLst>
+                  <a:ext uri="{FF2B5EF4-FFF2-40B4-BE49-F238E27FC236}">
+                    <a16:creationId xmlns:a16="http://schemas.microsoft.com/office/drawing/2014/main" id="{A8D64967-4F28-2958-EE17-93FB9B3EDEEA}"/>
+                  </a:ext>
+                </a:extLst>
+              </p:cNvPr>
+              <p:cNvSpPr/>
+              <p:nvPr/>
+            </p:nvSpPr>
+            <p:spPr>
+              <a:xfrm>
+                <a:off x="1957470" y="3491170"/>
+                <a:ext cx="1844844" cy="393032"/>
+              </a:xfrm>
+              <a:prstGeom prst="rect">
+                <a:avLst/>
+              </a:prstGeom>
+              <a:noFill/>
+              <a:ln>
+                <a:solidFill>
+                  <a:schemeClr val="accent6">
+                    <a:lumMod val="60000"/>
+                    <a:lumOff val="40000"/>
                   </a:schemeClr>
                 </a:solidFill>
-                <a:latin typeface="Open Sans" panose="020B0606030504020204" pitchFamily="34" charset="0"/>
-                <a:ea typeface="Open Sans" panose="020B0606030504020204" pitchFamily="34" charset="0"/>
-                <a:cs typeface="Open Sans" panose="020B0606030504020204" pitchFamily="34" charset="0"/>
-              </a:rPr>
-              <a:t>action / process</a:t>
-            </a:r>
-          </a:p>
-        </p:txBody>
-      </p:sp>
-      <p:sp>
-        <p:nvSpPr>
-          <p:cNvPr id="39" name="Flowchart: Data 38">
-            <a:extLst>
-              <a:ext uri="{FF2B5EF4-FFF2-40B4-BE49-F238E27FC236}">
-                <a16:creationId xmlns:a16="http://schemas.microsoft.com/office/drawing/2014/main" id="{84DF5FB3-6B18-6E52-CED0-52B59C223732}"/>
-              </a:ext>
-            </a:extLst>
-          </p:cNvPr>
-          <p:cNvSpPr/>
-          <p:nvPr/>
-        </p:nvSpPr>
-        <p:spPr>
-          <a:xfrm>
-            <a:off x="821623" y="2125701"/>
-            <a:ext cx="1844844" cy="489284"/>
-          </a:xfrm>
-          <a:prstGeom prst="flowChartInputOutput">
-            <a:avLst/>
-          </a:prstGeom>
-          <a:noFill/>
-          <a:ln>
-            <a:solidFill>
-              <a:schemeClr val="accent1">
-                <a:lumMod val="60000"/>
-                <a:lumOff val="40000"/>
-              </a:schemeClr>
-            </a:solidFill>
-          </a:ln>
-        </p:spPr>
-        <p:style>
-          <a:lnRef idx="2">
-            <a:schemeClr val="accent1">
-              <a:shade val="50000"/>
-            </a:schemeClr>
-          </a:lnRef>
-          <a:fillRef idx="1">
-            <a:schemeClr val="accent1"/>
-          </a:fillRef>
-          <a:effectRef idx="0">
-            <a:schemeClr val="accent1"/>
-          </a:effectRef>
-          <a:fontRef idx="minor">
-            <a:schemeClr val="lt1"/>
-          </a:fontRef>
-        </p:style>
-        <p:txBody>
-          <a:bodyPr rtlCol="0" anchor="ctr"/>
-          <a:lstStyle/>
-          <a:p>
-            <a:pPr algn="ctr"/>
-            <a:r>
-              <a:rPr lang="en-US" sz="1200" dirty="0">
-                <a:solidFill>
-                  <a:schemeClr val="bg1">
-                    <a:lumMod val="85000"/>
-                  </a:schemeClr>
-                </a:solidFill>
-                <a:latin typeface="Open Sans" panose="020B0606030504020204" pitchFamily="34" charset="0"/>
-                <a:ea typeface="Open Sans" panose="020B0606030504020204" pitchFamily="34" charset="0"/>
-                <a:cs typeface="Open Sans" panose="020B0606030504020204" pitchFamily="34" charset="0"/>
-              </a:rPr>
-              <a:t>input</a:t>
-            </a:r>
-          </a:p>
-        </p:txBody>
-      </p:sp>
-      <p:sp>
-        <p:nvSpPr>
-          <p:cNvPr id="46" name="Flowchart: Decision 45">
-            <a:extLst>
-              <a:ext uri="{FF2B5EF4-FFF2-40B4-BE49-F238E27FC236}">
-                <a16:creationId xmlns:a16="http://schemas.microsoft.com/office/drawing/2014/main" id="{265FEB22-D05F-9423-661B-B86264CDC339}"/>
-              </a:ext>
-            </a:extLst>
-          </p:cNvPr>
-          <p:cNvSpPr/>
-          <p:nvPr/>
-        </p:nvSpPr>
-        <p:spPr>
-          <a:xfrm>
-            <a:off x="821623" y="4052904"/>
-            <a:ext cx="1844844" cy="946484"/>
-          </a:xfrm>
-          <a:prstGeom prst="flowChartDecision">
-            <a:avLst/>
-          </a:prstGeom>
-          <a:noFill/>
-          <a:ln>
-            <a:solidFill>
-              <a:srgbClr val="FF7C80"/>
-            </a:solidFill>
-          </a:ln>
-        </p:spPr>
-        <p:style>
-          <a:lnRef idx="2">
-            <a:schemeClr val="accent1">
-              <a:shade val="50000"/>
-            </a:schemeClr>
-          </a:lnRef>
-          <a:fillRef idx="1">
-            <a:schemeClr val="accent1"/>
-          </a:fillRef>
-          <a:effectRef idx="0">
-            <a:schemeClr val="accent1"/>
-          </a:effectRef>
-          <a:fontRef idx="minor">
-            <a:schemeClr val="lt1"/>
-          </a:fontRef>
-        </p:style>
-        <p:txBody>
-          <a:bodyPr rtlCol="0" anchor="ctr"/>
-          <a:lstStyle/>
-          <a:p>
-            <a:pPr algn="ctr"/>
-            <a:r>
-              <a:rPr lang="en-US" sz="1200" dirty="0">
-                <a:solidFill>
-                  <a:schemeClr val="bg1">
-                    <a:lumMod val="85000"/>
-                  </a:schemeClr>
-                </a:solidFill>
-                <a:latin typeface="Open Sans" panose="020B0606030504020204" pitchFamily="34" charset="0"/>
-                <a:ea typeface="Open Sans" panose="020B0606030504020204" pitchFamily="34" charset="0"/>
-                <a:cs typeface="Open Sans" panose="020B0606030504020204" pitchFamily="34" charset="0"/>
-              </a:rPr>
-              <a:t>decision</a:t>
-            </a:r>
-          </a:p>
-        </p:txBody>
-      </p:sp>
-      <p:sp>
-        <p:nvSpPr>
-          <p:cNvPr id="47" name="Flowchart: Data 46">
-            <a:extLst>
-              <a:ext uri="{FF2B5EF4-FFF2-40B4-BE49-F238E27FC236}">
-                <a16:creationId xmlns:a16="http://schemas.microsoft.com/office/drawing/2014/main" id="{E79F7B5C-9F7D-5907-4BED-1DDC3947E632}"/>
-              </a:ext>
-            </a:extLst>
-          </p:cNvPr>
-          <p:cNvSpPr/>
-          <p:nvPr/>
-        </p:nvSpPr>
-        <p:spPr>
-          <a:xfrm>
-            <a:off x="821623" y="5526936"/>
-            <a:ext cx="1844844" cy="489284"/>
-          </a:xfrm>
-          <a:prstGeom prst="flowChartInputOutput">
-            <a:avLst/>
-          </a:prstGeom>
-          <a:noFill/>
-          <a:ln>
-            <a:solidFill>
-              <a:srgbClr val="CC99FF"/>
-            </a:solidFill>
-          </a:ln>
-        </p:spPr>
-        <p:style>
-          <a:lnRef idx="2">
-            <a:schemeClr val="accent1">
-              <a:shade val="50000"/>
-            </a:schemeClr>
-          </a:lnRef>
-          <a:fillRef idx="1">
-            <a:schemeClr val="accent1"/>
-          </a:fillRef>
-          <a:effectRef idx="0">
-            <a:schemeClr val="accent1"/>
-          </a:effectRef>
-          <a:fontRef idx="minor">
-            <a:schemeClr val="lt1"/>
-          </a:fontRef>
-        </p:style>
-        <p:txBody>
-          <a:bodyPr rtlCol="0" anchor="ctr"/>
-          <a:lstStyle/>
-          <a:p>
-            <a:pPr algn="ctr"/>
-            <a:r>
-              <a:rPr lang="en-US" sz="1200" dirty="0">
-                <a:solidFill>
-                  <a:schemeClr val="bg1">
-                    <a:lumMod val="85000"/>
-                  </a:schemeClr>
-                </a:solidFill>
-                <a:latin typeface="Open Sans" panose="020B0606030504020204" pitchFamily="34" charset="0"/>
-                <a:ea typeface="Open Sans" panose="020B0606030504020204" pitchFamily="34" charset="0"/>
-                <a:cs typeface="Open Sans" panose="020B0606030504020204" pitchFamily="34" charset="0"/>
-              </a:rPr>
-              <a:t>output</a:t>
-            </a:r>
-          </a:p>
-        </p:txBody>
-      </p:sp>
-      <p:sp>
-        <p:nvSpPr>
-          <p:cNvPr id="49" name="TextBox 48">
-            <a:extLst>
-              <a:ext uri="{FF2B5EF4-FFF2-40B4-BE49-F238E27FC236}">
-                <a16:creationId xmlns:a16="http://schemas.microsoft.com/office/drawing/2014/main" id="{9782D64F-E1B4-7BBA-97F1-672AA7BB38F2}"/>
-              </a:ext>
-            </a:extLst>
-          </p:cNvPr>
-          <p:cNvSpPr txBox="1"/>
-          <p:nvPr/>
-        </p:nvSpPr>
-        <p:spPr>
-          <a:xfrm>
-            <a:off x="2396841" y="4042695"/>
-            <a:ext cx="269626" cy="276999"/>
-          </a:xfrm>
-          <a:prstGeom prst="rect">
-            <a:avLst/>
-          </a:prstGeom>
-          <a:noFill/>
-        </p:spPr>
-        <p:txBody>
-          <a:bodyPr wrap="none" rtlCol="0">
-            <a:spAutoFit/>
-          </a:bodyPr>
-          <a:lstStyle/>
-          <a:p>
-            <a:r>
-              <a:rPr lang="en-US" sz="1200" dirty="0">
+              </a:ln>
+            </p:spPr>
+            <p:style>
+              <a:lnRef idx="2">
+                <a:schemeClr val="accent1">
+                  <a:shade val="50000"/>
+                </a:schemeClr>
+              </a:lnRef>
+              <a:fillRef idx="1">
+                <a:schemeClr val="accent1"/>
+              </a:fillRef>
+              <a:effectRef idx="0">
+                <a:schemeClr val="accent1"/>
+              </a:effectRef>
+              <a:fontRef idx="minor">
+                <a:schemeClr val="lt1"/>
+              </a:fontRef>
+            </p:style>
+            <p:txBody>
+              <a:bodyPr rtlCol="0" anchor="ctr"/>
+              <a:lstStyle/>
+              <a:p>
+                <a:pPr algn="ctr"/>
+                <a:r>
+                  <a:rPr lang="en-US" sz="1200" dirty="0">
+                    <a:solidFill>
+                      <a:schemeClr val="bg1">
+                        <a:lumMod val="85000"/>
+                      </a:schemeClr>
+                    </a:solidFill>
+                    <a:latin typeface="Open Sans" panose="020B0606030504020204" pitchFamily="34" charset="0"/>
+                    <a:ea typeface="Open Sans" panose="020B0606030504020204" pitchFamily="34" charset="0"/>
+                    <a:cs typeface="Open Sans" panose="020B0606030504020204" pitchFamily="34" charset="0"/>
+                  </a:rPr>
+                  <a:t>divisor = 2, </a:t>
+                </a:r>
+                <a:r>
+                  <a:rPr lang="en-US" sz="1200" dirty="0" err="1">
+                    <a:solidFill>
+                      <a:schemeClr val="bg1">
+                        <a:lumMod val="85000"/>
+                      </a:schemeClr>
+                    </a:solidFill>
+                    <a:latin typeface="Open Sans" panose="020B0606030504020204" pitchFamily="34" charset="0"/>
+                    <a:ea typeface="Open Sans" panose="020B0606030504020204" pitchFamily="34" charset="0"/>
+                    <a:cs typeface="Open Sans" panose="020B0606030504020204" pitchFamily="34" charset="0"/>
+                  </a:rPr>
+                  <a:t>isPrime</a:t>
+                </a:r>
+                <a:r>
+                  <a:rPr lang="en-US" sz="1200" dirty="0">
+                    <a:solidFill>
+                      <a:schemeClr val="bg1">
+                        <a:lumMod val="85000"/>
+                      </a:schemeClr>
+                    </a:solidFill>
+                    <a:latin typeface="Open Sans" panose="020B0606030504020204" pitchFamily="34" charset="0"/>
+                    <a:ea typeface="Open Sans" panose="020B0606030504020204" pitchFamily="34" charset="0"/>
+                    <a:cs typeface="Open Sans" panose="020B0606030504020204" pitchFamily="34" charset="0"/>
+                  </a:rPr>
+                  <a:t> = 1</a:t>
+                </a:r>
+              </a:p>
+            </p:txBody>
+          </p:sp>
+          <p:sp>
+            <p:nvSpPr>
+              <p:cNvPr id="46" name="Flowchart: Decision 45">
+                <a:extLst>
+                  <a:ext uri="{FF2B5EF4-FFF2-40B4-BE49-F238E27FC236}">
+                    <a16:creationId xmlns:a16="http://schemas.microsoft.com/office/drawing/2014/main" id="{265FEB22-D05F-9423-661B-B86264CDC339}"/>
+                  </a:ext>
+                </a:extLst>
+              </p:cNvPr>
+              <p:cNvSpPr/>
+              <p:nvPr/>
+            </p:nvSpPr>
+            <p:spPr>
+              <a:xfrm>
+                <a:off x="4173912" y="3214512"/>
+                <a:ext cx="1844844" cy="946484"/>
+              </a:xfrm>
+              <a:prstGeom prst="flowChartDecision">
+                <a:avLst/>
+              </a:prstGeom>
+              <a:noFill/>
+              <a:ln>
                 <a:solidFill>
                   <a:srgbClr val="FF7C80"/>
                 </a:solidFill>
-                <a:latin typeface="Open Sans" panose="020B0606030504020204" pitchFamily="34" charset="0"/>
-                <a:ea typeface="Open Sans" panose="020B0606030504020204" pitchFamily="34" charset="0"/>
-                <a:cs typeface="Open Sans" panose="020B0606030504020204" pitchFamily="34" charset="0"/>
-              </a:rPr>
-              <a:t>T</a:t>
-            </a:r>
-          </a:p>
-        </p:txBody>
-      </p:sp>
-      <p:sp>
-        <p:nvSpPr>
-          <p:cNvPr id="53" name="TextBox 52">
-            <a:extLst>
-              <a:ext uri="{FF2B5EF4-FFF2-40B4-BE49-F238E27FC236}">
-                <a16:creationId xmlns:a16="http://schemas.microsoft.com/office/drawing/2014/main" id="{7E6B2905-22B9-9F02-399A-510F7F8499F3}"/>
-              </a:ext>
-            </a:extLst>
-          </p:cNvPr>
-          <p:cNvSpPr txBox="1"/>
-          <p:nvPr/>
-        </p:nvSpPr>
-        <p:spPr>
-          <a:xfrm>
-            <a:off x="821623" y="4042694"/>
-            <a:ext cx="269626" cy="276999"/>
-          </a:xfrm>
-          <a:prstGeom prst="rect">
-            <a:avLst/>
-          </a:prstGeom>
-          <a:noFill/>
-        </p:spPr>
-        <p:txBody>
-          <a:bodyPr wrap="none" rtlCol="0">
-            <a:spAutoFit/>
-          </a:bodyPr>
-          <a:lstStyle/>
-          <a:p>
-            <a:r>
-              <a:rPr lang="en-US" sz="1200" dirty="0">
+              </a:ln>
+            </p:spPr>
+            <p:style>
+              <a:lnRef idx="2">
+                <a:schemeClr val="accent1">
+                  <a:shade val="50000"/>
+                </a:schemeClr>
+              </a:lnRef>
+              <a:fillRef idx="1">
+                <a:schemeClr val="accent1"/>
+              </a:fillRef>
+              <a:effectRef idx="0">
+                <a:schemeClr val="accent1"/>
+              </a:effectRef>
+              <a:fontRef idx="minor">
+                <a:schemeClr val="lt1"/>
+              </a:fontRef>
+            </p:style>
+            <p:txBody>
+              <a:bodyPr rtlCol="0" anchor="ctr"/>
+              <a:lstStyle/>
+              <a:p>
+                <a:pPr algn="ctr"/>
+                <a:endParaRPr lang="en-US" sz="1200" dirty="0">
+                  <a:solidFill>
+                    <a:schemeClr val="bg1">
+                      <a:lumMod val="85000"/>
+                    </a:schemeClr>
+                  </a:solidFill>
+                  <a:latin typeface="Open Sans" panose="020B0606030504020204" pitchFamily="34" charset="0"/>
+                  <a:ea typeface="Open Sans" panose="020B0606030504020204" pitchFamily="34" charset="0"/>
+                  <a:cs typeface="Open Sans" panose="020B0606030504020204" pitchFamily="34" charset="0"/>
+                </a:endParaRPr>
+              </a:p>
+            </p:txBody>
+          </p:sp>
+          <p:sp>
+            <p:nvSpPr>
+              <p:cNvPr id="49" name="TextBox 48">
+                <a:extLst>
+                  <a:ext uri="{FF2B5EF4-FFF2-40B4-BE49-F238E27FC236}">
+                    <a16:creationId xmlns:a16="http://schemas.microsoft.com/office/drawing/2014/main" id="{9782D64F-E1B4-7BBA-97F1-672AA7BB38F2}"/>
+                  </a:ext>
+                </a:extLst>
+              </p:cNvPr>
+              <p:cNvSpPr txBox="1"/>
+              <p:nvPr/>
+            </p:nvSpPr>
+            <p:spPr>
+              <a:xfrm>
+                <a:off x="8206338" y="3404336"/>
+                <a:ext cx="269626" cy="276999"/>
+              </a:xfrm>
+              <a:prstGeom prst="rect">
+                <a:avLst/>
+              </a:prstGeom>
+              <a:noFill/>
+            </p:spPr>
+            <p:txBody>
+              <a:bodyPr wrap="none" rtlCol="0">
+                <a:spAutoFit/>
+              </a:bodyPr>
+              <a:lstStyle/>
+              <a:p>
+                <a:r>
+                  <a:rPr lang="en-US" sz="1200" dirty="0">
+                    <a:solidFill>
+                      <a:srgbClr val="FF7C80"/>
+                    </a:solidFill>
+                    <a:latin typeface="Open Sans" panose="020B0606030504020204" pitchFamily="34" charset="0"/>
+                    <a:ea typeface="Open Sans" panose="020B0606030504020204" pitchFamily="34" charset="0"/>
+                    <a:cs typeface="Open Sans" panose="020B0606030504020204" pitchFamily="34" charset="0"/>
+                  </a:rPr>
+                  <a:t>T</a:t>
+                </a:r>
+              </a:p>
+            </p:txBody>
+          </p:sp>
+          <p:sp>
+            <p:nvSpPr>
+              <p:cNvPr id="53" name="TextBox 52">
+                <a:extLst>
+                  <a:ext uri="{FF2B5EF4-FFF2-40B4-BE49-F238E27FC236}">
+                    <a16:creationId xmlns:a16="http://schemas.microsoft.com/office/drawing/2014/main" id="{7E6B2905-22B9-9F02-399A-510F7F8499F3}"/>
+                  </a:ext>
+                </a:extLst>
+              </p:cNvPr>
+              <p:cNvSpPr txBox="1"/>
+              <p:nvPr/>
+            </p:nvSpPr>
+            <p:spPr>
+              <a:xfrm>
+                <a:off x="7039736" y="4146976"/>
+                <a:ext cx="269626" cy="276999"/>
+              </a:xfrm>
+              <a:prstGeom prst="rect">
+                <a:avLst/>
+              </a:prstGeom>
+              <a:noFill/>
+            </p:spPr>
+            <p:txBody>
+              <a:bodyPr wrap="none" rtlCol="0">
+                <a:spAutoFit/>
+              </a:bodyPr>
+              <a:lstStyle/>
+              <a:p>
+                <a:r>
+                  <a:rPr lang="en-US" sz="1200" dirty="0">
+                    <a:solidFill>
+                      <a:srgbClr val="FF7C80"/>
+                    </a:solidFill>
+                    <a:latin typeface="Open Sans" panose="020B0606030504020204" pitchFamily="34" charset="0"/>
+                    <a:ea typeface="Open Sans" panose="020B0606030504020204" pitchFamily="34" charset="0"/>
+                    <a:cs typeface="Open Sans" panose="020B0606030504020204" pitchFamily="34" charset="0"/>
+                  </a:rPr>
+                  <a:t>F</a:t>
+                </a:r>
+              </a:p>
+            </p:txBody>
+          </p:sp>
+          <p:sp>
+            <p:nvSpPr>
+              <p:cNvPr id="17" name="Flowchart: Decision 16">
+                <a:extLst>
+                  <a:ext uri="{FF2B5EF4-FFF2-40B4-BE49-F238E27FC236}">
+                    <a16:creationId xmlns:a16="http://schemas.microsoft.com/office/drawing/2014/main" id="{B3EECC7E-F7F1-D6AF-F11E-1B7E2D1AAB9D}"/>
+                  </a:ext>
+                </a:extLst>
+              </p:cNvPr>
+              <p:cNvSpPr/>
+              <p:nvPr/>
+            </p:nvSpPr>
+            <p:spPr>
+              <a:xfrm>
+                <a:off x="4173912" y="1971248"/>
+                <a:ext cx="1844844" cy="946484"/>
+              </a:xfrm>
+              <a:prstGeom prst="flowChartDecision">
+                <a:avLst/>
+              </a:prstGeom>
+              <a:noFill/>
+              <a:ln>
                 <a:solidFill>
                   <a:srgbClr val="FF7C80"/>
                 </a:solidFill>
-                <a:latin typeface="Open Sans" panose="020B0606030504020204" pitchFamily="34" charset="0"/>
-                <a:ea typeface="Open Sans" panose="020B0606030504020204" pitchFamily="34" charset="0"/>
-                <a:cs typeface="Open Sans" panose="020B0606030504020204" pitchFamily="34" charset="0"/>
-              </a:rPr>
-              <a:t>F</a:t>
-            </a:r>
-          </a:p>
-        </p:txBody>
-      </p:sp>
+              </a:ln>
+            </p:spPr>
+            <p:style>
+              <a:lnRef idx="2">
+                <a:schemeClr val="accent1">
+                  <a:shade val="50000"/>
+                </a:schemeClr>
+              </a:lnRef>
+              <a:fillRef idx="1">
+                <a:schemeClr val="accent1"/>
+              </a:fillRef>
+              <a:effectRef idx="0">
+                <a:schemeClr val="accent1"/>
+              </a:effectRef>
+              <a:fontRef idx="minor">
+                <a:schemeClr val="lt1"/>
+              </a:fontRef>
+            </p:style>
+            <p:txBody>
+              <a:bodyPr rtlCol="0" anchor="ctr"/>
+              <a:lstStyle/>
+              <a:p>
+                <a:pPr algn="ctr"/>
+                <a:r>
+                  <a:rPr lang="en-US" sz="1200" dirty="0" err="1">
+                    <a:solidFill>
+                      <a:schemeClr val="bg1">
+                        <a:lumMod val="85000"/>
+                      </a:schemeClr>
+                    </a:solidFill>
+                    <a:latin typeface="Open Sans" panose="020B0606030504020204" pitchFamily="34" charset="0"/>
+                    <a:ea typeface="Open Sans" panose="020B0606030504020204" pitchFamily="34" charset="0"/>
+                    <a:cs typeface="Open Sans" panose="020B0606030504020204" pitchFamily="34" charset="0"/>
+                  </a:rPr>
+                  <a:t>isPrime</a:t>
+                </a:r>
+                <a:r>
+                  <a:rPr lang="en-US" sz="1200" dirty="0">
+                    <a:solidFill>
+                      <a:schemeClr val="bg1">
+                        <a:lumMod val="85000"/>
+                      </a:schemeClr>
+                    </a:solidFill>
+                    <a:latin typeface="Open Sans" panose="020B0606030504020204" pitchFamily="34" charset="0"/>
+                    <a:ea typeface="Open Sans" panose="020B0606030504020204" pitchFamily="34" charset="0"/>
+                    <a:cs typeface="Open Sans" panose="020B0606030504020204" pitchFamily="34" charset="0"/>
+                  </a:rPr>
+                  <a:t> </a:t>
+                </a:r>
+              </a:p>
+              <a:p>
+                <a:pPr algn="ctr"/>
+                <a:r>
+                  <a:rPr lang="en-US" sz="1200" dirty="0">
+                    <a:solidFill>
+                      <a:schemeClr val="bg1">
+                        <a:lumMod val="85000"/>
+                      </a:schemeClr>
+                    </a:solidFill>
+                    <a:latin typeface="Open Sans" panose="020B0606030504020204" pitchFamily="34" charset="0"/>
+                    <a:ea typeface="Open Sans" panose="020B0606030504020204" pitchFamily="34" charset="0"/>
+                    <a:cs typeface="Open Sans" panose="020B0606030504020204" pitchFamily="34" charset="0"/>
+                  </a:rPr>
+                  <a:t>== 1</a:t>
+                </a:r>
+              </a:p>
+            </p:txBody>
+          </p:sp>
+          <p:sp>
+            <p:nvSpPr>
+              <p:cNvPr id="19" name="Flowchart: Data 18">
+                <a:extLst>
+                  <a:ext uri="{FF2B5EF4-FFF2-40B4-BE49-F238E27FC236}">
+                    <a16:creationId xmlns:a16="http://schemas.microsoft.com/office/drawing/2014/main" id="{83FF52BA-11BB-3A36-EE4B-E8F99BF5F935}"/>
+                  </a:ext>
+                </a:extLst>
+              </p:cNvPr>
+              <p:cNvSpPr/>
+              <p:nvPr/>
+            </p:nvSpPr>
+            <p:spPr>
+              <a:xfrm>
+                <a:off x="8603383" y="1504070"/>
+                <a:ext cx="1844844" cy="489284"/>
+              </a:xfrm>
+              <a:prstGeom prst="flowChartInputOutput">
+                <a:avLst/>
+              </a:prstGeom>
+              <a:noFill/>
+              <a:ln>
+                <a:solidFill>
+                  <a:srgbClr val="CC99FF"/>
+                </a:solidFill>
+              </a:ln>
+            </p:spPr>
+            <p:style>
+              <a:lnRef idx="2">
+                <a:schemeClr val="accent1">
+                  <a:shade val="50000"/>
+                </a:schemeClr>
+              </a:lnRef>
+              <a:fillRef idx="1">
+                <a:schemeClr val="accent1"/>
+              </a:fillRef>
+              <a:effectRef idx="0">
+                <a:schemeClr val="accent1"/>
+              </a:effectRef>
+              <a:fontRef idx="minor">
+                <a:schemeClr val="lt1"/>
+              </a:fontRef>
+            </p:style>
+            <p:txBody>
+              <a:bodyPr rtlCol="0" anchor="ctr"/>
+              <a:lstStyle/>
+              <a:p>
+                <a:pPr algn="ctr"/>
+                <a:r>
+                  <a:rPr lang="en-US" sz="1200" dirty="0">
+                    <a:solidFill>
+                      <a:schemeClr val="bg1">
+                        <a:lumMod val="85000"/>
+                      </a:schemeClr>
+                    </a:solidFill>
+                    <a:latin typeface="Open Sans" panose="020B0606030504020204" pitchFamily="34" charset="0"/>
+                    <a:ea typeface="Open Sans" panose="020B0606030504020204" pitchFamily="34" charset="0"/>
+                    <a:cs typeface="Open Sans" panose="020B0606030504020204" pitchFamily="34" charset="0"/>
+                  </a:rPr>
+                  <a:t>“Not Prime”</a:t>
+                </a:r>
+              </a:p>
+            </p:txBody>
+          </p:sp>
+          <p:sp>
+            <p:nvSpPr>
+              <p:cNvPr id="20" name="Flowchart: Decision 19">
+                <a:extLst>
+                  <a:ext uri="{FF2B5EF4-FFF2-40B4-BE49-F238E27FC236}">
+                    <a16:creationId xmlns:a16="http://schemas.microsoft.com/office/drawing/2014/main" id="{DD8ADAE0-429D-3F40-BA66-AAF73174C551}"/>
+                  </a:ext>
+                </a:extLst>
+              </p:cNvPr>
+              <p:cNvSpPr/>
+              <p:nvPr/>
+            </p:nvSpPr>
+            <p:spPr>
+              <a:xfrm>
+                <a:off x="6386941" y="3209755"/>
+                <a:ext cx="1844844" cy="946484"/>
+              </a:xfrm>
+              <a:prstGeom prst="flowChartDecision">
+                <a:avLst/>
+              </a:prstGeom>
+              <a:noFill/>
+              <a:ln>
+                <a:solidFill>
+                  <a:srgbClr val="FF7C80"/>
+                </a:solidFill>
+              </a:ln>
+            </p:spPr>
+            <p:style>
+              <a:lnRef idx="2">
+                <a:schemeClr val="accent1">
+                  <a:shade val="50000"/>
+                </a:schemeClr>
+              </a:lnRef>
+              <a:fillRef idx="1">
+                <a:schemeClr val="accent1"/>
+              </a:fillRef>
+              <a:effectRef idx="0">
+                <a:schemeClr val="accent1"/>
+              </a:effectRef>
+              <a:fontRef idx="minor">
+                <a:schemeClr val="lt1"/>
+              </a:fontRef>
+            </p:style>
+            <p:txBody>
+              <a:bodyPr rtlCol="0" anchor="ctr"/>
+              <a:lstStyle/>
+              <a:p>
+                <a:pPr algn="ctr"/>
+                <a:endParaRPr lang="en-US" sz="1200" dirty="0">
+                  <a:solidFill>
+                    <a:schemeClr val="bg1">
+                      <a:lumMod val="85000"/>
+                    </a:schemeClr>
+                  </a:solidFill>
+                  <a:latin typeface="Open Sans" panose="020B0606030504020204" pitchFamily="34" charset="0"/>
+                  <a:ea typeface="Open Sans" panose="020B0606030504020204" pitchFamily="34" charset="0"/>
+                  <a:cs typeface="Open Sans" panose="020B0606030504020204" pitchFamily="34" charset="0"/>
+                </a:endParaRPr>
+              </a:p>
+            </p:txBody>
+          </p:sp>
+          <p:sp>
+            <p:nvSpPr>
+              <p:cNvPr id="3" name="TextBox 2">
+                <a:extLst>
+                  <a:ext uri="{FF2B5EF4-FFF2-40B4-BE49-F238E27FC236}">
+                    <a16:creationId xmlns:a16="http://schemas.microsoft.com/office/drawing/2014/main" id="{0FCD52A5-D37E-5031-08A2-E2A66D2D1194}"/>
+                  </a:ext>
+                </a:extLst>
+              </p:cNvPr>
+              <p:cNvSpPr txBox="1"/>
+              <p:nvPr/>
+            </p:nvSpPr>
+            <p:spPr>
+              <a:xfrm>
+                <a:off x="4426118" y="3472310"/>
+                <a:ext cx="1340431" cy="430887"/>
+              </a:xfrm>
+              <a:prstGeom prst="rect">
+                <a:avLst/>
+              </a:prstGeom>
+              <a:noFill/>
+            </p:spPr>
+            <p:txBody>
+              <a:bodyPr wrap="none" rtlCol="0">
+                <a:spAutoFit/>
+              </a:bodyPr>
+              <a:lstStyle/>
+              <a:p>
+                <a:pPr algn="ctr"/>
+                <a:r>
+                  <a:rPr lang="en-US" sz="1100" dirty="0">
+                    <a:solidFill>
+                      <a:schemeClr val="bg1">
+                        <a:lumMod val="85000"/>
+                      </a:schemeClr>
+                    </a:solidFill>
+                    <a:latin typeface="Open Sans" panose="020B0606030504020204" pitchFamily="34" charset="0"/>
+                    <a:ea typeface="Open Sans" panose="020B0606030504020204" pitchFamily="34" charset="0"/>
+                    <a:cs typeface="Open Sans" panose="020B0606030504020204" pitchFamily="34" charset="0"/>
+                  </a:rPr>
+                  <a:t>divisor &lt; number </a:t>
+                </a:r>
+              </a:p>
+              <a:p>
+                <a:pPr algn="ctr"/>
+                <a:r>
+                  <a:rPr lang="en-US" sz="1100" dirty="0">
+                    <a:solidFill>
+                      <a:schemeClr val="bg1">
+                        <a:lumMod val="85000"/>
+                      </a:schemeClr>
+                    </a:solidFill>
+                    <a:latin typeface="Open Sans" panose="020B0606030504020204" pitchFamily="34" charset="0"/>
+                    <a:ea typeface="Open Sans" panose="020B0606030504020204" pitchFamily="34" charset="0"/>
+                    <a:cs typeface="Open Sans" panose="020B0606030504020204" pitchFamily="34" charset="0"/>
+                  </a:rPr>
+                  <a:t>&amp;&amp; </a:t>
+                </a:r>
+                <a:r>
+                  <a:rPr lang="en-US" sz="1100" dirty="0" err="1">
+                    <a:solidFill>
+                      <a:schemeClr val="bg1">
+                        <a:lumMod val="85000"/>
+                      </a:schemeClr>
+                    </a:solidFill>
+                    <a:latin typeface="Open Sans" panose="020B0606030504020204" pitchFamily="34" charset="0"/>
+                    <a:ea typeface="Open Sans" panose="020B0606030504020204" pitchFamily="34" charset="0"/>
+                    <a:cs typeface="Open Sans" panose="020B0606030504020204" pitchFamily="34" charset="0"/>
+                  </a:rPr>
+                  <a:t>isPrime</a:t>
+                </a:r>
+                <a:r>
+                  <a:rPr lang="en-US" sz="1100" dirty="0">
+                    <a:solidFill>
+                      <a:schemeClr val="bg1">
+                        <a:lumMod val="85000"/>
+                      </a:schemeClr>
+                    </a:solidFill>
+                    <a:latin typeface="Open Sans" panose="020B0606030504020204" pitchFamily="34" charset="0"/>
+                    <a:ea typeface="Open Sans" panose="020B0606030504020204" pitchFamily="34" charset="0"/>
+                    <a:cs typeface="Open Sans" panose="020B0606030504020204" pitchFamily="34" charset="0"/>
+                  </a:rPr>
+                  <a:t> == 1</a:t>
+                </a:r>
+              </a:p>
+            </p:txBody>
+          </p:sp>
+          <p:sp>
+            <p:nvSpPr>
+              <p:cNvPr id="21" name="Flowchart: Data 20">
+                <a:extLst>
+                  <a:ext uri="{FF2B5EF4-FFF2-40B4-BE49-F238E27FC236}">
+                    <a16:creationId xmlns:a16="http://schemas.microsoft.com/office/drawing/2014/main" id="{1000897F-B519-8730-0210-306D753D4C9E}"/>
+                  </a:ext>
+                </a:extLst>
+              </p:cNvPr>
+              <p:cNvSpPr/>
+              <p:nvPr/>
+            </p:nvSpPr>
+            <p:spPr>
+              <a:xfrm>
+                <a:off x="6386941" y="1504070"/>
+                <a:ext cx="1844844" cy="489284"/>
+              </a:xfrm>
+              <a:prstGeom prst="flowChartInputOutput">
+                <a:avLst/>
+              </a:prstGeom>
+              <a:noFill/>
+              <a:ln>
+                <a:solidFill>
+                  <a:srgbClr val="CC99FF"/>
+                </a:solidFill>
+              </a:ln>
+            </p:spPr>
+            <p:style>
+              <a:lnRef idx="2">
+                <a:schemeClr val="accent1">
+                  <a:shade val="50000"/>
+                </a:schemeClr>
+              </a:lnRef>
+              <a:fillRef idx="1">
+                <a:schemeClr val="accent1"/>
+              </a:fillRef>
+              <a:effectRef idx="0">
+                <a:schemeClr val="accent1"/>
+              </a:effectRef>
+              <a:fontRef idx="minor">
+                <a:schemeClr val="lt1"/>
+              </a:fontRef>
+            </p:style>
+            <p:txBody>
+              <a:bodyPr rtlCol="0" anchor="ctr"/>
+              <a:lstStyle/>
+              <a:p>
+                <a:pPr algn="ctr"/>
+                <a:r>
+                  <a:rPr lang="en-US" sz="1200" dirty="0">
+                    <a:solidFill>
+                      <a:schemeClr val="bg1">
+                        <a:lumMod val="85000"/>
+                      </a:schemeClr>
+                    </a:solidFill>
+                    <a:latin typeface="Open Sans" panose="020B0606030504020204" pitchFamily="34" charset="0"/>
+                    <a:ea typeface="Open Sans" panose="020B0606030504020204" pitchFamily="34" charset="0"/>
+                    <a:cs typeface="Open Sans" panose="020B0606030504020204" pitchFamily="34" charset="0"/>
+                  </a:rPr>
+                  <a:t>“Prime”</a:t>
+                </a:r>
+              </a:p>
+            </p:txBody>
+          </p:sp>
+          <p:sp>
+            <p:nvSpPr>
+              <p:cNvPr id="23" name="Flowchart: Data 22">
+                <a:extLst>
+                  <a:ext uri="{FF2B5EF4-FFF2-40B4-BE49-F238E27FC236}">
+                    <a16:creationId xmlns:a16="http://schemas.microsoft.com/office/drawing/2014/main" id="{8A8010FA-742E-3616-F64D-F271787DD465}"/>
+                  </a:ext>
+                </a:extLst>
+              </p:cNvPr>
+              <p:cNvSpPr/>
+              <p:nvPr/>
+            </p:nvSpPr>
+            <p:spPr>
+              <a:xfrm>
+                <a:off x="1954057" y="1504070"/>
+                <a:ext cx="1844844" cy="489284"/>
+              </a:xfrm>
+              <a:prstGeom prst="flowChartInputOutput">
+                <a:avLst/>
+              </a:prstGeom>
+              <a:noFill/>
+              <a:ln>
+                <a:solidFill>
+                  <a:schemeClr val="accent1">
+                    <a:lumMod val="60000"/>
+                    <a:lumOff val="40000"/>
+                  </a:schemeClr>
+                </a:solidFill>
+              </a:ln>
+            </p:spPr>
+            <p:style>
+              <a:lnRef idx="2">
+                <a:schemeClr val="accent1">
+                  <a:shade val="50000"/>
+                </a:schemeClr>
+              </a:lnRef>
+              <a:fillRef idx="1">
+                <a:schemeClr val="accent1"/>
+              </a:fillRef>
+              <a:effectRef idx="0">
+                <a:schemeClr val="accent1"/>
+              </a:effectRef>
+              <a:fontRef idx="minor">
+                <a:schemeClr val="lt1"/>
+              </a:fontRef>
+            </p:style>
+            <p:txBody>
+              <a:bodyPr rtlCol="0" anchor="ctr"/>
+              <a:lstStyle/>
+              <a:p>
+                <a:pPr algn="ctr"/>
+                <a:r>
+                  <a:rPr lang="en-US" sz="1200" dirty="0">
+                    <a:solidFill>
+                      <a:schemeClr val="bg1">
+                        <a:lumMod val="85000"/>
+                      </a:schemeClr>
+                    </a:solidFill>
+                    <a:latin typeface="Open Sans" panose="020B0606030504020204" pitchFamily="34" charset="0"/>
+                    <a:ea typeface="Open Sans" panose="020B0606030504020204" pitchFamily="34" charset="0"/>
+                    <a:cs typeface="Open Sans" panose="020B0606030504020204" pitchFamily="34" charset="0"/>
+                  </a:rPr>
+                  <a:t>Read number</a:t>
+                </a:r>
+              </a:p>
+            </p:txBody>
+          </p:sp>
+          <p:sp>
+            <p:nvSpPr>
+              <p:cNvPr id="26" name="TextBox 25">
+                <a:extLst>
+                  <a:ext uri="{FF2B5EF4-FFF2-40B4-BE49-F238E27FC236}">
+                    <a16:creationId xmlns:a16="http://schemas.microsoft.com/office/drawing/2014/main" id="{7A9814F8-DF19-5D08-F41C-F906F3B8183B}"/>
+                  </a:ext>
+                </a:extLst>
+              </p:cNvPr>
+              <p:cNvSpPr txBox="1"/>
+              <p:nvPr/>
+            </p:nvSpPr>
+            <p:spPr>
+              <a:xfrm>
+                <a:off x="6805860" y="3450503"/>
+                <a:ext cx="1007006" cy="461665"/>
+              </a:xfrm>
+              <a:prstGeom prst="rect">
+                <a:avLst/>
+              </a:prstGeom>
+              <a:noFill/>
+            </p:spPr>
+            <p:txBody>
+              <a:bodyPr wrap="none" rtlCol="0">
+                <a:spAutoFit/>
+              </a:bodyPr>
+              <a:lstStyle/>
+              <a:p>
+                <a:pPr algn="ctr"/>
+                <a:r>
+                  <a:rPr lang="en-US" sz="1200" dirty="0">
+                    <a:solidFill>
+                      <a:schemeClr val="bg1">
+                        <a:lumMod val="85000"/>
+                      </a:schemeClr>
+                    </a:solidFill>
+                    <a:latin typeface="Open Sans" panose="020B0606030504020204" pitchFamily="34" charset="0"/>
+                    <a:ea typeface="Open Sans" panose="020B0606030504020204" pitchFamily="34" charset="0"/>
+                    <a:cs typeface="Open Sans" panose="020B0606030504020204" pitchFamily="34" charset="0"/>
+                  </a:rPr>
+                  <a:t>number % </a:t>
+                </a:r>
+              </a:p>
+              <a:p>
+                <a:pPr algn="ctr"/>
+                <a:r>
+                  <a:rPr lang="en-US" sz="1200" dirty="0">
+                    <a:solidFill>
+                      <a:schemeClr val="bg1">
+                        <a:lumMod val="85000"/>
+                      </a:schemeClr>
+                    </a:solidFill>
+                    <a:latin typeface="Open Sans" panose="020B0606030504020204" pitchFamily="34" charset="0"/>
+                    <a:ea typeface="Open Sans" panose="020B0606030504020204" pitchFamily="34" charset="0"/>
+                    <a:cs typeface="Open Sans" panose="020B0606030504020204" pitchFamily="34" charset="0"/>
+                  </a:rPr>
+                  <a:t>divisor == 0</a:t>
+                </a:r>
+              </a:p>
+            </p:txBody>
+          </p:sp>
+          <p:sp>
+            <p:nvSpPr>
+              <p:cNvPr id="27" name="Rectangle 26">
+                <a:extLst>
+                  <a:ext uri="{FF2B5EF4-FFF2-40B4-BE49-F238E27FC236}">
+                    <a16:creationId xmlns:a16="http://schemas.microsoft.com/office/drawing/2014/main" id="{41EE7984-EBF6-3093-B196-54860B45ADBE}"/>
+                  </a:ext>
+                </a:extLst>
+              </p:cNvPr>
+              <p:cNvSpPr/>
+              <p:nvPr/>
+            </p:nvSpPr>
+            <p:spPr>
+              <a:xfrm>
+                <a:off x="6386941" y="4457776"/>
+                <a:ext cx="1844844" cy="393032"/>
+              </a:xfrm>
+              <a:prstGeom prst="rect">
+                <a:avLst/>
+              </a:prstGeom>
+              <a:noFill/>
+              <a:ln>
+                <a:solidFill>
+                  <a:schemeClr val="accent6">
+                    <a:lumMod val="60000"/>
+                    <a:lumOff val="40000"/>
+                  </a:schemeClr>
+                </a:solidFill>
+              </a:ln>
+            </p:spPr>
+            <p:style>
+              <a:lnRef idx="2">
+                <a:schemeClr val="accent1">
+                  <a:shade val="50000"/>
+                </a:schemeClr>
+              </a:lnRef>
+              <a:fillRef idx="1">
+                <a:schemeClr val="accent1"/>
+              </a:fillRef>
+              <a:effectRef idx="0">
+                <a:schemeClr val="accent1"/>
+              </a:effectRef>
+              <a:fontRef idx="minor">
+                <a:schemeClr val="lt1"/>
+              </a:fontRef>
+            </p:style>
+            <p:txBody>
+              <a:bodyPr rtlCol="0" anchor="ctr"/>
+              <a:lstStyle/>
+              <a:p>
+                <a:pPr algn="ctr"/>
+                <a:r>
+                  <a:rPr lang="en-US" sz="1200" dirty="0">
+                    <a:solidFill>
+                      <a:schemeClr val="bg1">
+                        <a:lumMod val="85000"/>
+                      </a:schemeClr>
+                    </a:solidFill>
+                    <a:latin typeface="Open Sans" panose="020B0606030504020204" pitchFamily="34" charset="0"/>
+                    <a:ea typeface="Open Sans" panose="020B0606030504020204" pitchFamily="34" charset="0"/>
+                    <a:cs typeface="Open Sans" panose="020B0606030504020204" pitchFamily="34" charset="0"/>
+                  </a:rPr>
+                  <a:t>divisor = divisor + 1</a:t>
+                </a:r>
+              </a:p>
+            </p:txBody>
+          </p:sp>
+          <p:sp>
+            <p:nvSpPr>
+              <p:cNvPr id="28" name="Rectangle 27">
+                <a:extLst>
+                  <a:ext uri="{FF2B5EF4-FFF2-40B4-BE49-F238E27FC236}">
+                    <a16:creationId xmlns:a16="http://schemas.microsoft.com/office/drawing/2014/main" id="{DD7212C3-9A7B-07AC-681D-5F0E34F6EA65}"/>
+                  </a:ext>
+                </a:extLst>
+              </p:cNvPr>
+              <p:cNvSpPr/>
+              <p:nvPr/>
+            </p:nvSpPr>
+            <p:spPr>
+              <a:xfrm>
+                <a:off x="8599970" y="3491238"/>
+                <a:ext cx="1844844" cy="393032"/>
+              </a:xfrm>
+              <a:prstGeom prst="rect">
+                <a:avLst/>
+              </a:prstGeom>
+              <a:noFill/>
+              <a:ln>
+                <a:solidFill>
+                  <a:schemeClr val="accent6">
+                    <a:lumMod val="60000"/>
+                    <a:lumOff val="40000"/>
+                  </a:schemeClr>
+                </a:solidFill>
+              </a:ln>
+            </p:spPr>
+            <p:style>
+              <a:lnRef idx="2">
+                <a:schemeClr val="accent1">
+                  <a:shade val="50000"/>
+                </a:schemeClr>
+              </a:lnRef>
+              <a:fillRef idx="1">
+                <a:schemeClr val="accent1"/>
+              </a:fillRef>
+              <a:effectRef idx="0">
+                <a:schemeClr val="accent1"/>
+              </a:effectRef>
+              <a:fontRef idx="minor">
+                <a:schemeClr val="lt1"/>
+              </a:fontRef>
+            </p:style>
+            <p:txBody>
+              <a:bodyPr rtlCol="0" anchor="ctr"/>
+              <a:lstStyle/>
+              <a:p>
+                <a:pPr algn="ctr"/>
+                <a:r>
+                  <a:rPr lang="en-US" sz="1200" dirty="0" err="1">
+                    <a:solidFill>
+                      <a:schemeClr val="bg1">
+                        <a:lumMod val="85000"/>
+                      </a:schemeClr>
+                    </a:solidFill>
+                    <a:latin typeface="Open Sans" panose="020B0606030504020204" pitchFamily="34" charset="0"/>
+                    <a:ea typeface="Open Sans" panose="020B0606030504020204" pitchFamily="34" charset="0"/>
+                    <a:cs typeface="Open Sans" panose="020B0606030504020204" pitchFamily="34" charset="0"/>
+                  </a:rPr>
+                  <a:t>isPrime</a:t>
+                </a:r>
+                <a:r>
+                  <a:rPr lang="en-US" sz="1200" dirty="0">
+                    <a:solidFill>
+                      <a:schemeClr val="bg1">
+                        <a:lumMod val="85000"/>
+                      </a:schemeClr>
+                    </a:solidFill>
+                    <a:latin typeface="Open Sans" panose="020B0606030504020204" pitchFamily="34" charset="0"/>
+                    <a:ea typeface="Open Sans" panose="020B0606030504020204" pitchFamily="34" charset="0"/>
+                    <a:cs typeface="Open Sans" panose="020B0606030504020204" pitchFamily="34" charset="0"/>
+                  </a:rPr>
+                  <a:t> = 0</a:t>
+                </a:r>
+              </a:p>
+            </p:txBody>
+          </p:sp>
+          <p:cxnSp>
+            <p:nvCxnSpPr>
+              <p:cNvPr id="8" name="Straight Arrow Connector 7">
+                <a:extLst>
+                  <a:ext uri="{FF2B5EF4-FFF2-40B4-BE49-F238E27FC236}">
+                    <a16:creationId xmlns:a16="http://schemas.microsoft.com/office/drawing/2014/main" id="{064526A1-F289-89BF-7179-162CCA44B861}"/>
+                  </a:ext>
+                </a:extLst>
+              </p:cNvPr>
+              <p:cNvCxnSpPr>
+                <a:cxnSpLocks/>
+                <a:stCxn id="23" idx="4"/>
+                <a:endCxn id="34" idx="0"/>
+              </p:cNvCxnSpPr>
+              <p:nvPr/>
+            </p:nvCxnSpPr>
+            <p:spPr>
+              <a:xfrm>
+                <a:off x="2876479" y="1993354"/>
+                <a:ext cx="3413" cy="1497816"/>
+              </a:xfrm>
+              <a:prstGeom prst="straightConnector1">
+                <a:avLst/>
+              </a:prstGeom>
+              <a:ln w="12700">
+                <a:solidFill>
+                  <a:schemeClr val="accent1">
+                    <a:lumMod val="60000"/>
+                    <a:lumOff val="40000"/>
+                  </a:schemeClr>
+                </a:solidFill>
+                <a:tailEnd type="triangle"/>
+              </a:ln>
+            </p:spPr>
+            <p:style>
+              <a:lnRef idx="1">
+                <a:schemeClr val="accent1"/>
+              </a:lnRef>
+              <a:fillRef idx="0">
+                <a:schemeClr val="accent1"/>
+              </a:fillRef>
+              <a:effectRef idx="0">
+                <a:schemeClr val="accent1"/>
+              </a:effectRef>
+              <a:fontRef idx="minor">
+                <a:schemeClr val="tx1"/>
+              </a:fontRef>
+            </p:style>
+          </p:cxnSp>
+          <p:cxnSp>
+            <p:nvCxnSpPr>
+              <p:cNvPr id="12" name="Straight Arrow Connector 11">
+                <a:extLst>
+                  <a:ext uri="{FF2B5EF4-FFF2-40B4-BE49-F238E27FC236}">
+                    <a16:creationId xmlns:a16="http://schemas.microsoft.com/office/drawing/2014/main" id="{8D6AC4A1-A2E1-442A-6D64-CD4E785A31B6}"/>
+                  </a:ext>
+                </a:extLst>
+              </p:cNvPr>
+              <p:cNvCxnSpPr>
+                <a:stCxn id="34" idx="3"/>
+                <a:endCxn id="46" idx="1"/>
+              </p:cNvCxnSpPr>
+              <p:nvPr/>
+            </p:nvCxnSpPr>
+            <p:spPr>
+              <a:xfrm>
+                <a:off x="3802314" y="3687686"/>
+                <a:ext cx="371598" cy="68"/>
+              </a:xfrm>
+              <a:prstGeom prst="straightConnector1">
+                <a:avLst/>
+              </a:prstGeom>
+              <a:ln w="12700">
+                <a:solidFill>
+                  <a:schemeClr val="bg1">
+                    <a:lumMod val="75000"/>
+                  </a:schemeClr>
+                </a:solidFill>
+                <a:tailEnd type="triangle"/>
+              </a:ln>
+            </p:spPr>
+            <p:style>
+              <a:lnRef idx="1">
+                <a:schemeClr val="accent1"/>
+              </a:lnRef>
+              <a:fillRef idx="0">
+                <a:schemeClr val="accent1"/>
+              </a:fillRef>
+              <a:effectRef idx="0">
+                <a:schemeClr val="accent1"/>
+              </a:effectRef>
+              <a:fontRef idx="minor">
+                <a:schemeClr val="tx1"/>
+              </a:fontRef>
+            </p:style>
+          </p:cxnSp>
+          <p:cxnSp>
+            <p:nvCxnSpPr>
+              <p:cNvPr id="14" name="Straight Arrow Connector 13">
+                <a:extLst>
+                  <a:ext uri="{FF2B5EF4-FFF2-40B4-BE49-F238E27FC236}">
+                    <a16:creationId xmlns:a16="http://schemas.microsoft.com/office/drawing/2014/main" id="{A14477F3-92D4-7940-F11F-4A4BF22A58D3}"/>
+                  </a:ext>
+                </a:extLst>
+              </p:cNvPr>
+              <p:cNvCxnSpPr>
+                <a:stCxn id="46" idx="0"/>
+                <a:endCxn id="17" idx="2"/>
+              </p:cNvCxnSpPr>
+              <p:nvPr/>
+            </p:nvCxnSpPr>
+            <p:spPr>
+              <a:xfrm flipV="1">
+                <a:off x="5096334" y="2917732"/>
+                <a:ext cx="0" cy="296780"/>
+              </a:xfrm>
+              <a:prstGeom prst="straightConnector1">
+                <a:avLst/>
+              </a:prstGeom>
+              <a:ln w="12700">
+                <a:solidFill>
+                  <a:srgbClr val="FF7C80"/>
+                </a:solidFill>
+                <a:tailEnd type="triangle"/>
+              </a:ln>
+            </p:spPr>
+            <p:style>
+              <a:lnRef idx="1">
+                <a:schemeClr val="accent1"/>
+              </a:lnRef>
+              <a:fillRef idx="0">
+                <a:schemeClr val="accent1"/>
+              </a:fillRef>
+              <a:effectRef idx="0">
+                <a:schemeClr val="accent1"/>
+              </a:effectRef>
+              <a:fontRef idx="minor">
+                <a:schemeClr val="tx1"/>
+              </a:fontRef>
+            </p:style>
+          </p:cxnSp>
+          <p:cxnSp>
+            <p:nvCxnSpPr>
+              <p:cNvPr id="22" name="Straight Arrow Connector 21">
+                <a:extLst>
+                  <a:ext uri="{FF2B5EF4-FFF2-40B4-BE49-F238E27FC236}">
+                    <a16:creationId xmlns:a16="http://schemas.microsoft.com/office/drawing/2014/main" id="{CE857124-A676-22A6-040F-B6A1D27A8ADB}"/>
+                  </a:ext>
+                </a:extLst>
+              </p:cNvPr>
+              <p:cNvCxnSpPr>
+                <a:stCxn id="46" idx="3"/>
+                <a:endCxn id="20" idx="1"/>
+              </p:cNvCxnSpPr>
+              <p:nvPr/>
+            </p:nvCxnSpPr>
+            <p:spPr>
+              <a:xfrm flipV="1">
+                <a:off x="6018756" y="3682997"/>
+                <a:ext cx="368185" cy="4757"/>
+              </a:xfrm>
+              <a:prstGeom prst="straightConnector1">
+                <a:avLst/>
+              </a:prstGeom>
+              <a:ln w="12700">
+                <a:solidFill>
+                  <a:srgbClr val="FF7C80"/>
+                </a:solidFill>
+                <a:tailEnd type="triangle"/>
+              </a:ln>
+            </p:spPr>
+            <p:style>
+              <a:lnRef idx="1">
+                <a:schemeClr val="accent1"/>
+              </a:lnRef>
+              <a:fillRef idx="0">
+                <a:schemeClr val="accent1"/>
+              </a:fillRef>
+              <a:effectRef idx="0">
+                <a:schemeClr val="accent1"/>
+              </a:effectRef>
+              <a:fontRef idx="minor">
+                <a:schemeClr val="tx1"/>
+              </a:fontRef>
+            </p:style>
+          </p:cxnSp>
+          <p:cxnSp>
+            <p:nvCxnSpPr>
+              <p:cNvPr id="25" name="Straight Arrow Connector 24">
+                <a:extLst>
+                  <a:ext uri="{FF2B5EF4-FFF2-40B4-BE49-F238E27FC236}">
+                    <a16:creationId xmlns:a16="http://schemas.microsoft.com/office/drawing/2014/main" id="{99DC3955-16EA-6F4E-6EF7-9E3B6AF97BCF}"/>
+                  </a:ext>
+                </a:extLst>
+              </p:cNvPr>
+              <p:cNvCxnSpPr>
+                <a:stCxn id="20" idx="3"/>
+                <a:endCxn id="28" idx="1"/>
+              </p:cNvCxnSpPr>
+              <p:nvPr/>
+            </p:nvCxnSpPr>
+            <p:spPr>
+              <a:xfrm>
+                <a:off x="8231785" y="3682997"/>
+                <a:ext cx="368185" cy="4757"/>
+              </a:xfrm>
+              <a:prstGeom prst="straightConnector1">
+                <a:avLst/>
+              </a:prstGeom>
+              <a:ln w="12700">
+                <a:solidFill>
+                  <a:srgbClr val="FF7C80"/>
+                </a:solidFill>
+                <a:tailEnd type="triangle"/>
+              </a:ln>
+            </p:spPr>
+            <p:style>
+              <a:lnRef idx="1">
+                <a:schemeClr val="accent1"/>
+              </a:lnRef>
+              <a:fillRef idx="0">
+                <a:schemeClr val="accent1"/>
+              </a:fillRef>
+              <a:effectRef idx="0">
+                <a:schemeClr val="accent1"/>
+              </a:effectRef>
+              <a:fontRef idx="minor">
+                <a:schemeClr val="tx1"/>
+              </a:fontRef>
+            </p:style>
+          </p:cxnSp>
+          <p:cxnSp>
+            <p:nvCxnSpPr>
+              <p:cNvPr id="32" name="Connector: Elbow 31">
+                <a:extLst>
+                  <a:ext uri="{FF2B5EF4-FFF2-40B4-BE49-F238E27FC236}">
+                    <a16:creationId xmlns:a16="http://schemas.microsoft.com/office/drawing/2014/main" id="{BFF16952-8176-4475-EE65-4A56183B6F14}"/>
+                  </a:ext>
+                </a:extLst>
+              </p:cNvPr>
+              <p:cNvCxnSpPr>
+                <a:stCxn id="17" idx="0"/>
+                <a:endCxn id="21" idx="2"/>
+              </p:cNvCxnSpPr>
+              <p:nvPr/>
+            </p:nvCxnSpPr>
+            <p:spPr>
+              <a:xfrm rot="5400000" flipH="1" flipV="1">
+                <a:off x="5722611" y="1122435"/>
+                <a:ext cx="222536" cy="1475091"/>
+              </a:xfrm>
+              <a:prstGeom prst="bentConnector2">
+                <a:avLst/>
+              </a:prstGeom>
+              <a:ln w="12700">
+                <a:solidFill>
+                  <a:srgbClr val="FF7C80"/>
+                </a:solidFill>
+                <a:tailEnd type="triangle"/>
+              </a:ln>
+            </p:spPr>
+            <p:style>
+              <a:lnRef idx="1">
+                <a:schemeClr val="accent1"/>
+              </a:lnRef>
+              <a:fillRef idx="0">
+                <a:schemeClr val="accent1"/>
+              </a:fillRef>
+              <a:effectRef idx="0">
+                <a:schemeClr val="accent1"/>
+              </a:effectRef>
+              <a:fontRef idx="minor">
+                <a:schemeClr val="tx1"/>
+              </a:fontRef>
+            </p:style>
+          </p:cxnSp>
+          <p:cxnSp>
+            <p:nvCxnSpPr>
+              <p:cNvPr id="35" name="Connector: Elbow 34">
+                <a:extLst>
+                  <a:ext uri="{FF2B5EF4-FFF2-40B4-BE49-F238E27FC236}">
+                    <a16:creationId xmlns:a16="http://schemas.microsoft.com/office/drawing/2014/main" id="{02ADEDEF-BC5B-FBBD-B154-0A2C58D3FD1D}"/>
+                  </a:ext>
+                </a:extLst>
+              </p:cNvPr>
+              <p:cNvCxnSpPr>
+                <a:stCxn id="17" idx="3"/>
+                <a:endCxn id="19" idx="4"/>
+              </p:cNvCxnSpPr>
+              <p:nvPr/>
+            </p:nvCxnSpPr>
+            <p:spPr>
+              <a:xfrm flipV="1">
+                <a:off x="6018756" y="1993354"/>
+                <a:ext cx="3507049" cy="451136"/>
+              </a:xfrm>
+              <a:prstGeom prst="bentConnector2">
+                <a:avLst/>
+              </a:prstGeom>
+              <a:ln w="12700">
+                <a:solidFill>
+                  <a:srgbClr val="FF7C80"/>
+                </a:solidFill>
+                <a:tailEnd type="triangle"/>
+              </a:ln>
+            </p:spPr>
+            <p:style>
+              <a:lnRef idx="1">
+                <a:schemeClr val="accent1"/>
+              </a:lnRef>
+              <a:fillRef idx="0">
+                <a:schemeClr val="accent1"/>
+              </a:fillRef>
+              <a:effectRef idx="0">
+                <a:schemeClr val="accent1"/>
+              </a:effectRef>
+              <a:fontRef idx="minor">
+                <a:schemeClr val="tx1"/>
+              </a:fontRef>
+            </p:style>
+          </p:cxnSp>
+          <p:cxnSp>
+            <p:nvCxnSpPr>
+              <p:cNvPr id="37" name="Connector: Elbow 36">
+                <a:extLst>
+                  <a:ext uri="{FF2B5EF4-FFF2-40B4-BE49-F238E27FC236}">
+                    <a16:creationId xmlns:a16="http://schemas.microsoft.com/office/drawing/2014/main" id="{DF9354F1-B30F-8F02-91AE-28A5B623DFDE}"/>
+                  </a:ext>
+                </a:extLst>
+              </p:cNvPr>
+              <p:cNvCxnSpPr>
+                <a:stCxn id="21" idx="1"/>
+                <a:endCxn id="60" idx="1"/>
+              </p:cNvCxnSpPr>
+              <p:nvPr/>
+            </p:nvCxnSpPr>
+            <p:spPr>
+              <a:xfrm rot="5400000" flipH="1" flipV="1">
+                <a:off x="7921081" y="424728"/>
+                <a:ext cx="467625" cy="1691061"/>
+              </a:xfrm>
+              <a:prstGeom prst="bentConnector2">
+                <a:avLst/>
+              </a:prstGeom>
+              <a:ln w="12700">
+                <a:solidFill>
+                  <a:srgbClr val="CC99FF"/>
+                </a:solidFill>
+                <a:tailEnd type="triangle"/>
+              </a:ln>
+            </p:spPr>
+            <p:style>
+              <a:lnRef idx="1">
+                <a:schemeClr val="accent1"/>
+              </a:lnRef>
+              <a:fillRef idx="0">
+                <a:schemeClr val="accent1"/>
+              </a:fillRef>
+              <a:effectRef idx="0">
+                <a:schemeClr val="accent1"/>
+              </a:effectRef>
+              <a:fontRef idx="minor">
+                <a:schemeClr val="tx1"/>
+              </a:fontRef>
+            </p:style>
+          </p:cxnSp>
+          <p:cxnSp>
+            <p:nvCxnSpPr>
+              <p:cNvPr id="40" name="Connector: Elbow 39">
+                <a:extLst>
+                  <a:ext uri="{FF2B5EF4-FFF2-40B4-BE49-F238E27FC236}">
+                    <a16:creationId xmlns:a16="http://schemas.microsoft.com/office/drawing/2014/main" id="{1D97D9FD-99D3-2B0A-F2EF-D2430E0B4E64}"/>
+                  </a:ext>
+                </a:extLst>
+              </p:cNvPr>
+              <p:cNvCxnSpPr>
+                <a:cxnSpLocks/>
+                <a:stCxn id="28" idx="2"/>
+                <a:endCxn id="27" idx="3"/>
+              </p:cNvCxnSpPr>
+              <p:nvPr/>
+            </p:nvCxnSpPr>
+            <p:spPr>
+              <a:xfrm rot="5400000">
+                <a:off x="8492078" y="3623978"/>
+                <a:ext cx="770022" cy="1290607"/>
+              </a:xfrm>
+              <a:prstGeom prst="bentConnector2">
+                <a:avLst/>
+              </a:prstGeom>
+              <a:ln w="12700">
+                <a:solidFill>
+                  <a:schemeClr val="bg1">
+                    <a:lumMod val="75000"/>
+                  </a:schemeClr>
+                </a:solidFill>
+                <a:tailEnd type="triangle"/>
+              </a:ln>
+            </p:spPr>
+            <p:style>
+              <a:lnRef idx="1">
+                <a:schemeClr val="accent1"/>
+              </a:lnRef>
+              <a:fillRef idx="0">
+                <a:schemeClr val="accent1"/>
+              </a:fillRef>
+              <a:effectRef idx="0">
+                <a:schemeClr val="accent1"/>
+              </a:effectRef>
+              <a:fontRef idx="minor">
+                <a:schemeClr val="tx1"/>
+              </a:fontRef>
+            </p:style>
+          </p:cxnSp>
+          <p:cxnSp>
+            <p:nvCxnSpPr>
+              <p:cNvPr id="54" name="Connector: Elbow 53">
+                <a:extLst>
+                  <a:ext uri="{FF2B5EF4-FFF2-40B4-BE49-F238E27FC236}">
+                    <a16:creationId xmlns:a16="http://schemas.microsoft.com/office/drawing/2014/main" id="{88C54B34-056D-DFCE-D8D2-879F4962C29C}"/>
+                  </a:ext>
+                </a:extLst>
+              </p:cNvPr>
+              <p:cNvCxnSpPr>
+                <a:cxnSpLocks/>
+                <a:stCxn id="27" idx="1"/>
+                <a:endCxn id="46" idx="2"/>
+              </p:cNvCxnSpPr>
+              <p:nvPr/>
+            </p:nvCxnSpPr>
+            <p:spPr>
+              <a:xfrm rot="10800000">
+                <a:off x="5096335" y="4160996"/>
+                <a:ext cx="1290607" cy="493296"/>
+              </a:xfrm>
+              <a:prstGeom prst="bentConnector2">
+                <a:avLst/>
+              </a:prstGeom>
+              <a:ln w="12700">
+                <a:solidFill>
+                  <a:schemeClr val="bg1">
+                    <a:lumMod val="75000"/>
+                  </a:schemeClr>
+                </a:solidFill>
+                <a:tailEnd type="triangle"/>
+              </a:ln>
+            </p:spPr>
+            <p:style>
+              <a:lnRef idx="1">
+                <a:schemeClr val="accent1"/>
+              </a:lnRef>
+              <a:fillRef idx="0">
+                <a:schemeClr val="accent1"/>
+              </a:fillRef>
+              <a:effectRef idx="0">
+                <a:schemeClr val="accent1"/>
+              </a:effectRef>
+              <a:fontRef idx="minor">
+                <a:schemeClr val="tx1"/>
+              </a:fontRef>
+            </p:style>
+          </p:cxnSp>
+          <p:cxnSp>
+            <p:nvCxnSpPr>
+              <p:cNvPr id="58" name="Straight Arrow Connector 57">
+                <a:extLst>
+                  <a:ext uri="{FF2B5EF4-FFF2-40B4-BE49-F238E27FC236}">
+                    <a16:creationId xmlns:a16="http://schemas.microsoft.com/office/drawing/2014/main" id="{54E15CD9-12D7-2621-8CC1-AD530E45C816}"/>
+                  </a:ext>
+                </a:extLst>
+              </p:cNvPr>
+              <p:cNvCxnSpPr>
+                <a:stCxn id="20" idx="2"/>
+                <a:endCxn id="27" idx="0"/>
+              </p:cNvCxnSpPr>
+              <p:nvPr/>
+            </p:nvCxnSpPr>
+            <p:spPr>
+              <a:xfrm>
+                <a:off x="7309363" y="4156239"/>
+                <a:ext cx="0" cy="301537"/>
+              </a:xfrm>
+              <a:prstGeom prst="straightConnector1">
+                <a:avLst/>
+              </a:prstGeom>
+              <a:ln w="12700">
+                <a:solidFill>
+                  <a:srgbClr val="FF7C80"/>
+                </a:solidFill>
+                <a:tailEnd type="triangle"/>
+              </a:ln>
+            </p:spPr>
+            <p:style>
+              <a:lnRef idx="1">
+                <a:schemeClr val="accent1"/>
+              </a:lnRef>
+              <a:fillRef idx="0">
+                <a:schemeClr val="accent1"/>
+              </a:fillRef>
+              <a:effectRef idx="0">
+                <a:schemeClr val="accent1"/>
+              </a:effectRef>
+              <a:fontRef idx="minor">
+                <a:schemeClr val="tx1"/>
+              </a:fontRef>
+            </p:style>
+          </p:cxnSp>
+          <p:sp>
+            <p:nvSpPr>
+              <p:cNvPr id="67" name="TextBox 66">
+                <a:extLst>
+                  <a:ext uri="{FF2B5EF4-FFF2-40B4-BE49-F238E27FC236}">
+                    <a16:creationId xmlns:a16="http://schemas.microsoft.com/office/drawing/2014/main" id="{71DBA315-543B-0F12-FA1C-E14B1F6743FA}"/>
+                  </a:ext>
+                </a:extLst>
+              </p:cNvPr>
+              <p:cNvSpPr txBox="1"/>
+              <p:nvPr/>
+            </p:nvSpPr>
+            <p:spPr>
+              <a:xfrm>
+                <a:off x="6007949" y="3404336"/>
+                <a:ext cx="269626" cy="276999"/>
+              </a:xfrm>
+              <a:prstGeom prst="rect">
+                <a:avLst/>
+              </a:prstGeom>
+              <a:noFill/>
+            </p:spPr>
+            <p:txBody>
+              <a:bodyPr wrap="none" rtlCol="0">
+                <a:spAutoFit/>
+              </a:bodyPr>
+              <a:lstStyle/>
+              <a:p>
+                <a:r>
+                  <a:rPr lang="en-US" sz="1200" dirty="0">
+                    <a:solidFill>
+                      <a:srgbClr val="FF7C80"/>
+                    </a:solidFill>
+                    <a:latin typeface="Open Sans" panose="020B0606030504020204" pitchFamily="34" charset="0"/>
+                    <a:ea typeface="Open Sans" panose="020B0606030504020204" pitchFamily="34" charset="0"/>
+                    <a:cs typeface="Open Sans" panose="020B0606030504020204" pitchFamily="34" charset="0"/>
+                  </a:rPr>
+                  <a:t>T</a:t>
+                </a:r>
+              </a:p>
+            </p:txBody>
+          </p:sp>
+          <p:sp>
+            <p:nvSpPr>
+              <p:cNvPr id="68" name="TextBox 67">
+                <a:extLst>
+                  <a:ext uri="{FF2B5EF4-FFF2-40B4-BE49-F238E27FC236}">
+                    <a16:creationId xmlns:a16="http://schemas.microsoft.com/office/drawing/2014/main" id="{2ED542CE-5B3C-F3CD-4EC7-09EC4ED14A09}"/>
+                  </a:ext>
+                </a:extLst>
+              </p:cNvPr>
+              <p:cNvSpPr txBox="1"/>
+              <p:nvPr/>
+            </p:nvSpPr>
+            <p:spPr>
+              <a:xfrm>
+                <a:off x="5090932" y="2920665"/>
+                <a:ext cx="269626" cy="276999"/>
+              </a:xfrm>
+              <a:prstGeom prst="rect">
+                <a:avLst/>
+              </a:prstGeom>
+              <a:noFill/>
+            </p:spPr>
+            <p:txBody>
+              <a:bodyPr wrap="none" rtlCol="0">
+                <a:spAutoFit/>
+              </a:bodyPr>
+              <a:lstStyle/>
+              <a:p>
+                <a:r>
+                  <a:rPr lang="en-US" sz="1200" dirty="0">
+                    <a:solidFill>
+                      <a:srgbClr val="FF7C80"/>
+                    </a:solidFill>
+                    <a:latin typeface="Open Sans" panose="020B0606030504020204" pitchFamily="34" charset="0"/>
+                    <a:ea typeface="Open Sans" panose="020B0606030504020204" pitchFamily="34" charset="0"/>
+                    <a:cs typeface="Open Sans" panose="020B0606030504020204" pitchFamily="34" charset="0"/>
+                  </a:rPr>
+                  <a:t>F</a:t>
+                </a:r>
+              </a:p>
+            </p:txBody>
+          </p:sp>
+          <p:sp>
+            <p:nvSpPr>
+              <p:cNvPr id="69" name="TextBox 68">
+                <a:extLst>
+                  <a:ext uri="{FF2B5EF4-FFF2-40B4-BE49-F238E27FC236}">
+                    <a16:creationId xmlns:a16="http://schemas.microsoft.com/office/drawing/2014/main" id="{3EA158B3-A8E9-2A5D-1429-75E3014636F2}"/>
+                  </a:ext>
+                </a:extLst>
+              </p:cNvPr>
+              <p:cNvSpPr txBox="1"/>
+              <p:nvPr/>
+            </p:nvSpPr>
+            <p:spPr>
+              <a:xfrm>
+                <a:off x="6018756" y="2167491"/>
+                <a:ext cx="269626" cy="276999"/>
+              </a:xfrm>
+              <a:prstGeom prst="rect">
+                <a:avLst/>
+              </a:prstGeom>
+              <a:noFill/>
+            </p:spPr>
+            <p:txBody>
+              <a:bodyPr wrap="none" rtlCol="0">
+                <a:spAutoFit/>
+              </a:bodyPr>
+              <a:lstStyle/>
+              <a:p>
+                <a:r>
+                  <a:rPr lang="en-US" sz="1200" dirty="0">
+                    <a:solidFill>
+                      <a:srgbClr val="FF7C80"/>
+                    </a:solidFill>
+                    <a:latin typeface="Open Sans" panose="020B0606030504020204" pitchFamily="34" charset="0"/>
+                    <a:ea typeface="Open Sans" panose="020B0606030504020204" pitchFamily="34" charset="0"/>
+                    <a:cs typeface="Open Sans" panose="020B0606030504020204" pitchFamily="34" charset="0"/>
+                  </a:rPr>
+                  <a:t>F</a:t>
+                </a:r>
+              </a:p>
+            </p:txBody>
+          </p:sp>
+          <p:sp>
+            <p:nvSpPr>
+              <p:cNvPr id="70" name="TextBox 69">
+                <a:extLst>
+                  <a:ext uri="{FF2B5EF4-FFF2-40B4-BE49-F238E27FC236}">
+                    <a16:creationId xmlns:a16="http://schemas.microsoft.com/office/drawing/2014/main" id="{9163DA9A-E93A-0F64-D9C3-9BBCD7C431CC}"/>
+                  </a:ext>
+                </a:extLst>
+              </p:cNvPr>
+              <p:cNvSpPr txBox="1"/>
+              <p:nvPr/>
+            </p:nvSpPr>
+            <p:spPr>
+              <a:xfrm>
+                <a:off x="4826707" y="1697909"/>
+                <a:ext cx="269626" cy="276999"/>
+              </a:xfrm>
+              <a:prstGeom prst="rect">
+                <a:avLst/>
+              </a:prstGeom>
+              <a:noFill/>
+            </p:spPr>
+            <p:txBody>
+              <a:bodyPr wrap="none" rtlCol="0">
+                <a:spAutoFit/>
+              </a:bodyPr>
+              <a:lstStyle/>
+              <a:p>
+                <a:r>
+                  <a:rPr lang="en-US" sz="1200" dirty="0">
+                    <a:solidFill>
+                      <a:srgbClr val="FF7C80"/>
+                    </a:solidFill>
+                    <a:latin typeface="Open Sans" panose="020B0606030504020204" pitchFamily="34" charset="0"/>
+                    <a:ea typeface="Open Sans" panose="020B0606030504020204" pitchFamily="34" charset="0"/>
+                    <a:cs typeface="Open Sans" panose="020B0606030504020204" pitchFamily="34" charset="0"/>
+                  </a:rPr>
+                  <a:t>T</a:t>
+                </a:r>
+              </a:p>
+            </p:txBody>
+          </p:sp>
+        </p:grpSp>
+      </p:grpSp>
     </p:spTree>
     <p:extLst>
       <p:ext uri="{BB962C8B-B14F-4D97-AF65-F5344CB8AC3E}">

</xml_diff>

<commit_message>
Added Flowchart for Q2 of PSPM2122_KMPk.md
</commit_message>
<xml_diff>
--- a/Past Year Theory Questions/Resources/resources.pptx
+++ b/Past Year Theory Questions/Resources/resources.pptx
@@ -277,7 +277,7 @@
           <a:p>
             <a:fld id="{34BBF2E1-1C0D-4B66-AD27-CA9E57E33A5F}" type="datetimeFigureOut">
               <a:rPr lang="en-US" smtClean="0"/>
-              <a:t>18-May-22</a:t>
+              <a:t>19-May-22</a:t>
             </a:fld>
             <a:endParaRPr lang="en-US"/>
           </a:p>
@@ -475,7 +475,7 @@
           <a:p>
             <a:fld id="{34BBF2E1-1C0D-4B66-AD27-CA9E57E33A5F}" type="datetimeFigureOut">
               <a:rPr lang="en-US" smtClean="0"/>
-              <a:t>18-May-22</a:t>
+              <a:t>19-May-22</a:t>
             </a:fld>
             <a:endParaRPr lang="en-US"/>
           </a:p>
@@ -683,7 +683,7 @@
           <a:p>
             <a:fld id="{34BBF2E1-1C0D-4B66-AD27-CA9E57E33A5F}" type="datetimeFigureOut">
               <a:rPr lang="en-US" smtClean="0"/>
-              <a:t>18-May-22</a:t>
+              <a:t>19-May-22</a:t>
             </a:fld>
             <a:endParaRPr lang="en-US"/>
           </a:p>
@@ -881,7 +881,7 @@
           <a:p>
             <a:fld id="{34BBF2E1-1C0D-4B66-AD27-CA9E57E33A5F}" type="datetimeFigureOut">
               <a:rPr lang="en-US" smtClean="0"/>
-              <a:t>18-May-22</a:t>
+              <a:t>19-May-22</a:t>
             </a:fld>
             <a:endParaRPr lang="en-US"/>
           </a:p>
@@ -1156,7 +1156,7 @@
           <a:p>
             <a:fld id="{34BBF2E1-1C0D-4B66-AD27-CA9E57E33A5F}" type="datetimeFigureOut">
               <a:rPr lang="en-US" smtClean="0"/>
-              <a:t>18-May-22</a:t>
+              <a:t>19-May-22</a:t>
             </a:fld>
             <a:endParaRPr lang="en-US"/>
           </a:p>
@@ -1421,7 +1421,7 @@
           <a:p>
             <a:fld id="{34BBF2E1-1C0D-4B66-AD27-CA9E57E33A5F}" type="datetimeFigureOut">
               <a:rPr lang="en-US" smtClean="0"/>
-              <a:t>18-May-22</a:t>
+              <a:t>19-May-22</a:t>
             </a:fld>
             <a:endParaRPr lang="en-US"/>
           </a:p>
@@ -1833,7 +1833,7 @@
           <a:p>
             <a:fld id="{34BBF2E1-1C0D-4B66-AD27-CA9E57E33A5F}" type="datetimeFigureOut">
               <a:rPr lang="en-US" smtClean="0"/>
-              <a:t>18-May-22</a:t>
+              <a:t>19-May-22</a:t>
             </a:fld>
             <a:endParaRPr lang="en-US"/>
           </a:p>
@@ -1974,7 +1974,7 @@
           <a:p>
             <a:fld id="{34BBF2E1-1C0D-4B66-AD27-CA9E57E33A5F}" type="datetimeFigureOut">
               <a:rPr lang="en-US" smtClean="0"/>
-              <a:t>18-May-22</a:t>
+              <a:t>19-May-22</a:t>
             </a:fld>
             <a:endParaRPr lang="en-US"/>
           </a:p>
@@ -2087,7 +2087,7 @@
           <a:p>
             <a:fld id="{34BBF2E1-1C0D-4B66-AD27-CA9E57E33A5F}" type="datetimeFigureOut">
               <a:rPr lang="en-US" smtClean="0"/>
-              <a:t>18-May-22</a:t>
+              <a:t>19-May-22</a:t>
             </a:fld>
             <a:endParaRPr lang="en-US"/>
           </a:p>
@@ -2398,7 +2398,7 @@
           <a:p>
             <a:fld id="{34BBF2E1-1C0D-4B66-AD27-CA9E57E33A5F}" type="datetimeFigureOut">
               <a:rPr lang="en-US" smtClean="0"/>
-              <a:t>18-May-22</a:t>
+              <a:t>19-May-22</a:t>
             </a:fld>
             <a:endParaRPr lang="en-US"/>
           </a:p>
@@ -2686,7 +2686,7 @@
           <a:p>
             <a:fld id="{34BBF2E1-1C0D-4B66-AD27-CA9E57E33A5F}" type="datetimeFigureOut">
               <a:rPr lang="en-US" smtClean="0"/>
-              <a:t>18-May-22</a:t>
+              <a:t>19-May-22</a:t>
             </a:fld>
             <a:endParaRPr lang="en-US"/>
           </a:p>
@@ -2930,7 +2930,7 @@
           <a:p>
             <a:fld id="{34BBF2E1-1C0D-4B66-AD27-CA9E57E33A5F}" type="datetimeFigureOut">
               <a:rPr lang="en-US" smtClean="0"/>
-              <a:t>18-May-22</a:t>
+              <a:t>19-May-22</a:t>
             </a:fld>
             <a:endParaRPr lang="en-US"/>
           </a:p>
@@ -16274,123 +16274,79 @@
           <a:chExt cx="0" cy="0"/>
         </a:xfrm>
       </p:grpSpPr>
-      <p:sp>
-        <p:nvSpPr>
-          <p:cNvPr id="108" name="Rectangle 107">
+      <p:grpSp>
+        <p:nvGrpSpPr>
+          <p:cNvPr id="28" name="Group 27">
             <a:extLst>
               <a:ext uri="{FF2B5EF4-FFF2-40B4-BE49-F238E27FC236}">
-                <a16:creationId xmlns:a16="http://schemas.microsoft.com/office/drawing/2014/main" id="{F5A5FD62-A99C-04B6-706B-DEE9B81AF541}"/>
+                <a16:creationId xmlns:a16="http://schemas.microsoft.com/office/drawing/2014/main" id="{FDA4C168-3292-EA37-B232-87322FC1AAEF}"/>
               </a:ext>
             </a:extLst>
           </p:cNvPr>
-          <p:cNvSpPr/>
+          <p:cNvGrpSpPr/>
           <p:nvPr/>
-        </p:nvSpPr>
-        <p:spPr>
+        </p:nvGrpSpPr>
+        <p:grpSpPr>
           <a:xfrm>
-            <a:off x="3645392" y="1315453"/>
-            <a:ext cx="7327942" cy="4227094"/>
+            <a:off x="2432029" y="1435768"/>
+            <a:ext cx="7327942" cy="3986464"/>
+            <a:chOff x="2432029" y="1435768"/>
+            <a:chExt cx="7327942" cy="3986464"/>
           </a:xfrm>
-          <a:prstGeom prst="rect">
-            <a:avLst/>
-          </a:prstGeom>
-          <a:solidFill>
-            <a:srgbClr val="0F1017"/>
-          </a:solidFill>
-          <a:ln w="12700">
+        </p:grpSpPr>
+        <p:sp>
+          <p:nvSpPr>
+            <p:cNvPr id="108" name="Rectangle 107">
+              <a:extLst>
+                <a:ext uri="{FF2B5EF4-FFF2-40B4-BE49-F238E27FC236}">
+                  <a16:creationId xmlns:a16="http://schemas.microsoft.com/office/drawing/2014/main" id="{F5A5FD62-A99C-04B6-706B-DEE9B81AF541}"/>
+                </a:ext>
+              </a:extLst>
+            </p:cNvPr>
+            <p:cNvSpPr/>
+            <p:nvPr/>
+          </p:nvSpPr>
+          <p:spPr>
+            <a:xfrm>
+              <a:off x="2432029" y="1435768"/>
+              <a:ext cx="7327942" cy="3986464"/>
+            </a:xfrm>
+            <a:prstGeom prst="rect">
+              <a:avLst/>
+            </a:prstGeom>
             <a:solidFill>
-              <a:schemeClr val="bg1">
-                <a:lumMod val="75000"/>
-              </a:schemeClr>
+              <a:srgbClr val="0F1017"/>
             </a:solidFill>
-          </a:ln>
-        </p:spPr>
-        <p:style>
-          <a:lnRef idx="2">
-            <a:schemeClr val="accent1">
-              <a:shade val="50000"/>
-            </a:schemeClr>
-          </a:lnRef>
-          <a:fillRef idx="1">
-            <a:schemeClr val="accent1"/>
-          </a:fillRef>
-          <a:effectRef idx="0">
-            <a:schemeClr val="accent1"/>
-          </a:effectRef>
-          <a:fontRef idx="minor">
-            <a:schemeClr val="lt1"/>
-          </a:fontRef>
-        </p:style>
-        <p:txBody>
-          <a:bodyPr rtlCol="0" anchor="ctr"/>
-          <a:lstStyle/>
-          <a:p>
-            <a:pPr algn="ctr"/>
-            <a:endParaRPr lang="en-US" sz="1800" dirty="0">
+            <a:ln w="12700">
               <a:solidFill>
                 <a:schemeClr val="bg1">
-                  <a:lumMod val="85000"/>
+                  <a:lumMod val="75000"/>
                 </a:schemeClr>
               </a:solidFill>
-              <a:latin typeface="Open Sans" panose="020B0606030504020204" pitchFamily="34" charset="0"/>
-              <a:ea typeface="Open Sans" panose="020B0606030504020204" pitchFamily="34" charset="0"/>
-              <a:cs typeface="Open Sans" panose="020B0606030504020204" pitchFamily="34" charset="0"/>
-            </a:endParaRPr>
-          </a:p>
-        </p:txBody>
-      </p:sp>
-      <p:sp>
-        <p:nvSpPr>
-          <p:cNvPr id="59" name="Flowchart: Terminator 58">
-            <a:extLst>
-              <a:ext uri="{FF2B5EF4-FFF2-40B4-BE49-F238E27FC236}">
-                <a16:creationId xmlns:a16="http://schemas.microsoft.com/office/drawing/2014/main" id="{D7554AAC-5F81-46CA-BA4E-6CDF6B8CC5AD}"/>
-              </a:ext>
-            </a:extLst>
-          </p:cNvPr>
-          <p:cNvSpPr/>
-          <p:nvPr/>
-        </p:nvSpPr>
-        <p:spPr>
-          <a:xfrm>
-            <a:off x="4572180" y="1739895"/>
-            <a:ext cx="1050758" cy="341690"/>
-          </a:xfrm>
-          <a:prstGeom prst="flowChartTerminator">
-            <a:avLst/>
-          </a:prstGeom>
-          <a:noFill/>
-          <a:ln>
-            <a:solidFill>
-              <a:schemeClr val="bg1">
-                <a:lumMod val="75000"/>
+            </a:ln>
+          </p:spPr>
+          <p:style>
+            <a:lnRef idx="2">
+              <a:schemeClr val="accent1">
+                <a:shade val="50000"/>
               </a:schemeClr>
-            </a:solidFill>
-          </a:ln>
-        </p:spPr>
-        <p:style>
-          <a:lnRef idx="2">
-            <a:schemeClr val="accent1">
-              <a:shade val="50000"/>
-            </a:schemeClr>
-          </a:lnRef>
-          <a:fillRef idx="1">
-            <a:schemeClr val="accent1"/>
-          </a:fillRef>
-          <a:effectRef idx="0">
-            <a:schemeClr val="accent1"/>
-          </a:effectRef>
-          <a:fontRef idx="minor">
-            <a:schemeClr val="lt1"/>
-          </a:fontRef>
-        </p:style>
-        <p:txBody>
-          <a:bodyPr rtlCol="0" anchor="ctr"/>
-          <a:lstStyle/>
-          <a:p>
-            <a:pPr algn="ctr"/>
-            <a:r>
-              <a:rPr lang="en-US" sz="1200" dirty="0">
+            </a:lnRef>
+            <a:fillRef idx="1">
+              <a:schemeClr val="accent1"/>
+            </a:fillRef>
+            <a:effectRef idx="0">
+              <a:schemeClr val="accent1"/>
+            </a:effectRef>
+            <a:fontRef idx="minor">
+              <a:schemeClr val="lt1"/>
+            </a:fontRef>
+          </p:style>
+          <p:txBody>
+            <a:bodyPr rtlCol="0" anchor="ctr"/>
+            <a:lstStyle/>
+            <a:p>
+              <a:pPr algn="ctr"/>
+              <a:endParaRPr lang="en-US" sz="1800" dirty="0">
                 <a:solidFill>
                   <a:schemeClr val="bg1">
                     <a:lumMod val="85000"/>
@@ -16399,648 +16355,903 @@
                 <a:latin typeface="Open Sans" panose="020B0606030504020204" pitchFamily="34" charset="0"/>
                 <a:ea typeface="Open Sans" panose="020B0606030504020204" pitchFamily="34" charset="0"/>
                 <a:cs typeface="Open Sans" panose="020B0606030504020204" pitchFamily="34" charset="0"/>
-              </a:rPr>
-              <a:t>Start</a:t>
-            </a:r>
-          </a:p>
-        </p:txBody>
-      </p:sp>
-      <p:sp>
-        <p:nvSpPr>
-          <p:cNvPr id="60" name="Flowchart: Terminator 59">
-            <a:extLst>
-              <a:ext uri="{FF2B5EF4-FFF2-40B4-BE49-F238E27FC236}">
-                <a16:creationId xmlns:a16="http://schemas.microsoft.com/office/drawing/2014/main" id="{103191FC-37A5-724C-C214-882B4B9F6C89}"/>
-              </a:ext>
-            </a:extLst>
-          </p:cNvPr>
-          <p:cNvSpPr/>
-          <p:nvPr/>
-        </p:nvSpPr>
-        <p:spPr>
-          <a:xfrm>
-            <a:off x="9000424" y="1739895"/>
-            <a:ext cx="1050758" cy="341690"/>
-          </a:xfrm>
-          <a:prstGeom prst="flowChartTerminator">
-            <a:avLst/>
-          </a:prstGeom>
-          <a:noFill/>
-          <a:ln>
-            <a:solidFill>
-              <a:schemeClr val="bg1">
-                <a:lumMod val="75000"/>
-              </a:schemeClr>
-            </a:solidFill>
-          </a:ln>
-        </p:spPr>
-        <p:style>
-          <a:lnRef idx="2">
-            <a:schemeClr val="accent1">
-              <a:shade val="50000"/>
-            </a:schemeClr>
-          </a:lnRef>
-          <a:fillRef idx="1">
-            <a:schemeClr val="accent1"/>
-          </a:fillRef>
-          <a:effectRef idx="0">
-            <a:schemeClr val="accent1"/>
-          </a:effectRef>
-          <a:fontRef idx="minor">
-            <a:schemeClr val="lt1"/>
-          </a:fontRef>
-        </p:style>
-        <p:txBody>
-          <a:bodyPr rtlCol="0" anchor="ctr"/>
-          <a:lstStyle/>
-          <a:p>
-            <a:pPr algn="ctr"/>
-            <a:r>
-              <a:rPr lang="en-US" sz="1200" dirty="0">
+              </a:endParaRPr>
+            </a:p>
+          </p:txBody>
+        </p:sp>
+        <p:grpSp>
+          <p:nvGrpSpPr>
+            <p:cNvPr id="26" name="Group 25">
+              <a:extLst>
+                <a:ext uri="{FF2B5EF4-FFF2-40B4-BE49-F238E27FC236}">
+                  <a16:creationId xmlns:a16="http://schemas.microsoft.com/office/drawing/2014/main" id="{5D2D5595-1CD3-3652-27AA-2671FD6727DD}"/>
+                </a:ext>
+              </a:extLst>
+            </p:cNvPr>
+            <p:cNvGrpSpPr/>
+            <p:nvPr/>
+          </p:nvGrpSpPr>
+          <p:grpSpPr>
+            <a:xfrm>
+              <a:off x="2957136" y="1891379"/>
+              <a:ext cx="6277726" cy="3075242"/>
+              <a:chOff x="2957136" y="1739895"/>
+              <a:chExt cx="6277726" cy="3075242"/>
+            </a:xfrm>
+          </p:grpSpPr>
+          <p:sp>
+            <p:nvSpPr>
+              <p:cNvPr id="59" name="Flowchart: Terminator 58">
+                <a:extLst>
+                  <a:ext uri="{FF2B5EF4-FFF2-40B4-BE49-F238E27FC236}">
+                    <a16:creationId xmlns:a16="http://schemas.microsoft.com/office/drawing/2014/main" id="{D7554AAC-5F81-46CA-BA4E-6CDF6B8CC5AD}"/>
+                  </a:ext>
+                </a:extLst>
+              </p:cNvPr>
+              <p:cNvSpPr/>
+              <p:nvPr/>
+            </p:nvSpPr>
+            <p:spPr>
+              <a:xfrm>
+                <a:off x="3358817" y="1739895"/>
+                <a:ext cx="1050758" cy="341690"/>
+              </a:xfrm>
+              <a:prstGeom prst="flowChartTerminator">
+                <a:avLst/>
+              </a:prstGeom>
+              <a:noFill/>
+              <a:ln>
                 <a:solidFill>
                   <a:schemeClr val="bg1">
-                    <a:lumMod val="85000"/>
+                    <a:lumMod val="75000"/>
                   </a:schemeClr>
                 </a:solidFill>
-                <a:latin typeface="Open Sans" panose="020B0606030504020204" pitchFamily="34" charset="0"/>
-                <a:ea typeface="Open Sans" panose="020B0606030504020204" pitchFamily="34" charset="0"/>
-                <a:cs typeface="Open Sans" panose="020B0606030504020204" pitchFamily="34" charset="0"/>
-              </a:rPr>
-              <a:t>Stop</a:t>
-            </a:r>
-          </a:p>
-        </p:txBody>
-      </p:sp>
-      <p:cxnSp>
-        <p:nvCxnSpPr>
-          <p:cNvPr id="61" name="Straight Arrow Connector 60">
-            <a:extLst>
-              <a:ext uri="{FF2B5EF4-FFF2-40B4-BE49-F238E27FC236}">
-                <a16:creationId xmlns:a16="http://schemas.microsoft.com/office/drawing/2014/main" id="{A1BBCFB3-141A-F3B8-67BE-C05995E64053}"/>
-              </a:ext>
-            </a:extLst>
-          </p:cNvPr>
-          <p:cNvCxnSpPr>
-            <a:cxnSpLocks/>
-            <a:stCxn id="59" idx="2"/>
-          </p:cNvCxnSpPr>
-          <p:nvPr/>
-        </p:nvCxnSpPr>
-        <p:spPr>
-          <a:xfrm flipH="1">
-            <a:off x="5092921" y="2081585"/>
-            <a:ext cx="4638" cy="341690"/>
-          </a:xfrm>
-          <a:prstGeom prst="straightConnector1">
-            <a:avLst/>
-          </a:prstGeom>
-          <a:ln w="12700">
-            <a:solidFill>
-              <a:schemeClr val="bg1">
-                <a:lumMod val="75000"/>
-              </a:schemeClr>
-            </a:solidFill>
-            <a:tailEnd type="triangle"/>
-          </a:ln>
-        </p:spPr>
-        <p:style>
-          <a:lnRef idx="1">
-            <a:schemeClr val="accent1"/>
-          </a:lnRef>
-          <a:fillRef idx="0">
-            <a:schemeClr val="accent1"/>
-          </a:fillRef>
-          <a:effectRef idx="0">
-            <a:schemeClr val="accent1"/>
-          </a:effectRef>
-          <a:fontRef idx="minor">
-            <a:schemeClr val="tx1"/>
-          </a:fontRef>
-        </p:style>
-      </p:cxnSp>
-      <p:cxnSp>
-        <p:nvCxnSpPr>
-          <p:cNvPr id="18" name="Straight Arrow Connector 17">
-            <a:extLst>
-              <a:ext uri="{FF2B5EF4-FFF2-40B4-BE49-F238E27FC236}">
-                <a16:creationId xmlns:a16="http://schemas.microsoft.com/office/drawing/2014/main" id="{28D76C1F-C45D-8EEF-E187-E9E48161CAB0}"/>
-              </a:ext>
-            </a:extLst>
-          </p:cNvPr>
-          <p:cNvCxnSpPr>
-            <a:cxnSpLocks/>
-            <a:endCxn id="60" idx="2"/>
-          </p:cNvCxnSpPr>
-          <p:nvPr/>
-        </p:nvCxnSpPr>
-        <p:spPr>
-          <a:xfrm flipV="1">
-            <a:off x="9525803" y="2081585"/>
-            <a:ext cx="0" cy="296780"/>
-          </a:xfrm>
-          <a:prstGeom prst="straightConnector1">
-            <a:avLst/>
-          </a:prstGeom>
-          <a:ln w="12700">
-            <a:solidFill>
-              <a:srgbClr val="CC99FF"/>
-            </a:solidFill>
-            <a:tailEnd type="triangle"/>
-          </a:ln>
-        </p:spPr>
-        <p:style>
-          <a:lnRef idx="1">
-            <a:schemeClr val="accent1"/>
-          </a:lnRef>
-          <a:fillRef idx="0">
-            <a:schemeClr val="accent1"/>
-          </a:fillRef>
-          <a:effectRef idx="0">
-            <a:schemeClr val="accent1"/>
-          </a:effectRef>
-          <a:fontRef idx="minor">
-            <a:schemeClr val="tx1"/>
-          </a:fontRef>
-        </p:style>
-      </p:cxnSp>
-      <p:sp>
-        <p:nvSpPr>
-          <p:cNvPr id="29" name="Flowchart: Terminator 28">
-            <a:extLst>
-              <a:ext uri="{FF2B5EF4-FFF2-40B4-BE49-F238E27FC236}">
-                <a16:creationId xmlns:a16="http://schemas.microsoft.com/office/drawing/2014/main" id="{97EBF7DD-2035-166F-CFA5-6B352DAE8ECC}"/>
-              </a:ext>
-            </a:extLst>
-          </p:cNvPr>
-          <p:cNvSpPr/>
-          <p:nvPr/>
-        </p:nvSpPr>
-        <p:spPr>
-          <a:xfrm>
-            <a:off x="1218666" y="649032"/>
-            <a:ext cx="1050758" cy="341690"/>
-          </a:xfrm>
-          <a:prstGeom prst="flowChartTerminator">
-            <a:avLst/>
-          </a:prstGeom>
-          <a:noFill/>
-          <a:ln>
-            <a:solidFill>
-              <a:schemeClr val="bg1">
-                <a:lumMod val="75000"/>
-              </a:schemeClr>
-            </a:solidFill>
-          </a:ln>
-        </p:spPr>
-        <p:style>
-          <a:lnRef idx="2">
-            <a:schemeClr val="accent1">
-              <a:shade val="50000"/>
-            </a:schemeClr>
-          </a:lnRef>
-          <a:fillRef idx="1">
-            <a:schemeClr val="accent1"/>
-          </a:fillRef>
-          <a:effectRef idx="0">
-            <a:schemeClr val="accent1"/>
-          </a:effectRef>
-          <a:fontRef idx="minor">
-            <a:schemeClr val="lt1"/>
-          </a:fontRef>
-        </p:style>
-        <p:txBody>
-          <a:bodyPr rtlCol="0" anchor="ctr"/>
-          <a:lstStyle/>
-          <a:p>
-            <a:pPr algn="ctr"/>
-            <a:r>
-              <a:rPr lang="en-US" sz="1200" dirty="0">
+              </a:ln>
+            </p:spPr>
+            <p:style>
+              <a:lnRef idx="2">
+                <a:schemeClr val="accent1">
+                  <a:shade val="50000"/>
+                </a:schemeClr>
+              </a:lnRef>
+              <a:fillRef idx="1">
+                <a:schemeClr val="accent1"/>
+              </a:fillRef>
+              <a:effectRef idx="0">
+                <a:schemeClr val="accent1"/>
+              </a:effectRef>
+              <a:fontRef idx="minor">
+                <a:schemeClr val="lt1"/>
+              </a:fontRef>
+            </p:style>
+            <p:txBody>
+              <a:bodyPr rtlCol="0" anchor="ctr"/>
+              <a:lstStyle/>
+              <a:p>
+                <a:pPr algn="ctr"/>
+                <a:r>
+                  <a:rPr lang="en-US" sz="1200" dirty="0">
+                    <a:solidFill>
+                      <a:schemeClr val="bg1">
+                        <a:lumMod val="85000"/>
+                      </a:schemeClr>
+                    </a:solidFill>
+                    <a:latin typeface="Open Sans" panose="020B0606030504020204" pitchFamily="34" charset="0"/>
+                    <a:ea typeface="Open Sans" panose="020B0606030504020204" pitchFamily="34" charset="0"/>
+                    <a:cs typeface="Open Sans" panose="020B0606030504020204" pitchFamily="34" charset="0"/>
+                  </a:rPr>
+                  <a:t>START</a:t>
+                </a:r>
+              </a:p>
+            </p:txBody>
+          </p:sp>
+          <p:sp>
+            <p:nvSpPr>
+              <p:cNvPr id="60" name="Flowchart: Terminator 59">
+                <a:extLst>
+                  <a:ext uri="{FF2B5EF4-FFF2-40B4-BE49-F238E27FC236}">
+                    <a16:creationId xmlns:a16="http://schemas.microsoft.com/office/drawing/2014/main" id="{103191FC-37A5-724C-C214-882B4B9F6C89}"/>
+                  </a:ext>
+                </a:extLst>
+              </p:cNvPr>
+              <p:cNvSpPr/>
+              <p:nvPr/>
+            </p:nvSpPr>
+            <p:spPr>
+              <a:xfrm>
+                <a:off x="7787061" y="1739895"/>
+                <a:ext cx="1050758" cy="341690"/>
+              </a:xfrm>
+              <a:prstGeom prst="flowChartTerminator">
+                <a:avLst/>
+              </a:prstGeom>
+              <a:noFill/>
+              <a:ln>
                 <a:solidFill>
                   <a:schemeClr val="bg1">
-                    <a:lumMod val="85000"/>
+                    <a:lumMod val="75000"/>
                   </a:schemeClr>
                 </a:solidFill>
-                <a:latin typeface="Open Sans" panose="020B0606030504020204" pitchFamily="34" charset="0"/>
-                <a:ea typeface="Open Sans" panose="020B0606030504020204" pitchFamily="34" charset="0"/>
-                <a:cs typeface="Open Sans" panose="020B0606030504020204" pitchFamily="34" charset="0"/>
-              </a:rPr>
-              <a:t>Start</a:t>
-            </a:r>
-          </a:p>
-        </p:txBody>
-      </p:sp>
-      <p:sp>
-        <p:nvSpPr>
-          <p:cNvPr id="31" name="Flowchart: Terminator 30">
-            <a:extLst>
-              <a:ext uri="{FF2B5EF4-FFF2-40B4-BE49-F238E27FC236}">
-                <a16:creationId xmlns:a16="http://schemas.microsoft.com/office/drawing/2014/main" id="{B46FF1EB-056C-88CD-27DB-132AB41F0506}"/>
-              </a:ext>
-            </a:extLst>
-          </p:cNvPr>
-          <p:cNvSpPr/>
-          <p:nvPr/>
-        </p:nvSpPr>
-        <p:spPr>
-          <a:xfrm>
-            <a:off x="1218666" y="1262521"/>
-            <a:ext cx="1050758" cy="341690"/>
-          </a:xfrm>
-          <a:prstGeom prst="flowChartTerminator">
-            <a:avLst/>
-          </a:prstGeom>
-          <a:noFill/>
-          <a:ln>
-            <a:solidFill>
-              <a:schemeClr val="bg1">
-                <a:lumMod val="75000"/>
-              </a:schemeClr>
-            </a:solidFill>
-          </a:ln>
-        </p:spPr>
-        <p:style>
-          <a:lnRef idx="2">
-            <a:schemeClr val="accent1">
-              <a:shade val="50000"/>
-            </a:schemeClr>
-          </a:lnRef>
-          <a:fillRef idx="1">
-            <a:schemeClr val="accent1"/>
-          </a:fillRef>
-          <a:effectRef idx="0">
-            <a:schemeClr val="accent1"/>
-          </a:effectRef>
-          <a:fontRef idx="minor">
-            <a:schemeClr val="lt1"/>
-          </a:fontRef>
-        </p:style>
-        <p:txBody>
-          <a:bodyPr rtlCol="0" anchor="ctr"/>
-          <a:lstStyle/>
-          <a:p>
-            <a:pPr algn="ctr"/>
-            <a:r>
-              <a:rPr lang="en-US" sz="1200" dirty="0">
+              </a:ln>
+            </p:spPr>
+            <p:style>
+              <a:lnRef idx="2">
+                <a:schemeClr val="accent1">
+                  <a:shade val="50000"/>
+                </a:schemeClr>
+              </a:lnRef>
+              <a:fillRef idx="1">
+                <a:schemeClr val="accent1"/>
+              </a:fillRef>
+              <a:effectRef idx="0">
+                <a:schemeClr val="accent1"/>
+              </a:effectRef>
+              <a:fontRef idx="minor">
+                <a:schemeClr val="lt1"/>
+              </a:fontRef>
+            </p:style>
+            <p:txBody>
+              <a:bodyPr rtlCol="0" anchor="ctr"/>
+              <a:lstStyle/>
+              <a:p>
+                <a:pPr algn="ctr"/>
+                <a:r>
+                  <a:rPr lang="en-US" sz="1200" dirty="0">
+                    <a:solidFill>
+                      <a:schemeClr val="bg1">
+                        <a:lumMod val="85000"/>
+                      </a:schemeClr>
+                    </a:solidFill>
+                    <a:latin typeface="Open Sans" panose="020B0606030504020204" pitchFamily="34" charset="0"/>
+                    <a:ea typeface="Open Sans" panose="020B0606030504020204" pitchFamily="34" charset="0"/>
+                    <a:cs typeface="Open Sans" panose="020B0606030504020204" pitchFamily="34" charset="0"/>
+                  </a:rPr>
+                  <a:t>STOP</a:t>
+                </a:r>
+              </a:p>
+            </p:txBody>
+          </p:sp>
+          <p:cxnSp>
+            <p:nvCxnSpPr>
+              <p:cNvPr id="61" name="Straight Arrow Connector 60">
+                <a:extLst>
+                  <a:ext uri="{FF2B5EF4-FFF2-40B4-BE49-F238E27FC236}">
+                    <a16:creationId xmlns:a16="http://schemas.microsoft.com/office/drawing/2014/main" id="{A1BBCFB3-141A-F3B8-67BE-C05995E64053}"/>
+                  </a:ext>
+                </a:extLst>
+              </p:cNvPr>
+              <p:cNvCxnSpPr>
+                <a:cxnSpLocks/>
+                <a:stCxn id="59" idx="2"/>
+                <a:endCxn id="16" idx="0"/>
+              </p:cNvCxnSpPr>
+              <p:nvPr/>
+            </p:nvCxnSpPr>
+            <p:spPr>
+              <a:xfrm flipH="1">
+                <a:off x="3879558" y="2081585"/>
+                <a:ext cx="4638" cy="349710"/>
+              </a:xfrm>
+              <a:prstGeom prst="straightConnector1">
+                <a:avLst/>
+              </a:prstGeom>
+              <a:ln w="12700">
                 <a:solidFill>
                   <a:schemeClr val="bg1">
-                    <a:lumMod val="85000"/>
+                    <a:lumMod val="75000"/>
                   </a:schemeClr>
                 </a:solidFill>
-                <a:latin typeface="Open Sans" panose="020B0606030504020204" pitchFamily="34" charset="0"/>
-                <a:ea typeface="Open Sans" panose="020B0606030504020204" pitchFamily="34" charset="0"/>
-                <a:cs typeface="Open Sans" panose="020B0606030504020204" pitchFamily="34" charset="0"/>
-              </a:rPr>
-              <a:t>Stop</a:t>
-            </a:r>
-          </a:p>
-        </p:txBody>
-      </p:sp>
-      <p:sp>
-        <p:nvSpPr>
-          <p:cNvPr id="34" name="Rectangle 33">
-            <a:extLst>
-              <a:ext uri="{FF2B5EF4-FFF2-40B4-BE49-F238E27FC236}">
-                <a16:creationId xmlns:a16="http://schemas.microsoft.com/office/drawing/2014/main" id="{A8D64967-4F28-2958-EE17-93FB9B3EDEEA}"/>
-              </a:ext>
-            </a:extLst>
-          </p:cNvPr>
-          <p:cNvSpPr/>
-          <p:nvPr/>
-        </p:nvSpPr>
-        <p:spPr>
-          <a:xfrm>
-            <a:off x="821623" y="3132324"/>
-            <a:ext cx="1844844" cy="393032"/>
-          </a:xfrm>
-          <a:prstGeom prst="rect">
-            <a:avLst/>
-          </a:prstGeom>
-          <a:noFill/>
-          <a:ln>
-            <a:solidFill>
-              <a:schemeClr val="accent6">
-                <a:lumMod val="60000"/>
-                <a:lumOff val="40000"/>
-              </a:schemeClr>
-            </a:solidFill>
-          </a:ln>
-        </p:spPr>
-        <p:style>
-          <a:lnRef idx="2">
-            <a:schemeClr val="accent1">
-              <a:shade val="50000"/>
-            </a:schemeClr>
-          </a:lnRef>
-          <a:fillRef idx="1">
-            <a:schemeClr val="accent1"/>
-          </a:fillRef>
-          <a:effectRef idx="0">
-            <a:schemeClr val="accent1"/>
-          </a:effectRef>
-          <a:fontRef idx="minor">
-            <a:schemeClr val="lt1"/>
-          </a:fontRef>
-        </p:style>
-        <p:txBody>
-          <a:bodyPr rtlCol="0" anchor="ctr"/>
-          <a:lstStyle/>
-          <a:p>
-            <a:pPr algn="ctr"/>
-            <a:r>
-              <a:rPr lang="en-US" sz="1200" dirty="0">
+                <a:tailEnd type="triangle"/>
+              </a:ln>
+            </p:spPr>
+            <p:style>
+              <a:lnRef idx="1">
+                <a:schemeClr val="accent1"/>
+              </a:lnRef>
+              <a:fillRef idx="0">
+                <a:schemeClr val="accent1"/>
+              </a:fillRef>
+              <a:effectRef idx="0">
+                <a:schemeClr val="accent1"/>
+              </a:effectRef>
+              <a:fontRef idx="minor">
+                <a:schemeClr val="tx1"/>
+              </a:fontRef>
+            </p:style>
+          </p:cxnSp>
+          <p:cxnSp>
+            <p:nvCxnSpPr>
+              <p:cNvPr id="18" name="Straight Arrow Connector 17">
+                <a:extLst>
+                  <a:ext uri="{FF2B5EF4-FFF2-40B4-BE49-F238E27FC236}">
+                    <a16:creationId xmlns:a16="http://schemas.microsoft.com/office/drawing/2014/main" id="{28D76C1F-C45D-8EEF-E187-E9E48161CAB0}"/>
+                  </a:ext>
+                </a:extLst>
+              </p:cNvPr>
+              <p:cNvCxnSpPr>
+                <a:cxnSpLocks/>
+                <a:stCxn id="47" idx="1"/>
+                <a:endCxn id="60" idx="2"/>
+              </p:cNvCxnSpPr>
+              <p:nvPr/>
+            </p:nvCxnSpPr>
+            <p:spPr>
+              <a:xfrm flipV="1">
+                <a:off x="8312440" y="2081585"/>
+                <a:ext cx="0" cy="301584"/>
+              </a:xfrm>
+              <a:prstGeom prst="straightConnector1">
+                <a:avLst/>
+              </a:prstGeom>
+              <a:ln w="12700">
                 <a:solidFill>
-                  <a:schemeClr val="bg1">
-                    <a:lumMod val="85000"/>
+                  <a:srgbClr val="CC99FF"/>
+                </a:solidFill>
+                <a:tailEnd type="triangle"/>
+              </a:ln>
+            </p:spPr>
+            <p:style>
+              <a:lnRef idx="1">
+                <a:schemeClr val="accent1"/>
+              </a:lnRef>
+              <a:fillRef idx="0">
+                <a:schemeClr val="accent1"/>
+              </a:fillRef>
+              <a:effectRef idx="0">
+                <a:schemeClr val="accent1"/>
+              </a:effectRef>
+              <a:fontRef idx="minor">
+                <a:schemeClr val="tx1"/>
+              </a:fontRef>
+            </p:style>
+          </p:cxnSp>
+          <p:sp>
+            <p:nvSpPr>
+              <p:cNvPr id="47" name="Flowchart: Data 46">
+                <a:extLst>
+                  <a:ext uri="{FF2B5EF4-FFF2-40B4-BE49-F238E27FC236}">
+                    <a16:creationId xmlns:a16="http://schemas.microsoft.com/office/drawing/2014/main" id="{E79F7B5C-9F7D-5907-4BED-1DDC3947E632}"/>
+                  </a:ext>
+                </a:extLst>
+              </p:cNvPr>
+              <p:cNvSpPr/>
+              <p:nvPr/>
+            </p:nvSpPr>
+            <p:spPr>
+              <a:xfrm>
+                <a:off x="7390018" y="2383169"/>
+                <a:ext cx="1844844" cy="489284"/>
+              </a:xfrm>
+              <a:prstGeom prst="flowChartInputOutput">
+                <a:avLst/>
+              </a:prstGeom>
+              <a:noFill/>
+              <a:ln>
+                <a:solidFill>
+                  <a:srgbClr val="CC99FF"/>
+                </a:solidFill>
+              </a:ln>
+            </p:spPr>
+            <p:style>
+              <a:lnRef idx="2">
+                <a:schemeClr val="accent1">
+                  <a:shade val="50000"/>
+                </a:schemeClr>
+              </a:lnRef>
+              <a:fillRef idx="1">
+                <a:schemeClr val="accent1"/>
+              </a:fillRef>
+              <a:effectRef idx="0">
+                <a:schemeClr val="accent1"/>
+              </a:effectRef>
+              <a:fontRef idx="minor">
+                <a:schemeClr val="lt1"/>
+              </a:fontRef>
+            </p:style>
+            <p:txBody>
+              <a:bodyPr rtlCol="0" anchor="ctr"/>
+              <a:lstStyle/>
+              <a:p>
+                <a:pPr algn="ctr"/>
+                <a:r>
+                  <a:rPr lang="en-US" sz="1200" dirty="0">
+                    <a:solidFill>
+                      <a:schemeClr val="bg1">
+                        <a:lumMod val="85000"/>
+                      </a:schemeClr>
+                    </a:solidFill>
+                    <a:latin typeface="Open Sans" panose="020B0606030504020204" pitchFamily="34" charset="0"/>
+                    <a:ea typeface="Open Sans" panose="020B0606030504020204" pitchFamily="34" charset="0"/>
+                    <a:cs typeface="Open Sans" panose="020B0606030504020204" pitchFamily="34" charset="0"/>
+                  </a:rPr>
+                  <a:t>PRINT sum</a:t>
+                </a:r>
+              </a:p>
+            </p:txBody>
+          </p:sp>
+          <p:sp>
+            <p:nvSpPr>
+              <p:cNvPr id="49" name="TextBox 48">
+                <a:extLst>
+                  <a:ext uri="{FF2B5EF4-FFF2-40B4-BE49-F238E27FC236}">
+                    <a16:creationId xmlns:a16="http://schemas.microsoft.com/office/drawing/2014/main" id="{9782D64F-E1B4-7BBA-97F1-672AA7BB38F2}"/>
+                  </a:ext>
+                </a:extLst>
+              </p:cNvPr>
+              <p:cNvSpPr txBox="1"/>
+              <p:nvPr/>
+            </p:nvSpPr>
+            <p:spPr>
+              <a:xfrm>
+                <a:off x="7016102" y="3365258"/>
+                <a:ext cx="269626" cy="276999"/>
+              </a:xfrm>
+              <a:prstGeom prst="rect">
+                <a:avLst/>
+              </a:prstGeom>
+              <a:noFill/>
+            </p:spPr>
+            <p:txBody>
+              <a:bodyPr wrap="none" rtlCol="0">
+                <a:spAutoFit/>
+              </a:bodyPr>
+              <a:lstStyle/>
+              <a:p>
+                <a:r>
+                  <a:rPr lang="en-US" sz="1200" dirty="0">
+                    <a:solidFill>
+                      <a:srgbClr val="FF7C80"/>
+                    </a:solidFill>
+                    <a:latin typeface="Open Sans" panose="020B0606030504020204" pitchFamily="34" charset="0"/>
+                    <a:ea typeface="Open Sans" panose="020B0606030504020204" pitchFamily="34" charset="0"/>
+                    <a:cs typeface="Open Sans" panose="020B0606030504020204" pitchFamily="34" charset="0"/>
+                  </a:rPr>
+                  <a:t>T</a:t>
+                </a:r>
+              </a:p>
+            </p:txBody>
+          </p:sp>
+          <p:sp>
+            <p:nvSpPr>
+              <p:cNvPr id="53" name="TextBox 52">
+                <a:extLst>
+                  <a:ext uri="{FF2B5EF4-FFF2-40B4-BE49-F238E27FC236}">
+                    <a16:creationId xmlns:a16="http://schemas.microsoft.com/office/drawing/2014/main" id="{7E6B2905-22B9-9F02-399A-510F7F8499F3}"/>
+                  </a:ext>
+                </a:extLst>
+              </p:cNvPr>
+              <p:cNvSpPr txBox="1"/>
+              <p:nvPr/>
+            </p:nvSpPr>
+            <p:spPr>
+              <a:xfrm>
+                <a:off x="6100509" y="2876018"/>
+                <a:ext cx="269626" cy="276999"/>
+              </a:xfrm>
+              <a:prstGeom prst="rect">
+                <a:avLst/>
+              </a:prstGeom>
+              <a:noFill/>
+            </p:spPr>
+            <p:txBody>
+              <a:bodyPr wrap="none" rtlCol="0">
+                <a:spAutoFit/>
+              </a:bodyPr>
+              <a:lstStyle/>
+              <a:p>
+                <a:r>
+                  <a:rPr lang="en-US" sz="1200" dirty="0">
+                    <a:solidFill>
+                      <a:srgbClr val="FF7C80"/>
+                    </a:solidFill>
+                    <a:latin typeface="Open Sans" panose="020B0606030504020204" pitchFamily="34" charset="0"/>
+                    <a:ea typeface="Open Sans" panose="020B0606030504020204" pitchFamily="34" charset="0"/>
+                    <a:cs typeface="Open Sans" panose="020B0606030504020204" pitchFamily="34" charset="0"/>
+                  </a:rPr>
+                  <a:t>F</a:t>
+                </a:r>
+              </a:p>
+            </p:txBody>
+          </p:sp>
+          <p:sp>
+            <p:nvSpPr>
+              <p:cNvPr id="16" name="Rectangle 15">
+                <a:extLst>
+                  <a:ext uri="{FF2B5EF4-FFF2-40B4-BE49-F238E27FC236}">
+                    <a16:creationId xmlns:a16="http://schemas.microsoft.com/office/drawing/2014/main" id="{190FC25B-55B7-6E22-E858-B29F922D7596}"/>
+                  </a:ext>
+                </a:extLst>
+              </p:cNvPr>
+              <p:cNvSpPr/>
+              <p:nvPr/>
+            </p:nvSpPr>
+            <p:spPr>
+              <a:xfrm>
+                <a:off x="2957136" y="2431295"/>
+                <a:ext cx="1844844" cy="393032"/>
+              </a:xfrm>
+              <a:prstGeom prst="rect">
+                <a:avLst/>
+              </a:prstGeom>
+              <a:noFill/>
+              <a:ln>
+                <a:solidFill>
+                  <a:schemeClr val="accent6">
+                    <a:lumMod val="60000"/>
+                    <a:lumOff val="40000"/>
                   </a:schemeClr>
                 </a:solidFill>
-                <a:latin typeface="Open Sans" panose="020B0606030504020204" pitchFamily="34" charset="0"/>
-                <a:ea typeface="Open Sans" panose="020B0606030504020204" pitchFamily="34" charset="0"/>
-                <a:cs typeface="Open Sans" panose="020B0606030504020204" pitchFamily="34" charset="0"/>
-              </a:rPr>
-              <a:t>action / process</a:t>
-            </a:r>
-          </a:p>
-        </p:txBody>
-      </p:sp>
-      <p:sp>
-        <p:nvSpPr>
-          <p:cNvPr id="39" name="Flowchart: Data 38">
-            <a:extLst>
-              <a:ext uri="{FF2B5EF4-FFF2-40B4-BE49-F238E27FC236}">
-                <a16:creationId xmlns:a16="http://schemas.microsoft.com/office/drawing/2014/main" id="{84DF5FB3-6B18-6E52-CED0-52B59C223732}"/>
-              </a:ext>
-            </a:extLst>
-          </p:cNvPr>
-          <p:cNvSpPr/>
-          <p:nvPr/>
-        </p:nvSpPr>
-        <p:spPr>
-          <a:xfrm>
-            <a:off x="821623" y="2125701"/>
-            <a:ext cx="1844844" cy="489284"/>
-          </a:xfrm>
-          <a:prstGeom prst="flowChartInputOutput">
-            <a:avLst/>
-          </a:prstGeom>
-          <a:noFill/>
-          <a:ln>
-            <a:solidFill>
-              <a:schemeClr val="accent1">
-                <a:lumMod val="60000"/>
-                <a:lumOff val="40000"/>
-              </a:schemeClr>
-            </a:solidFill>
-          </a:ln>
-        </p:spPr>
-        <p:style>
-          <a:lnRef idx="2">
-            <a:schemeClr val="accent1">
-              <a:shade val="50000"/>
-            </a:schemeClr>
-          </a:lnRef>
-          <a:fillRef idx="1">
-            <a:schemeClr val="accent1"/>
-          </a:fillRef>
-          <a:effectRef idx="0">
-            <a:schemeClr val="accent1"/>
-          </a:effectRef>
-          <a:fontRef idx="minor">
-            <a:schemeClr val="lt1"/>
-          </a:fontRef>
-        </p:style>
-        <p:txBody>
-          <a:bodyPr rtlCol="0" anchor="ctr"/>
-          <a:lstStyle/>
-          <a:p>
-            <a:pPr algn="ctr"/>
-            <a:r>
-              <a:rPr lang="en-US" sz="1200" dirty="0">
-                <a:solidFill>
-                  <a:schemeClr val="bg1">
-                    <a:lumMod val="85000"/>
-                  </a:schemeClr>
-                </a:solidFill>
-                <a:latin typeface="Open Sans" panose="020B0606030504020204" pitchFamily="34" charset="0"/>
-                <a:ea typeface="Open Sans" panose="020B0606030504020204" pitchFamily="34" charset="0"/>
-                <a:cs typeface="Open Sans" panose="020B0606030504020204" pitchFamily="34" charset="0"/>
-              </a:rPr>
-              <a:t>input</a:t>
-            </a:r>
-          </a:p>
-        </p:txBody>
-      </p:sp>
-      <p:sp>
-        <p:nvSpPr>
-          <p:cNvPr id="46" name="Flowchart: Decision 45">
-            <a:extLst>
-              <a:ext uri="{FF2B5EF4-FFF2-40B4-BE49-F238E27FC236}">
-                <a16:creationId xmlns:a16="http://schemas.microsoft.com/office/drawing/2014/main" id="{265FEB22-D05F-9423-661B-B86264CDC339}"/>
-              </a:ext>
-            </a:extLst>
-          </p:cNvPr>
-          <p:cNvSpPr/>
-          <p:nvPr/>
-        </p:nvSpPr>
-        <p:spPr>
-          <a:xfrm>
-            <a:off x="821623" y="4052904"/>
-            <a:ext cx="1844844" cy="946484"/>
-          </a:xfrm>
-          <a:prstGeom prst="flowChartDecision">
-            <a:avLst/>
-          </a:prstGeom>
-          <a:noFill/>
-          <a:ln>
-            <a:solidFill>
-              <a:srgbClr val="FF7C80"/>
-            </a:solidFill>
-          </a:ln>
-        </p:spPr>
-        <p:style>
-          <a:lnRef idx="2">
-            <a:schemeClr val="accent1">
-              <a:shade val="50000"/>
-            </a:schemeClr>
-          </a:lnRef>
-          <a:fillRef idx="1">
-            <a:schemeClr val="accent1"/>
-          </a:fillRef>
-          <a:effectRef idx="0">
-            <a:schemeClr val="accent1"/>
-          </a:effectRef>
-          <a:fontRef idx="minor">
-            <a:schemeClr val="lt1"/>
-          </a:fontRef>
-        </p:style>
-        <p:txBody>
-          <a:bodyPr rtlCol="0" anchor="ctr"/>
-          <a:lstStyle/>
-          <a:p>
-            <a:pPr algn="ctr"/>
-            <a:r>
-              <a:rPr lang="en-US" sz="1200" dirty="0">
-                <a:solidFill>
-                  <a:schemeClr val="bg1">
-                    <a:lumMod val="85000"/>
-                  </a:schemeClr>
-                </a:solidFill>
-                <a:latin typeface="Open Sans" panose="020B0606030504020204" pitchFamily="34" charset="0"/>
-                <a:ea typeface="Open Sans" panose="020B0606030504020204" pitchFamily="34" charset="0"/>
-                <a:cs typeface="Open Sans" panose="020B0606030504020204" pitchFamily="34" charset="0"/>
-              </a:rPr>
-              <a:t>decision</a:t>
-            </a:r>
-          </a:p>
-        </p:txBody>
-      </p:sp>
-      <p:sp>
-        <p:nvSpPr>
-          <p:cNvPr id="47" name="Flowchart: Data 46">
-            <a:extLst>
-              <a:ext uri="{FF2B5EF4-FFF2-40B4-BE49-F238E27FC236}">
-                <a16:creationId xmlns:a16="http://schemas.microsoft.com/office/drawing/2014/main" id="{E79F7B5C-9F7D-5907-4BED-1DDC3947E632}"/>
-              </a:ext>
-            </a:extLst>
-          </p:cNvPr>
-          <p:cNvSpPr/>
-          <p:nvPr/>
-        </p:nvSpPr>
-        <p:spPr>
-          <a:xfrm>
-            <a:off x="821623" y="5526936"/>
-            <a:ext cx="1844844" cy="489284"/>
-          </a:xfrm>
-          <a:prstGeom prst="flowChartInputOutput">
-            <a:avLst/>
-          </a:prstGeom>
-          <a:noFill/>
-          <a:ln>
-            <a:solidFill>
-              <a:srgbClr val="CC99FF"/>
-            </a:solidFill>
-          </a:ln>
-        </p:spPr>
-        <p:style>
-          <a:lnRef idx="2">
-            <a:schemeClr val="accent1">
-              <a:shade val="50000"/>
-            </a:schemeClr>
-          </a:lnRef>
-          <a:fillRef idx="1">
-            <a:schemeClr val="accent1"/>
-          </a:fillRef>
-          <a:effectRef idx="0">
-            <a:schemeClr val="accent1"/>
-          </a:effectRef>
-          <a:fontRef idx="minor">
-            <a:schemeClr val="lt1"/>
-          </a:fontRef>
-        </p:style>
-        <p:txBody>
-          <a:bodyPr rtlCol="0" anchor="ctr"/>
-          <a:lstStyle/>
-          <a:p>
-            <a:pPr algn="ctr"/>
-            <a:r>
-              <a:rPr lang="en-US" sz="1200" dirty="0">
-                <a:solidFill>
-                  <a:schemeClr val="bg1">
-                    <a:lumMod val="85000"/>
-                  </a:schemeClr>
-                </a:solidFill>
-                <a:latin typeface="Open Sans" panose="020B0606030504020204" pitchFamily="34" charset="0"/>
-                <a:ea typeface="Open Sans" panose="020B0606030504020204" pitchFamily="34" charset="0"/>
-                <a:cs typeface="Open Sans" panose="020B0606030504020204" pitchFamily="34" charset="0"/>
-              </a:rPr>
-              <a:t>output</a:t>
-            </a:r>
-          </a:p>
-        </p:txBody>
-      </p:sp>
-      <p:sp>
-        <p:nvSpPr>
-          <p:cNvPr id="49" name="TextBox 48">
-            <a:extLst>
-              <a:ext uri="{FF2B5EF4-FFF2-40B4-BE49-F238E27FC236}">
-                <a16:creationId xmlns:a16="http://schemas.microsoft.com/office/drawing/2014/main" id="{9782D64F-E1B4-7BBA-97F1-672AA7BB38F2}"/>
-              </a:ext>
-            </a:extLst>
-          </p:cNvPr>
-          <p:cNvSpPr txBox="1"/>
-          <p:nvPr/>
-        </p:nvSpPr>
-        <p:spPr>
-          <a:xfrm>
-            <a:off x="2396841" y="4042695"/>
-            <a:ext cx="269626" cy="276999"/>
-          </a:xfrm>
-          <a:prstGeom prst="rect">
-            <a:avLst/>
-          </a:prstGeom>
-          <a:noFill/>
-        </p:spPr>
-        <p:txBody>
-          <a:bodyPr wrap="none" rtlCol="0">
-            <a:spAutoFit/>
-          </a:bodyPr>
-          <a:lstStyle/>
-          <a:p>
-            <a:r>
-              <a:rPr lang="en-US" sz="1200" dirty="0">
+              </a:ln>
+            </p:spPr>
+            <p:style>
+              <a:lnRef idx="2">
+                <a:schemeClr val="accent1">
+                  <a:shade val="50000"/>
+                </a:schemeClr>
+              </a:lnRef>
+              <a:fillRef idx="1">
+                <a:schemeClr val="accent1"/>
+              </a:fillRef>
+              <a:effectRef idx="0">
+                <a:schemeClr val="accent1"/>
+              </a:effectRef>
+              <a:fontRef idx="minor">
+                <a:schemeClr val="lt1"/>
+              </a:fontRef>
+            </p:style>
+            <p:txBody>
+              <a:bodyPr rtlCol="0" anchor="ctr"/>
+              <a:lstStyle/>
+              <a:p>
+                <a:pPr algn="ctr"/>
+                <a:r>
+                  <a:rPr lang="en-US" sz="1200" dirty="0">
+                    <a:solidFill>
+                      <a:schemeClr val="bg1">
+                        <a:lumMod val="85000"/>
+                      </a:schemeClr>
+                    </a:solidFill>
+                    <a:latin typeface="Open Sans" panose="020B0606030504020204" pitchFamily="34" charset="0"/>
+                    <a:ea typeface="Open Sans" panose="020B0606030504020204" pitchFamily="34" charset="0"/>
+                    <a:cs typeface="Open Sans" panose="020B0606030504020204" pitchFamily="34" charset="0"/>
+                  </a:rPr>
+                  <a:t>sum = 0, n = 50</a:t>
+                </a:r>
+              </a:p>
+            </p:txBody>
+          </p:sp>
+          <p:sp>
+            <p:nvSpPr>
+              <p:cNvPr id="20" name="Flowchart: Decision 19">
+                <a:extLst>
+                  <a:ext uri="{FF2B5EF4-FFF2-40B4-BE49-F238E27FC236}">
+                    <a16:creationId xmlns:a16="http://schemas.microsoft.com/office/drawing/2014/main" id="{0BED0A29-55B9-923E-92BE-86339F445517}"/>
+                  </a:ext>
+                </a:extLst>
+              </p:cNvPr>
+              <p:cNvSpPr/>
+              <p:nvPr/>
+            </p:nvSpPr>
+            <p:spPr>
+              <a:xfrm>
+                <a:off x="5171258" y="3174037"/>
+                <a:ext cx="1844844" cy="946484"/>
+              </a:xfrm>
+              <a:prstGeom prst="flowChartDecision">
+                <a:avLst/>
+              </a:prstGeom>
+              <a:noFill/>
+              <a:ln>
                 <a:solidFill>
                   <a:srgbClr val="FF7C80"/>
                 </a:solidFill>
-                <a:latin typeface="Open Sans" panose="020B0606030504020204" pitchFamily="34" charset="0"/>
-                <a:ea typeface="Open Sans" panose="020B0606030504020204" pitchFamily="34" charset="0"/>
-                <a:cs typeface="Open Sans" panose="020B0606030504020204" pitchFamily="34" charset="0"/>
-              </a:rPr>
-              <a:t>T</a:t>
-            </a:r>
-          </a:p>
-        </p:txBody>
-      </p:sp>
-      <p:sp>
-        <p:nvSpPr>
-          <p:cNvPr id="53" name="TextBox 52">
-            <a:extLst>
-              <a:ext uri="{FF2B5EF4-FFF2-40B4-BE49-F238E27FC236}">
-                <a16:creationId xmlns:a16="http://schemas.microsoft.com/office/drawing/2014/main" id="{7E6B2905-22B9-9F02-399A-510F7F8499F3}"/>
-              </a:ext>
-            </a:extLst>
-          </p:cNvPr>
-          <p:cNvSpPr txBox="1"/>
-          <p:nvPr/>
-        </p:nvSpPr>
-        <p:spPr>
-          <a:xfrm>
-            <a:off x="821623" y="4042694"/>
-            <a:ext cx="269626" cy="276999"/>
-          </a:xfrm>
-          <a:prstGeom prst="rect">
-            <a:avLst/>
-          </a:prstGeom>
-          <a:noFill/>
-        </p:spPr>
-        <p:txBody>
-          <a:bodyPr wrap="none" rtlCol="0">
-            <a:spAutoFit/>
-          </a:bodyPr>
-          <a:lstStyle/>
-          <a:p>
-            <a:r>
-              <a:rPr lang="en-US" sz="1200" dirty="0">
+              </a:ln>
+            </p:spPr>
+            <p:style>
+              <a:lnRef idx="2">
+                <a:schemeClr val="accent1">
+                  <a:shade val="50000"/>
+                </a:schemeClr>
+              </a:lnRef>
+              <a:fillRef idx="1">
+                <a:schemeClr val="accent1"/>
+              </a:fillRef>
+              <a:effectRef idx="0">
+                <a:schemeClr val="accent1"/>
+              </a:effectRef>
+              <a:fontRef idx="minor">
+                <a:schemeClr val="lt1"/>
+              </a:fontRef>
+            </p:style>
+            <p:txBody>
+              <a:bodyPr rtlCol="0" anchor="ctr"/>
+              <a:lstStyle/>
+              <a:p>
+                <a:pPr algn="ctr"/>
+                <a:r>
+                  <a:rPr lang="en-US" sz="1200" dirty="0">
+                    <a:solidFill>
+                      <a:schemeClr val="bg1">
+                        <a:lumMod val="85000"/>
+                      </a:schemeClr>
+                    </a:solidFill>
+                    <a:latin typeface="Open Sans" panose="020B0606030504020204" pitchFamily="34" charset="0"/>
+                    <a:ea typeface="Open Sans" panose="020B0606030504020204" pitchFamily="34" charset="0"/>
+                    <a:cs typeface="Open Sans" panose="020B0606030504020204" pitchFamily="34" charset="0"/>
+                  </a:rPr>
+                  <a:t>n &lt; = 500</a:t>
+                </a:r>
+              </a:p>
+            </p:txBody>
+          </p:sp>
+          <p:sp>
+            <p:nvSpPr>
+              <p:cNvPr id="21" name="Rectangle 20">
+                <a:extLst>
+                  <a:ext uri="{FF2B5EF4-FFF2-40B4-BE49-F238E27FC236}">
+                    <a16:creationId xmlns:a16="http://schemas.microsoft.com/office/drawing/2014/main" id="{9136B688-46E4-A03B-627F-331358DA481C}"/>
+                  </a:ext>
+                </a:extLst>
+              </p:cNvPr>
+              <p:cNvSpPr/>
+              <p:nvPr/>
+            </p:nvSpPr>
+            <p:spPr>
+              <a:xfrm>
+                <a:off x="7390018" y="4422105"/>
+                <a:ext cx="1844844" cy="393032"/>
+              </a:xfrm>
+              <a:prstGeom prst="rect">
+                <a:avLst/>
+              </a:prstGeom>
+              <a:noFill/>
+              <a:ln>
+                <a:solidFill>
+                  <a:schemeClr val="accent6">
+                    <a:lumMod val="60000"/>
+                    <a:lumOff val="40000"/>
+                  </a:schemeClr>
+                </a:solidFill>
+              </a:ln>
+            </p:spPr>
+            <p:style>
+              <a:lnRef idx="2">
+                <a:schemeClr val="accent1">
+                  <a:shade val="50000"/>
+                </a:schemeClr>
+              </a:lnRef>
+              <a:fillRef idx="1">
+                <a:schemeClr val="accent1"/>
+              </a:fillRef>
+              <a:effectRef idx="0">
+                <a:schemeClr val="accent1"/>
+              </a:effectRef>
+              <a:fontRef idx="minor">
+                <a:schemeClr val="lt1"/>
+              </a:fontRef>
+            </p:style>
+            <p:txBody>
+              <a:bodyPr rtlCol="0" anchor="ctr"/>
+              <a:lstStyle/>
+              <a:p>
+                <a:pPr algn="ctr"/>
+                <a:r>
+                  <a:rPr lang="en-US" sz="1200" dirty="0">
+                    <a:solidFill>
+                      <a:schemeClr val="bg1">
+                        <a:lumMod val="85000"/>
+                      </a:schemeClr>
+                    </a:solidFill>
+                    <a:latin typeface="Open Sans" panose="020B0606030504020204" pitchFamily="34" charset="0"/>
+                    <a:ea typeface="Open Sans" panose="020B0606030504020204" pitchFamily="34" charset="0"/>
+                    <a:cs typeface="Open Sans" panose="020B0606030504020204" pitchFamily="34" charset="0"/>
+                  </a:rPr>
+                  <a:t>sum = sum + n</a:t>
+                </a:r>
+              </a:p>
+            </p:txBody>
+          </p:sp>
+          <p:sp>
+            <p:nvSpPr>
+              <p:cNvPr id="24" name="Rectangle 23">
+                <a:extLst>
+                  <a:ext uri="{FF2B5EF4-FFF2-40B4-BE49-F238E27FC236}">
+                    <a16:creationId xmlns:a16="http://schemas.microsoft.com/office/drawing/2014/main" id="{CC505E46-8CF8-817E-3DD4-67DD0AA83830}"/>
+                  </a:ext>
+                </a:extLst>
+              </p:cNvPr>
+              <p:cNvSpPr/>
+              <p:nvPr/>
+            </p:nvSpPr>
+            <p:spPr>
+              <a:xfrm>
+                <a:off x="5171258" y="4422105"/>
+                <a:ext cx="1844844" cy="393032"/>
+              </a:xfrm>
+              <a:prstGeom prst="rect">
+                <a:avLst/>
+              </a:prstGeom>
+              <a:noFill/>
+              <a:ln>
+                <a:solidFill>
+                  <a:schemeClr val="accent6">
+                    <a:lumMod val="60000"/>
+                    <a:lumOff val="40000"/>
+                  </a:schemeClr>
+                </a:solidFill>
+              </a:ln>
+            </p:spPr>
+            <p:style>
+              <a:lnRef idx="2">
+                <a:schemeClr val="accent1">
+                  <a:shade val="50000"/>
+                </a:schemeClr>
+              </a:lnRef>
+              <a:fillRef idx="1">
+                <a:schemeClr val="accent1"/>
+              </a:fillRef>
+              <a:effectRef idx="0">
+                <a:schemeClr val="accent1"/>
+              </a:effectRef>
+              <a:fontRef idx="minor">
+                <a:schemeClr val="lt1"/>
+              </a:fontRef>
+            </p:style>
+            <p:txBody>
+              <a:bodyPr rtlCol="0" anchor="ctr"/>
+              <a:lstStyle/>
+              <a:p>
+                <a:pPr algn="ctr"/>
+                <a:r>
+                  <a:rPr lang="en-US" sz="1200" dirty="0">
+                    <a:solidFill>
+                      <a:schemeClr val="bg1">
+                        <a:lumMod val="85000"/>
+                      </a:schemeClr>
+                    </a:solidFill>
+                    <a:latin typeface="Open Sans" panose="020B0606030504020204" pitchFamily="34" charset="0"/>
+                    <a:ea typeface="Open Sans" panose="020B0606030504020204" pitchFamily="34" charset="0"/>
+                    <a:cs typeface="Open Sans" panose="020B0606030504020204" pitchFamily="34" charset="0"/>
+                  </a:rPr>
+                  <a:t>n = n + 2</a:t>
+                </a:r>
+              </a:p>
+            </p:txBody>
+          </p:sp>
+          <p:cxnSp>
+            <p:nvCxnSpPr>
+              <p:cNvPr id="6" name="Straight Arrow Connector 5">
+                <a:extLst>
+                  <a:ext uri="{FF2B5EF4-FFF2-40B4-BE49-F238E27FC236}">
+                    <a16:creationId xmlns:a16="http://schemas.microsoft.com/office/drawing/2014/main" id="{C939D8A1-9A3E-39E2-9984-C70C2D86A87A}"/>
+                  </a:ext>
+                </a:extLst>
+              </p:cNvPr>
+              <p:cNvCxnSpPr>
+                <a:stCxn id="21" idx="1"/>
+                <a:endCxn id="24" idx="3"/>
+              </p:cNvCxnSpPr>
+              <p:nvPr/>
+            </p:nvCxnSpPr>
+            <p:spPr>
+              <a:xfrm flipH="1">
+                <a:off x="7016102" y="4618621"/>
+                <a:ext cx="373916" cy="0"/>
+              </a:xfrm>
+              <a:prstGeom prst="straightConnector1">
+                <a:avLst/>
+              </a:prstGeom>
+              <a:ln w="12700">
+                <a:solidFill>
+                  <a:schemeClr val="bg1">
+                    <a:lumMod val="75000"/>
+                  </a:schemeClr>
+                </a:solidFill>
+                <a:tailEnd type="triangle"/>
+              </a:ln>
+            </p:spPr>
+            <p:style>
+              <a:lnRef idx="1">
+                <a:schemeClr val="accent1"/>
+              </a:lnRef>
+              <a:fillRef idx="0">
+                <a:schemeClr val="accent1"/>
+              </a:fillRef>
+              <a:effectRef idx="0">
+                <a:schemeClr val="accent1"/>
+              </a:effectRef>
+              <a:fontRef idx="minor">
+                <a:schemeClr val="tx1"/>
+              </a:fontRef>
+            </p:style>
+          </p:cxnSp>
+          <p:cxnSp>
+            <p:nvCxnSpPr>
+              <p:cNvPr id="8" name="Straight Arrow Connector 7">
+                <a:extLst>
+                  <a:ext uri="{FF2B5EF4-FFF2-40B4-BE49-F238E27FC236}">
+                    <a16:creationId xmlns:a16="http://schemas.microsoft.com/office/drawing/2014/main" id="{C21BEB91-E7D3-2122-8FE6-7024D6B3091F}"/>
+                  </a:ext>
+                </a:extLst>
+              </p:cNvPr>
+              <p:cNvCxnSpPr>
+                <a:cxnSpLocks/>
+                <a:stCxn id="24" idx="0"/>
+                <a:endCxn id="20" idx="2"/>
+              </p:cNvCxnSpPr>
+              <p:nvPr/>
+            </p:nvCxnSpPr>
+            <p:spPr>
+              <a:xfrm flipV="1">
+                <a:off x="6093680" y="4120521"/>
+                <a:ext cx="0" cy="301584"/>
+              </a:xfrm>
+              <a:prstGeom prst="straightConnector1">
+                <a:avLst/>
+              </a:prstGeom>
+              <a:ln w="12700">
+                <a:solidFill>
+                  <a:schemeClr val="bg1">
+                    <a:lumMod val="75000"/>
+                  </a:schemeClr>
+                </a:solidFill>
+                <a:tailEnd type="triangle"/>
+              </a:ln>
+            </p:spPr>
+            <p:style>
+              <a:lnRef idx="1">
+                <a:schemeClr val="accent1"/>
+              </a:lnRef>
+              <a:fillRef idx="0">
+                <a:schemeClr val="accent1"/>
+              </a:fillRef>
+              <a:effectRef idx="0">
+                <a:schemeClr val="accent1"/>
+              </a:effectRef>
+              <a:fontRef idx="minor">
+                <a:schemeClr val="tx1"/>
+              </a:fontRef>
+            </p:style>
+          </p:cxnSp>
+          <p:cxnSp>
+            <p:nvCxnSpPr>
+              <p:cNvPr id="12" name="Connector: Elbow 11">
+                <a:extLst>
+                  <a:ext uri="{FF2B5EF4-FFF2-40B4-BE49-F238E27FC236}">
+                    <a16:creationId xmlns:a16="http://schemas.microsoft.com/office/drawing/2014/main" id="{34DCCC4A-526B-CA81-F88B-B276E1E6313C}"/>
+                  </a:ext>
+                </a:extLst>
+              </p:cNvPr>
+              <p:cNvCxnSpPr>
+                <a:stCxn id="16" idx="2"/>
+                <a:endCxn id="20" idx="1"/>
+              </p:cNvCxnSpPr>
+              <p:nvPr/>
+            </p:nvCxnSpPr>
+            <p:spPr>
+              <a:xfrm rot="16200000" flipH="1">
+                <a:off x="4113932" y="2589953"/>
+                <a:ext cx="822952" cy="1291700"/>
+              </a:xfrm>
+              <a:prstGeom prst="bentConnector2">
+                <a:avLst/>
+              </a:prstGeom>
+              <a:ln w="12700">
+                <a:solidFill>
+                  <a:schemeClr val="bg1">
+                    <a:lumMod val="75000"/>
+                  </a:schemeClr>
+                </a:solidFill>
+                <a:tailEnd type="triangle"/>
+              </a:ln>
+            </p:spPr>
+            <p:style>
+              <a:lnRef idx="1">
+                <a:schemeClr val="accent1"/>
+              </a:lnRef>
+              <a:fillRef idx="0">
+                <a:schemeClr val="accent1"/>
+              </a:fillRef>
+              <a:effectRef idx="0">
+                <a:schemeClr val="accent1"/>
+              </a:effectRef>
+              <a:fontRef idx="minor">
+                <a:schemeClr val="tx1"/>
+              </a:fontRef>
+            </p:style>
+          </p:cxnSp>
+          <p:cxnSp>
+            <p:nvCxnSpPr>
+              <p:cNvPr id="14" name="Connector: Elbow 13">
+                <a:extLst>
+                  <a:ext uri="{FF2B5EF4-FFF2-40B4-BE49-F238E27FC236}">
+                    <a16:creationId xmlns:a16="http://schemas.microsoft.com/office/drawing/2014/main" id="{03EF06A7-FB44-3B3B-F3CD-96907ED04353}"/>
+                  </a:ext>
+                </a:extLst>
+              </p:cNvPr>
+              <p:cNvCxnSpPr>
+                <a:stCxn id="20" idx="0"/>
+                <a:endCxn id="47" idx="2"/>
+              </p:cNvCxnSpPr>
+              <p:nvPr/>
+            </p:nvCxnSpPr>
+            <p:spPr>
+              <a:xfrm rot="5400000" flipH="1" flipV="1">
+                <a:off x="6560978" y="2160513"/>
+                <a:ext cx="546226" cy="1480822"/>
+              </a:xfrm>
+              <a:prstGeom prst="bentConnector2">
+                <a:avLst/>
+              </a:prstGeom>
+              <a:ln w="12700">
                 <a:solidFill>
                   <a:srgbClr val="FF7C80"/>
                 </a:solidFill>
-                <a:latin typeface="Open Sans" panose="020B0606030504020204" pitchFamily="34" charset="0"/>
-                <a:ea typeface="Open Sans" panose="020B0606030504020204" pitchFamily="34" charset="0"/>
-                <a:cs typeface="Open Sans" panose="020B0606030504020204" pitchFamily="34" charset="0"/>
-              </a:rPr>
-              <a:t>F</a:t>
-            </a:r>
-          </a:p>
-        </p:txBody>
-      </p:sp>
+                <a:tailEnd type="triangle"/>
+              </a:ln>
+            </p:spPr>
+            <p:style>
+              <a:lnRef idx="1">
+                <a:schemeClr val="accent1"/>
+              </a:lnRef>
+              <a:fillRef idx="0">
+                <a:schemeClr val="accent1"/>
+              </a:fillRef>
+              <a:effectRef idx="0">
+                <a:schemeClr val="accent1"/>
+              </a:effectRef>
+              <a:fontRef idx="minor">
+                <a:schemeClr val="tx1"/>
+              </a:fontRef>
+            </p:style>
+          </p:cxnSp>
+          <p:cxnSp>
+            <p:nvCxnSpPr>
+              <p:cNvPr id="17" name="Connector: Elbow 16">
+                <a:extLst>
+                  <a:ext uri="{FF2B5EF4-FFF2-40B4-BE49-F238E27FC236}">
+                    <a16:creationId xmlns:a16="http://schemas.microsoft.com/office/drawing/2014/main" id="{A118672A-A1B8-85AD-37B4-344F0FB1CC13}"/>
+                  </a:ext>
+                </a:extLst>
+              </p:cNvPr>
+              <p:cNvCxnSpPr>
+                <a:stCxn id="20" idx="3"/>
+                <a:endCxn id="21" idx="0"/>
+              </p:cNvCxnSpPr>
+              <p:nvPr/>
+            </p:nvCxnSpPr>
+            <p:spPr>
+              <a:xfrm>
+                <a:off x="7016102" y="3647279"/>
+                <a:ext cx="1296338" cy="774826"/>
+              </a:xfrm>
+              <a:prstGeom prst="bentConnector2">
+                <a:avLst/>
+              </a:prstGeom>
+              <a:ln w="12700">
+                <a:solidFill>
+                  <a:srgbClr val="FF7C80"/>
+                </a:solidFill>
+                <a:tailEnd type="triangle"/>
+              </a:ln>
+            </p:spPr>
+            <p:style>
+              <a:lnRef idx="1">
+                <a:schemeClr val="accent1"/>
+              </a:lnRef>
+              <a:fillRef idx="0">
+                <a:schemeClr val="accent1"/>
+              </a:fillRef>
+              <a:effectRef idx="0">
+                <a:schemeClr val="accent1"/>
+              </a:effectRef>
+              <a:fontRef idx="minor">
+                <a:schemeClr val="tx1"/>
+              </a:fontRef>
+            </p:style>
+          </p:cxnSp>
+        </p:grpSp>
+      </p:grpSp>
     </p:spTree>
     <p:extLst>
       <p:ext uri="{BB962C8B-B14F-4D97-AF65-F5344CB8AC3E}">

</xml_diff>

<commit_message>
Added Flowchart for Q2 of PrePSPM2122_KMPP.md
</commit_message>
<xml_diff>
--- a/Past Year Theory Questions/Resources/resources.pptx
+++ b/Past Year Theory Questions/Resources/resources.pptx
@@ -23,7 +23,8 @@
     <p:sldId id="272" r:id="rId17"/>
     <p:sldId id="273" r:id="rId18"/>
     <p:sldId id="274" r:id="rId19"/>
-    <p:sldId id="275" r:id="rId20"/>
+    <p:sldId id="277" r:id="rId20"/>
+    <p:sldId id="276" r:id="rId21"/>
   </p:sldIdLst>
   <p:sldSz cx="12192000" cy="6858000"/>
   <p:notesSz cx="6858000" cy="9144000"/>
@@ -17282,123 +17283,79 @@
           <a:chExt cx="0" cy="0"/>
         </a:xfrm>
       </p:grpSpPr>
-      <p:sp>
-        <p:nvSpPr>
-          <p:cNvPr id="108" name="Rectangle 107">
+      <p:grpSp>
+        <p:nvGrpSpPr>
+          <p:cNvPr id="48" name="Group 47">
             <a:extLst>
               <a:ext uri="{FF2B5EF4-FFF2-40B4-BE49-F238E27FC236}">
-                <a16:creationId xmlns:a16="http://schemas.microsoft.com/office/drawing/2014/main" id="{F5A5FD62-A99C-04B6-706B-DEE9B81AF541}"/>
+                <a16:creationId xmlns:a16="http://schemas.microsoft.com/office/drawing/2014/main" id="{5A6EE309-70F2-AF6B-68E1-68C5A1D97F6E}"/>
               </a:ext>
             </a:extLst>
           </p:cNvPr>
-          <p:cNvSpPr/>
+          <p:cNvGrpSpPr/>
           <p:nvPr/>
-        </p:nvSpPr>
-        <p:spPr>
+        </p:nvGrpSpPr>
+        <p:grpSpPr>
           <a:xfrm>
-            <a:off x="3645392" y="1315453"/>
-            <a:ext cx="7327942" cy="4227094"/>
+            <a:off x="1331227" y="1363579"/>
+            <a:ext cx="9529545" cy="4130842"/>
+            <a:chOff x="1331227" y="1363579"/>
+            <a:chExt cx="9529545" cy="4130842"/>
           </a:xfrm>
-          <a:prstGeom prst="rect">
-            <a:avLst/>
-          </a:prstGeom>
-          <a:solidFill>
-            <a:srgbClr val="0F1017"/>
-          </a:solidFill>
-          <a:ln w="12700">
+        </p:grpSpPr>
+        <p:sp>
+          <p:nvSpPr>
+            <p:cNvPr id="108" name="Rectangle 107">
+              <a:extLst>
+                <a:ext uri="{FF2B5EF4-FFF2-40B4-BE49-F238E27FC236}">
+                  <a16:creationId xmlns:a16="http://schemas.microsoft.com/office/drawing/2014/main" id="{F5A5FD62-A99C-04B6-706B-DEE9B81AF541}"/>
+                </a:ext>
+              </a:extLst>
+            </p:cNvPr>
+            <p:cNvSpPr/>
+            <p:nvPr/>
+          </p:nvSpPr>
+          <p:spPr>
+            <a:xfrm>
+              <a:off x="1331227" y="1363579"/>
+              <a:ext cx="9529545" cy="4130842"/>
+            </a:xfrm>
+            <a:prstGeom prst="rect">
+              <a:avLst/>
+            </a:prstGeom>
             <a:solidFill>
-              <a:schemeClr val="bg1">
-                <a:lumMod val="75000"/>
-              </a:schemeClr>
+              <a:srgbClr val="0F1017"/>
             </a:solidFill>
-          </a:ln>
-        </p:spPr>
-        <p:style>
-          <a:lnRef idx="2">
-            <a:schemeClr val="accent1">
-              <a:shade val="50000"/>
-            </a:schemeClr>
-          </a:lnRef>
-          <a:fillRef idx="1">
-            <a:schemeClr val="accent1"/>
-          </a:fillRef>
-          <a:effectRef idx="0">
-            <a:schemeClr val="accent1"/>
-          </a:effectRef>
-          <a:fontRef idx="minor">
-            <a:schemeClr val="lt1"/>
-          </a:fontRef>
-        </p:style>
-        <p:txBody>
-          <a:bodyPr rtlCol="0" anchor="ctr"/>
-          <a:lstStyle/>
-          <a:p>
-            <a:pPr algn="ctr"/>
-            <a:endParaRPr lang="en-US" sz="1800" dirty="0">
+            <a:ln w="12700">
               <a:solidFill>
                 <a:schemeClr val="bg1">
-                  <a:lumMod val="85000"/>
+                  <a:lumMod val="75000"/>
                 </a:schemeClr>
               </a:solidFill>
-              <a:latin typeface="Open Sans" panose="020B0606030504020204" pitchFamily="34" charset="0"/>
-              <a:ea typeface="Open Sans" panose="020B0606030504020204" pitchFamily="34" charset="0"/>
-              <a:cs typeface="Open Sans" panose="020B0606030504020204" pitchFamily="34" charset="0"/>
-            </a:endParaRPr>
-          </a:p>
-        </p:txBody>
-      </p:sp>
-      <p:sp>
-        <p:nvSpPr>
-          <p:cNvPr id="59" name="Flowchart: Terminator 58">
-            <a:extLst>
-              <a:ext uri="{FF2B5EF4-FFF2-40B4-BE49-F238E27FC236}">
-                <a16:creationId xmlns:a16="http://schemas.microsoft.com/office/drawing/2014/main" id="{D7554AAC-5F81-46CA-BA4E-6CDF6B8CC5AD}"/>
-              </a:ext>
-            </a:extLst>
-          </p:cNvPr>
-          <p:cNvSpPr/>
-          <p:nvPr/>
-        </p:nvSpPr>
-        <p:spPr>
-          <a:xfrm>
-            <a:off x="4572180" y="1739895"/>
-            <a:ext cx="1050758" cy="341690"/>
-          </a:xfrm>
-          <a:prstGeom prst="flowChartTerminator">
-            <a:avLst/>
-          </a:prstGeom>
-          <a:noFill/>
-          <a:ln>
-            <a:solidFill>
-              <a:schemeClr val="bg1">
-                <a:lumMod val="75000"/>
+            </a:ln>
+          </p:spPr>
+          <p:style>
+            <a:lnRef idx="2">
+              <a:schemeClr val="accent1">
+                <a:shade val="50000"/>
               </a:schemeClr>
-            </a:solidFill>
-          </a:ln>
-        </p:spPr>
-        <p:style>
-          <a:lnRef idx="2">
-            <a:schemeClr val="accent1">
-              <a:shade val="50000"/>
-            </a:schemeClr>
-          </a:lnRef>
-          <a:fillRef idx="1">
-            <a:schemeClr val="accent1"/>
-          </a:fillRef>
-          <a:effectRef idx="0">
-            <a:schemeClr val="accent1"/>
-          </a:effectRef>
-          <a:fontRef idx="minor">
-            <a:schemeClr val="lt1"/>
-          </a:fontRef>
-        </p:style>
-        <p:txBody>
-          <a:bodyPr rtlCol="0" anchor="ctr"/>
-          <a:lstStyle/>
-          <a:p>
-            <a:pPr algn="ctr"/>
-            <a:r>
-              <a:rPr lang="en-US" sz="1200" dirty="0">
+            </a:lnRef>
+            <a:fillRef idx="1">
+              <a:schemeClr val="accent1"/>
+            </a:fillRef>
+            <a:effectRef idx="0">
+              <a:schemeClr val="accent1"/>
+            </a:effectRef>
+            <a:fontRef idx="minor">
+              <a:schemeClr val="lt1"/>
+            </a:fontRef>
+          </p:style>
+          <p:txBody>
+            <a:bodyPr rtlCol="0" anchor="ctr"/>
+            <a:lstStyle/>
+            <a:p>
+              <a:pPr algn="ctr"/>
+              <a:endParaRPr lang="en-US" sz="1800" dirty="0">
                 <a:solidFill>
                   <a:schemeClr val="bg1">
                     <a:lumMod val="85000"/>
@@ -17407,652 +17364,1448 @@
                 <a:latin typeface="Open Sans" panose="020B0606030504020204" pitchFamily="34" charset="0"/>
                 <a:ea typeface="Open Sans" panose="020B0606030504020204" pitchFamily="34" charset="0"/>
                 <a:cs typeface="Open Sans" panose="020B0606030504020204" pitchFamily="34" charset="0"/>
-              </a:rPr>
-              <a:t>Start</a:t>
-            </a:r>
-          </a:p>
-        </p:txBody>
-      </p:sp>
-      <p:sp>
-        <p:nvSpPr>
-          <p:cNvPr id="60" name="Flowchart: Terminator 59">
-            <a:extLst>
-              <a:ext uri="{FF2B5EF4-FFF2-40B4-BE49-F238E27FC236}">
-                <a16:creationId xmlns:a16="http://schemas.microsoft.com/office/drawing/2014/main" id="{103191FC-37A5-724C-C214-882B4B9F6C89}"/>
-              </a:ext>
-            </a:extLst>
-          </p:cNvPr>
-          <p:cNvSpPr/>
-          <p:nvPr/>
-        </p:nvSpPr>
-        <p:spPr>
-          <a:xfrm>
-            <a:off x="9000424" y="1739895"/>
-            <a:ext cx="1050758" cy="341690"/>
-          </a:xfrm>
-          <a:prstGeom prst="flowChartTerminator">
-            <a:avLst/>
-          </a:prstGeom>
-          <a:noFill/>
-          <a:ln>
-            <a:solidFill>
-              <a:schemeClr val="bg1">
-                <a:lumMod val="75000"/>
-              </a:schemeClr>
-            </a:solidFill>
-          </a:ln>
-        </p:spPr>
-        <p:style>
-          <a:lnRef idx="2">
-            <a:schemeClr val="accent1">
-              <a:shade val="50000"/>
-            </a:schemeClr>
-          </a:lnRef>
-          <a:fillRef idx="1">
-            <a:schemeClr val="accent1"/>
-          </a:fillRef>
-          <a:effectRef idx="0">
-            <a:schemeClr val="accent1"/>
-          </a:effectRef>
-          <a:fontRef idx="minor">
-            <a:schemeClr val="lt1"/>
-          </a:fontRef>
-        </p:style>
-        <p:txBody>
-          <a:bodyPr rtlCol="0" anchor="ctr"/>
-          <a:lstStyle/>
-          <a:p>
-            <a:pPr algn="ctr"/>
-            <a:r>
-              <a:rPr lang="en-US" sz="1200" dirty="0">
+              </a:endParaRPr>
+            </a:p>
+          </p:txBody>
+        </p:sp>
+        <p:grpSp>
+          <p:nvGrpSpPr>
+            <p:cNvPr id="45" name="Group 44">
+              <a:extLst>
+                <a:ext uri="{FF2B5EF4-FFF2-40B4-BE49-F238E27FC236}">
+                  <a16:creationId xmlns:a16="http://schemas.microsoft.com/office/drawing/2014/main" id="{947D0D80-BB7C-738A-B4DB-5EDE3BFBAFAD}"/>
+                </a:ext>
+              </a:extLst>
+            </p:cNvPr>
+            <p:cNvGrpSpPr/>
+            <p:nvPr/>
+          </p:nvGrpSpPr>
+          <p:grpSpPr>
+            <a:xfrm>
+              <a:off x="1852327" y="1849897"/>
+              <a:ext cx="8490757" cy="3158207"/>
+              <a:chOff x="1852327" y="1436396"/>
+              <a:chExt cx="8490757" cy="3158207"/>
+            </a:xfrm>
+          </p:grpSpPr>
+          <p:sp>
+            <p:nvSpPr>
+              <p:cNvPr id="59" name="Flowchart: Terminator 58">
+                <a:extLst>
+                  <a:ext uri="{FF2B5EF4-FFF2-40B4-BE49-F238E27FC236}">
+                    <a16:creationId xmlns:a16="http://schemas.microsoft.com/office/drawing/2014/main" id="{D7554AAC-5F81-46CA-BA4E-6CDF6B8CC5AD}"/>
+                  </a:ext>
+                </a:extLst>
+              </p:cNvPr>
+              <p:cNvSpPr/>
+              <p:nvPr/>
+            </p:nvSpPr>
+            <p:spPr>
+              <a:xfrm>
+                <a:off x="2245957" y="1436396"/>
+                <a:ext cx="1050758" cy="341690"/>
+              </a:xfrm>
+              <a:prstGeom prst="flowChartTerminator">
+                <a:avLst/>
+              </a:prstGeom>
+              <a:noFill/>
+              <a:ln>
                 <a:solidFill>
                   <a:schemeClr val="bg1">
-                    <a:lumMod val="85000"/>
+                    <a:lumMod val="75000"/>
                   </a:schemeClr>
                 </a:solidFill>
-                <a:latin typeface="Open Sans" panose="020B0606030504020204" pitchFamily="34" charset="0"/>
-                <a:ea typeface="Open Sans" panose="020B0606030504020204" pitchFamily="34" charset="0"/>
-                <a:cs typeface="Open Sans" panose="020B0606030504020204" pitchFamily="34" charset="0"/>
-              </a:rPr>
-              <a:t>Stop</a:t>
-            </a:r>
-          </a:p>
-        </p:txBody>
-      </p:sp>
-      <p:cxnSp>
-        <p:nvCxnSpPr>
-          <p:cNvPr id="61" name="Straight Arrow Connector 60">
-            <a:extLst>
-              <a:ext uri="{FF2B5EF4-FFF2-40B4-BE49-F238E27FC236}">
-                <a16:creationId xmlns:a16="http://schemas.microsoft.com/office/drawing/2014/main" id="{A1BBCFB3-141A-F3B8-67BE-C05995E64053}"/>
-              </a:ext>
-            </a:extLst>
-          </p:cNvPr>
-          <p:cNvCxnSpPr>
-            <a:cxnSpLocks/>
-            <a:stCxn id="59" idx="2"/>
-          </p:cNvCxnSpPr>
-          <p:nvPr/>
-        </p:nvCxnSpPr>
-        <p:spPr>
-          <a:xfrm flipH="1">
-            <a:off x="5092921" y="2081585"/>
-            <a:ext cx="4638" cy="341690"/>
-          </a:xfrm>
-          <a:prstGeom prst="straightConnector1">
-            <a:avLst/>
-          </a:prstGeom>
-          <a:ln w="12700">
-            <a:solidFill>
-              <a:schemeClr val="bg1">
-                <a:lumMod val="75000"/>
-              </a:schemeClr>
-            </a:solidFill>
-            <a:tailEnd type="triangle"/>
-          </a:ln>
-        </p:spPr>
-        <p:style>
-          <a:lnRef idx="1">
-            <a:schemeClr val="accent1"/>
-          </a:lnRef>
-          <a:fillRef idx="0">
-            <a:schemeClr val="accent1"/>
-          </a:fillRef>
-          <a:effectRef idx="0">
-            <a:schemeClr val="accent1"/>
-          </a:effectRef>
-          <a:fontRef idx="minor">
-            <a:schemeClr val="tx1"/>
-          </a:fontRef>
-        </p:style>
-      </p:cxnSp>
-      <p:cxnSp>
-        <p:nvCxnSpPr>
-          <p:cNvPr id="18" name="Straight Arrow Connector 17">
-            <a:extLst>
-              <a:ext uri="{FF2B5EF4-FFF2-40B4-BE49-F238E27FC236}">
-                <a16:creationId xmlns:a16="http://schemas.microsoft.com/office/drawing/2014/main" id="{28D76C1F-C45D-8EEF-E187-E9E48161CAB0}"/>
-              </a:ext>
-            </a:extLst>
-          </p:cNvPr>
-          <p:cNvCxnSpPr>
-            <a:cxnSpLocks/>
-            <a:endCxn id="60" idx="2"/>
-          </p:cNvCxnSpPr>
-          <p:nvPr/>
-        </p:nvCxnSpPr>
-        <p:spPr>
-          <a:xfrm flipV="1">
-            <a:off x="9525803" y="2081585"/>
-            <a:ext cx="0" cy="296780"/>
-          </a:xfrm>
-          <a:prstGeom prst="straightConnector1">
-            <a:avLst/>
-          </a:prstGeom>
-          <a:ln w="12700">
-            <a:solidFill>
-              <a:srgbClr val="CC99FF"/>
-            </a:solidFill>
-            <a:tailEnd type="triangle"/>
-          </a:ln>
-        </p:spPr>
-        <p:style>
-          <a:lnRef idx="1">
-            <a:schemeClr val="accent1"/>
-          </a:lnRef>
-          <a:fillRef idx="0">
-            <a:schemeClr val="accent1"/>
-          </a:fillRef>
-          <a:effectRef idx="0">
-            <a:schemeClr val="accent1"/>
-          </a:effectRef>
-          <a:fontRef idx="minor">
-            <a:schemeClr val="tx1"/>
-          </a:fontRef>
-        </p:style>
-      </p:cxnSp>
-      <p:sp>
-        <p:nvSpPr>
-          <p:cNvPr id="29" name="Flowchart: Terminator 28">
-            <a:extLst>
-              <a:ext uri="{FF2B5EF4-FFF2-40B4-BE49-F238E27FC236}">
-                <a16:creationId xmlns:a16="http://schemas.microsoft.com/office/drawing/2014/main" id="{97EBF7DD-2035-166F-CFA5-6B352DAE8ECC}"/>
-              </a:ext>
-            </a:extLst>
-          </p:cNvPr>
-          <p:cNvSpPr/>
-          <p:nvPr/>
-        </p:nvSpPr>
-        <p:spPr>
-          <a:xfrm>
-            <a:off x="1218666" y="649032"/>
-            <a:ext cx="1050758" cy="341690"/>
-          </a:xfrm>
-          <a:prstGeom prst="flowChartTerminator">
-            <a:avLst/>
-          </a:prstGeom>
-          <a:noFill/>
-          <a:ln>
-            <a:solidFill>
-              <a:schemeClr val="bg1">
-                <a:lumMod val="75000"/>
-              </a:schemeClr>
-            </a:solidFill>
-          </a:ln>
-        </p:spPr>
-        <p:style>
-          <a:lnRef idx="2">
-            <a:schemeClr val="accent1">
-              <a:shade val="50000"/>
-            </a:schemeClr>
-          </a:lnRef>
-          <a:fillRef idx="1">
-            <a:schemeClr val="accent1"/>
-          </a:fillRef>
-          <a:effectRef idx="0">
-            <a:schemeClr val="accent1"/>
-          </a:effectRef>
-          <a:fontRef idx="minor">
-            <a:schemeClr val="lt1"/>
-          </a:fontRef>
-        </p:style>
-        <p:txBody>
-          <a:bodyPr rtlCol="0" anchor="ctr"/>
-          <a:lstStyle/>
-          <a:p>
-            <a:pPr algn="ctr"/>
-            <a:r>
-              <a:rPr lang="en-US" sz="1200" dirty="0">
+              </a:ln>
+            </p:spPr>
+            <p:style>
+              <a:lnRef idx="2">
+                <a:schemeClr val="accent1">
+                  <a:shade val="50000"/>
+                </a:schemeClr>
+              </a:lnRef>
+              <a:fillRef idx="1">
+                <a:schemeClr val="accent1"/>
+              </a:fillRef>
+              <a:effectRef idx="0">
+                <a:schemeClr val="accent1"/>
+              </a:effectRef>
+              <a:fontRef idx="minor">
+                <a:schemeClr val="lt1"/>
+              </a:fontRef>
+            </p:style>
+            <p:txBody>
+              <a:bodyPr rtlCol="0" anchor="ctr"/>
+              <a:lstStyle/>
+              <a:p>
+                <a:pPr algn="ctr"/>
+                <a:r>
+                  <a:rPr lang="en-US" sz="1200" dirty="0">
+                    <a:solidFill>
+                      <a:schemeClr val="bg1">
+                        <a:lumMod val="85000"/>
+                      </a:schemeClr>
+                    </a:solidFill>
+                    <a:latin typeface="Open Sans" panose="020B0606030504020204" pitchFamily="34" charset="0"/>
+                    <a:ea typeface="Open Sans" panose="020B0606030504020204" pitchFamily="34" charset="0"/>
+                    <a:cs typeface="Open Sans" panose="020B0606030504020204" pitchFamily="34" charset="0"/>
+                  </a:rPr>
+                  <a:t>START</a:t>
+                </a:r>
+              </a:p>
+            </p:txBody>
+          </p:sp>
+          <p:sp>
+            <p:nvSpPr>
+              <p:cNvPr id="60" name="Flowchart: Terminator 59">
+                <a:extLst>
+                  <a:ext uri="{FF2B5EF4-FFF2-40B4-BE49-F238E27FC236}">
+                    <a16:creationId xmlns:a16="http://schemas.microsoft.com/office/drawing/2014/main" id="{103191FC-37A5-724C-C214-882B4B9F6C89}"/>
+                  </a:ext>
+                </a:extLst>
+              </p:cNvPr>
+              <p:cNvSpPr/>
+              <p:nvPr/>
+            </p:nvSpPr>
+            <p:spPr>
+              <a:xfrm>
+                <a:off x="8895281" y="1436396"/>
+                <a:ext cx="1050758" cy="341690"/>
+              </a:xfrm>
+              <a:prstGeom prst="flowChartTerminator">
+                <a:avLst/>
+              </a:prstGeom>
+              <a:noFill/>
+              <a:ln>
                 <a:solidFill>
                   <a:schemeClr val="bg1">
-                    <a:lumMod val="85000"/>
+                    <a:lumMod val="75000"/>
                   </a:schemeClr>
                 </a:solidFill>
-                <a:latin typeface="Open Sans" panose="020B0606030504020204" pitchFamily="34" charset="0"/>
-                <a:ea typeface="Open Sans" panose="020B0606030504020204" pitchFamily="34" charset="0"/>
-                <a:cs typeface="Open Sans" panose="020B0606030504020204" pitchFamily="34" charset="0"/>
-              </a:rPr>
-              <a:t>Start</a:t>
-            </a:r>
-          </a:p>
-        </p:txBody>
-      </p:sp>
-      <p:sp>
-        <p:nvSpPr>
-          <p:cNvPr id="31" name="Flowchart: Terminator 30">
-            <a:extLst>
-              <a:ext uri="{FF2B5EF4-FFF2-40B4-BE49-F238E27FC236}">
-                <a16:creationId xmlns:a16="http://schemas.microsoft.com/office/drawing/2014/main" id="{B46FF1EB-056C-88CD-27DB-132AB41F0506}"/>
-              </a:ext>
-            </a:extLst>
-          </p:cNvPr>
-          <p:cNvSpPr/>
-          <p:nvPr/>
-        </p:nvSpPr>
-        <p:spPr>
-          <a:xfrm>
-            <a:off x="1218666" y="1262521"/>
-            <a:ext cx="1050758" cy="341690"/>
-          </a:xfrm>
-          <a:prstGeom prst="flowChartTerminator">
-            <a:avLst/>
-          </a:prstGeom>
-          <a:noFill/>
-          <a:ln>
-            <a:solidFill>
-              <a:schemeClr val="bg1">
-                <a:lumMod val="75000"/>
-              </a:schemeClr>
-            </a:solidFill>
-          </a:ln>
-        </p:spPr>
-        <p:style>
-          <a:lnRef idx="2">
-            <a:schemeClr val="accent1">
-              <a:shade val="50000"/>
-            </a:schemeClr>
-          </a:lnRef>
-          <a:fillRef idx="1">
-            <a:schemeClr val="accent1"/>
-          </a:fillRef>
-          <a:effectRef idx="0">
-            <a:schemeClr val="accent1"/>
-          </a:effectRef>
-          <a:fontRef idx="minor">
-            <a:schemeClr val="lt1"/>
-          </a:fontRef>
-        </p:style>
-        <p:txBody>
-          <a:bodyPr rtlCol="0" anchor="ctr"/>
-          <a:lstStyle/>
-          <a:p>
-            <a:pPr algn="ctr"/>
-            <a:r>
-              <a:rPr lang="en-US" sz="1200" dirty="0">
+              </a:ln>
+            </p:spPr>
+            <p:style>
+              <a:lnRef idx="2">
+                <a:schemeClr val="accent1">
+                  <a:shade val="50000"/>
+                </a:schemeClr>
+              </a:lnRef>
+              <a:fillRef idx="1">
+                <a:schemeClr val="accent1"/>
+              </a:fillRef>
+              <a:effectRef idx="0">
+                <a:schemeClr val="accent1"/>
+              </a:effectRef>
+              <a:fontRef idx="minor">
+                <a:schemeClr val="lt1"/>
+              </a:fontRef>
+            </p:style>
+            <p:txBody>
+              <a:bodyPr rtlCol="0" anchor="ctr"/>
+              <a:lstStyle/>
+              <a:p>
+                <a:pPr algn="ctr"/>
+                <a:r>
+                  <a:rPr lang="en-US" sz="1200" dirty="0">
+                    <a:solidFill>
+                      <a:schemeClr val="bg1">
+                        <a:lumMod val="85000"/>
+                      </a:schemeClr>
+                    </a:solidFill>
+                    <a:latin typeface="Open Sans" panose="020B0606030504020204" pitchFamily="34" charset="0"/>
+                    <a:ea typeface="Open Sans" panose="020B0606030504020204" pitchFamily="34" charset="0"/>
+                    <a:cs typeface="Open Sans" panose="020B0606030504020204" pitchFamily="34" charset="0"/>
+                  </a:rPr>
+                  <a:t>STOP</a:t>
+                </a:r>
+              </a:p>
+            </p:txBody>
+          </p:sp>
+          <p:cxnSp>
+            <p:nvCxnSpPr>
+              <p:cNvPr id="61" name="Straight Arrow Connector 60">
+                <a:extLst>
+                  <a:ext uri="{FF2B5EF4-FFF2-40B4-BE49-F238E27FC236}">
+                    <a16:creationId xmlns:a16="http://schemas.microsoft.com/office/drawing/2014/main" id="{A1BBCFB3-141A-F3B8-67BE-C05995E64053}"/>
+                  </a:ext>
+                </a:extLst>
+              </p:cNvPr>
+              <p:cNvCxnSpPr>
+                <a:cxnSpLocks/>
+                <a:stCxn id="59" idx="2"/>
+                <a:endCxn id="34" idx="0"/>
+              </p:cNvCxnSpPr>
+              <p:nvPr/>
+            </p:nvCxnSpPr>
+            <p:spPr>
+              <a:xfrm>
+                <a:off x="2771336" y="1778086"/>
+                <a:ext cx="3413" cy="1278833"/>
+              </a:xfrm>
+              <a:prstGeom prst="straightConnector1">
+                <a:avLst/>
+              </a:prstGeom>
+              <a:ln w="12700">
                 <a:solidFill>
                   <a:schemeClr val="bg1">
-                    <a:lumMod val="85000"/>
+                    <a:lumMod val="75000"/>
                   </a:schemeClr>
                 </a:solidFill>
-                <a:latin typeface="Open Sans" panose="020B0606030504020204" pitchFamily="34" charset="0"/>
-                <a:ea typeface="Open Sans" panose="020B0606030504020204" pitchFamily="34" charset="0"/>
-                <a:cs typeface="Open Sans" panose="020B0606030504020204" pitchFamily="34" charset="0"/>
-              </a:rPr>
-              <a:t>Stop</a:t>
-            </a:r>
-          </a:p>
-        </p:txBody>
-      </p:sp>
-      <p:sp>
-        <p:nvSpPr>
-          <p:cNvPr id="34" name="Rectangle 33">
-            <a:extLst>
-              <a:ext uri="{FF2B5EF4-FFF2-40B4-BE49-F238E27FC236}">
-                <a16:creationId xmlns:a16="http://schemas.microsoft.com/office/drawing/2014/main" id="{A8D64967-4F28-2958-EE17-93FB9B3EDEEA}"/>
-              </a:ext>
-            </a:extLst>
-          </p:cNvPr>
-          <p:cNvSpPr/>
-          <p:nvPr/>
-        </p:nvSpPr>
-        <p:spPr>
-          <a:xfrm>
-            <a:off x="821623" y="3132324"/>
-            <a:ext cx="1844844" cy="393032"/>
-          </a:xfrm>
-          <a:prstGeom prst="rect">
-            <a:avLst/>
-          </a:prstGeom>
-          <a:noFill/>
-          <a:ln>
-            <a:solidFill>
-              <a:schemeClr val="accent6">
-                <a:lumMod val="60000"/>
-                <a:lumOff val="40000"/>
-              </a:schemeClr>
-            </a:solidFill>
-          </a:ln>
-        </p:spPr>
-        <p:style>
-          <a:lnRef idx="2">
-            <a:schemeClr val="accent1">
-              <a:shade val="50000"/>
-            </a:schemeClr>
-          </a:lnRef>
-          <a:fillRef idx="1">
-            <a:schemeClr val="accent1"/>
-          </a:fillRef>
-          <a:effectRef idx="0">
-            <a:schemeClr val="accent1"/>
-          </a:effectRef>
-          <a:fontRef idx="minor">
-            <a:schemeClr val="lt1"/>
-          </a:fontRef>
-        </p:style>
-        <p:txBody>
-          <a:bodyPr rtlCol="0" anchor="ctr"/>
-          <a:lstStyle/>
-          <a:p>
-            <a:pPr algn="ctr"/>
-            <a:r>
-              <a:rPr lang="en-US" sz="1200" dirty="0">
+                <a:tailEnd type="triangle"/>
+              </a:ln>
+            </p:spPr>
+            <p:style>
+              <a:lnRef idx="1">
+                <a:schemeClr val="accent1"/>
+              </a:lnRef>
+              <a:fillRef idx="0">
+                <a:schemeClr val="accent1"/>
+              </a:fillRef>
+              <a:effectRef idx="0">
+                <a:schemeClr val="accent1"/>
+              </a:effectRef>
+              <a:fontRef idx="minor">
+                <a:schemeClr val="tx1"/>
+              </a:fontRef>
+            </p:style>
+          </p:cxnSp>
+          <p:cxnSp>
+            <p:nvCxnSpPr>
+              <p:cNvPr id="18" name="Straight Arrow Connector 17">
+                <a:extLst>
+                  <a:ext uri="{FF2B5EF4-FFF2-40B4-BE49-F238E27FC236}">
+                    <a16:creationId xmlns:a16="http://schemas.microsoft.com/office/drawing/2014/main" id="{28D76C1F-C45D-8EEF-E187-E9E48161CAB0}"/>
+                  </a:ext>
+                </a:extLst>
+              </p:cNvPr>
+              <p:cNvCxnSpPr>
+                <a:cxnSpLocks/>
+                <a:endCxn id="60" idx="2"/>
+              </p:cNvCxnSpPr>
+              <p:nvPr/>
+            </p:nvCxnSpPr>
+            <p:spPr>
+              <a:xfrm flipV="1">
+                <a:off x="9420660" y="1778086"/>
+                <a:ext cx="0" cy="296780"/>
+              </a:xfrm>
+              <a:prstGeom prst="straightConnector1">
+                <a:avLst/>
+              </a:prstGeom>
+              <a:ln w="12700">
                 <a:solidFill>
-                  <a:schemeClr val="bg1">
-                    <a:lumMod val="85000"/>
+                  <a:srgbClr val="CC99FF"/>
+                </a:solidFill>
+                <a:tailEnd type="triangle"/>
+              </a:ln>
+            </p:spPr>
+            <p:style>
+              <a:lnRef idx="1">
+                <a:schemeClr val="accent1"/>
+              </a:lnRef>
+              <a:fillRef idx="0">
+                <a:schemeClr val="accent1"/>
+              </a:fillRef>
+              <a:effectRef idx="0">
+                <a:schemeClr val="accent1"/>
+              </a:effectRef>
+              <a:fontRef idx="minor">
+                <a:schemeClr val="tx1"/>
+              </a:fontRef>
+            </p:style>
+          </p:cxnSp>
+          <p:sp>
+            <p:nvSpPr>
+              <p:cNvPr id="34" name="Rectangle 33">
+                <a:extLst>
+                  <a:ext uri="{FF2B5EF4-FFF2-40B4-BE49-F238E27FC236}">
+                    <a16:creationId xmlns:a16="http://schemas.microsoft.com/office/drawing/2014/main" id="{A8D64967-4F28-2958-EE17-93FB9B3EDEEA}"/>
+                  </a:ext>
+                </a:extLst>
+              </p:cNvPr>
+              <p:cNvSpPr/>
+              <p:nvPr/>
+            </p:nvSpPr>
+            <p:spPr>
+              <a:xfrm>
+                <a:off x="1852327" y="3056919"/>
+                <a:ext cx="1844844" cy="548640"/>
+              </a:xfrm>
+              <a:prstGeom prst="rect">
+                <a:avLst/>
+              </a:prstGeom>
+              <a:noFill/>
+              <a:ln>
+                <a:solidFill>
+                  <a:schemeClr val="accent6">
+                    <a:lumMod val="60000"/>
+                    <a:lumOff val="40000"/>
                   </a:schemeClr>
                 </a:solidFill>
-                <a:latin typeface="Open Sans" panose="020B0606030504020204" pitchFamily="34" charset="0"/>
-                <a:ea typeface="Open Sans" panose="020B0606030504020204" pitchFamily="34" charset="0"/>
-                <a:cs typeface="Open Sans" panose="020B0606030504020204" pitchFamily="34" charset="0"/>
-              </a:rPr>
-              <a:t>action / process</a:t>
-            </a:r>
-          </a:p>
-        </p:txBody>
-      </p:sp>
-      <p:sp>
-        <p:nvSpPr>
-          <p:cNvPr id="39" name="Flowchart: Data 38">
-            <a:extLst>
-              <a:ext uri="{FF2B5EF4-FFF2-40B4-BE49-F238E27FC236}">
-                <a16:creationId xmlns:a16="http://schemas.microsoft.com/office/drawing/2014/main" id="{84DF5FB3-6B18-6E52-CED0-52B59C223732}"/>
-              </a:ext>
-            </a:extLst>
-          </p:cNvPr>
-          <p:cNvSpPr/>
-          <p:nvPr/>
-        </p:nvSpPr>
-        <p:spPr>
-          <a:xfrm>
-            <a:off x="821623" y="2125701"/>
-            <a:ext cx="1844844" cy="489284"/>
-          </a:xfrm>
-          <a:prstGeom prst="flowChartInputOutput">
-            <a:avLst/>
-          </a:prstGeom>
-          <a:noFill/>
-          <a:ln>
-            <a:solidFill>
-              <a:schemeClr val="accent1">
-                <a:lumMod val="60000"/>
-                <a:lumOff val="40000"/>
-              </a:schemeClr>
-            </a:solidFill>
-          </a:ln>
-        </p:spPr>
-        <p:style>
-          <a:lnRef idx="2">
-            <a:schemeClr val="accent1">
-              <a:shade val="50000"/>
-            </a:schemeClr>
-          </a:lnRef>
-          <a:fillRef idx="1">
-            <a:schemeClr val="accent1"/>
-          </a:fillRef>
-          <a:effectRef idx="0">
-            <a:schemeClr val="accent1"/>
-          </a:effectRef>
-          <a:fontRef idx="minor">
-            <a:schemeClr val="lt1"/>
-          </a:fontRef>
-        </p:style>
-        <p:txBody>
-          <a:bodyPr rtlCol="0" anchor="ctr"/>
-          <a:lstStyle/>
-          <a:p>
-            <a:pPr algn="ctr"/>
-            <a:r>
-              <a:rPr lang="en-US" sz="1200" dirty="0">
-                <a:solidFill>
-                  <a:schemeClr val="bg1">
-                    <a:lumMod val="85000"/>
-                  </a:schemeClr>
-                </a:solidFill>
-                <a:latin typeface="Open Sans" panose="020B0606030504020204" pitchFamily="34" charset="0"/>
-                <a:ea typeface="Open Sans" panose="020B0606030504020204" pitchFamily="34" charset="0"/>
-                <a:cs typeface="Open Sans" panose="020B0606030504020204" pitchFamily="34" charset="0"/>
-              </a:rPr>
-              <a:t>input</a:t>
-            </a:r>
-          </a:p>
-        </p:txBody>
-      </p:sp>
-      <p:sp>
-        <p:nvSpPr>
-          <p:cNvPr id="46" name="Flowchart: Decision 45">
-            <a:extLst>
-              <a:ext uri="{FF2B5EF4-FFF2-40B4-BE49-F238E27FC236}">
-                <a16:creationId xmlns:a16="http://schemas.microsoft.com/office/drawing/2014/main" id="{265FEB22-D05F-9423-661B-B86264CDC339}"/>
-              </a:ext>
-            </a:extLst>
-          </p:cNvPr>
-          <p:cNvSpPr/>
-          <p:nvPr/>
-        </p:nvSpPr>
-        <p:spPr>
-          <a:xfrm>
-            <a:off x="821623" y="4052904"/>
-            <a:ext cx="1844844" cy="946484"/>
-          </a:xfrm>
-          <a:prstGeom prst="flowChartDecision">
-            <a:avLst/>
-          </a:prstGeom>
-          <a:noFill/>
-          <a:ln>
-            <a:solidFill>
-              <a:srgbClr val="FF7C80"/>
-            </a:solidFill>
-          </a:ln>
-        </p:spPr>
-        <p:style>
-          <a:lnRef idx="2">
-            <a:schemeClr val="accent1">
-              <a:shade val="50000"/>
-            </a:schemeClr>
-          </a:lnRef>
-          <a:fillRef idx="1">
-            <a:schemeClr val="accent1"/>
-          </a:fillRef>
-          <a:effectRef idx="0">
-            <a:schemeClr val="accent1"/>
-          </a:effectRef>
-          <a:fontRef idx="minor">
-            <a:schemeClr val="lt1"/>
-          </a:fontRef>
-        </p:style>
-        <p:txBody>
-          <a:bodyPr rtlCol="0" anchor="ctr"/>
-          <a:lstStyle/>
-          <a:p>
-            <a:pPr algn="ctr"/>
-            <a:r>
-              <a:rPr lang="en-US" sz="1200" dirty="0">
-                <a:solidFill>
-                  <a:schemeClr val="bg1">
-                    <a:lumMod val="85000"/>
-                  </a:schemeClr>
-                </a:solidFill>
-                <a:latin typeface="Open Sans" panose="020B0606030504020204" pitchFamily="34" charset="0"/>
-                <a:ea typeface="Open Sans" panose="020B0606030504020204" pitchFamily="34" charset="0"/>
-                <a:cs typeface="Open Sans" panose="020B0606030504020204" pitchFamily="34" charset="0"/>
-              </a:rPr>
-              <a:t>decision</a:t>
-            </a:r>
-          </a:p>
-        </p:txBody>
-      </p:sp>
-      <p:sp>
-        <p:nvSpPr>
-          <p:cNvPr id="47" name="Flowchart: Data 46">
-            <a:extLst>
-              <a:ext uri="{FF2B5EF4-FFF2-40B4-BE49-F238E27FC236}">
-                <a16:creationId xmlns:a16="http://schemas.microsoft.com/office/drawing/2014/main" id="{E79F7B5C-9F7D-5907-4BED-1DDC3947E632}"/>
-              </a:ext>
-            </a:extLst>
-          </p:cNvPr>
-          <p:cNvSpPr/>
-          <p:nvPr/>
-        </p:nvSpPr>
-        <p:spPr>
-          <a:xfrm>
-            <a:off x="821623" y="5526936"/>
-            <a:ext cx="1844844" cy="489284"/>
-          </a:xfrm>
-          <a:prstGeom prst="flowChartInputOutput">
-            <a:avLst/>
-          </a:prstGeom>
-          <a:noFill/>
-          <a:ln>
-            <a:solidFill>
-              <a:srgbClr val="CC99FF"/>
-            </a:solidFill>
-          </a:ln>
-        </p:spPr>
-        <p:style>
-          <a:lnRef idx="2">
-            <a:schemeClr val="accent1">
-              <a:shade val="50000"/>
-            </a:schemeClr>
-          </a:lnRef>
-          <a:fillRef idx="1">
-            <a:schemeClr val="accent1"/>
-          </a:fillRef>
-          <a:effectRef idx="0">
-            <a:schemeClr val="accent1"/>
-          </a:effectRef>
-          <a:fontRef idx="minor">
-            <a:schemeClr val="lt1"/>
-          </a:fontRef>
-        </p:style>
-        <p:txBody>
-          <a:bodyPr rtlCol="0" anchor="ctr"/>
-          <a:lstStyle/>
-          <a:p>
-            <a:pPr algn="ctr"/>
-            <a:r>
-              <a:rPr lang="en-US" sz="1200" dirty="0">
-                <a:solidFill>
-                  <a:schemeClr val="bg1">
-                    <a:lumMod val="85000"/>
-                  </a:schemeClr>
-                </a:solidFill>
-                <a:latin typeface="Open Sans" panose="020B0606030504020204" pitchFamily="34" charset="0"/>
-                <a:ea typeface="Open Sans" panose="020B0606030504020204" pitchFamily="34" charset="0"/>
-                <a:cs typeface="Open Sans" panose="020B0606030504020204" pitchFamily="34" charset="0"/>
-              </a:rPr>
-              <a:t>output</a:t>
-            </a:r>
-          </a:p>
-        </p:txBody>
-      </p:sp>
-      <p:sp>
-        <p:nvSpPr>
-          <p:cNvPr id="49" name="TextBox 48">
-            <a:extLst>
-              <a:ext uri="{FF2B5EF4-FFF2-40B4-BE49-F238E27FC236}">
-                <a16:creationId xmlns:a16="http://schemas.microsoft.com/office/drawing/2014/main" id="{9782D64F-E1B4-7BBA-97F1-672AA7BB38F2}"/>
-              </a:ext>
-            </a:extLst>
-          </p:cNvPr>
-          <p:cNvSpPr txBox="1"/>
-          <p:nvPr/>
-        </p:nvSpPr>
-        <p:spPr>
-          <a:xfrm>
-            <a:off x="2396841" y="4042695"/>
-            <a:ext cx="269626" cy="276999"/>
-          </a:xfrm>
-          <a:prstGeom prst="rect">
-            <a:avLst/>
-          </a:prstGeom>
-          <a:noFill/>
-        </p:spPr>
-        <p:txBody>
-          <a:bodyPr wrap="none" rtlCol="0">
-            <a:spAutoFit/>
-          </a:bodyPr>
-          <a:lstStyle/>
-          <a:p>
-            <a:r>
-              <a:rPr lang="en-US" sz="1200" dirty="0">
+              </a:ln>
+            </p:spPr>
+            <p:style>
+              <a:lnRef idx="2">
+                <a:schemeClr val="accent1">
+                  <a:shade val="50000"/>
+                </a:schemeClr>
+              </a:lnRef>
+              <a:fillRef idx="1">
+                <a:schemeClr val="accent1"/>
+              </a:fillRef>
+              <a:effectRef idx="0">
+                <a:schemeClr val="accent1"/>
+              </a:effectRef>
+              <a:fontRef idx="minor">
+                <a:schemeClr val="lt1"/>
+              </a:fontRef>
+            </p:style>
+            <p:txBody>
+              <a:bodyPr rtlCol="0" anchor="ctr"/>
+              <a:lstStyle/>
+              <a:p>
+                <a:pPr algn="ctr"/>
+                <a:r>
+                  <a:rPr lang="en-US" sz="1200" dirty="0">
+                    <a:solidFill>
+                      <a:schemeClr val="bg1">
+                        <a:lumMod val="85000"/>
+                      </a:schemeClr>
+                    </a:solidFill>
+                    <a:latin typeface="Open Sans" panose="020B0606030504020204" pitchFamily="34" charset="0"/>
+                    <a:ea typeface="Open Sans" panose="020B0606030504020204" pitchFamily="34" charset="0"/>
+                    <a:cs typeface="Open Sans" panose="020B0606030504020204" pitchFamily="34" charset="0"/>
+                  </a:rPr>
+                  <a:t>large = 0, </a:t>
+                </a:r>
+              </a:p>
+              <a:p>
+                <a:pPr algn="ctr"/>
+                <a:r>
+                  <a:rPr lang="en-US" sz="1200" dirty="0" err="1">
+                    <a:solidFill>
+                      <a:schemeClr val="bg1">
+                        <a:lumMod val="85000"/>
+                      </a:schemeClr>
+                    </a:solidFill>
+                    <a:latin typeface="Open Sans" panose="020B0606030504020204" pitchFamily="34" charset="0"/>
+                    <a:ea typeface="Open Sans" panose="020B0606030504020204" pitchFamily="34" charset="0"/>
+                    <a:cs typeface="Open Sans" panose="020B0606030504020204" pitchFamily="34" charset="0"/>
+                  </a:rPr>
+                  <a:t>childCount</a:t>
+                </a:r>
+                <a:r>
+                  <a:rPr lang="en-US" sz="1200" dirty="0">
+                    <a:solidFill>
+                      <a:schemeClr val="bg1">
+                        <a:lumMod val="85000"/>
+                      </a:schemeClr>
+                    </a:solidFill>
+                    <a:latin typeface="Open Sans" panose="020B0606030504020204" pitchFamily="34" charset="0"/>
+                    <a:ea typeface="Open Sans" panose="020B0606030504020204" pitchFamily="34" charset="0"/>
+                    <a:cs typeface="Open Sans" panose="020B0606030504020204" pitchFamily="34" charset="0"/>
+                  </a:rPr>
+                  <a:t> = 0</a:t>
+                </a:r>
+              </a:p>
+            </p:txBody>
+          </p:sp>
+          <p:sp>
+            <p:nvSpPr>
+              <p:cNvPr id="46" name="Flowchart: Decision 45">
+                <a:extLst>
+                  <a:ext uri="{FF2B5EF4-FFF2-40B4-BE49-F238E27FC236}">
+                    <a16:creationId xmlns:a16="http://schemas.microsoft.com/office/drawing/2014/main" id="{265FEB22-D05F-9423-661B-B86264CDC339}"/>
+                  </a:ext>
+                </a:extLst>
+              </p:cNvPr>
+              <p:cNvSpPr/>
+              <p:nvPr/>
+            </p:nvSpPr>
+            <p:spPr>
+              <a:xfrm>
+                <a:off x="4068769" y="2857997"/>
+                <a:ext cx="1844844" cy="946484"/>
+              </a:xfrm>
+              <a:prstGeom prst="flowChartDecision">
+                <a:avLst/>
+              </a:prstGeom>
+              <a:noFill/>
+              <a:ln>
                 <a:solidFill>
                   <a:srgbClr val="FF7C80"/>
                 </a:solidFill>
-                <a:latin typeface="Open Sans" panose="020B0606030504020204" pitchFamily="34" charset="0"/>
-                <a:ea typeface="Open Sans" panose="020B0606030504020204" pitchFamily="34" charset="0"/>
-                <a:cs typeface="Open Sans" panose="020B0606030504020204" pitchFamily="34" charset="0"/>
-              </a:rPr>
-              <a:t>T</a:t>
-            </a:r>
-          </a:p>
-        </p:txBody>
-      </p:sp>
-      <p:sp>
-        <p:nvSpPr>
-          <p:cNvPr id="53" name="TextBox 52">
-            <a:extLst>
-              <a:ext uri="{FF2B5EF4-FFF2-40B4-BE49-F238E27FC236}">
-                <a16:creationId xmlns:a16="http://schemas.microsoft.com/office/drawing/2014/main" id="{7E6B2905-22B9-9F02-399A-510F7F8499F3}"/>
-              </a:ext>
-            </a:extLst>
-          </p:cNvPr>
-          <p:cNvSpPr txBox="1"/>
-          <p:nvPr/>
-        </p:nvSpPr>
-        <p:spPr>
-          <a:xfrm>
-            <a:off x="821623" y="4042694"/>
-            <a:ext cx="269626" cy="276999"/>
-          </a:xfrm>
-          <a:prstGeom prst="rect">
-            <a:avLst/>
-          </a:prstGeom>
-          <a:noFill/>
-        </p:spPr>
-        <p:txBody>
-          <a:bodyPr wrap="none" rtlCol="0">
-            <a:spAutoFit/>
-          </a:bodyPr>
-          <a:lstStyle/>
-          <a:p>
-            <a:r>
-              <a:rPr lang="en-US" sz="1200" dirty="0">
+              </a:ln>
+            </p:spPr>
+            <p:style>
+              <a:lnRef idx="2">
+                <a:schemeClr val="accent1">
+                  <a:shade val="50000"/>
+                </a:schemeClr>
+              </a:lnRef>
+              <a:fillRef idx="1">
+                <a:schemeClr val="accent1"/>
+              </a:fillRef>
+              <a:effectRef idx="0">
+                <a:schemeClr val="accent1"/>
+              </a:effectRef>
+              <a:fontRef idx="minor">
+                <a:schemeClr val="lt1"/>
+              </a:fontRef>
+            </p:style>
+            <p:txBody>
+              <a:bodyPr rtlCol="0" anchor="ctr"/>
+              <a:lstStyle/>
+              <a:p>
+                <a:pPr algn="ctr"/>
+                <a:endParaRPr lang="en-US" sz="1200" dirty="0">
+                  <a:solidFill>
+                    <a:schemeClr val="bg1">
+                      <a:lumMod val="85000"/>
+                    </a:schemeClr>
+                  </a:solidFill>
+                  <a:latin typeface="Open Sans" panose="020B0606030504020204" pitchFamily="34" charset="0"/>
+                  <a:ea typeface="Open Sans" panose="020B0606030504020204" pitchFamily="34" charset="0"/>
+                  <a:cs typeface="Open Sans" panose="020B0606030504020204" pitchFamily="34" charset="0"/>
+                </a:endParaRPr>
+              </a:p>
+            </p:txBody>
+          </p:sp>
+          <p:sp>
+            <p:nvSpPr>
+              <p:cNvPr id="49" name="TextBox 48">
+                <a:extLst>
+                  <a:ext uri="{FF2B5EF4-FFF2-40B4-BE49-F238E27FC236}">
+                    <a16:creationId xmlns:a16="http://schemas.microsoft.com/office/drawing/2014/main" id="{9782D64F-E1B4-7BBA-97F1-672AA7BB38F2}"/>
+                  </a:ext>
+                </a:extLst>
+              </p:cNvPr>
+              <p:cNvSpPr txBox="1"/>
+              <p:nvPr/>
+            </p:nvSpPr>
+            <p:spPr>
+              <a:xfrm>
+                <a:off x="8101195" y="3047821"/>
+                <a:ext cx="269626" cy="276999"/>
+              </a:xfrm>
+              <a:prstGeom prst="rect">
+                <a:avLst/>
+              </a:prstGeom>
+              <a:noFill/>
+            </p:spPr>
+            <p:txBody>
+              <a:bodyPr wrap="none" rtlCol="0">
+                <a:spAutoFit/>
+              </a:bodyPr>
+              <a:lstStyle/>
+              <a:p>
+                <a:r>
+                  <a:rPr lang="en-US" sz="1200" dirty="0">
+                    <a:solidFill>
+                      <a:srgbClr val="FF7C80"/>
+                    </a:solidFill>
+                    <a:latin typeface="Open Sans" panose="020B0606030504020204" pitchFamily="34" charset="0"/>
+                    <a:ea typeface="Open Sans" panose="020B0606030504020204" pitchFamily="34" charset="0"/>
+                    <a:cs typeface="Open Sans" panose="020B0606030504020204" pitchFamily="34" charset="0"/>
+                  </a:rPr>
+                  <a:t>T</a:t>
+                </a:r>
+              </a:p>
+            </p:txBody>
+          </p:sp>
+          <p:sp>
+            <p:nvSpPr>
+              <p:cNvPr id="53" name="TextBox 52">
+                <a:extLst>
+                  <a:ext uri="{FF2B5EF4-FFF2-40B4-BE49-F238E27FC236}">
+                    <a16:creationId xmlns:a16="http://schemas.microsoft.com/office/drawing/2014/main" id="{7E6B2905-22B9-9F02-399A-510F7F8499F3}"/>
+                  </a:ext>
+                </a:extLst>
+              </p:cNvPr>
+              <p:cNvSpPr txBox="1"/>
+              <p:nvPr/>
+            </p:nvSpPr>
+            <p:spPr>
+              <a:xfrm>
+                <a:off x="6934593" y="3800222"/>
+                <a:ext cx="269626" cy="276999"/>
+              </a:xfrm>
+              <a:prstGeom prst="rect">
+                <a:avLst/>
+              </a:prstGeom>
+              <a:noFill/>
+            </p:spPr>
+            <p:txBody>
+              <a:bodyPr wrap="none" rtlCol="0">
+                <a:spAutoFit/>
+              </a:bodyPr>
+              <a:lstStyle/>
+              <a:p>
+                <a:r>
+                  <a:rPr lang="en-US" sz="1200" dirty="0">
+                    <a:solidFill>
+                      <a:srgbClr val="FF7C80"/>
+                    </a:solidFill>
+                    <a:latin typeface="Open Sans" panose="020B0606030504020204" pitchFamily="34" charset="0"/>
+                    <a:ea typeface="Open Sans" panose="020B0606030504020204" pitchFamily="34" charset="0"/>
+                    <a:cs typeface="Open Sans" panose="020B0606030504020204" pitchFamily="34" charset="0"/>
+                  </a:rPr>
+                  <a:t>F</a:t>
+                </a:r>
+              </a:p>
+            </p:txBody>
+          </p:sp>
+          <p:sp>
+            <p:nvSpPr>
+              <p:cNvPr id="19" name="Flowchart: Data 18">
+                <a:extLst>
+                  <a:ext uri="{FF2B5EF4-FFF2-40B4-BE49-F238E27FC236}">
+                    <a16:creationId xmlns:a16="http://schemas.microsoft.com/office/drawing/2014/main" id="{83FF52BA-11BB-3A36-EE4B-E8F99BF5F935}"/>
+                  </a:ext>
+                </a:extLst>
+              </p:cNvPr>
+              <p:cNvSpPr/>
+              <p:nvPr/>
+            </p:nvSpPr>
+            <p:spPr>
+              <a:xfrm>
+                <a:off x="8498240" y="2074866"/>
+                <a:ext cx="1844844" cy="489284"/>
+              </a:xfrm>
+              <a:prstGeom prst="flowChartInputOutput">
+                <a:avLst/>
+              </a:prstGeom>
+              <a:noFill/>
+              <a:ln>
+                <a:solidFill>
+                  <a:srgbClr val="CC99FF"/>
+                </a:solidFill>
+              </a:ln>
+            </p:spPr>
+            <p:style>
+              <a:lnRef idx="2">
+                <a:schemeClr val="accent1">
+                  <a:shade val="50000"/>
+                </a:schemeClr>
+              </a:lnRef>
+              <a:fillRef idx="1">
+                <a:schemeClr val="accent1"/>
+              </a:fillRef>
+              <a:effectRef idx="0">
+                <a:schemeClr val="accent1"/>
+              </a:effectRef>
+              <a:fontRef idx="minor">
+                <a:schemeClr val="lt1"/>
+              </a:fontRef>
+            </p:style>
+            <p:txBody>
+              <a:bodyPr rtlCol="0" anchor="ctr"/>
+              <a:lstStyle/>
+              <a:p>
+                <a:pPr algn="ctr"/>
+                <a:r>
+                  <a:rPr lang="en-US" sz="1200" dirty="0">
+                    <a:solidFill>
+                      <a:schemeClr val="bg1">
+                        <a:lumMod val="85000"/>
+                      </a:schemeClr>
+                    </a:solidFill>
+                    <a:latin typeface="Open Sans" panose="020B0606030504020204" pitchFamily="34" charset="0"/>
+                    <a:ea typeface="Open Sans" panose="020B0606030504020204" pitchFamily="34" charset="0"/>
+                    <a:cs typeface="Open Sans" panose="020B0606030504020204" pitchFamily="34" charset="0"/>
+                  </a:rPr>
+                  <a:t>“Family needs MPV”</a:t>
+                </a:r>
+              </a:p>
+            </p:txBody>
+          </p:sp>
+          <p:sp>
+            <p:nvSpPr>
+              <p:cNvPr id="20" name="Flowchart: Decision 19">
+                <a:extLst>
+                  <a:ext uri="{FF2B5EF4-FFF2-40B4-BE49-F238E27FC236}">
+                    <a16:creationId xmlns:a16="http://schemas.microsoft.com/office/drawing/2014/main" id="{DD8ADAE0-429D-3F40-BA66-AAF73174C551}"/>
+                  </a:ext>
+                </a:extLst>
+              </p:cNvPr>
+              <p:cNvSpPr/>
+              <p:nvPr/>
+            </p:nvSpPr>
+            <p:spPr>
+              <a:xfrm>
+                <a:off x="6281798" y="2853240"/>
+                <a:ext cx="1844844" cy="946484"/>
+              </a:xfrm>
+              <a:prstGeom prst="flowChartDecision">
+                <a:avLst/>
+              </a:prstGeom>
+              <a:noFill/>
+              <a:ln>
                 <a:solidFill>
                   <a:srgbClr val="FF7C80"/>
                 </a:solidFill>
-                <a:latin typeface="Open Sans" panose="020B0606030504020204" pitchFamily="34" charset="0"/>
-                <a:ea typeface="Open Sans" panose="020B0606030504020204" pitchFamily="34" charset="0"/>
-                <a:cs typeface="Open Sans" panose="020B0606030504020204" pitchFamily="34" charset="0"/>
-              </a:rPr>
-              <a:t>F</a:t>
-            </a:r>
-          </a:p>
-        </p:txBody>
-      </p:sp>
+              </a:ln>
+            </p:spPr>
+            <p:style>
+              <a:lnRef idx="2">
+                <a:schemeClr val="accent1">
+                  <a:shade val="50000"/>
+                </a:schemeClr>
+              </a:lnRef>
+              <a:fillRef idx="1">
+                <a:schemeClr val="accent1"/>
+              </a:fillRef>
+              <a:effectRef idx="0">
+                <a:schemeClr val="accent1"/>
+              </a:effectRef>
+              <a:fontRef idx="minor">
+                <a:schemeClr val="lt1"/>
+              </a:fontRef>
+            </p:style>
+            <p:txBody>
+              <a:bodyPr rtlCol="0" anchor="ctr"/>
+              <a:lstStyle/>
+              <a:p>
+                <a:pPr algn="ctr"/>
+                <a:endParaRPr lang="en-US" sz="1200" dirty="0">
+                  <a:solidFill>
+                    <a:schemeClr val="bg1">
+                      <a:lumMod val="85000"/>
+                    </a:schemeClr>
+                  </a:solidFill>
+                  <a:latin typeface="Open Sans" panose="020B0606030504020204" pitchFamily="34" charset="0"/>
+                  <a:ea typeface="Open Sans" panose="020B0606030504020204" pitchFamily="34" charset="0"/>
+                  <a:cs typeface="Open Sans" panose="020B0606030504020204" pitchFamily="34" charset="0"/>
+                </a:endParaRPr>
+              </a:p>
+            </p:txBody>
+          </p:sp>
+          <p:sp>
+            <p:nvSpPr>
+              <p:cNvPr id="3" name="TextBox 2">
+                <a:extLst>
+                  <a:ext uri="{FF2B5EF4-FFF2-40B4-BE49-F238E27FC236}">
+                    <a16:creationId xmlns:a16="http://schemas.microsoft.com/office/drawing/2014/main" id="{0FCD52A5-D37E-5031-08A2-E2A66D2D1194}"/>
+                  </a:ext>
+                </a:extLst>
+              </p:cNvPr>
+              <p:cNvSpPr txBox="1"/>
+              <p:nvPr/>
+            </p:nvSpPr>
+            <p:spPr>
+              <a:xfrm>
+                <a:off x="4491697" y="3106195"/>
+                <a:ext cx="998992" cy="461665"/>
+              </a:xfrm>
+              <a:prstGeom prst="rect">
+                <a:avLst/>
+              </a:prstGeom>
+              <a:noFill/>
+            </p:spPr>
+            <p:txBody>
+              <a:bodyPr wrap="none" rtlCol="0">
+                <a:spAutoFit/>
+              </a:bodyPr>
+              <a:lstStyle/>
+              <a:p>
+                <a:pPr algn="ctr"/>
+                <a:r>
+                  <a:rPr lang="en-US" sz="1200" dirty="0" err="1">
+                    <a:solidFill>
+                      <a:schemeClr val="bg1">
+                        <a:lumMod val="85000"/>
+                      </a:schemeClr>
+                    </a:solidFill>
+                    <a:latin typeface="Open Sans" panose="020B0606030504020204" pitchFamily="34" charset="0"/>
+                    <a:ea typeface="Open Sans" panose="020B0606030504020204" pitchFamily="34" charset="0"/>
+                    <a:cs typeface="Open Sans" panose="020B0606030504020204" pitchFamily="34" charset="0"/>
+                  </a:rPr>
+                  <a:t>childCount</a:t>
+                </a:r>
+                <a:r>
+                  <a:rPr lang="en-US" sz="1200" dirty="0">
+                    <a:solidFill>
+                      <a:schemeClr val="bg1">
+                        <a:lumMod val="85000"/>
+                      </a:schemeClr>
+                    </a:solidFill>
+                    <a:latin typeface="Open Sans" panose="020B0606030504020204" pitchFamily="34" charset="0"/>
+                    <a:ea typeface="Open Sans" panose="020B0606030504020204" pitchFamily="34" charset="0"/>
+                    <a:cs typeface="Open Sans" panose="020B0606030504020204" pitchFamily="34" charset="0"/>
+                  </a:rPr>
+                  <a:t> </a:t>
+                </a:r>
+              </a:p>
+              <a:p>
+                <a:pPr algn="ctr"/>
+                <a:r>
+                  <a:rPr lang="en-US" sz="1200" dirty="0">
+                    <a:solidFill>
+                      <a:schemeClr val="bg1">
+                        <a:lumMod val="85000"/>
+                      </a:schemeClr>
+                    </a:solidFill>
+                    <a:latin typeface="Open Sans" panose="020B0606030504020204" pitchFamily="34" charset="0"/>
+                    <a:ea typeface="Open Sans" panose="020B0606030504020204" pitchFamily="34" charset="0"/>
+                    <a:cs typeface="Open Sans" panose="020B0606030504020204" pitchFamily="34" charset="0"/>
+                  </a:rPr>
+                  <a:t>!= –1</a:t>
+                </a:r>
+              </a:p>
+            </p:txBody>
+          </p:sp>
+          <p:sp>
+            <p:nvSpPr>
+              <p:cNvPr id="23" name="Flowchart: Data 22">
+                <a:extLst>
+                  <a:ext uri="{FF2B5EF4-FFF2-40B4-BE49-F238E27FC236}">
+                    <a16:creationId xmlns:a16="http://schemas.microsoft.com/office/drawing/2014/main" id="{8A8010FA-742E-3616-F64D-F271787DD465}"/>
+                  </a:ext>
+                </a:extLst>
+              </p:cNvPr>
+              <p:cNvSpPr/>
+              <p:nvPr/>
+            </p:nvSpPr>
+            <p:spPr>
+              <a:xfrm>
+                <a:off x="6281797" y="4105319"/>
+                <a:ext cx="1844844" cy="489284"/>
+              </a:xfrm>
+              <a:prstGeom prst="flowChartInputOutput">
+                <a:avLst/>
+              </a:prstGeom>
+              <a:noFill/>
+              <a:ln>
+                <a:solidFill>
+                  <a:schemeClr val="accent1">
+                    <a:lumMod val="60000"/>
+                    <a:lumOff val="40000"/>
+                  </a:schemeClr>
+                </a:solidFill>
+              </a:ln>
+            </p:spPr>
+            <p:style>
+              <a:lnRef idx="2">
+                <a:schemeClr val="accent1">
+                  <a:shade val="50000"/>
+                </a:schemeClr>
+              </a:lnRef>
+              <a:fillRef idx="1">
+                <a:schemeClr val="accent1"/>
+              </a:fillRef>
+              <a:effectRef idx="0">
+                <a:schemeClr val="accent1"/>
+              </a:effectRef>
+              <a:fontRef idx="minor">
+                <a:schemeClr val="lt1"/>
+              </a:fontRef>
+            </p:style>
+            <p:txBody>
+              <a:bodyPr rtlCol="0" anchor="ctr"/>
+              <a:lstStyle/>
+              <a:p>
+                <a:pPr algn="ctr"/>
+                <a:r>
+                  <a:rPr lang="en-US" sz="1200" dirty="0">
+                    <a:solidFill>
+                      <a:schemeClr val="bg1">
+                        <a:lumMod val="85000"/>
+                      </a:schemeClr>
+                    </a:solidFill>
+                    <a:latin typeface="Open Sans" panose="020B0606030504020204" pitchFamily="34" charset="0"/>
+                    <a:ea typeface="Open Sans" panose="020B0606030504020204" pitchFamily="34" charset="0"/>
+                    <a:cs typeface="Open Sans" panose="020B0606030504020204" pitchFamily="34" charset="0"/>
+                  </a:rPr>
+                  <a:t>INPUT </a:t>
+                </a:r>
+                <a:r>
+                  <a:rPr lang="en-US" sz="1200" dirty="0" err="1">
+                    <a:solidFill>
+                      <a:schemeClr val="bg1">
+                        <a:lumMod val="85000"/>
+                      </a:schemeClr>
+                    </a:solidFill>
+                    <a:latin typeface="Open Sans" panose="020B0606030504020204" pitchFamily="34" charset="0"/>
+                    <a:ea typeface="Open Sans" panose="020B0606030504020204" pitchFamily="34" charset="0"/>
+                    <a:cs typeface="Open Sans" panose="020B0606030504020204" pitchFamily="34" charset="0"/>
+                  </a:rPr>
+                  <a:t>childCount</a:t>
+                </a:r>
+                <a:endParaRPr lang="en-US" sz="1200" dirty="0">
+                  <a:solidFill>
+                    <a:schemeClr val="bg1">
+                      <a:lumMod val="85000"/>
+                    </a:schemeClr>
+                  </a:solidFill>
+                  <a:latin typeface="Open Sans" panose="020B0606030504020204" pitchFamily="34" charset="0"/>
+                  <a:ea typeface="Open Sans" panose="020B0606030504020204" pitchFamily="34" charset="0"/>
+                  <a:cs typeface="Open Sans" panose="020B0606030504020204" pitchFamily="34" charset="0"/>
+                </a:endParaRPr>
+              </a:p>
+            </p:txBody>
+          </p:sp>
+          <p:sp>
+            <p:nvSpPr>
+              <p:cNvPr id="26" name="TextBox 25">
+                <a:extLst>
+                  <a:ext uri="{FF2B5EF4-FFF2-40B4-BE49-F238E27FC236}">
+                    <a16:creationId xmlns:a16="http://schemas.microsoft.com/office/drawing/2014/main" id="{7A9814F8-DF19-5D08-F41C-F906F3B8183B}"/>
+                  </a:ext>
+                </a:extLst>
+              </p:cNvPr>
+              <p:cNvSpPr txBox="1"/>
+              <p:nvPr/>
+            </p:nvSpPr>
+            <p:spPr>
+              <a:xfrm>
+                <a:off x="6724763" y="3093988"/>
+                <a:ext cx="958917" cy="461665"/>
+              </a:xfrm>
+              <a:prstGeom prst="rect">
+                <a:avLst/>
+              </a:prstGeom>
+              <a:noFill/>
+            </p:spPr>
+            <p:txBody>
+              <a:bodyPr wrap="none" rtlCol="0">
+                <a:spAutoFit/>
+              </a:bodyPr>
+              <a:lstStyle/>
+              <a:p>
+                <a:pPr algn="ctr"/>
+                <a:r>
+                  <a:rPr lang="en-US" sz="1200" dirty="0" err="1">
+                    <a:solidFill>
+                      <a:schemeClr val="bg1">
+                        <a:lumMod val="85000"/>
+                      </a:schemeClr>
+                    </a:solidFill>
+                    <a:latin typeface="Open Sans" panose="020B0606030504020204" pitchFamily="34" charset="0"/>
+                    <a:ea typeface="Open Sans" panose="020B0606030504020204" pitchFamily="34" charset="0"/>
+                    <a:cs typeface="Open Sans" panose="020B0606030504020204" pitchFamily="34" charset="0"/>
+                  </a:rPr>
+                  <a:t>childCount</a:t>
+                </a:r>
+                <a:endParaRPr lang="en-US" sz="1200" dirty="0">
+                  <a:solidFill>
+                    <a:schemeClr val="bg1">
+                      <a:lumMod val="85000"/>
+                    </a:schemeClr>
+                  </a:solidFill>
+                  <a:latin typeface="Open Sans" panose="020B0606030504020204" pitchFamily="34" charset="0"/>
+                  <a:ea typeface="Open Sans" panose="020B0606030504020204" pitchFamily="34" charset="0"/>
+                  <a:cs typeface="Open Sans" panose="020B0606030504020204" pitchFamily="34" charset="0"/>
+                </a:endParaRPr>
+              </a:p>
+              <a:p>
+                <a:pPr algn="ctr"/>
+                <a:r>
+                  <a:rPr lang="en-US" sz="1200" dirty="0">
+                    <a:solidFill>
+                      <a:schemeClr val="bg1">
+                        <a:lumMod val="85000"/>
+                      </a:schemeClr>
+                    </a:solidFill>
+                    <a:latin typeface="Open Sans" panose="020B0606030504020204" pitchFamily="34" charset="0"/>
+                    <a:ea typeface="Open Sans" panose="020B0606030504020204" pitchFamily="34" charset="0"/>
+                    <a:cs typeface="Open Sans" panose="020B0606030504020204" pitchFamily="34" charset="0"/>
+                  </a:rPr>
+                  <a:t>&gt; 3</a:t>
+                </a:r>
+              </a:p>
+            </p:txBody>
+          </p:sp>
+          <p:sp>
+            <p:nvSpPr>
+              <p:cNvPr id="28" name="Rectangle 27">
+                <a:extLst>
+                  <a:ext uri="{FF2B5EF4-FFF2-40B4-BE49-F238E27FC236}">
+                    <a16:creationId xmlns:a16="http://schemas.microsoft.com/office/drawing/2014/main" id="{DD7212C3-9A7B-07AC-681D-5F0E34F6EA65}"/>
+                  </a:ext>
+                </a:extLst>
+              </p:cNvPr>
+              <p:cNvSpPr/>
+              <p:nvPr/>
+            </p:nvSpPr>
+            <p:spPr>
+              <a:xfrm>
+                <a:off x="8494827" y="3134723"/>
+                <a:ext cx="1844844" cy="393032"/>
+              </a:xfrm>
+              <a:prstGeom prst="rect">
+                <a:avLst/>
+              </a:prstGeom>
+              <a:noFill/>
+              <a:ln>
+                <a:solidFill>
+                  <a:schemeClr val="accent6">
+                    <a:lumMod val="60000"/>
+                    <a:lumOff val="40000"/>
+                  </a:schemeClr>
+                </a:solidFill>
+              </a:ln>
+            </p:spPr>
+            <p:style>
+              <a:lnRef idx="2">
+                <a:schemeClr val="accent1">
+                  <a:shade val="50000"/>
+                </a:schemeClr>
+              </a:lnRef>
+              <a:fillRef idx="1">
+                <a:schemeClr val="accent1"/>
+              </a:fillRef>
+              <a:effectRef idx="0">
+                <a:schemeClr val="accent1"/>
+              </a:effectRef>
+              <a:fontRef idx="minor">
+                <a:schemeClr val="lt1"/>
+              </a:fontRef>
+            </p:style>
+            <p:txBody>
+              <a:bodyPr rtlCol="0" anchor="ctr"/>
+              <a:lstStyle/>
+              <a:p>
+                <a:pPr algn="ctr"/>
+                <a:r>
+                  <a:rPr lang="en-US" sz="1200" dirty="0">
+                    <a:solidFill>
+                      <a:schemeClr val="bg1">
+                        <a:lumMod val="85000"/>
+                      </a:schemeClr>
+                    </a:solidFill>
+                    <a:latin typeface="Open Sans" panose="020B0606030504020204" pitchFamily="34" charset="0"/>
+                    <a:ea typeface="Open Sans" panose="020B0606030504020204" pitchFamily="34" charset="0"/>
+                    <a:cs typeface="Open Sans" panose="020B0606030504020204" pitchFamily="34" charset="0"/>
+                  </a:rPr>
+                  <a:t>large = large + 1</a:t>
+                </a:r>
+              </a:p>
+            </p:txBody>
+          </p:sp>
+          <p:cxnSp>
+            <p:nvCxnSpPr>
+              <p:cNvPr id="12" name="Straight Arrow Connector 11">
+                <a:extLst>
+                  <a:ext uri="{FF2B5EF4-FFF2-40B4-BE49-F238E27FC236}">
+                    <a16:creationId xmlns:a16="http://schemas.microsoft.com/office/drawing/2014/main" id="{8D6AC4A1-A2E1-442A-6D64-CD4E785A31B6}"/>
+                  </a:ext>
+                </a:extLst>
+              </p:cNvPr>
+              <p:cNvCxnSpPr>
+                <a:stCxn id="34" idx="3"/>
+                <a:endCxn id="46" idx="1"/>
+              </p:cNvCxnSpPr>
+              <p:nvPr/>
+            </p:nvCxnSpPr>
+            <p:spPr>
+              <a:xfrm>
+                <a:off x="3697171" y="3331239"/>
+                <a:ext cx="371598" cy="0"/>
+              </a:xfrm>
+              <a:prstGeom prst="straightConnector1">
+                <a:avLst/>
+              </a:prstGeom>
+              <a:ln w="12700">
+                <a:solidFill>
+                  <a:schemeClr val="bg1">
+                    <a:lumMod val="75000"/>
+                  </a:schemeClr>
+                </a:solidFill>
+                <a:tailEnd type="triangle"/>
+              </a:ln>
+            </p:spPr>
+            <p:style>
+              <a:lnRef idx="1">
+                <a:schemeClr val="accent1"/>
+              </a:lnRef>
+              <a:fillRef idx="0">
+                <a:schemeClr val="accent1"/>
+              </a:fillRef>
+              <a:effectRef idx="0">
+                <a:schemeClr val="accent1"/>
+              </a:effectRef>
+              <a:fontRef idx="minor">
+                <a:schemeClr val="tx1"/>
+              </a:fontRef>
+            </p:style>
+          </p:cxnSp>
+          <p:cxnSp>
+            <p:nvCxnSpPr>
+              <p:cNvPr id="22" name="Straight Arrow Connector 21">
+                <a:extLst>
+                  <a:ext uri="{FF2B5EF4-FFF2-40B4-BE49-F238E27FC236}">
+                    <a16:creationId xmlns:a16="http://schemas.microsoft.com/office/drawing/2014/main" id="{CE857124-A676-22A6-040F-B6A1D27A8ADB}"/>
+                  </a:ext>
+                </a:extLst>
+              </p:cNvPr>
+              <p:cNvCxnSpPr>
+                <a:stCxn id="46" idx="3"/>
+                <a:endCxn id="20" idx="1"/>
+              </p:cNvCxnSpPr>
+              <p:nvPr/>
+            </p:nvCxnSpPr>
+            <p:spPr>
+              <a:xfrm flipV="1">
+                <a:off x="5913613" y="3326482"/>
+                <a:ext cx="368185" cy="4757"/>
+              </a:xfrm>
+              <a:prstGeom prst="straightConnector1">
+                <a:avLst/>
+              </a:prstGeom>
+              <a:ln w="12700">
+                <a:solidFill>
+                  <a:srgbClr val="FF7C80"/>
+                </a:solidFill>
+                <a:tailEnd type="triangle"/>
+              </a:ln>
+            </p:spPr>
+            <p:style>
+              <a:lnRef idx="1">
+                <a:schemeClr val="accent1"/>
+              </a:lnRef>
+              <a:fillRef idx="0">
+                <a:schemeClr val="accent1"/>
+              </a:fillRef>
+              <a:effectRef idx="0">
+                <a:schemeClr val="accent1"/>
+              </a:effectRef>
+              <a:fontRef idx="minor">
+                <a:schemeClr val="tx1"/>
+              </a:fontRef>
+            </p:style>
+          </p:cxnSp>
+          <p:cxnSp>
+            <p:nvCxnSpPr>
+              <p:cNvPr id="25" name="Straight Arrow Connector 24">
+                <a:extLst>
+                  <a:ext uri="{FF2B5EF4-FFF2-40B4-BE49-F238E27FC236}">
+                    <a16:creationId xmlns:a16="http://schemas.microsoft.com/office/drawing/2014/main" id="{99DC3955-16EA-6F4E-6EF7-9E3B6AF97BCF}"/>
+                  </a:ext>
+                </a:extLst>
+              </p:cNvPr>
+              <p:cNvCxnSpPr>
+                <a:stCxn id="20" idx="3"/>
+                <a:endCxn id="28" idx="1"/>
+              </p:cNvCxnSpPr>
+              <p:nvPr/>
+            </p:nvCxnSpPr>
+            <p:spPr>
+              <a:xfrm>
+                <a:off x="8126642" y="3326482"/>
+                <a:ext cx="368185" cy="4757"/>
+              </a:xfrm>
+              <a:prstGeom prst="straightConnector1">
+                <a:avLst/>
+              </a:prstGeom>
+              <a:ln w="12700">
+                <a:solidFill>
+                  <a:srgbClr val="FF7C80"/>
+                </a:solidFill>
+                <a:tailEnd type="triangle"/>
+              </a:ln>
+            </p:spPr>
+            <p:style>
+              <a:lnRef idx="1">
+                <a:schemeClr val="accent1"/>
+              </a:lnRef>
+              <a:fillRef idx="0">
+                <a:schemeClr val="accent1"/>
+              </a:fillRef>
+              <a:effectRef idx="0">
+                <a:schemeClr val="accent1"/>
+              </a:effectRef>
+              <a:fontRef idx="minor">
+                <a:schemeClr val="tx1"/>
+              </a:fontRef>
+            </p:style>
+          </p:cxnSp>
+          <p:cxnSp>
+            <p:nvCxnSpPr>
+              <p:cNvPr id="40" name="Connector: Elbow 39">
+                <a:extLst>
+                  <a:ext uri="{FF2B5EF4-FFF2-40B4-BE49-F238E27FC236}">
+                    <a16:creationId xmlns:a16="http://schemas.microsoft.com/office/drawing/2014/main" id="{1D97D9FD-99D3-2B0A-F2EF-D2430E0B4E64}"/>
+                  </a:ext>
+                </a:extLst>
+              </p:cNvPr>
+              <p:cNvCxnSpPr>
+                <a:cxnSpLocks/>
+                <a:stCxn id="28" idx="2"/>
+                <a:endCxn id="23" idx="5"/>
+              </p:cNvCxnSpPr>
+              <p:nvPr/>
+            </p:nvCxnSpPr>
+            <p:spPr>
+              <a:xfrm rot="5400000">
+                <a:off x="8268600" y="3201312"/>
+                <a:ext cx="822206" cy="1475092"/>
+              </a:xfrm>
+              <a:prstGeom prst="bentConnector2">
+                <a:avLst/>
+              </a:prstGeom>
+              <a:ln w="12700">
+                <a:solidFill>
+                  <a:schemeClr val="bg1">
+                    <a:lumMod val="75000"/>
+                  </a:schemeClr>
+                </a:solidFill>
+                <a:tailEnd type="triangle"/>
+              </a:ln>
+            </p:spPr>
+            <p:style>
+              <a:lnRef idx="1">
+                <a:schemeClr val="accent1"/>
+              </a:lnRef>
+              <a:fillRef idx="0">
+                <a:schemeClr val="accent1"/>
+              </a:fillRef>
+              <a:effectRef idx="0">
+                <a:schemeClr val="accent1"/>
+              </a:effectRef>
+              <a:fontRef idx="minor">
+                <a:schemeClr val="tx1"/>
+              </a:fontRef>
+            </p:style>
+          </p:cxnSp>
+          <p:cxnSp>
+            <p:nvCxnSpPr>
+              <p:cNvPr id="54" name="Connector: Elbow 53">
+                <a:extLst>
+                  <a:ext uri="{FF2B5EF4-FFF2-40B4-BE49-F238E27FC236}">
+                    <a16:creationId xmlns:a16="http://schemas.microsoft.com/office/drawing/2014/main" id="{88C54B34-056D-DFCE-D8D2-879F4962C29C}"/>
+                  </a:ext>
+                </a:extLst>
+              </p:cNvPr>
+              <p:cNvCxnSpPr>
+                <a:cxnSpLocks/>
+                <a:stCxn id="23" idx="2"/>
+                <a:endCxn id="46" idx="2"/>
+              </p:cNvCxnSpPr>
+              <p:nvPr/>
+            </p:nvCxnSpPr>
+            <p:spPr>
+              <a:xfrm rot="10800000">
+                <a:off x="4991191" y="3804481"/>
+                <a:ext cx="1475090" cy="545480"/>
+              </a:xfrm>
+              <a:prstGeom prst="bentConnector2">
+                <a:avLst/>
+              </a:prstGeom>
+              <a:ln w="12700">
+                <a:solidFill>
+                  <a:schemeClr val="accent1">
+                    <a:lumMod val="60000"/>
+                    <a:lumOff val="40000"/>
+                  </a:schemeClr>
+                </a:solidFill>
+                <a:tailEnd type="triangle"/>
+              </a:ln>
+            </p:spPr>
+            <p:style>
+              <a:lnRef idx="1">
+                <a:schemeClr val="accent1"/>
+              </a:lnRef>
+              <a:fillRef idx="0">
+                <a:schemeClr val="accent1"/>
+              </a:fillRef>
+              <a:effectRef idx="0">
+                <a:schemeClr val="accent1"/>
+              </a:effectRef>
+              <a:fontRef idx="minor">
+                <a:schemeClr val="tx1"/>
+              </a:fontRef>
+            </p:style>
+          </p:cxnSp>
+          <p:cxnSp>
+            <p:nvCxnSpPr>
+              <p:cNvPr id="58" name="Straight Arrow Connector 57">
+                <a:extLst>
+                  <a:ext uri="{FF2B5EF4-FFF2-40B4-BE49-F238E27FC236}">
+                    <a16:creationId xmlns:a16="http://schemas.microsoft.com/office/drawing/2014/main" id="{54E15CD9-12D7-2621-8CC1-AD530E45C816}"/>
+                  </a:ext>
+                </a:extLst>
+              </p:cNvPr>
+              <p:cNvCxnSpPr>
+                <a:cxnSpLocks/>
+                <a:stCxn id="20" idx="2"/>
+                <a:endCxn id="23" idx="1"/>
+              </p:cNvCxnSpPr>
+              <p:nvPr/>
+            </p:nvCxnSpPr>
+            <p:spPr>
+              <a:xfrm flipH="1">
+                <a:off x="7204219" y="3799724"/>
+                <a:ext cx="1" cy="305595"/>
+              </a:xfrm>
+              <a:prstGeom prst="straightConnector1">
+                <a:avLst/>
+              </a:prstGeom>
+              <a:ln w="12700">
+                <a:solidFill>
+                  <a:srgbClr val="FF7C80"/>
+                </a:solidFill>
+                <a:tailEnd type="triangle"/>
+              </a:ln>
+            </p:spPr>
+            <p:style>
+              <a:lnRef idx="1">
+                <a:schemeClr val="accent1"/>
+              </a:lnRef>
+              <a:fillRef idx="0">
+                <a:schemeClr val="accent1"/>
+              </a:fillRef>
+              <a:effectRef idx="0">
+                <a:schemeClr val="accent1"/>
+              </a:effectRef>
+              <a:fontRef idx="minor">
+                <a:schemeClr val="tx1"/>
+              </a:fontRef>
+            </p:style>
+          </p:cxnSp>
+          <p:sp>
+            <p:nvSpPr>
+              <p:cNvPr id="67" name="TextBox 66">
+                <a:extLst>
+                  <a:ext uri="{FF2B5EF4-FFF2-40B4-BE49-F238E27FC236}">
+                    <a16:creationId xmlns:a16="http://schemas.microsoft.com/office/drawing/2014/main" id="{71DBA315-543B-0F12-FA1C-E14B1F6743FA}"/>
+                  </a:ext>
+                </a:extLst>
+              </p:cNvPr>
+              <p:cNvSpPr txBox="1"/>
+              <p:nvPr/>
+            </p:nvSpPr>
+            <p:spPr>
+              <a:xfrm>
+                <a:off x="5902806" y="3047821"/>
+                <a:ext cx="269626" cy="276999"/>
+              </a:xfrm>
+              <a:prstGeom prst="rect">
+                <a:avLst/>
+              </a:prstGeom>
+              <a:noFill/>
+            </p:spPr>
+            <p:txBody>
+              <a:bodyPr wrap="none" rtlCol="0">
+                <a:spAutoFit/>
+              </a:bodyPr>
+              <a:lstStyle/>
+              <a:p>
+                <a:r>
+                  <a:rPr lang="en-US" sz="1200" dirty="0">
+                    <a:solidFill>
+                      <a:srgbClr val="FF7C80"/>
+                    </a:solidFill>
+                    <a:latin typeface="Open Sans" panose="020B0606030504020204" pitchFamily="34" charset="0"/>
+                    <a:ea typeface="Open Sans" panose="020B0606030504020204" pitchFamily="34" charset="0"/>
+                    <a:cs typeface="Open Sans" panose="020B0606030504020204" pitchFamily="34" charset="0"/>
+                  </a:rPr>
+                  <a:t>T</a:t>
+                </a:r>
+              </a:p>
+            </p:txBody>
+          </p:sp>
+          <p:sp>
+            <p:nvSpPr>
+              <p:cNvPr id="68" name="TextBox 67">
+                <a:extLst>
+                  <a:ext uri="{FF2B5EF4-FFF2-40B4-BE49-F238E27FC236}">
+                    <a16:creationId xmlns:a16="http://schemas.microsoft.com/office/drawing/2014/main" id="{2ED542CE-5B3C-F3CD-4EC7-09EC4ED14A09}"/>
+                  </a:ext>
+                </a:extLst>
+              </p:cNvPr>
+              <p:cNvSpPr txBox="1"/>
+              <p:nvPr/>
+            </p:nvSpPr>
+            <p:spPr>
+              <a:xfrm>
+                <a:off x="4985789" y="2564150"/>
+                <a:ext cx="269626" cy="276999"/>
+              </a:xfrm>
+              <a:prstGeom prst="rect">
+                <a:avLst/>
+              </a:prstGeom>
+              <a:noFill/>
+            </p:spPr>
+            <p:txBody>
+              <a:bodyPr wrap="none" rtlCol="0">
+                <a:spAutoFit/>
+              </a:bodyPr>
+              <a:lstStyle/>
+              <a:p>
+                <a:r>
+                  <a:rPr lang="en-US" sz="1200" dirty="0">
+                    <a:solidFill>
+                      <a:srgbClr val="FF7C80"/>
+                    </a:solidFill>
+                    <a:latin typeface="Open Sans" panose="020B0606030504020204" pitchFamily="34" charset="0"/>
+                    <a:ea typeface="Open Sans" panose="020B0606030504020204" pitchFamily="34" charset="0"/>
+                    <a:cs typeface="Open Sans" panose="020B0606030504020204" pitchFamily="34" charset="0"/>
+                  </a:rPr>
+                  <a:t>F</a:t>
+                </a:r>
+              </a:p>
+            </p:txBody>
+          </p:sp>
+          <p:sp>
+            <p:nvSpPr>
+              <p:cNvPr id="47" name="Flowchart: Data 46">
+                <a:extLst>
+                  <a:ext uri="{FF2B5EF4-FFF2-40B4-BE49-F238E27FC236}">
+                    <a16:creationId xmlns:a16="http://schemas.microsoft.com/office/drawing/2014/main" id="{4844740F-0C63-482C-2229-A7F3B3B77353}"/>
+                  </a:ext>
+                </a:extLst>
+              </p:cNvPr>
+              <p:cNvSpPr/>
+              <p:nvPr/>
+            </p:nvSpPr>
+            <p:spPr>
+              <a:xfrm>
+                <a:off x="6281797" y="2074866"/>
+                <a:ext cx="1844844" cy="489284"/>
+              </a:xfrm>
+              <a:prstGeom prst="flowChartInputOutput">
+                <a:avLst/>
+              </a:prstGeom>
+              <a:noFill/>
+              <a:ln>
+                <a:solidFill>
+                  <a:srgbClr val="CC99FF"/>
+                </a:solidFill>
+              </a:ln>
+            </p:spPr>
+            <p:style>
+              <a:lnRef idx="2">
+                <a:schemeClr val="accent1">
+                  <a:shade val="50000"/>
+                </a:schemeClr>
+              </a:lnRef>
+              <a:fillRef idx="1">
+                <a:schemeClr val="accent1"/>
+              </a:fillRef>
+              <a:effectRef idx="0">
+                <a:schemeClr val="accent1"/>
+              </a:effectRef>
+              <a:fontRef idx="minor">
+                <a:schemeClr val="lt1"/>
+              </a:fontRef>
+            </p:style>
+            <p:txBody>
+              <a:bodyPr rtlCol="0" anchor="ctr"/>
+              <a:lstStyle/>
+              <a:p>
+                <a:pPr algn="ctr"/>
+                <a:r>
+                  <a:rPr lang="en-US" sz="1200" dirty="0">
+                    <a:solidFill>
+                      <a:schemeClr val="bg1">
+                        <a:lumMod val="85000"/>
+                      </a:schemeClr>
+                    </a:solidFill>
+                    <a:latin typeface="Open Sans" panose="020B0606030504020204" pitchFamily="34" charset="0"/>
+                    <a:ea typeface="Open Sans" panose="020B0606030504020204" pitchFamily="34" charset="0"/>
+                    <a:cs typeface="Open Sans" panose="020B0606030504020204" pitchFamily="34" charset="0"/>
+                  </a:rPr>
+                  <a:t>large</a:t>
+                </a:r>
+              </a:p>
+            </p:txBody>
+          </p:sp>
+          <p:cxnSp>
+            <p:nvCxnSpPr>
+              <p:cNvPr id="31" name="Connector: Elbow 30">
+                <a:extLst>
+                  <a:ext uri="{FF2B5EF4-FFF2-40B4-BE49-F238E27FC236}">
+                    <a16:creationId xmlns:a16="http://schemas.microsoft.com/office/drawing/2014/main" id="{C10BE16C-8483-6B07-C0FD-50BF3FFAC067}"/>
+                  </a:ext>
+                </a:extLst>
+              </p:cNvPr>
+              <p:cNvCxnSpPr>
+                <a:stCxn id="46" idx="0"/>
+                <a:endCxn id="47" idx="2"/>
+              </p:cNvCxnSpPr>
+              <p:nvPr/>
+            </p:nvCxnSpPr>
+            <p:spPr>
+              <a:xfrm rot="5400000" flipH="1" flipV="1">
+                <a:off x="5459492" y="1851208"/>
+                <a:ext cx="538489" cy="1475090"/>
+              </a:xfrm>
+              <a:prstGeom prst="bentConnector2">
+                <a:avLst/>
+              </a:prstGeom>
+              <a:ln w="12700">
+                <a:solidFill>
+                  <a:srgbClr val="FF7C80"/>
+                </a:solidFill>
+                <a:tailEnd type="triangle"/>
+              </a:ln>
+            </p:spPr>
+            <p:style>
+              <a:lnRef idx="1">
+                <a:schemeClr val="accent1"/>
+              </a:lnRef>
+              <a:fillRef idx="0">
+                <a:schemeClr val="accent1"/>
+              </a:fillRef>
+              <a:effectRef idx="0">
+                <a:schemeClr val="accent1"/>
+              </a:effectRef>
+              <a:fontRef idx="minor">
+                <a:schemeClr val="tx1"/>
+              </a:fontRef>
+            </p:style>
+          </p:cxnSp>
+          <p:cxnSp>
+            <p:nvCxnSpPr>
+              <p:cNvPr id="36" name="Straight Arrow Connector 35">
+                <a:extLst>
+                  <a:ext uri="{FF2B5EF4-FFF2-40B4-BE49-F238E27FC236}">
+                    <a16:creationId xmlns:a16="http://schemas.microsoft.com/office/drawing/2014/main" id="{DE612D05-355D-36CC-561F-47591CC866FB}"/>
+                  </a:ext>
+                </a:extLst>
+              </p:cNvPr>
+              <p:cNvCxnSpPr>
+                <a:cxnSpLocks/>
+                <a:stCxn id="47" idx="5"/>
+                <a:endCxn id="19" idx="2"/>
+              </p:cNvCxnSpPr>
+              <p:nvPr/>
+            </p:nvCxnSpPr>
+            <p:spPr>
+              <a:xfrm>
+                <a:off x="7942157" y="2319508"/>
+                <a:ext cx="740567" cy="0"/>
+              </a:xfrm>
+              <a:prstGeom prst="straightConnector1">
+                <a:avLst/>
+              </a:prstGeom>
+              <a:ln w="12700">
+                <a:solidFill>
+                  <a:srgbClr val="CC99FF"/>
+                </a:solidFill>
+                <a:tailEnd type="triangle"/>
+              </a:ln>
+            </p:spPr>
+            <p:style>
+              <a:lnRef idx="1">
+                <a:schemeClr val="accent1"/>
+              </a:lnRef>
+              <a:fillRef idx="0">
+                <a:schemeClr val="accent1"/>
+              </a:fillRef>
+              <a:effectRef idx="0">
+                <a:schemeClr val="accent1"/>
+              </a:effectRef>
+              <a:fontRef idx="minor">
+                <a:schemeClr val="tx1"/>
+              </a:fontRef>
+            </p:style>
+          </p:cxnSp>
+        </p:grpSp>
+      </p:grpSp>
     </p:spTree>
     <p:extLst>
       <p:ext uri="{BB962C8B-B14F-4D97-AF65-F5344CB8AC3E}">
-        <p14:creationId xmlns:p14="http://schemas.microsoft.com/office/powerpoint/2010/main" val="2807625748"/>
+        <p14:creationId xmlns:p14="http://schemas.microsoft.com/office/powerpoint/2010/main" val="3202339316"/>
       </p:ext>
     </p:extLst>
   </p:cSld>
@@ -19898,6 +20651,803 @@
     <p:extLst>
       <p:ext uri="{BB962C8B-B14F-4D97-AF65-F5344CB8AC3E}">
         <p14:creationId xmlns:p14="http://schemas.microsoft.com/office/powerpoint/2010/main" val="2424013946"/>
+      </p:ext>
+    </p:extLst>
+  </p:cSld>
+  <p:clrMapOvr>
+    <a:masterClrMapping/>
+  </p:clrMapOvr>
+</p:sld>
+</file>
+
+<file path=ppt/slides/slide20.xml><?xml version="1.0" encoding="utf-8"?>
+<p:sld xmlns:a="http://schemas.openxmlformats.org/drawingml/2006/main" xmlns:r="http://schemas.openxmlformats.org/officeDocument/2006/relationships" xmlns:p="http://schemas.openxmlformats.org/presentationml/2006/main">
+  <p:cSld>
+    <p:spTree>
+      <p:nvGrpSpPr>
+        <p:cNvPr id="1" name=""/>
+        <p:cNvGrpSpPr/>
+        <p:nvPr/>
+      </p:nvGrpSpPr>
+      <p:grpSpPr>
+        <a:xfrm>
+          <a:off x="0" y="0"/>
+          <a:ext cx="0" cy="0"/>
+          <a:chOff x="0" y="0"/>
+          <a:chExt cx="0" cy="0"/>
+        </a:xfrm>
+      </p:grpSpPr>
+      <p:sp>
+        <p:nvSpPr>
+          <p:cNvPr id="108" name="Rectangle 107">
+            <a:extLst>
+              <a:ext uri="{FF2B5EF4-FFF2-40B4-BE49-F238E27FC236}">
+                <a16:creationId xmlns:a16="http://schemas.microsoft.com/office/drawing/2014/main" id="{F5A5FD62-A99C-04B6-706B-DEE9B81AF541}"/>
+              </a:ext>
+            </a:extLst>
+          </p:cNvPr>
+          <p:cNvSpPr/>
+          <p:nvPr/>
+        </p:nvSpPr>
+        <p:spPr>
+          <a:xfrm>
+            <a:off x="3645392" y="1315453"/>
+            <a:ext cx="7327942" cy="4227094"/>
+          </a:xfrm>
+          <a:prstGeom prst="rect">
+            <a:avLst/>
+          </a:prstGeom>
+          <a:solidFill>
+            <a:srgbClr val="0F1017"/>
+          </a:solidFill>
+          <a:ln w="12700">
+            <a:solidFill>
+              <a:schemeClr val="bg1">
+                <a:lumMod val="75000"/>
+              </a:schemeClr>
+            </a:solidFill>
+          </a:ln>
+        </p:spPr>
+        <p:style>
+          <a:lnRef idx="2">
+            <a:schemeClr val="accent1">
+              <a:shade val="50000"/>
+            </a:schemeClr>
+          </a:lnRef>
+          <a:fillRef idx="1">
+            <a:schemeClr val="accent1"/>
+          </a:fillRef>
+          <a:effectRef idx="0">
+            <a:schemeClr val="accent1"/>
+          </a:effectRef>
+          <a:fontRef idx="minor">
+            <a:schemeClr val="lt1"/>
+          </a:fontRef>
+        </p:style>
+        <p:txBody>
+          <a:bodyPr rtlCol="0" anchor="ctr"/>
+          <a:lstStyle/>
+          <a:p>
+            <a:pPr algn="ctr"/>
+            <a:endParaRPr lang="en-US" sz="1800" dirty="0">
+              <a:solidFill>
+                <a:schemeClr val="bg1">
+                  <a:lumMod val="85000"/>
+                </a:schemeClr>
+              </a:solidFill>
+              <a:latin typeface="Open Sans" panose="020B0606030504020204" pitchFamily="34" charset="0"/>
+              <a:ea typeface="Open Sans" panose="020B0606030504020204" pitchFamily="34" charset="0"/>
+              <a:cs typeface="Open Sans" panose="020B0606030504020204" pitchFamily="34" charset="0"/>
+            </a:endParaRPr>
+          </a:p>
+        </p:txBody>
+      </p:sp>
+      <p:sp>
+        <p:nvSpPr>
+          <p:cNvPr id="59" name="Flowchart: Terminator 58">
+            <a:extLst>
+              <a:ext uri="{FF2B5EF4-FFF2-40B4-BE49-F238E27FC236}">
+                <a16:creationId xmlns:a16="http://schemas.microsoft.com/office/drawing/2014/main" id="{D7554AAC-5F81-46CA-BA4E-6CDF6B8CC5AD}"/>
+              </a:ext>
+            </a:extLst>
+          </p:cNvPr>
+          <p:cNvSpPr/>
+          <p:nvPr/>
+        </p:nvSpPr>
+        <p:spPr>
+          <a:xfrm>
+            <a:off x="4572180" y="1739895"/>
+            <a:ext cx="1050758" cy="341690"/>
+          </a:xfrm>
+          <a:prstGeom prst="flowChartTerminator">
+            <a:avLst/>
+          </a:prstGeom>
+          <a:noFill/>
+          <a:ln>
+            <a:solidFill>
+              <a:schemeClr val="bg1">
+                <a:lumMod val="75000"/>
+              </a:schemeClr>
+            </a:solidFill>
+          </a:ln>
+        </p:spPr>
+        <p:style>
+          <a:lnRef idx="2">
+            <a:schemeClr val="accent1">
+              <a:shade val="50000"/>
+            </a:schemeClr>
+          </a:lnRef>
+          <a:fillRef idx="1">
+            <a:schemeClr val="accent1"/>
+          </a:fillRef>
+          <a:effectRef idx="0">
+            <a:schemeClr val="accent1"/>
+          </a:effectRef>
+          <a:fontRef idx="minor">
+            <a:schemeClr val="lt1"/>
+          </a:fontRef>
+        </p:style>
+        <p:txBody>
+          <a:bodyPr rtlCol="0" anchor="ctr"/>
+          <a:lstStyle/>
+          <a:p>
+            <a:pPr algn="ctr"/>
+            <a:r>
+              <a:rPr lang="en-US" sz="1200" dirty="0">
+                <a:solidFill>
+                  <a:schemeClr val="bg1">
+                    <a:lumMod val="85000"/>
+                  </a:schemeClr>
+                </a:solidFill>
+                <a:latin typeface="Open Sans" panose="020B0606030504020204" pitchFamily="34" charset="0"/>
+                <a:ea typeface="Open Sans" panose="020B0606030504020204" pitchFamily="34" charset="0"/>
+                <a:cs typeface="Open Sans" panose="020B0606030504020204" pitchFamily="34" charset="0"/>
+              </a:rPr>
+              <a:t>START</a:t>
+            </a:r>
+          </a:p>
+        </p:txBody>
+      </p:sp>
+      <p:sp>
+        <p:nvSpPr>
+          <p:cNvPr id="60" name="Flowchart: Terminator 59">
+            <a:extLst>
+              <a:ext uri="{FF2B5EF4-FFF2-40B4-BE49-F238E27FC236}">
+                <a16:creationId xmlns:a16="http://schemas.microsoft.com/office/drawing/2014/main" id="{103191FC-37A5-724C-C214-882B4B9F6C89}"/>
+              </a:ext>
+            </a:extLst>
+          </p:cNvPr>
+          <p:cNvSpPr/>
+          <p:nvPr/>
+        </p:nvSpPr>
+        <p:spPr>
+          <a:xfrm>
+            <a:off x="9000424" y="1739895"/>
+            <a:ext cx="1050758" cy="341690"/>
+          </a:xfrm>
+          <a:prstGeom prst="flowChartTerminator">
+            <a:avLst/>
+          </a:prstGeom>
+          <a:noFill/>
+          <a:ln>
+            <a:solidFill>
+              <a:schemeClr val="bg1">
+                <a:lumMod val="75000"/>
+              </a:schemeClr>
+            </a:solidFill>
+          </a:ln>
+        </p:spPr>
+        <p:style>
+          <a:lnRef idx="2">
+            <a:schemeClr val="accent1">
+              <a:shade val="50000"/>
+            </a:schemeClr>
+          </a:lnRef>
+          <a:fillRef idx="1">
+            <a:schemeClr val="accent1"/>
+          </a:fillRef>
+          <a:effectRef idx="0">
+            <a:schemeClr val="accent1"/>
+          </a:effectRef>
+          <a:fontRef idx="minor">
+            <a:schemeClr val="lt1"/>
+          </a:fontRef>
+        </p:style>
+        <p:txBody>
+          <a:bodyPr rtlCol="0" anchor="ctr"/>
+          <a:lstStyle/>
+          <a:p>
+            <a:pPr algn="ctr"/>
+            <a:r>
+              <a:rPr lang="en-US" sz="1200" dirty="0">
+                <a:solidFill>
+                  <a:schemeClr val="bg1">
+                    <a:lumMod val="85000"/>
+                  </a:schemeClr>
+                </a:solidFill>
+                <a:latin typeface="Open Sans" panose="020B0606030504020204" pitchFamily="34" charset="0"/>
+                <a:ea typeface="Open Sans" panose="020B0606030504020204" pitchFamily="34" charset="0"/>
+                <a:cs typeface="Open Sans" panose="020B0606030504020204" pitchFamily="34" charset="0"/>
+              </a:rPr>
+              <a:t>STOP</a:t>
+            </a:r>
+          </a:p>
+        </p:txBody>
+      </p:sp>
+      <p:cxnSp>
+        <p:nvCxnSpPr>
+          <p:cNvPr id="61" name="Straight Arrow Connector 60">
+            <a:extLst>
+              <a:ext uri="{FF2B5EF4-FFF2-40B4-BE49-F238E27FC236}">
+                <a16:creationId xmlns:a16="http://schemas.microsoft.com/office/drawing/2014/main" id="{A1BBCFB3-141A-F3B8-67BE-C05995E64053}"/>
+              </a:ext>
+            </a:extLst>
+          </p:cNvPr>
+          <p:cNvCxnSpPr>
+            <a:cxnSpLocks/>
+            <a:stCxn id="59" idx="2"/>
+          </p:cNvCxnSpPr>
+          <p:nvPr/>
+        </p:nvCxnSpPr>
+        <p:spPr>
+          <a:xfrm flipH="1">
+            <a:off x="5092921" y="2081585"/>
+            <a:ext cx="4638" cy="341690"/>
+          </a:xfrm>
+          <a:prstGeom prst="straightConnector1">
+            <a:avLst/>
+          </a:prstGeom>
+          <a:ln w="12700">
+            <a:solidFill>
+              <a:schemeClr val="bg1">
+                <a:lumMod val="75000"/>
+              </a:schemeClr>
+            </a:solidFill>
+            <a:tailEnd type="triangle"/>
+          </a:ln>
+        </p:spPr>
+        <p:style>
+          <a:lnRef idx="1">
+            <a:schemeClr val="accent1"/>
+          </a:lnRef>
+          <a:fillRef idx="0">
+            <a:schemeClr val="accent1"/>
+          </a:fillRef>
+          <a:effectRef idx="0">
+            <a:schemeClr val="accent1"/>
+          </a:effectRef>
+          <a:fontRef idx="minor">
+            <a:schemeClr val="tx1"/>
+          </a:fontRef>
+        </p:style>
+      </p:cxnSp>
+      <p:cxnSp>
+        <p:nvCxnSpPr>
+          <p:cNvPr id="18" name="Straight Arrow Connector 17">
+            <a:extLst>
+              <a:ext uri="{FF2B5EF4-FFF2-40B4-BE49-F238E27FC236}">
+                <a16:creationId xmlns:a16="http://schemas.microsoft.com/office/drawing/2014/main" id="{28D76C1F-C45D-8EEF-E187-E9E48161CAB0}"/>
+              </a:ext>
+            </a:extLst>
+          </p:cNvPr>
+          <p:cNvCxnSpPr>
+            <a:cxnSpLocks/>
+            <a:endCxn id="60" idx="2"/>
+          </p:cNvCxnSpPr>
+          <p:nvPr/>
+        </p:nvCxnSpPr>
+        <p:spPr>
+          <a:xfrm flipV="1">
+            <a:off x="9525803" y="2081585"/>
+            <a:ext cx="0" cy="296780"/>
+          </a:xfrm>
+          <a:prstGeom prst="straightConnector1">
+            <a:avLst/>
+          </a:prstGeom>
+          <a:ln w="12700">
+            <a:solidFill>
+              <a:srgbClr val="CC99FF"/>
+            </a:solidFill>
+            <a:tailEnd type="triangle"/>
+          </a:ln>
+        </p:spPr>
+        <p:style>
+          <a:lnRef idx="1">
+            <a:schemeClr val="accent1"/>
+          </a:lnRef>
+          <a:fillRef idx="0">
+            <a:schemeClr val="accent1"/>
+          </a:fillRef>
+          <a:effectRef idx="0">
+            <a:schemeClr val="accent1"/>
+          </a:effectRef>
+          <a:fontRef idx="minor">
+            <a:schemeClr val="tx1"/>
+          </a:fontRef>
+        </p:style>
+      </p:cxnSp>
+      <p:sp>
+        <p:nvSpPr>
+          <p:cNvPr id="29" name="Flowchart: Terminator 28">
+            <a:extLst>
+              <a:ext uri="{FF2B5EF4-FFF2-40B4-BE49-F238E27FC236}">
+                <a16:creationId xmlns:a16="http://schemas.microsoft.com/office/drawing/2014/main" id="{97EBF7DD-2035-166F-CFA5-6B352DAE8ECC}"/>
+              </a:ext>
+            </a:extLst>
+          </p:cNvPr>
+          <p:cNvSpPr/>
+          <p:nvPr/>
+        </p:nvSpPr>
+        <p:spPr>
+          <a:xfrm>
+            <a:off x="1218666" y="649032"/>
+            <a:ext cx="1050758" cy="341690"/>
+          </a:xfrm>
+          <a:prstGeom prst="flowChartTerminator">
+            <a:avLst/>
+          </a:prstGeom>
+          <a:noFill/>
+          <a:ln>
+            <a:solidFill>
+              <a:schemeClr val="bg1">
+                <a:lumMod val="75000"/>
+              </a:schemeClr>
+            </a:solidFill>
+          </a:ln>
+        </p:spPr>
+        <p:style>
+          <a:lnRef idx="2">
+            <a:schemeClr val="accent1">
+              <a:shade val="50000"/>
+            </a:schemeClr>
+          </a:lnRef>
+          <a:fillRef idx="1">
+            <a:schemeClr val="accent1"/>
+          </a:fillRef>
+          <a:effectRef idx="0">
+            <a:schemeClr val="accent1"/>
+          </a:effectRef>
+          <a:fontRef idx="minor">
+            <a:schemeClr val="lt1"/>
+          </a:fontRef>
+        </p:style>
+        <p:txBody>
+          <a:bodyPr rtlCol="0" anchor="ctr"/>
+          <a:lstStyle/>
+          <a:p>
+            <a:pPr algn="ctr"/>
+            <a:r>
+              <a:rPr lang="en-US" sz="1200" dirty="0">
+                <a:solidFill>
+                  <a:schemeClr val="bg1">
+                    <a:lumMod val="85000"/>
+                  </a:schemeClr>
+                </a:solidFill>
+                <a:latin typeface="Open Sans" panose="020B0606030504020204" pitchFamily="34" charset="0"/>
+                <a:ea typeface="Open Sans" panose="020B0606030504020204" pitchFamily="34" charset="0"/>
+                <a:cs typeface="Open Sans" panose="020B0606030504020204" pitchFamily="34" charset="0"/>
+              </a:rPr>
+              <a:t>Start</a:t>
+            </a:r>
+          </a:p>
+        </p:txBody>
+      </p:sp>
+      <p:sp>
+        <p:nvSpPr>
+          <p:cNvPr id="31" name="Flowchart: Terminator 30">
+            <a:extLst>
+              <a:ext uri="{FF2B5EF4-FFF2-40B4-BE49-F238E27FC236}">
+                <a16:creationId xmlns:a16="http://schemas.microsoft.com/office/drawing/2014/main" id="{B46FF1EB-056C-88CD-27DB-132AB41F0506}"/>
+              </a:ext>
+            </a:extLst>
+          </p:cNvPr>
+          <p:cNvSpPr/>
+          <p:nvPr/>
+        </p:nvSpPr>
+        <p:spPr>
+          <a:xfrm>
+            <a:off x="1218666" y="1262521"/>
+            <a:ext cx="1050758" cy="341690"/>
+          </a:xfrm>
+          <a:prstGeom prst="flowChartTerminator">
+            <a:avLst/>
+          </a:prstGeom>
+          <a:noFill/>
+          <a:ln>
+            <a:solidFill>
+              <a:schemeClr val="bg1">
+                <a:lumMod val="75000"/>
+              </a:schemeClr>
+            </a:solidFill>
+          </a:ln>
+        </p:spPr>
+        <p:style>
+          <a:lnRef idx="2">
+            <a:schemeClr val="accent1">
+              <a:shade val="50000"/>
+            </a:schemeClr>
+          </a:lnRef>
+          <a:fillRef idx="1">
+            <a:schemeClr val="accent1"/>
+          </a:fillRef>
+          <a:effectRef idx="0">
+            <a:schemeClr val="accent1"/>
+          </a:effectRef>
+          <a:fontRef idx="minor">
+            <a:schemeClr val="lt1"/>
+          </a:fontRef>
+        </p:style>
+        <p:txBody>
+          <a:bodyPr rtlCol="0" anchor="ctr"/>
+          <a:lstStyle/>
+          <a:p>
+            <a:pPr algn="ctr"/>
+            <a:r>
+              <a:rPr lang="en-US" sz="1200" dirty="0">
+                <a:solidFill>
+                  <a:schemeClr val="bg1">
+                    <a:lumMod val="85000"/>
+                  </a:schemeClr>
+                </a:solidFill>
+                <a:latin typeface="Open Sans" panose="020B0606030504020204" pitchFamily="34" charset="0"/>
+                <a:ea typeface="Open Sans" panose="020B0606030504020204" pitchFamily="34" charset="0"/>
+                <a:cs typeface="Open Sans" panose="020B0606030504020204" pitchFamily="34" charset="0"/>
+              </a:rPr>
+              <a:t>Stop</a:t>
+            </a:r>
+          </a:p>
+        </p:txBody>
+      </p:sp>
+      <p:sp>
+        <p:nvSpPr>
+          <p:cNvPr id="34" name="Rectangle 33">
+            <a:extLst>
+              <a:ext uri="{FF2B5EF4-FFF2-40B4-BE49-F238E27FC236}">
+                <a16:creationId xmlns:a16="http://schemas.microsoft.com/office/drawing/2014/main" id="{A8D64967-4F28-2958-EE17-93FB9B3EDEEA}"/>
+              </a:ext>
+            </a:extLst>
+          </p:cNvPr>
+          <p:cNvSpPr/>
+          <p:nvPr/>
+        </p:nvSpPr>
+        <p:spPr>
+          <a:xfrm>
+            <a:off x="821623" y="3132324"/>
+            <a:ext cx="1844844" cy="393032"/>
+          </a:xfrm>
+          <a:prstGeom prst="rect">
+            <a:avLst/>
+          </a:prstGeom>
+          <a:noFill/>
+          <a:ln>
+            <a:solidFill>
+              <a:schemeClr val="accent6">
+                <a:lumMod val="60000"/>
+                <a:lumOff val="40000"/>
+              </a:schemeClr>
+            </a:solidFill>
+          </a:ln>
+        </p:spPr>
+        <p:style>
+          <a:lnRef idx="2">
+            <a:schemeClr val="accent1">
+              <a:shade val="50000"/>
+            </a:schemeClr>
+          </a:lnRef>
+          <a:fillRef idx="1">
+            <a:schemeClr val="accent1"/>
+          </a:fillRef>
+          <a:effectRef idx="0">
+            <a:schemeClr val="accent1"/>
+          </a:effectRef>
+          <a:fontRef idx="minor">
+            <a:schemeClr val="lt1"/>
+          </a:fontRef>
+        </p:style>
+        <p:txBody>
+          <a:bodyPr rtlCol="0" anchor="ctr"/>
+          <a:lstStyle/>
+          <a:p>
+            <a:pPr algn="ctr"/>
+            <a:r>
+              <a:rPr lang="en-US" sz="1200" dirty="0">
+                <a:solidFill>
+                  <a:schemeClr val="bg1">
+                    <a:lumMod val="85000"/>
+                  </a:schemeClr>
+                </a:solidFill>
+                <a:latin typeface="Open Sans" panose="020B0606030504020204" pitchFamily="34" charset="0"/>
+                <a:ea typeface="Open Sans" panose="020B0606030504020204" pitchFamily="34" charset="0"/>
+                <a:cs typeface="Open Sans" panose="020B0606030504020204" pitchFamily="34" charset="0"/>
+              </a:rPr>
+              <a:t>action / process</a:t>
+            </a:r>
+          </a:p>
+        </p:txBody>
+      </p:sp>
+      <p:sp>
+        <p:nvSpPr>
+          <p:cNvPr id="39" name="Flowchart: Data 38">
+            <a:extLst>
+              <a:ext uri="{FF2B5EF4-FFF2-40B4-BE49-F238E27FC236}">
+                <a16:creationId xmlns:a16="http://schemas.microsoft.com/office/drawing/2014/main" id="{84DF5FB3-6B18-6E52-CED0-52B59C223732}"/>
+              </a:ext>
+            </a:extLst>
+          </p:cNvPr>
+          <p:cNvSpPr/>
+          <p:nvPr/>
+        </p:nvSpPr>
+        <p:spPr>
+          <a:xfrm>
+            <a:off x="821623" y="2125701"/>
+            <a:ext cx="1844844" cy="489284"/>
+          </a:xfrm>
+          <a:prstGeom prst="flowChartInputOutput">
+            <a:avLst/>
+          </a:prstGeom>
+          <a:noFill/>
+          <a:ln>
+            <a:solidFill>
+              <a:schemeClr val="accent1">
+                <a:lumMod val="60000"/>
+                <a:lumOff val="40000"/>
+              </a:schemeClr>
+            </a:solidFill>
+          </a:ln>
+        </p:spPr>
+        <p:style>
+          <a:lnRef idx="2">
+            <a:schemeClr val="accent1">
+              <a:shade val="50000"/>
+            </a:schemeClr>
+          </a:lnRef>
+          <a:fillRef idx="1">
+            <a:schemeClr val="accent1"/>
+          </a:fillRef>
+          <a:effectRef idx="0">
+            <a:schemeClr val="accent1"/>
+          </a:effectRef>
+          <a:fontRef idx="minor">
+            <a:schemeClr val="lt1"/>
+          </a:fontRef>
+        </p:style>
+        <p:txBody>
+          <a:bodyPr rtlCol="0" anchor="ctr"/>
+          <a:lstStyle/>
+          <a:p>
+            <a:pPr algn="ctr"/>
+            <a:r>
+              <a:rPr lang="en-US" sz="1200" dirty="0">
+                <a:solidFill>
+                  <a:schemeClr val="bg1">
+                    <a:lumMod val="85000"/>
+                  </a:schemeClr>
+                </a:solidFill>
+                <a:latin typeface="Open Sans" panose="020B0606030504020204" pitchFamily="34" charset="0"/>
+                <a:ea typeface="Open Sans" panose="020B0606030504020204" pitchFamily="34" charset="0"/>
+                <a:cs typeface="Open Sans" panose="020B0606030504020204" pitchFamily="34" charset="0"/>
+              </a:rPr>
+              <a:t>input</a:t>
+            </a:r>
+          </a:p>
+        </p:txBody>
+      </p:sp>
+      <p:sp>
+        <p:nvSpPr>
+          <p:cNvPr id="46" name="Flowchart: Decision 45">
+            <a:extLst>
+              <a:ext uri="{FF2B5EF4-FFF2-40B4-BE49-F238E27FC236}">
+                <a16:creationId xmlns:a16="http://schemas.microsoft.com/office/drawing/2014/main" id="{265FEB22-D05F-9423-661B-B86264CDC339}"/>
+              </a:ext>
+            </a:extLst>
+          </p:cNvPr>
+          <p:cNvSpPr/>
+          <p:nvPr/>
+        </p:nvSpPr>
+        <p:spPr>
+          <a:xfrm>
+            <a:off x="821623" y="4052904"/>
+            <a:ext cx="1844844" cy="946484"/>
+          </a:xfrm>
+          <a:prstGeom prst="flowChartDecision">
+            <a:avLst/>
+          </a:prstGeom>
+          <a:noFill/>
+          <a:ln>
+            <a:solidFill>
+              <a:srgbClr val="FF7C80"/>
+            </a:solidFill>
+          </a:ln>
+        </p:spPr>
+        <p:style>
+          <a:lnRef idx="2">
+            <a:schemeClr val="accent1">
+              <a:shade val="50000"/>
+            </a:schemeClr>
+          </a:lnRef>
+          <a:fillRef idx="1">
+            <a:schemeClr val="accent1"/>
+          </a:fillRef>
+          <a:effectRef idx="0">
+            <a:schemeClr val="accent1"/>
+          </a:effectRef>
+          <a:fontRef idx="minor">
+            <a:schemeClr val="lt1"/>
+          </a:fontRef>
+        </p:style>
+        <p:txBody>
+          <a:bodyPr rtlCol="0" anchor="ctr"/>
+          <a:lstStyle/>
+          <a:p>
+            <a:pPr algn="ctr"/>
+            <a:r>
+              <a:rPr lang="en-US" sz="1200" dirty="0">
+                <a:solidFill>
+                  <a:schemeClr val="bg1">
+                    <a:lumMod val="85000"/>
+                  </a:schemeClr>
+                </a:solidFill>
+                <a:latin typeface="Open Sans" panose="020B0606030504020204" pitchFamily="34" charset="0"/>
+                <a:ea typeface="Open Sans" panose="020B0606030504020204" pitchFamily="34" charset="0"/>
+                <a:cs typeface="Open Sans" panose="020B0606030504020204" pitchFamily="34" charset="0"/>
+              </a:rPr>
+              <a:t>decision</a:t>
+            </a:r>
+          </a:p>
+        </p:txBody>
+      </p:sp>
+      <p:sp>
+        <p:nvSpPr>
+          <p:cNvPr id="47" name="Flowchart: Data 46">
+            <a:extLst>
+              <a:ext uri="{FF2B5EF4-FFF2-40B4-BE49-F238E27FC236}">
+                <a16:creationId xmlns:a16="http://schemas.microsoft.com/office/drawing/2014/main" id="{E79F7B5C-9F7D-5907-4BED-1DDC3947E632}"/>
+              </a:ext>
+            </a:extLst>
+          </p:cNvPr>
+          <p:cNvSpPr/>
+          <p:nvPr/>
+        </p:nvSpPr>
+        <p:spPr>
+          <a:xfrm>
+            <a:off x="821623" y="5526936"/>
+            <a:ext cx="1844844" cy="489284"/>
+          </a:xfrm>
+          <a:prstGeom prst="flowChartInputOutput">
+            <a:avLst/>
+          </a:prstGeom>
+          <a:noFill/>
+          <a:ln>
+            <a:solidFill>
+              <a:srgbClr val="CC99FF"/>
+            </a:solidFill>
+          </a:ln>
+        </p:spPr>
+        <p:style>
+          <a:lnRef idx="2">
+            <a:schemeClr val="accent1">
+              <a:shade val="50000"/>
+            </a:schemeClr>
+          </a:lnRef>
+          <a:fillRef idx="1">
+            <a:schemeClr val="accent1"/>
+          </a:fillRef>
+          <a:effectRef idx="0">
+            <a:schemeClr val="accent1"/>
+          </a:effectRef>
+          <a:fontRef idx="minor">
+            <a:schemeClr val="lt1"/>
+          </a:fontRef>
+        </p:style>
+        <p:txBody>
+          <a:bodyPr rtlCol="0" anchor="ctr"/>
+          <a:lstStyle/>
+          <a:p>
+            <a:pPr algn="ctr"/>
+            <a:r>
+              <a:rPr lang="en-US" sz="1200" dirty="0">
+                <a:solidFill>
+                  <a:schemeClr val="bg1">
+                    <a:lumMod val="85000"/>
+                  </a:schemeClr>
+                </a:solidFill>
+                <a:latin typeface="Open Sans" panose="020B0606030504020204" pitchFamily="34" charset="0"/>
+                <a:ea typeface="Open Sans" panose="020B0606030504020204" pitchFamily="34" charset="0"/>
+                <a:cs typeface="Open Sans" panose="020B0606030504020204" pitchFamily="34" charset="0"/>
+              </a:rPr>
+              <a:t>output</a:t>
+            </a:r>
+          </a:p>
+        </p:txBody>
+      </p:sp>
+      <p:sp>
+        <p:nvSpPr>
+          <p:cNvPr id="49" name="TextBox 48">
+            <a:extLst>
+              <a:ext uri="{FF2B5EF4-FFF2-40B4-BE49-F238E27FC236}">
+                <a16:creationId xmlns:a16="http://schemas.microsoft.com/office/drawing/2014/main" id="{9782D64F-E1B4-7BBA-97F1-672AA7BB38F2}"/>
+              </a:ext>
+            </a:extLst>
+          </p:cNvPr>
+          <p:cNvSpPr txBox="1"/>
+          <p:nvPr/>
+        </p:nvSpPr>
+        <p:spPr>
+          <a:xfrm>
+            <a:off x="2396841" y="4042695"/>
+            <a:ext cx="269626" cy="276999"/>
+          </a:xfrm>
+          <a:prstGeom prst="rect">
+            <a:avLst/>
+          </a:prstGeom>
+          <a:noFill/>
+        </p:spPr>
+        <p:txBody>
+          <a:bodyPr wrap="none" rtlCol="0">
+            <a:spAutoFit/>
+          </a:bodyPr>
+          <a:lstStyle/>
+          <a:p>
+            <a:r>
+              <a:rPr lang="en-US" sz="1200" dirty="0">
+                <a:solidFill>
+                  <a:srgbClr val="FF7C80"/>
+                </a:solidFill>
+                <a:latin typeface="Open Sans" panose="020B0606030504020204" pitchFamily="34" charset="0"/>
+                <a:ea typeface="Open Sans" panose="020B0606030504020204" pitchFamily="34" charset="0"/>
+                <a:cs typeface="Open Sans" panose="020B0606030504020204" pitchFamily="34" charset="0"/>
+              </a:rPr>
+              <a:t>T</a:t>
+            </a:r>
+          </a:p>
+        </p:txBody>
+      </p:sp>
+      <p:sp>
+        <p:nvSpPr>
+          <p:cNvPr id="53" name="TextBox 52">
+            <a:extLst>
+              <a:ext uri="{FF2B5EF4-FFF2-40B4-BE49-F238E27FC236}">
+                <a16:creationId xmlns:a16="http://schemas.microsoft.com/office/drawing/2014/main" id="{7E6B2905-22B9-9F02-399A-510F7F8499F3}"/>
+              </a:ext>
+            </a:extLst>
+          </p:cNvPr>
+          <p:cNvSpPr txBox="1"/>
+          <p:nvPr/>
+        </p:nvSpPr>
+        <p:spPr>
+          <a:xfrm>
+            <a:off x="821623" y="4042694"/>
+            <a:ext cx="269626" cy="276999"/>
+          </a:xfrm>
+          <a:prstGeom prst="rect">
+            <a:avLst/>
+          </a:prstGeom>
+          <a:noFill/>
+        </p:spPr>
+        <p:txBody>
+          <a:bodyPr wrap="none" rtlCol="0">
+            <a:spAutoFit/>
+          </a:bodyPr>
+          <a:lstStyle/>
+          <a:p>
+            <a:r>
+              <a:rPr lang="en-US" sz="1200" dirty="0">
+                <a:solidFill>
+                  <a:srgbClr val="FF7C80"/>
+                </a:solidFill>
+                <a:latin typeface="Open Sans" panose="020B0606030504020204" pitchFamily="34" charset="0"/>
+                <a:ea typeface="Open Sans" panose="020B0606030504020204" pitchFamily="34" charset="0"/>
+                <a:cs typeface="Open Sans" panose="020B0606030504020204" pitchFamily="34" charset="0"/>
+              </a:rPr>
+              <a:t>F</a:t>
+            </a:r>
+          </a:p>
+        </p:txBody>
+      </p:sp>
+    </p:spTree>
+    <p:extLst>
+      <p:ext uri="{BB962C8B-B14F-4D97-AF65-F5344CB8AC3E}">
+        <p14:creationId xmlns:p14="http://schemas.microsoft.com/office/powerpoint/2010/main" val="1878857899"/>
       </p:ext>
     </p:extLst>
   </p:cSld>

</xml_diff>

<commit_message>
Added Flowchart for Q2 of PrePSPM2122_KMS.md
</commit_message>
<xml_diff>
--- a/Past Year Theory Questions/Resources/resources.pptx
+++ b/Past Year Theory Questions/Resources/resources.pptx
@@ -24,7 +24,7 @@
     <p:sldId id="273" r:id="rId18"/>
     <p:sldId id="274" r:id="rId19"/>
     <p:sldId id="277" r:id="rId20"/>
-    <p:sldId id="276" r:id="rId21"/>
+    <p:sldId id="278" r:id="rId21"/>
   </p:sldIdLst>
   <p:sldSz cx="12192000" cy="6858000"/>
   <p:notesSz cx="6858000" cy="9144000"/>
@@ -20677,123 +20677,79 @@
           <a:chExt cx="0" cy="0"/>
         </a:xfrm>
       </p:grpSpPr>
-      <p:sp>
-        <p:nvSpPr>
-          <p:cNvPr id="108" name="Rectangle 107">
+      <p:grpSp>
+        <p:nvGrpSpPr>
+          <p:cNvPr id="44" name="Group 43">
             <a:extLst>
               <a:ext uri="{FF2B5EF4-FFF2-40B4-BE49-F238E27FC236}">
-                <a16:creationId xmlns:a16="http://schemas.microsoft.com/office/drawing/2014/main" id="{F5A5FD62-A99C-04B6-706B-DEE9B81AF541}"/>
+                <a16:creationId xmlns:a16="http://schemas.microsoft.com/office/drawing/2014/main" id="{881B1C34-4472-0E6D-3363-47BEB0B92F52}"/>
               </a:ext>
             </a:extLst>
           </p:cNvPr>
-          <p:cNvSpPr/>
+          <p:cNvGrpSpPr/>
           <p:nvPr/>
-        </p:nvSpPr>
-        <p:spPr>
+        </p:nvGrpSpPr>
+        <p:grpSpPr>
           <a:xfrm>
-            <a:off x="3645392" y="1315453"/>
-            <a:ext cx="7327942" cy="4227094"/>
+            <a:off x="1331227" y="1459832"/>
+            <a:ext cx="9529545" cy="3938336"/>
+            <a:chOff x="1331227" y="1459832"/>
+            <a:chExt cx="9529545" cy="3938336"/>
           </a:xfrm>
-          <a:prstGeom prst="rect">
-            <a:avLst/>
-          </a:prstGeom>
-          <a:solidFill>
-            <a:srgbClr val="0F1017"/>
-          </a:solidFill>
-          <a:ln w="12700">
+        </p:grpSpPr>
+        <p:sp>
+          <p:nvSpPr>
+            <p:cNvPr id="108" name="Rectangle 107">
+              <a:extLst>
+                <a:ext uri="{FF2B5EF4-FFF2-40B4-BE49-F238E27FC236}">
+                  <a16:creationId xmlns:a16="http://schemas.microsoft.com/office/drawing/2014/main" id="{F5A5FD62-A99C-04B6-706B-DEE9B81AF541}"/>
+                </a:ext>
+              </a:extLst>
+            </p:cNvPr>
+            <p:cNvSpPr/>
+            <p:nvPr/>
+          </p:nvSpPr>
+          <p:spPr>
+            <a:xfrm>
+              <a:off x="1331227" y="1459832"/>
+              <a:ext cx="9529545" cy="3938336"/>
+            </a:xfrm>
+            <a:prstGeom prst="rect">
+              <a:avLst/>
+            </a:prstGeom>
             <a:solidFill>
-              <a:schemeClr val="bg1">
-                <a:lumMod val="75000"/>
-              </a:schemeClr>
+              <a:srgbClr val="0F1017"/>
             </a:solidFill>
-          </a:ln>
-        </p:spPr>
-        <p:style>
-          <a:lnRef idx="2">
-            <a:schemeClr val="accent1">
-              <a:shade val="50000"/>
-            </a:schemeClr>
-          </a:lnRef>
-          <a:fillRef idx="1">
-            <a:schemeClr val="accent1"/>
-          </a:fillRef>
-          <a:effectRef idx="0">
-            <a:schemeClr val="accent1"/>
-          </a:effectRef>
-          <a:fontRef idx="minor">
-            <a:schemeClr val="lt1"/>
-          </a:fontRef>
-        </p:style>
-        <p:txBody>
-          <a:bodyPr rtlCol="0" anchor="ctr"/>
-          <a:lstStyle/>
-          <a:p>
-            <a:pPr algn="ctr"/>
-            <a:endParaRPr lang="en-US" sz="1800" dirty="0">
+            <a:ln w="12700">
               <a:solidFill>
                 <a:schemeClr val="bg1">
-                  <a:lumMod val="85000"/>
+                  <a:lumMod val="75000"/>
                 </a:schemeClr>
               </a:solidFill>
-              <a:latin typeface="Open Sans" panose="020B0606030504020204" pitchFamily="34" charset="0"/>
-              <a:ea typeface="Open Sans" panose="020B0606030504020204" pitchFamily="34" charset="0"/>
-              <a:cs typeface="Open Sans" panose="020B0606030504020204" pitchFamily="34" charset="0"/>
-            </a:endParaRPr>
-          </a:p>
-        </p:txBody>
-      </p:sp>
-      <p:sp>
-        <p:nvSpPr>
-          <p:cNvPr id="59" name="Flowchart: Terminator 58">
-            <a:extLst>
-              <a:ext uri="{FF2B5EF4-FFF2-40B4-BE49-F238E27FC236}">
-                <a16:creationId xmlns:a16="http://schemas.microsoft.com/office/drawing/2014/main" id="{D7554AAC-5F81-46CA-BA4E-6CDF6B8CC5AD}"/>
-              </a:ext>
-            </a:extLst>
-          </p:cNvPr>
-          <p:cNvSpPr/>
-          <p:nvPr/>
-        </p:nvSpPr>
-        <p:spPr>
-          <a:xfrm>
-            <a:off x="4572180" y="1739895"/>
-            <a:ext cx="1050758" cy="341690"/>
-          </a:xfrm>
-          <a:prstGeom prst="flowChartTerminator">
-            <a:avLst/>
-          </a:prstGeom>
-          <a:noFill/>
-          <a:ln>
-            <a:solidFill>
-              <a:schemeClr val="bg1">
-                <a:lumMod val="75000"/>
+            </a:ln>
+          </p:spPr>
+          <p:style>
+            <a:lnRef idx="2">
+              <a:schemeClr val="accent1">
+                <a:shade val="50000"/>
               </a:schemeClr>
-            </a:solidFill>
-          </a:ln>
-        </p:spPr>
-        <p:style>
-          <a:lnRef idx="2">
-            <a:schemeClr val="accent1">
-              <a:shade val="50000"/>
-            </a:schemeClr>
-          </a:lnRef>
-          <a:fillRef idx="1">
-            <a:schemeClr val="accent1"/>
-          </a:fillRef>
-          <a:effectRef idx="0">
-            <a:schemeClr val="accent1"/>
-          </a:effectRef>
-          <a:fontRef idx="minor">
-            <a:schemeClr val="lt1"/>
-          </a:fontRef>
-        </p:style>
-        <p:txBody>
-          <a:bodyPr rtlCol="0" anchor="ctr"/>
-          <a:lstStyle/>
-          <a:p>
-            <a:pPr algn="ctr"/>
-            <a:r>
-              <a:rPr lang="en-US" sz="1200" dirty="0">
+            </a:lnRef>
+            <a:fillRef idx="1">
+              <a:schemeClr val="accent1"/>
+            </a:fillRef>
+            <a:effectRef idx="0">
+              <a:schemeClr val="accent1"/>
+            </a:effectRef>
+            <a:fontRef idx="minor">
+              <a:schemeClr val="lt1"/>
+            </a:fontRef>
+          </p:style>
+          <p:txBody>
+            <a:bodyPr rtlCol="0" anchor="ctr"/>
+            <a:lstStyle/>
+            <a:p>
+              <a:pPr algn="ctr"/>
+              <a:endParaRPr lang="en-US" sz="1800" dirty="0">
                 <a:solidFill>
                   <a:schemeClr val="bg1">
                     <a:lumMod val="85000"/>
@@ -20802,652 +20758,1288 @@
                 <a:latin typeface="Open Sans" panose="020B0606030504020204" pitchFamily="34" charset="0"/>
                 <a:ea typeface="Open Sans" panose="020B0606030504020204" pitchFamily="34" charset="0"/>
                 <a:cs typeface="Open Sans" panose="020B0606030504020204" pitchFamily="34" charset="0"/>
-              </a:rPr>
-              <a:t>START</a:t>
-            </a:r>
-          </a:p>
-        </p:txBody>
-      </p:sp>
-      <p:sp>
-        <p:nvSpPr>
-          <p:cNvPr id="60" name="Flowchart: Terminator 59">
-            <a:extLst>
-              <a:ext uri="{FF2B5EF4-FFF2-40B4-BE49-F238E27FC236}">
-                <a16:creationId xmlns:a16="http://schemas.microsoft.com/office/drawing/2014/main" id="{103191FC-37A5-724C-C214-882B4B9F6C89}"/>
-              </a:ext>
-            </a:extLst>
-          </p:cNvPr>
-          <p:cNvSpPr/>
-          <p:nvPr/>
-        </p:nvSpPr>
-        <p:spPr>
-          <a:xfrm>
-            <a:off x="9000424" y="1739895"/>
-            <a:ext cx="1050758" cy="341690"/>
-          </a:xfrm>
-          <a:prstGeom prst="flowChartTerminator">
-            <a:avLst/>
-          </a:prstGeom>
-          <a:noFill/>
-          <a:ln>
-            <a:solidFill>
-              <a:schemeClr val="bg1">
-                <a:lumMod val="75000"/>
-              </a:schemeClr>
-            </a:solidFill>
-          </a:ln>
-        </p:spPr>
-        <p:style>
-          <a:lnRef idx="2">
-            <a:schemeClr val="accent1">
-              <a:shade val="50000"/>
-            </a:schemeClr>
-          </a:lnRef>
-          <a:fillRef idx="1">
-            <a:schemeClr val="accent1"/>
-          </a:fillRef>
-          <a:effectRef idx="0">
-            <a:schemeClr val="accent1"/>
-          </a:effectRef>
-          <a:fontRef idx="minor">
-            <a:schemeClr val="lt1"/>
-          </a:fontRef>
-        </p:style>
-        <p:txBody>
-          <a:bodyPr rtlCol="0" anchor="ctr"/>
-          <a:lstStyle/>
-          <a:p>
-            <a:pPr algn="ctr"/>
-            <a:r>
-              <a:rPr lang="en-US" sz="1200" dirty="0">
+              </a:endParaRPr>
+            </a:p>
+          </p:txBody>
+        </p:sp>
+        <p:grpSp>
+          <p:nvGrpSpPr>
+            <p:cNvPr id="43" name="Group 42">
+              <a:extLst>
+                <a:ext uri="{FF2B5EF4-FFF2-40B4-BE49-F238E27FC236}">
+                  <a16:creationId xmlns:a16="http://schemas.microsoft.com/office/drawing/2014/main" id="{920C2039-5CD5-747C-1678-D00966F75996}"/>
+                </a:ext>
+              </a:extLst>
+            </p:cNvPr>
+            <p:cNvGrpSpPr/>
+            <p:nvPr/>
+          </p:nvGrpSpPr>
+          <p:grpSpPr>
+            <a:xfrm>
+              <a:off x="1850621" y="1898023"/>
+              <a:ext cx="8490757" cy="3061955"/>
+              <a:chOff x="1852327" y="1849897"/>
+              <a:chExt cx="8490757" cy="3061955"/>
+            </a:xfrm>
+          </p:grpSpPr>
+          <p:sp>
+            <p:nvSpPr>
+              <p:cNvPr id="59" name="Flowchart: Terminator 58">
+                <a:extLst>
+                  <a:ext uri="{FF2B5EF4-FFF2-40B4-BE49-F238E27FC236}">
+                    <a16:creationId xmlns:a16="http://schemas.microsoft.com/office/drawing/2014/main" id="{D7554AAC-5F81-46CA-BA4E-6CDF6B8CC5AD}"/>
+                  </a:ext>
+                </a:extLst>
+              </p:cNvPr>
+              <p:cNvSpPr/>
+              <p:nvPr/>
+            </p:nvSpPr>
+            <p:spPr>
+              <a:xfrm>
+                <a:off x="2245957" y="1849897"/>
+                <a:ext cx="1050758" cy="341690"/>
+              </a:xfrm>
+              <a:prstGeom prst="flowChartTerminator">
+                <a:avLst/>
+              </a:prstGeom>
+              <a:noFill/>
+              <a:ln>
                 <a:solidFill>
                   <a:schemeClr val="bg1">
-                    <a:lumMod val="85000"/>
+                    <a:lumMod val="75000"/>
                   </a:schemeClr>
                 </a:solidFill>
-                <a:latin typeface="Open Sans" panose="020B0606030504020204" pitchFamily="34" charset="0"/>
-                <a:ea typeface="Open Sans" panose="020B0606030504020204" pitchFamily="34" charset="0"/>
-                <a:cs typeface="Open Sans" panose="020B0606030504020204" pitchFamily="34" charset="0"/>
-              </a:rPr>
-              <a:t>STOP</a:t>
-            </a:r>
-          </a:p>
-        </p:txBody>
-      </p:sp>
-      <p:cxnSp>
-        <p:nvCxnSpPr>
-          <p:cNvPr id="61" name="Straight Arrow Connector 60">
-            <a:extLst>
-              <a:ext uri="{FF2B5EF4-FFF2-40B4-BE49-F238E27FC236}">
-                <a16:creationId xmlns:a16="http://schemas.microsoft.com/office/drawing/2014/main" id="{A1BBCFB3-141A-F3B8-67BE-C05995E64053}"/>
-              </a:ext>
-            </a:extLst>
-          </p:cNvPr>
-          <p:cNvCxnSpPr>
-            <a:cxnSpLocks/>
-            <a:stCxn id="59" idx="2"/>
-          </p:cNvCxnSpPr>
-          <p:nvPr/>
-        </p:nvCxnSpPr>
-        <p:spPr>
-          <a:xfrm flipH="1">
-            <a:off x="5092921" y="2081585"/>
-            <a:ext cx="4638" cy="341690"/>
-          </a:xfrm>
-          <a:prstGeom prst="straightConnector1">
-            <a:avLst/>
-          </a:prstGeom>
-          <a:ln w="12700">
-            <a:solidFill>
-              <a:schemeClr val="bg1">
-                <a:lumMod val="75000"/>
-              </a:schemeClr>
-            </a:solidFill>
-            <a:tailEnd type="triangle"/>
-          </a:ln>
-        </p:spPr>
-        <p:style>
-          <a:lnRef idx="1">
-            <a:schemeClr val="accent1"/>
-          </a:lnRef>
-          <a:fillRef idx="0">
-            <a:schemeClr val="accent1"/>
-          </a:fillRef>
-          <a:effectRef idx="0">
-            <a:schemeClr val="accent1"/>
-          </a:effectRef>
-          <a:fontRef idx="minor">
-            <a:schemeClr val="tx1"/>
-          </a:fontRef>
-        </p:style>
-      </p:cxnSp>
-      <p:cxnSp>
-        <p:nvCxnSpPr>
-          <p:cNvPr id="18" name="Straight Arrow Connector 17">
-            <a:extLst>
-              <a:ext uri="{FF2B5EF4-FFF2-40B4-BE49-F238E27FC236}">
-                <a16:creationId xmlns:a16="http://schemas.microsoft.com/office/drawing/2014/main" id="{28D76C1F-C45D-8EEF-E187-E9E48161CAB0}"/>
-              </a:ext>
-            </a:extLst>
-          </p:cNvPr>
-          <p:cNvCxnSpPr>
-            <a:cxnSpLocks/>
-            <a:endCxn id="60" idx="2"/>
-          </p:cNvCxnSpPr>
-          <p:nvPr/>
-        </p:nvCxnSpPr>
-        <p:spPr>
-          <a:xfrm flipV="1">
-            <a:off x="9525803" y="2081585"/>
-            <a:ext cx="0" cy="296780"/>
-          </a:xfrm>
-          <a:prstGeom prst="straightConnector1">
-            <a:avLst/>
-          </a:prstGeom>
-          <a:ln w="12700">
-            <a:solidFill>
-              <a:srgbClr val="CC99FF"/>
-            </a:solidFill>
-            <a:tailEnd type="triangle"/>
-          </a:ln>
-        </p:spPr>
-        <p:style>
-          <a:lnRef idx="1">
-            <a:schemeClr val="accent1"/>
-          </a:lnRef>
-          <a:fillRef idx="0">
-            <a:schemeClr val="accent1"/>
-          </a:fillRef>
-          <a:effectRef idx="0">
-            <a:schemeClr val="accent1"/>
-          </a:effectRef>
-          <a:fontRef idx="minor">
-            <a:schemeClr val="tx1"/>
-          </a:fontRef>
-        </p:style>
-      </p:cxnSp>
-      <p:sp>
-        <p:nvSpPr>
-          <p:cNvPr id="29" name="Flowchart: Terminator 28">
-            <a:extLst>
-              <a:ext uri="{FF2B5EF4-FFF2-40B4-BE49-F238E27FC236}">
-                <a16:creationId xmlns:a16="http://schemas.microsoft.com/office/drawing/2014/main" id="{97EBF7DD-2035-166F-CFA5-6B352DAE8ECC}"/>
-              </a:ext>
-            </a:extLst>
-          </p:cNvPr>
-          <p:cNvSpPr/>
-          <p:nvPr/>
-        </p:nvSpPr>
-        <p:spPr>
-          <a:xfrm>
-            <a:off x="1218666" y="649032"/>
-            <a:ext cx="1050758" cy="341690"/>
-          </a:xfrm>
-          <a:prstGeom prst="flowChartTerminator">
-            <a:avLst/>
-          </a:prstGeom>
-          <a:noFill/>
-          <a:ln>
-            <a:solidFill>
-              <a:schemeClr val="bg1">
-                <a:lumMod val="75000"/>
-              </a:schemeClr>
-            </a:solidFill>
-          </a:ln>
-        </p:spPr>
-        <p:style>
-          <a:lnRef idx="2">
-            <a:schemeClr val="accent1">
-              <a:shade val="50000"/>
-            </a:schemeClr>
-          </a:lnRef>
-          <a:fillRef idx="1">
-            <a:schemeClr val="accent1"/>
-          </a:fillRef>
-          <a:effectRef idx="0">
-            <a:schemeClr val="accent1"/>
-          </a:effectRef>
-          <a:fontRef idx="minor">
-            <a:schemeClr val="lt1"/>
-          </a:fontRef>
-        </p:style>
-        <p:txBody>
-          <a:bodyPr rtlCol="0" anchor="ctr"/>
-          <a:lstStyle/>
-          <a:p>
-            <a:pPr algn="ctr"/>
-            <a:r>
-              <a:rPr lang="en-US" sz="1200" dirty="0">
+              </a:ln>
+            </p:spPr>
+            <p:style>
+              <a:lnRef idx="2">
+                <a:schemeClr val="accent1">
+                  <a:shade val="50000"/>
+                </a:schemeClr>
+              </a:lnRef>
+              <a:fillRef idx="1">
+                <a:schemeClr val="accent1"/>
+              </a:fillRef>
+              <a:effectRef idx="0">
+                <a:schemeClr val="accent1"/>
+              </a:effectRef>
+              <a:fontRef idx="minor">
+                <a:schemeClr val="lt1"/>
+              </a:fontRef>
+            </p:style>
+            <p:txBody>
+              <a:bodyPr rtlCol="0" anchor="ctr"/>
+              <a:lstStyle/>
+              <a:p>
+                <a:pPr algn="ctr"/>
+                <a:r>
+                  <a:rPr lang="en-US" sz="1200" dirty="0">
+                    <a:solidFill>
+                      <a:schemeClr val="bg1">
+                        <a:lumMod val="85000"/>
+                      </a:schemeClr>
+                    </a:solidFill>
+                    <a:latin typeface="Open Sans" panose="020B0606030504020204" pitchFamily="34" charset="0"/>
+                    <a:ea typeface="Open Sans" panose="020B0606030504020204" pitchFamily="34" charset="0"/>
+                    <a:cs typeface="Open Sans" panose="020B0606030504020204" pitchFamily="34" charset="0"/>
+                  </a:rPr>
+                  <a:t>START</a:t>
+                </a:r>
+              </a:p>
+            </p:txBody>
+          </p:sp>
+          <p:sp>
+            <p:nvSpPr>
+              <p:cNvPr id="60" name="Flowchart: Terminator 59">
+                <a:extLst>
+                  <a:ext uri="{FF2B5EF4-FFF2-40B4-BE49-F238E27FC236}">
+                    <a16:creationId xmlns:a16="http://schemas.microsoft.com/office/drawing/2014/main" id="{103191FC-37A5-724C-C214-882B4B9F6C89}"/>
+                  </a:ext>
+                </a:extLst>
+              </p:cNvPr>
+              <p:cNvSpPr/>
+              <p:nvPr/>
+            </p:nvSpPr>
+            <p:spPr>
+              <a:xfrm>
+                <a:off x="8895281" y="1849897"/>
+                <a:ext cx="1050758" cy="341690"/>
+              </a:xfrm>
+              <a:prstGeom prst="flowChartTerminator">
+                <a:avLst/>
+              </a:prstGeom>
+              <a:noFill/>
+              <a:ln>
                 <a:solidFill>
                   <a:schemeClr val="bg1">
-                    <a:lumMod val="85000"/>
+                    <a:lumMod val="75000"/>
                   </a:schemeClr>
                 </a:solidFill>
-                <a:latin typeface="Open Sans" panose="020B0606030504020204" pitchFamily="34" charset="0"/>
-                <a:ea typeface="Open Sans" panose="020B0606030504020204" pitchFamily="34" charset="0"/>
-                <a:cs typeface="Open Sans" panose="020B0606030504020204" pitchFamily="34" charset="0"/>
-              </a:rPr>
-              <a:t>Start</a:t>
-            </a:r>
-          </a:p>
-        </p:txBody>
-      </p:sp>
-      <p:sp>
-        <p:nvSpPr>
-          <p:cNvPr id="31" name="Flowchart: Terminator 30">
-            <a:extLst>
-              <a:ext uri="{FF2B5EF4-FFF2-40B4-BE49-F238E27FC236}">
-                <a16:creationId xmlns:a16="http://schemas.microsoft.com/office/drawing/2014/main" id="{B46FF1EB-056C-88CD-27DB-132AB41F0506}"/>
-              </a:ext>
-            </a:extLst>
-          </p:cNvPr>
-          <p:cNvSpPr/>
-          <p:nvPr/>
-        </p:nvSpPr>
-        <p:spPr>
-          <a:xfrm>
-            <a:off x="1218666" y="1262521"/>
-            <a:ext cx="1050758" cy="341690"/>
-          </a:xfrm>
-          <a:prstGeom prst="flowChartTerminator">
-            <a:avLst/>
-          </a:prstGeom>
-          <a:noFill/>
-          <a:ln>
-            <a:solidFill>
-              <a:schemeClr val="bg1">
-                <a:lumMod val="75000"/>
-              </a:schemeClr>
-            </a:solidFill>
-          </a:ln>
-        </p:spPr>
-        <p:style>
-          <a:lnRef idx="2">
-            <a:schemeClr val="accent1">
-              <a:shade val="50000"/>
-            </a:schemeClr>
-          </a:lnRef>
-          <a:fillRef idx="1">
-            <a:schemeClr val="accent1"/>
-          </a:fillRef>
-          <a:effectRef idx="0">
-            <a:schemeClr val="accent1"/>
-          </a:effectRef>
-          <a:fontRef idx="minor">
-            <a:schemeClr val="lt1"/>
-          </a:fontRef>
-        </p:style>
-        <p:txBody>
-          <a:bodyPr rtlCol="0" anchor="ctr"/>
-          <a:lstStyle/>
-          <a:p>
-            <a:pPr algn="ctr"/>
-            <a:r>
-              <a:rPr lang="en-US" sz="1200" dirty="0">
+              </a:ln>
+            </p:spPr>
+            <p:style>
+              <a:lnRef idx="2">
+                <a:schemeClr val="accent1">
+                  <a:shade val="50000"/>
+                </a:schemeClr>
+              </a:lnRef>
+              <a:fillRef idx="1">
+                <a:schemeClr val="accent1"/>
+              </a:fillRef>
+              <a:effectRef idx="0">
+                <a:schemeClr val="accent1"/>
+              </a:effectRef>
+              <a:fontRef idx="minor">
+                <a:schemeClr val="lt1"/>
+              </a:fontRef>
+            </p:style>
+            <p:txBody>
+              <a:bodyPr rtlCol="0" anchor="ctr"/>
+              <a:lstStyle/>
+              <a:p>
+                <a:pPr algn="ctr"/>
+                <a:r>
+                  <a:rPr lang="en-US" sz="1200" dirty="0">
+                    <a:solidFill>
+                      <a:schemeClr val="bg1">
+                        <a:lumMod val="85000"/>
+                      </a:schemeClr>
+                    </a:solidFill>
+                    <a:latin typeface="Open Sans" panose="020B0606030504020204" pitchFamily="34" charset="0"/>
+                    <a:ea typeface="Open Sans" panose="020B0606030504020204" pitchFamily="34" charset="0"/>
+                    <a:cs typeface="Open Sans" panose="020B0606030504020204" pitchFamily="34" charset="0"/>
+                  </a:rPr>
+                  <a:t>STOP</a:t>
+                </a:r>
+              </a:p>
+            </p:txBody>
+          </p:sp>
+          <p:cxnSp>
+            <p:nvCxnSpPr>
+              <p:cNvPr id="61" name="Straight Arrow Connector 60">
+                <a:extLst>
+                  <a:ext uri="{FF2B5EF4-FFF2-40B4-BE49-F238E27FC236}">
+                    <a16:creationId xmlns:a16="http://schemas.microsoft.com/office/drawing/2014/main" id="{A1BBCFB3-141A-F3B8-67BE-C05995E64053}"/>
+                  </a:ext>
+                </a:extLst>
+              </p:cNvPr>
+              <p:cNvCxnSpPr>
+                <a:cxnSpLocks/>
+                <a:stCxn id="59" idx="2"/>
+                <a:endCxn id="34" idx="0"/>
+              </p:cNvCxnSpPr>
+              <p:nvPr/>
+            </p:nvCxnSpPr>
+            <p:spPr>
+              <a:xfrm>
+                <a:off x="2771336" y="2191587"/>
+                <a:ext cx="3413" cy="1356637"/>
+              </a:xfrm>
+              <a:prstGeom prst="straightConnector1">
+                <a:avLst/>
+              </a:prstGeom>
+              <a:ln w="12700">
                 <a:solidFill>
                   <a:schemeClr val="bg1">
-                    <a:lumMod val="85000"/>
+                    <a:lumMod val="75000"/>
                   </a:schemeClr>
                 </a:solidFill>
-                <a:latin typeface="Open Sans" panose="020B0606030504020204" pitchFamily="34" charset="0"/>
-                <a:ea typeface="Open Sans" panose="020B0606030504020204" pitchFamily="34" charset="0"/>
-                <a:cs typeface="Open Sans" panose="020B0606030504020204" pitchFamily="34" charset="0"/>
-              </a:rPr>
-              <a:t>Stop</a:t>
-            </a:r>
-          </a:p>
-        </p:txBody>
-      </p:sp>
-      <p:sp>
-        <p:nvSpPr>
-          <p:cNvPr id="34" name="Rectangle 33">
-            <a:extLst>
-              <a:ext uri="{FF2B5EF4-FFF2-40B4-BE49-F238E27FC236}">
-                <a16:creationId xmlns:a16="http://schemas.microsoft.com/office/drawing/2014/main" id="{A8D64967-4F28-2958-EE17-93FB9B3EDEEA}"/>
-              </a:ext>
-            </a:extLst>
-          </p:cNvPr>
-          <p:cNvSpPr/>
-          <p:nvPr/>
-        </p:nvSpPr>
-        <p:spPr>
-          <a:xfrm>
-            <a:off x="821623" y="3132324"/>
-            <a:ext cx="1844844" cy="393032"/>
-          </a:xfrm>
-          <a:prstGeom prst="rect">
-            <a:avLst/>
-          </a:prstGeom>
-          <a:noFill/>
-          <a:ln>
-            <a:solidFill>
-              <a:schemeClr val="accent6">
-                <a:lumMod val="60000"/>
-                <a:lumOff val="40000"/>
-              </a:schemeClr>
-            </a:solidFill>
-          </a:ln>
-        </p:spPr>
-        <p:style>
-          <a:lnRef idx="2">
-            <a:schemeClr val="accent1">
-              <a:shade val="50000"/>
-            </a:schemeClr>
-          </a:lnRef>
-          <a:fillRef idx="1">
-            <a:schemeClr val="accent1"/>
-          </a:fillRef>
-          <a:effectRef idx="0">
-            <a:schemeClr val="accent1"/>
-          </a:effectRef>
-          <a:fontRef idx="minor">
-            <a:schemeClr val="lt1"/>
-          </a:fontRef>
-        </p:style>
-        <p:txBody>
-          <a:bodyPr rtlCol="0" anchor="ctr"/>
-          <a:lstStyle/>
-          <a:p>
-            <a:pPr algn="ctr"/>
-            <a:r>
-              <a:rPr lang="en-US" sz="1200" dirty="0">
+                <a:tailEnd type="triangle"/>
+              </a:ln>
+            </p:spPr>
+            <p:style>
+              <a:lnRef idx="1">
+                <a:schemeClr val="accent1"/>
+              </a:lnRef>
+              <a:fillRef idx="0">
+                <a:schemeClr val="accent1"/>
+              </a:fillRef>
+              <a:effectRef idx="0">
+                <a:schemeClr val="accent1"/>
+              </a:effectRef>
+              <a:fontRef idx="minor">
+                <a:schemeClr val="tx1"/>
+              </a:fontRef>
+            </p:style>
+          </p:cxnSp>
+          <p:cxnSp>
+            <p:nvCxnSpPr>
+              <p:cNvPr id="18" name="Straight Arrow Connector 17">
+                <a:extLst>
+                  <a:ext uri="{FF2B5EF4-FFF2-40B4-BE49-F238E27FC236}">
+                    <a16:creationId xmlns:a16="http://schemas.microsoft.com/office/drawing/2014/main" id="{28D76C1F-C45D-8EEF-E187-E9E48161CAB0}"/>
+                  </a:ext>
+                </a:extLst>
+              </p:cNvPr>
+              <p:cNvCxnSpPr>
+                <a:cxnSpLocks/>
+                <a:endCxn id="60" idx="2"/>
+              </p:cNvCxnSpPr>
+              <p:nvPr/>
+            </p:nvCxnSpPr>
+            <p:spPr>
+              <a:xfrm flipV="1">
+                <a:off x="9420660" y="2191587"/>
+                <a:ext cx="0" cy="296780"/>
+              </a:xfrm>
+              <a:prstGeom prst="straightConnector1">
+                <a:avLst/>
+              </a:prstGeom>
+              <a:ln w="12700">
+                <a:solidFill>
+                  <a:srgbClr val="CC99FF"/>
+                </a:solidFill>
+                <a:tailEnd type="triangle"/>
+              </a:ln>
+            </p:spPr>
+            <p:style>
+              <a:lnRef idx="1">
+                <a:schemeClr val="accent1"/>
+              </a:lnRef>
+              <a:fillRef idx="0">
+                <a:schemeClr val="accent1"/>
+              </a:fillRef>
+              <a:effectRef idx="0">
+                <a:schemeClr val="accent1"/>
+              </a:effectRef>
+              <a:fontRef idx="minor">
+                <a:schemeClr val="tx1"/>
+              </a:fontRef>
+            </p:style>
+          </p:cxnSp>
+          <p:sp>
+            <p:nvSpPr>
+              <p:cNvPr id="34" name="Rectangle 33">
+                <a:extLst>
+                  <a:ext uri="{FF2B5EF4-FFF2-40B4-BE49-F238E27FC236}">
+                    <a16:creationId xmlns:a16="http://schemas.microsoft.com/office/drawing/2014/main" id="{A8D64967-4F28-2958-EE17-93FB9B3EDEEA}"/>
+                  </a:ext>
+                </a:extLst>
+              </p:cNvPr>
+              <p:cNvSpPr/>
+              <p:nvPr/>
+            </p:nvSpPr>
+            <p:spPr>
+              <a:xfrm>
+                <a:off x="1852327" y="3548224"/>
+                <a:ext cx="1844844" cy="393192"/>
+              </a:xfrm>
+              <a:prstGeom prst="rect">
+                <a:avLst/>
+              </a:prstGeom>
+              <a:noFill/>
+              <a:ln>
+                <a:solidFill>
+                  <a:schemeClr val="accent6">
+                    <a:lumMod val="60000"/>
+                    <a:lumOff val="40000"/>
+                  </a:schemeClr>
+                </a:solidFill>
+              </a:ln>
+            </p:spPr>
+            <p:style>
+              <a:lnRef idx="2">
+                <a:schemeClr val="accent1">
+                  <a:shade val="50000"/>
+                </a:schemeClr>
+              </a:lnRef>
+              <a:fillRef idx="1">
+                <a:schemeClr val="accent1"/>
+              </a:fillRef>
+              <a:effectRef idx="0">
+                <a:schemeClr val="accent1"/>
+              </a:effectRef>
+              <a:fontRef idx="minor">
+                <a:schemeClr val="lt1"/>
+              </a:fontRef>
+            </p:style>
+            <p:txBody>
+              <a:bodyPr rtlCol="0" anchor="ctr"/>
+              <a:lstStyle/>
+              <a:p>
+                <a:pPr algn="ctr"/>
+                <a:r>
+                  <a:rPr lang="en-US" sz="1200" dirty="0">
+                    <a:solidFill>
+                      <a:schemeClr val="bg1">
+                        <a:lumMod val="85000"/>
+                      </a:schemeClr>
+                    </a:solidFill>
+                    <a:latin typeface="Open Sans" panose="020B0606030504020204" pitchFamily="34" charset="0"/>
+                    <a:ea typeface="Open Sans" panose="020B0606030504020204" pitchFamily="34" charset="0"/>
+                    <a:cs typeface="Open Sans" panose="020B0606030504020204" pitchFamily="34" charset="0"/>
+                  </a:rPr>
+                  <a:t>num = 50, sum = 0</a:t>
+                </a:r>
+              </a:p>
+            </p:txBody>
+          </p:sp>
+          <p:sp>
+            <p:nvSpPr>
+              <p:cNvPr id="46" name="Flowchart: Decision 45">
+                <a:extLst>
+                  <a:ext uri="{FF2B5EF4-FFF2-40B4-BE49-F238E27FC236}">
+                    <a16:creationId xmlns:a16="http://schemas.microsoft.com/office/drawing/2014/main" id="{265FEB22-D05F-9423-661B-B86264CDC339}"/>
+                  </a:ext>
+                </a:extLst>
+              </p:cNvPr>
+              <p:cNvSpPr/>
+              <p:nvPr/>
+            </p:nvSpPr>
+            <p:spPr>
+              <a:xfrm>
+                <a:off x="4068769" y="3271498"/>
+                <a:ext cx="1844844" cy="946484"/>
+              </a:xfrm>
+              <a:prstGeom prst="flowChartDecision">
+                <a:avLst/>
+              </a:prstGeom>
+              <a:noFill/>
+              <a:ln>
+                <a:solidFill>
+                  <a:srgbClr val="FF7C80"/>
+                </a:solidFill>
+              </a:ln>
+            </p:spPr>
+            <p:style>
+              <a:lnRef idx="2">
+                <a:schemeClr val="accent1">
+                  <a:shade val="50000"/>
+                </a:schemeClr>
+              </a:lnRef>
+              <a:fillRef idx="1">
+                <a:schemeClr val="accent1"/>
+              </a:fillRef>
+              <a:effectRef idx="0">
+                <a:schemeClr val="accent1"/>
+              </a:effectRef>
+              <a:fontRef idx="minor">
+                <a:schemeClr val="lt1"/>
+              </a:fontRef>
+            </p:style>
+            <p:txBody>
+              <a:bodyPr rtlCol="0" anchor="ctr"/>
+              <a:lstStyle/>
+              <a:p>
+                <a:pPr algn="ctr"/>
+                <a:r>
+                  <a:rPr lang="en-US" sz="1200" dirty="0">
+                    <a:solidFill>
+                      <a:schemeClr val="bg1">
+                        <a:lumMod val="85000"/>
+                      </a:schemeClr>
+                    </a:solidFill>
+                    <a:latin typeface="Open Sans" panose="020B0606030504020204" pitchFamily="34" charset="0"/>
+                    <a:ea typeface="Open Sans" panose="020B0606030504020204" pitchFamily="34" charset="0"/>
+                    <a:cs typeface="Open Sans" panose="020B0606030504020204" pitchFamily="34" charset="0"/>
+                  </a:rPr>
+                  <a:t>num </a:t>
+                </a:r>
+              </a:p>
+              <a:p>
+                <a:pPr algn="ctr"/>
+                <a:r>
+                  <a:rPr lang="en-US" sz="1200" dirty="0">
+                    <a:solidFill>
+                      <a:schemeClr val="bg1">
+                        <a:lumMod val="85000"/>
+                      </a:schemeClr>
+                    </a:solidFill>
+                    <a:latin typeface="Open Sans" panose="020B0606030504020204" pitchFamily="34" charset="0"/>
+                    <a:ea typeface="Open Sans" panose="020B0606030504020204" pitchFamily="34" charset="0"/>
+                    <a:cs typeface="Open Sans" panose="020B0606030504020204" pitchFamily="34" charset="0"/>
+                  </a:rPr>
+                  <a:t>&lt;= 300</a:t>
+                </a:r>
+              </a:p>
+            </p:txBody>
+          </p:sp>
+          <p:sp>
+            <p:nvSpPr>
+              <p:cNvPr id="49" name="TextBox 48">
+                <a:extLst>
+                  <a:ext uri="{FF2B5EF4-FFF2-40B4-BE49-F238E27FC236}">
+                    <a16:creationId xmlns:a16="http://schemas.microsoft.com/office/drawing/2014/main" id="{9782D64F-E1B4-7BBA-97F1-672AA7BB38F2}"/>
+                  </a:ext>
+                </a:extLst>
+              </p:cNvPr>
+              <p:cNvSpPr txBox="1"/>
+              <p:nvPr/>
+            </p:nvSpPr>
+            <p:spPr>
+              <a:xfrm>
+                <a:off x="8101195" y="3461322"/>
+                <a:ext cx="269626" cy="276999"/>
+              </a:xfrm>
+              <a:prstGeom prst="rect">
+                <a:avLst/>
+              </a:prstGeom>
+              <a:noFill/>
+            </p:spPr>
+            <p:txBody>
+              <a:bodyPr wrap="none" rtlCol="0">
+                <a:spAutoFit/>
+              </a:bodyPr>
+              <a:lstStyle/>
+              <a:p>
+                <a:r>
+                  <a:rPr lang="en-US" sz="1200" dirty="0">
+                    <a:solidFill>
+                      <a:srgbClr val="FF7C80"/>
+                    </a:solidFill>
+                    <a:latin typeface="Open Sans" panose="020B0606030504020204" pitchFamily="34" charset="0"/>
+                    <a:ea typeface="Open Sans" panose="020B0606030504020204" pitchFamily="34" charset="0"/>
+                    <a:cs typeface="Open Sans" panose="020B0606030504020204" pitchFamily="34" charset="0"/>
+                  </a:rPr>
+                  <a:t>T</a:t>
+                </a:r>
+              </a:p>
+            </p:txBody>
+          </p:sp>
+          <p:sp>
+            <p:nvSpPr>
+              <p:cNvPr id="53" name="TextBox 52">
+                <a:extLst>
+                  <a:ext uri="{FF2B5EF4-FFF2-40B4-BE49-F238E27FC236}">
+                    <a16:creationId xmlns:a16="http://schemas.microsoft.com/office/drawing/2014/main" id="{7E6B2905-22B9-9F02-399A-510F7F8499F3}"/>
+                  </a:ext>
+                </a:extLst>
+              </p:cNvPr>
+              <p:cNvSpPr txBox="1"/>
+              <p:nvPr/>
+            </p:nvSpPr>
+            <p:spPr>
+              <a:xfrm>
+                <a:off x="6934593" y="4213723"/>
+                <a:ext cx="269626" cy="276999"/>
+              </a:xfrm>
+              <a:prstGeom prst="rect">
+                <a:avLst/>
+              </a:prstGeom>
+              <a:noFill/>
+            </p:spPr>
+            <p:txBody>
+              <a:bodyPr wrap="none" rtlCol="0">
+                <a:spAutoFit/>
+              </a:bodyPr>
+              <a:lstStyle/>
+              <a:p>
+                <a:r>
+                  <a:rPr lang="en-US" sz="1200" dirty="0">
+                    <a:solidFill>
+                      <a:srgbClr val="FF7C80"/>
+                    </a:solidFill>
+                    <a:latin typeface="Open Sans" panose="020B0606030504020204" pitchFamily="34" charset="0"/>
+                    <a:ea typeface="Open Sans" panose="020B0606030504020204" pitchFamily="34" charset="0"/>
+                    <a:cs typeface="Open Sans" panose="020B0606030504020204" pitchFamily="34" charset="0"/>
+                  </a:rPr>
+                  <a:t>F</a:t>
+                </a:r>
+              </a:p>
+            </p:txBody>
+          </p:sp>
+          <p:sp>
+            <p:nvSpPr>
+              <p:cNvPr id="19" name="Flowchart: Data 18">
+                <a:extLst>
+                  <a:ext uri="{FF2B5EF4-FFF2-40B4-BE49-F238E27FC236}">
+                    <a16:creationId xmlns:a16="http://schemas.microsoft.com/office/drawing/2014/main" id="{83FF52BA-11BB-3A36-EE4B-E8F99BF5F935}"/>
+                  </a:ext>
+                </a:extLst>
+              </p:cNvPr>
+              <p:cNvSpPr/>
+              <p:nvPr/>
+            </p:nvSpPr>
+            <p:spPr>
+              <a:xfrm>
+                <a:off x="8498240" y="2488367"/>
+                <a:ext cx="1844844" cy="489284"/>
+              </a:xfrm>
+              <a:prstGeom prst="flowChartInputOutput">
+                <a:avLst/>
+              </a:prstGeom>
+              <a:noFill/>
+              <a:ln>
+                <a:solidFill>
+                  <a:srgbClr val="CC99FF"/>
+                </a:solidFill>
+              </a:ln>
+            </p:spPr>
+            <p:style>
+              <a:lnRef idx="2">
+                <a:schemeClr val="accent1">
+                  <a:shade val="50000"/>
+                </a:schemeClr>
+              </a:lnRef>
+              <a:fillRef idx="1">
+                <a:schemeClr val="accent1"/>
+              </a:fillRef>
+              <a:effectRef idx="0">
+                <a:schemeClr val="accent1"/>
+              </a:effectRef>
+              <a:fontRef idx="minor">
+                <a:schemeClr val="lt1"/>
+              </a:fontRef>
+            </p:style>
+            <p:txBody>
+              <a:bodyPr rtlCol="0" anchor="ctr"/>
+              <a:lstStyle/>
+              <a:p>
+                <a:pPr algn="ctr"/>
+                <a:r>
+                  <a:rPr lang="en-US" sz="1200" dirty="0">
+                    <a:solidFill>
+                      <a:schemeClr val="bg1">
+                        <a:lumMod val="85000"/>
+                      </a:schemeClr>
+                    </a:solidFill>
+                    <a:latin typeface="Open Sans" panose="020B0606030504020204" pitchFamily="34" charset="0"/>
+                    <a:ea typeface="Open Sans" panose="020B0606030504020204" pitchFamily="34" charset="0"/>
+                    <a:cs typeface="Open Sans" panose="020B0606030504020204" pitchFamily="34" charset="0"/>
+                  </a:rPr>
+                  <a:t>PRINT sum</a:t>
+                </a:r>
+              </a:p>
+            </p:txBody>
+          </p:sp>
+          <p:sp>
+            <p:nvSpPr>
+              <p:cNvPr id="20" name="Flowchart: Decision 19">
+                <a:extLst>
+                  <a:ext uri="{FF2B5EF4-FFF2-40B4-BE49-F238E27FC236}">
+                    <a16:creationId xmlns:a16="http://schemas.microsoft.com/office/drawing/2014/main" id="{DD8ADAE0-429D-3F40-BA66-AAF73174C551}"/>
+                  </a:ext>
+                </a:extLst>
+              </p:cNvPr>
+              <p:cNvSpPr/>
+              <p:nvPr/>
+            </p:nvSpPr>
+            <p:spPr>
+              <a:xfrm>
+                <a:off x="6281798" y="3266741"/>
+                <a:ext cx="1844844" cy="946484"/>
+              </a:xfrm>
+              <a:prstGeom prst="flowChartDecision">
+                <a:avLst/>
+              </a:prstGeom>
+              <a:noFill/>
+              <a:ln>
+                <a:solidFill>
+                  <a:srgbClr val="FF7C80"/>
+                </a:solidFill>
+              </a:ln>
+            </p:spPr>
+            <p:style>
+              <a:lnRef idx="2">
+                <a:schemeClr val="accent1">
+                  <a:shade val="50000"/>
+                </a:schemeClr>
+              </a:lnRef>
+              <a:fillRef idx="1">
+                <a:schemeClr val="accent1"/>
+              </a:fillRef>
+              <a:effectRef idx="0">
+                <a:schemeClr val="accent1"/>
+              </a:effectRef>
+              <a:fontRef idx="minor">
+                <a:schemeClr val="lt1"/>
+              </a:fontRef>
+            </p:style>
+            <p:txBody>
+              <a:bodyPr rtlCol="0" anchor="ctr"/>
+              <a:lstStyle/>
+              <a:p>
+                <a:pPr algn="ctr"/>
+                <a:r>
+                  <a:rPr lang="en-US" sz="1200" dirty="0">
+                    <a:solidFill>
+                      <a:schemeClr val="bg1">
+                        <a:lumMod val="85000"/>
+                      </a:schemeClr>
+                    </a:solidFill>
+                    <a:latin typeface="Open Sans" panose="020B0606030504020204" pitchFamily="34" charset="0"/>
+                    <a:ea typeface="Open Sans" panose="020B0606030504020204" pitchFamily="34" charset="0"/>
+                    <a:cs typeface="Open Sans" panose="020B0606030504020204" pitchFamily="34" charset="0"/>
+                  </a:rPr>
+                  <a:t>num % 3</a:t>
+                </a:r>
+              </a:p>
+              <a:p>
+                <a:pPr algn="ctr"/>
+                <a:r>
+                  <a:rPr lang="en-US" sz="1200" dirty="0">
+                    <a:solidFill>
+                      <a:schemeClr val="bg1">
+                        <a:lumMod val="85000"/>
+                      </a:schemeClr>
+                    </a:solidFill>
+                    <a:latin typeface="Open Sans" panose="020B0606030504020204" pitchFamily="34" charset="0"/>
+                    <a:ea typeface="Open Sans" panose="020B0606030504020204" pitchFamily="34" charset="0"/>
+                    <a:cs typeface="Open Sans" panose="020B0606030504020204" pitchFamily="34" charset="0"/>
+                  </a:rPr>
+                  <a:t>== 0</a:t>
+                </a:r>
+              </a:p>
+            </p:txBody>
+          </p:sp>
+          <p:sp>
+            <p:nvSpPr>
+              <p:cNvPr id="23" name="Flowchart: Data 22">
+                <a:extLst>
+                  <a:ext uri="{FF2B5EF4-FFF2-40B4-BE49-F238E27FC236}">
+                    <a16:creationId xmlns:a16="http://schemas.microsoft.com/office/drawing/2014/main" id="{8A8010FA-742E-3616-F64D-F271787DD465}"/>
+                  </a:ext>
+                </a:extLst>
+              </p:cNvPr>
+              <p:cNvSpPr/>
+              <p:nvPr/>
+            </p:nvSpPr>
+            <p:spPr>
+              <a:xfrm>
+                <a:off x="8494827" y="3493679"/>
+                <a:ext cx="1844844" cy="489284"/>
+              </a:xfrm>
+              <a:prstGeom prst="flowChartInputOutput">
+                <a:avLst/>
+              </a:prstGeom>
+              <a:noFill/>
+              <a:ln>
+                <a:solidFill>
+                  <a:srgbClr val="CC99FF"/>
+                </a:solidFill>
+              </a:ln>
+            </p:spPr>
+            <p:style>
+              <a:lnRef idx="2">
+                <a:schemeClr val="accent1">
+                  <a:shade val="50000"/>
+                </a:schemeClr>
+              </a:lnRef>
+              <a:fillRef idx="1">
+                <a:schemeClr val="accent1"/>
+              </a:fillRef>
+              <a:effectRef idx="0">
+                <a:schemeClr val="accent1"/>
+              </a:effectRef>
+              <a:fontRef idx="minor">
+                <a:schemeClr val="lt1"/>
+              </a:fontRef>
+            </p:style>
+            <p:txBody>
+              <a:bodyPr rtlCol="0" anchor="ctr"/>
+              <a:lstStyle/>
+              <a:p>
+                <a:pPr algn="ctr"/>
+                <a:r>
+                  <a:rPr lang="en-US" sz="1200" dirty="0">
+                    <a:solidFill>
+                      <a:schemeClr val="bg1">
+                        <a:lumMod val="85000"/>
+                      </a:schemeClr>
+                    </a:solidFill>
+                    <a:latin typeface="Open Sans" panose="020B0606030504020204" pitchFamily="34" charset="0"/>
+                    <a:ea typeface="Open Sans" panose="020B0606030504020204" pitchFamily="34" charset="0"/>
+                    <a:cs typeface="Open Sans" panose="020B0606030504020204" pitchFamily="34" charset="0"/>
+                  </a:rPr>
+                  <a:t>PRINT num</a:t>
+                </a:r>
+              </a:p>
+            </p:txBody>
+          </p:sp>
+          <p:sp>
+            <p:nvSpPr>
+              <p:cNvPr id="28" name="Rectangle 27">
+                <a:extLst>
+                  <a:ext uri="{FF2B5EF4-FFF2-40B4-BE49-F238E27FC236}">
+                    <a16:creationId xmlns:a16="http://schemas.microsoft.com/office/drawing/2014/main" id="{DD7212C3-9A7B-07AC-681D-5F0E34F6EA65}"/>
+                  </a:ext>
+                </a:extLst>
+              </p:cNvPr>
+              <p:cNvSpPr/>
+              <p:nvPr/>
+            </p:nvSpPr>
+            <p:spPr>
+              <a:xfrm>
+                <a:off x="6281797" y="4518820"/>
+                <a:ext cx="1844844" cy="393032"/>
+              </a:xfrm>
+              <a:prstGeom prst="rect">
+                <a:avLst/>
+              </a:prstGeom>
+              <a:noFill/>
+              <a:ln>
+                <a:solidFill>
+                  <a:schemeClr val="accent6">
+                    <a:lumMod val="60000"/>
+                    <a:lumOff val="40000"/>
+                  </a:schemeClr>
+                </a:solidFill>
+              </a:ln>
+            </p:spPr>
+            <p:style>
+              <a:lnRef idx="2">
+                <a:schemeClr val="accent1">
+                  <a:shade val="50000"/>
+                </a:schemeClr>
+              </a:lnRef>
+              <a:fillRef idx="1">
+                <a:schemeClr val="accent1"/>
+              </a:fillRef>
+              <a:effectRef idx="0">
+                <a:schemeClr val="accent1"/>
+              </a:effectRef>
+              <a:fontRef idx="minor">
+                <a:schemeClr val="lt1"/>
+              </a:fontRef>
+            </p:style>
+            <p:txBody>
+              <a:bodyPr rtlCol="0" anchor="ctr"/>
+              <a:lstStyle/>
+              <a:p>
+                <a:pPr algn="ctr"/>
+                <a:r>
+                  <a:rPr lang="en-US" sz="1200" dirty="0">
+                    <a:solidFill>
+                      <a:schemeClr val="bg1">
+                        <a:lumMod val="85000"/>
+                      </a:schemeClr>
+                    </a:solidFill>
+                    <a:latin typeface="Open Sans" panose="020B0606030504020204" pitchFamily="34" charset="0"/>
+                    <a:ea typeface="Open Sans" panose="020B0606030504020204" pitchFamily="34" charset="0"/>
+                    <a:cs typeface="Open Sans" panose="020B0606030504020204" pitchFamily="34" charset="0"/>
+                  </a:rPr>
+                  <a:t>num = num + 1</a:t>
+                </a:r>
+              </a:p>
+            </p:txBody>
+          </p:sp>
+          <p:cxnSp>
+            <p:nvCxnSpPr>
+              <p:cNvPr id="12" name="Straight Arrow Connector 11">
+                <a:extLst>
+                  <a:ext uri="{FF2B5EF4-FFF2-40B4-BE49-F238E27FC236}">
+                    <a16:creationId xmlns:a16="http://schemas.microsoft.com/office/drawing/2014/main" id="{8D6AC4A1-A2E1-442A-6D64-CD4E785A31B6}"/>
+                  </a:ext>
+                </a:extLst>
+              </p:cNvPr>
+              <p:cNvCxnSpPr>
+                <a:stCxn id="34" idx="3"/>
+                <a:endCxn id="46" idx="1"/>
+              </p:cNvCxnSpPr>
+              <p:nvPr/>
+            </p:nvCxnSpPr>
+            <p:spPr>
+              <a:xfrm flipV="1">
+                <a:off x="3697171" y="3744740"/>
+                <a:ext cx="371598" cy="80"/>
+              </a:xfrm>
+              <a:prstGeom prst="straightConnector1">
+                <a:avLst/>
+              </a:prstGeom>
+              <a:ln w="12700">
                 <a:solidFill>
                   <a:schemeClr val="bg1">
-                    <a:lumMod val="85000"/>
+                    <a:lumMod val="75000"/>
                   </a:schemeClr>
                 </a:solidFill>
-                <a:latin typeface="Open Sans" panose="020B0606030504020204" pitchFamily="34" charset="0"/>
-                <a:ea typeface="Open Sans" panose="020B0606030504020204" pitchFamily="34" charset="0"/>
-                <a:cs typeface="Open Sans" panose="020B0606030504020204" pitchFamily="34" charset="0"/>
-              </a:rPr>
-              <a:t>action / process</a:t>
-            </a:r>
-          </a:p>
-        </p:txBody>
-      </p:sp>
-      <p:sp>
-        <p:nvSpPr>
-          <p:cNvPr id="39" name="Flowchart: Data 38">
-            <a:extLst>
-              <a:ext uri="{FF2B5EF4-FFF2-40B4-BE49-F238E27FC236}">
-                <a16:creationId xmlns:a16="http://schemas.microsoft.com/office/drawing/2014/main" id="{84DF5FB3-6B18-6E52-CED0-52B59C223732}"/>
-              </a:ext>
-            </a:extLst>
-          </p:cNvPr>
-          <p:cNvSpPr/>
-          <p:nvPr/>
-        </p:nvSpPr>
-        <p:spPr>
-          <a:xfrm>
-            <a:off x="821623" y="2125701"/>
-            <a:ext cx="1844844" cy="489284"/>
-          </a:xfrm>
-          <a:prstGeom prst="flowChartInputOutput">
-            <a:avLst/>
-          </a:prstGeom>
-          <a:noFill/>
-          <a:ln>
-            <a:solidFill>
-              <a:schemeClr val="accent1">
-                <a:lumMod val="60000"/>
-                <a:lumOff val="40000"/>
-              </a:schemeClr>
-            </a:solidFill>
-          </a:ln>
-        </p:spPr>
-        <p:style>
-          <a:lnRef idx="2">
-            <a:schemeClr val="accent1">
-              <a:shade val="50000"/>
-            </a:schemeClr>
-          </a:lnRef>
-          <a:fillRef idx="1">
-            <a:schemeClr val="accent1"/>
-          </a:fillRef>
-          <a:effectRef idx="0">
-            <a:schemeClr val="accent1"/>
-          </a:effectRef>
-          <a:fontRef idx="minor">
-            <a:schemeClr val="lt1"/>
-          </a:fontRef>
-        </p:style>
-        <p:txBody>
-          <a:bodyPr rtlCol="0" anchor="ctr"/>
-          <a:lstStyle/>
-          <a:p>
-            <a:pPr algn="ctr"/>
-            <a:r>
-              <a:rPr lang="en-US" sz="1200" dirty="0">
+                <a:tailEnd type="triangle"/>
+              </a:ln>
+            </p:spPr>
+            <p:style>
+              <a:lnRef idx="1">
+                <a:schemeClr val="accent1"/>
+              </a:lnRef>
+              <a:fillRef idx="0">
+                <a:schemeClr val="accent1"/>
+              </a:fillRef>
+              <a:effectRef idx="0">
+                <a:schemeClr val="accent1"/>
+              </a:effectRef>
+              <a:fontRef idx="minor">
+                <a:schemeClr val="tx1"/>
+              </a:fontRef>
+            </p:style>
+          </p:cxnSp>
+          <p:cxnSp>
+            <p:nvCxnSpPr>
+              <p:cNvPr id="22" name="Straight Arrow Connector 21">
+                <a:extLst>
+                  <a:ext uri="{FF2B5EF4-FFF2-40B4-BE49-F238E27FC236}">
+                    <a16:creationId xmlns:a16="http://schemas.microsoft.com/office/drawing/2014/main" id="{CE857124-A676-22A6-040F-B6A1D27A8ADB}"/>
+                  </a:ext>
+                </a:extLst>
+              </p:cNvPr>
+              <p:cNvCxnSpPr>
+                <a:stCxn id="46" idx="3"/>
+                <a:endCxn id="20" idx="1"/>
+              </p:cNvCxnSpPr>
+              <p:nvPr/>
+            </p:nvCxnSpPr>
+            <p:spPr>
+              <a:xfrm flipV="1">
+                <a:off x="5913613" y="3739983"/>
+                <a:ext cx="368185" cy="4757"/>
+              </a:xfrm>
+              <a:prstGeom prst="straightConnector1">
+                <a:avLst/>
+              </a:prstGeom>
+              <a:ln w="12700">
+                <a:solidFill>
+                  <a:srgbClr val="FF7C80"/>
+                </a:solidFill>
+                <a:tailEnd type="triangle"/>
+              </a:ln>
+            </p:spPr>
+            <p:style>
+              <a:lnRef idx="1">
+                <a:schemeClr val="accent1"/>
+              </a:lnRef>
+              <a:fillRef idx="0">
+                <a:schemeClr val="accent1"/>
+              </a:fillRef>
+              <a:effectRef idx="0">
+                <a:schemeClr val="accent1"/>
+              </a:effectRef>
+              <a:fontRef idx="minor">
+                <a:schemeClr val="tx1"/>
+              </a:fontRef>
+            </p:style>
+          </p:cxnSp>
+          <p:cxnSp>
+            <p:nvCxnSpPr>
+              <p:cNvPr id="25" name="Straight Arrow Connector 24">
+                <a:extLst>
+                  <a:ext uri="{FF2B5EF4-FFF2-40B4-BE49-F238E27FC236}">
+                    <a16:creationId xmlns:a16="http://schemas.microsoft.com/office/drawing/2014/main" id="{99DC3955-16EA-6F4E-6EF7-9E3B6AF97BCF}"/>
+                  </a:ext>
+                </a:extLst>
+              </p:cNvPr>
+              <p:cNvCxnSpPr>
+                <a:cxnSpLocks/>
+                <a:stCxn id="20" idx="3"/>
+                <a:endCxn id="23" idx="2"/>
+              </p:cNvCxnSpPr>
+              <p:nvPr/>
+            </p:nvCxnSpPr>
+            <p:spPr>
+              <a:xfrm flipV="1">
+                <a:off x="8126642" y="3738321"/>
+                <a:ext cx="552669" cy="1662"/>
+              </a:xfrm>
+              <a:prstGeom prst="straightConnector1">
+                <a:avLst/>
+              </a:prstGeom>
+              <a:ln w="12700">
+                <a:solidFill>
+                  <a:srgbClr val="FF7C80"/>
+                </a:solidFill>
+                <a:tailEnd type="triangle"/>
+              </a:ln>
+            </p:spPr>
+            <p:style>
+              <a:lnRef idx="1">
+                <a:schemeClr val="accent1"/>
+              </a:lnRef>
+              <a:fillRef idx="0">
+                <a:schemeClr val="accent1"/>
+              </a:fillRef>
+              <a:effectRef idx="0">
+                <a:schemeClr val="accent1"/>
+              </a:effectRef>
+              <a:fontRef idx="minor">
+                <a:schemeClr val="tx1"/>
+              </a:fontRef>
+            </p:style>
+          </p:cxnSp>
+          <p:cxnSp>
+            <p:nvCxnSpPr>
+              <p:cNvPr id="40" name="Connector: Elbow 39">
+                <a:extLst>
+                  <a:ext uri="{FF2B5EF4-FFF2-40B4-BE49-F238E27FC236}">
+                    <a16:creationId xmlns:a16="http://schemas.microsoft.com/office/drawing/2014/main" id="{1D97D9FD-99D3-2B0A-F2EF-D2430E0B4E64}"/>
+                  </a:ext>
+                </a:extLst>
+              </p:cNvPr>
+              <p:cNvCxnSpPr>
+                <a:cxnSpLocks/>
+                <a:stCxn id="28" idx="1"/>
+                <a:endCxn id="46" idx="2"/>
+              </p:cNvCxnSpPr>
+              <p:nvPr/>
+            </p:nvCxnSpPr>
+            <p:spPr>
+              <a:xfrm rot="10800000">
+                <a:off x="4991191" y="4217982"/>
+                <a:ext cx="1290606" cy="497354"/>
+              </a:xfrm>
+              <a:prstGeom prst="bentConnector2">
+                <a:avLst/>
+              </a:prstGeom>
+              <a:ln w="12700">
                 <a:solidFill>
                   <a:schemeClr val="bg1">
-                    <a:lumMod val="85000"/>
+                    <a:lumMod val="75000"/>
                   </a:schemeClr>
                 </a:solidFill>
-                <a:latin typeface="Open Sans" panose="020B0606030504020204" pitchFamily="34" charset="0"/>
-                <a:ea typeface="Open Sans" panose="020B0606030504020204" pitchFamily="34" charset="0"/>
-                <a:cs typeface="Open Sans" panose="020B0606030504020204" pitchFamily="34" charset="0"/>
-              </a:rPr>
-              <a:t>input</a:t>
-            </a:r>
-          </a:p>
-        </p:txBody>
-      </p:sp>
-      <p:sp>
-        <p:nvSpPr>
-          <p:cNvPr id="46" name="Flowchart: Decision 45">
-            <a:extLst>
-              <a:ext uri="{FF2B5EF4-FFF2-40B4-BE49-F238E27FC236}">
-                <a16:creationId xmlns:a16="http://schemas.microsoft.com/office/drawing/2014/main" id="{265FEB22-D05F-9423-661B-B86264CDC339}"/>
-              </a:ext>
-            </a:extLst>
-          </p:cNvPr>
-          <p:cNvSpPr/>
-          <p:nvPr/>
-        </p:nvSpPr>
-        <p:spPr>
-          <a:xfrm>
-            <a:off x="821623" y="4052904"/>
-            <a:ext cx="1844844" cy="946484"/>
-          </a:xfrm>
-          <a:prstGeom prst="flowChartDecision">
-            <a:avLst/>
-          </a:prstGeom>
-          <a:noFill/>
-          <a:ln>
-            <a:solidFill>
-              <a:srgbClr val="FF7C80"/>
-            </a:solidFill>
-          </a:ln>
-        </p:spPr>
-        <p:style>
-          <a:lnRef idx="2">
-            <a:schemeClr val="accent1">
-              <a:shade val="50000"/>
-            </a:schemeClr>
-          </a:lnRef>
-          <a:fillRef idx="1">
-            <a:schemeClr val="accent1"/>
-          </a:fillRef>
-          <a:effectRef idx="0">
-            <a:schemeClr val="accent1"/>
-          </a:effectRef>
-          <a:fontRef idx="minor">
-            <a:schemeClr val="lt1"/>
-          </a:fontRef>
-        </p:style>
-        <p:txBody>
-          <a:bodyPr rtlCol="0" anchor="ctr"/>
-          <a:lstStyle/>
-          <a:p>
-            <a:pPr algn="ctr"/>
-            <a:r>
-              <a:rPr lang="en-US" sz="1200" dirty="0">
+                <a:tailEnd type="triangle"/>
+              </a:ln>
+            </p:spPr>
+            <p:style>
+              <a:lnRef idx="1">
+                <a:schemeClr val="accent1"/>
+              </a:lnRef>
+              <a:fillRef idx="0">
+                <a:schemeClr val="accent1"/>
+              </a:fillRef>
+              <a:effectRef idx="0">
+                <a:schemeClr val="accent1"/>
+              </a:effectRef>
+              <a:fontRef idx="minor">
+                <a:schemeClr val="tx1"/>
+              </a:fontRef>
+            </p:style>
+          </p:cxnSp>
+          <p:cxnSp>
+            <p:nvCxnSpPr>
+              <p:cNvPr id="58" name="Straight Arrow Connector 57">
+                <a:extLst>
+                  <a:ext uri="{FF2B5EF4-FFF2-40B4-BE49-F238E27FC236}">
+                    <a16:creationId xmlns:a16="http://schemas.microsoft.com/office/drawing/2014/main" id="{54E15CD9-12D7-2621-8CC1-AD530E45C816}"/>
+                  </a:ext>
+                </a:extLst>
+              </p:cNvPr>
+              <p:cNvCxnSpPr>
+                <a:cxnSpLocks/>
+                <a:stCxn id="20" idx="2"/>
+                <a:endCxn id="28" idx="0"/>
+              </p:cNvCxnSpPr>
+              <p:nvPr/>
+            </p:nvCxnSpPr>
+            <p:spPr>
+              <a:xfrm flipH="1">
+                <a:off x="7204219" y="4213225"/>
+                <a:ext cx="1" cy="305595"/>
+              </a:xfrm>
+              <a:prstGeom prst="straightConnector1">
+                <a:avLst/>
+              </a:prstGeom>
+              <a:ln w="12700">
+                <a:solidFill>
+                  <a:srgbClr val="FF7C80"/>
+                </a:solidFill>
+                <a:tailEnd type="triangle"/>
+              </a:ln>
+            </p:spPr>
+            <p:style>
+              <a:lnRef idx="1">
+                <a:schemeClr val="accent1"/>
+              </a:lnRef>
+              <a:fillRef idx="0">
+                <a:schemeClr val="accent1"/>
+              </a:fillRef>
+              <a:effectRef idx="0">
+                <a:schemeClr val="accent1"/>
+              </a:effectRef>
+              <a:fontRef idx="minor">
+                <a:schemeClr val="tx1"/>
+              </a:fontRef>
+            </p:style>
+          </p:cxnSp>
+          <p:sp>
+            <p:nvSpPr>
+              <p:cNvPr id="67" name="TextBox 66">
+                <a:extLst>
+                  <a:ext uri="{FF2B5EF4-FFF2-40B4-BE49-F238E27FC236}">
+                    <a16:creationId xmlns:a16="http://schemas.microsoft.com/office/drawing/2014/main" id="{71DBA315-543B-0F12-FA1C-E14B1F6743FA}"/>
+                  </a:ext>
+                </a:extLst>
+              </p:cNvPr>
+              <p:cNvSpPr txBox="1"/>
+              <p:nvPr/>
+            </p:nvSpPr>
+            <p:spPr>
+              <a:xfrm>
+                <a:off x="5902806" y="3461322"/>
+                <a:ext cx="269626" cy="276999"/>
+              </a:xfrm>
+              <a:prstGeom prst="rect">
+                <a:avLst/>
+              </a:prstGeom>
+              <a:noFill/>
+            </p:spPr>
+            <p:txBody>
+              <a:bodyPr wrap="none" rtlCol="0">
+                <a:spAutoFit/>
+              </a:bodyPr>
+              <a:lstStyle/>
+              <a:p>
+                <a:r>
+                  <a:rPr lang="en-US" sz="1200" dirty="0">
+                    <a:solidFill>
+                      <a:srgbClr val="FF7C80"/>
+                    </a:solidFill>
+                    <a:latin typeface="Open Sans" panose="020B0606030504020204" pitchFamily="34" charset="0"/>
+                    <a:ea typeface="Open Sans" panose="020B0606030504020204" pitchFamily="34" charset="0"/>
+                    <a:cs typeface="Open Sans" panose="020B0606030504020204" pitchFamily="34" charset="0"/>
+                  </a:rPr>
+                  <a:t>T</a:t>
+                </a:r>
+              </a:p>
+            </p:txBody>
+          </p:sp>
+          <p:sp>
+            <p:nvSpPr>
+              <p:cNvPr id="68" name="TextBox 67">
+                <a:extLst>
+                  <a:ext uri="{FF2B5EF4-FFF2-40B4-BE49-F238E27FC236}">
+                    <a16:creationId xmlns:a16="http://schemas.microsoft.com/office/drawing/2014/main" id="{2ED542CE-5B3C-F3CD-4EC7-09EC4ED14A09}"/>
+                  </a:ext>
+                </a:extLst>
+              </p:cNvPr>
+              <p:cNvSpPr txBox="1"/>
+              <p:nvPr/>
+            </p:nvSpPr>
+            <p:spPr>
+              <a:xfrm>
+                <a:off x="4985789" y="2977651"/>
+                <a:ext cx="269626" cy="276999"/>
+              </a:xfrm>
+              <a:prstGeom prst="rect">
+                <a:avLst/>
+              </a:prstGeom>
+              <a:noFill/>
+            </p:spPr>
+            <p:txBody>
+              <a:bodyPr wrap="none" rtlCol="0">
+                <a:spAutoFit/>
+              </a:bodyPr>
+              <a:lstStyle/>
+              <a:p>
+                <a:r>
+                  <a:rPr lang="en-US" sz="1200" dirty="0">
+                    <a:solidFill>
+                      <a:srgbClr val="FF7C80"/>
+                    </a:solidFill>
+                    <a:latin typeface="Open Sans" panose="020B0606030504020204" pitchFamily="34" charset="0"/>
+                    <a:ea typeface="Open Sans" panose="020B0606030504020204" pitchFamily="34" charset="0"/>
+                    <a:cs typeface="Open Sans" panose="020B0606030504020204" pitchFamily="34" charset="0"/>
+                  </a:rPr>
+                  <a:t>F</a:t>
+                </a:r>
+              </a:p>
+            </p:txBody>
+          </p:sp>
+          <p:cxnSp>
+            <p:nvCxnSpPr>
+              <p:cNvPr id="31" name="Connector: Elbow 30">
+                <a:extLst>
+                  <a:ext uri="{FF2B5EF4-FFF2-40B4-BE49-F238E27FC236}">
+                    <a16:creationId xmlns:a16="http://schemas.microsoft.com/office/drawing/2014/main" id="{C10BE16C-8483-6B07-C0FD-50BF3FFAC067}"/>
+                  </a:ext>
+                </a:extLst>
+              </p:cNvPr>
+              <p:cNvCxnSpPr>
+                <a:cxnSpLocks/>
+                <a:stCxn id="46" idx="0"/>
+                <a:endCxn id="19" idx="2"/>
+              </p:cNvCxnSpPr>
+              <p:nvPr/>
+            </p:nvCxnSpPr>
+            <p:spPr>
+              <a:xfrm rot="5400000" flipH="1" flipV="1">
+                <a:off x="6567713" y="1156488"/>
+                <a:ext cx="538489" cy="3691533"/>
+              </a:xfrm>
+              <a:prstGeom prst="bentConnector2">
+                <a:avLst/>
+              </a:prstGeom>
+              <a:ln w="12700">
+                <a:solidFill>
+                  <a:srgbClr val="FF7C80"/>
+                </a:solidFill>
+                <a:tailEnd type="triangle"/>
+              </a:ln>
+            </p:spPr>
+            <p:style>
+              <a:lnRef idx="1">
+                <a:schemeClr val="accent1"/>
+              </a:lnRef>
+              <a:fillRef idx="0">
+                <a:schemeClr val="accent1"/>
+              </a:fillRef>
+              <a:effectRef idx="0">
+                <a:schemeClr val="accent1"/>
+              </a:effectRef>
+              <a:fontRef idx="minor">
+                <a:schemeClr val="tx1"/>
+              </a:fontRef>
+            </p:style>
+          </p:cxnSp>
+          <p:sp>
+            <p:nvSpPr>
+              <p:cNvPr id="55" name="Rectangle 54">
+                <a:extLst>
+                  <a:ext uri="{FF2B5EF4-FFF2-40B4-BE49-F238E27FC236}">
+                    <a16:creationId xmlns:a16="http://schemas.microsoft.com/office/drawing/2014/main" id="{3FF08235-09F1-BBD1-07A1-A54283FC7D54}"/>
+                  </a:ext>
+                </a:extLst>
+              </p:cNvPr>
+              <p:cNvSpPr/>
+              <p:nvPr/>
+            </p:nvSpPr>
+            <p:spPr>
+              <a:xfrm>
+                <a:off x="8494825" y="4518820"/>
+                <a:ext cx="1844844" cy="393032"/>
+              </a:xfrm>
+              <a:prstGeom prst="rect">
+                <a:avLst/>
+              </a:prstGeom>
+              <a:noFill/>
+              <a:ln>
+                <a:solidFill>
+                  <a:schemeClr val="accent6">
+                    <a:lumMod val="60000"/>
+                    <a:lumOff val="40000"/>
+                  </a:schemeClr>
+                </a:solidFill>
+              </a:ln>
+            </p:spPr>
+            <p:style>
+              <a:lnRef idx="2">
+                <a:schemeClr val="accent1">
+                  <a:shade val="50000"/>
+                </a:schemeClr>
+              </a:lnRef>
+              <a:fillRef idx="1">
+                <a:schemeClr val="accent1"/>
+              </a:fillRef>
+              <a:effectRef idx="0">
+                <a:schemeClr val="accent1"/>
+              </a:effectRef>
+              <a:fontRef idx="minor">
+                <a:schemeClr val="lt1"/>
+              </a:fontRef>
+            </p:style>
+            <p:txBody>
+              <a:bodyPr rtlCol="0" anchor="ctr"/>
+              <a:lstStyle/>
+              <a:p>
+                <a:pPr algn="ctr"/>
+                <a:r>
+                  <a:rPr lang="en-US" sz="1200" dirty="0">
+                    <a:solidFill>
+                      <a:schemeClr val="bg1">
+                        <a:lumMod val="85000"/>
+                      </a:schemeClr>
+                    </a:solidFill>
+                    <a:latin typeface="Open Sans" panose="020B0606030504020204" pitchFamily="34" charset="0"/>
+                    <a:ea typeface="Open Sans" panose="020B0606030504020204" pitchFamily="34" charset="0"/>
+                    <a:cs typeface="Open Sans" panose="020B0606030504020204" pitchFamily="34" charset="0"/>
+                  </a:rPr>
+                  <a:t>sum = sum + num</a:t>
+                </a:r>
+              </a:p>
+            </p:txBody>
+          </p:sp>
+          <p:cxnSp>
+            <p:nvCxnSpPr>
+              <p:cNvPr id="39" name="Straight Arrow Connector 38">
+                <a:extLst>
+                  <a:ext uri="{FF2B5EF4-FFF2-40B4-BE49-F238E27FC236}">
+                    <a16:creationId xmlns:a16="http://schemas.microsoft.com/office/drawing/2014/main" id="{A0C93E01-A6A3-6E45-F267-91941C2306E4}"/>
+                  </a:ext>
+                </a:extLst>
+              </p:cNvPr>
+              <p:cNvCxnSpPr>
+                <a:stCxn id="23" idx="4"/>
+                <a:endCxn id="55" idx="0"/>
+              </p:cNvCxnSpPr>
+              <p:nvPr/>
+            </p:nvCxnSpPr>
+            <p:spPr>
+              <a:xfrm flipH="1">
+                <a:off x="9417247" y="3982963"/>
+                <a:ext cx="2" cy="535857"/>
+              </a:xfrm>
+              <a:prstGeom prst="straightConnector1">
+                <a:avLst/>
+              </a:prstGeom>
+              <a:ln w="12700">
+                <a:solidFill>
+                  <a:srgbClr val="CC99FF"/>
+                </a:solidFill>
+                <a:tailEnd type="triangle"/>
+              </a:ln>
+            </p:spPr>
+            <p:style>
+              <a:lnRef idx="1">
+                <a:schemeClr val="accent1"/>
+              </a:lnRef>
+              <a:fillRef idx="0">
+                <a:schemeClr val="accent1"/>
+              </a:fillRef>
+              <a:effectRef idx="0">
+                <a:schemeClr val="accent1"/>
+              </a:effectRef>
+              <a:fontRef idx="minor">
+                <a:schemeClr val="tx1"/>
+              </a:fontRef>
+            </p:style>
+          </p:cxnSp>
+          <p:cxnSp>
+            <p:nvCxnSpPr>
+              <p:cNvPr id="42" name="Straight Arrow Connector 41">
+                <a:extLst>
+                  <a:ext uri="{FF2B5EF4-FFF2-40B4-BE49-F238E27FC236}">
+                    <a16:creationId xmlns:a16="http://schemas.microsoft.com/office/drawing/2014/main" id="{5BEB5CDE-EA8A-56DE-C0C4-75C965914104}"/>
+                  </a:ext>
+                </a:extLst>
+              </p:cNvPr>
+              <p:cNvCxnSpPr>
+                <a:stCxn id="55" idx="1"/>
+                <a:endCxn id="28" idx="3"/>
+              </p:cNvCxnSpPr>
+              <p:nvPr/>
+            </p:nvCxnSpPr>
+            <p:spPr>
+              <a:xfrm flipH="1">
+                <a:off x="8126641" y="4715336"/>
+                <a:ext cx="368184" cy="0"/>
+              </a:xfrm>
+              <a:prstGeom prst="straightConnector1">
+                <a:avLst/>
+              </a:prstGeom>
+              <a:ln w="12700">
                 <a:solidFill>
                   <a:schemeClr val="bg1">
-                    <a:lumMod val="85000"/>
+                    <a:lumMod val="75000"/>
                   </a:schemeClr>
                 </a:solidFill>
-                <a:latin typeface="Open Sans" panose="020B0606030504020204" pitchFamily="34" charset="0"/>
-                <a:ea typeface="Open Sans" panose="020B0606030504020204" pitchFamily="34" charset="0"/>
-                <a:cs typeface="Open Sans" panose="020B0606030504020204" pitchFamily="34" charset="0"/>
-              </a:rPr>
-              <a:t>decision</a:t>
-            </a:r>
-          </a:p>
-        </p:txBody>
-      </p:sp>
-      <p:sp>
-        <p:nvSpPr>
-          <p:cNvPr id="47" name="Flowchart: Data 46">
-            <a:extLst>
-              <a:ext uri="{FF2B5EF4-FFF2-40B4-BE49-F238E27FC236}">
-                <a16:creationId xmlns:a16="http://schemas.microsoft.com/office/drawing/2014/main" id="{E79F7B5C-9F7D-5907-4BED-1DDC3947E632}"/>
-              </a:ext>
-            </a:extLst>
-          </p:cNvPr>
-          <p:cNvSpPr/>
-          <p:nvPr/>
-        </p:nvSpPr>
-        <p:spPr>
-          <a:xfrm>
-            <a:off x="821623" y="5526936"/>
-            <a:ext cx="1844844" cy="489284"/>
-          </a:xfrm>
-          <a:prstGeom prst="flowChartInputOutput">
-            <a:avLst/>
-          </a:prstGeom>
-          <a:noFill/>
-          <a:ln>
-            <a:solidFill>
-              <a:srgbClr val="CC99FF"/>
-            </a:solidFill>
-          </a:ln>
-        </p:spPr>
-        <p:style>
-          <a:lnRef idx="2">
-            <a:schemeClr val="accent1">
-              <a:shade val="50000"/>
-            </a:schemeClr>
-          </a:lnRef>
-          <a:fillRef idx="1">
-            <a:schemeClr val="accent1"/>
-          </a:fillRef>
-          <a:effectRef idx="0">
-            <a:schemeClr val="accent1"/>
-          </a:effectRef>
-          <a:fontRef idx="minor">
-            <a:schemeClr val="lt1"/>
-          </a:fontRef>
-        </p:style>
-        <p:txBody>
-          <a:bodyPr rtlCol="0" anchor="ctr"/>
-          <a:lstStyle/>
-          <a:p>
-            <a:pPr algn="ctr"/>
-            <a:r>
-              <a:rPr lang="en-US" sz="1200" dirty="0">
-                <a:solidFill>
-                  <a:schemeClr val="bg1">
-                    <a:lumMod val="85000"/>
-                  </a:schemeClr>
-                </a:solidFill>
-                <a:latin typeface="Open Sans" panose="020B0606030504020204" pitchFamily="34" charset="0"/>
-                <a:ea typeface="Open Sans" panose="020B0606030504020204" pitchFamily="34" charset="0"/>
-                <a:cs typeface="Open Sans" panose="020B0606030504020204" pitchFamily="34" charset="0"/>
-              </a:rPr>
-              <a:t>output</a:t>
-            </a:r>
-          </a:p>
-        </p:txBody>
-      </p:sp>
-      <p:sp>
-        <p:nvSpPr>
-          <p:cNvPr id="49" name="TextBox 48">
-            <a:extLst>
-              <a:ext uri="{FF2B5EF4-FFF2-40B4-BE49-F238E27FC236}">
-                <a16:creationId xmlns:a16="http://schemas.microsoft.com/office/drawing/2014/main" id="{9782D64F-E1B4-7BBA-97F1-672AA7BB38F2}"/>
-              </a:ext>
-            </a:extLst>
-          </p:cNvPr>
-          <p:cNvSpPr txBox="1"/>
-          <p:nvPr/>
-        </p:nvSpPr>
-        <p:spPr>
-          <a:xfrm>
-            <a:off x="2396841" y="4042695"/>
-            <a:ext cx="269626" cy="276999"/>
-          </a:xfrm>
-          <a:prstGeom prst="rect">
-            <a:avLst/>
-          </a:prstGeom>
-          <a:noFill/>
-        </p:spPr>
-        <p:txBody>
-          <a:bodyPr wrap="none" rtlCol="0">
-            <a:spAutoFit/>
-          </a:bodyPr>
-          <a:lstStyle/>
-          <a:p>
-            <a:r>
-              <a:rPr lang="en-US" sz="1200" dirty="0">
-                <a:solidFill>
-                  <a:srgbClr val="FF7C80"/>
-                </a:solidFill>
-                <a:latin typeface="Open Sans" panose="020B0606030504020204" pitchFamily="34" charset="0"/>
-                <a:ea typeface="Open Sans" panose="020B0606030504020204" pitchFamily="34" charset="0"/>
-                <a:cs typeface="Open Sans" panose="020B0606030504020204" pitchFamily="34" charset="0"/>
-              </a:rPr>
-              <a:t>T</a:t>
-            </a:r>
-          </a:p>
-        </p:txBody>
-      </p:sp>
-      <p:sp>
-        <p:nvSpPr>
-          <p:cNvPr id="53" name="TextBox 52">
-            <a:extLst>
-              <a:ext uri="{FF2B5EF4-FFF2-40B4-BE49-F238E27FC236}">
-                <a16:creationId xmlns:a16="http://schemas.microsoft.com/office/drawing/2014/main" id="{7E6B2905-22B9-9F02-399A-510F7F8499F3}"/>
-              </a:ext>
-            </a:extLst>
-          </p:cNvPr>
-          <p:cNvSpPr txBox="1"/>
-          <p:nvPr/>
-        </p:nvSpPr>
-        <p:spPr>
-          <a:xfrm>
-            <a:off x="821623" y="4042694"/>
-            <a:ext cx="269626" cy="276999"/>
-          </a:xfrm>
-          <a:prstGeom prst="rect">
-            <a:avLst/>
-          </a:prstGeom>
-          <a:noFill/>
-        </p:spPr>
-        <p:txBody>
-          <a:bodyPr wrap="none" rtlCol="0">
-            <a:spAutoFit/>
-          </a:bodyPr>
-          <a:lstStyle/>
-          <a:p>
-            <a:r>
-              <a:rPr lang="en-US" sz="1200" dirty="0">
-                <a:solidFill>
-                  <a:srgbClr val="FF7C80"/>
-                </a:solidFill>
-                <a:latin typeface="Open Sans" panose="020B0606030504020204" pitchFamily="34" charset="0"/>
-                <a:ea typeface="Open Sans" panose="020B0606030504020204" pitchFamily="34" charset="0"/>
-                <a:cs typeface="Open Sans" panose="020B0606030504020204" pitchFamily="34" charset="0"/>
-              </a:rPr>
-              <a:t>F</a:t>
-            </a:r>
-          </a:p>
-        </p:txBody>
-      </p:sp>
+                <a:tailEnd type="triangle"/>
+              </a:ln>
+            </p:spPr>
+            <p:style>
+              <a:lnRef idx="1">
+                <a:schemeClr val="accent1"/>
+              </a:lnRef>
+              <a:fillRef idx="0">
+                <a:schemeClr val="accent1"/>
+              </a:fillRef>
+              <a:effectRef idx="0">
+                <a:schemeClr val="accent1"/>
+              </a:effectRef>
+              <a:fontRef idx="minor">
+                <a:schemeClr val="tx1"/>
+              </a:fontRef>
+            </p:style>
+          </p:cxnSp>
+        </p:grpSp>
+      </p:grpSp>
     </p:spTree>
     <p:extLst>
       <p:ext uri="{BB962C8B-B14F-4D97-AF65-F5344CB8AC3E}">
-        <p14:creationId xmlns:p14="http://schemas.microsoft.com/office/powerpoint/2010/main" val="1878857899"/>
+        <p14:creationId xmlns:p14="http://schemas.microsoft.com/office/powerpoint/2010/main" val="3103607967"/>
       </p:ext>
     </p:extLst>
   </p:cSld>

</xml_diff>